<commit_message>
Built site for jfa: 0.5.0@591f74c
</commit_message>
<xml_diff>
--- a/reference/figures/cheatsheet/cheatsheet.pptx
+++ b/reference/figures/cheatsheet/cheatsheet.pptx
@@ -2175,7 +2175,7 @@
           </a:ln>
           <a:extLst>
             <a:ext uri="{C572A759-6A51-4108-AA02-DFA0A04FC94B}">
-              <ma14:wrappingTextBoxFlag xmlns="" xmlns:m="http://schemas.openxmlformats.org/officeDocument/2006/math" xmlns:a14="http://schemas.microsoft.com/office/drawing/2010/main" xmlns:ma14="http://schemas.microsoft.com/office/mac/drawingml/2011/main" val="1"/>
+              <ma14:wrappingTextBoxFlag xmlns:ma14="http://schemas.microsoft.com/office/mac/drawingml/2011/main" xmlns:a14="http://schemas.microsoft.com/office/drawing/2010/main" xmlns:m="http://schemas.openxmlformats.org/officeDocument/2006/math" xmlns="" val="1"/>
             </a:ext>
           </a:extLst>
         </p:spPr>
@@ -2214,7 +2214,7 @@
           </a:ln>
           <a:extLst>
             <a:ext uri="{C572A759-6A51-4108-AA02-DFA0A04FC94B}">
-              <ma14:wrappingTextBoxFlag xmlns="" xmlns:m="http://schemas.openxmlformats.org/officeDocument/2006/math" xmlns:a14="http://schemas.microsoft.com/office/drawing/2010/main" xmlns:ma14="http://schemas.microsoft.com/office/mac/drawingml/2011/main" val="1"/>
+              <ma14:wrappingTextBoxFlag xmlns:ma14="http://schemas.microsoft.com/office/mac/drawingml/2011/main" xmlns:a14="http://schemas.microsoft.com/office/drawing/2010/main" xmlns:m="http://schemas.openxmlformats.org/officeDocument/2006/math" xmlns="" val="1"/>
             </a:ext>
           </a:extLst>
         </p:spPr>
@@ -3210,8 +3210,8 @@
         </p:nvSpPr>
         <p:spPr>
           <a:xfrm>
-            <a:off x="205014" y="1530350"/>
-            <a:ext cx="2954306" cy="3711482"/>
+            <a:off x="205014" y="1530349"/>
+            <a:ext cx="2954306" cy="5572878"/>
           </a:xfrm>
           <a:prstGeom prst="rect">
             <a:avLst/>
@@ -3307,7 +3307,7 @@
           </a:ln>
           <a:extLst>
             <a:ext uri="{C572A759-6A51-4108-AA02-DFA0A04FC94B}">
-              <ma14:wrappingTextBoxFlag xmlns="" xmlns:m="http://schemas.openxmlformats.org/officeDocument/2006/math" xmlns:a14="http://schemas.microsoft.com/office/drawing/2010/main" xmlns:ma14="http://schemas.microsoft.com/office/mac/drawingml/2011/main" val="1"/>
+              <ma14:wrappingTextBoxFlag xmlns:ma14="http://schemas.microsoft.com/office/mac/drawingml/2011/main" xmlns:a14="http://schemas.microsoft.com/office/drawing/2010/main" xmlns:m="http://schemas.openxmlformats.org/officeDocument/2006/math" xmlns="" val="1"/>
             </a:ext>
           </a:extLst>
         </p:spPr>
@@ -3360,7 +3360,7 @@
           </a:ln>
           <a:extLst>
             <a:ext uri="{C572A759-6A51-4108-AA02-DFA0A04FC94B}">
-              <ma14:wrappingTextBoxFlag xmlns="" xmlns:m="http://schemas.openxmlformats.org/officeDocument/2006/math" xmlns:a14="http://schemas.microsoft.com/office/drawing/2010/main" xmlns:ma14="http://schemas.microsoft.com/office/mac/drawingml/2011/main" val="1"/>
+              <ma14:wrappingTextBoxFlag xmlns:ma14="http://schemas.microsoft.com/office/mac/drawingml/2011/main" xmlns:a14="http://schemas.microsoft.com/office/drawing/2010/main" xmlns:m="http://schemas.openxmlformats.org/officeDocument/2006/math" xmlns="" val="1"/>
             </a:ext>
           </a:extLst>
         </p:spPr>
@@ -3459,7 +3459,7 @@
         </p:nvSpPr>
         <p:spPr>
           <a:xfrm>
-            <a:off x="323329" y="2070098"/>
+            <a:off x="323329" y="2021970"/>
             <a:ext cx="2704008" cy="1568131"/>
           </a:xfrm>
           <a:prstGeom prst="rect">
@@ -3470,7 +3470,7 @@
           </a:ln>
           <a:extLst>
             <a:ext uri="{C572A759-6A51-4108-AA02-DFA0A04FC94B}">
-              <ma14:wrappingTextBoxFlag xmlns="" xmlns:m="http://schemas.openxmlformats.org/officeDocument/2006/math" xmlns:a14="http://schemas.microsoft.com/office/drawing/2010/main" xmlns:ma14="http://schemas.microsoft.com/office/mac/drawingml/2011/main" val="1"/>
+              <ma14:wrappingTextBoxFlag xmlns:ma14="http://schemas.microsoft.com/office/mac/drawingml/2011/main" xmlns:a14="http://schemas.microsoft.com/office/drawing/2010/main" xmlns:m="http://schemas.openxmlformats.org/officeDocument/2006/math" xmlns="" val="1"/>
             </a:ext>
           </a:extLst>
         </p:spPr>
@@ -4051,7 +4051,7 @@
           </a:ln>
           <a:extLst>
             <a:ext uri="{C572A759-6A51-4108-AA02-DFA0A04FC94B}">
-              <ma14:wrappingTextBoxFlag xmlns="" xmlns:m="http://schemas.openxmlformats.org/officeDocument/2006/math" xmlns:a14="http://schemas.microsoft.com/office/drawing/2010/main" xmlns:ma14="http://schemas.microsoft.com/office/mac/drawingml/2011/main" val="1"/>
+              <ma14:wrappingTextBoxFlag xmlns:ma14="http://schemas.microsoft.com/office/mac/drawingml/2011/main" xmlns:a14="http://schemas.microsoft.com/office/drawing/2010/main" xmlns:m="http://schemas.openxmlformats.org/officeDocument/2006/math" xmlns="" val="1"/>
             </a:ext>
           </a:extLst>
         </p:spPr>
@@ -4199,8 +4199,8 @@
         </p:nvSpPr>
         <p:spPr>
           <a:xfrm>
-            <a:off x="10409753" y="2302425"/>
-            <a:ext cx="3178078" cy="479538"/>
+            <a:off x="10409753" y="2333203"/>
+            <a:ext cx="3178078" cy="417982"/>
           </a:xfrm>
           <a:prstGeom prst="rect">
             <a:avLst/>
@@ -4219,7 +4219,7 @@
           </a:ln>
           <a:extLst>
             <a:ext uri="{C572A759-6A51-4108-AA02-DFA0A04FC94B}">
-              <ma14:wrappingTextBoxFlag xmlns="" xmlns:m="http://schemas.openxmlformats.org/officeDocument/2006/math" xmlns:a14="http://schemas.microsoft.com/office/drawing/2010/main" xmlns:ma14="http://schemas.microsoft.com/office/mac/drawingml/2011/main" val="1"/>
+              <ma14:wrappingTextBoxFlag xmlns:ma14="http://schemas.microsoft.com/office/mac/drawingml/2011/main" xmlns:a14="http://schemas.microsoft.com/office/drawing/2010/main" xmlns:m="http://schemas.openxmlformats.org/officeDocument/2006/math" xmlns="" val="1"/>
             </a:ext>
           </a:extLst>
         </p:spPr>
@@ -4244,7 +4244,7 @@
               </a:defRPr>
             </a:pPr>
             <a:r>
-              <a:rPr lang="nl-NL" dirty="0" err="1">
+              <a:rPr lang="nl-NL" sz="1000" dirty="0" err="1">
                 <a:solidFill>
                   <a:schemeClr val="tx1"/>
                 </a:solidFill>
@@ -4254,7 +4254,7 @@
               <a:t>auditPrior</a:t>
             </a:r>
             <a:r>
-              <a:rPr lang="nl-NL" dirty="0">
+              <a:rPr lang="nl-NL" sz="1000" dirty="0">
                 <a:solidFill>
                   <a:schemeClr val="tx1"/>
                 </a:solidFill>
@@ -4264,7 +4264,7 @@
               <a:t>(</a:t>
             </a:r>
             <a:r>
-              <a:rPr lang="nl-NL" dirty="0" err="1">
+              <a:rPr lang="nl-NL" sz="1000" dirty="0" err="1">
                 <a:solidFill>
                   <a:schemeClr val="tx1"/>
                 </a:solidFill>
@@ -4274,7 +4274,7 @@
               <a:t>materiality</a:t>
             </a:r>
             <a:r>
-              <a:rPr lang="nl-NL" dirty="0">
+              <a:rPr lang="nl-NL" sz="1000" dirty="0">
                 <a:solidFill>
                   <a:schemeClr val="tx1"/>
                 </a:solidFill>
@@ -4300,7 +4300,7 @@
               </a:defRPr>
             </a:pPr>
             <a:r>
-              <a:rPr lang="nl-NL" dirty="0">
+              <a:rPr lang="nl-NL" sz="1000" dirty="0">
                 <a:solidFill>
                   <a:schemeClr val="tx1"/>
                 </a:solidFill>
@@ -4310,7 +4310,7 @@
               <a:t>           </a:t>
             </a:r>
             <a:r>
-              <a:rPr lang="nl-NL" dirty="0" err="1">
+              <a:rPr lang="nl-NL" sz="1000" dirty="0" err="1">
                 <a:solidFill>
                   <a:schemeClr val="tx1"/>
                 </a:solidFill>
@@ -4320,7 +4320,7 @@
               <a:t>method</a:t>
             </a:r>
             <a:r>
-              <a:rPr lang="nl-NL" dirty="0">
+              <a:rPr lang="nl-NL" sz="1000" dirty="0">
                 <a:solidFill>
                   <a:schemeClr val="tx1"/>
                 </a:solidFill>
@@ -4329,7 +4329,7 @@
               </a:rPr>
               <a:t> = "none")</a:t>
             </a:r>
-            <a:endParaRPr dirty="0">
+            <a:endParaRPr sz="1000" dirty="0">
               <a:solidFill>
                 <a:schemeClr val="tx1"/>
               </a:solidFill>
@@ -4358,7 +4358,7 @@
           </a:ln>
           <a:extLst>
             <a:ext uri="{C572A759-6A51-4108-AA02-DFA0A04FC94B}">
-              <ma14:wrappingTextBoxFlag xmlns="" xmlns:m="http://schemas.openxmlformats.org/officeDocument/2006/math" xmlns:a14="http://schemas.microsoft.com/office/drawing/2010/main" xmlns:ma14="http://schemas.microsoft.com/office/mac/drawingml/2011/main" val="1"/>
+              <ma14:wrappingTextBoxFlag xmlns:ma14="http://schemas.microsoft.com/office/mac/drawingml/2011/main" xmlns:a14="http://schemas.microsoft.com/office/drawing/2010/main" xmlns:m="http://schemas.openxmlformats.org/officeDocument/2006/math" xmlns="" val="1"/>
             </a:ext>
           </a:extLst>
         </p:spPr>
@@ -4535,7 +4535,7 @@
           <a:effectLst/>
           <a:extLst>
             <a:ext uri="{C572A759-6A51-4108-AA02-DFA0A04FC94B}">
-              <ma14:wrappingTextBoxFlag xmlns:lc="http://schemas.openxmlformats.org/drawingml/2006/lockedCanvas" xmlns:ma14="http://schemas.microsoft.com/office/mac/drawingml/2011/main" xmlns:a14="http://schemas.microsoft.com/office/drawing/2010/main" xmlns:m="http://schemas.openxmlformats.org/officeDocument/2006/math" xmlns="" val="1"/>
+              <ma14:wrappingTextBoxFlag xmlns="" xmlns:m="http://schemas.openxmlformats.org/officeDocument/2006/math" xmlns:a14="http://schemas.microsoft.com/office/drawing/2010/main" xmlns:ma14="http://schemas.microsoft.com/office/mac/drawingml/2011/main" xmlns:lc="http://schemas.openxmlformats.org/drawingml/2006/lockedCanvas" val="1"/>
             </a:ext>
           </a:extLst>
         </p:spPr>
@@ -5029,7 +5029,7 @@
           </a:ln>
           <a:extLst>
             <a:ext uri="{C572A759-6A51-4108-AA02-DFA0A04FC94B}">
-              <ma14:wrappingTextBoxFlag xmlns="" xmlns:m="http://schemas.openxmlformats.org/officeDocument/2006/math" xmlns:a14="http://schemas.microsoft.com/office/drawing/2010/main" xmlns:ma14="http://schemas.microsoft.com/office/mac/drawingml/2011/main" val="1"/>
+              <ma14:wrappingTextBoxFlag xmlns:ma14="http://schemas.microsoft.com/office/mac/drawingml/2011/main" xmlns:a14="http://schemas.microsoft.com/office/drawing/2010/main" xmlns:m="http://schemas.openxmlformats.org/officeDocument/2006/math" xmlns="" val="1"/>
             </a:ext>
           </a:extLst>
         </p:spPr>
@@ -5242,7 +5242,7 @@
           </a:ln>
           <a:extLst>
             <a:ext uri="{C572A759-6A51-4108-AA02-DFA0A04FC94B}">
-              <ma14:wrappingTextBoxFlag xmlns="" xmlns:m="http://schemas.openxmlformats.org/officeDocument/2006/math" xmlns:a14="http://schemas.microsoft.com/office/drawing/2010/main" xmlns:ma14="http://schemas.microsoft.com/office/mac/drawingml/2011/main" val="1"/>
+              <ma14:wrappingTextBoxFlag xmlns:ma14="http://schemas.microsoft.com/office/mac/drawingml/2011/main" xmlns:a14="http://schemas.microsoft.com/office/drawing/2010/main" xmlns:m="http://schemas.openxmlformats.org/officeDocument/2006/math" xmlns="" val="1"/>
             </a:ext>
           </a:extLst>
         </p:spPr>
@@ -5373,7 +5373,7 @@
           <a:effectLst/>
           <a:extLst>
             <a:ext uri="{C572A759-6A51-4108-AA02-DFA0A04FC94B}">
-              <ma14:wrappingTextBoxFlag xmlns:lc="http://schemas.openxmlformats.org/drawingml/2006/lockedCanvas" xmlns:ma14="http://schemas.microsoft.com/office/mac/drawingml/2011/main" xmlns:a14="http://schemas.microsoft.com/office/drawing/2010/main" xmlns:m="http://schemas.openxmlformats.org/officeDocument/2006/math" xmlns="" val="1"/>
+              <ma14:wrappingTextBoxFlag xmlns="" xmlns:m="http://schemas.openxmlformats.org/officeDocument/2006/math" xmlns:a14="http://schemas.microsoft.com/office/drawing/2010/main" xmlns:ma14="http://schemas.microsoft.com/office/mac/drawingml/2011/main" xmlns:lc="http://schemas.openxmlformats.org/drawingml/2006/lockedCanvas" val="1"/>
             </a:ext>
           </a:extLst>
         </p:spPr>
@@ -5841,7 +5841,7 @@
           </a:ln>
           <a:extLst>
             <a:ext uri="{C572A759-6A51-4108-AA02-DFA0A04FC94B}">
-              <ma14:wrappingTextBoxFlag xmlns="" xmlns:m="http://schemas.openxmlformats.org/officeDocument/2006/math" xmlns:a14="http://schemas.microsoft.com/office/drawing/2010/main" xmlns:ma14="http://schemas.microsoft.com/office/mac/drawingml/2011/main" val="1"/>
+              <ma14:wrappingTextBoxFlag xmlns:ma14="http://schemas.microsoft.com/office/mac/drawingml/2011/main" xmlns:a14="http://schemas.microsoft.com/office/drawing/2010/main" xmlns:m="http://schemas.openxmlformats.org/officeDocument/2006/math" xmlns="" val="1"/>
             </a:ext>
           </a:extLst>
         </p:spPr>
@@ -5945,7 +5945,7 @@
         <p:spPr>
           <a:xfrm>
             <a:off x="4795732" y="5137597"/>
-            <a:ext cx="5663410" cy="277127"/>
+            <a:ext cx="4962897" cy="277127"/>
           </a:xfrm>
           <a:prstGeom prst="rect">
             <a:avLst/>
@@ -5955,7 +5955,7 @@
           </a:ln>
           <a:extLst>
             <a:ext uri="{C572A759-6A51-4108-AA02-DFA0A04FC94B}">
-              <ma14:wrappingTextBoxFlag xmlns="" xmlns:m="http://schemas.openxmlformats.org/officeDocument/2006/math" xmlns:a14="http://schemas.microsoft.com/office/drawing/2010/main" xmlns:ma14="http://schemas.microsoft.com/office/mac/drawingml/2011/main" val="1"/>
+              <ma14:wrappingTextBoxFlag xmlns:ma14="http://schemas.microsoft.com/office/mac/drawingml/2011/main" xmlns:a14="http://schemas.microsoft.com/office/drawing/2010/main" xmlns:m="http://schemas.openxmlformats.org/officeDocument/2006/math" xmlns="" val="1"/>
             </a:ext>
           </a:extLst>
         </p:spPr>
@@ -6066,17 +6066,7 @@
                   </a:schemeClr>
                 </a:solidFill>
               </a:rPr>
-              <a:t> </a:t>
-            </a:r>
-            <a:r>
-              <a:rPr lang="nl-NL" sz="2000" dirty="0" err="1">
-                <a:solidFill>
-                  <a:schemeClr val="tx1">
-                    <a:lumMod val="50000"/>
-                  </a:schemeClr>
-                </a:solidFill>
-              </a:rPr>
-              <a:t>population</a:t>
+              <a:t> data</a:t>
             </a:r>
             <a:endParaRPr sz="2000" dirty="0">
               <a:solidFill>
@@ -6116,7 +6106,7 @@
           <a:effectLst/>
           <a:extLst>
             <a:ext uri="{C572A759-6A51-4108-AA02-DFA0A04FC94B}">
-              <ma14:wrappingTextBoxFlag xmlns:lc="http://schemas.openxmlformats.org/drawingml/2006/lockedCanvas" xmlns:ma14="http://schemas.microsoft.com/office/mac/drawingml/2011/main" xmlns:a14="http://schemas.microsoft.com/office/drawing/2010/main" xmlns:m="http://schemas.openxmlformats.org/officeDocument/2006/math" xmlns="" val="1"/>
+              <ma14:wrappingTextBoxFlag xmlns="" xmlns:m="http://schemas.openxmlformats.org/officeDocument/2006/math" xmlns:a14="http://schemas.microsoft.com/office/drawing/2010/main" xmlns:ma14="http://schemas.microsoft.com/office/mac/drawingml/2011/main" xmlns:lc="http://schemas.openxmlformats.org/drawingml/2006/lockedCanvas" val="1"/>
             </a:ext>
           </a:extLst>
         </p:spPr>
@@ -6610,7 +6600,7 @@
           </a:ln>
           <a:extLst>
             <a:ext uri="{C572A759-6A51-4108-AA02-DFA0A04FC94B}">
-              <ma14:wrappingTextBoxFlag xmlns="" xmlns:m="http://schemas.openxmlformats.org/officeDocument/2006/math" xmlns:a14="http://schemas.microsoft.com/office/drawing/2010/main" xmlns:ma14="http://schemas.microsoft.com/office/mac/drawingml/2011/main" val="1"/>
+              <ma14:wrappingTextBoxFlag xmlns:ma14="http://schemas.microsoft.com/office/mac/drawingml/2011/main" xmlns:a14="http://schemas.microsoft.com/office/drawing/2010/main" xmlns:m="http://schemas.openxmlformats.org/officeDocument/2006/math" xmlns="" val="1"/>
             </a:ext>
           </a:extLst>
         </p:spPr>
@@ -6912,7 +6902,7 @@
           </a:ln>
           <a:extLst>
             <a:ext uri="{C572A759-6A51-4108-AA02-DFA0A04FC94B}">
-              <ma14:wrappingTextBoxFlag xmlns="" xmlns:m="http://schemas.openxmlformats.org/officeDocument/2006/math" xmlns:a14="http://schemas.microsoft.com/office/drawing/2010/main" xmlns:ma14="http://schemas.microsoft.com/office/mac/drawingml/2011/main" val="1"/>
+              <ma14:wrappingTextBoxFlag xmlns:ma14="http://schemas.microsoft.com/office/mac/drawingml/2011/main" xmlns:a14="http://schemas.microsoft.com/office/drawing/2010/main" xmlns:m="http://schemas.openxmlformats.org/officeDocument/2006/math" xmlns="" val="1"/>
             </a:ext>
           </a:extLst>
         </p:spPr>
@@ -7033,7 +7023,7 @@
           <a:effectLst/>
           <a:extLst>
             <a:ext uri="{C572A759-6A51-4108-AA02-DFA0A04FC94B}">
-              <ma14:wrappingTextBoxFlag xmlns:lc="http://schemas.openxmlformats.org/drawingml/2006/lockedCanvas" xmlns:ma14="http://schemas.microsoft.com/office/mac/drawingml/2011/main" xmlns:a14="http://schemas.microsoft.com/office/drawing/2010/main" xmlns:m="http://schemas.openxmlformats.org/officeDocument/2006/math" xmlns="" val="1"/>
+              <ma14:wrappingTextBoxFlag xmlns="" xmlns:m="http://schemas.openxmlformats.org/officeDocument/2006/math" xmlns:a14="http://schemas.microsoft.com/office/drawing/2010/main" xmlns:ma14="http://schemas.microsoft.com/office/mac/drawingml/2011/main" xmlns:lc="http://schemas.openxmlformats.org/drawingml/2006/lockedCanvas" val="1"/>
             </a:ext>
           </a:extLst>
         </p:spPr>
@@ -7527,7 +7517,7 @@
           </a:ln>
           <a:extLst>
             <a:ext uri="{C572A759-6A51-4108-AA02-DFA0A04FC94B}">
-              <ma14:wrappingTextBoxFlag xmlns="" xmlns:m="http://schemas.openxmlformats.org/officeDocument/2006/math" xmlns:a14="http://schemas.microsoft.com/office/drawing/2010/main" xmlns:ma14="http://schemas.microsoft.com/office/mac/drawingml/2011/main" val="1"/>
+              <ma14:wrappingTextBoxFlag xmlns:ma14="http://schemas.microsoft.com/office/mac/drawingml/2011/main" xmlns:a14="http://schemas.microsoft.com/office/drawing/2010/main" xmlns:m="http://schemas.openxmlformats.org/officeDocument/2006/math" xmlns="" val="1"/>
             </a:ext>
           </a:extLst>
         </p:spPr>
@@ -7621,7 +7611,7 @@
           </a:ln>
           <a:extLst>
             <a:ext uri="{C572A759-6A51-4108-AA02-DFA0A04FC94B}">
-              <ma14:wrappingTextBoxFlag xmlns="" xmlns:m="http://schemas.openxmlformats.org/officeDocument/2006/math" xmlns:a14="http://schemas.microsoft.com/office/drawing/2010/main" xmlns:ma14="http://schemas.microsoft.com/office/mac/drawingml/2011/main" val="1"/>
+              <ma14:wrappingTextBoxFlag xmlns:ma14="http://schemas.microsoft.com/office/mac/drawingml/2011/main" xmlns:a14="http://schemas.microsoft.com/office/drawing/2010/main" xmlns:m="http://schemas.openxmlformats.org/officeDocument/2006/math" xmlns="" val="1"/>
             </a:ext>
           </a:extLst>
         </p:spPr>
@@ -7732,7 +7722,7 @@
           <a:effectLst/>
           <a:extLst>
             <a:ext uri="{C572A759-6A51-4108-AA02-DFA0A04FC94B}">
-              <ma14:wrappingTextBoxFlag xmlns:lc="http://schemas.openxmlformats.org/drawingml/2006/lockedCanvas" xmlns:ma14="http://schemas.microsoft.com/office/mac/drawingml/2011/main" xmlns:a14="http://schemas.microsoft.com/office/drawing/2010/main" xmlns:m="http://schemas.openxmlformats.org/officeDocument/2006/math" xmlns="" val="1"/>
+              <ma14:wrappingTextBoxFlag xmlns="" xmlns:m="http://schemas.openxmlformats.org/officeDocument/2006/math" xmlns:a14="http://schemas.microsoft.com/office/drawing/2010/main" xmlns:ma14="http://schemas.microsoft.com/office/mac/drawingml/2011/main" xmlns:lc="http://schemas.openxmlformats.org/drawingml/2006/lockedCanvas" val="1"/>
             </a:ext>
           </a:extLst>
         </p:spPr>
@@ -8093,8 +8083,8 @@
         </p:nvSpPr>
         <p:spPr>
           <a:xfrm>
-            <a:off x="10397721" y="3880635"/>
-            <a:ext cx="3178078" cy="664204"/>
+            <a:off x="10397721" y="3926801"/>
+            <a:ext cx="3178078" cy="571871"/>
           </a:xfrm>
           <a:prstGeom prst="rect">
             <a:avLst/>
@@ -8113,7 +8103,7 @@
           </a:ln>
           <a:extLst>
             <a:ext uri="{C572A759-6A51-4108-AA02-DFA0A04FC94B}">
-              <ma14:wrappingTextBoxFlag xmlns="" xmlns:m="http://schemas.openxmlformats.org/officeDocument/2006/math" xmlns:a14="http://schemas.microsoft.com/office/drawing/2010/main" xmlns:ma14="http://schemas.microsoft.com/office/mac/drawingml/2011/main" val="1"/>
+              <ma14:wrappingTextBoxFlag xmlns:ma14="http://schemas.microsoft.com/office/mac/drawingml/2011/main" xmlns:a14="http://schemas.microsoft.com/office/drawing/2010/main" xmlns:m="http://schemas.openxmlformats.org/officeDocument/2006/math" xmlns="" val="1"/>
             </a:ext>
           </a:extLst>
         </p:spPr>
@@ -8138,7 +8128,7 @@
               </a:defRPr>
             </a:pPr>
             <a:r>
-              <a:rPr lang="nl-NL" dirty="0">
+              <a:rPr lang="nl-NL" sz="1000" dirty="0">
                 <a:solidFill>
                   <a:schemeClr val="tx1"/>
                 </a:solidFill>
@@ -8148,7 +8138,7 @@
               <a:t>planning(</a:t>
             </a:r>
             <a:r>
-              <a:rPr lang="nl-NL" dirty="0" err="1">
+              <a:rPr lang="nl-NL" sz="1000" dirty="0" err="1">
                 <a:solidFill>
                   <a:schemeClr val="tx1"/>
                 </a:solidFill>
@@ -8158,7 +8148,7 @@
               <a:t>materiality</a:t>
             </a:r>
             <a:r>
-              <a:rPr lang="nl-NL" dirty="0">
+              <a:rPr lang="nl-NL" sz="1000" dirty="0">
                 <a:solidFill>
                   <a:schemeClr val="tx1"/>
                 </a:solidFill>
@@ -8184,7 +8174,7 @@
               </a:defRPr>
             </a:pPr>
             <a:r>
-              <a:rPr lang="nl-NL" dirty="0">
+              <a:rPr lang="nl-NL" sz="1000" dirty="0">
                 <a:solidFill>
                   <a:schemeClr val="tx1"/>
                 </a:solidFill>
@@ -8194,7 +8184,7 @@
               <a:t>         </a:t>
             </a:r>
             <a:r>
-              <a:rPr lang="nl-NL" dirty="0" err="1">
+              <a:rPr lang="nl-NL" sz="1000" dirty="0" err="1">
                 <a:solidFill>
                   <a:schemeClr val="tx1"/>
                 </a:solidFill>
@@ -8204,7 +8194,7 @@
               <a:t>expectedError</a:t>
             </a:r>
             <a:r>
-              <a:rPr lang="nl-NL" dirty="0">
+              <a:rPr lang="nl-NL" sz="1000" dirty="0">
                 <a:solidFill>
                   <a:schemeClr val="tx1"/>
                 </a:solidFill>
@@ -8230,7 +8220,7 @@
               </a:defRPr>
             </a:pPr>
             <a:r>
-              <a:rPr lang="nl-NL" dirty="0">
+              <a:rPr lang="nl-NL" sz="1000" dirty="0">
                 <a:solidFill>
                   <a:schemeClr val="tx1"/>
                 </a:solidFill>
@@ -8239,7 +8229,7 @@
               </a:rPr>
               <a:t>         prior = FALSE)</a:t>
             </a:r>
-            <a:endParaRPr dirty="0">
+            <a:endParaRPr sz="1000" dirty="0">
               <a:solidFill>
                 <a:schemeClr val="tx1"/>
               </a:solidFill>
@@ -8263,8 +8253,8 @@
         </p:nvSpPr>
         <p:spPr>
           <a:xfrm>
-            <a:off x="10409753" y="5826754"/>
-            <a:ext cx="3178078" cy="479538"/>
+            <a:off x="10409753" y="5787867"/>
+            <a:ext cx="3178078" cy="725759"/>
           </a:xfrm>
           <a:prstGeom prst="rect">
             <a:avLst/>
@@ -8283,7 +8273,7 @@
           </a:ln>
           <a:extLst>
             <a:ext uri="{C572A759-6A51-4108-AA02-DFA0A04FC94B}">
-              <ma14:wrappingTextBoxFlag xmlns="" xmlns:m="http://schemas.openxmlformats.org/officeDocument/2006/math" xmlns:a14="http://schemas.microsoft.com/office/drawing/2010/main" xmlns:ma14="http://schemas.microsoft.com/office/mac/drawingml/2011/main" val="1"/>
+              <ma14:wrappingTextBoxFlag xmlns:ma14="http://schemas.microsoft.com/office/mac/drawingml/2011/main" xmlns:a14="http://schemas.microsoft.com/office/drawing/2010/main" xmlns:m="http://schemas.openxmlformats.org/officeDocument/2006/math" xmlns="" val="1"/>
             </a:ext>
           </a:extLst>
         </p:spPr>
@@ -8308,7 +8298,7 @@
               </a:defRPr>
             </a:pPr>
             <a:r>
-              <a:rPr lang="nl-NL" dirty="0" err="1">
+              <a:rPr lang="nl-NL" sz="1000" dirty="0" err="1">
                 <a:solidFill>
                   <a:schemeClr val="tx1"/>
                 </a:solidFill>
@@ -8318,7 +8308,7 @@
               <a:t>selection</a:t>
             </a:r>
             <a:r>
-              <a:rPr lang="nl-NL" dirty="0">
+              <a:rPr lang="nl-NL" sz="1000" dirty="0">
                 <a:solidFill>
                   <a:schemeClr val="tx1"/>
                 </a:solidFill>
@@ -8328,7 +8318,7 @@
               <a:t>(</a:t>
             </a:r>
             <a:r>
-              <a:rPr lang="nl-NL" dirty="0" err="1">
+              <a:rPr lang="nl-NL" sz="1000" dirty="0" err="1">
                 <a:solidFill>
                   <a:schemeClr val="tx1"/>
                 </a:solidFill>
@@ -8338,14 +8328,34 @@
               <a:t>population</a:t>
             </a:r>
             <a:r>
-              <a:rPr lang="nl-NL" dirty="0">
+              <a:rPr lang="nl-NL" sz="1000" dirty="0">
                 <a:solidFill>
                   <a:schemeClr val="tx1"/>
                 </a:solidFill>
                 <a:latin typeface="Courier New" panose="02070309020205020404" pitchFamily="49" charset="0"/>
                 <a:cs typeface="Courier New" panose="02070309020205020404" pitchFamily="49" charset="0"/>
               </a:rPr>
-              <a:t> = dataset,</a:t>
+              <a:t> = </a:t>
+            </a:r>
+            <a:r>
+              <a:rPr lang="nl-NL" sz="1000" dirty="0" err="1">
+                <a:solidFill>
+                  <a:schemeClr val="tx1"/>
+                </a:solidFill>
+                <a:latin typeface="Courier New" panose="02070309020205020404" pitchFamily="49" charset="0"/>
+                <a:cs typeface="Courier New" panose="02070309020205020404" pitchFamily="49" charset="0"/>
+              </a:rPr>
+              <a:t>BuildIt</a:t>
+            </a:r>
+            <a:r>
+              <a:rPr lang="nl-NL" sz="1000" dirty="0">
+                <a:solidFill>
+                  <a:schemeClr val="tx1"/>
+                </a:solidFill>
+                <a:latin typeface="Courier New" panose="02070309020205020404" pitchFamily="49" charset="0"/>
+                <a:cs typeface="Courier New" panose="02070309020205020404" pitchFamily="49" charset="0"/>
+              </a:rPr>
+              <a:t>,</a:t>
             </a:r>
           </a:p>
           <a:p>
@@ -8364,7 +8374,7 @@
               </a:defRPr>
             </a:pPr>
             <a:r>
-              <a:rPr lang="nl-NL" dirty="0">
+              <a:rPr lang="nl-NL" sz="1000" dirty="0">
                 <a:solidFill>
                   <a:schemeClr val="tx1"/>
                 </a:solidFill>
@@ -8374,7 +8384,7 @@
               <a:t>          </a:t>
             </a:r>
             <a:r>
-              <a:rPr lang="nl-NL" dirty="0" err="1">
+              <a:rPr lang="nl-NL" sz="1000" dirty="0" err="1">
                 <a:solidFill>
                   <a:schemeClr val="tx1"/>
                 </a:solidFill>
@@ -8384,16 +8394,88 @@
               <a:t>sampleSize</a:t>
             </a:r>
             <a:r>
-              <a:rPr lang="nl-NL" dirty="0">
+              <a:rPr lang="nl-NL" sz="1000" dirty="0">
                 <a:solidFill>
                   <a:schemeClr val="tx1"/>
                 </a:solidFill>
                 <a:latin typeface="Courier New" panose="02070309020205020404" pitchFamily="49" charset="0"/>
                 <a:cs typeface="Courier New" panose="02070309020205020404" pitchFamily="49" charset="0"/>
               </a:rPr>
-              <a:t> = 100) </a:t>
-            </a:r>
-            <a:endParaRPr dirty="0">
+              <a:t> = 93,</a:t>
+            </a:r>
+          </a:p>
+          <a:p>
+            <a:pPr>
+              <a:spcBef>
+                <a:spcPts val="0"/>
+              </a:spcBef>
+              <a:defRPr b="0">
+                <a:solidFill>
+                  <a:srgbClr val="000000"/>
+                </a:solidFill>
+                <a:latin typeface="Menlo"/>
+                <a:ea typeface="Menlo"/>
+                <a:cs typeface="Menlo"/>
+                <a:sym typeface="Menlo"/>
+              </a:defRPr>
+            </a:pPr>
+            <a:r>
+              <a:rPr lang="nl-NL" sz="1000" dirty="0">
+                <a:solidFill>
+                  <a:schemeClr val="tx1"/>
+                </a:solidFill>
+                <a:latin typeface="Courier New" panose="02070309020205020404" pitchFamily="49" charset="0"/>
+                <a:cs typeface="Courier New" panose="02070309020205020404" pitchFamily="49" charset="0"/>
+              </a:rPr>
+              <a:t>          units = "records",</a:t>
+            </a:r>
+          </a:p>
+          <a:p>
+            <a:pPr>
+              <a:spcBef>
+                <a:spcPts val="0"/>
+              </a:spcBef>
+              <a:defRPr b="0">
+                <a:solidFill>
+                  <a:srgbClr val="000000"/>
+                </a:solidFill>
+                <a:latin typeface="Menlo"/>
+                <a:ea typeface="Menlo"/>
+                <a:cs typeface="Menlo"/>
+                <a:sym typeface="Menlo"/>
+              </a:defRPr>
+            </a:pPr>
+            <a:r>
+              <a:rPr lang="nl-NL" sz="1000" dirty="0">
+                <a:solidFill>
+                  <a:schemeClr val="tx1"/>
+                </a:solidFill>
+                <a:latin typeface="Courier New" panose="02070309020205020404" pitchFamily="49" charset="0"/>
+                <a:cs typeface="Courier New" panose="02070309020205020404" pitchFamily="49" charset="0"/>
+              </a:rPr>
+              <a:t>          </a:t>
+            </a:r>
+            <a:r>
+              <a:rPr lang="nl-NL" sz="1000" dirty="0" err="1">
+                <a:solidFill>
+                  <a:schemeClr val="tx1"/>
+                </a:solidFill>
+                <a:latin typeface="Courier New" panose="02070309020205020404" pitchFamily="49" charset="0"/>
+                <a:cs typeface="Courier New" panose="02070309020205020404" pitchFamily="49" charset="0"/>
+              </a:rPr>
+              <a:t>algorithm</a:t>
+            </a:r>
+            <a:r>
+              <a:rPr lang="nl-NL" sz="1000">
+                <a:solidFill>
+                  <a:schemeClr val="tx1"/>
+                </a:solidFill>
+                <a:latin typeface="Courier New" panose="02070309020205020404" pitchFamily="49" charset="0"/>
+                <a:cs typeface="Courier New" panose="02070309020205020404" pitchFamily="49" charset="0"/>
+              </a:rPr>
+              <a:t> = "interval") </a:t>
+            </a:r>
+            <a:endParaRPr lang="nl-NL" sz="1000" dirty="0">
               <a:solidFill>
                 <a:schemeClr val="tx1"/>
               </a:solidFill>
@@ -8417,8 +8499,8 @@
         </p:nvSpPr>
         <p:spPr>
           <a:xfrm>
-            <a:off x="10409753" y="7413806"/>
-            <a:ext cx="3178078" cy="1033536"/>
+            <a:off x="10409752" y="7382463"/>
+            <a:ext cx="3166047" cy="879647"/>
           </a:xfrm>
           <a:prstGeom prst="rect">
             <a:avLst/>
@@ -8437,7 +8519,7 @@
           </a:ln>
           <a:extLst>
             <a:ext uri="{C572A759-6A51-4108-AA02-DFA0A04FC94B}">
-              <ma14:wrappingTextBoxFlag xmlns="" xmlns:m="http://schemas.openxmlformats.org/officeDocument/2006/math" xmlns:a14="http://schemas.microsoft.com/office/drawing/2010/main" xmlns:ma14="http://schemas.microsoft.com/office/mac/drawingml/2011/main" val="1"/>
+              <ma14:wrappingTextBoxFlag xmlns:ma14="http://schemas.microsoft.com/office/mac/drawingml/2011/main" xmlns:a14="http://schemas.microsoft.com/office/drawing/2010/main" xmlns:m="http://schemas.openxmlformats.org/officeDocument/2006/math" xmlns="" val="1"/>
             </a:ext>
           </a:extLst>
         </p:spPr>
@@ -8462,7 +8544,7 @@
               </a:defRPr>
             </a:pPr>
             <a:r>
-              <a:rPr lang="nl-NL" dirty="0" err="1">
+              <a:rPr lang="nl-NL" sz="1000" dirty="0" err="1">
                 <a:solidFill>
                   <a:schemeClr val="tx1"/>
                 </a:solidFill>
@@ -8472,14 +8554,34 @@
               <a:t>evaluation</a:t>
             </a:r>
             <a:r>
-              <a:rPr lang="nl-NL" dirty="0">
+              <a:rPr lang="nl-NL" sz="1000" dirty="0">
                 <a:solidFill>
                   <a:schemeClr val="tx1"/>
                 </a:solidFill>
                 <a:latin typeface="Courier New" panose="02070309020205020404" pitchFamily="49" charset="0"/>
                 <a:cs typeface="Courier New" panose="02070309020205020404" pitchFamily="49" charset="0"/>
               </a:rPr>
-              <a:t>(sample = sample,</a:t>
+              <a:t>(sample = </a:t>
+            </a:r>
+            <a:r>
+              <a:rPr lang="nl-NL" sz="1000" dirty="0" err="1">
+                <a:solidFill>
+                  <a:schemeClr val="tx1"/>
+                </a:solidFill>
+                <a:latin typeface="Courier New" panose="02070309020205020404" pitchFamily="49" charset="0"/>
+                <a:cs typeface="Courier New" panose="02070309020205020404" pitchFamily="49" charset="0"/>
+              </a:rPr>
+              <a:t>selectionResult</a:t>
+            </a:r>
+            <a:r>
+              <a:rPr lang="nl-NL" sz="1000" dirty="0">
+                <a:solidFill>
+                  <a:schemeClr val="tx1"/>
+                </a:solidFill>
+                <a:latin typeface="Courier New" panose="02070309020205020404" pitchFamily="49" charset="0"/>
+                <a:cs typeface="Courier New" panose="02070309020205020404" pitchFamily="49" charset="0"/>
+              </a:rPr>
+              <a:t>,</a:t>
             </a:r>
           </a:p>
           <a:p>
@@ -8498,7 +8600,7 @@
               </a:defRPr>
             </a:pPr>
             <a:r>
-              <a:rPr lang="nl-NL" dirty="0">
+              <a:rPr lang="nl-NL" sz="1000" dirty="0">
                 <a:solidFill>
                   <a:schemeClr val="tx1"/>
                 </a:solidFill>
@@ -8508,7 +8610,7 @@
               <a:t>           </a:t>
             </a:r>
             <a:r>
-              <a:rPr lang="nl-NL" dirty="0" err="1">
+              <a:rPr lang="nl-NL" sz="1000" dirty="0" err="1">
                 <a:solidFill>
                   <a:schemeClr val="tx1"/>
                 </a:solidFill>
@@ -8518,7 +8620,7 @@
               <a:t>bookValues</a:t>
             </a:r>
             <a:r>
-              <a:rPr lang="nl-NL" dirty="0">
+              <a:rPr lang="nl-NL" sz="1000" dirty="0">
                 <a:solidFill>
                   <a:schemeClr val="tx1"/>
                 </a:solidFill>
@@ -8528,17 +8630,17 @@
               <a:t> = "</a:t>
             </a:r>
             <a:r>
-              <a:rPr lang="nl-NL" dirty="0" err="1">
+              <a:rPr lang="nl-NL" sz="1000" dirty="0" err="1">
                 <a:solidFill>
                   <a:schemeClr val="tx1"/>
                 </a:solidFill>
                 <a:latin typeface="Courier New" panose="02070309020205020404" pitchFamily="49" charset="0"/>
                 <a:cs typeface="Courier New" panose="02070309020205020404" pitchFamily="49" charset="0"/>
               </a:rPr>
-              <a:t>ist</a:t>
-            </a:r>
-            <a:r>
-              <a:rPr lang="nl-NL" dirty="0">
+              <a:t>bookValue</a:t>
+            </a:r>
+            <a:r>
+              <a:rPr lang="nl-NL" sz="1000" dirty="0">
                 <a:solidFill>
                   <a:schemeClr val="tx1"/>
                 </a:solidFill>
@@ -8564,7 +8666,7 @@
               </a:defRPr>
             </a:pPr>
             <a:r>
-              <a:rPr lang="nl-NL" dirty="0">
+              <a:rPr lang="nl-NL" sz="1000" dirty="0">
                 <a:solidFill>
                   <a:schemeClr val="tx1"/>
                 </a:solidFill>
@@ -8574,7 +8676,7 @@
               <a:t>           </a:t>
             </a:r>
             <a:r>
-              <a:rPr lang="nl-NL" dirty="0" err="1">
+              <a:rPr lang="nl-NL" sz="1000" dirty="0" err="1">
                 <a:solidFill>
                   <a:schemeClr val="tx1"/>
                 </a:solidFill>
@@ -8584,7 +8686,7 @@
               <a:t>auditValues</a:t>
             </a:r>
             <a:r>
-              <a:rPr lang="nl-NL" dirty="0">
+              <a:rPr lang="nl-NL" sz="1000" dirty="0">
                 <a:solidFill>
                   <a:schemeClr val="tx1"/>
                 </a:solidFill>
@@ -8594,17 +8696,17 @@
               <a:t> = "</a:t>
             </a:r>
             <a:r>
-              <a:rPr lang="nl-NL" dirty="0" err="1">
+              <a:rPr lang="nl-NL" sz="1000" dirty="0" err="1">
                 <a:solidFill>
                   <a:schemeClr val="tx1"/>
                 </a:solidFill>
                 <a:latin typeface="Courier New" panose="02070309020205020404" pitchFamily="49" charset="0"/>
                 <a:cs typeface="Courier New" panose="02070309020205020404" pitchFamily="49" charset="0"/>
               </a:rPr>
-              <a:t>soll</a:t>
-            </a:r>
-            <a:r>
-              <a:rPr lang="nl-NL" dirty="0">
+              <a:t>auditValue</a:t>
+            </a:r>
+            <a:r>
+              <a:rPr lang="nl-NL" sz="1000" dirty="0">
                 <a:solidFill>
                   <a:schemeClr val="tx1"/>
                 </a:solidFill>
@@ -8630,7 +8732,7 @@
               </a:defRPr>
             </a:pPr>
             <a:r>
-              <a:rPr lang="nl-NL" dirty="0">
+              <a:rPr lang="nl-NL" sz="1000" dirty="0">
                 <a:solidFill>
                   <a:schemeClr val="tx1"/>
                 </a:solidFill>
@@ -8640,7 +8742,7 @@
               <a:t>           </a:t>
             </a:r>
             <a:r>
-              <a:rPr lang="nl-NL" dirty="0" err="1">
+              <a:rPr lang="nl-NL" sz="1000" dirty="0" err="1">
                 <a:solidFill>
                   <a:schemeClr val="tx1"/>
                 </a:solidFill>
@@ -8650,7 +8752,7 @@
               <a:t>method</a:t>
             </a:r>
             <a:r>
-              <a:rPr lang="nl-NL" dirty="0">
+              <a:rPr lang="nl-NL" sz="1000" dirty="0">
                 <a:solidFill>
                   <a:schemeClr val="tx1"/>
                 </a:solidFill>
@@ -8660,7 +8762,7 @@
               <a:t> = "</a:t>
             </a:r>
             <a:r>
-              <a:rPr lang="nl-NL" dirty="0" err="1">
+              <a:rPr lang="nl-NL" sz="1000" dirty="0" err="1">
                 <a:solidFill>
                   <a:schemeClr val="tx1"/>
                 </a:solidFill>
@@ -8670,7 +8772,7 @@
               <a:t>stringer</a:t>
             </a:r>
             <a:r>
-              <a:rPr lang="nl-NL" dirty="0">
+              <a:rPr lang="nl-NL" sz="1000" dirty="0">
                 <a:solidFill>
                   <a:schemeClr val="tx1"/>
                 </a:solidFill>
@@ -8696,7 +8798,7 @@
               </a:defRPr>
             </a:pPr>
             <a:r>
-              <a:rPr lang="nl-NL" dirty="0">
+              <a:rPr lang="nl-NL" sz="1000" dirty="0">
                 <a:solidFill>
                   <a:schemeClr val="tx1"/>
                 </a:solidFill>
@@ -8706,7 +8808,7 @@
               <a:t>           </a:t>
             </a:r>
             <a:r>
-              <a:rPr lang="nl-NL" dirty="0" err="1">
+              <a:rPr lang="nl-NL" sz="1000" dirty="0" err="1">
                 <a:solidFill>
                   <a:schemeClr val="tx1"/>
                 </a:solidFill>
@@ -8716,7 +8818,7 @@
               <a:t>materiality</a:t>
             </a:r>
             <a:r>
-              <a:rPr lang="nl-NL" dirty="0">
+              <a:rPr lang="nl-NL" sz="1000" dirty="0">
                 <a:solidFill>
                   <a:schemeClr val="tx1"/>
                 </a:solidFill>
@@ -8725,7 +8827,7 @@
               </a:rPr>
               <a:t> = 0.05)</a:t>
             </a:r>
-            <a:endParaRPr dirty="0">
+            <a:endParaRPr sz="1000" dirty="0">
               <a:solidFill>
                 <a:schemeClr val="tx1"/>
               </a:solidFill>
@@ -8749,8 +8851,8 @@
         </p:nvSpPr>
         <p:spPr>
           <a:xfrm>
-            <a:off x="10409753" y="9379958"/>
-            <a:ext cx="3178078" cy="479538"/>
+            <a:off x="10409753" y="9422768"/>
+            <a:ext cx="3178078" cy="417982"/>
           </a:xfrm>
           <a:prstGeom prst="rect">
             <a:avLst/>
@@ -8769,7 +8871,7 @@
           </a:ln>
           <a:extLst>
             <a:ext uri="{C572A759-6A51-4108-AA02-DFA0A04FC94B}">
-              <ma14:wrappingTextBoxFlag xmlns="" xmlns:m="http://schemas.openxmlformats.org/officeDocument/2006/math" xmlns:a14="http://schemas.microsoft.com/office/drawing/2010/main" xmlns:ma14="http://schemas.microsoft.com/office/mac/drawingml/2011/main" val="1"/>
+              <ma14:wrappingTextBoxFlag xmlns:ma14="http://schemas.microsoft.com/office/mac/drawingml/2011/main" xmlns:a14="http://schemas.microsoft.com/office/drawing/2010/main" xmlns:m="http://schemas.openxmlformats.org/officeDocument/2006/math" xmlns="" val="1"/>
             </a:ext>
           </a:extLst>
         </p:spPr>
@@ -8794,7 +8896,7 @@
               </a:defRPr>
             </a:pPr>
             <a:r>
-              <a:rPr lang="nl-NL" dirty="0">
+              <a:rPr lang="nl-NL" sz="1000" dirty="0">
                 <a:solidFill>
                   <a:schemeClr val="tx1"/>
                 </a:solidFill>
@@ -8804,17 +8906,17 @@
               <a:t>report(object = </a:t>
             </a:r>
             <a:r>
-              <a:rPr lang="nl-NL" dirty="0" err="1">
+              <a:rPr lang="nl-NL" sz="1000" dirty="0" err="1">
                 <a:solidFill>
                   <a:schemeClr val="tx1"/>
                 </a:solidFill>
                 <a:latin typeface="Courier New" panose="02070309020205020404" pitchFamily="49" charset="0"/>
                 <a:cs typeface="Courier New" panose="02070309020205020404" pitchFamily="49" charset="0"/>
               </a:rPr>
-              <a:t>result</a:t>
-            </a:r>
-            <a:r>
-              <a:rPr lang="nl-NL" dirty="0">
+              <a:t>evaluationResult</a:t>
+            </a:r>
+            <a:r>
+              <a:rPr lang="nl-NL" sz="1000" dirty="0">
                 <a:solidFill>
                   <a:schemeClr val="tx1"/>
                 </a:solidFill>
@@ -8840,7 +8942,7 @@
               </a:defRPr>
             </a:pPr>
             <a:r>
-              <a:rPr lang="nl-NL" dirty="0">
+              <a:rPr lang="nl-NL" sz="1000" dirty="0">
                 <a:solidFill>
                   <a:schemeClr val="tx1"/>
                 </a:solidFill>
@@ -8849,7 +8951,7 @@
               </a:rPr>
               <a:t>       file = "report.html")</a:t>
             </a:r>
-            <a:endParaRPr dirty="0">
+            <a:endParaRPr sz="1000" dirty="0">
               <a:solidFill>
                 <a:schemeClr val="tx1"/>
               </a:solidFill>
@@ -9226,7 +9328,7 @@
           </a:ln>
           <a:extLst>
             <a:ext uri="{C572A759-6A51-4108-AA02-DFA0A04FC94B}">
-              <ma14:wrappingTextBoxFlag xmlns="" xmlns:m="http://schemas.openxmlformats.org/officeDocument/2006/math" xmlns:a14="http://schemas.microsoft.com/office/drawing/2010/main" xmlns:ma14="http://schemas.microsoft.com/office/mac/drawingml/2011/main" val="1"/>
+              <ma14:wrappingTextBoxFlag xmlns:ma14="http://schemas.microsoft.com/office/mac/drawingml/2011/main" xmlns:a14="http://schemas.microsoft.com/office/drawing/2010/main" xmlns:m="http://schemas.openxmlformats.org/officeDocument/2006/math" xmlns="" val="1"/>
             </a:ext>
           </a:extLst>
         </p:spPr>
@@ -9279,7 +9381,7 @@
         </p:nvSpPr>
         <p:spPr>
           <a:xfrm>
-            <a:off x="317394" y="4302857"/>
+            <a:off x="317394" y="4254729"/>
             <a:ext cx="2704008" cy="938976"/>
           </a:xfrm>
           <a:prstGeom prst="rect">
@@ -9290,7 +9392,7 @@
           </a:ln>
           <a:extLst>
             <a:ext uri="{C572A759-6A51-4108-AA02-DFA0A04FC94B}">
-              <ma14:wrappingTextBoxFlag xmlns="" xmlns:m="http://schemas.openxmlformats.org/officeDocument/2006/math" xmlns:a14="http://schemas.microsoft.com/office/drawing/2010/main" xmlns:ma14="http://schemas.microsoft.com/office/mac/drawingml/2011/main" val="1"/>
+              <ma14:wrappingTextBoxFlag xmlns:ma14="http://schemas.microsoft.com/office/mac/drawingml/2011/main" xmlns:a14="http://schemas.microsoft.com/office/drawing/2010/main" xmlns:m="http://schemas.openxmlformats.org/officeDocument/2006/math" xmlns="" val="1"/>
             </a:ext>
           </a:extLst>
         </p:spPr>
@@ -9686,6 +9788,431 @@
             <a:endParaRPr lang="nl-NL" b="0" dirty="0">
               <a:latin typeface="+mn-lt"/>
             </a:endParaRPr>
+          </a:p>
+        </p:txBody>
+      </p:sp>
+      <p:sp>
+        <p:nvSpPr>
+          <p:cNvPr id="53" name="Basics">
+            <a:extLst>
+              <a:ext uri="{FF2B5EF4-FFF2-40B4-BE49-F238E27FC236}">
+                <a16:creationId xmlns:a16="http://schemas.microsoft.com/office/drawing/2014/main" id="{FA4BBC2F-A850-472B-8607-E68FD24C627E}"/>
+              </a:ext>
+            </a:extLst>
+          </p:cNvPr>
+          <p:cNvSpPr txBox="1"/>
+          <p:nvPr/>
+        </p:nvSpPr>
+        <p:spPr>
+          <a:xfrm>
+            <a:off x="306210" y="5450820"/>
+            <a:ext cx="1183016" cy="340029"/>
+          </a:xfrm>
+          <a:prstGeom prst="rect">
+            <a:avLst/>
+          </a:prstGeom>
+          <a:ln w="12700">
+            <a:miter lim="400000"/>
+          </a:ln>
+          <a:extLst>
+            <a:ext uri="{C572A759-6A51-4108-AA02-DFA0A04FC94B}">
+              <ma14:wrappingTextBoxFlag xmlns:ma14="http://schemas.microsoft.com/office/mac/drawingml/2011/main" xmlns:a14="http://schemas.microsoft.com/office/drawing/2010/main" xmlns:m="http://schemas.openxmlformats.org/officeDocument/2006/math" xmlns="" val="1"/>
+            </a:ext>
+          </a:extLst>
+        </p:spPr>
+        <p:txBody>
+          <a:bodyPr wrap="none" lIns="12700" tIns="12700" rIns="12700" bIns="12700" anchor="ctr">
+            <a:spAutoFit/>
+          </a:bodyPr>
+          <a:lstStyle/>
+          <a:p>
+            <a:pPr lvl="1" indent="0">
+              <a:lnSpc>
+                <a:spcPct val="80000"/>
+              </a:lnSpc>
+              <a:spcBef>
+                <a:spcPts val="0"/>
+              </a:spcBef>
+              <a:defRPr sz="2500" b="0">
+                <a:solidFill>
+                  <a:srgbClr val="628DB5"/>
+                </a:solidFill>
+              </a:defRPr>
+            </a:pPr>
+            <a:r>
+              <a:rPr lang="nl-NL" dirty="0" err="1">
+                <a:solidFill>
+                  <a:schemeClr val="tx2"/>
+                </a:solidFill>
+              </a:rPr>
+              <a:t>Example</a:t>
+            </a:r>
+            <a:endParaRPr dirty="0">
+              <a:solidFill>
+                <a:schemeClr val="tx2"/>
+              </a:solidFill>
+            </a:endParaRPr>
+          </a:p>
+        </p:txBody>
+      </p:sp>
+      <p:sp>
+        <p:nvSpPr>
+          <p:cNvPr id="55" name="Thank you for making a new cheatsheet for R! These cheatsheets have an important job:">
+            <a:extLst>
+              <a:ext uri="{FF2B5EF4-FFF2-40B4-BE49-F238E27FC236}">
+                <a16:creationId xmlns:a16="http://schemas.microsoft.com/office/drawing/2014/main" id="{11DB5590-7A5D-4881-9776-04A572D92153}"/>
+              </a:ext>
+            </a:extLst>
+          </p:cNvPr>
+          <p:cNvSpPr txBox="1"/>
+          <p:nvPr/>
+        </p:nvSpPr>
+        <p:spPr>
+          <a:xfrm>
+            <a:off x="317394" y="5862418"/>
+            <a:ext cx="2704008" cy="1240809"/>
+          </a:xfrm>
+          <a:prstGeom prst="rect">
+            <a:avLst/>
+          </a:prstGeom>
+          <a:ln w="12700">
+            <a:miter lim="400000"/>
+          </a:ln>
+          <a:extLst>
+            <a:ext uri="{C572A759-6A51-4108-AA02-DFA0A04FC94B}">
+              <ma14:wrappingTextBoxFlag xmlns:ma14="http://schemas.microsoft.com/office/mac/drawingml/2011/main" xmlns:a14="http://schemas.microsoft.com/office/drawing/2010/main" xmlns:m="http://schemas.openxmlformats.org/officeDocument/2006/math" xmlns="" val="1"/>
+            </a:ext>
+          </a:extLst>
+        </p:spPr>
+        <p:txBody>
+          <a:bodyPr lIns="0" tIns="0" rIns="0" bIns="0">
+            <a:normAutofit/>
+          </a:bodyPr>
+          <a:lstStyle/>
+          <a:p>
+            <a:pPr algn="just">
+              <a:lnSpc>
+                <a:spcPct val="90000"/>
+              </a:lnSpc>
+              <a:spcBef>
+                <a:spcPts val="0"/>
+              </a:spcBef>
+              <a:buClr>
+                <a:schemeClr val="accent4">
+                  <a:hueOff val="384618"/>
+                  <a:satOff val="3869"/>
+                  <a:lumOff val="5802"/>
+                </a:schemeClr>
+              </a:buClr>
+              <a:defRPr b="0">
+                <a:solidFill>
+                  <a:srgbClr val="000000"/>
+                </a:solidFill>
+              </a:defRPr>
+            </a:pPr>
+            <a:r>
+              <a:rPr lang="nl-NL" b="0" dirty="0">
+                <a:latin typeface="+mn-lt"/>
+              </a:rPr>
+              <a:t>The blue code </a:t>
+            </a:r>
+            <a:r>
+              <a:rPr lang="nl-NL" b="0" dirty="0" err="1">
+                <a:latin typeface="+mn-lt"/>
+              </a:rPr>
+              <a:t>blocks</a:t>
+            </a:r>
+            <a:r>
+              <a:rPr lang="nl-NL" b="0" dirty="0">
+                <a:latin typeface="+mn-lt"/>
+              </a:rPr>
+              <a:t> next </a:t>
+            </a:r>
+            <a:r>
+              <a:rPr lang="nl-NL" b="0" dirty="0" err="1">
+                <a:latin typeface="+mn-lt"/>
+              </a:rPr>
+              <a:t>to</a:t>
+            </a:r>
+            <a:r>
+              <a:rPr lang="nl-NL" b="0" dirty="0">
+                <a:latin typeface="+mn-lt"/>
+              </a:rPr>
+              <a:t> </a:t>
+            </a:r>
+            <a:r>
+              <a:rPr lang="nl-NL" b="0" dirty="0" err="1">
+                <a:latin typeface="+mn-lt"/>
+              </a:rPr>
+              <a:t>the</a:t>
+            </a:r>
+            <a:r>
+              <a:rPr lang="nl-NL" b="0" dirty="0">
+                <a:latin typeface="+mn-lt"/>
+              </a:rPr>
+              <a:t> </a:t>
+            </a:r>
+            <a:r>
+              <a:rPr lang="nl-NL" b="0" dirty="0" err="1">
+                <a:latin typeface="+mn-lt"/>
+              </a:rPr>
+              <a:t>function</a:t>
+            </a:r>
+            <a:r>
+              <a:rPr lang="nl-NL" b="0" dirty="0">
+                <a:latin typeface="+mn-lt"/>
+              </a:rPr>
+              <a:t> </a:t>
+            </a:r>
+            <a:r>
+              <a:rPr lang="nl-NL" b="0" dirty="0" err="1">
+                <a:latin typeface="+mn-lt"/>
+              </a:rPr>
+              <a:t>descriptions</a:t>
+            </a:r>
+            <a:r>
+              <a:rPr lang="nl-NL" b="0" dirty="0">
+                <a:latin typeface="+mn-lt"/>
+              </a:rPr>
+              <a:t> </a:t>
+            </a:r>
+            <a:r>
+              <a:rPr lang="nl-NL" b="0" dirty="0" err="1">
+                <a:latin typeface="+mn-lt"/>
+              </a:rPr>
+              <a:t>provide</a:t>
+            </a:r>
+            <a:r>
+              <a:rPr lang="nl-NL" b="0" dirty="0">
+                <a:latin typeface="+mn-lt"/>
+              </a:rPr>
+              <a:t> a </a:t>
+            </a:r>
+            <a:r>
+              <a:rPr lang="nl-NL" b="0" dirty="0" err="1">
+                <a:latin typeface="+mn-lt"/>
+              </a:rPr>
+              <a:t>working</a:t>
+            </a:r>
+            <a:r>
+              <a:rPr lang="nl-NL" b="0" dirty="0">
+                <a:latin typeface="+mn-lt"/>
+              </a:rPr>
+              <a:t> </a:t>
+            </a:r>
+            <a:r>
+              <a:rPr lang="nl-NL" b="0" dirty="0" err="1">
+                <a:latin typeface="+mn-lt"/>
+              </a:rPr>
+              <a:t>example</a:t>
+            </a:r>
+            <a:r>
+              <a:rPr lang="nl-NL" b="0" dirty="0">
+                <a:latin typeface="+mn-lt"/>
+              </a:rPr>
+              <a:t> of </a:t>
+            </a:r>
+            <a:r>
+              <a:rPr lang="nl-NL" b="0" dirty="0" err="1">
+                <a:latin typeface="+mn-lt"/>
+              </a:rPr>
+              <a:t>the</a:t>
+            </a:r>
+            <a:r>
+              <a:rPr lang="nl-NL" b="0" dirty="0">
+                <a:latin typeface="+mn-lt"/>
+              </a:rPr>
+              <a:t> </a:t>
+            </a:r>
+            <a:r>
+              <a:rPr lang="nl-NL" b="0" dirty="0" err="1">
+                <a:latin typeface="+mn-lt"/>
+              </a:rPr>
+              <a:t>intended</a:t>
+            </a:r>
+            <a:r>
+              <a:rPr lang="nl-NL" b="0" dirty="0">
+                <a:latin typeface="+mn-lt"/>
+              </a:rPr>
+              <a:t> workflow. </a:t>
+            </a:r>
+          </a:p>
+          <a:p>
+            <a:pPr>
+              <a:lnSpc>
+                <a:spcPct val="90000"/>
+              </a:lnSpc>
+              <a:spcBef>
+                <a:spcPts val="0"/>
+              </a:spcBef>
+              <a:buClr>
+                <a:schemeClr val="accent4">
+                  <a:hueOff val="384618"/>
+                  <a:satOff val="3869"/>
+                  <a:lumOff val="5802"/>
+                </a:schemeClr>
+              </a:buClr>
+              <a:defRPr b="0">
+                <a:solidFill>
+                  <a:srgbClr val="000000"/>
+                </a:solidFill>
+              </a:defRPr>
+            </a:pPr>
+            <a:endParaRPr lang="nl-NL" b="0" dirty="0">
+              <a:latin typeface="+mn-lt"/>
+            </a:endParaRPr>
+          </a:p>
+          <a:p>
+            <a:pPr>
+              <a:lnSpc>
+                <a:spcPct val="90000"/>
+              </a:lnSpc>
+              <a:spcBef>
+                <a:spcPts val="0"/>
+              </a:spcBef>
+              <a:buClr>
+                <a:schemeClr val="accent4">
+                  <a:hueOff val="384618"/>
+                  <a:satOff val="3869"/>
+                  <a:lumOff val="5802"/>
+                </a:schemeClr>
+              </a:buClr>
+              <a:defRPr b="0">
+                <a:solidFill>
+                  <a:srgbClr val="000000"/>
+                </a:solidFill>
+              </a:defRPr>
+            </a:pPr>
+            <a:r>
+              <a:rPr lang="nl-NL" b="0" dirty="0">
+                <a:latin typeface="+mn-lt"/>
+              </a:rPr>
+              <a:t>The data </a:t>
+            </a:r>
+            <a:r>
+              <a:rPr lang="nl-NL" b="0" dirty="0" err="1">
+                <a:latin typeface="+mn-lt"/>
+              </a:rPr>
+              <a:t>for</a:t>
+            </a:r>
+            <a:r>
+              <a:rPr lang="nl-NL" b="0" dirty="0">
+                <a:latin typeface="+mn-lt"/>
+              </a:rPr>
+              <a:t> </a:t>
+            </a:r>
+            <a:r>
+              <a:rPr lang="nl-NL" b="0" dirty="0" err="1">
+                <a:latin typeface="+mn-lt"/>
+              </a:rPr>
+              <a:t>this</a:t>
+            </a:r>
+            <a:r>
+              <a:rPr lang="nl-NL" b="0" dirty="0">
+                <a:latin typeface="+mn-lt"/>
+              </a:rPr>
+              <a:t> </a:t>
+            </a:r>
+            <a:r>
+              <a:rPr lang="nl-NL" b="0" dirty="0" err="1">
+                <a:latin typeface="+mn-lt"/>
+              </a:rPr>
+              <a:t>example</a:t>
+            </a:r>
+            <a:r>
+              <a:rPr lang="nl-NL" b="0" dirty="0">
+                <a:latin typeface="+mn-lt"/>
+              </a:rPr>
+              <a:t> </a:t>
+            </a:r>
+            <a:r>
+              <a:rPr lang="nl-NL" b="0" dirty="0" err="1">
+                <a:latin typeface="+mn-lt"/>
+              </a:rPr>
+              <a:t>can</a:t>
+            </a:r>
+            <a:r>
+              <a:rPr lang="nl-NL" b="0" dirty="0">
+                <a:latin typeface="+mn-lt"/>
+              </a:rPr>
+              <a:t> </a:t>
+            </a:r>
+            <a:r>
+              <a:rPr lang="nl-NL" b="0" dirty="0" err="1">
+                <a:latin typeface="+mn-lt"/>
+              </a:rPr>
+              <a:t>be</a:t>
+            </a:r>
+            <a:r>
+              <a:rPr lang="nl-NL" b="0" dirty="0">
+                <a:latin typeface="+mn-lt"/>
+              </a:rPr>
+              <a:t> </a:t>
+            </a:r>
+            <a:r>
+              <a:rPr lang="nl-NL" b="0" dirty="0" err="1">
+                <a:latin typeface="+mn-lt"/>
+              </a:rPr>
+              <a:t>loaded</a:t>
+            </a:r>
+            <a:r>
+              <a:rPr lang="nl-NL" b="0" dirty="0">
+                <a:latin typeface="+mn-lt"/>
+              </a:rPr>
+              <a:t> via:</a:t>
+            </a:r>
+          </a:p>
+          <a:p>
+            <a:pPr>
+              <a:lnSpc>
+                <a:spcPct val="90000"/>
+              </a:lnSpc>
+              <a:spcBef>
+                <a:spcPts val="0"/>
+              </a:spcBef>
+              <a:buClr>
+                <a:schemeClr val="accent4">
+                  <a:hueOff val="384618"/>
+                  <a:satOff val="3869"/>
+                  <a:lumOff val="5802"/>
+                </a:schemeClr>
+              </a:buClr>
+              <a:defRPr b="0">
+                <a:solidFill>
+                  <a:srgbClr val="000000"/>
+                </a:solidFill>
+              </a:defRPr>
+            </a:pPr>
+            <a:r>
+              <a:rPr lang="nl-NL" b="0" dirty="0">
+                <a:solidFill>
+                  <a:schemeClr val="accent1"/>
+                </a:solidFill>
+                <a:latin typeface="Courier New" panose="02070309020205020404" pitchFamily="49" charset="0"/>
+                <a:cs typeface="Courier New" panose="02070309020205020404" pitchFamily="49" charset="0"/>
+              </a:rPr>
+              <a:t>data("</a:t>
+            </a:r>
+            <a:r>
+              <a:rPr lang="nl-NL" b="0" dirty="0" err="1">
+                <a:solidFill>
+                  <a:schemeClr val="accent1"/>
+                </a:solidFill>
+                <a:latin typeface="Courier New" panose="02070309020205020404" pitchFamily="49" charset="0"/>
+                <a:cs typeface="Courier New" panose="02070309020205020404" pitchFamily="49" charset="0"/>
+              </a:rPr>
+              <a:t>BuildIt</a:t>
+            </a:r>
+            <a:r>
+              <a:rPr lang="nl-NL" b="0" dirty="0">
+                <a:solidFill>
+                  <a:schemeClr val="accent1"/>
+                </a:solidFill>
+                <a:latin typeface="Courier New" panose="02070309020205020404" pitchFamily="49" charset="0"/>
+                <a:cs typeface="Courier New" panose="02070309020205020404" pitchFamily="49" charset="0"/>
+              </a:rPr>
+              <a:t>")</a:t>
+            </a:r>
           </a:p>
         </p:txBody>
       </p:sp>

</xml_diff>

<commit_message>
Built site for jfa: 0.5.0@db7ff77
</commit_message>
<xml_diff>
--- a/reference/figures/cheatsheet/cheatsheet.pptx
+++ b/reference/figures/cheatsheet/cheatsheet.pptx
@@ -2175,7 +2175,7 @@
           </a:ln>
           <a:extLst>
             <a:ext uri="{C572A759-6A51-4108-AA02-DFA0A04FC94B}">
-              <ma14:wrappingTextBoxFlag xmlns:ma14="http://schemas.microsoft.com/office/mac/drawingml/2011/main" xmlns:a14="http://schemas.microsoft.com/office/drawing/2010/main" xmlns:m="http://schemas.openxmlformats.org/officeDocument/2006/math" xmlns="" val="1"/>
+              <ma14:wrappingTextBoxFlag xmlns="" xmlns:m="http://schemas.openxmlformats.org/officeDocument/2006/math" xmlns:a14="http://schemas.microsoft.com/office/drawing/2010/main" xmlns:ma14="http://schemas.microsoft.com/office/mac/drawingml/2011/main" val="1"/>
             </a:ext>
           </a:extLst>
         </p:spPr>
@@ -2214,7 +2214,7 @@
           </a:ln>
           <a:extLst>
             <a:ext uri="{C572A759-6A51-4108-AA02-DFA0A04FC94B}">
-              <ma14:wrappingTextBoxFlag xmlns:ma14="http://schemas.microsoft.com/office/mac/drawingml/2011/main" xmlns:a14="http://schemas.microsoft.com/office/drawing/2010/main" xmlns:m="http://schemas.openxmlformats.org/officeDocument/2006/math" xmlns="" val="1"/>
+              <ma14:wrappingTextBoxFlag xmlns="" xmlns:m="http://schemas.openxmlformats.org/officeDocument/2006/math" xmlns:a14="http://schemas.microsoft.com/office/drawing/2010/main" xmlns:ma14="http://schemas.microsoft.com/office/mac/drawingml/2011/main" val="1"/>
             </a:ext>
           </a:extLst>
         </p:spPr>
@@ -3307,7 +3307,7 @@
           </a:ln>
           <a:extLst>
             <a:ext uri="{C572A759-6A51-4108-AA02-DFA0A04FC94B}">
-              <ma14:wrappingTextBoxFlag xmlns:ma14="http://schemas.microsoft.com/office/mac/drawingml/2011/main" xmlns:a14="http://schemas.microsoft.com/office/drawing/2010/main" xmlns:m="http://schemas.openxmlformats.org/officeDocument/2006/math" xmlns="" val="1"/>
+              <ma14:wrappingTextBoxFlag xmlns="" xmlns:m="http://schemas.openxmlformats.org/officeDocument/2006/math" xmlns:a14="http://schemas.microsoft.com/office/drawing/2010/main" xmlns:ma14="http://schemas.microsoft.com/office/mac/drawingml/2011/main" val="1"/>
             </a:ext>
           </a:extLst>
         </p:spPr>
@@ -3360,7 +3360,7 @@
           </a:ln>
           <a:extLst>
             <a:ext uri="{C572A759-6A51-4108-AA02-DFA0A04FC94B}">
-              <ma14:wrappingTextBoxFlag xmlns:ma14="http://schemas.microsoft.com/office/mac/drawingml/2011/main" xmlns:a14="http://schemas.microsoft.com/office/drawing/2010/main" xmlns:m="http://schemas.openxmlformats.org/officeDocument/2006/math" xmlns="" val="1"/>
+              <ma14:wrappingTextBoxFlag xmlns="" xmlns:m="http://schemas.openxmlformats.org/officeDocument/2006/math" xmlns:a14="http://schemas.microsoft.com/office/drawing/2010/main" xmlns:ma14="http://schemas.microsoft.com/office/mac/drawingml/2011/main" val="1"/>
             </a:ext>
           </a:extLst>
         </p:spPr>
@@ -3470,7 +3470,7 @@
           </a:ln>
           <a:extLst>
             <a:ext uri="{C572A759-6A51-4108-AA02-DFA0A04FC94B}">
-              <ma14:wrappingTextBoxFlag xmlns:ma14="http://schemas.microsoft.com/office/mac/drawingml/2011/main" xmlns:a14="http://schemas.microsoft.com/office/drawing/2010/main" xmlns:m="http://schemas.openxmlformats.org/officeDocument/2006/math" xmlns="" val="1"/>
+              <ma14:wrappingTextBoxFlag xmlns="" xmlns:m="http://schemas.openxmlformats.org/officeDocument/2006/math" xmlns:a14="http://schemas.microsoft.com/office/drawing/2010/main" xmlns:ma14="http://schemas.microsoft.com/office/mac/drawingml/2011/main" val="1"/>
             </a:ext>
           </a:extLst>
         </p:spPr>
@@ -4051,7 +4051,7 @@
           </a:ln>
           <a:extLst>
             <a:ext uri="{C572A759-6A51-4108-AA02-DFA0A04FC94B}">
-              <ma14:wrappingTextBoxFlag xmlns:ma14="http://schemas.microsoft.com/office/mac/drawingml/2011/main" xmlns:a14="http://schemas.microsoft.com/office/drawing/2010/main" xmlns:m="http://schemas.openxmlformats.org/officeDocument/2006/math" xmlns="" val="1"/>
+              <ma14:wrappingTextBoxFlag xmlns="" xmlns:m="http://schemas.openxmlformats.org/officeDocument/2006/math" xmlns:a14="http://schemas.microsoft.com/office/drawing/2010/main" xmlns:ma14="http://schemas.microsoft.com/office/mac/drawingml/2011/main" val="1"/>
             </a:ext>
           </a:extLst>
         </p:spPr>
@@ -4213,13 +4213,16 @@
           </a:solidFill>
           <a:ln w="12700">
             <a:solidFill>
-              <a:srgbClr val="A6AAA9"/>
+              <a:schemeClr val="bg1"/>
             </a:solidFill>
             <a:miter lim="400000"/>
           </a:ln>
+          <a:effectLst>
+            <a:softEdge rad="31750"/>
+          </a:effectLst>
           <a:extLst>
             <a:ext uri="{C572A759-6A51-4108-AA02-DFA0A04FC94B}">
-              <ma14:wrappingTextBoxFlag xmlns:ma14="http://schemas.microsoft.com/office/mac/drawingml/2011/main" xmlns:a14="http://schemas.microsoft.com/office/drawing/2010/main" xmlns:m="http://schemas.openxmlformats.org/officeDocument/2006/math" xmlns="" val="1"/>
+              <ma14:wrappingTextBoxFlag xmlns="" xmlns:m="http://schemas.openxmlformats.org/officeDocument/2006/math" xmlns:a14="http://schemas.microsoft.com/office/drawing/2010/main" xmlns:ma14="http://schemas.microsoft.com/office/mac/drawingml/2011/main" val="1"/>
             </a:ext>
           </a:extLst>
         </p:spPr>
@@ -4358,7 +4361,7 @@
           </a:ln>
           <a:extLst>
             <a:ext uri="{C572A759-6A51-4108-AA02-DFA0A04FC94B}">
-              <ma14:wrappingTextBoxFlag xmlns:ma14="http://schemas.microsoft.com/office/mac/drawingml/2011/main" xmlns:a14="http://schemas.microsoft.com/office/drawing/2010/main" xmlns:m="http://schemas.openxmlformats.org/officeDocument/2006/math" xmlns="" val="1"/>
+              <ma14:wrappingTextBoxFlag xmlns="" xmlns:m="http://schemas.openxmlformats.org/officeDocument/2006/math" xmlns:a14="http://schemas.microsoft.com/office/drawing/2010/main" xmlns:ma14="http://schemas.microsoft.com/office/mac/drawingml/2011/main" val="1"/>
             </a:ext>
           </a:extLst>
         </p:spPr>
@@ -4535,7 +4538,7 @@
           <a:effectLst/>
           <a:extLst>
             <a:ext uri="{C572A759-6A51-4108-AA02-DFA0A04FC94B}">
-              <ma14:wrappingTextBoxFlag xmlns="" xmlns:m="http://schemas.openxmlformats.org/officeDocument/2006/math" xmlns:a14="http://schemas.microsoft.com/office/drawing/2010/main" xmlns:ma14="http://schemas.microsoft.com/office/mac/drawingml/2011/main" xmlns:lc="http://schemas.openxmlformats.org/drawingml/2006/lockedCanvas" val="1"/>
+              <ma14:wrappingTextBoxFlag xmlns:lc="http://schemas.openxmlformats.org/drawingml/2006/lockedCanvas" xmlns:ma14="http://schemas.microsoft.com/office/mac/drawingml/2011/main" xmlns:a14="http://schemas.microsoft.com/office/drawing/2010/main" xmlns:m="http://schemas.openxmlformats.org/officeDocument/2006/math" xmlns="" val="1"/>
             </a:ext>
           </a:extLst>
         </p:spPr>
@@ -5029,7 +5032,7 @@
           </a:ln>
           <a:extLst>
             <a:ext uri="{C572A759-6A51-4108-AA02-DFA0A04FC94B}">
-              <ma14:wrappingTextBoxFlag xmlns:ma14="http://schemas.microsoft.com/office/mac/drawingml/2011/main" xmlns:a14="http://schemas.microsoft.com/office/drawing/2010/main" xmlns:m="http://schemas.openxmlformats.org/officeDocument/2006/math" xmlns="" val="1"/>
+              <ma14:wrappingTextBoxFlag xmlns="" xmlns:m="http://schemas.openxmlformats.org/officeDocument/2006/math" xmlns:a14="http://schemas.microsoft.com/office/drawing/2010/main" xmlns:ma14="http://schemas.microsoft.com/office/mac/drawingml/2011/main" val="1"/>
             </a:ext>
           </a:extLst>
         </p:spPr>
@@ -5242,7 +5245,7 @@
           </a:ln>
           <a:extLst>
             <a:ext uri="{C572A759-6A51-4108-AA02-DFA0A04FC94B}">
-              <ma14:wrappingTextBoxFlag xmlns:ma14="http://schemas.microsoft.com/office/mac/drawingml/2011/main" xmlns:a14="http://schemas.microsoft.com/office/drawing/2010/main" xmlns:m="http://schemas.openxmlformats.org/officeDocument/2006/math" xmlns="" val="1"/>
+              <ma14:wrappingTextBoxFlag xmlns="" xmlns:m="http://schemas.openxmlformats.org/officeDocument/2006/math" xmlns:a14="http://schemas.microsoft.com/office/drawing/2010/main" xmlns:ma14="http://schemas.microsoft.com/office/mac/drawingml/2011/main" val="1"/>
             </a:ext>
           </a:extLst>
         </p:spPr>
@@ -5373,7 +5376,7 @@
           <a:effectLst/>
           <a:extLst>
             <a:ext uri="{C572A759-6A51-4108-AA02-DFA0A04FC94B}">
-              <ma14:wrappingTextBoxFlag xmlns="" xmlns:m="http://schemas.openxmlformats.org/officeDocument/2006/math" xmlns:a14="http://schemas.microsoft.com/office/drawing/2010/main" xmlns:ma14="http://schemas.microsoft.com/office/mac/drawingml/2011/main" xmlns:lc="http://schemas.openxmlformats.org/drawingml/2006/lockedCanvas" val="1"/>
+              <ma14:wrappingTextBoxFlag xmlns:lc="http://schemas.openxmlformats.org/drawingml/2006/lockedCanvas" xmlns:ma14="http://schemas.microsoft.com/office/mac/drawingml/2011/main" xmlns:a14="http://schemas.microsoft.com/office/drawing/2010/main" xmlns:m="http://schemas.openxmlformats.org/officeDocument/2006/math" xmlns="" val="1"/>
             </a:ext>
           </a:extLst>
         </p:spPr>
@@ -5841,7 +5844,7 @@
           </a:ln>
           <a:extLst>
             <a:ext uri="{C572A759-6A51-4108-AA02-DFA0A04FC94B}">
-              <ma14:wrappingTextBoxFlag xmlns:ma14="http://schemas.microsoft.com/office/mac/drawingml/2011/main" xmlns:a14="http://schemas.microsoft.com/office/drawing/2010/main" xmlns:m="http://schemas.openxmlformats.org/officeDocument/2006/math" xmlns="" val="1"/>
+              <ma14:wrappingTextBoxFlag xmlns="" xmlns:m="http://schemas.openxmlformats.org/officeDocument/2006/math" xmlns:a14="http://schemas.microsoft.com/office/drawing/2010/main" xmlns:ma14="http://schemas.microsoft.com/office/mac/drawingml/2011/main" val="1"/>
             </a:ext>
           </a:extLst>
         </p:spPr>
@@ -5955,7 +5958,7 @@
           </a:ln>
           <a:extLst>
             <a:ext uri="{C572A759-6A51-4108-AA02-DFA0A04FC94B}">
-              <ma14:wrappingTextBoxFlag xmlns:ma14="http://schemas.microsoft.com/office/mac/drawingml/2011/main" xmlns:a14="http://schemas.microsoft.com/office/drawing/2010/main" xmlns:m="http://schemas.openxmlformats.org/officeDocument/2006/math" xmlns="" val="1"/>
+              <ma14:wrappingTextBoxFlag xmlns="" xmlns:m="http://schemas.openxmlformats.org/officeDocument/2006/math" xmlns:a14="http://schemas.microsoft.com/office/drawing/2010/main" xmlns:ma14="http://schemas.microsoft.com/office/mac/drawingml/2011/main" val="1"/>
             </a:ext>
           </a:extLst>
         </p:spPr>
@@ -6106,7 +6109,7 @@
           <a:effectLst/>
           <a:extLst>
             <a:ext uri="{C572A759-6A51-4108-AA02-DFA0A04FC94B}">
-              <ma14:wrappingTextBoxFlag xmlns="" xmlns:m="http://schemas.openxmlformats.org/officeDocument/2006/math" xmlns:a14="http://schemas.microsoft.com/office/drawing/2010/main" xmlns:ma14="http://schemas.microsoft.com/office/mac/drawingml/2011/main" xmlns:lc="http://schemas.openxmlformats.org/drawingml/2006/lockedCanvas" val="1"/>
+              <ma14:wrappingTextBoxFlag xmlns:lc="http://schemas.openxmlformats.org/drawingml/2006/lockedCanvas" xmlns:ma14="http://schemas.microsoft.com/office/mac/drawingml/2011/main" xmlns:a14="http://schemas.microsoft.com/office/drawing/2010/main" xmlns:m="http://schemas.openxmlformats.org/officeDocument/2006/math" xmlns="" val="1"/>
             </a:ext>
           </a:extLst>
         </p:spPr>
@@ -6600,7 +6603,7 @@
           </a:ln>
           <a:extLst>
             <a:ext uri="{C572A759-6A51-4108-AA02-DFA0A04FC94B}">
-              <ma14:wrappingTextBoxFlag xmlns:ma14="http://schemas.microsoft.com/office/mac/drawingml/2011/main" xmlns:a14="http://schemas.microsoft.com/office/drawing/2010/main" xmlns:m="http://schemas.openxmlformats.org/officeDocument/2006/math" xmlns="" val="1"/>
+              <ma14:wrappingTextBoxFlag xmlns="" xmlns:m="http://schemas.openxmlformats.org/officeDocument/2006/math" xmlns:a14="http://schemas.microsoft.com/office/drawing/2010/main" xmlns:ma14="http://schemas.microsoft.com/office/mac/drawingml/2011/main" val="1"/>
             </a:ext>
           </a:extLst>
         </p:spPr>
@@ -6902,7 +6905,7 @@
           </a:ln>
           <a:extLst>
             <a:ext uri="{C572A759-6A51-4108-AA02-DFA0A04FC94B}">
-              <ma14:wrappingTextBoxFlag xmlns:ma14="http://schemas.microsoft.com/office/mac/drawingml/2011/main" xmlns:a14="http://schemas.microsoft.com/office/drawing/2010/main" xmlns:m="http://schemas.openxmlformats.org/officeDocument/2006/math" xmlns="" val="1"/>
+              <ma14:wrappingTextBoxFlag xmlns="" xmlns:m="http://schemas.openxmlformats.org/officeDocument/2006/math" xmlns:a14="http://schemas.microsoft.com/office/drawing/2010/main" xmlns:ma14="http://schemas.microsoft.com/office/mac/drawingml/2011/main" val="1"/>
             </a:ext>
           </a:extLst>
         </p:spPr>
@@ -7023,7 +7026,7 @@
           <a:effectLst/>
           <a:extLst>
             <a:ext uri="{C572A759-6A51-4108-AA02-DFA0A04FC94B}">
-              <ma14:wrappingTextBoxFlag xmlns="" xmlns:m="http://schemas.openxmlformats.org/officeDocument/2006/math" xmlns:a14="http://schemas.microsoft.com/office/drawing/2010/main" xmlns:ma14="http://schemas.microsoft.com/office/mac/drawingml/2011/main" xmlns:lc="http://schemas.openxmlformats.org/drawingml/2006/lockedCanvas" val="1"/>
+              <ma14:wrappingTextBoxFlag xmlns:lc="http://schemas.openxmlformats.org/drawingml/2006/lockedCanvas" xmlns:ma14="http://schemas.microsoft.com/office/mac/drawingml/2011/main" xmlns:a14="http://schemas.microsoft.com/office/drawing/2010/main" xmlns:m="http://schemas.openxmlformats.org/officeDocument/2006/math" xmlns="" val="1"/>
             </a:ext>
           </a:extLst>
         </p:spPr>
@@ -7517,7 +7520,7 @@
           </a:ln>
           <a:extLst>
             <a:ext uri="{C572A759-6A51-4108-AA02-DFA0A04FC94B}">
-              <ma14:wrappingTextBoxFlag xmlns:ma14="http://schemas.microsoft.com/office/mac/drawingml/2011/main" xmlns:a14="http://schemas.microsoft.com/office/drawing/2010/main" xmlns:m="http://schemas.openxmlformats.org/officeDocument/2006/math" xmlns="" val="1"/>
+              <ma14:wrappingTextBoxFlag xmlns="" xmlns:m="http://schemas.openxmlformats.org/officeDocument/2006/math" xmlns:a14="http://schemas.microsoft.com/office/drawing/2010/main" xmlns:ma14="http://schemas.microsoft.com/office/mac/drawingml/2011/main" val="1"/>
             </a:ext>
           </a:extLst>
         </p:spPr>
@@ -7611,7 +7614,7 @@
           </a:ln>
           <a:extLst>
             <a:ext uri="{C572A759-6A51-4108-AA02-DFA0A04FC94B}">
-              <ma14:wrappingTextBoxFlag xmlns:ma14="http://schemas.microsoft.com/office/mac/drawingml/2011/main" xmlns:a14="http://schemas.microsoft.com/office/drawing/2010/main" xmlns:m="http://schemas.openxmlformats.org/officeDocument/2006/math" xmlns="" val="1"/>
+              <ma14:wrappingTextBoxFlag xmlns="" xmlns:m="http://schemas.openxmlformats.org/officeDocument/2006/math" xmlns:a14="http://schemas.microsoft.com/office/drawing/2010/main" xmlns:ma14="http://schemas.microsoft.com/office/mac/drawingml/2011/main" val="1"/>
             </a:ext>
           </a:extLst>
         </p:spPr>
@@ -7722,7 +7725,7 @@
           <a:effectLst/>
           <a:extLst>
             <a:ext uri="{C572A759-6A51-4108-AA02-DFA0A04FC94B}">
-              <ma14:wrappingTextBoxFlag xmlns="" xmlns:m="http://schemas.openxmlformats.org/officeDocument/2006/math" xmlns:a14="http://schemas.microsoft.com/office/drawing/2010/main" xmlns:ma14="http://schemas.microsoft.com/office/mac/drawingml/2011/main" xmlns:lc="http://schemas.openxmlformats.org/drawingml/2006/lockedCanvas" val="1"/>
+              <ma14:wrappingTextBoxFlag xmlns:lc="http://schemas.openxmlformats.org/drawingml/2006/lockedCanvas" xmlns:ma14="http://schemas.microsoft.com/office/mac/drawingml/2011/main" xmlns:a14="http://schemas.microsoft.com/office/drawing/2010/main" xmlns:m="http://schemas.openxmlformats.org/officeDocument/2006/math" xmlns="" val="1"/>
             </a:ext>
           </a:extLst>
         </p:spPr>
@@ -8097,13 +8100,16 @@
           </a:solidFill>
           <a:ln w="12700">
             <a:solidFill>
-              <a:srgbClr val="A6AAA9"/>
+              <a:schemeClr val="bg1"/>
             </a:solidFill>
             <a:miter lim="400000"/>
           </a:ln>
+          <a:effectLst>
+            <a:softEdge rad="31750"/>
+          </a:effectLst>
           <a:extLst>
             <a:ext uri="{C572A759-6A51-4108-AA02-DFA0A04FC94B}">
-              <ma14:wrappingTextBoxFlag xmlns:ma14="http://schemas.microsoft.com/office/mac/drawingml/2011/main" xmlns:a14="http://schemas.microsoft.com/office/drawing/2010/main" xmlns:m="http://schemas.openxmlformats.org/officeDocument/2006/math" xmlns="" val="1"/>
+              <ma14:wrappingTextBoxFlag xmlns="" xmlns:m="http://schemas.openxmlformats.org/officeDocument/2006/math" xmlns:a14="http://schemas.microsoft.com/office/drawing/2010/main" xmlns:ma14="http://schemas.microsoft.com/office/mac/drawingml/2011/main" val="1"/>
             </a:ext>
           </a:extLst>
         </p:spPr>
@@ -8267,13 +8273,16 @@
           </a:solidFill>
           <a:ln w="12700">
             <a:solidFill>
-              <a:srgbClr val="A6AAA9"/>
+              <a:schemeClr val="bg1"/>
             </a:solidFill>
             <a:miter lim="400000"/>
           </a:ln>
+          <a:effectLst>
+            <a:softEdge rad="31750"/>
+          </a:effectLst>
           <a:extLst>
             <a:ext uri="{C572A759-6A51-4108-AA02-DFA0A04FC94B}">
-              <ma14:wrappingTextBoxFlag xmlns:ma14="http://schemas.microsoft.com/office/mac/drawingml/2011/main" xmlns:a14="http://schemas.microsoft.com/office/drawing/2010/main" xmlns:m="http://schemas.openxmlformats.org/officeDocument/2006/math" xmlns="" val="1"/>
+              <ma14:wrappingTextBoxFlag xmlns="" xmlns:m="http://schemas.openxmlformats.org/officeDocument/2006/math" xmlns:a14="http://schemas.microsoft.com/office/drawing/2010/main" xmlns:ma14="http://schemas.microsoft.com/office/mac/drawingml/2011/main" val="1"/>
             </a:ext>
           </a:extLst>
         </p:spPr>
@@ -8513,13 +8522,16 @@
           </a:solidFill>
           <a:ln w="12700">
             <a:solidFill>
-              <a:srgbClr val="A6AAA9"/>
+              <a:schemeClr val="bg1"/>
             </a:solidFill>
             <a:miter lim="400000"/>
           </a:ln>
+          <a:effectLst>
+            <a:softEdge rad="31750"/>
+          </a:effectLst>
           <a:extLst>
             <a:ext uri="{C572A759-6A51-4108-AA02-DFA0A04FC94B}">
-              <ma14:wrappingTextBoxFlag xmlns:ma14="http://schemas.microsoft.com/office/mac/drawingml/2011/main" xmlns:a14="http://schemas.microsoft.com/office/drawing/2010/main" xmlns:m="http://schemas.openxmlformats.org/officeDocument/2006/math" xmlns="" val="1"/>
+              <ma14:wrappingTextBoxFlag xmlns="" xmlns:m="http://schemas.openxmlformats.org/officeDocument/2006/math" xmlns:a14="http://schemas.microsoft.com/office/drawing/2010/main" xmlns:ma14="http://schemas.microsoft.com/office/mac/drawingml/2011/main" val="1"/>
             </a:ext>
           </a:extLst>
         </p:spPr>
@@ -8865,13 +8877,16 @@
           </a:solidFill>
           <a:ln w="12700">
             <a:solidFill>
-              <a:srgbClr val="A6AAA9"/>
+              <a:schemeClr val="bg1"/>
             </a:solidFill>
             <a:miter lim="400000"/>
           </a:ln>
+          <a:effectLst>
+            <a:softEdge rad="31750"/>
+          </a:effectLst>
           <a:extLst>
             <a:ext uri="{C572A759-6A51-4108-AA02-DFA0A04FC94B}">
-              <ma14:wrappingTextBoxFlag xmlns:ma14="http://schemas.microsoft.com/office/mac/drawingml/2011/main" xmlns:a14="http://schemas.microsoft.com/office/drawing/2010/main" xmlns:m="http://schemas.openxmlformats.org/officeDocument/2006/math" xmlns="" val="1"/>
+              <ma14:wrappingTextBoxFlag xmlns="" xmlns:m="http://schemas.openxmlformats.org/officeDocument/2006/math" xmlns:a14="http://schemas.microsoft.com/office/drawing/2010/main" xmlns:ma14="http://schemas.microsoft.com/office/mac/drawingml/2011/main" val="1"/>
             </a:ext>
           </a:extLst>
         </p:spPr>
@@ -9328,7 +9343,7 @@
           </a:ln>
           <a:extLst>
             <a:ext uri="{C572A759-6A51-4108-AA02-DFA0A04FC94B}">
-              <ma14:wrappingTextBoxFlag xmlns:ma14="http://schemas.microsoft.com/office/mac/drawingml/2011/main" xmlns:a14="http://schemas.microsoft.com/office/drawing/2010/main" xmlns:m="http://schemas.openxmlformats.org/officeDocument/2006/math" xmlns="" val="1"/>
+              <ma14:wrappingTextBoxFlag xmlns="" xmlns:m="http://schemas.openxmlformats.org/officeDocument/2006/math" xmlns:a14="http://schemas.microsoft.com/office/drawing/2010/main" xmlns:ma14="http://schemas.microsoft.com/office/mac/drawingml/2011/main" val="1"/>
             </a:ext>
           </a:extLst>
         </p:spPr>
@@ -9392,7 +9407,7 @@
           </a:ln>
           <a:extLst>
             <a:ext uri="{C572A759-6A51-4108-AA02-DFA0A04FC94B}">
-              <ma14:wrappingTextBoxFlag xmlns:ma14="http://schemas.microsoft.com/office/mac/drawingml/2011/main" xmlns:a14="http://schemas.microsoft.com/office/drawing/2010/main" xmlns:m="http://schemas.openxmlformats.org/officeDocument/2006/math" xmlns="" val="1"/>
+              <ma14:wrappingTextBoxFlag xmlns="" xmlns:m="http://schemas.openxmlformats.org/officeDocument/2006/math" xmlns:a14="http://schemas.microsoft.com/office/drawing/2010/main" xmlns:ma14="http://schemas.microsoft.com/office/mac/drawingml/2011/main" val="1"/>
             </a:ext>
           </a:extLst>
         </p:spPr>
@@ -9816,7 +9831,7 @@
           </a:ln>
           <a:extLst>
             <a:ext uri="{C572A759-6A51-4108-AA02-DFA0A04FC94B}">
-              <ma14:wrappingTextBoxFlag xmlns:ma14="http://schemas.microsoft.com/office/mac/drawingml/2011/main" xmlns:a14="http://schemas.microsoft.com/office/drawing/2010/main" xmlns:m="http://schemas.openxmlformats.org/officeDocument/2006/math" xmlns="" val="1"/>
+              <ma14:wrappingTextBoxFlag xmlns="" xmlns:m="http://schemas.openxmlformats.org/officeDocument/2006/math" xmlns:a14="http://schemas.microsoft.com/office/drawing/2010/main" xmlns:ma14="http://schemas.microsoft.com/office/mac/drawingml/2011/main" val="1"/>
             </a:ext>
           </a:extLst>
         </p:spPr>
@@ -9880,7 +9895,7 @@
           </a:ln>
           <a:extLst>
             <a:ext uri="{C572A759-6A51-4108-AA02-DFA0A04FC94B}">
-              <ma14:wrappingTextBoxFlag xmlns:ma14="http://schemas.microsoft.com/office/mac/drawingml/2011/main" xmlns:a14="http://schemas.microsoft.com/office/drawing/2010/main" xmlns:m="http://schemas.openxmlformats.org/officeDocument/2006/math" xmlns="" val="1"/>
+              <ma14:wrappingTextBoxFlag xmlns="" xmlns:m="http://schemas.openxmlformats.org/officeDocument/2006/math" xmlns:a14="http://schemas.microsoft.com/office/drawing/2010/main" xmlns:ma14="http://schemas.microsoft.com/office/mac/drawingml/2011/main" val="1"/>
             </a:ext>
           </a:extLst>
         </p:spPr>

</xml_diff>

<commit_message>
Built site for jfa: 0.5.0@f8fdff5
</commit_message>
<xml_diff>
--- a/reference/figures/cheatsheet/cheatsheet.pptx
+++ b/reference/figures/cheatsheet/cheatsheet.pptx
@@ -2175,7 +2175,7 @@
           </a:ln>
           <a:extLst>
             <a:ext uri="{C572A759-6A51-4108-AA02-DFA0A04FC94B}">
-              <ma14:wrappingTextBoxFlag xmlns="" xmlns:m="http://schemas.openxmlformats.org/officeDocument/2006/math" xmlns:a14="http://schemas.microsoft.com/office/drawing/2010/main" xmlns:ma14="http://schemas.microsoft.com/office/mac/drawingml/2011/main" val="1"/>
+              <ma14:wrappingTextBoxFlag xmlns:ma14="http://schemas.microsoft.com/office/mac/drawingml/2011/main" xmlns:a14="http://schemas.microsoft.com/office/drawing/2010/main" xmlns:m="http://schemas.openxmlformats.org/officeDocument/2006/math" xmlns="" val="1"/>
             </a:ext>
           </a:extLst>
         </p:spPr>
@@ -2214,7 +2214,7 @@
           </a:ln>
           <a:extLst>
             <a:ext uri="{C572A759-6A51-4108-AA02-DFA0A04FC94B}">
-              <ma14:wrappingTextBoxFlag xmlns="" xmlns:m="http://schemas.openxmlformats.org/officeDocument/2006/math" xmlns:a14="http://schemas.microsoft.com/office/drawing/2010/main" xmlns:ma14="http://schemas.microsoft.com/office/mac/drawingml/2011/main" val="1"/>
+              <ma14:wrappingTextBoxFlag xmlns:ma14="http://schemas.microsoft.com/office/mac/drawingml/2011/main" xmlns:a14="http://schemas.microsoft.com/office/drawing/2010/main" xmlns:m="http://schemas.openxmlformats.org/officeDocument/2006/math" xmlns="" val="1"/>
             </a:ext>
           </a:extLst>
         </p:spPr>
@@ -3307,7 +3307,7 @@
           </a:ln>
           <a:extLst>
             <a:ext uri="{C572A759-6A51-4108-AA02-DFA0A04FC94B}">
-              <ma14:wrappingTextBoxFlag xmlns="" xmlns:m="http://schemas.openxmlformats.org/officeDocument/2006/math" xmlns:a14="http://schemas.microsoft.com/office/drawing/2010/main" xmlns:ma14="http://schemas.microsoft.com/office/mac/drawingml/2011/main" val="1"/>
+              <ma14:wrappingTextBoxFlag xmlns:ma14="http://schemas.microsoft.com/office/mac/drawingml/2011/main" xmlns:a14="http://schemas.microsoft.com/office/drawing/2010/main" xmlns:m="http://schemas.openxmlformats.org/officeDocument/2006/math" xmlns="" val="1"/>
             </a:ext>
           </a:extLst>
         </p:spPr>
@@ -3360,7 +3360,7 @@
           </a:ln>
           <a:extLst>
             <a:ext uri="{C572A759-6A51-4108-AA02-DFA0A04FC94B}">
-              <ma14:wrappingTextBoxFlag xmlns="" xmlns:m="http://schemas.openxmlformats.org/officeDocument/2006/math" xmlns:a14="http://schemas.microsoft.com/office/drawing/2010/main" xmlns:ma14="http://schemas.microsoft.com/office/mac/drawingml/2011/main" val="1"/>
+              <ma14:wrappingTextBoxFlag xmlns:ma14="http://schemas.microsoft.com/office/mac/drawingml/2011/main" xmlns:a14="http://schemas.microsoft.com/office/drawing/2010/main" xmlns:m="http://schemas.openxmlformats.org/officeDocument/2006/math" xmlns="" val="1"/>
             </a:ext>
           </a:extLst>
         </p:spPr>
@@ -3470,7 +3470,7 @@
           </a:ln>
           <a:extLst>
             <a:ext uri="{C572A759-6A51-4108-AA02-DFA0A04FC94B}">
-              <ma14:wrappingTextBoxFlag xmlns="" xmlns:m="http://schemas.openxmlformats.org/officeDocument/2006/math" xmlns:a14="http://schemas.microsoft.com/office/drawing/2010/main" xmlns:ma14="http://schemas.microsoft.com/office/mac/drawingml/2011/main" val="1"/>
+              <ma14:wrappingTextBoxFlag xmlns:ma14="http://schemas.microsoft.com/office/mac/drawingml/2011/main" xmlns:a14="http://schemas.microsoft.com/office/drawing/2010/main" xmlns:m="http://schemas.openxmlformats.org/officeDocument/2006/math" xmlns="" val="1"/>
             </a:ext>
           </a:extLst>
         </p:spPr>
@@ -4051,7 +4051,7 @@
           </a:ln>
           <a:extLst>
             <a:ext uri="{C572A759-6A51-4108-AA02-DFA0A04FC94B}">
-              <ma14:wrappingTextBoxFlag xmlns="" xmlns:m="http://schemas.openxmlformats.org/officeDocument/2006/math" xmlns:a14="http://schemas.microsoft.com/office/drawing/2010/main" xmlns:ma14="http://schemas.microsoft.com/office/mac/drawingml/2011/main" val="1"/>
+              <ma14:wrappingTextBoxFlag xmlns:ma14="http://schemas.microsoft.com/office/mac/drawingml/2011/main" xmlns:a14="http://schemas.microsoft.com/office/drawing/2010/main" xmlns:m="http://schemas.openxmlformats.org/officeDocument/2006/math" xmlns="" val="1"/>
             </a:ext>
           </a:extLst>
         </p:spPr>
@@ -4217,12 +4217,10 @@
             </a:solidFill>
             <a:miter lim="400000"/>
           </a:ln>
-          <a:effectLst>
-            <a:softEdge rad="31750"/>
-          </a:effectLst>
+          <a:effectLst/>
           <a:extLst>
             <a:ext uri="{C572A759-6A51-4108-AA02-DFA0A04FC94B}">
-              <ma14:wrappingTextBoxFlag xmlns="" xmlns:m="http://schemas.openxmlformats.org/officeDocument/2006/math" xmlns:a14="http://schemas.microsoft.com/office/drawing/2010/main" xmlns:ma14="http://schemas.microsoft.com/office/mac/drawingml/2011/main" val="1"/>
+              <ma14:wrappingTextBoxFlag xmlns:ma14="http://schemas.microsoft.com/office/mac/drawingml/2011/main" xmlns:a14="http://schemas.microsoft.com/office/drawing/2010/main" xmlns:m="http://schemas.openxmlformats.org/officeDocument/2006/math" xmlns="" val="1"/>
             </a:ext>
           </a:extLst>
         </p:spPr>
@@ -4361,7 +4359,7 @@
           </a:ln>
           <a:extLst>
             <a:ext uri="{C572A759-6A51-4108-AA02-DFA0A04FC94B}">
-              <ma14:wrappingTextBoxFlag xmlns="" xmlns:m="http://schemas.openxmlformats.org/officeDocument/2006/math" xmlns:a14="http://schemas.microsoft.com/office/drawing/2010/main" xmlns:ma14="http://schemas.microsoft.com/office/mac/drawingml/2011/main" val="1"/>
+              <ma14:wrappingTextBoxFlag xmlns:ma14="http://schemas.microsoft.com/office/mac/drawingml/2011/main" xmlns:a14="http://schemas.microsoft.com/office/drawing/2010/main" xmlns:m="http://schemas.openxmlformats.org/officeDocument/2006/math" xmlns="" val="1"/>
             </a:ext>
           </a:extLst>
         </p:spPr>
@@ -4538,7 +4536,7 @@
           <a:effectLst/>
           <a:extLst>
             <a:ext uri="{C572A759-6A51-4108-AA02-DFA0A04FC94B}">
-              <ma14:wrappingTextBoxFlag xmlns:lc="http://schemas.openxmlformats.org/drawingml/2006/lockedCanvas" xmlns:ma14="http://schemas.microsoft.com/office/mac/drawingml/2011/main" xmlns:a14="http://schemas.microsoft.com/office/drawing/2010/main" xmlns:m="http://schemas.openxmlformats.org/officeDocument/2006/math" xmlns="" val="1"/>
+              <ma14:wrappingTextBoxFlag xmlns="" xmlns:m="http://schemas.openxmlformats.org/officeDocument/2006/math" xmlns:a14="http://schemas.microsoft.com/office/drawing/2010/main" xmlns:ma14="http://schemas.microsoft.com/office/mac/drawingml/2011/main" xmlns:lc="http://schemas.openxmlformats.org/drawingml/2006/lockedCanvas" val="1"/>
             </a:ext>
           </a:extLst>
         </p:spPr>
@@ -5032,7 +5030,7 @@
           </a:ln>
           <a:extLst>
             <a:ext uri="{C572A759-6A51-4108-AA02-DFA0A04FC94B}">
-              <ma14:wrappingTextBoxFlag xmlns="" xmlns:m="http://schemas.openxmlformats.org/officeDocument/2006/math" xmlns:a14="http://schemas.microsoft.com/office/drawing/2010/main" xmlns:ma14="http://schemas.microsoft.com/office/mac/drawingml/2011/main" val="1"/>
+              <ma14:wrappingTextBoxFlag xmlns:ma14="http://schemas.microsoft.com/office/mac/drawingml/2011/main" xmlns:a14="http://schemas.microsoft.com/office/drawing/2010/main" xmlns:m="http://schemas.openxmlformats.org/officeDocument/2006/math" xmlns="" val="1"/>
             </a:ext>
           </a:extLst>
         </p:spPr>
@@ -5245,7 +5243,7 @@
           </a:ln>
           <a:extLst>
             <a:ext uri="{C572A759-6A51-4108-AA02-DFA0A04FC94B}">
-              <ma14:wrappingTextBoxFlag xmlns="" xmlns:m="http://schemas.openxmlformats.org/officeDocument/2006/math" xmlns:a14="http://schemas.microsoft.com/office/drawing/2010/main" xmlns:ma14="http://schemas.microsoft.com/office/mac/drawingml/2011/main" val="1"/>
+              <ma14:wrappingTextBoxFlag xmlns:ma14="http://schemas.microsoft.com/office/mac/drawingml/2011/main" xmlns:a14="http://schemas.microsoft.com/office/drawing/2010/main" xmlns:m="http://schemas.openxmlformats.org/officeDocument/2006/math" xmlns="" val="1"/>
             </a:ext>
           </a:extLst>
         </p:spPr>
@@ -5376,7 +5374,7 @@
           <a:effectLst/>
           <a:extLst>
             <a:ext uri="{C572A759-6A51-4108-AA02-DFA0A04FC94B}">
-              <ma14:wrappingTextBoxFlag xmlns:lc="http://schemas.openxmlformats.org/drawingml/2006/lockedCanvas" xmlns:ma14="http://schemas.microsoft.com/office/mac/drawingml/2011/main" xmlns:a14="http://schemas.microsoft.com/office/drawing/2010/main" xmlns:m="http://schemas.openxmlformats.org/officeDocument/2006/math" xmlns="" val="1"/>
+              <ma14:wrappingTextBoxFlag xmlns="" xmlns:m="http://schemas.openxmlformats.org/officeDocument/2006/math" xmlns:a14="http://schemas.microsoft.com/office/drawing/2010/main" xmlns:ma14="http://schemas.microsoft.com/office/mac/drawingml/2011/main" xmlns:lc="http://schemas.openxmlformats.org/drawingml/2006/lockedCanvas" val="1"/>
             </a:ext>
           </a:extLst>
         </p:spPr>
@@ -5844,7 +5842,7 @@
           </a:ln>
           <a:extLst>
             <a:ext uri="{C572A759-6A51-4108-AA02-DFA0A04FC94B}">
-              <ma14:wrappingTextBoxFlag xmlns="" xmlns:m="http://schemas.openxmlformats.org/officeDocument/2006/math" xmlns:a14="http://schemas.microsoft.com/office/drawing/2010/main" xmlns:ma14="http://schemas.microsoft.com/office/mac/drawingml/2011/main" val="1"/>
+              <ma14:wrappingTextBoxFlag xmlns:ma14="http://schemas.microsoft.com/office/mac/drawingml/2011/main" xmlns:a14="http://schemas.microsoft.com/office/drawing/2010/main" xmlns:m="http://schemas.openxmlformats.org/officeDocument/2006/math" xmlns="" val="1"/>
             </a:ext>
           </a:extLst>
         </p:spPr>
@@ -5958,7 +5956,7 @@
           </a:ln>
           <a:extLst>
             <a:ext uri="{C572A759-6A51-4108-AA02-DFA0A04FC94B}">
-              <ma14:wrappingTextBoxFlag xmlns="" xmlns:m="http://schemas.openxmlformats.org/officeDocument/2006/math" xmlns:a14="http://schemas.microsoft.com/office/drawing/2010/main" xmlns:ma14="http://schemas.microsoft.com/office/mac/drawingml/2011/main" val="1"/>
+              <ma14:wrappingTextBoxFlag xmlns:ma14="http://schemas.microsoft.com/office/mac/drawingml/2011/main" xmlns:a14="http://schemas.microsoft.com/office/drawing/2010/main" xmlns:m="http://schemas.openxmlformats.org/officeDocument/2006/math" xmlns="" val="1"/>
             </a:ext>
           </a:extLst>
         </p:spPr>
@@ -6109,7 +6107,7 @@
           <a:effectLst/>
           <a:extLst>
             <a:ext uri="{C572A759-6A51-4108-AA02-DFA0A04FC94B}">
-              <ma14:wrappingTextBoxFlag xmlns:lc="http://schemas.openxmlformats.org/drawingml/2006/lockedCanvas" xmlns:ma14="http://schemas.microsoft.com/office/mac/drawingml/2011/main" xmlns:a14="http://schemas.microsoft.com/office/drawing/2010/main" xmlns:m="http://schemas.openxmlformats.org/officeDocument/2006/math" xmlns="" val="1"/>
+              <ma14:wrappingTextBoxFlag xmlns="" xmlns:m="http://schemas.openxmlformats.org/officeDocument/2006/math" xmlns:a14="http://schemas.microsoft.com/office/drawing/2010/main" xmlns:ma14="http://schemas.microsoft.com/office/mac/drawingml/2011/main" xmlns:lc="http://schemas.openxmlformats.org/drawingml/2006/lockedCanvas" val="1"/>
             </a:ext>
           </a:extLst>
         </p:spPr>
@@ -6603,7 +6601,7 @@
           </a:ln>
           <a:extLst>
             <a:ext uri="{C572A759-6A51-4108-AA02-DFA0A04FC94B}">
-              <ma14:wrappingTextBoxFlag xmlns="" xmlns:m="http://schemas.openxmlformats.org/officeDocument/2006/math" xmlns:a14="http://schemas.microsoft.com/office/drawing/2010/main" xmlns:ma14="http://schemas.microsoft.com/office/mac/drawingml/2011/main" val="1"/>
+              <ma14:wrappingTextBoxFlag xmlns:ma14="http://schemas.microsoft.com/office/mac/drawingml/2011/main" xmlns:a14="http://schemas.microsoft.com/office/drawing/2010/main" xmlns:m="http://schemas.openxmlformats.org/officeDocument/2006/math" xmlns="" val="1"/>
             </a:ext>
           </a:extLst>
         </p:spPr>
@@ -6905,7 +6903,7 @@
           </a:ln>
           <a:extLst>
             <a:ext uri="{C572A759-6A51-4108-AA02-DFA0A04FC94B}">
-              <ma14:wrappingTextBoxFlag xmlns="" xmlns:m="http://schemas.openxmlformats.org/officeDocument/2006/math" xmlns:a14="http://schemas.microsoft.com/office/drawing/2010/main" xmlns:ma14="http://schemas.microsoft.com/office/mac/drawingml/2011/main" val="1"/>
+              <ma14:wrappingTextBoxFlag xmlns:ma14="http://schemas.microsoft.com/office/mac/drawingml/2011/main" xmlns:a14="http://schemas.microsoft.com/office/drawing/2010/main" xmlns:m="http://schemas.openxmlformats.org/officeDocument/2006/math" xmlns="" val="1"/>
             </a:ext>
           </a:extLst>
         </p:spPr>
@@ -7026,7 +7024,7 @@
           <a:effectLst/>
           <a:extLst>
             <a:ext uri="{C572A759-6A51-4108-AA02-DFA0A04FC94B}">
-              <ma14:wrappingTextBoxFlag xmlns:lc="http://schemas.openxmlformats.org/drawingml/2006/lockedCanvas" xmlns:ma14="http://schemas.microsoft.com/office/mac/drawingml/2011/main" xmlns:a14="http://schemas.microsoft.com/office/drawing/2010/main" xmlns:m="http://schemas.openxmlformats.org/officeDocument/2006/math" xmlns="" val="1"/>
+              <ma14:wrappingTextBoxFlag xmlns="" xmlns:m="http://schemas.openxmlformats.org/officeDocument/2006/math" xmlns:a14="http://schemas.microsoft.com/office/drawing/2010/main" xmlns:ma14="http://schemas.microsoft.com/office/mac/drawingml/2011/main" xmlns:lc="http://schemas.openxmlformats.org/drawingml/2006/lockedCanvas" val="1"/>
             </a:ext>
           </a:extLst>
         </p:spPr>
@@ -7520,7 +7518,7 @@
           </a:ln>
           <a:extLst>
             <a:ext uri="{C572A759-6A51-4108-AA02-DFA0A04FC94B}">
-              <ma14:wrappingTextBoxFlag xmlns="" xmlns:m="http://schemas.openxmlformats.org/officeDocument/2006/math" xmlns:a14="http://schemas.microsoft.com/office/drawing/2010/main" xmlns:ma14="http://schemas.microsoft.com/office/mac/drawingml/2011/main" val="1"/>
+              <ma14:wrappingTextBoxFlag xmlns:ma14="http://schemas.microsoft.com/office/mac/drawingml/2011/main" xmlns:a14="http://schemas.microsoft.com/office/drawing/2010/main" xmlns:m="http://schemas.openxmlformats.org/officeDocument/2006/math" xmlns="" val="1"/>
             </a:ext>
           </a:extLst>
         </p:spPr>
@@ -7614,7 +7612,7 @@
           </a:ln>
           <a:extLst>
             <a:ext uri="{C572A759-6A51-4108-AA02-DFA0A04FC94B}">
-              <ma14:wrappingTextBoxFlag xmlns="" xmlns:m="http://schemas.openxmlformats.org/officeDocument/2006/math" xmlns:a14="http://schemas.microsoft.com/office/drawing/2010/main" xmlns:ma14="http://schemas.microsoft.com/office/mac/drawingml/2011/main" val="1"/>
+              <ma14:wrappingTextBoxFlag xmlns:ma14="http://schemas.microsoft.com/office/mac/drawingml/2011/main" xmlns:a14="http://schemas.microsoft.com/office/drawing/2010/main" xmlns:m="http://schemas.openxmlformats.org/officeDocument/2006/math" xmlns="" val="1"/>
             </a:ext>
           </a:extLst>
         </p:spPr>
@@ -7725,7 +7723,7 @@
           <a:effectLst/>
           <a:extLst>
             <a:ext uri="{C572A759-6A51-4108-AA02-DFA0A04FC94B}">
-              <ma14:wrappingTextBoxFlag xmlns:lc="http://schemas.openxmlformats.org/drawingml/2006/lockedCanvas" xmlns:ma14="http://schemas.microsoft.com/office/mac/drawingml/2011/main" xmlns:a14="http://schemas.microsoft.com/office/drawing/2010/main" xmlns:m="http://schemas.openxmlformats.org/officeDocument/2006/math" xmlns="" val="1"/>
+              <ma14:wrappingTextBoxFlag xmlns="" xmlns:m="http://schemas.openxmlformats.org/officeDocument/2006/math" xmlns:a14="http://schemas.microsoft.com/office/drawing/2010/main" xmlns:ma14="http://schemas.microsoft.com/office/mac/drawingml/2011/main" xmlns:lc="http://schemas.openxmlformats.org/drawingml/2006/lockedCanvas" val="1"/>
             </a:ext>
           </a:extLst>
         </p:spPr>
@@ -8104,12 +8102,10 @@
             </a:solidFill>
             <a:miter lim="400000"/>
           </a:ln>
-          <a:effectLst>
-            <a:softEdge rad="31750"/>
-          </a:effectLst>
+          <a:effectLst/>
           <a:extLst>
             <a:ext uri="{C572A759-6A51-4108-AA02-DFA0A04FC94B}">
-              <ma14:wrappingTextBoxFlag xmlns="" xmlns:m="http://schemas.openxmlformats.org/officeDocument/2006/math" xmlns:a14="http://schemas.microsoft.com/office/drawing/2010/main" xmlns:ma14="http://schemas.microsoft.com/office/mac/drawingml/2011/main" val="1"/>
+              <ma14:wrappingTextBoxFlag xmlns:ma14="http://schemas.microsoft.com/office/mac/drawingml/2011/main" xmlns:a14="http://schemas.microsoft.com/office/drawing/2010/main" xmlns:m="http://schemas.openxmlformats.org/officeDocument/2006/math" xmlns="" val="1"/>
             </a:ext>
           </a:extLst>
         </p:spPr>
@@ -8277,12 +8273,10 @@
             </a:solidFill>
             <a:miter lim="400000"/>
           </a:ln>
-          <a:effectLst>
-            <a:softEdge rad="31750"/>
-          </a:effectLst>
+          <a:effectLst/>
           <a:extLst>
             <a:ext uri="{C572A759-6A51-4108-AA02-DFA0A04FC94B}">
-              <ma14:wrappingTextBoxFlag xmlns="" xmlns:m="http://schemas.openxmlformats.org/officeDocument/2006/math" xmlns:a14="http://schemas.microsoft.com/office/drawing/2010/main" xmlns:ma14="http://schemas.microsoft.com/office/mac/drawingml/2011/main" val="1"/>
+              <ma14:wrappingTextBoxFlag xmlns:ma14="http://schemas.microsoft.com/office/mac/drawingml/2011/main" xmlns:a14="http://schemas.microsoft.com/office/drawing/2010/main" xmlns:m="http://schemas.openxmlformats.org/officeDocument/2006/math" xmlns="" val="1"/>
             </a:ext>
           </a:extLst>
         </p:spPr>
@@ -8526,12 +8520,10 @@
             </a:solidFill>
             <a:miter lim="400000"/>
           </a:ln>
-          <a:effectLst>
-            <a:softEdge rad="31750"/>
-          </a:effectLst>
+          <a:effectLst/>
           <a:extLst>
             <a:ext uri="{C572A759-6A51-4108-AA02-DFA0A04FC94B}">
-              <ma14:wrappingTextBoxFlag xmlns="" xmlns:m="http://schemas.openxmlformats.org/officeDocument/2006/math" xmlns:a14="http://schemas.microsoft.com/office/drawing/2010/main" xmlns:ma14="http://schemas.microsoft.com/office/mac/drawingml/2011/main" val="1"/>
+              <ma14:wrappingTextBoxFlag xmlns:ma14="http://schemas.microsoft.com/office/mac/drawingml/2011/main" xmlns:a14="http://schemas.microsoft.com/office/drawing/2010/main" xmlns:m="http://schemas.openxmlformats.org/officeDocument/2006/math" xmlns="" val="1"/>
             </a:ext>
           </a:extLst>
         </p:spPr>
@@ -8881,12 +8873,10 @@
             </a:solidFill>
             <a:miter lim="400000"/>
           </a:ln>
-          <a:effectLst>
-            <a:softEdge rad="31750"/>
-          </a:effectLst>
+          <a:effectLst/>
           <a:extLst>
             <a:ext uri="{C572A759-6A51-4108-AA02-DFA0A04FC94B}">
-              <ma14:wrappingTextBoxFlag xmlns="" xmlns:m="http://schemas.openxmlformats.org/officeDocument/2006/math" xmlns:a14="http://schemas.microsoft.com/office/drawing/2010/main" xmlns:ma14="http://schemas.microsoft.com/office/mac/drawingml/2011/main" val="1"/>
+              <ma14:wrappingTextBoxFlag xmlns:ma14="http://schemas.microsoft.com/office/mac/drawingml/2011/main" xmlns:a14="http://schemas.microsoft.com/office/drawing/2010/main" xmlns:m="http://schemas.openxmlformats.org/officeDocument/2006/math" xmlns="" val="1"/>
             </a:ext>
           </a:extLst>
         </p:spPr>
@@ -9343,7 +9333,7 @@
           </a:ln>
           <a:extLst>
             <a:ext uri="{C572A759-6A51-4108-AA02-DFA0A04FC94B}">
-              <ma14:wrappingTextBoxFlag xmlns="" xmlns:m="http://schemas.openxmlformats.org/officeDocument/2006/math" xmlns:a14="http://schemas.microsoft.com/office/drawing/2010/main" xmlns:ma14="http://schemas.microsoft.com/office/mac/drawingml/2011/main" val="1"/>
+              <ma14:wrappingTextBoxFlag xmlns:ma14="http://schemas.microsoft.com/office/mac/drawingml/2011/main" xmlns:a14="http://schemas.microsoft.com/office/drawing/2010/main" xmlns:m="http://schemas.openxmlformats.org/officeDocument/2006/math" xmlns="" val="1"/>
             </a:ext>
           </a:extLst>
         </p:spPr>
@@ -9407,7 +9397,7 @@
           </a:ln>
           <a:extLst>
             <a:ext uri="{C572A759-6A51-4108-AA02-DFA0A04FC94B}">
-              <ma14:wrappingTextBoxFlag xmlns="" xmlns:m="http://schemas.openxmlformats.org/officeDocument/2006/math" xmlns:a14="http://schemas.microsoft.com/office/drawing/2010/main" xmlns:ma14="http://schemas.microsoft.com/office/mac/drawingml/2011/main" val="1"/>
+              <ma14:wrappingTextBoxFlag xmlns:ma14="http://schemas.microsoft.com/office/mac/drawingml/2011/main" xmlns:a14="http://schemas.microsoft.com/office/drawing/2010/main" xmlns:m="http://schemas.openxmlformats.org/officeDocument/2006/math" xmlns="" val="1"/>
             </a:ext>
           </a:extLst>
         </p:spPr>
@@ -9831,7 +9821,7 @@
           </a:ln>
           <a:extLst>
             <a:ext uri="{C572A759-6A51-4108-AA02-DFA0A04FC94B}">
-              <ma14:wrappingTextBoxFlag xmlns="" xmlns:m="http://schemas.openxmlformats.org/officeDocument/2006/math" xmlns:a14="http://schemas.microsoft.com/office/drawing/2010/main" xmlns:ma14="http://schemas.microsoft.com/office/mac/drawingml/2011/main" val="1"/>
+              <ma14:wrappingTextBoxFlag xmlns:ma14="http://schemas.microsoft.com/office/mac/drawingml/2011/main" xmlns:a14="http://schemas.microsoft.com/office/drawing/2010/main" xmlns:m="http://schemas.openxmlformats.org/officeDocument/2006/math" xmlns="" val="1"/>
             </a:ext>
           </a:extLst>
         </p:spPr>
@@ -9895,7 +9885,7 @@
           </a:ln>
           <a:extLst>
             <a:ext uri="{C572A759-6A51-4108-AA02-DFA0A04FC94B}">
-              <ma14:wrappingTextBoxFlag xmlns="" xmlns:m="http://schemas.openxmlformats.org/officeDocument/2006/math" xmlns:a14="http://schemas.microsoft.com/office/drawing/2010/main" xmlns:ma14="http://schemas.microsoft.com/office/mac/drawingml/2011/main" val="1"/>
+              <ma14:wrappingTextBoxFlag xmlns:ma14="http://schemas.microsoft.com/office/mac/drawingml/2011/main" xmlns:a14="http://schemas.microsoft.com/office/drawing/2010/main" xmlns:m="http://schemas.openxmlformats.org/officeDocument/2006/math" xmlns="" val="1"/>
             </a:ext>
           </a:extLst>
         </p:spPr>

</xml_diff>

<commit_message>
Built site for jfa: 0.5.0@88eff73
</commit_message>
<xml_diff>
--- a/reference/figures/cheatsheet/cheatsheet.pptx
+++ b/reference/figures/cheatsheet/cheatsheet.pptx
@@ -366,6 +366,70 @@
       </pc:sldMasterChg>
     </pc:docChg>
   </pc:docChgLst>
+  <pc:docChgLst>
+    <pc:chgData name="Derks, Koen" userId="42903d96-be75-4cec-9136-f3710e86cd30" providerId="ADAL" clId="{16DBF44E-6DA5-4025-8FE0-79440E68FF90}"/>
+    <pc:docChg chg="undo custSel modSld">
+      <pc:chgData name="Derks, Koen" userId="42903d96-be75-4cec-9136-f3710e86cd30" providerId="ADAL" clId="{16DBF44E-6DA5-4025-8FE0-79440E68FF90}" dt="2021-01-02T10:50:36.123" v="122" actId="207"/>
+      <pc:docMkLst>
+        <pc:docMk/>
+      </pc:docMkLst>
+      <pc:sldChg chg="modSp mod">
+        <pc:chgData name="Derks, Koen" userId="42903d96-be75-4cec-9136-f3710e86cd30" providerId="ADAL" clId="{16DBF44E-6DA5-4025-8FE0-79440E68FF90}" dt="2021-01-02T10:50:36.123" v="122" actId="207"/>
+        <pc:sldMkLst>
+          <pc:docMk/>
+          <pc:sldMk cId="0" sldId="257"/>
+        </pc:sldMkLst>
+        <pc:spChg chg="mod">
+          <ac:chgData name="Derks, Koen" userId="42903d96-be75-4cec-9136-f3710e86cd30" providerId="ADAL" clId="{16DBF44E-6DA5-4025-8FE0-79440E68FF90}" dt="2021-01-02T10:43:37.769" v="37" actId="207"/>
+          <ac:spMkLst>
+            <pc:docMk/>
+            <pc:sldMk cId="0" sldId="257"/>
+            <ac:spMk id="124" creationId="{840686DE-7A82-47C4-A954-0B456668CB4F}"/>
+          </ac:spMkLst>
+        </pc:spChg>
+        <pc:spChg chg="mod">
+          <ac:chgData name="Derks, Koen" userId="42903d96-be75-4cec-9136-f3710e86cd30" providerId="ADAL" clId="{16DBF44E-6DA5-4025-8FE0-79440E68FF90}" dt="2021-01-02T10:50:29.205" v="120" actId="207"/>
+          <ac:spMkLst>
+            <pc:docMk/>
+            <pc:sldMk cId="0" sldId="257"/>
+            <ac:spMk id="143" creationId="{FB0763FA-753C-40C1-A1E4-7DA1DDA10072}"/>
+          </ac:spMkLst>
+        </pc:spChg>
+        <pc:spChg chg="mod">
+          <ac:chgData name="Derks, Koen" userId="42903d96-be75-4cec-9136-f3710e86cd30" providerId="ADAL" clId="{16DBF44E-6DA5-4025-8FE0-79440E68FF90}" dt="2021-01-02T10:50:26.888" v="119" actId="207"/>
+          <ac:spMkLst>
+            <pc:docMk/>
+            <pc:sldMk cId="0" sldId="257"/>
+            <ac:spMk id="144" creationId="{9AF2C0F0-B69F-45A7-9DB4-1D7962C71414}"/>
+          </ac:spMkLst>
+        </pc:spChg>
+        <pc:spChg chg="mod">
+          <ac:chgData name="Derks, Koen" userId="42903d96-be75-4cec-9136-f3710e86cd30" providerId="ADAL" clId="{16DBF44E-6DA5-4025-8FE0-79440E68FF90}" dt="2021-01-02T10:50:23.630" v="118" actId="207"/>
+          <ac:spMkLst>
+            <pc:docMk/>
+            <pc:sldMk cId="0" sldId="257"/>
+            <ac:spMk id="145" creationId="{130E5FF5-89E1-42AE-84ED-37821A67F183}"/>
+          </ac:spMkLst>
+        </pc:spChg>
+        <pc:spChg chg="mod">
+          <ac:chgData name="Derks, Koen" userId="42903d96-be75-4cec-9136-f3710e86cd30" providerId="ADAL" clId="{16DBF44E-6DA5-4025-8FE0-79440E68FF90}" dt="2021-01-02T10:50:36.123" v="122" actId="207"/>
+          <ac:spMkLst>
+            <pc:docMk/>
+            <pc:sldMk cId="0" sldId="257"/>
+            <ac:spMk id="146" creationId="{7FDCB908-2F7E-48F5-81CD-C9EF3585FD33}"/>
+          </ac:spMkLst>
+        </pc:spChg>
+        <pc:spChg chg="mod">
+          <ac:chgData name="Derks, Koen" userId="42903d96-be75-4cec-9136-f3710e86cd30" providerId="ADAL" clId="{16DBF44E-6DA5-4025-8FE0-79440E68FF90}" dt="2021-01-02T10:50:32.176" v="121" actId="207"/>
+          <ac:spMkLst>
+            <pc:docMk/>
+            <pc:sldMk cId="0" sldId="257"/>
+            <ac:spMk id="380" creationId="{00000000-0000-0000-0000-000000000000}"/>
+          </ac:spMkLst>
+        </pc:spChg>
+      </pc:sldChg>
+    </pc:docChg>
+  </pc:docChgLst>
 </pc:chgInfo>
 </file>
 
@@ -2175,7 +2239,7 @@
           </a:ln>
           <a:extLst>
             <a:ext uri="{C572A759-6A51-4108-AA02-DFA0A04FC94B}">
-              <ma14:wrappingTextBoxFlag xmlns:ma14="http://schemas.microsoft.com/office/mac/drawingml/2011/main" xmlns:a14="http://schemas.microsoft.com/office/drawing/2010/main" xmlns:m="http://schemas.openxmlformats.org/officeDocument/2006/math" xmlns="" val="1"/>
+              <ma14:wrappingTextBoxFlag xmlns="" xmlns:m="http://schemas.openxmlformats.org/officeDocument/2006/math" xmlns:a14="http://schemas.microsoft.com/office/drawing/2010/main" xmlns:ma14="http://schemas.microsoft.com/office/mac/drawingml/2011/main" val="1"/>
             </a:ext>
           </a:extLst>
         </p:spPr>
@@ -2214,7 +2278,7 @@
           </a:ln>
           <a:extLst>
             <a:ext uri="{C572A759-6A51-4108-AA02-DFA0A04FC94B}">
-              <ma14:wrappingTextBoxFlag xmlns:ma14="http://schemas.microsoft.com/office/mac/drawingml/2011/main" xmlns:a14="http://schemas.microsoft.com/office/drawing/2010/main" xmlns:m="http://schemas.openxmlformats.org/officeDocument/2006/math" xmlns="" val="1"/>
+              <ma14:wrappingTextBoxFlag xmlns="" xmlns:m="http://schemas.openxmlformats.org/officeDocument/2006/math" xmlns:a14="http://schemas.microsoft.com/office/drawing/2010/main" xmlns:ma14="http://schemas.microsoft.com/office/mac/drawingml/2011/main" val="1"/>
             </a:ext>
           </a:extLst>
         </p:spPr>
@@ -3307,7 +3371,7 @@
           </a:ln>
           <a:extLst>
             <a:ext uri="{C572A759-6A51-4108-AA02-DFA0A04FC94B}">
-              <ma14:wrappingTextBoxFlag xmlns:ma14="http://schemas.microsoft.com/office/mac/drawingml/2011/main" xmlns:a14="http://schemas.microsoft.com/office/drawing/2010/main" xmlns:m="http://schemas.openxmlformats.org/officeDocument/2006/math" xmlns="" val="1"/>
+              <ma14:wrappingTextBoxFlag xmlns="" xmlns:m="http://schemas.openxmlformats.org/officeDocument/2006/math" xmlns:a14="http://schemas.microsoft.com/office/drawing/2010/main" xmlns:ma14="http://schemas.microsoft.com/office/mac/drawingml/2011/main" val="1"/>
             </a:ext>
           </a:extLst>
         </p:spPr>
@@ -3360,7 +3424,7 @@
           </a:ln>
           <a:extLst>
             <a:ext uri="{C572A759-6A51-4108-AA02-DFA0A04FC94B}">
-              <ma14:wrappingTextBoxFlag xmlns:ma14="http://schemas.microsoft.com/office/mac/drawingml/2011/main" xmlns:a14="http://schemas.microsoft.com/office/drawing/2010/main" xmlns:m="http://schemas.openxmlformats.org/officeDocument/2006/math" xmlns="" val="1"/>
+              <ma14:wrappingTextBoxFlag xmlns="" xmlns:m="http://schemas.openxmlformats.org/officeDocument/2006/math" xmlns:a14="http://schemas.microsoft.com/office/drawing/2010/main" xmlns:ma14="http://schemas.microsoft.com/office/mac/drawingml/2011/main" val="1"/>
             </a:ext>
           </a:extLst>
         </p:spPr>
@@ -3470,7 +3534,7 @@
           </a:ln>
           <a:extLst>
             <a:ext uri="{C572A759-6A51-4108-AA02-DFA0A04FC94B}">
-              <ma14:wrappingTextBoxFlag xmlns:ma14="http://schemas.microsoft.com/office/mac/drawingml/2011/main" xmlns:a14="http://schemas.microsoft.com/office/drawing/2010/main" xmlns:m="http://schemas.openxmlformats.org/officeDocument/2006/math" xmlns="" val="1"/>
+              <ma14:wrappingTextBoxFlag xmlns="" xmlns:m="http://schemas.openxmlformats.org/officeDocument/2006/math" xmlns:a14="http://schemas.microsoft.com/office/drawing/2010/main" xmlns:ma14="http://schemas.microsoft.com/office/mac/drawingml/2011/main" val="1"/>
             </a:ext>
           </a:extLst>
         </p:spPr>
@@ -4051,7 +4115,7 @@
           </a:ln>
           <a:extLst>
             <a:ext uri="{C572A759-6A51-4108-AA02-DFA0A04FC94B}">
-              <ma14:wrappingTextBoxFlag xmlns:ma14="http://schemas.microsoft.com/office/mac/drawingml/2011/main" xmlns:a14="http://schemas.microsoft.com/office/drawing/2010/main" xmlns:m="http://schemas.openxmlformats.org/officeDocument/2006/math" xmlns="" val="1"/>
+              <ma14:wrappingTextBoxFlag xmlns="" xmlns:m="http://schemas.openxmlformats.org/officeDocument/2006/math" xmlns:a14="http://schemas.microsoft.com/office/drawing/2010/main" xmlns:ma14="http://schemas.microsoft.com/office/mac/drawingml/2011/main" val="1"/>
             </a:ext>
           </a:extLst>
         </p:spPr>
@@ -4199,8 +4263,8 @@
         </p:nvSpPr>
         <p:spPr>
           <a:xfrm>
-            <a:off x="10409753" y="2333203"/>
-            <a:ext cx="3178078" cy="417982"/>
+            <a:off x="10409753" y="2332459"/>
+            <a:ext cx="3178078" cy="571871"/>
           </a:xfrm>
           <a:prstGeom prst="rect">
             <a:avLst/>
@@ -4220,7 +4284,7 @@
           <a:effectLst/>
           <a:extLst>
             <a:ext uri="{C572A759-6A51-4108-AA02-DFA0A04FC94B}">
-              <ma14:wrappingTextBoxFlag xmlns:ma14="http://schemas.microsoft.com/office/mac/drawingml/2011/main" xmlns:a14="http://schemas.microsoft.com/office/drawing/2010/main" xmlns:m="http://schemas.openxmlformats.org/officeDocument/2006/math" xmlns="" val="1"/>
+              <ma14:wrappingTextBoxFlag xmlns="" xmlns:m="http://schemas.openxmlformats.org/officeDocument/2006/math" xmlns:a14="http://schemas.microsoft.com/office/drawing/2010/main" xmlns:ma14="http://schemas.microsoft.com/office/mac/drawingml/2011/main" val="1"/>
             </a:ext>
           </a:extLst>
         </p:spPr>
@@ -4247,7 +4311,9 @@
             <a:r>
               <a:rPr lang="nl-NL" sz="1000" dirty="0" err="1">
                 <a:solidFill>
-                  <a:schemeClr val="tx1"/>
+                  <a:schemeClr val="tx1">
+                    <a:lumMod val="50000"/>
+                  </a:schemeClr>
                 </a:solidFill>
                 <a:latin typeface="Courier New" panose="02070309020205020404" pitchFamily="49" charset="0"/>
                 <a:cs typeface="Courier New" panose="02070309020205020404" pitchFamily="49" charset="0"/>
@@ -4257,7 +4323,9 @@
             <a:r>
               <a:rPr lang="nl-NL" sz="1000" dirty="0">
                 <a:solidFill>
-                  <a:schemeClr val="tx1"/>
+                  <a:schemeClr val="tx1">
+                    <a:lumMod val="50000"/>
+                  </a:schemeClr>
                 </a:solidFill>
                 <a:latin typeface="Courier New" panose="02070309020205020404" pitchFamily="49" charset="0"/>
                 <a:cs typeface="Courier New" panose="02070309020205020404" pitchFamily="49" charset="0"/>
@@ -4267,7 +4335,9 @@
             <a:r>
               <a:rPr lang="nl-NL" sz="1000" dirty="0" err="1">
                 <a:solidFill>
-                  <a:schemeClr val="tx1"/>
+                  <a:schemeClr val="tx1">
+                    <a:lumMod val="50000"/>
+                  </a:schemeClr>
                 </a:solidFill>
                 <a:latin typeface="Courier New" panose="02070309020205020404" pitchFamily="49" charset="0"/>
                 <a:cs typeface="Courier New" panose="02070309020205020404" pitchFamily="49" charset="0"/>
@@ -4277,7 +4347,9 @@
             <a:r>
               <a:rPr lang="nl-NL" sz="1000" dirty="0">
                 <a:solidFill>
-                  <a:schemeClr val="tx1"/>
+                  <a:schemeClr val="tx1">
+                    <a:lumMod val="50000"/>
+                  </a:schemeClr>
                 </a:solidFill>
                 <a:latin typeface="Courier New" panose="02070309020205020404" pitchFamily="49" charset="0"/>
                 <a:cs typeface="Courier New" panose="02070309020205020404" pitchFamily="49" charset="0"/>
@@ -4303,7 +4375,9 @@
             <a:r>
               <a:rPr lang="nl-NL" sz="1000" dirty="0">
                 <a:solidFill>
-                  <a:schemeClr val="tx1"/>
+                  <a:schemeClr val="tx1">
+                    <a:lumMod val="50000"/>
+                  </a:schemeClr>
                 </a:solidFill>
                 <a:latin typeface="Courier New" panose="02070309020205020404" pitchFamily="49" charset="0"/>
                 <a:cs typeface="Courier New" panose="02070309020205020404" pitchFamily="49" charset="0"/>
@@ -4313,7 +4387,9 @@
             <a:r>
               <a:rPr lang="nl-NL" sz="1000" dirty="0" err="1">
                 <a:solidFill>
-                  <a:schemeClr val="tx1"/>
+                  <a:schemeClr val="tx1">
+                    <a:lumMod val="50000"/>
+                  </a:schemeClr>
                 </a:solidFill>
                 <a:latin typeface="Courier New" panose="02070309020205020404" pitchFamily="49" charset="0"/>
                 <a:cs typeface="Courier New" panose="02070309020205020404" pitchFamily="49" charset="0"/>
@@ -4323,16 +4399,96 @@
             <a:r>
               <a:rPr lang="nl-NL" sz="1000" dirty="0">
                 <a:solidFill>
-                  <a:schemeClr val="tx1"/>
+                  <a:schemeClr val="tx1">
+                    <a:lumMod val="50000"/>
+                  </a:schemeClr>
                 </a:solidFill>
                 <a:latin typeface="Courier New" panose="02070309020205020404" pitchFamily="49" charset="0"/>
                 <a:cs typeface="Courier New" panose="02070309020205020404" pitchFamily="49" charset="0"/>
               </a:rPr>
-              <a:t> = "none")</a:t>
+              <a:t> = "none",</a:t>
+            </a:r>
+          </a:p>
+          <a:p>
+            <a:pPr>
+              <a:spcBef>
+                <a:spcPts val="0"/>
+              </a:spcBef>
+              <a:defRPr b="0">
+                <a:solidFill>
+                  <a:srgbClr val="000000"/>
+                </a:solidFill>
+                <a:latin typeface="Menlo"/>
+                <a:ea typeface="Menlo"/>
+                <a:cs typeface="Menlo"/>
+                <a:sym typeface="Menlo"/>
+              </a:defRPr>
+            </a:pPr>
+            <a:r>
+              <a:rPr lang="nl-NL" sz="1000" dirty="0">
+                <a:solidFill>
+                  <a:schemeClr val="tx1">
+                    <a:lumMod val="50000"/>
+                  </a:schemeClr>
+                </a:solidFill>
+                <a:latin typeface="Courier New" panose="02070309020205020404" pitchFamily="49" charset="0"/>
+                <a:cs typeface="Courier New" panose="02070309020205020404" pitchFamily="49" charset="0"/>
+              </a:rPr>
+              <a:t>	   </a:t>
+            </a:r>
+            <a:r>
+              <a:rPr lang="nl-NL" sz="1000" dirty="0" err="1">
+                <a:solidFill>
+                  <a:schemeClr val="tx1">
+                    <a:lumMod val="50000"/>
+                  </a:schemeClr>
+                </a:solidFill>
+                <a:latin typeface="Courier New" panose="02070309020205020404" pitchFamily="49" charset="0"/>
+                <a:cs typeface="Courier New" panose="02070309020205020404" pitchFamily="49" charset="0"/>
+              </a:rPr>
+              <a:t>likelihood</a:t>
+            </a:r>
+            <a:r>
+              <a:rPr lang="nl-NL" sz="1000" dirty="0">
+                <a:solidFill>
+                  <a:schemeClr val="tx1">
+                    <a:lumMod val="50000"/>
+                  </a:schemeClr>
+                </a:solidFill>
+                <a:latin typeface="Courier New" panose="02070309020205020404" pitchFamily="49" charset="0"/>
+                <a:cs typeface="Courier New" panose="02070309020205020404" pitchFamily="49" charset="0"/>
+              </a:rPr>
+              <a:t> = "</a:t>
+            </a:r>
+            <a:r>
+              <a:rPr lang="nl-NL" sz="1000" dirty="0" err="1">
+                <a:solidFill>
+                  <a:schemeClr val="tx1">
+                    <a:lumMod val="50000"/>
+                  </a:schemeClr>
+                </a:solidFill>
+                <a:latin typeface="Courier New" panose="02070309020205020404" pitchFamily="49" charset="0"/>
+                <a:cs typeface="Courier New" panose="02070309020205020404" pitchFamily="49" charset="0"/>
+              </a:rPr>
+              <a:t>binomial</a:t>
+            </a:r>
+            <a:r>
+              <a:rPr lang="nl-NL" sz="1000" dirty="0">
+                <a:solidFill>
+                  <a:schemeClr val="tx1">
+                    <a:lumMod val="50000"/>
+                  </a:schemeClr>
+                </a:solidFill>
+                <a:latin typeface="Courier New" panose="02070309020205020404" pitchFamily="49" charset="0"/>
+                <a:cs typeface="Courier New" panose="02070309020205020404" pitchFamily="49" charset="0"/>
+              </a:rPr>
+              <a:t>")</a:t>
             </a:r>
             <a:endParaRPr sz="1000" dirty="0">
               <a:solidFill>
-                <a:schemeClr val="tx1"/>
+                <a:schemeClr val="tx1">
+                  <a:lumMod val="50000"/>
+                </a:schemeClr>
               </a:solidFill>
               <a:latin typeface="Courier New" panose="02070309020205020404" pitchFamily="49" charset="0"/>
               <a:cs typeface="Courier New" panose="02070309020205020404" pitchFamily="49" charset="0"/>
@@ -4359,7 +4515,7 @@
           </a:ln>
           <a:extLst>
             <a:ext uri="{C572A759-6A51-4108-AA02-DFA0A04FC94B}">
-              <ma14:wrappingTextBoxFlag xmlns:ma14="http://schemas.microsoft.com/office/mac/drawingml/2011/main" xmlns:a14="http://schemas.microsoft.com/office/drawing/2010/main" xmlns:m="http://schemas.openxmlformats.org/officeDocument/2006/math" xmlns="" val="1"/>
+              <ma14:wrappingTextBoxFlag xmlns="" xmlns:m="http://schemas.openxmlformats.org/officeDocument/2006/math" xmlns:a14="http://schemas.microsoft.com/office/drawing/2010/main" xmlns:ma14="http://schemas.microsoft.com/office/mac/drawingml/2011/main" val="1"/>
             </a:ext>
           </a:extLst>
         </p:spPr>
@@ -4536,7 +4692,7 @@
           <a:effectLst/>
           <a:extLst>
             <a:ext uri="{C572A759-6A51-4108-AA02-DFA0A04FC94B}">
-              <ma14:wrappingTextBoxFlag xmlns="" xmlns:m="http://schemas.openxmlformats.org/officeDocument/2006/math" xmlns:a14="http://schemas.microsoft.com/office/drawing/2010/main" xmlns:ma14="http://schemas.microsoft.com/office/mac/drawingml/2011/main" xmlns:lc="http://schemas.openxmlformats.org/drawingml/2006/lockedCanvas" val="1"/>
+              <ma14:wrappingTextBoxFlag xmlns:lc="http://schemas.openxmlformats.org/drawingml/2006/lockedCanvas" xmlns:ma14="http://schemas.microsoft.com/office/mac/drawingml/2011/main" xmlns:a14="http://schemas.microsoft.com/office/drawing/2010/main" xmlns:m="http://schemas.openxmlformats.org/officeDocument/2006/math" xmlns="" val="1"/>
             </a:ext>
           </a:extLst>
         </p:spPr>
@@ -5020,7 +5176,7 @@
         <p:spPr>
           <a:xfrm>
             <a:off x="4798452" y="3875064"/>
-            <a:ext cx="5490981" cy="1018147"/>
+            <a:ext cx="5490981" cy="1188963"/>
           </a:xfrm>
           <a:prstGeom prst="rect">
             <a:avLst/>
@@ -5030,7 +5186,7 @@
           </a:ln>
           <a:extLst>
             <a:ext uri="{C572A759-6A51-4108-AA02-DFA0A04FC94B}">
-              <ma14:wrappingTextBoxFlag xmlns:ma14="http://schemas.microsoft.com/office/mac/drawingml/2011/main" xmlns:a14="http://schemas.microsoft.com/office/drawing/2010/main" xmlns:m="http://schemas.openxmlformats.org/officeDocument/2006/math" xmlns="" val="1"/>
+              <ma14:wrappingTextBoxFlag xmlns="" xmlns:m="http://schemas.openxmlformats.org/officeDocument/2006/math" xmlns:a14="http://schemas.microsoft.com/office/drawing/2010/main" xmlns:ma14="http://schemas.microsoft.com/office/mac/drawingml/2011/main" val="1"/>
             </a:ext>
           </a:extLst>
         </p:spPr>
@@ -5110,7 +5266,28 @@
                 <a:effectLst/>
                 <a:latin typeface="+mn-lt"/>
               </a:rPr>
-              <a:t>oisson, binomial, or hypergeometric likelihood. A </a:t>
+              <a:t>oisson, binomial, or hypergeometric </a:t>
+            </a:r>
+            <a:r>
+              <a:rPr lang="en-US" b="0" i="0" dirty="0">
+                <a:solidFill>
+                  <a:schemeClr val="accent1"/>
+                </a:solidFill>
+                <a:effectLst/>
+                <a:latin typeface="Courier New" panose="02070309020205020404" pitchFamily="49" charset="0"/>
+                <a:cs typeface="Courier New" panose="02070309020205020404" pitchFamily="49" charset="0"/>
+              </a:rPr>
+              <a:t>likelihood</a:t>
+            </a:r>
+            <a:r>
+              <a:rPr lang="en-US" b="0" i="0" dirty="0">
+                <a:solidFill>
+                  <a:srgbClr val="000000"/>
+                </a:solidFill>
+                <a:effectLst/>
+                <a:latin typeface="+mn-lt"/>
+              </a:rPr>
+              <a:t>. A </a:t>
             </a:r>
             <a:r>
               <a:rPr lang="en-US" b="0" i="0" dirty="0">
@@ -5243,7 +5420,7 @@
           </a:ln>
           <a:extLst>
             <a:ext uri="{C572A759-6A51-4108-AA02-DFA0A04FC94B}">
-              <ma14:wrappingTextBoxFlag xmlns:ma14="http://schemas.microsoft.com/office/mac/drawingml/2011/main" xmlns:a14="http://schemas.microsoft.com/office/drawing/2010/main" xmlns:m="http://schemas.openxmlformats.org/officeDocument/2006/math" xmlns="" val="1"/>
+              <ma14:wrappingTextBoxFlag xmlns="" xmlns:m="http://schemas.openxmlformats.org/officeDocument/2006/math" xmlns:a14="http://schemas.microsoft.com/office/drawing/2010/main" xmlns:ma14="http://schemas.microsoft.com/office/mac/drawingml/2011/main" val="1"/>
             </a:ext>
           </a:extLst>
         </p:spPr>
@@ -5374,7 +5551,7 @@
           <a:effectLst/>
           <a:extLst>
             <a:ext uri="{C572A759-6A51-4108-AA02-DFA0A04FC94B}">
-              <ma14:wrappingTextBoxFlag xmlns="" xmlns:m="http://schemas.openxmlformats.org/officeDocument/2006/math" xmlns:a14="http://schemas.microsoft.com/office/drawing/2010/main" xmlns:ma14="http://schemas.microsoft.com/office/mac/drawingml/2011/main" xmlns:lc="http://schemas.openxmlformats.org/drawingml/2006/lockedCanvas" val="1"/>
+              <ma14:wrappingTextBoxFlag xmlns:lc="http://schemas.openxmlformats.org/drawingml/2006/lockedCanvas" xmlns:ma14="http://schemas.microsoft.com/office/mac/drawingml/2011/main" xmlns:a14="http://schemas.microsoft.com/office/drawing/2010/main" xmlns:m="http://schemas.openxmlformats.org/officeDocument/2006/math" xmlns="" val="1"/>
             </a:ext>
           </a:extLst>
         </p:spPr>
@@ -5842,7 +6019,7 @@
           </a:ln>
           <a:extLst>
             <a:ext uri="{C572A759-6A51-4108-AA02-DFA0A04FC94B}">
-              <ma14:wrappingTextBoxFlag xmlns:ma14="http://schemas.microsoft.com/office/mac/drawingml/2011/main" xmlns:a14="http://schemas.microsoft.com/office/drawing/2010/main" xmlns:m="http://schemas.openxmlformats.org/officeDocument/2006/math" xmlns="" val="1"/>
+              <ma14:wrappingTextBoxFlag xmlns="" xmlns:m="http://schemas.openxmlformats.org/officeDocument/2006/math" xmlns:a14="http://schemas.microsoft.com/office/drawing/2010/main" xmlns:ma14="http://schemas.microsoft.com/office/mac/drawingml/2011/main" val="1"/>
             </a:ext>
           </a:extLst>
         </p:spPr>
@@ -5956,7 +6133,7 @@
           </a:ln>
           <a:extLst>
             <a:ext uri="{C572A759-6A51-4108-AA02-DFA0A04FC94B}">
-              <ma14:wrappingTextBoxFlag xmlns:ma14="http://schemas.microsoft.com/office/mac/drawingml/2011/main" xmlns:a14="http://schemas.microsoft.com/office/drawing/2010/main" xmlns:m="http://schemas.openxmlformats.org/officeDocument/2006/math" xmlns="" val="1"/>
+              <ma14:wrappingTextBoxFlag xmlns="" xmlns:m="http://schemas.openxmlformats.org/officeDocument/2006/math" xmlns:a14="http://schemas.microsoft.com/office/drawing/2010/main" xmlns:ma14="http://schemas.microsoft.com/office/mac/drawingml/2011/main" val="1"/>
             </a:ext>
           </a:extLst>
         </p:spPr>
@@ -6107,7 +6284,7 @@
           <a:effectLst/>
           <a:extLst>
             <a:ext uri="{C572A759-6A51-4108-AA02-DFA0A04FC94B}">
-              <ma14:wrappingTextBoxFlag xmlns="" xmlns:m="http://schemas.openxmlformats.org/officeDocument/2006/math" xmlns:a14="http://schemas.microsoft.com/office/drawing/2010/main" xmlns:ma14="http://schemas.microsoft.com/office/mac/drawingml/2011/main" xmlns:lc="http://schemas.openxmlformats.org/drawingml/2006/lockedCanvas" val="1"/>
+              <ma14:wrappingTextBoxFlag xmlns:lc="http://schemas.openxmlformats.org/drawingml/2006/lockedCanvas" xmlns:ma14="http://schemas.microsoft.com/office/mac/drawingml/2011/main" xmlns:a14="http://schemas.microsoft.com/office/drawing/2010/main" xmlns:m="http://schemas.openxmlformats.org/officeDocument/2006/math" xmlns="" val="1"/>
             </a:ext>
           </a:extLst>
         </p:spPr>
@@ -6601,7 +6778,7 @@
           </a:ln>
           <a:extLst>
             <a:ext uri="{C572A759-6A51-4108-AA02-DFA0A04FC94B}">
-              <ma14:wrappingTextBoxFlag xmlns:ma14="http://schemas.microsoft.com/office/mac/drawingml/2011/main" xmlns:a14="http://schemas.microsoft.com/office/drawing/2010/main" xmlns:m="http://schemas.openxmlformats.org/officeDocument/2006/math" xmlns="" val="1"/>
+              <ma14:wrappingTextBoxFlag xmlns="" xmlns:m="http://schemas.openxmlformats.org/officeDocument/2006/math" xmlns:a14="http://schemas.microsoft.com/office/drawing/2010/main" xmlns:ma14="http://schemas.microsoft.com/office/mac/drawingml/2011/main" val="1"/>
             </a:ext>
           </a:extLst>
         </p:spPr>
@@ -6903,7 +7080,7 @@
           </a:ln>
           <a:extLst>
             <a:ext uri="{C572A759-6A51-4108-AA02-DFA0A04FC94B}">
-              <ma14:wrappingTextBoxFlag xmlns:ma14="http://schemas.microsoft.com/office/mac/drawingml/2011/main" xmlns:a14="http://schemas.microsoft.com/office/drawing/2010/main" xmlns:m="http://schemas.openxmlformats.org/officeDocument/2006/math" xmlns="" val="1"/>
+              <ma14:wrappingTextBoxFlag xmlns="" xmlns:m="http://schemas.openxmlformats.org/officeDocument/2006/math" xmlns:a14="http://schemas.microsoft.com/office/drawing/2010/main" xmlns:ma14="http://schemas.microsoft.com/office/mac/drawingml/2011/main" val="1"/>
             </a:ext>
           </a:extLst>
         </p:spPr>
@@ -7024,7 +7201,7 @@
           <a:effectLst/>
           <a:extLst>
             <a:ext uri="{C572A759-6A51-4108-AA02-DFA0A04FC94B}">
-              <ma14:wrappingTextBoxFlag xmlns="" xmlns:m="http://schemas.openxmlformats.org/officeDocument/2006/math" xmlns:a14="http://schemas.microsoft.com/office/drawing/2010/main" xmlns:ma14="http://schemas.microsoft.com/office/mac/drawingml/2011/main" xmlns:lc="http://schemas.openxmlformats.org/drawingml/2006/lockedCanvas" val="1"/>
+              <ma14:wrappingTextBoxFlag xmlns:lc="http://schemas.openxmlformats.org/drawingml/2006/lockedCanvas" xmlns:ma14="http://schemas.microsoft.com/office/mac/drawingml/2011/main" xmlns:a14="http://schemas.microsoft.com/office/drawing/2010/main" xmlns:m="http://schemas.openxmlformats.org/officeDocument/2006/math" xmlns="" val="1"/>
             </a:ext>
           </a:extLst>
         </p:spPr>
@@ -7518,7 +7695,7 @@
           </a:ln>
           <a:extLst>
             <a:ext uri="{C572A759-6A51-4108-AA02-DFA0A04FC94B}">
-              <ma14:wrappingTextBoxFlag xmlns:ma14="http://schemas.microsoft.com/office/mac/drawingml/2011/main" xmlns:a14="http://schemas.microsoft.com/office/drawing/2010/main" xmlns:m="http://schemas.openxmlformats.org/officeDocument/2006/math" xmlns="" val="1"/>
+              <ma14:wrappingTextBoxFlag xmlns="" xmlns:m="http://schemas.openxmlformats.org/officeDocument/2006/math" xmlns:a14="http://schemas.microsoft.com/office/drawing/2010/main" xmlns:ma14="http://schemas.microsoft.com/office/mac/drawingml/2011/main" val="1"/>
             </a:ext>
           </a:extLst>
         </p:spPr>
@@ -7612,7 +7789,7 @@
           </a:ln>
           <a:extLst>
             <a:ext uri="{C572A759-6A51-4108-AA02-DFA0A04FC94B}">
-              <ma14:wrappingTextBoxFlag xmlns:ma14="http://schemas.microsoft.com/office/mac/drawingml/2011/main" xmlns:a14="http://schemas.microsoft.com/office/drawing/2010/main" xmlns:m="http://schemas.openxmlformats.org/officeDocument/2006/math" xmlns="" val="1"/>
+              <ma14:wrappingTextBoxFlag xmlns="" xmlns:m="http://schemas.openxmlformats.org/officeDocument/2006/math" xmlns:a14="http://schemas.microsoft.com/office/drawing/2010/main" xmlns:ma14="http://schemas.microsoft.com/office/mac/drawingml/2011/main" val="1"/>
             </a:ext>
           </a:extLst>
         </p:spPr>
@@ -7723,7 +7900,7 @@
           <a:effectLst/>
           <a:extLst>
             <a:ext uri="{C572A759-6A51-4108-AA02-DFA0A04FC94B}">
-              <ma14:wrappingTextBoxFlag xmlns="" xmlns:m="http://schemas.openxmlformats.org/officeDocument/2006/math" xmlns:a14="http://schemas.microsoft.com/office/drawing/2010/main" xmlns:ma14="http://schemas.microsoft.com/office/mac/drawingml/2011/main" xmlns:lc="http://schemas.openxmlformats.org/drawingml/2006/lockedCanvas" val="1"/>
+              <ma14:wrappingTextBoxFlag xmlns:lc="http://schemas.openxmlformats.org/drawingml/2006/lockedCanvas" xmlns:ma14="http://schemas.microsoft.com/office/mac/drawingml/2011/main" xmlns:a14="http://schemas.microsoft.com/office/drawing/2010/main" xmlns:m="http://schemas.openxmlformats.org/officeDocument/2006/math" xmlns="" val="1"/>
             </a:ext>
           </a:extLst>
         </p:spPr>
@@ -8084,8 +8261,8 @@
         </p:nvSpPr>
         <p:spPr>
           <a:xfrm>
-            <a:off x="10397721" y="3926801"/>
-            <a:ext cx="3178078" cy="571871"/>
+            <a:off x="10397721" y="3926057"/>
+            <a:ext cx="3178078" cy="725759"/>
           </a:xfrm>
           <a:prstGeom prst="rect">
             <a:avLst/>
@@ -8105,7 +8282,7 @@
           <a:effectLst/>
           <a:extLst>
             <a:ext uri="{C572A759-6A51-4108-AA02-DFA0A04FC94B}">
-              <ma14:wrappingTextBoxFlag xmlns:ma14="http://schemas.microsoft.com/office/mac/drawingml/2011/main" xmlns:a14="http://schemas.microsoft.com/office/drawing/2010/main" xmlns:m="http://schemas.openxmlformats.org/officeDocument/2006/math" xmlns="" val="1"/>
+              <ma14:wrappingTextBoxFlag xmlns="" xmlns:m="http://schemas.openxmlformats.org/officeDocument/2006/math" xmlns:a14="http://schemas.microsoft.com/office/drawing/2010/main" xmlns:ma14="http://schemas.microsoft.com/office/mac/drawingml/2011/main" val="1"/>
             </a:ext>
           </a:extLst>
         </p:spPr>
@@ -8132,7 +8309,9 @@
             <a:r>
               <a:rPr lang="nl-NL" sz="1000" dirty="0">
                 <a:solidFill>
-                  <a:schemeClr val="tx1"/>
+                  <a:schemeClr val="tx1">
+                    <a:lumMod val="50000"/>
+                  </a:schemeClr>
                 </a:solidFill>
                 <a:latin typeface="Courier New" panose="02070309020205020404" pitchFamily="49" charset="0"/>
                 <a:cs typeface="Courier New" panose="02070309020205020404" pitchFamily="49" charset="0"/>
@@ -8142,7 +8321,9 @@
             <a:r>
               <a:rPr lang="nl-NL" sz="1000" dirty="0" err="1">
                 <a:solidFill>
-                  <a:schemeClr val="tx1"/>
+                  <a:schemeClr val="tx1">
+                    <a:lumMod val="50000"/>
+                  </a:schemeClr>
                 </a:solidFill>
                 <a:latin typeface="Courier New" panose="02070309020205020404" pitchFamily="49" charset="0"/>
                 <a:cs typeface="Courier New" panose="02070309020205020404" pitchFamily="49" charset="0"/>
@@ -8152,7 +8333,9 @@
             <a:r>
               <a:rPr lang="nl-NL" sz="1000" dirty="0">
                 <a:solidFill>
-                  <a:schemeClr val="tx1"/>
+                  <a:schemeClr val="tx1">
+                    <a:lumMod val="50000"/>
+                  </a:schemeClr>
                 </a:solidFill>
                 <a:latin typeface="Courier New" panose="02070309020205020404" pitchFamily="49" charset="0"/>
                 <a:cs typeface="Courier New" panose="02070309020205020404" pitchFamily="49" charset="0"/>
@@ -8178,7 +8361,9 @@
             <a:r>
               <a:rPr lang="nl-NL" sz="1000" dirty="0">
                 <a:solidFill>
-                  <a:schemeClr val="tx1"/>
+                  <a:schemeClr val="tx1">
+                    <a:lumMod val="50000"/>
+                  </a:schemeClr>
                 </a:solidFill>
                 <a:latin typeface="Courier New" panose="02070309020205020404" pitchFamily="49" charset="0"/>
                 <a:cs typeface="Courier New" panose="02070309020205020404" pitchFamily="49" charset="0"/>
@@ -8188,7 +8373,9 @@
             <a:r>
               <a:rPr lang="nl-NL" sz="1000" dirty="0" err="1">
                 <a:solidFill>
-                  <a:schemeClr val="tx1"/>
+                  <a:schemeClr val="tx1">
+                    <a:lumMod val="50000"/>
+                  </a:schemeClr>
                 </a:solidFill>
                 <a:latin typeface="Courier New" panose="02070309020205020404" pitchFamily="49" charset="0"/>
                 <a:cs typeface="Courier New" panose="02070309020205020404" pitchFamily="49" charset="0"/>
@@ -8198,7 +8385,9 @@
             <a:r>
               <a:rPr lang="nl-NL" sz="1000" dirty="0">
                 <a:solidFill>
-                  <a:schemeClr val="tx1"/>
+                  <a:schemeClr val="tx1">
+                    <a:lumMod val="50000"/>
+                  </a:schemeClr>
                 </a:solidFill>
                 <a:latin typeface="Courier New" panose="02070309020205020404" pitchFamily="49" charset="0"/>
                 <a:cs typeface="Courier New" panose="02070309020205020404" pitchFamily="49" charset="0"/>
@@ -8224,16 +8413,96 @@
             <a:r>
               <a:rPr lang="nl-NL" sz="1000" dirty="0">
                 <a:solidFill>
-                  <a:schemeClr val="tx1"/>
+                  <a:schemeClr val="tx1">
+                    <a:lumMod val="50000"/>
+                  </a:schemeClr>
                 </a:solidFill>
                 <a:latin typeface="Courier New" panose="02070309020205020404" pitchFamily="49" charset="0"/>
                 <a:cs typeface="Courier New" panose="02070309020205020404" pitchFamily="49" charset="0"/>
               </a:rPr>
+              <a:t>	 </a:t>
+            </a:r>
+            <a:r>
+              <a:rPr lang="nl-NL" sz="1000" dirty="0" err="1">
+                <a:solidFill>
+                  <a:schemeClr val="tx1">
+                    <a:lumMod val="50000"/>
+                  </a:schemeClr>
+                </a:solidFill>
+                <a:latin typeface="Courier New" panose="02070309020205020404" pitchFamily="49" charset="0"/>
+                <a:cs typeface="Courier New" panose="02070309020205020404" pitchFamily="49" charset="0"/>
+              </a:rPr>
+              <a:t>likelihood</a:t>
+            </a:r>
+            <a:r>
+              <a:rPr lang="nl-NL" sz="1000" dirty="0">
+                <a:solidFill>
+                  <a:schemeClr val="tx1">
+                    <a:lumMod val="50000"/>
+                  </a:schemeClr>
+                </a:solidFill>
+                <a:latin typeface="Courier New" panose="02070309020205020404" pitchFamily="49" charset="0"/>
+                <a:cs typeface="Courier New" panose="02070309020205020404" pitchFamily="49" charset="0"/>
+              </a:rPr>
+              <a:t> = "</a:t>
+            </a:r>
+            <a:r>
+              <a:rPr lang="nl-NL" sz="1000" dirty="0" err="1">
+                <a:solidFill>
+                  <a:schemeClr val="tx1">
+                    <a:lumMod val="50000"/>
+                  </a:schemeClr>
+                </a:solidFill>
+                <a:latin typeface="Courier New" panose="02070309020205020404" pitchFamily="49" charset="0"/>
+                <a:cs typeface="Courier New" panose="02070309020205020404" pitchFamily="49" charset="0"/>
+              </a:rPr>
+              <a:t>binomial</a:t>
+            </a:r>
+            <a:r>
+              <a:rPr lang="nl-NL" sz="1000" dirty="0">
+                <a:solidFill>
+                  <a:schemeClr val="tx1">
+                    <a:lumMod val="50000"/>
+                  </a:schemeClr>
+                </a:solidFill>
+                <a:latin typeface="Courier New" panose="02070309020205020404" pitchFamily="49" charset="0"/>
+                <a:cs typeface="Courier New" panose="02070309020205020404" pitchFamily="49" charset="0"/>
+              </a:rPr>
+              <a:t>",</a:t>
+            </a:r>
+          </a:p>
+          <a:p>
+            <a:pPr>
+              <a:spcBef>
+                <a:spcPts val="0"/>
+              </a:spcBef>
+              <a:defRPr b="0">
+                <a:solidFill>
+                  <a:srgbClr val="000000"/>
+                </a:solidFill>
+                <a:latin typeface="Menlo"/>
+                <a:ea typeface="Menlo"/>
+                <a:cs typeface="Menlo"/>
+                <a:sym typeface="Menlo"/>
+              </a:defRPr>
+            </a:pPr>
+            <a:r>
+              <a:rPr lang="nl-NL" sz="1000" dirty="0">
+                <a:solidFill>
+                  <a:schemeClr val="tx1">
+                    <a:lumMod val="50000"/>
+                  </a:schemeClr>
+                </a:solidFill>
+                <a:latin typeface="Courier New" panose="02070309020205020404" pitchFamily="49" charset="0"/>
+                <a:cs typeface="Courier New" panose="02070309020205020404" pitchFamily="49" charset="0"/>
+              </a:rPr>
               <a:t>         prior = FALSE)</a:t>
             </a:r>
             <a:endParaRPr sz="1000" dirty="0">
               <a:solidFill>
-                <a:schemeClr val="tx1"/>
+                <a:schemeClr val="tx1">
+                  <a:lumMod val="50000"/>
+                </a:schemeClr>
               </a:solidFill>
               <a:latin typeface="Courier New" panose="02070309020205020404" pitchFamily="49" charset="0"/>
               <a:cs typeface="Courier New" panose="02070309020205020404" pitchFamily="49" charset="0"/>
@@ -8276,7 +8545,7 @@
           <a:effectLst/>
           <a:extLst>
             <a:ext uri="{C572A759-6A51-4108-AA02-DFA0A04FC94B}">
-              <ma14:wrappingTextBoxFlag xmlns:ma14="http://schemas.microsoft.com/office/mac/drawingml/2011/main" xmlns:a14="http://schemas.microsoft.com/office/drawing/2010/main" xmlns:m="http://schemas.openxmlformats.org/officeDocument/2006/math" xmlns="" val="1"/>
+              <ma14:wrappingTextBoxFlag xmlns="" xmlns:m="http://schemas.openxmlformats.org/officeDocument/2006/math" xmlns:a14="http://schemas.microsoft.com/office/drawing/2010/main" xmlns:ma14="http://schemas.microsoft.com/office/mac/drawingml/2011/main" val="1"/>
             </a:ext>
           </a:extLst>
         </p:spPr>
@@ -8303,7 +8572,9 @@
             <a:r>
               <a:rPr lang="nl-NL" sz="1000" dirty="0" err="1">
                 <a:solidFill>
-                  <a:schemeClr val="tx1"/>
+                  <a:schemeClr val="tx1">
+                    <a:lumMod val="50000"/>
+                  </a:schemeClr>
                 </a:solidFill>
                 <a:latin typeface="Courier New" panose="02070309020205020404" pitchFamily="49" charset="0"/>
                 <a:cs typeface="Courier New" panose="02070309020205020404" pitchFamily="49" charset="0"/>
@@ -8313,7 +8584,9 @@
             <a:r>
               <a:rPr lang="nl-NL" sz="1000" dirty="0">
                 <a:solidFill>
-                  <a:schemeClr val="tx1"/>
+                  <a:schemeClr val="tx1">
+                    <a:lumMod val="50000"/>
+                  </a:schemeClr>
                 </a:solidFill>
                 <a:latin typeface="Courier New" panose="02070309020205020404" pitchFamily="49" charset="0"/>
                 <a:cs typeface="Courier New" panose="02070309020205020404" pitchFamily="49" charset="0"/>
@@ -8323,7 +8596,9 @@
             <a:r>
               <a:rPr lang="nl-NL" sz="1000" dirty="0" err="1">
                 <a:solidFill>
-                  <a:schemeClr val="tx1"/>
+                  <a:schemeClr val="tx1">
+                    <a:lumMod val="50000"/>
+                  </a:schemeClr>
                 </a:solidFill>
                 <a:latin typeface="Courier New" panose="02070309020205020404" pitchFamily="49" charset="0"/>
                 <a:cs typeface="Courier New" panose="02070309020205020404" pitchFamily="49" charset="0"/>
@@ -8333,7 +8608,9 @@
             <a:r>
               <a:rPr lang="nl-NL" sz="1000" dirty="0">
                 <a:solidFill>
-                  <a:schemeClr val="tx1"/>
+                  <a:schemeClr val="tx1">
+                    <a:lumMod val="50000"/>
+                  </a:schemeClr>
                 </a:solidFill>
                 <a:latin typeface="Courier New" panose="02070309020205020404" pitchFamily="49" charset="0"/>
                 <a:cs typeface="Courier New" panose="02070309020205020404" pitchFamily="49" charset="0"/>
@@ -8343,7 +8620,9 @@
             <a:r>
               <a:rPr lang="nl-NL" sz="1000" dirty="0" err="1">
                 <a:solidFill>
-                  <a:schemeClr val="tx1"/>
+                  <a:schemeClr val="tx1">
+                    <a:lumMod val="50000"/>
+                  </a:schemeClr>
                 </a:solidFill>
                 <a:latin typeface="Courier New" panose="02070309020205020404" pitchFamily="49" charset="0"/>
                 <a:cs typeface="Courier New" panose="02070309020205020404" pitchFamily="49" charset="0"/>
@@ -8353,7 +8632,9 @@
             <a:r>
               <a:rPr lang="nl-NL" sz="1000" dirty="0">
                 <a:solidFill>
-                  <a:schemeClr val="tx1"/>
+                  <a:schemeClr val="tx1">
+                    <a:lumMod val="50000"/>
+                  </a:schemeClr>
                 </a:solidFill>
                 <a:latin typeface="Courier New" panose="02070309020205020404" pitchFamily="49" charset="0"/>
                 <a:cs typeface="Courier New" panose="02070309020205020404" pitchFamily="49" charset="0"/>
@@ -8379,7 +8660,9 @@
             <a:r>
               <a:rPr lang="nl-NL" sz="1000" dirty="0">
                 <a:solidFill>
-                  <a:schemeClr val="tx1"/>
+                  <a:schemeClr val="tx1">
+                    <a:lumMod val="50000"/>
+                  </a:schemeClr>
                 </a:solidFill>
                 <a:latin typeface="Courier New" panose="02070309020205020404" pitchFamily="49" charset="0"/>
                 <a:cs typeface="Courier New" panose="02070309020205020404" pitchFamily="49" charset="0"/>
@@ -8389,7 +8672,9 @@
             <a:r>
               <a:rPr lang="nl-NL" sz="1000" dirty="0" err="1">
                 <a:solidFill>
-                  <a:schemeClr val="tx1"/>
+                  <a:schemeClr val="tx1">
+                    <a:lumMod val="50000"/>
+                  </a:schemeClr>
                 </a:solidFill>
                 <a:latin typeface="Courier New" panose="02070309020205020404" pitchFamily="49" charset="0"/>
                 <a:cs typeface="Courier New" panose="02070309020205020404" pitchFamily="49" charset="0"/>
@@ -8399,7 +8684,9 @@
             <a:r>
               <a:rPr lang="nl-NL" sz="1000" dirty="0">
                 <a:solidFill>
-                  <a:schemeClr val="tx1"/>
+                  <a:schemeClr val="tx1">
+                    <a:lumMod val="50000"/>
+                  </a:schemeClr>
                 </a:solidFill>
                 <a:latin typeface="Courier New" panose="02070309020205020404" pitchFamily="49" charset="0"/>
                 <a:cs typeface="Courier New" panose="02070309020205020404" pitchFamily="49" charset="0"/>
@@ -8425,7 +8712,9 @@
             <a:r>
               <a:rPr lang="nl-NL" sz="1000" dirty="0">
                 <a:solidFill>
-                  <a:schemeClr val="tx1"/>
+                  <a:schemeClr val="tx1">
+                    <a:lumMod val="50000"/>
+                  </a:schemeClr>
                 </a:solidFill>
                 <a:latin typeface="Courier New" panose="02070309020205020404" pitchFamily="49" charset="0"/>
                 <a:cs typeface="Courier New" panose="02070309020205020404" pitchFamily="49" charset="0"/>
@@ -8451,7 +8740,9 @@
             <a:r>
               <a:rPr lang="nl-NL" sz="1000" dirty="0">
                 <a:solidFill>
-                  <a:schemeClr val="tx1"/>
+                  <a:schemeClr val="tx1">
+                    <a:lumMod val="50000"/>
+                  </a:schemeClr>
                 </a:solidFill>
                 <a:latin typeface="Courier New" panose="02070309020205020404" pitchFamily="49" charset="0"/>
                 <a:cs typeface="Courier New" panose="02070309020205020404" pitchFamily="49" charset="0"/>
@@ -8461,7 +8752,9 @@
             <a:r>
               <a:rPr lang="nl-NL" sz="1000" dirty="0" err="1">
                 <a:solidFill>
-                  <a:schemeClr val="tx1"/>
+                  <a:schemeClr val="tx1">
+                    <a:lumMod val="50000"/>
+                  </a:schemeClr>
                 </a:solidFill>
                 <a:latin typeface="Courier New" panose="02070309020205020404" pitchFamily="49" charset="0"/>
                 <a:cs typeface="Courier New" panose="02070309020205020404" pitchFamily="49" charset="0"/>
@@ -8469,22 +8762,17 @@
               <a:t>algorithm</a:t>
             </a:r>
             <a:r>
-              <a:rPr lang="nl-NL" sz="1000">
-                <a:solidFill>
-                  <a:schemeClr val="tx1"/>
+              <a:rPr lang="nl-NL" sz="1000" dirty="0">
+                <a:solidFill>
+                  <a:schemeClr val="tx1">
+                    <a:lumMod val="50000"/>
+                  </a:schemeClr>
                 </a:solidFill>
                 <a:latin typeface="Courier New" panose="02070309020205020404" pitchFamily="49" charset="0"/>
                 <a:cs typeface="Courier New" panose="02070309020205020404" pitchFamily="49" charset="0"/>
               </a:rPr>
               <a:t> = "interval") </a:t>
             </a:r>
-            <a:endParaRPr lang="nl-NL" sz="1000" dirty="0">
-              <a:solidFill>
-                <a:schemeClr val="tx1"/>
-              </a:solidFill>
-              <a:latin typeface="Courier New" panose="02070309020205020404" pitchFamily="49" charset="0"/>
-              <a:cs typeface="Courier New" panose="02070309020205020404" pitchFamily="49" charset="0"/>
-            </a:endParaRPr>
           </a:p>
         </p:txBody>
       </p:sp>
@@ -8523,7 +8811,7 @@
           <a:effectLst/>
           <a:extLst>
             <a:ext uri="{C572A759-6A51-4108-AA02-DFA0A04FC94B}">
-              <ma14:wrappingTextBoxFlag xmlns:ma14="http://schemas.microsoft.com/office/mac/drawingml/2011/main" xmlns:a14="http://schemas.microsoft.com/office/drawing/2010/main" xmlns:m="http://schemas.openxmlformats.org/officeDocument/2006/math" xmlns="" val="1"/>
+              <ma14:wrappingTextBoxFlag xmlns="" xmlns:m="http://schemas.openxmlformats.org/officeDocument/2006/math" xmlns:a14="http://schemas.microsoft.com/office/drawing/2010/main" xmlns:ma14="http://schemas.microsoft.com/office/mac/drawingml/2011/main" val="1"/>
             </a:ext>
           </a:extLst>
         </p:spPr>
@@ -8550,7 +8838,9 @@
             <a:r>
               <a:rPr lang="nl-NL" sz="1000" dirty="0" err="1">
                 <a:solidFill>
-                  <a:schemeClr val="tx1"/>
+                  <a:schemeClr val="tx1">
+                    <a:lumMod val="50000"/>
+                  </a:schemeClr>
                 </a:solidFill>
                 <a:latin typeface="Courier New" panose="02070309020205020404" pitchFamily="49" charset="0"/>
                 <a:cs typeface="Courier New" panose="02070309020205020404" pitchFamily="49" charset="0"/>
@@ -8560,7 +8850,9 @@
             <a:r>
               <a:rPr lang="nl-NL" sz="1000" dirty="0">
                 <a:solidFill>
-                  <a:schemeClr val="tx1"/>
+                  <a:schemeClr val="tx1">
+                    <a:lumMod val="50000"/>
+                  </a:schemeClr>
                 </a:solidFill>
                 <a:latin typeface="Courier New" panose="02070309020205020404" pitchFamily="49" charset="0"/>
                 <a:cs typeface="Courier New" panose="02070309020205020404" pitchFamily="49" charset="0"/>
@@ -8570,7 +8862,9 @@
             <a:r>
               <a:rPr lang="nl-NL" sz="1000" dirty="0" err="1">
                 <a:solidFill>
-                  <a:schemeClr val="tx1"/>
+                  <a:schemeClr val="tx1">
+                    <a:lumMod val="50000"/>
+                  </a:schemeClr>
                 </a:solidFill>
                 <a:latin typeface="Courier New" panose="02070309020205020404" pitchFamily="49" charset="0"/>
                 <a:cs typeface="Courier New" panose="02070309020205020404" pitchFamily="49" charset="0"/>
@@ -8580,7 +8874,9 @@
             <a:r>
               <a:rPr lang="nl-NL" sz="1000" dirty="0">
                 <a:solidFill>
-                  <a:schemeClr val="tx1"/>
+                  <a:schemeClr val="tx1">
+                    <a:lumMod val="50000"/>
+                  </a:schemeClr>
                 </a:solidFill>
                 <a:latin typeface="Courier New" panose="02070309020205020404" pitchFamily="49" charset="0"/>
                 <a:cs typeface="Courier New" panose="02070309020205020404" pitchFamily="49" charset="0"/>
@@ -8606,7 +8902,9 @@
             <a:r>
               <a:rPr lang="nl-NL" sz="1000" dirty="0">
                 <a:solidFill>
-                  <a:schemeClr val="tx1"/>
+                  <a:schemeClr val="tx1">
+                    <a:lumMod val="50000"/>
+                  </a:schemeClr>
                 </a:solidFill>
                 <a:latin typeface="Courier New" panose="02070309020205020404" pitchFamily="49" charset="0"/>
                 <a:cs typeface="Courier New" panose="02070309020205020404" pitchFamily="49" charset="0"/>
@@ -8616,7 +8914,9 @@
             <a:r>
               <a:rPr lang="nl-NL" sz="1000" dirty="0" err="1">
                 <a:solidFill>
-                  <a:schemeClr val="tx1"/>
+                  <a:schemeClr val="tx1">
+                    <a:lumMod val="50000"/>
+                  </a:schemeClr>
                 </a:solidFill>
                 <a:latin typeface="Courier New" panose="02070309020205020404" pitchFamily="49" charset="0"/>
                 <a:cs typeface="Courier New" panose="02070309020205020404" pitchFamily="49" charset="0"/>
@@ -8626,7 +8926,9 @@
             <a:r>
               <a:rPr lang="nl-NL" sz="1000" dirty="0">
                 <a:solidFill>
-                  <a:schemeClr val="tx1"/>
+                  <a:schemeClr val="tx1">
+                    <a:lumMod val="50000"/>
+                  </a:schemeClr>
                 </a:solidFill>
                 <a:latin typeface="Courier New" panose="02070309020205020404" pitchFamily="49" charset="0"/>
                 <a:cs typeface="Courier New" panose="02070309020205020404" pitchFamily="49" charset="0"/>
@@ -8636,7 +8938,9 @@
             <a:r>
               <a:rPr lang="nl-NL" sz="1000" dirty="0" err="1">
                 <a:solidFill>
-                  <a:schemeClr val="tx1"/>
+                  <a:schemeClr val="tx1">
+                    <a:lumMod val="50000"/>
+                  </a:schemeClr>
                 </a:solidFill>
                 <a:latin typeface="Courier New" panose="02070309020205020404" pitchFamily="49" charset="0"/>
                 <a:cs typeface="Courier New" panose="02070309020205020404" pitchFamily="49" charset="0"/>
@@ -8646,7 +8950,9 @@
             <a:r>
               <a:rPr lang="nl-NL" sz="1000" dirty="0">
                 <a:solidFill>
-                  <a:schemeClr val="tx1"/>
+                  <a:schemeClr val="tx1">
+                    <a:lumMod val="50000"/>
+                  </a:schemeClr>
                 </a:solidFill>
                 <a:latin typeface="Courier New" panose="02070309020205020404" pitchFamily="49" charset="0"/>
                 <a:cs typeface="Courier New" panose="02070309020205020404" pitchFamily="49" charset="0"/>
@@ -8672,7 +8978,9 @@
             <a:r>
               <a:rPr lang="nl-NL" sz="1000" dirty="0">
                 <a:solidFill>
-                  <a:schemeClr val="tx1"/>
+                  <a:schemeClr val="tx1">
+                    <a:lumMod val="50000"/>
+                  </a:schemeClr>
                 </a:solidFill>
                 <a:latin typeface="Courier New" panose="02070309020205020404" pitchFamily="49" charset="0"/>
                 <a:cs typeface="Courier New" panose="02070309020205020404" pitchFamily="49" charset="0"/>
@@ -8682,7 +8990,9 @@
             <a:r>
               <a:rPr lang="nl-NL" sz="1000" dirty="0" err="1">
                 <a:solidFill>
-                  <a:schemeClr val="tx1"/>
+                  <a:schemeClr val="tx1">
+                    <a:lumMod val="50000"/>
+                  </a:schemeClr>
                 </a:solidFill>
                 <a:latin typeface="Courier New" panose="02070309020205020404" pitchFamily="49" charset="0"/>
                 <a:cs typeface="Courier New" panose="02070309020205020404" pitchFamily="49" charset="0"/>
@@ -8692,7 +9002,9 @@
             <a:r>
               <a:rPr lang="nl-NL" sz="1000" dirty="0">
                 <a:solidFill>
-                  <a:schemeClr val="tx1"/>
+                  <a:schemeClr val="tx1">
+                    <a:lumMod val="50000"/>
+                  </a:schemeClr>
                 </a:solidFill>
                 <a:latin typeface="Courier New" panose="02070309020205020404" pitchFamily="49" charset="0"/>
                 <a:cs typeface="Courier New" panose="02070309020205020404" pitchFamily="49" charset="0"/>
@@ -8702,7 +9014,9 @@
             <a:r>
               <a:rPr lang="nl-NL" sz="1000" dirty="0" err="1">
                 <a:solidFill>
-                  <a:schemeClr val="tx1"/>
+                  <a:schemeClr val="tx1">
+                    <a:lumMod val="50000"/>
+                  </a:schemeClr>
                 </a:solidFill>
                 <a:latin typeface="Courier New" panose="02070309020205020404" pitchFamily="49" charset="0"/>
                 <a:cs typeface="Courier New" panose="02070309020205020404" pitchFamily="49" charset="0"/>
@@ -8712,7 +9026,9 @@
             <a:r>
               <a:rPr lang="nl-NL" sz="1000" dirty="0">
                 <a:solidFill>
-                  <a:schemeClr val="tx1"/>
+                  <a:schemeClr val="tx1">
+                    <a:lumMod val="50000"/>
+                  </a:schemeClr>
                 </a:solidFill>
                 <a:latin typeface="Courier New" panose="02070309020205020404" pitchFamily="49" charset="0"/>
                 <a:cs typeface="Courier New" panose="02070309020205020404" pitchFamily="49" charset="0"/>
@@ -8738,7 +9054,9 @@
             <a:r>
               <a:rPr lang="nl-NL" sz="1000" dirty="0">
                 <a:solidFill>
-                  <a:schemeClr val="tx1"/>
+                  <a:schemeClr val="tx1">
+                    <a:lumMod val="50000"/>
+                  </a:schemeClr>
                 </a:solidFill>
                 <a:latin typeface="Courier New" panose="02070309020205020404" pitchFamily="49" charset="0"/>
                 <a:cs typeface="Courier New" panose="02070309020205020404" pitchFamily="49" charset="0"/>
@@ -8748,7 +9066,9 @@
             <a:r>
               <a:rPr lang="nl-NL" sz="1000" dirty="0" err="1">
                 <a:solidFill>
-                  <a:schemeClr val="tx1"/>
+                  <a:schemeClr val="tx1">
+                    <a:lumMod val="50000"/>
+                  </a:schemeClr>
                 </a:solidFill>
                 <a:latin typeface="Courier New" panose="02070309020205020404" pitchFamily="49" charset="0"/>
                 <a:cs typeface="Courier New" panose="02070309020205020404" pitchFamily="49" charset="0"/>
@@ -8758,7 +9078,9 @@
             <a:r>
               <a:rPr lang="nl-NL" sz="1000" dirty="0">
                 <a:solidFill>
-                  <a:schemeClr val="tx1"/>
+                  <a:schemeClr val="tx1">
+                    <a:lumMod val="50000"/>
+                  </a:schemeClr>
                 </a:solidFill>
                 <a:latin typeface="Courier New" panose="02070309020205020404" pitchFamily="49" charset="0"/>
                 <a:cs typeface="Courier New" panose="02070309020205020404" pitchFamily="49" charset="0"/>
@@ -8768,7 +9090,9 @@
             <a:r>
               <a:rPr lang="nl-NL" sz="1000" dirty="0" err="1">
                 <a:solidFill>
-                  <a:schemeClr val="tx1"/>
+                  <a:schemeClr val="tx1">
+                    <a:lumMod val="50000"/>
+                  </a:schemeClr>
                 </a:solidFill>
                 <a:latin typeface="Courier New" panose="02070309020205020404" pitchFamily="49" charset="0"/>
                 <a:cs typeface="Courier New" panose="02070309020205020404" pitchFamily="49" charset="0"/>
@@ -8778,7 +9102,9 @@
             <a:r>
               <a:rPr lang="nl-NL" sz="1000" dirty="0">
                 <a:solidFill>
-                  <a:schemeClr val="tx1"/>
+                  <a:schemeClr val="tx1">
+                    <a:lumMod val="50000"/>
+                  </a:schemeClr>
                 </a:solidFill>
                 <a:latin typeface="Courier New" panose="02070309020205020404" pitchFamily="49" charset="0"/>
                 <a:cs typeface="Courier New" panose="02070309020205020404" pitchFamily="49" charset="0"/>
@@ -8804,7 +9130,9 @@
             <a:r>
               <a:rPr lang="nl-NL" sz="1000" dirty="0">
                 <a:solidFill>
-                  <a:schemeClr val="tx1"/>
+                  <a:schemeClr val="tx1">
+                    <a:lumMod val="50000"/>
+                  </a:schemeClr>
                 </a:solidFill>
                 <a:latin typeface="Courier New" panose="02070309020205020404" pitchFamily="49" charset="0"/>
                 <a:cs typeface="Courier New" panose="02070309020205020404" pitchFamily="49" charset="0"/>
@@ -8814,7 +9142,9 @@
             <a:r>
               <a:rPr lang="nl-NL" sz="1000" dirty="0" err="1">
                 <a:solidFill>
-                  <a:schemeClr val="tx1"/>
+                  <a:schemeClr val="tx1">
+                    <a:lumMod val="50000"/>
+                  </a:schemeClr>
                 </a:solidFill>
                 <a:latin typeface="Courier New" panose="02070309020205020404" pitchFamily="49" charset="0"/>
                 <a:cs typeface="Courier New" panose="02070309020205020404" pitchFamily="49" charset="0"/>
@@ -8824,7 +9154,9 @@
             <a:r>
               <a:rPr lang="nl-NL" sz="1000" dirty="0">
                 <a:solidFill>
-                  <a:schemeClr val="tx1"/>
+                  <a:schemeClr val="tx1">
+                    <a:lumMod val="50000"/>
+                  </a:schemeClr>
                 </a:solidFill>
                 <a:latin typeface="Courier New" panose="02070309020205020404" pitchFamily="49" charset="0"/>
                 <a:cs typeface="Courier New" panose="02070309020205020404" pitchFamily="49" charset="0"/>
@@ -8833,7 +9165,9 @@
             </a:r>
             <a:endParaRPr sz="1000" dirty="0">
               <a:solidFill>
-                <a:schemeClr val="tx1"/>
+                <a:schemeClr val="tx1">
+                  <a:lumMod val="50000"/>
+                </a:schemeClr>
               </a:solidFill>
               <a:latin typeface="Courier New" panose="02070309020205020404" pitchFamily="49" charset="0"/>
               <a:cs typeface="Courier New" panose="02070309020205020404" pitchFamily="49" charset="0"/>
@@ -8876,7 +9210,7 @@
           <a:effectLst/>
           <a:extLst>
             <a:ext uri="{C572A759-6A51-4108-AA02-DFA0A04FC94B}">
-              <ma14:wrappingTextBoxFlag xmlns:ma14="http://schemas.microsoft.com/office/mac/drawingml/2011/main" xmlns:a14="http://schemas.microsoft.com/office/drawing/2010/main" xmlns:m="http://schemas.openxmlformats.org/officeDocument/2006/math" xmlns="" val="1"/>
+              <ma14:wrappingTextBoxFlag xmlns="" xmlns:m="http://schemas.openxmlformats.org/officeDocument/2006/math" xmlns:a14="http://schemas.microsoft.com/office/drawing/2010/main" xmlns:ma14="http://schemas.microsoft.com/office/mac/drawingml/2011/main" val="1"/>
             </a:ext>
           </a:extLst>
         </p:spPr>
@@ -8903,7 +9237,9 @@
             <a:r>
               <a:rPr lang="nl-NL" sz="1000" dirty="0">
                 <a:solidFill>
-                  <a:schemeClr val="tx1"/>
+                  <a:schemeClr val="tx1">
+                    <a:lumMod val="50000"/>
+                  </a:schemeClr>
                 </a:solidFill>
                 <a:latin typeface="Courier New" panose="02070309020205020404" pitchFamily="49" charset="0"/>
                 <a:cs typeface="Courier New" panose="02070309020205020404" pitchFamily="49" charset="0"/>
@@ -8913,7 +9249,9 @@
             <a:r>
               <a:rPr lang="nl-NL" sz="1000" dirty="0" err="1">
                 <a:solidFill>
-                  <a:schemeClr val="tx1"/>
+                  <a:schemeClr val="tx1">
+                    <a:lumMod val="50000"/>
+                  </a:schemeClr>
                 </a:solidFill>
                 <a:latin typeface="Courier New" panose="02070309020205020404" pitchFamily="49" charset="0"/>
                 <a:cs typeface="Courier New" panose="02070309020205020404" pitchFamily="49" charset="0"/>
@@ -8923,7 +9261,9 @@
             <a:r>
               <a:rPr lang="nl-NL" sz="1000" dirty="0">
                 <a:solidFill>
-                  <a:schemeClr val="tx1"/>
+                  <a:schemeClr val="tx1">
+                    <a:lumMod val="50000"/>
+                  </a:schemeClr>
                 </a:solidFill>
                 <a:latin typeface="Courier New" panose="02070309020205020404" pitchFamily="49" charset="0"/>
                 <a:cs typeface="Courier New" panose="02070309020205020404" pitchFamily="49" charset="0"/>
@@ -8949,7 +9289,9 @@
             <a:r>
               <a:rPr lang="nl-NL" sz="1000" dirty="0">
                 <a:solidFill>
-                  <a:schemeClr val="tx1"/>
+                  <a:schemeClr val="tx1">
+                    <a:lumMod val="50000"/>
+                  </a:schemeClr>
                 </a:solidFill>
                 <a:latin typeface="Courier New" panose="02070309020205020404" pitchFamily="49" charset="0"/>
                 <a:cs typeface="Courier New" panose="02070309020205020404" pitchFamily="49" charset="0"/>
@@ -8958,7 +9300,9 @@
             </a:r>
             <a:endParaRPr sz="1000" dirty="0">
               <a:solidFill>
-                <a:schemeClr val="tx1"/>
+                <a:schemeClr val="tx1">
+                  <a:lumMod val="50000"/>
+                </a:schemeClr>
               </a:solidFill>
               <a:latin typeface="Courier New" panose="02070309020205020404" pitchFamily="49" charset="0"/>
               <a:cs typeface="Courier New" panose="02070309020205020404" pitchFamily="49" charset="0"/>
@@ -9333,7 +9677,7 @@
           </a:ln>
           <a:extLst>
             <a:ext uri="{C572A759-6A51-4108-AA02-DFA0A04FC94B}">
-              <ma14:wrappingTextBoxFlag xmlns:ma14="http://schemas.microsoft.com/office/mac/drawingml/2011/main" xmlns:a14="http://schemas.microsoft.com/office/drawing/2010/main" xmlns:m="http://schemas.openxmlformats.org/officeDocument/2006/math" xmlns="" val="1"/>
+              <ma14:wrappingTextBoxFlag xmlns="" xmlns:m="http://schemas.openxmlformats.org/officeDocument/2006/math" xmlns:a14="http://schemas.microsoft.com/office/drawing/2010/main" xmlns:ma14="http://schemas.microsoft.com/office/mac/drawingml/2011/main" val="1"/>
             </a:ext>
           </a:extLst>
         </p:spPr>
@@ -9397,7 +9741,7 @@
           </a:ln>
           <a:extLst>
             <a:ext uri="{C572A759-6A51-4108-AA02-DFA0A04FC94B}">
-              <ma14:wrappingTextBoxFlag xmlns:ma14="http://schemas.microsoft.com/office/mac/drawingml/2011/main" xmlns:a14="http://schemas.microsoft.com/office/drawing/2010/main" xmlns:m="http://schemas.openxmlformats.org/officeDocument/2006/math" xmlns="" val="1"/>
+              <ma14:wrappingTextBoxFlag xmlns="" xmlns:m="http://schemas.openxmlformats.org/officeDocument/2006/math" xmlns:a14="http://schemas.microsoft.com/office/drawing/2010/main" xmlns:ma14="http://schemas.microsoft.com/office/mac/drawingml/2011/main" val="1"/>
             </a:ext>
           </a:extLst>
         </p:spPr>
@@ -9821,7 +10165,7 @@
           </a:ln>
           <a:extLst>
             <a:ext uri="{C572A759-6A51-4108-AA02-DFA0A04FC94B}">
-              <ma14:wrappingTextBoxFlag xmlns:ma14="http://schemas.microsoft.com/office/mac/drawingml/2011/main" xmlns:a14="http://schemas.microsoft.com/office/drawing/2010/main" xmlns:m="http://schemas.openxmlformats.org/officeDocument/2006/math" xmlns="" val="1"/>
+              <ma14:wrappingTextBoxFlag xmlns="" xmlns:m="http://schemas.openxmlformats.org/officeDocument/2006/math" xmlns:a14="http://schemas.microsoft.com/office/drawing/2010/main" xmlns:ma14="http://schemas.microsoft.com/office/mac/drawingml/2011/main" val="1"/>
             </a:ext>
           </a:extLst>
         </p:spPr>
@@ -9885,7 +10229,7 @@
           </a:ln>
           <a:extLst>
             <a:ext uri="{C572A759-6A51-4108-AA02-DFA0A04FC94B}">
-              <ma14:wrappingTextBoxFlag xmlns:ma14="http://schemas.microsoft.com/office/mac/drawingml/2011/main" xmlns:a14="http://schemas.microsoft.com/office/drawing/2010/main" xmlns:m="http://schemas.openxmlformats.org/officeDocument/2006/math" xmlns="" val="1"/>
+              <ma14:wrappingTextBoxFlag xmlns="" xmlns:m="http://schemas.openxmlformats.org/officeDocument/2006/math" xmlns:a14="http://schemas.microsoft.com/office/drawing/2010/main" xmlns:ma14="http://schemas.microsoft.com/office/mac/drawingml/2011/main" val="1"/>
             </a:ext>
           </a:extLst>
         </p:spPr>

</xml_diff>

<commit_message>
Built site for jfa: 0.5.0@7d625aa
</commit_message>
<xml_diff>
--- a/reference/figures/cheatsheet/cheatsheet.pptx
+++ b/reference/figures/cheatsheet/cheatsheet.pptx
@@ -369,12 +369,12 @@
   <pc:docChgLst>
     <pc:chgData name="Derks, Koen" userId="42903d96-be75-4cec-9136-f3710e86cd30" providerId="ADAL" clId="{16DBF44E-6DA5-4025-8FE0-79440E68FF90}"/>
     <pc:docChg chg="undo custSel modSld">
-      <pc:chgData name="Derks, Koen" userId="42903d96-be75-4cec-9136-f3710e86cd30" providerId="ADAL" clId="{16DBF44E-6DA5-4025-8FE0-79440E68FF90}" dt="2021-01-02T10:50:36.123" v="122" actId="207"/>
+      <pc:chgData name="Derks, Koen" userId="42903d96-be75-4cec-9136-f3710e86cd30" providerId="ADAL" clId="{16DBF44E-6DA5-4025-8FE0-79440E68FF90}" dt="2021-01-02T10:54:32.078" v="162" actId="5793"/>
       <pc:docMkLst>
         <pc:docMk/>
       </pc:docMkLst>
       <pc:sldChg chg="modSp mod">
-        <pc:chgData name="Derks, Koen" userId="42903d96-be75-4cec-9136-f3710e86cd30" providerId="ADAL" clId="{16DBF44E-6DA5-4025-8FE0-79440E68FF90}" dt="2021-01-02T10:50:36.123" v="122" actId="207"/>
+        <pc:chgData name="Derks, Koen" userId="42903d96-be75-4cec-9136-f3710e86cd30" providerId="ADAL" clId="{16DBF44E-6DA5-4025-8FE0-79440E68FF90}" dt="2021-01-02T10:54:32.078" v="162" actId="5793"/>
         <pc:sldMkLst>
           <pc:docMk/>
           <pc:sldMk cId="0" sldId="257"/>
@@ -388,7 +388,7 @@
           </ac:spMkLst>
         </pc:spChg>
         <pc:spChg chg="mod">
-          <ac:chgData name="Derks, Koen" userId="42903d96-be75-4cec-9136-f3710e86cd30" providerId="ADAL" clId="{16DBF44E-6DA5-4025-8FE0-79440E68FF90}" dt="2021-01-02T10:50:29.205" v="120" actId="207"/>
+          <ac:chgData name="Derks, Koen" userId="42903d96-be75-4cec-9136-f3710e86cd30" providerId="ADAL" clId="{16DBF44E-6DA5-4025-8FE0-79440E68FF90}" dt="2021-01-02T10:54:20.069" v="139" actId="5793"/>
           <ac:spMkLst>
             <pc:docMk/>
             <pc:sldMk cId="0" sldId="257"/>
@@ -396,7 +396,7 @@
           </ac:spMkLst>
         </pc:spChg>
         <pc:spChg chg="mod">
-          <ac:chgData name="Derks, Koen" userId="42903d96-be75-4cec-9136-f3710e86cd30" providerId="ADAL" clId="{16DBF44E-6DA5-4025-8FE0-79440E68FF90}" dt="2021-01-02T10:50:26.888" v="119" actId="207"/>
+          <ac:chgData name="Derks, Koen" userId="42903d96-be75-4cec-9136-f3710e86cd30" providerId="ADAL" clId="{16DBF44E-6DA5-4025-8FE0-79440E68FF90}" dt="2021-01-02T10:54:23.407" v="147" actId="5793"/>
           <ac:spMkLst>
             <pc:docMk/>
             <pc:sldMk cId="0" sldId="257"/>
@@ -404,7 +404,7 @@
           </ac:spMkLst>
         </pc:spChg>
         <pc:spChg chg="mod">
-          <ac:chgData name="Derks, Koen" userId="42903d96-be75-4cec-9136-f3710e86cd30" providerId="ADAL" clId="{16DBF44E-6DA5-4025-8FE0-79440E68FF90}" dt="2021-01-02T10:50:23.630" v="118" actId="207"/>
+          <ac:chgData name="Derks, Koen" userId="42903d96-be75-4cec-9136-f3710e86cd30" providerId="ADAL" clId="{16DBF44E-6DA5-4025-8FE0-79440E68FF90}" dt="2021-01-02T10:54:27.035" v="154" actId="5793"/>
           <ac:spMkLst>
             <pc:docMk/>
             <pc:sldMk cId="0" sldId="257"/>
@@ -412,7 +412,7 @@
           </ac:spMkLst>
         </pc:spChg>
         <pc:spChg chg="mod">
-          <ac:chgData name="Derks, Koen" userId="42903d96-be75-4cec-9136-f3710e86cd30" providerId="ADAL" clId="{16DBF44E-6DA5-4025-8FE0-79440E68FF90}" dt="2021-01-02T10:50:36.123" v="122" actId="207"/>
+          <ac:chgData name="Derks, Koen" userId="42903d96-be75-4cec-9136-f3710e86cd30" providerId="ADAL" clId="{16DBF44E-6DA5-4025-8FE0-79440E68FF90}" dt="2021-01-02T10:54:32.078" v="162" actId="5793"/>
           <ac:spMkLst>
             <pc:docMk/>
             <pc:sldMk cId="0" sldId="257"/>
@@ -420,7 +420,7 @@
           </ac:spMkLst>
         </pc:spChg>
         <pc:spChg chg="mod">
-          <ac:chgData name="Derks, Koen" userId="42903d96-be75-4cec-9136-f3710e86cd30" providerId="ADAL" clId="{16DBF44E-6DA5-4025-8FE0-79440E68FF90}" dt="2021-01-02T10:50:32.176" v="121" actId="207"/>
+          <ac:chgData name="Derks, Koen" userId="42903d96-be75-4cec-9136-f3710e86cd30" providerId="ADAL" clId="{16DBF44E-6DA5-4025-8FE0-79440E68FF90}" dt="2021-01-02T10:54:16.346" v="130" actId="5793"/>
           <ac:spMkLst>
             <pc:docMk/>
             <pc:sldMk cId="0" sldId="257"/>
@@ -2239,7 +2239,7 @@
           </a:ln>
           <a:extLst>
             <a:ext uri="{C572A759-6A51-4108-AA02-DFA0A04FC94B}">
-              <ma14:wrappingTextBoxFlag xmlns="" xmlns:m="http://schemas.openxmlformats.org/officeDocument/2006/math" xmlns:a14="http://schemas.microsoft.com/office/drawing/2010/main" xmlns:ma14="http://schemas.microsoft.com/office/mac/drawingml/2011/main" val="1"/>
+              <ma14:wrappingTextBoxFlag xmlns:ma14="http://schemas.microsoft.com/office/mac/drawingml/2011/main" xmlns:a14="http://schemas.microsoft.com/office/drawing/2010/main" xmlns:m="http://schemas.openxmlformats.org/officeDocument/2006/math" xmlns="" val="1"/>
             </a:ext>
           </a:extLst>
         </p:spPr>
@@ -2278,7 +2278,7 @@
           </a:ln>
           <a:extLst>
             <a:ext uri="{C572A759-6A51-4108-AA02-DFA0A04FC94B}">
-              <ma14:wrappingTextBoxFlag xmlns="" xmlns:m="http://schemas.openxmlformats.org/officeDocument/2006/math" xmlns:a14="http://schemas.microsoft.com/office/drawing/2010/main" xmlns:ma14="http://schemas.microsoft.com/office/mac/drawingml/2011/main" val="1"/>
+              <ma14:wrappingTextBoxFlag xmlns:ma14="http://schemas.microsoft.com/office/mac/drawingml/2011/main" xmlns:a14="http://schemas.microsoft.com/office/drawing/2010/main" xmlns:m="http://schemas.openxmlformats.org/officeDocument/2006/math" xmlns="" val="1"/>
             </a:ext>
           </a:extLst>
         </p:spPr>
@@ -3371,7 +3371,7 @@
           </a:ln>
           <a:extLst>
             <a:ext uri="{C572A759-6A51-4108-AA02-DFA0A04FC94B}">
-              <ma14:wrappingTextBoxFlag xmlns="" xmlns:m="http://schemas.openxmlformats.org/officeDocument/2006/math" xmlns:a14="http://schemas.microsoft.com/office/drawing/2010/main" xmlns:ma14="http://schemas.microsoft.com/office/mac/drawingml/2011/main" val="1"/>
+              <ma14:wrappingTextBoxFlag xmlns:ma14="http://schemas.microsoft.com/office/mac/drawingml/2011/main" xmlns:a14="http://schemas.microsoft.com/office/drawing/2010/main" xmlns:m="http://schemas.openxmlformats.org/officeDocument/2006/math" xmlns="" val="1"/>
             </a:ext>
           </a:extLst>
         </p:spPr>
@@ -3424,7 +3424,7 @@
           </a:ln>
           <a:extLst>
             <a:ext uri="{C572A759-6A51-4108-AA02-DFA0A04FC94B}">
-              <ma14:wrappingTextBoxFlag xmlns="" xmlns:m="http://schemas.openxmlformats.org/officeDocument/2006/math" xmlns:a14="http://schemas.microsoft.com/office/drawing/2010/main" xmlns:ma14="http://schemas.microsoft.com/office/mac/drawingml/2011/main" val="1"/>
+              <ma14:wrappingTextBoxFlag xmlns:ma14="http://schemas.microsoft.com/office/mac/drawingml/2011/main" xmlns:a14="http://schemas.microsoft.com/office/drawing/2010/main" xmlns:m="http://schemas.openxmlformats.org/officeDocument/2006/math" xmlns="" val="1"/>
             </a:ext>
           </a:extLst>
         </p:spPr>
@@ -3534,7 +3534,7 @@
           </a:ln>
           <a:extLst>
             <a:ext uri="{C572A759-6A51-4108-AA02-DFA0A04FC94B}">
-              <ma14:wrappingTextBoxFlag xmlns="" xmlns:m="http://schemas.openxmlformats.org/officeDocument/2006/math" xmlns:a14="http://schemas.microsoft.com/office/drawing/2010/main" xmlns:ma14="http://schemas.microsoft.com/office/mac/drawingml/2011/main" val="1"/>
+              <ma14:wrappingTextBoxFlag xmlns:ma14="http://schemas.microsoft.com/office/mac/drawingml/2011/main" xmlns:a14="http://schemas.microsoft.com/office/drawing/2010/main" xmlns:m="http://schemas.openxmlformats.org/officeDocument/2006/math" xmlns="" val="1"/>
             </a:ext>
           </a:extLst>
         </p:spPr>
@@ -4115,7 +4115,7 @@
           </a:ln>
           <a:extLst>
             <a:ext uri="{C572A759-6A51-4108-AA02-DFA0A04FC94B}">
-              <ma14:wrappingTextBoxFlag xmlns="" xmlns:m="http://schemas.openxmlformats.org/officeDocument/2006/math" xmlns:a14="http://schemas.microsoft.com/office/drawing/2010/main" xmlns:ma14="http://schemas.microsoft.com/office/mac/drawingml/2011/main" val="1"/>
+              <ma14:wrappingTextBoxFlag xmlns:ma14="http://schemas.microsoft.com/office/mac/drawingml/2011/main" xmlns:a14="http://schemas.microsoft.com/office/drawing/2010/main" xmlns:m="http://schemas.openxmlformats.org/officeDocument/2006/math" xmlns="" val="1"/>
             </a:ext>
           </a:extLst>
         </p:spPr>
@@ -4284,7 +4284,7 @@
           <a:effectLst/>
           <a:extLst>
             <a:ext uri="{C572A759-6A51-4108-AA02-DFA0A04FC94B}">
-              <ma14:wrappingTextBoxFlag xmlns="" xmlns:m="http://schemas.openxmlformats.org/officeDocument/2006/math" xmlns:a14="http://schemas.microsoft.com/office/drawing/2010/main" xmlns:ma14="http://schemas.microsoft.com/office/mac/drawingml/2011/main" val="1"/>
+              <ma14:wrappingTextBoxFlag xmlns:ma14="http://schemas.microsoft.com/office/mac/drawingml/2011/main" xmlns:a14="http://schemas.microsoft.com/office/drawing/2010/main" xmlns:m="http://schemas.openxmlformats.org/officeDocument/2006/math" xmlns="" val="1"/>
             </a:ext>
           </a:extLst>
         </p:spPr>
@@ -4482,7 +4482,7 @@
                 <a:latin typeface="Courier New" panose="02070309020205020404" pitchFamily="49" charset="0"/>
                 <a:cs typeface="Courier New" panose="02070309020205020404" pitchFamily="49" charset="0"/>
               </a:rPr>
-              <a:t>")</a:t>
+              <a:t>“, ...)</a:t>
             </a:r>
             <a:endParaRPr sz="1000" dirty="0">
               <a:solidFill>
@@ -4515,7 +4515,7 @@
           </a:ln>
           <a:extLst>
             <a:ext uri="{C572A759-6A51-4108-AA02-DFA0A04FC94B}">
-              <ma14:wrappingTextBoxFlag xmlns="" xmlns:m="http://schemas.openxmlformats.org/officeDocument/2006/math" xmlns:a14="http://schemas.microsoft.com/office/drawing/2010/main" xmlns:ma14="http://schemas.microsoft.com/office/mac/drawingml/2011/main" val="1"/>
+              <ma14:wrappingTextBoxFlag xmlns:ma14="http://schemas.microsoft.com/office/mac/drawingml/2011/main" xmlns:a14="http://schemas.microsoft.com/office/drawing/2010/main" xmlns:m="http://schemas.openxmlformats.org/officeDocument/2006/math" xmlns="" val="1"/>
             </a:ext>
           </a:extLst>
         </p:spPr>
@@ -4692,7 +4692,7 @@
           <a:effectLst/>
           <a:extLst>
             <a:ext uri="{C572A759-6A51-4108-AA02-DFA0A04FC94B}">
-              <ma14:wrappingTextBoxFlag xmlns:lc="http://schemas.openxmlformats.org/drawingml/2006/lockedCanvas" xmlns:ma14="http://schemas.microsoft.com/office/mac/drawingml/2011/main" xmlns:a14="http://schemas.microsoft.com/office/drawing/2010/main" xmlns:m="http://schemas.openxmlformats.org/officeDocument/2006/math" xmlns="" val="1"/>
+              <ma14:wrappingTextBoxFlag xmlns="" xmlns:m="http://schemas.openxmlformats.org/officeDocument/2006/math" xmlns:a14="http://schemas.microsoft.com/office/drawing/2010/main" xmlns:ma14="http://schemas.microsoft.com/office/mac/drawingml/2011/main" xmlns:lc="http://schemas.openxmlformats.org/drawingml/2006/lockedCanvas" val="1"/>
             </a:ext>
           </a:extLst>
         </p:spPr>
@@ -5186,7 +5186,7 @@
           </a:ln>
           <a:extLst>
             <a:ext uri="{C572A759-6A51-4108-AA02-DFA0A04FC94B}">
-              <ma14:wrappingTextBoxFlag xmlns="" xmlns:m="http://schemas.openxmlformats.org/officeDocument/2006/math" xmlns:a14="http://schemas.microsoft.com/office/drawing/2010/main" xmlns:ma14="http://schemas.microsoft.com/office/mac/drawingml/2011/main" val="1"/>
+              <ma14:wrappingTextBoxFlag xmlns:ma14="http://schemas.microsoft.com/office/mac/drawingml/2011/main" xmlns:a14="http://schemas.microsoft.com/office/drawing/2010/main" xmlns:m="http://schemas.openxmlformats.org/officeDocument/2006/math" xmlns="" val="1"/>
             </a:ext>
           </a:extLst>
         </p:spPr>
@@ -5420,7 +5420,7 @@
           </a:ln>
           <a:extLst>
             <a:ext uri="{C572A759-6A51-4108-AA02-DFA0A04FC94B}">
-              <ma14:wrappingTextBoxFlag xmlns="" xmlns:m="http://schemas.openxmlformats.org/officeDocument/2006/math" xmlns:a14="http://schemas.microsoft.com/office/drawing/2010/main" xmlns:ma14="http://schemas.microsoft.com/office/mac/drawingml/2011/main" val="1"/>
+              <ma14:wrappingTextBoxFlag xmlns:ma14="http://schemas.microsoft.com/office/mac/drawingml/2011/main" xmlns:a14="http://schemas.microsoft.com/office/drawing/2010/main" xmlns:m="http://schemas.openxmlformats.org/officeDocument/2006/math" xmlns="" val="1"/>
             </a:ext>
           </a:extLst>
         </p:spPr>
@@ -5551,7 +5551,7 @@
           <a:effectLst/>
           <a:extLst>
             <a:ext uri="{C572A759-6A51-4108-AA02-DFA0A04FC94B}">
-              <ma14:wrappingTextBoxFlag xmlns:lc="http://schemas.openxmlformats.org/drawingml/2006/lockedCanvas" xmlns:ma14="http://schemas.microsoft.com/office/mac/drawingml/2011/main" xmlns:a14="http://schemas.microsoft.com/office/drawing/2010/main" xmlns:m="http://schemas.openxmlformats.org/officeDocument/2006/math" xmlns="" val="1"/>
+              <ma14:wrappingTextBoxFlag xmlns="" xmlns:m="http://schemas.openxmlformats.org/officeDocument/2006/math" xmlns:a14="http://schemas.microsoft.com/office/drawing/2010/main" xmlns:ma14="http://schemas.microsoft.com/office/mac/drawingml/2011/main" xmlns:lc="http://schemas.openxmlformats.org/drawingml/2006/lockedCanvas" val="1"/>
             </a:ext>
           </a:extLst>
         </p:spPr>
@@ -6019,7 +6019,7 @@
           </a:ln>
           <a:extLst>
             <a:ext uri="{C572A759-6A51-4108-AA02-DFA0A04FC94B}">
-              <ma14:wrappingTextBoxFlag xmlns="" xmlns:m="http://schemas.openxmlformats.org/officeDocument/2006/math" xmlns:a14="http://schemas.microsoft.com/office/drawing/2010/main" xmlns:ma14="http://schemas.microsoft.com/office/mac/drawingml/2011/main" val="1"/>
+              <ma14:wrappingTextBoxFlag xmlns:ma14="http://schemas.microsoft.com/office/mac/drawingml/2011/main" xmlns:a14="http://schemas.microsoft.com/office/drawing/2010/main" xmlns:m="http://schemas.openxmlformats.org/officeDocument/2006/math" xmlns="" val="1"/>
             </a:ext>
           </a:extLst>
         </p:spPr>
@@ -6133,7 +6133,7 @@
           </a:ln>
           <a:extLst>
             <a:ext uri="{C572A759-6A51-4108-AA02-DFA0A04FC94B}">
-              <ma14:wrappingTextBoxFlag xmlns="" xmlns:m="http://schemas.openxmlformats.org/officeDocument/2006/math" xmlns:a14="http://schemas.microsoft.com/office/drawing/2010/main" xmlns:ma14="http://schemas.microsoft.com/office/mac/drawingml/2011/main" val="1"/>
+              <ma14:wrappingTextBoxFlag xmlns:ma14="http://schemas.microsoft.com/office/mac/drawingml/2011/main" xmlns:a14="http://schemas.microsoft.com/office/drawing/2010/main" xmlns:m="http://schemas.openxmlformats.org/officeDocument/2006/math" xmlns="" val="1"/>
             </a:ext>
           </a:extLst>
         </p:spPr>
@@ -6284,7 +6284,7 @@
           <a:effectLst/>
           <a:extLst>
             <a:ext uri="{C572A759-6A51-4108-AA02-DFA0A04FC94B}">
-              <ma14:wrappingTextBoxFlag xmlns:lc="http://schemas.openxmlformats.org/drawingml/2006/lockedCanvas" xmlns:ma14="http://schemas.microsoft.com/office/mac/drawingml/2011/main" xmlns:a14="http://schemas.microsoft.com/office/drawing/2010/main" xmlns:m="http://schemas.openxmlformats.org/officeDocument/2006/math" xmlns="" val="1"/>
+              <ma14:wrappingTextBoxFlag xmlns="" xmlns:m="http://schemas.openxmlformats.org/officeDocument/2006/math" xmlns:a14="http://schemas.microsoft.com/office/drawing/2010/main" xmlns:ma14="http://schemas.microsoft.com/office/mac/drawingml/2011/main" xmlns:lc="http://schemas.openxmlformats.org/drawingml/2006/lockedCanvas" val="1"/>
             </a:ext>
           </a:extLst>
         </p:spPr>
@@ -6778,7 +6778,7 @@
           </a:ln>
           <a:extLst>
             <a:ext uri="{C572A759-6A51-4108-AA02-DFA0A04FC94B}">
-              <ma14:wrappingTextBoxFlag xmlns="" xmlns:m="http://schemas.openxmlformats.org/officeDocument/2006/math" xmlns:a14="http://schemas.microsoft.com/office/drawing/2010/main" xmlns:ma14="http://schemas.microsoft.com/office/mac/drawingml/2011/main" val="1"/>
+              <ma14:wrappingTextBoxFlag xmlns:ma14="http://schemas.microsoft.com/office/mac/drawingml/2011/main" xmlns:a14="http://schemas.microsoft.com/office/drawing/2010/main" xmlns:m="http://schemas.openxmlformats.org/officeDocument/2006/math" xmlns="" val="1"/>
             </a:ext>
           </a:extLst>
         </p:spPr>
@@ -7080,7 +7080,7 @@
           </a:ln>
           <a:extLst>
             <a:ext uri="{C572A759-6A51-4108-AA02-DFA0A04FC94B}">
-              <ma14:wrappingTextBoxFlag xmlns="" xmlns:m="http://schemas.openxmlformats.org/officeDocument/2006/math" xmlns:a14="http://schemas.microsoft.com/office/drawing/2010/main" xmlns:ma14="http://schemas.microsoft.com/office/mac/drawingml/2011/main" val="1"/>
+              <ma14:wrappingTextBoxFlag xmlns:ma14="http://schemas.microsoft.com/office/mac/drawingml/2011/main" xmlns:a14="http://schemas.microsoft.com/office/drawing/2010/main" xmlns:m="http://schemas.openxmlformats.org/officeDocument/2006/math" xmlns="" val="1"/>
             </a:ext>
           </a:extLst>
         </p:spPr>
@@ -7201,7 +7201,7 @@
           <a:effectLst/>
           <a:extLst>
             <a:ext uri="{C572A759-6A51-4108-AA02-DFA0A04FC94B}">
-              <ma14:wrappingTextBoxFlag xmlns:lc="http://schemas.openxmlformats.org/drawingml/2006/lockedCanvas" xmlns:ma14="http://schemas.microsoft.com/office/mac/drawingml/2011/main" xmlns:a14="http://schemas.microsoft.com/office/drawing/2010/main" xmlns:m="http://schemas.openxmlformats.org/officeDocument/2006/math" xmlns="" val="1"/>
+              <ma14:wrappingTextBoxFlag xmlns="" xmlns:m="http://schemas.openxmlformats.org/officeDocument/2006/math" xmlns:a14="http://schemas.microsoft.com/office/drawing/2010/main" xmlns:ma14="http://schemas.microsoft.com/office/mac/drawingml/2011/main" xmlns:lc="http://schemas.openxmlformats.org/drawingml/2006/lockedCanvas" val="1"/>
             </a:ext>
           </a:extLst>
         </p:spPr>
@@ -7695,7 +7695,7 @@
           </a:ln>
           <a:extLst>
             <a:ext uri="{C572A759-6A51-4108-AA02-DFA0A04FC94B}">
-              <ma14:wrappingTextBoxFlag xmlns="" xmlns:m="http://schemas.openxmlformats.org/officeDocument/2006/math" xmlns:a14="http://schemas.microsoft.com/office/drawing/2010/main" xmlns:ma14="http://schemas.microsoft.com/office/mac/drawingml/2011/main" val="1"/>
+              <ma14:wrappingTextBoxFlag xmlns:ma14="http://schemas.microsoft.com/office/mac/drawingml/2011/main" xmlns:a14="http://schemas.microsoft.com/office/drawing/2010/main" xmlns:m="http://schemas.openxmlformats.org/officeDocument/2006/math" xmlns="" val="1"/>
             </a:ext>
           </a:extLst>
         </p:spPr>
@@ -7789,7 +7789,7 @@
           </a:ln>
           <a:extLst>
             <a:ext uri="{C572A759-6A51-4108-AA02-DFA0A04FC94B}">
-              <ma14:wrappingTextBoxFlag xmlns="" xmlns:m="http://schemas.openxmlformats.org/officeDocument/2006/math" xmlns:a14="http://schemas.microsoft.com/office/drawing/2010/main" xmlns:ma14="http://schemas.microsoft.com/office/mac/drawingml/2011/main" val="1"/>
+              <ma14:wrappingTextBoxFlag xmlns:ma14="http://schemas.microsoft.com/office/mac/drawingml/2011/main" xmlns:a14="http://schemas.microsoft.com/office/drawing/2010/main" xmlns:m="http://schemas.openxmlformats.org/officeDocument/2006/math" xmlns="" val="1"/>
             </a:ext>
           </a:extLst>
         </p:spPr>
@@ -7900,7 +7900,7 @@
           <a:effectLst/>
           <a:extLst>
             <a:ext uri="{C572A759-6A51-4108-AA02-DFA0A04FC94B}">
-              <ma14:wrappingTextBoxFlag xmlns:lc="http://schemas.openxmlformats.org/drawingml/2006/lockedCanvas" xmlns:ma14="http://schemas.microsoft.com/office/mac/drawingml/2011/main" xmlns:a14="http://schemas.microsoft.com/office/drawing/2010/main" xmlns:m="http://schemas.openxmlformats.org/officeDocument/2006/math" xmlns="" val="1"/>
+              <ma14:wrappingTextBoxFlag xmlns="" xmlns:m="http://schemas.openxmlformats.org/officeDocument/2006/math" xmlns:a14="http://schemas.microsoft.com/office/drawing/2010/main" xmlns:ma14="http://schemas.microsoft.com/office/mac/drawingml/2011/main" xmlns:lc="http://schemas.openxmlformats.org/drawingml/2006/lockedCanvas" val="1"/>
             </a:ext>
           </a:extLst>
         </p:spPr>
@@ -8282,7 +8282,7 @@
           <a:effectLst/>
           <a:extLst>
             <a:ext uri="{C572A759-6A51-4108-AA02-DFA0A04FC94B}">
-              <ma14:wrappingTextBoxFlag xmlns="" xmlns:m="http://schemas.openxmlformats.org/officeDocument/2006/math" xmlns:a14="http://schemas.microsoft.com/office/drawing/2010/main" xmlns:ma14="http://schemas.microsoft.com/office/mac/drawingml/2011/main" val="1"/>
+              <ma14:wrappingTextBoxFlag xmlns:ma14="http://schemas.microsoft.com/office/mac/drawingml/2011/main" xmlns:a14="http://schemas.microsoft.com/office/drawing/2010/main" xmlns:m="http://schemas.openxmlformats.org/officeDocument/2006/math" xmlns="" val="1"/>
             </a:ext>
           </a:extLst>
         </p:spPr>
@@ -8496,7 +8496,7 @@
                 <a:latin typeface="Courier New" panose="02070309020205020404" pitchFamily="49" charset="0"/>
                 <a:cs typeface="Courier New" panose="02070309020205020404" pitchFamily="49" charset="0"/>
               </a:rPr>
-              <a:t>         prior = FALSE)</a:t>
+              <a:t>         prior = FALSE, ...)</a:t>
             </a:r>
             <a:endParaRPr sz="1000" dirty="0">
               <a:solidFill>
@@ -8545,7 +8545,7 @@
           <a:effectLst/>
           <a:extLst>
             <a:ext uri="{C572A759-6A51-4108-AA02-DFA0A04FC94B}">
-              <ma14:wrappingTextBoxFlag xmlns="" xmlns:m="http://schemas.openxmlformats.org/officeDocument/2006/math" xmlns:a14="http://schemas.microsoft.com/office/drawing/2010/main" xmlns:ma14="http://schemas.microsoft.com/office/mac/drawingml/2011/main" val="1"/>
+              <ma14:wrappingTextBoxFlag xmlns:ma14="http://schemas.microsoft.com/office/mac/drawingml/2011/main" xmlns:a14="http://schemas.microsoft.com/office/drawing/2010/main" xmlns:m="http://schemas.openxmlformats.org/officeDocument/2006/math" xmlns="" val="1"/>
             </a:ext>
           </a:extLst>
         </p:spPr>
@@ -8771,7 +8771,7 @@
                 <a:latin typeface="Courier New" panose="02070309020205020404" pitchFamily="49" charset="0"/>
                 <a:cs typeface="Courier New" panose="02070309020205020404" pitchFamily="49" charset="0"/>
               </a:rPr>
-              <a:t> = "interval") </a:t>
+              <a:t> = "interval“, ...) </a:t>
             </a:r>
           </a:p>
         </p:txBody>
@@ -8811,7 +8811,7 @@
           <a:effectLst/>
           <a:extLst>
             <a:ext uri="{C572A759-6A51-4108-AA02-DFA0A04FC94B}">
-              <ma14:wrappingTextBoxFlag xmlns="" xmlns:m="http://schemas.openxmlformats.org/officeDocument/2006/math" xmlns:a14="http://schemas.microsoft.com/office/drawing/2010/main" xmlns:ma14="http://schemas.microsoft.com/office/mac/drawingml/2011/main" val="1"/>
+              <ma14:wrappingTextBoxFlag xmlns:ma14="http://schemas.microsoft.com/office/mac/drawingml/2011/main" xmlns:a14="http://schemas.microsoft.com/office/drawing/2010/main" xmlns:m="http://schemas.openxmlformats.org/officeDocument/2006/math" xmlns="" val="1"/>
             </a:ext>
           </a:extLst>
         </p:spPr>
@@ -9161,7 +9161,7 @@
                 <a:latin typeface="Courier New" panose="02070309020205020404" pitchFamily="49" charset="0"/>
                 <a:cs typeface="Courier New" panose="02070309020205020404" pitchFamily="49" charset="0"/>
               </a:rPr>
-              <a:t> = 0.05)</a:t>
+              <a:t> = 0.05, ...)</a:t>
             </a:r>
             <a:endParaRPr sz="1000" dirty="0">
               <a:solidFill>
@@ -9210,7 +9210,7 @@
           <a:effectLst/>
           <a:extLst>
             <a:ext uri="{C572A759-6A51-4108-AA02-DFA0A04FC94B}">
-              <ma14:wrappingTextBoxFlag xmlns="" xmlns:m="http://schemas.openxmlformats.org/officeDocument/2006/math" xmlns:a14="http://schemas.microsoft.com/office/drawing/2010/main" xmlns:ma14="http://schemas.microsoft.com/office/mac/drawingml/2011/main" val="1"/>
+              <ma14:wrappingTextBoxFlag xmlns:ma14="http://schemas.microsoft.com/office/mac/drawingml/2011/main" xmlns:a14="http://schemas.microsoft.com/office/drawing/2010/main" xmlns:m="http://schemas.openxmlformats.org/officeDocument/2006/math" xmlns="" val="1"/>
             </a:ext>
           </a:extLst>
         </p:spPr>
@@ -9296,7 +9296,7 @@
                 <a:latin typeface="Courier New" panose="02070309020205020404" pitchFamily="49" charset="0"/>
                 <a:cs typeface="Courier New" panose="02070309020205020404" pitchFamily="49" charset="0"/>
               </a:rPr>
-              <a:t>       file = "report.html")</a:t>
+              <a:t>       file = "report.html“, ...)</a:t>
             </a:r>
             <a:endParaRPr sz="1000" dirty="0">
               <a:solidFill>
@@ -9677,7 +9677,7 @@
           </a:ln>
           <a:extLst>
             <a:ext uri="{C572A759-6A51-4108-AA02-DFA0A04FC94B}">
-              <ma14:wrappingTextBoxFlag xmlns="" xmlns:m="http://schemas.openxmlformats.org/officeDocument/2006/math" xmlns:a14="http://schemas.microsoft.com/office/drawing/2010/main" xmlns:ma14="http://schemas.microsoft.com/office/mac/drawingml/2011/main" val="1"/>
+              <ma14:wrappingTextBoxFlag xmlns:ma14="http://schemas.microsoft.com/office/mac/drawingml/2011/main" xmlns:a14="http://schemas.microsoft.com/office/drawing/2010/main" xmlns:m="http://schemas.openxmlformats.org/officeDocument/2006/math" xmlns="" val="1"/>
             </a:ext>
           </a:extLst>
         </p:spPr>
@@ -9741,7 +9741,7 @@
           </a:ln>
           <a:extLst>
             <a:ext uri="{C572A759-6A51-4108-AA02-DFA0A04FC94B}">
-              <ma14:wrappingTextBoxFlag xmlns="" xmlns:m="http://schemas.openxmlformats.org/officeDocument/2006/math" xmlns:a14="http://schemas.microsoft.com/office/drawing/2010/main" xmlns:ma14="http://schemas.microsoft.com/office/mac/drawingml/2011/main" val="1"/>
+              <ma14:wrappingTextBoxFlag xmlns:ma14="http://schemas.microsoft.com/office/mac/drawingml/2011/main" xmlns:a14="http://schemas.microsoft.com/office/drawing/2010/main" xmlns:m="http://schemas.openxmlformats.org/officeDocument/2006/math" xmlns="" val="1"/>
             </a:ext>
           </a:extLst>
         </p:spPr>
@@ -10165,7 +10165,7 @@
           </a:ln>
           <a:extLst>
             <a:ext uri="{C572A759-6A51-4108-AA02-DFA0A04FC94B}">
-              <ma14:wrappingTextBoxFlag xmlns="" xmlns:m="http://schemas.openxmlformats.org/officeDocument/2006/math" xmlns:a14="http://schemas.microsoft.com/office/drawing/2010/main" xmlns:ma14="http://schemas.microsoft.com/office/mac/drawingml/2011/main" val="1"/>
+              <ma14:wrappingTextBoxFlag xmlns:ma14="http://schemas.microsoft.com/office/mac/drawingml/2011/main" xmlns:a14="http://schemas.microsoft.com/office/drawing/2010/main" xmlns:m="http://schemas.openxmlformats.org/officeDocument/2006/math" xmlns="" val="1"/>
             </a:ext>
           </a:extLst>
         </p:spPr>
@@ -10229,7 +10229,7 @@
           </a:ln>
           <a:extLst>
             <a:ext uri="{C572A759-6A51-4108-AA02-DFA0A04FC94B}">
-              <ma14:wrappingTextBoxFlag xmlns="" xmlns:m="http://schemas.openxmlformats.org/officeDocument/2006/math" xmlns:a14="http://schemas.microsoft.com/office/drawing/2010/main" xmlns:ma14="http://schemas.microsoft.com/office/mac/drawingml/2011/main" val="1"/>
+              <ma14:wrappingTextBoxFlag xmlns:ma14="http://schemas.microsoft.com/office/mac/drawingml/2011/main" xmlns:a14="http://schemas.microsoft.com/office/drawing/2010/main" xmlns:m="http://schemas.openxmlformats.org/officeDocument/2006/math" xmlns="" val="1"/>
             </a:ext>
           </a:extLst>
         </p:spPr>

</xml_diff>

<commit_message>
Built site for jfa: 0.5.2@df46c1c
</commit_message>
<xml_diff>
--- a/reference/figures/cheatsheet/cheatsheet.pptx
+++ b/reference/figures/cheatsheet/cheatsheet.pptx
@@ -321,6 +321,30 @@
 <file path=ppt/changesInfos/changesInfo1.xml><?xml version="1.0" encoding="utf-8"?>
 <pc:chgInfo xmlns:a="http://schemas.openxmlformats.org/drawingml/2006/main" xmlns:r="http://schemas.openxmlformats.org/officeDocument/2006/relationships" xmlns:ac="http://schemas.microsoft.com/office/drawing/2013/main/command" xmlns:pc="http://schemas.microsoft.com/office/powerpoint/2013/main/command">
   <pc:docChgLst>
+    <pc:chgData name="Derks, Koen" userId="42903d96-be75-4cec-9136-f3710e86cd30" providerId="ADAL" clId="{31252840-B54D-42F9-AADB-EFDB9C1D7E85}"/>
+    <pc:docChg chg="modSld">
+      <pc:chgData name="Derks, Koen" userId="42903d96-be75-4cec-9136-f3710e86cd30" providerId="ADAL" clId="{31252840-B54D-42F9-AADB-EFDB9C1D7E85}" dt="2021-03-22T08:43:18.965" v="16" actId="20577"/>
+      <pc:docMkLst>
+        <pc:docMk/>
+      </pc:docMkLst>
+      <pc:sldChg chg="modSp mod">
+        <pc:chgData name="Derks, Koen" userId="42903d96-be75-4cec-9136-f3710e86cd30" providerId="ADAL" clId="{31252840-B54D-42F9-AADB-EFDB9C1D7E85}" dt="2021-03-22T08:43:18.965" v="16" actId="20577"/>
+        <pc:sldMkLst>
+          <pc:docMk/>
+          <pc:sldMk cId="0" sldId="257"/>
+        </pc:sldMkLst>
+        <pc:spChg chg="mod">
+          <ac:chgData name="Derks, Koen" userId="42903d96-be75-4cec-9136-f3710e86cd30" providerId="ADAL" clId="{31252840-B54D-42F9-AADB-EFDB9C1D7E85}" dt="2021-03-22T08:43:18.965" v="16" actId="20577"/>
+          <ac:spMkLst>
+            <pc:docMk/>
+            <pc:sldMk cId="0" sldId="257"/>
+            <ac:spMk id="322" creationId="{00000000-0000-0000-0000-000000000000}"/>
+          </ac:spMkLst>
+        </pc:spChg>
+      </pc:sldChg>
+    </pc:docChg>
+  </pc:docChgLst>
+  <pc:docChgLst>
     <pc:chgData name="Derks, Koen" userId="42903d96-be75-4cec-9136-f3710e86cd30" providerId="ADAL" clId="{76736121-1439-4CC5-B71A-43EA3D14E7B7}"/>
     <pc:docChg chg="delSld modSld">
       <pc:chgData name="Derks, Koen" userId="42903d96-be75-4cec-9136-f3710e86cd30" providerId="ADAL" clId="{76736121-1439-4CC5-B71A-43EA3D14E7B7}" dt="2020-11-28T22:53:19.244" v="23" actId="20577"/>
@@ -2239,7 +2263,7 @@
           </a:ln>
           <a:extLst>
             <a:ext uri="{C572A759-6A51-4108-AA02-DFA0A04FC94B}">
-              <ma14:wrappingTextBoxFlag xmlns:ma14="http://schemas.microsoft.com/office/mac/drawingml/2011/main" xmlns:a14="http://schemas.microsoft.com/office/drawing/2010/main" xmlns:m="http://schemas.openxmlformats.org/officeDocument/2006/math" xmlns="" val="1"/>
+              <ma14:wrappingTextBoxFlag xmlns="" xmlns:m="http://schemas.openxmlformats.org/officeDocument/2006/math" xmlns:a14="http://schemas.microsoft.com/office/drawing/2010/main" xmlns:ma14="http://schemas.microsoft.com/office/mac/drawingml/2011/main" val="1"/>
             </a:ext>
           </a:extLst>
         </p:spPr>
@@ -2278,7 +2302,7 @@
           </a:ln>
           <a:extLst>
             <a:ext uri="{C572A759-6A51-4108-AA02-DFA0A04FC94B}">
-              <ma14:wrappingTextBoxFlag xmlns:ma14="http://schemas.microsoft.com/office/mac/drawingml/2011/main" xmlns:a14="http://schemas.microsoft.com/office/drawing/2010/main" xmlns:m="http://schemas.openxmlformats.org/officeDocument/2006/math" xmlns="" val="1"/>
+              <ma14:wrappingTextBoxFlag xmlns="" xmlns:m="http://schemas.openxmlformats.org/officeDocument/2006/math" xmlns:a14="http://schemas.microsoft.com/office/drawing/2010/main" xmlns:ma14="http://schemas.microsoft.com/office/mac/drawingml/2011/main" val="1"/>
             </a:ext>
           </a:extLst>
         </p:spPr>
@@ -3371,7 +3395,7 @@
           </a:ln>
           <a:extLst>
             <a:ext uri="{C572A759-6A51-4108-AA02-DFA0A04FC94B}">
-              <ma14:wrappingTextBoxFlag xmlns:ma14="http://schemas.microsoft.com/office/mac/drawingml/2011/main" xmlns:a14="http://schemas.microsoft.com/office/drawing/2010/main" xmlns:m="http://schemas.openxmlformats.org/officeDocument/2006/math" xmlns="" val="1"/>
+              <ma14:wrappingTextBoxFlag xmlns="" xmlns:m="http://schemas.openxmlformats.org/officeDocument/2006/math" xmlns:a14="http://schemas.microsoft.com/office/drawing/2010/main" xmlns:ma14="http://schemas.microsoft.com/office/mac/drawingml/2011/main" val="1"/>
             </a:ext>
           </a:extLst>
         </p:spPr>
@@ -3424,7 +3448,7 @@
           </a:ln>
           <a:extLst>
             <a:ext uri="{C572A759-6A51-4108-AA02-DFA0A04FC94B}">
-              <ma14:wrappingTextBoxFlag xmlns:ma14="http://schemas.microsoft.com/office/mac/drawingml/2011/main" xmlns:a14="http://schemas.microsoft.com/office/drawing/2010/main" xmlns:m="http://schemas.openxmlformats.org/officeDocument/2006/math" xmlns="" val="1"/>
+              <ma14:wrappingTextBoxFlag xmlns="" xmlns:m="http://schemas.openxmlformats.org/officeDocument/2006/math" xmlns:a14="http://schemas.microsoft.com/office/drawing/2010/main" xmlns:ma14="http://schemas.microsoft.com/office/mac/drawingml/2011/main" val="1"/>
             </a:ext>
           </a:extLst>
         </p:spPr>
@@ -3489,19 +3513,55 @@
             </a:r>
             <a:r>
               <a:rPr dirty="0"/>
-              <a:t>•  Learn more at </a:t>
+              <a:t>•  Learn more at</a:t>
+            </a:r>
+            <a:r>
+              <a:rPr lang="nl-NL" dirty="0"/>
+              <a:t> </a:t>
+            </a:r>
+            <a:r>
+              <a:rPr lang="nl-NL" dirty="0" err="1"/>
+              <a:t>the</a:t>
+            </a:r>
+            <a:r>
+              <a:rPr dirty="0"/>
+              <a:t> </a:t>
             </a:r>
             <a:r>
               <a:rPr b="1" dirty="0"/>
               <a:t>webpage or vignette</a:t>
             </a:r>
             <a:r>
+              <a:rPr lang="nl-NL" b="1" dirty="0"/>
+              <a:t>s</a:t>
+            </a:r>
+            <a:r>
               <a:rPr dirty="0"/>
-              <a:t>   •  package version  0.5.0 •  Updated: 20</a:t>
+              <a:t>   •  </a:t>
             </a:r>
             <a:r>
               <a:rPr lang="nl-NL" dirty="0"/>
-              <a:t>20</a:t>
+              <a:t>P</a:t>
+            </a:r>
+            <a:r>
+              <a:rPr dirty="0" err="1"/>
+              <a:t>ackage</a:t>
+            </a:r>
+            <a:r>
+              <a:rPr dirty="0"/>
+              <a:t> version  0.5.</a:t>
+            </a:r>
+            <a:r>
+              <a:rPr lang="nl-NL" dirty="0"/>
+              <a:t>2</a:t>
+            </a:r>
+            <a:r>
+              <a:rPr dirty="0"/>
+              <a:t> •  Updated: 20</a:t>
+            </a:r>
+            <a:r>
+              <a:rPr lang="nl-NL" dirty="0"/>
+              <a:t>21</a:t>
             </a:r>
             <a:r>
               <a:rPr dirty="0"/>
@@ -3509,7 +3569,7 @@
             </a:r>
             <a:r>
               <a:rPr lang="nl-NL" dirty="0"/>
-              <a:t>12</a:t>
+              <a:t>04</a:t>
             </a:r>
             <a:endParaRPr dirty="0"/>
           </a:p>
@@ -3534,7 +3594,7 @@
           </a:ln>
           <a:extLst>
             <a:ext uri="{C572A759-6A51-4108-AA02-DFA0A04FC94B}">
-              <ma14:wrappingTextBoxFlag xmlns:ma14="http://schemas.microsoft.com/office/mac/drawingml/2011/main" xmlns:a14="http://schemas.microsoft.com/office/drawing/2010/main" xmlns:m="http://schemas.openxmlformats.org/officeDocument/2006/math" xmlns="" val="1"/>
+              <ma14:wrappingTextBoxFlag xmlns="" xmlns:m="http://schemas.openxmlformats.org/officeDocument/2006/math" xmlns:a14="http://schemas.microsoft.com/office/drawing/2010/main" xmlns:ma14="http://schemas.microsoft.com/office/mac/drawingml/2011/main" val="1"/>
             </a:ext>
           </a:extLst>
         </p:spPr>
@@ -4115,7 +4175,7 @@
           </a:ln>
           <a:extLst>
             <a:ext uri="{C572A759-6A51-4108-AA02-DFA0A04FC94B}">
-              <ma14:wrappingTextBoxFlag xmlns:ma14="http://schemas.microsoft.com/office/mac/drawingml/2011/main" xmlns:a14="http://schemas.microsoft.com/office/drawing/2010/main" xmlns:m="http://schemas.openxmlformats.org/officeDocument/2006/math" xmlns="" val="1"/>
+              <ma14:wrappingTextBoxFlag xmlns="" xmlns:m="http://schemas.openxmlformats.org/officeDocument/2006/math" xmlns:a14="http://schemas.microsoft.com/office/drawing/2010/main" xmlns:ma14="http://schemas.microsoft.com/office/mac/drawingml/2011/main" val="1"/>
             </a:ext>
           </a:extLst>
         </p:spPr>
@@ -4284,7 +4344,7 @@
           <a:effectLst/>
           <a:extLst>
             <a:ext uri="{C572A759-6A51-4108-AA02-DFA0A04FC94B}">
-              <ma14:wrappingTextBoxFlag xmlns:ma14="http://schemas.microsoft.com/office/mac/drawingml/2011/main" xmlns:a14="http://schemas.microsoft.com/office/drawing/2010/main" xmlns:m="http://schemas.openxmlformats.org/officeDocument/2006/math" xmlns="" val="1"/>
+              <ma14:wrappingTextBoxFlag xmlns="" xmlns:m="http://schemas.openxmlformats.org/officeDocument/2006/math" xmlns:a14="http://schemas.microsoft.com/office/drawing/2010/main" xmlns:ma14="http://schemas.microsoft.com/office/mac/drawingml/2011/main" val="1"/>
             </a:ext>
           </a:extLst>
         </p:spPr>
@@ -4515,7 +4575,7 @@
           </a:ln>
           <a:extLst>
             <a:ext uri="{C572A759-6A51-4108-AA02-DFA0A04FC94B}">
-              <ma14:wrappingTextBoxFlag xmlns:ma14="http://schemas.microsoft.com/office/mac/drawingml/2011/main" xmlns:a14="http://schemas.microsoft.com/office/drawing/2010/main" xmlns:m="http://schemas.openxmlformats.org/officeDocument/2006/math" xmlns="" val="1"/>
+              <ma14:wrappingTextBoxFlag xmlns="" xmlns:m="http://schemas.openxmlformats.org/officeDocument/2006/math" xmlns:a14="http://schemas.microsoft.com/office/drawing/2010/main" xmlns:ma14="http://schemas.microsoft.com/office/mac/drawingml/2011/main" val="1"/>
             </a:ext>
           </a:extLst>
         </p:spPr>
@@ -4692,7 +4752,7 @@
           <a:effectLst/>
           <a:extLst>
             <a:ext uri="{C572A759-6A51-4108-AA02-DFA0A04FC94B}">
-              <ma14:wrappingTextBoxFlag xmlns="" xmlns:m="http://schemas.openxmlformats.org/officeDocument/2006/math" xmlns:a14="http://schemas.microsoft.com/office/drawing/2010/main" xmlns:ma14="http://schemas.microsoft.com/office/mac/drawingml/2011/main" xmlns:lc="http://schemas.openxmlformats.org/drawingml/2006/lockedCanvas" val="1"/>
+              <ma14:wrappingTextBoxFlag xmlns:lc="http://schemas.openxmlformats.org/drawingml/2006/lockedCanvas" xmlns:ma14="http://schemas.microsoft.com/office/mac/drawingml/2011/main" xmlns:a14="http://schemas.microsoft.com/office/drawing/2010/main" xmlns:m="http://schemas.openxmlformats.org/officeDocument/2006/math" xmlns="" val="1"/>
             </a:ext>
           </a:extLst>
         </p:spPr>
@@ -5186,7 +5246,7 @@
           </a:ln>
           <a:extLst>
             <a:ext uri="{C572A759-6A51-4108-AA02-DFA0A04FC94B}">
-              <ma14:wrappingTextBoxFlag xmlns:ma14="http://schemas.microsoft.com/office/mac/drawingml/2011/main" xmlns:a14="http://schemas.microsoft.com/office/drawing/2010/main" xmlns:m="http://schemas.openxmlformats.org/officeDocument/2006/math" xmlns="" val="1"/>
+              <ma14:wrappingTextBoxFlag xmlns="" xmlns:m="http://schemas.openxmlformats.org/officeDocument/2006/math" xmlns:a14="http://schemas.microsoft.com/office/drawing/2010/main" xmlns:ma14="http://schemas.microsoft.com/office/mac/drawingml/2011/main" val="1"/>
             </a:ext>
           </a:extLst>
         </p:spPr>
@@ -5420,7 +5480,7 @@
           </a:ln>
           <a:extLst>
             <a:ext uri="{C572A759-6A51-4108-AA02-DFA0A04FC94B}">
-              <ma14:wrappingTextBoxFlag xmlns:ma14="http://schemas.microsoft.com/office/mac/drawingml/2011/main" xmlns:a14="http://schemas.microsoft.com/office/drawing/2010/main" xmlns:m="http://schemas.openxmlformats.org/officeDocument/2006/math" xmlns="" val="1"/>
+              <ma14:wrappingTextBoxFlag xmlns="" xmlns:m="http://schemas.openxmlformats.org/officeDocument/2006/math" xmlns:a14="http://schemas.microsoft.com/office/drawing/2010/main" xmlns:ma14="http://schemas.microsoft.com/office/mac/drawingml/2011/main" val="1"/>
             </a:ext>
           </a:extLst>
         </p:spPr>
@@ -5551,7 +5611,7 @@
           <a:effectLst/>
           <a:extLst>
             <a:ext uri="{C572A759-6A51-4108-AA02-DFA0A04FC94B}">
-              <ma14:wrappingTextBoxFlag xmlns="" xmlns:m="http://schemas.openxmlformats.org/officeDocument/2006/math" xmlns:a14="http://schemas.microsoft.com/office/drawing/2010/main" xmlns:ma14="http://schemas.microsoft.com/office/mac/drawingml/2011/main" xmlns:lc="http://schemas.openxmlformats.org/drawingml/2006/lockedCanvas" val="1"/>
+              <ma14:wrappingTextBoxFlag xmlns:lc="http://schemas.openxmlformats.org/drawingml/2006/lockedCanvas" xmlns:ma14="http://schemas.microsoft.com/office/mac/drawingml/2011/main" xmlns:a14="http://schemas.microsoft.com/office/drawing/2010/main" xmlns:m="http://schemas.openxmlformats.org/officeDocument/2006/math" xmlns="" val="1"/>
             </a:ext>
           </a:extLst>
         </p:spPr>
@@ -6019,7 +6079,7 @@
           </a:ln>
           <a:extLst>
             <a:ext uri="{C572A759-6A51-4108-AA02-DFA0A04FC94B}">
-              <ma14:wrappingTextBoxFlag xmlns:ma14="http://schemas.microsoft.com/office/mac/drawingml/2011/main" xmlns:a14="http://schemas.microsoft.com/office/drawing/2010/main" xmlns:m="http://schemas.openxmlformats.org/officeDocument/2006/math" xmlns="" val="1"/>
+              <ma14:wrappingTextBoxFlag xmlns="" xmlns:m="http://schemas.openxmlformats.org/officeDocument/2006/math" xmlns:a14="http://schemas.microsoft.com/office/drawing/2010/main" xmlns:ma14="http://schemas.microsoft.com/office/mac/drawingml/2011/main" val="1"/>
             </a:ext>
           </a:extLst>
         </p:spPr>
@@ -6133,7 +6193,7 @@
           </a:ln>
           <a:extLst>
             <a:ext uri="{C572A759-6A51-4108-AA02-DFA0A04FC94B}">
-              <ma14:wrappingTextBoxFlag xmlns:ma14="http://schemas.microsoft.com/office/mac/drawingml/2011/main" xmlns:a14="http://schemas.microsoft.com/office/drawing/2010/main" xmlns:m="http://schemas.openxmlformats.org/officeDocument/2006/math" xmlns="" val="1"/>
+              <ma14:wrappingTextBoxFlag xmlns="" xmlns:m="http://schemas.openxmlformats.org/officeDocument/2006/math" xmlns:a14="http://schemas.microsoft.com/office/drawing/2010/main" xmlns:ma14="http://schemas.microsoft.com/office/mac/drawingml/2011/main" val="1"/>
             </a:ext>
           </a:extLst>
         </p:spPr>
@@ -6284,7 +6344,7 @@
           <a:effectLst/>
           <a:extLst>
             <a:ext uri="{C572A759-6A51-4108-AA02-DFA0A04FC94B}">
-              <ma14:wrappingTextBoxFlag xmlns="" xmlns:m="http://schemas.openxmlformats.org/officeDocument/2006/math" xmlns:a14="http://schemas.microsoft.com/office/drawing/2010/main" xmlns:ma14="http://schemas.microsoft.com/office/mac/drawingml/2011/main" xmlns:lc="http://schemas.openxmlformats.org/drawingml/2006/lockedCanvas" val="1"/>
+              <ma14:wrappingTextBoxFlag xmlns:lc="http://schemas.openxmlformats.org/drawingml/2006/lockedCanvas" xmlns:ma14="http://schemas.microsoft.com/office/mac/drawingml/2011/main" xmlns:a14="http://schemas.microsoft.com/office/drawing/2010/main" xmlns:m="http://schemas.openxmlformats.org/officeDocument/2006/math" xmlns="" val="1"/>
             </a:ext>
           </a:extLst>
         </p:spPr>
@@ -6778,7 +6838,7 @@
           </a:ln>
           <a:extLst>
             <a:ext uri="{C572A759-6A51-4108-AA02-DFA0A04FC94B}">
-              <ma14:wrappingTextBoxFlag xmlns:ma14="http://schemas.microsoft.com/office/mac/drawingml/2011/main" xmlns:a14="http://schemas.microsoft.com/office/drawing/2010/main" xmlns:m="http://schemas.openxmlformats.org/officeDocument/2006/math" xmlns="" val="1"/>
+              <ma14:wrappingTextBoxFlag xmlns="" xmlns:m="http://schemas.openxmlformats.org/officeDocument/2006/math" xmlns:a14="http://schemas.microsoft.com/office/drawing/2010/main" xmlns:ma14="http://schemas.microsoft.com/office/mac/drawingml/2011/main" val="1"/>
             </a:ext>
           </a:extLst>
         </p:spPr>
@@ -7080,7 +7140,7 @@
           </a:ln>
           <a:extLst>
             <a:ext uri="{C572A759-6A51-4108-AA02-DFA0A04FC94B}">
-              <ma14:wrappingTextBoxFlag xmlns:ma14="http://schemas.microsoft.com/office/mac/drawingml/2011/main" xmlns:a14="http://schemas.microsoft.com/office/drawing/2010/main" xmlns:m="http://schemas.openxmlformats.org/officeDocument/2006/math" xmlns="" val="1"/>
+              <ma14:wrappingTextBoxFlag xmlns="" xmlns:m="http://schemas.openxmlformats.org/officeDocument/2006/math" xmlns:a14="http://schemas.microsoft.com/office/drawing/2010/main" xmlns:ma14="http://schemas.microsoft.com/office/mac/drawingml/2011/main" val="1"/>
             </a:ext>
           </a:extLst>
         </p:spPr>
@@ -7201,7 +7261,7 @@
           <a:effectLst/>
           <a:extLst>
             <a:ext uri="{C572A759-6A51-4108-AA02-DFA0A04FC94B}">
-              <ma14:wrappingTextBoxFlag xmlns="" xmlns:m="http://schemas.openxmlformats.org/officeDocument/2006/math" xmlns:a14="http://schemas.microsoft.com/office/drawing/2010/main" xmlns:ma14="http://schemas.microsoft.com/office/mac/drawingml/2011/main" xmlns:lc="http://schemas.openxmlformats.org/drawingml/2006/lockedCanvas" val="1"/>
+              <ma14:wrappingTextBoxFlag xmlns:lc="http://schemas.openxmlformats.org/drawingml/2006/lockedCanvas" xmlns:ma14="http://schemas.microsoft.com/office/mac/drawingml/2011/main" xmlns:a14="http://schemas.microsoft.com/office/drawing/2010/main" xmlns:m="http://schemas.openxmlformats.org/officeDocument/2006/math" xmlns="" val="1"/>
             </a:ext>
           </a:extLst>
         </p:spPr>
@@ -7695,7 +7755,7 @@
           </a:ln>
           <a:extLst>
             <a:ext uri="{C572A759-6A51-4108-AA02-DFA0A04FC94B}">
-              <ma14:wrappingTextBoxFlag xmlns:ma14="http://schemas.microsoft.com/office/mac/drawingml/2011/main" xmlns:a14="http://schemas.microsoft.com/office/drawing/2010/main" xmlns:m="http://schemas.openxmlformats.org/officeDocument/2006/math" xmlns="" val="1"/>
+              <ma14:wrappingTextBoxFlag xmlns="" xmlns:m="http://schemas.openxmlformats.org/officeDocument/2006/math" xmlns:a14="http://schemas.microsoft.com/office/drawing/2010/main" xmlns:ma14="http://schemas.microsoft.com/office/mac/drawingml/2011/main" val="1"/>
             </a:ext>
           </a:extLst>
         </p:spPr>
@@ -7789,7 +7849,7 @@
           </a:ln>
           <a:extLst>
             <a:ext uri="{C572A759-6A51-4108-AA02-DFA0A04FC94B}">
-              <ma14:wrappingTextBoxFlag xmlns:ma14="http://schemas.microsoft.com/office/mac/drawingml/2011/main" xmlns:a14="http://schemas.microsoft.com/office/drawing/2010/main" xmlns:m="http://schemas.openxmlformats.org/officeDocument/2006/math" xmlns="" val="1"/>
+              <ma14:wrappingTextBoxFlag xmlns="" xmlns:m="http://schemas.openxmlformats.org/officeDocument/2006/math" xmlns:a14="http://schemas.microsoft.com/office/drawing/2010/main" xmlns:ma14="http://schemas.microsoft.com/office/mac/drawingml/2011/main" val="1"/>
             </a:ext>
           </a:extLst>
         </p:spPr>
@@ -7900,7 +7960,7 @@
           <a:effectLst/>
           <a:extLst>
             <a:ext uri="{C572A759-6A51-4108-AA02-DFA0A04FC94B}">
-              <ma14:wrappingTextBoxFlag xmlns="" xmlns:m="http://schemas.openxmlformats.org/officeDocument/2006/math" xmlns:a14="http://schemas.microsoft.com/office/drawing/2010/main" xmlns:ma14="http://schemas.microsoft.com/office/mac/drawingml/2011/main" xmlns:lc="http://schemas.openxmlformats.org/drawingml/2006/lockedCanvas" val="1"/>
+              <ma14:wrappingTextBoxFlag xmlns:lc="http://schemas.openxmlformats.org/drawingml/2006/lockedCanvas" xmlns:ma14="http://schemas.microsoft.com/office/mac/drawingml/2011/main" xmlns:a14="http://schemas.microsoft.com/office/drawing/2010/main" xmlns:m="http://schemas.openxmlformats.org/officeDocument/2006/math" xmlns="" val="1"/>
             </a:ext>
           </a:extLst>
         </p:spPr>
@@ -8282,7 +8342,7 @@
           <a:effectLst/>
           <a:extLst>
             <a:ext uri="{C572A759-6A51-4108-AA02-DFA0A04FC94B}">
-              <ma14:wrappingTextBoxFlag xmlns:ma14="http://schemas.microsoft.com/office/mac/drawingml/2011/main" xmlns:a14="http://schemas.microsoft.com/office/drawing/2010/main" xmlns:m="http://schemas.openxmlformats.org/officeDocument/2006/math" xmlns="" val="1"/>
+              <ma14:wrappingTextBoxFlag xmlns="" xmlns:m="http://schemas.openxmlformats.org/officeDocument/2006/math" xmlns:a14="http://schemas.microsoft.com/office/drawing/2010/main" xmlns:ma14="http://schemas.microsoft.com/office/mac/drawingml/2011/main" val="1"/>
             </a:ext>
           </a:extLst>
         </p:spPr>
@@ -8545,7 +8605,7 @@
           <a:effectLst/>
           <a:extLst>
             <a:ext uri="{C572A759-6A51-4108-AA02-DFA0A04FC94B}">
-              <ma14:wrappingTextBoxFlag xmlns:ma14="http://schemas.microsoft.com/office/mac/drawingml/2011/main" xmlns:a14="http://schemas.microsoft.com/office/drawing/2010/main" xmlns:m="http://schemas.openxmlformats.org/officeDocument/2006/math" xmlns="" val="1"/>
+              <ma14:wrappingTextBoxFlag xmlns="" xmlns:m="http://schemas.openxmlformats.org/officeDocument/2006/math" xmlns:a14="http://schemas.microsoft.com/office/drawing/2010/main" xmlns:ma14="http://schemas.microsoft.com/office/mac/drawingml/2011/main" val="1"/>
             </a:ext>
           </a:extLst>
         </p:spPr>
@@ -8811,7 +8871,7 @@
           <a:effectLst/>
           <a:extLst>
             <a:ext uri="{C572A759-6A51-4108-AA02-DFA0A04FC94B}">
-              <ma14:wrappingTextBoxFlag xmlns:ma14="http://schemas.microsoft.com/office/mac/drawingml/2011/main" xmlns:a14="http://schemas.microsoft.com/office/drawing/2010/main" xmlns:m="http://schemas.openxmlformats.org/officeDocument/2006/math" xmlns="" val="1"/>
+              <ma14:wrappingTextBoxFlag xmlns="" xmlns:m="http://schemas.openxmlformats.org/officeDocument/2006/math" xmlns:a14="http://schemas.microsoft.com/office/drawing/2010/main" xmlns:ma14="http://schemas.microsoft.com/office/mac/drawingml/2011/main" val="1"/>
             </a:ext>
           </a:extLst>
         </p:spPr>
@@ -9210,7 +9270,7 @@
           <a:effectLst/>
           <a:extLst>
             <a:ext uri="{C572A759-6A51-4108-AA02-DFA0A04FC94B}">
-              <ma14:wrappingTextBoxFlag xmlns:ma14="http://schemas.microsoft.com/office/mac/drawingml/2011/main" xmlns:a14="http://schemas.microsoft.com/office/drawing/2010/main" xmlns:m="http://schemas.openxmlformats.org/officeDocument/2006/math" xmlns="" val="1"/>
+              <ma14:wrappingTextBoxFlag xmlns="" xmlns:m="http://schemas.openxmlformats.org/officeDocument/2006/math" xmlns:a14="http://schemas.microsoft.com/office/drawing/2010/main" xmlns:ma14="http://schemas.microsoft.com/office/mac/drawingml/2011/main" val="1"/>
             </a:ext>
           </a:extLst>
         </p:spPr>
@@ -9677,7 +9737,7 @@
           </a:ln>
           <a:extLst>
             <a:ext uri="{C572A759-6A51-4108-AA02-DFA0A04FC94B}">
-              <ma14:wrappingTextBoxFlag xmlns:ma14="http://schemas.microsoft.com/office/mac/drawingml/2011/main" xmlns:a14="http://schemas.microsoft.com/office/drawing/2010/main" xmlns:m="http://schemas.openxmlformats.org/officeDocument/2006/math" xmlns="" val="1"/>
+              <ma14:wrappingTextBoxFlag xmlns="" xmlns:m="http://schemas.openxmlformats.org/officeDocument/2006/math" xmlns:a14="http://schemas.microsoft.com/office/drawing/2010/main" xmlns:ma14="http://schemas.microsoft.com/office/mac/drawingml/2011/main" val="1"/>
             </a:ext>
           </a:extLst>
         </p:spPr>
@@ -9741,7 +9801,7 @@
           </a:ln>
           <a:extLst>
             <a:ext uri="{C572A759-6A51-4108-AA02-DFA0A04FC94B}">
-              <ma14:wrappingTextBoxFlag xmlns:ma14="http://schemas.microsoft.com/office/mac/drawingml/2011/main" xmlns:a14="http://schemas.microsoft.com/office/drawing/2010/main" xmlns:m="http://schemas.openxmlformats.org/officeDocument/2006/math" xmlns="" val="1"/>
+              <ma14:wrappingTextBoxFlag xmlns="" xmlns:m="http://schemas.openxmlformats.org/officeDocument/2006/math" xmlns:a14="http://schemas.microsoft.com/office/drawing/2010/main" xmlns:ma14="http://schemas.microsoft.com/office/mac/drawingml/2011/main" val="1"/>
             </a:ext>
           </a:extLst>
         </p:spPr>
@@ -10165,7 +10225,7 @@
           </a:ln>
           <a:extLst>
             <a:ext uri="{C572A759-6A51-4108-AA02-DFA0A04FC94B}">
-              <ma14:wrappingTextBoxFlag xmlns:ma14="http://schemas.microsoft.com/office/mac/drawingml/2011/main" xmlns:a14="http://schemas.microsoft.com/office/drawing/2010/main" xmlns:m="http://schemas.openxmlformats.org/officeDocument/2006/math" xmlns="" val="1"/>
+              <ma14:wrappingTextBoxFlag xmlns="" xmlns:m="http://schemas.openxmlformats.org/officeDocument/2006/math" xmlns:a14="http://schemas.microsoft.com/office/drawing/2010/main" xmlns:ma14="http://schemas.microsoft.com/office/mac/drawingml/2011/main" val="1"/>
             </a:ext>
           </a:extLst>
         </p:spPr>
@@ -10229,7 +10289,7 @@
           </a:ln>
           <a:extLst>
             <a:ext uri="{C572A759-6A51-4108-AA02-DFA0A04FC94B}">
-              <ma14:wrappingTextBoxFlag xmlns:ma14="http://schemas.microsoft.com/office/mac/drawingml/2011/main" xmlns:a14="http://schemas.microsoft.com/office/drawing/2010/main" xmlns:m="http://schemas.openxmlformats.org/officeDocument/2006/math" xmlns="" val="1"/>
+              <ma14:wrappingTextBoxFlag xmlns="" xmlns:m="http://schemas.openxmlformats.org/officeDocument/2006/math" xmlns:a14="http://schemas.microsoft.com/office/drawing/2010/main" xmlns:ma14="http://schemas.microsoft.com/office/mac/drawingml/2011/main" val="1"/>
             </a:ext>
           </a:extLst>
         </p:spPr>

</xml_diff>

<commit_message>
Built site for jfa: 0.5.2@b4bd753
</commit_message>
<xml_diff>
--- a/reference/figures/cheatsheet/cheatsheet.pptx
+++ b/reference/figures/cheatsheet/cheatsheet.pptx
@@ -322,23 +322,95 @@
 <pc:chgInfo xmlns:a="http://schemas.openxmlformats.org/drawingml/2006/main" xmlns:r="http://schemas.openxmlformats.org/officeDocument/2006/relationships" xmlns:ac="http://schemas.microsoft.com/office/drawing/2013/main/command" xmlns:pc="http://schemas.microsoft.com/office/powerpoint/2013/main/command">
   <pc:docChgLst>
     <pc:chgData name="Derks, Koen" userId="42903d96-be75-4cec-9136-f3710e86cd30" providerId="ADAL" clId="{31252840-B54D-42F9-AADB-EFDB9C1D7E85}"/>
-    <pc:docChg chg="modSld">
-      <pc:chgData name="Derks, Koen" userId="42903d96-be75-4cec-9136-f3710e86cd30" providerId="ADAL" clId="{31252840-B54D-42F9-AADB-EFDB9C1D7E85}" dt="2021-03-22T08:43:18.965" v="16" actId="20577"/>
+    <pc:docChg chg="undo custSel modSld">
+      <pc:chgData name="Derks, Koen" userId="42903d96-be75-4cec-9136-f3710e86cd30" providerId="ADAL" clId="{31252840-B54D-42F9-AADB-EFDB9C1D7E85}" dt="2021-04-02T11:26:05.594" v="87" actId="113"/>
       <pc:docMkLst>
         <pc:docMk/>
       </pc:docMkLst>
       <pc:sldChg chg="modSp mod">
-        <pc:chgData name="Derks, Koen" userId="42903d96-be75-4cec-9136-f3710e86cd30" providerId="ADAL" clId="{31252840-B54D-42F9-AADB-EFDB9C1D7E85}" dt="2021-03-22T08:43:18.965" v="16" actId="20577"/>
+        <pc:chgData name="Derks, Koen" userId="42903d96-be75-4cec-9136-f3710e86cd30" providerId="ADAL" clId="{31252840-B54D-42F9-AADB-EFDB9C1D7E85}" dt="2021-04-02T11:26:05.594" v="87" actId="113"/>
         <pc:sldMkLst>
           <pc:docMk/>
           <pc:sldMk cId="0" sldId="257"/>
         </pc:sldMkLst>
         <pc:spChg chg="mod">
-          <ac:chgData name="Derks, Koen" userId="42903d96-be75-4cec-9136-f3710e86cd30" providerId="ADAL" clId="{31252840-B54D-42F9-AADB-EFDB9C1D7E85}" dt="2021-03-22T08:43:18.965" v="16" actId="20577"/>
+          <ac:chgData name="Derks, Koen" userId="42903d96-be75-4cec-9136-f3710e86cd30" providerId="ADAL" clId="{31252840-B54D-42F9-AADB-EFDB9C1D7E85}" dt="2021-04-02T11:24:14.486" v="20"/>
+          <ac:spMkLst>
+            <pc:docMk/>
+            <pc:sldMk cId="0" sldId="257"/>
+            <ac:spMk id="52" creationId="{DD98DBD8-D3CF-4958-A26E-11C31BD0A8BF}"/>
+          </ac:spMkLst>
+        </pc:spChg>
+        <pc:spChg chg="mod">
+          <ac:chgData name="Derks, Koen" userId="42903d96-be75-4cec-9136-f3710e86cd30" providerId="ADAL" clId="{31252840-B54D-42F9-AADB-EFDB9C1D7E85}" dt="2021-04-02T11:24:24.133" v="28"/>
+          <ac:spMkLst>
+            <pc:docMk/>
+            <pc:sldMk cId="0" sldId="257"/>
+            <ac:spMk id="55" creationId="{11DB5590-7A5D-4881-9776-04A572D92153}"/>
+          </ac:spMkLst>
+        </pc:spChg>
+        <pc:spChg chg="mod">
+          <ac:chgData name="Derks, Koen" userId="42903d96-be75-4cec-9136-f3710e86cd30" providerId="ADAL" clId="{31252840-B54D-42F9-AADB-EFDB9C1D7E85}" dt="2021-04-02T11:25:08.035" v="71" actId="20577"/>
+          <ac:spMkLst>
+            <pc:docMk/>
+            <pc:sldMk cId="0" sldId="257"/>
+            <ac:spMk id="130" creationId="{44904A4B-B912-4594-8AA2-DCA86DC78C9C}"/>
+          </ac:spMkLst>
+        </pc:spChg>
+        <pc:spChg chg="mod">
+          <ac:chgData name="Derks, Koen" userId="42903d96-be75-4cec-9136-f3710e86cd30" providerId="ADAL" clId="{31252840-B54D-42F9-AADB-EFDB9C1D7E85}" dt="2021-04-02T11:25:10.388" v="76" actId="20577"/>
+          <ac:spMkLst>
+            <pc:docMk/>
+            <pc:sldMk cId="0" sldId="257"/>
+            <ac:spMk id="135" creationId="{9D0348CA-97F1-4EDC-8F7E-BBB556E48519}"/>
+          </ac:spMkLst>
+        </pc:spChg>
+        <pc:spChg chg="mod">
+          <ac:chgData name="Derks, Koen" userId="42903d96-be75-4cec-9136-f3710e86cd30" providerId="ADAL" clId="{31252840-B54D-42F9-AADB-EFDB9C1D7E85}" dt="2021-04-02T11:24:35.485" v="40"/>
+          <ac:spMkLst>
+            <pc:docMk/>
+            <pc:sldMk cId="0" sldId="257"/>
+            <ac:spMk id="143" creationId="{FB0763FA-753C-40C1-A1E4-7DA1DDA10072}"/>
+          </ac:spMkLst>
+        </pc:spChg>
+        <pc:spChg chg="mod">
+          <ac:chgData name="Derks, Koen" userId="42903d96-be75-4cec-9136-f3710e86cd30" providerId="ADAL" clId="{31252840-B54D-42F9-AADB-EFDB9C1D7E85}" dt="2021-04-02T11:24:42.172" v="48"/>
+          <ac:spMkLst>
+            <pc:docMk/>
+            <pc:sldMk cId="0" sldId="257"/>
+            <ac:spMk id="144" creationId="{9AF2C0F0-B69F-45A7-9DB4-1D7962C71414}"/>
+          </ac:spMkLst>
+        </pc:spChg>
+        <pc:spChg chg="mod">
+          <ac:chgData name="Derks, Koen" userId="42903d96-be75-4cec-9136-f3710e86cd30" providerId="ADAL" clId="{31252840-B54D-42F9-AADB-EFDB9C1D7E85}" dt="2021-04-02T11:24:52.651" v="60"/>
+          <ac:spMkLst>
+            <pc:docMk/>
+            <pc:sldMk cId="0" sldId="257"/>
+            <ac:spMk id="145" creationId="{130E5FF5-89E1-42AE-84ED-37821A67F183}"/>
+          </ac:spMkLst>
+        </pc:spChg>
+        <pc:spChg chg="mod">
+          <ac:chgData name="Derks, Koen" userId="42903d96-be75-4cec-9136-f3710e86cd30" providerId="ADAL" clId="{31252840-B54D-42F9-AADB-EFDB9C1D7E85}" dt="2021-04-02T11:25:31.317" v="80"/>
+          <ac:spMkLst>
+            <pc:docMk/>
+            <pc:sldMk cId="0" sldId="257"/>
+            <ac:spMk id="146" creationId="{7FDCB908-2F7E-48F5-81CD-C9EF3585FD33}"/>
+          </ac:spMkLst>
+        </pc:spChg>
+        <pc:spChg chg="mod">
+          <ac:chgData name="Derks, Koen" userId="42903d96-be75-4cec-9136-f3710e86cd30" providerId="ADAL" clId="{31252840-B54D-42F9-AADB-EFDB9C1D7E85}" dt="2021-04-02T11:26:05.594" v="87" actId="113"/>
           <ac:spMkLst>
             <pc:docMk/>
             <pc:sldMk cId="0" sldId="257"/>
             <ac:spMk id="322" creationId="{00000000-0000-0000-0000-000000000000}"/>
+          </ac:spMkLst>
+        </pc:spChg>
+        <pc:spChg chg="mod">
+          <ac:chgData name="Derks, Koen" userId="42903d96-be75-4cec-9136-f3710e86cd30" providerId="ADAL" clId="{31252840-B54D-42F9-AADB-EFDB9C1D7E85}" dt="2021-04-02T11:24:30.824" v="36"/>
+          <ac:spMkLst>
+            <pc:docMk/>
+            <pc:sldMk cId="0" sldId="257"/>
+            <ac:spMk id="380" creationId="{00000000-0000-0000-0000-000000000000}"/>
           </ac:spMkLst>
         </pc:spChg>
       </pc:sldChg>
@@ -2263,7 +2335,7 @@
           </a:ln>
           <a:extLst>
             <a:ext uri="{C572A759-6A51-4108-AA02-DFA0A04FC94B}">
-              <ma14:wrappingTextBoxFlag xmlns="" xmlns:m="http://schemas.openxmlformats.org/officeDocument/2006/math" xmlns:a14="http://schemas.microsoft.com/office/drawing/2010/main" xmlns:ma14="http://schemas.microsoft.com/office/mac/drawingml/2011/main" val="1"/>
+              <ma14:wrappingTextBoxFlag xmlns:ma14="http://schemas.microsoft.com/office/mac/drawingml/2011/main" xmlns:a14="http://schemas.microsoft.com/office/drawing/2010/main" xmlns:m="http://schemas.openxmlformats.org/officeDocument/2006/math" xmlns="" val="1"/>
             </a:ext>
           </a:extLst>
         </p:spPr>
@@ -2302,7 +2374,7 @@
           </a:ln>
           <a:extLst>
             <a:ext uri="{C572A759-6A51-4108-AA02-DFA0A04FC94B}">
-              <ma14:wrappingTextBoxFlag xmlns="" xmlns:m="http://schemas.openxmlformats.org/officeDocument/2006/math" xmlns:a14="http://schemas.microsoft.com/office/drawing/2010/main" xmlns:ma14="http://schemas.microsoft.com/office/mac/drawingml/2011/main" val="1"/>
+              <ma14:wrappingTextBoxFlag xmlns:ma14="http://schemas.microsoft.com/office/mac/drawingml/2011/main" xmlns:a14="http://schemas.microsoft.com/office/drawing/2010/main" xmlns:m="http://schemas.openxmlformats.org/officeDocument/2006/math" xmlns="" val="1"/>
             </a:ext>
           </a:extLst>
         </p:spPr>
@@ -3395,7 +3467,7 @@
           </a:ln>
           <a:extLst>
             <a:ext uri="{C572A759-6A51-4108-AA02-DFA0A04FC94B}">
-              <ma14:wrappingTextBoxFlag xmlns="" xmlns:m="http://schemas.openxmlformats.org/officeDocument/2006/math" xmlns:a14="http://schemas.microsoft.com/office/drawing/2010/main" xmlns:ma14="http://schemas.microsoft.com/office/mac/drawingml/2011/main" val="1"/>
+              <ma14:wrappingTextBoxFlag xmlns:ma14="http://schemas.microsoft.com/office/mac/drawingml/2011/main" xmlns:a14="http://schemas.microsoft.com/office/drawing/2010/main" xmlns:m="http://schemas.openxmlformats.org/officeDocument/2006/math" xmlns="" val="1"/>
             </a:ext>
           </a:extLst>
         </p:spPr>
@@ -3448,7 +3520,7 @@
           </a:ln>
           <a:extLst>
             <a:ext uri="{C572A759-6A51-4108-AA02-DFA0A04FC94B}">
-              <ma14:wrappingTextBoxFlag xmlns="" xmlns:m="http://schemas.openxmlformats.org/officeDocument/2006/math" xmlns:a14="http://schemas.microsoft.com/office/drawing/2010/main" xmlns:ma14="http://schemas.microsoft.com/office/mac/drawingml/2011/main" val="1"/>
+              <ma14:wrappingTextBoxFlag xmlns:ma14="http://schemas.microsoft.com/office/mac/drawingml/2011/main" xmlns:a14="http://schemas.microsoft.com/office/drawing/2010/main" xmlns:m="http://schemas.openxmlformats.org/officeDocument/2006/math" xmlns="" val="1"/>
             </a:ext>
           </a:extLst>
         </p:spPr>
@@ -3513,7 +3585,11 @@
             </a:r>
             <a:r>
               <a:rPr dirty="0"/>
-              <a:t>•  Learn more at</a:t>
+              <a:t>•  Learn more </a:t>
+            </a:r>
+            <a:r>
+              <a:rPr lang="nl-NL" dirty="0" err="1"/>
+              <a:t>from</a:t>
             </a:r>
             <a:r>
               <a:rPr lang="nl-NL" dirty="0"/>
@@ -3529,7 +3605,15 @@
             </a:r>
             <a:r>
               <a:rPr b="1" dirty="0"/>
-              <a:t>webpage or vignette</a:t>
+              <a:t>webpage </a:t>
+            </a:r>
+            <a:r>
+              <a:rPr b="0" dirty="0"/>
+              <a:t>or</a:t>
+            </a:r>
+            <a:r>
+              <a:rPr b="1" dirty="0"/>
+              <a:t> vignette</a:t>
             </a:r>
             <a:r>
               <a:rPr lang="nl-NL" b="1" dirty="0"/>
@@ -3594,7 +3678,7 @@
           </a:ln>
           <a:extLst>
             <a:ext uri="{C572A759-6A51-4108-AA02-DFA0A04FC94B}">
-              <ma14:wrappingTextBoxFlag xmlns="" xmlns:m="http://schemas.openxmlformats.org/officeDocument/2006/math" xmlns:a14="http://schemas.microsoft.com/office/drawing/2010/main" xmlns:ma14="http://schemas.microsoft.com/office/mac/drawingml/2011/main" val="1"/>
+              <ma14:wrappingTextBoxFlag xmlns:ma14="http://schemas.microsoft.com/office/mac/drawingml/2011/main" xmlns:a14="http://schemas.microsoft.com/office/drawing/2010/main" xmlns:m="http://schemas.openxmlformats.org/officeDocument/2006/math" xmlns="" val="1"/>
             </a:ext>
           </a:extLst>
         </p:spPr>
@@ -4175,7 +4259,7 @@
           </a:ln>
           <a:extLst>
             <a:ext uri="{C572A759-6A51-4108-AA02-DFA0A04FC94B}">
-              <ma14:wrappingTextBoxFlag xmlns="" xmlns:m="http://schemas.openxmlformats.org/officeDocument/2006/math" xmlns:a14="http://schemas.microsoft.com/office/drawing/2010/main" xmlns:ma14="http://schemas.microsoft.com/office/mac/drawingml/2011/main" val="1"/>
+              <ma14:wrappingTextBoxFlag xmlns:ma14="http://schemas.microsoft.com/office/mac/drawingml/2011/main" xmlns:a14="http://schemas.microsoft.com/office/drawing/2010/main" xmlns:m="http://schemas.openxmlformats.org/officeDocument/2006/math" xmlns="" val="1"/>
             </a:ext>
           </a:extLst>
         </p:spPr>
@@ -4344,7 +4428,7 @@
           <a:effectLst/>
           <a:extLst>
             <a:ext uri="{C572A759-6A51-4108-AA02-DFA0A04FC94B}">
-              <ma14:wrappingTextBoxFlag xmlns="" xmlns:m="http://schemas.openxmlformats.org/officeDocument/2006/math" xmlns:a14="http://schemas.microsoft.com/office/drawing/2010/main" xmlns:ma14="http://schemas.microsoft.com/office/mac/drawingml/2011/main" val="1"/>
+              <ma14:wrappingTextBoxFlag xmlns:ma14="http://schemas.microsoft.com/office/mac/drawingml/2011/main" xmlns:a14="http://schemas.microsoft.com/office/drawing/2010/main" xmlns:m="http://schemas.openxmlformats.org/officeDocument/2006/math" xmlns="" val="1"/>
             </a:ext>
           </a:extLst>
         </p:spPr>
@@ -4466,7 +4550,7 @@
                 <a:latin typeface="Courier New" panose="02070309020205020404" pitchFamily="49" charset="0"/>
                 <a:cs typeface="Courier New" panose="02070309020205020404" pitchFamily="49" charset="0"/>
               </a:rPr>
-              <a:t> = "none",</a:t>
+              <a:t> = 'none',</a:t>
             </a:r>
           </a:p>
           <a:p>
@@ -4518,7 +4602,7 @@
                 <a:latin typeface="Courier New" panose="02070309020205020404" pitchFamily="49" charset="0"/>
                 <a:cs typeface="Courier New" panose="02070309020205020404" pitchFamily="49" charset="0"/>
               </a:rPr>
-              <a:t> = "</a:t>
+              <a:t> = '</a:t>
             </a:r>
             <a:r>
               <a:rPr lang="nl-NL" sz="1000" dirty="0" err="1">
@@ -4542,7 +4626,7 @@
                 <a:latin typeface="Courier New" panose="02070309020205020404" pitchFamily="49" charset="0"/>
                 <a:cs typeface="Courier New" panose="02070309020205020404" pitchFamily="49" charset="0"/>
               </a:rPr>
-              <a:t>“, ...)</a:t>
+              <a:t>', ...)</a:t>
             </a:r>
             <a:endParaRPr sz="1000" dirty="0">
               <a:solidFill>
@@ -4575,7 +4659,7 @@
           </a:ln>
           <a:extLst>
             <a:ext uri="{C572A759-6A51-4108-AA02-DFA0A04FC94B}">
-              <ma14:wrappingTextBoxFlag xmlns="" xmlns:m="http://schemas.openxmlformats.org/officeDocument/2006/math" xmlns:a14="http://schemas.microsoft.com/office/drawing/2010/main" xmlns:ma14="http://schemas.microsoft.com/office/mac/drawingml/2011/main" val="1"/>
+              <ma14:wrappingTextBoxFlag xmlns:ma14="http://schemas.microsoft.com/office/mac/drawingml/2011/main" xmlns:a14="http://schemas.microsoft.com/office/drawing/2010/main" xmlns:m="http://schemas.openxmlformats.org/officeDocument/2006/math" xmlns="" val="1"/>
             </a:ext>
           </a:extLst>
         </p:spPr>
@@ -4752,7 +4836,7 @@
           <a:effectLst/>
           <a:extLst>
             <a:ext uri="{C572A759-6A51-4108-AA02-DFA0A04FC94B}">
-              <ma14:wrappingTextBoxFlag xmlns:lc="http://schemas.openxmlformats.org/drawingml/2006/lockedCanvas" xmlns:ma14="http://schemas.microsoft.com/office/mac/drawingml/2011/main" xmlns:a14="http://schemas.microsoft.com/office/drawing/2010/main" xmlns:m="http://schemas.openxmlformats.org/officeDocument/2006/math" xmlns="" val="1"/>
+              <ma14:wrappingTextBoxFlag xmlns="" xmlns:m="http://schemas.openxmlformats.org/officeDocument/2006/math" xmlns:a14="http://schemas.microsoft.com/office/drawing/2010/main" xmlns:ma14="http://schemas.microsoft.com/office/mac/drawingml/2011/main" xmlns:lc="http://schemas.openxmlformats.org/drawingml/2006/lockedCanvas" val="1"/>
             </a:ext>
           </a:extLst>
         </p:spPr>
@@ -5246,7 +5330,7 @@
           </a:ln>
           <a:extLst>
             <a:ext uri="{C572A759-6A51-4108-AA02-DFA0A04FC94B}">
-              <ma14:wrappingTextBoxFlag xmlns="" xmlns:m="http://schemas.openxmlformats.org/officeDocument/2006/math" xmlns:a14="http://schemas.microsoft.com/office/drawing/2010/main" xmlns:ma14="http://schemas.microsoft.com/office/mac/drawingml/2011/main" val="1"/>
+              <ma14:wrappingTextBoxFlag xmlns:ma14="http://schemas.microsoft.com/office/mac/drawingml/2011/main" xmlns:a14="http://schemas.microsoft.com/office/drawing/2010/main" xmlns:m="http://schemas.openxmlformats.org/officeDocument/2006/math" xmlns="" val="1"/>
             </a:ext>
           </a:extLst>
         </p:spPr>
@@ -5480,7 +5564,7 @@
           </a:ln>
           <a:extLst>
             <a:ext uri="{C572A759-6A51-4108-AA02-DFA0A04FC94B}">
-              <ma14:wrappingTextBoxFlag xmlns="" xmlns:m="http://schemas.openxmlformats.org/officeDocument/2006/math" xmlns:a14="http://schemas.microsoft.com/office/drawing/2010/main" xmlns:ma14="http://schemas.microsoft.com/office/mac/drawingml/2011/main" val="1"/>
+              <ma14:wrappingTextBoxFlag xmlns:ma14="http://schemas.microsoft.com/office/mac/drawingml/2011/main" xmlns:a14="http://schemas.microsoft.com/office/drawing/2010/main" xmlns:m="http://schemas.openxmlformats.org/officeDocument/2006/math" xmlns="" val="1"/>
             </a:ext>
           </a:extLst>
         </p:spPr>
@@ -5611,7 +5695,7 @@
           <a:effectLst/>
           <a:extLst>
             <a:ext uri="{C572A759-6A51-4108-AA02-DFA0A04FC94B}">
-              <ma14:wrappingTextBoxFlag xmlns:lc="http://schemas.openxmlformats.org/drawingml/2006/lockedCanvas" xmlns:ma14="http://schemas.microsoft.com/office/mac/drawingml/2011/main" xmlns:a14="http://schemas.microsoft.com/office/drawing/2010/main" xmlns:m="http://schemas.openxmlformats.org/officeDocument/2006/math" xmlns="" val="1"/>
+              <ma14:wrappingTextBoxFlag xmlns="" xmlns:m="http://schemas.openxmlformats.org/officeDocument/2006/math" xmlns:a14="http://schemas.microsoft.com/office/drawing/2010/main" xmlns:ma14="http://schemas.microsoft.com/office/mac/drawingml/2011/main" xmlns:lc="http://schemas.openxmlformats.org/drawingml/2006/lockedCanvas" val="1"/>
             </a:ext>
           </a:extLst>
         </p:spPr>
@@ -6079,7 +6163,7 @@
           </a:ln>
           <a:extLst>
             <a:ext uri="{C572A759-6A51-4108-AA02-DFA0A04FC94B}">
-              <ma14:wrappingTextBoxFlag xmlns="" xmlns:m="http://schemas.openxmlformats.org/officeDocument/2006/math" xmlns:a14="http://schemas.microsoft.com/office/drawing/2010/main" xmlns:ma14="http://schemas.microsoft.com/office/mac/drawingml/2011/main" val="1"/>
+              <ma14:wrappingTextBoxFlag xmlns:ma14="http://schemas.microsoft.com/office/mac/drawingml/2011/main" xmlns:a14="http://schemas.microsoft.com/office/drawing/2010/main" xmlns:m="http://schemas.openxmlformats.org/officeDocument/2006/math" xmlns="" val="1"/>
             </a:ext>
           </a:extLst>
         </p:spPr>
@@ -6183,7 +6267,7 @@
         <p:spPr>
           <a:xfrm>
             <a:off x="4795732" y="5137597"/>
-            <a:ext cx="4962897" cy="277127"/>
+            <a:ext cx="4220707" cy="277127"/>
           </a:xfrm>
           <a:prstGeom prst="rect">
             <a:avLst/>
@@ -6193,7 +6277,7 @@
           </a:ln>
           <a:extLst>
             <a:ext uri="{C572A759-6A51-4108-AA02-DFA0A04FC94B}">
-              <ma14:wrappingTextBoxFlag xmlns="" xmlns:m="http://schemas.openxmlformats.org/officeDocument/2006/math" xmlns:a14="http://schemas.microsoft.com/office/drawing/2010/main" xmlns:ma14="http://schemas.microsoft.com/office/mac/drawingml/2011/main" val="1"/>
+              <ma14:wrappingTextBoxFlag xmlns:ma14="http://schemas.microsoft.com/office/mac/drawingml/2011/main" xmlns:a14="http://schemas.microsoft.com/office/drawing/2010/main" xmlns:m="http://schemas.openxmlformats.org/officeDocument/2006/math" xmlns="" val="1"/>
             </a:ext>
           </a:extLst>
         </p:spPr>
@@ -6264,7 +6348,7 @@
                   </a:schemeClr>
                 </a:solidFill>
               </a:rPr>
-              <a:t> transactions </a:t>
+              <a:t> items </a:t>
             </a:r>
             <a:r>
               <a:rPr lang="nl-NL" sz="2000" dirty="0" err="1">
@@ -6344,7 +6428,7 @@
           <a:effectLst/>
           <a:extLst>
             <a:ext uri="{C572A759-6A51-4108-AA02-DFA0A04FC94B}">
-              <ma14:wrappingTextBoxFlag xmlns:lc="http://schemas.openxmlformats.org/drawingml/2006/lockedCanvas" xmlns:ma14="http://schemas.microsoft.com/office/mac/drawingml/2011/main" xmlns:a14="http://schemas.microsoft.com/office/drawing/2010/main" xmlns:m="http://schemas.openxmlformats.org/officeDocument/2006/math" xmlns="" val="1"/>
+              <ma14:wrappingTextBoxFlag xmlns="" xmlns:m="http://schemas.openxmlformats.org/officeDocument/2006/math" xmlns:a14="http://schemas.microsoft.com/office/drawing/2010/main" xmlns:ma14="http://schemas.microsoft.com/office/mac/drawingml/2011/main" xmlns:lc="http://schemas.openxmlformats.org/drawingml/2006/lockedCanvas" val="1"/>
             </a:ext>
           </a:extLst>
         </p:spPr>
@@ -6838,7 +6922,7 @@
           </a:ln>
           <a:extLst>
             <a:ext uri="{C572A759-6A51-4108-AA02-DFA0A04FC94B}">
-              <ma14:wrappingTextBoxFlag xmlns="" xmlns:m="http://schemas.openxmlformats.org/officeDocument/2006/math" xmlns:a14="http://schemas.microsoft.com/office/drawing/2010/main" xmlns:ma14="http://schemas.microsoft.com/office/mac/drawingml/2011/main" val="1"/>
+              <ma14:wrappingTextBoxFlag xmlns:ma14="http://schemas.microsoft.com/office/mac/drawingml/2011/main" xmlns:a14="http://schemas.microsoft.com/office/drawing/2010/main" xmlns:m="http://schemas.openxmlformats.org/officeDocument/2006/math" xmlns="" val="1"/>
             </a:ext>
           </a:extLst>
         </p:spPr>
@@ -7130,7 +7214,7 @@
         <p:spPr>
           <a:xfrm>
             <a:off x="4798004" y="6749594"/>
-            <a:ext cx="3634008" cy="277127"/>
+            <a:ext cx="2891817" cy="277127"/>
           </a:xfrm>
           <a:prstGeom prst="rect">
             <a:avLst/>
@@ -7140,7 +7224,7 @@
           </a:ln>
           <a:extLst>
             <a:ext uri="{C572A759-6A51-4108-AA02-DFA0A04FC94B}">
-              <ma14:wrappingTextBoxFlag xmlns="" xmlns:m="http://schemas.openxmlformats.org/officeDocument/2006/math" xmlns:a14="http://schemas.microsoft.com/office/drawing/2010/main" xmlns:ma14="http://schemas.microsoft.com/office/mac/drawingml/2011/main" val="1"/>
+              <ma14:wrappingTextBoxFlag xmlns:ma14="http://schemas.microsoft.com/office/mac/drawingml/2011/main" xmlns:a14="http://schemas.microsoft.com/office/drawing/2010/main" xmlns:m="http://schemas.openxmlformats.org/officeDocument/2006/math" xmlns="" val="1"/>
             </a:ext>
           </a:extLst>
         </p:spPr>
@@ -7221,7 +7305,7 @@
                   </a:schemeClr>
                 </a:solidFill>
               </a:rPr>
-              <a:t> transactions</a:t>
+              <a:t> items</a:t>
             </a:r>
             <a:endParaRPr sz="2000" dirty="0">
               <a:solidFill>
@@ -7261,7 +7345,7 @@
           <a:effectLst/>
           <a:extLst>
             <a:ext uri="{C572A759-6A51-4108-AA02-DFA0A04FC94B}">
-              <ma14:wrappingTextBoxFlag xmlns:lc="http://schemas.openxmlformats.org/drawingml/2006/lockedCanvas" xmlns:ma14="http://schemas.microsoft.com/office/mac/drawingml/2011/main" xmlns:a14="http://schemas.microsoft.com/office/drawing/2010/main" xmlns:m="http://schemas.openxmlformats.org/officeDocument/2006/math" xmlns="" val="1"/>
+              <ma14:wrappingTextBoxFlag xmlns="" xmlns:m="http://schemas.openxmlformats.org/officeDocument/2006/math" xmlns:a14="http://schemas.microsoft.com/office/drawing/2010/main" xmlns:ma14="http://schemas.microsoft.com/office/mac/drawingml/2011/main" xmlns:lc="http://schemas.openxmlformats.org/drawingml/2006/lockedCanvas" val="1"/>
             </a:ext>
           </a:extLst>
         </p:spPr>
@@ -7755,7 +7839,7 @@
           </a:ln>
           <a:extLst>
             <a:ext uri="{C572A759-6A51-4108-AA02-DFA0A04FC94B}">
-              <ma14:wrappingTextBoxFlag xmlns="" xmlns:m="http://schemas.openxmlformats.org/officeDocument/2006/math" xmlns:a14="http://schemas.microsoft.com/office/drawing/2010/main" xmlns:ma14="http://schemas.microsoft.com/office/mac/drawingml/2011/main" val="1"/>
+              <ma14:wrappingTextBoxFlag xmlns:ma14="http://schemas.microsoft.com/office/mac/drawingml/2011/main" xmlns:a14="http://schemas.microsoft.com/office/drawing/2010/main" xmlns:m="http://schemas.openxmlformats.org/officeDocument/2006/math" xmlns="" val="1"/>
             </a:ext>
           </a:extLst>
         </p:spPr>
@@ -7849,7 +7933,7 @@
           </a:ln>
           <a:extLst>
             <a:ext uri="{C572A759-6A51-4108-AA02-DFA0A04FC94B}">
-              <ma14:wrappingTextBoxFlag xmlns="" xmlns:m="http://schemas.openxmlformats.org/officeDocument/2006/math" xmlns:a14="http://schemas.microsoft.com/office/drawing/2010/main" xmlns:ma14="http://schemas.microsoft.com/office/mac/drawingml/2011/main" val="1"/>
+              <ma14:wrappingTextBoxFlag xmlns:ma14="http://schemas.microsoft.com/office/mac/drawingml/2011/main" xmlns:a14="http://schemas.microsoft.com/office/drawing/2010/main" xmlns:m="http://schemas.openxmlformats.org/officeDocument/2006/math" xmlns="" val="1"/>
             </a:ext>
           </a:extLst>
         </p:spPr>
@@ -7960,7 +8044,7 @@
           <a:effectLst/>
           <a:extLst>
             <a:ext uri="{C572A759-6A51-4108-AA02-DFA0A04FC94B}">
-              <ma14:wrappingTextBoxFlag xmlns:lc="http://schemas.openxmlformats.org/drawingml/2006/lockedCanvas" xmlns:ma14="http://schemas.microsoft.com/office/mac/drawingml/2011/main" xmlns:a14="http://schemas.microsoft.com/office/drawing/2010/main" xmlns:m="http://schemas.openxmlformats.org/officeDocument/2006/math" xmlns="" val="1"/>
+              <ma14:wrappingTextBoxFlag xmlns="" xmlns:m="http://schemas.openxmlformats.org/officeDocument/2006/math" xmlns:a14="http://schemas.microsoft.com/office/drawing/2010/main" xmlns:ma14="http://schemas.microsoft.com/office/mac/drawingml/2011/main" xmlns:lc="http://schemas.openxmlformats.org/drawingml/2006/lockedCanvas" val="1"/>
             </a:ext>
           </a:extLst>
         </p:spPr>
@@ -8342,7 +8426,7 @@
           <a:effectLst/>
           <a:extLst>
             <a:ext uri="{C572A759-6A51-4108-AA02-DFA0A04FC94B}">
-              <ma14:wrappingTextBoxFlag xmlns="" xmlns:m="http://schemas.openxmlformats.org/officeDocument/2006/math" xmlns:a14="http://schemas.microsoft.com/office/drawing/2010/main" xmlns:ma14="http://schemas.microsoft.com/office/mac/drawingml/2011/main" val="1"/>
+              <ma14:wrappingTextBoxFlag xmlns:ma14="http://schemas.microsoft.com/office/mac/drawingml/2011/main" xmlns:a14="http://schemas.microsoft.com/office/drawing/2010/main" xmlns:m="http://schemas.openxmlformats.org/officeDocument/2006/math" xmlns="" val="1"/>
             </a:ext>
           </a:extLst>
         </p:spPr>
@@ -8504,7 +8588,7 @@
                 <a:latin typeface="Courier New" panose="02070309020205020404" pitchFamily="49" charset="0"/>
                 <a:cs typeface="Courier New" panose="02070309020205020404" pitchFamily="49" charset="0"/>
               </a:rPr>
-              <a:t> = "</a:t>
+              <a:t> = '</a:t>
             </a:r>
             <a:r>
               <a:rPr lang="nl-NL" sz="1000" dirty="0" err="1">
@@ -8528,7 +8612,7 @@
                 <a:latin typeface="Courier New" panose="02070309020205020404" pitchFamily="49" charset="0"/>
                 <a:cs typeface="Courier New" panose="02070309020205020404" pitchFamily="49" charset="0"/>
               </a:rPr>
-              <a:t>",</a:t>
+              <a:t>',</a:t>
             </a:r>
           </a:p>
           <a:p>
@@ -8605,7 +8689,7 @@
           <a:effectLst/>
           <a:extLst>
             <a:ext uri="{C572A759-6A51-4108-AA02-DFA0A04FC94B}">
-              <ma14:wrappingTextBoxFlag xmlns="" xmlns:m="http://schemas.openxmlformats.org/officeDocument/2006/math" xmlns:a14="http://schemas.microsoft.com/office/drawing/2010/main" xmlns:ma14="http://schemas.microsoft.com/office/mac/drawingml/2011/main" val="1"/>
+              <ma14:wrappingTextBoxFlag xmlns:ma14="http://schemas.microsoft.com/office/mac/drawingml/2011/main" xmlns:a14="http://schemas.microsoft.com/office/drawing/2010/main" xmlns:m="http://schemas.openxmlformats.org/officeDocument/2006/math" xmlns="" val="1"/>
             </a:ext>
           </a:extLst>
         </p:spPr>
@@ -8779,7 +8863,7 @@
                 <a:latin typeface="Courier New" panose="02070309020205020404" pitchFamily="49" charset="0"/>
                 <a:cs typeface="Courier New" panose="02070309020205020404" pitchFamily="49" charset="0"/>
               </a:rPr>
-              <a:t>          units = "records",</a:t>
+              <a:t>          units = 'records',</a:t>
             </a:r>
           </a:p>
           <a:p>
@@ -8831,7 +8915,7 @@
                 <a:latin typeface="Courier New" panose="02070309020205020404" pitchFamily="49" charset="0"/>
                 <a:cs typeface="Courier New" panose="02070309020205020404" pitchFamily="49" charset="0"/>
               </a:rPr>
-              <a:t> = "interval“, ...) </a:t>
+              <a:t> = 'interval', ...) </a:t>
             </a:r>
           </a:p>
         </p:txBody>
@@ -8871,7 +8955,7 @@
           <a:effectLst/>
           <a:extLst>
             <a:ext uri="{C572A759-6A51-4108-AA02-DFA0A04FC94B}">
-              <ma14:wrappingTextBoxFlag xmlns="" xmlns:m="http://schemas.openxmlformats.org/officeDocument/2006/math" xmlns:a14="http://schemas.microsoft.com/office/drawing/2010/main" xmlns:ma14="http://schemas.microsoft.com/office/mac/drawingml/2011/main" val="1"/>
+              <ma14:wrappingTextBoxFlag xmlns:ma14="http://schemas.microsoft.com/office/mac/drawingml/2011/main" xmlns:a14="http://schemas.microsoft.com/office/drawing/2010/main" xmlns:m="http://schemas.openxmlformats.org/officeDocument/2006/math" xmlns="" val="1"/>
             </a:ext>
           </a:extLst>
         </p:spPr>
@@ -8993,7 +9077,7 @@
                 <a:latin typeface="Courier New" panose="02070309020205020404" pitchFamily="49" charset="0"/>
                 <a:cs typeface="Courier New" panose="02070309020205020404" pitchFamily="49" charset="0"/>
               </a:rPr>
-              <a:t> = "</a:t>
+              <a:t> = '</a:t>
             </a:r>
             <a:r>
               <a:rPr lang="nl-NL" sz="1000" dirty="0" err="1">
@@ -9017,7 +9101,7 @@
                 <a:latin typeface="Courier New" panose="02070309020205020404" pitchFamily="49" charset="0"/>
                 <a:cs typeface="Courier New" panose="02070309020205020404" pitchFamily="49" charset="0"/>
               </a:rPr>
-              <a:t>",</a:t>
+              <a:t>',</a:t>
             </a:r>
           </a:p>
           <a:p>
@@ -9069,7 +9153,7 @@
                 <a:latin typeface="Courier New" panose="02070309020205020404" pitchFamily="49" charset="0"/>
                 <a:cs typeface="Courier New" panose="02070309020205020404" pitchFamily="49" charset="0"/>
               </a:rPr>
-              <a:t> = "</a:t>
+              <a:t> = '</a:t>
             </a:r>
             <a:r>
               <a:rPr lang="nl-NL" sz="1000" dirty="0" err="1">
@@ -9093,7 +9177,7 @@
                 <a:latin typeface="Courier New" panose="02070309020205020404" pitchFamily="49" charset="0"/>
                 <a:cs typeface="Courier New" panose="02070309020205020404" pitchFamily="49" charset="0"/>
               </a:rPr>
-              <a:t>",</a:t>
+              <a:t>',</a:t>
             </a:r>
           </a:p>
           <a:p>
@@ -9145,7 +9229,7 @@
                 <a:latin typeface="Courier New" panose="02070309020205020404" pitchFamily="49" charset="0"/>
                 <a:cs typeface="Courier New" panose="02070309020205020404" pitchFamily="49" charset="0"/>
               </a:rPr>
-              <a:t> = "</a:t>
+              <a:t> = '</a:t>
             </a:r>
             <a:r>
               <a:rPr lang="nl-NL" sz="1000" dirty="0" err="1">
@@ -9169,7 +9253,7 @@
                 <a:latin typeface="Courier New" panose="02070309020205020404" pitchFamily="49" charset="0"/>
                 <a:cs typeface="Courier New" panose="02070309020205020404" pitchFamily="49" charset="0"/>
               </a:rPr>
-              <a:t>",</a:t>
+              <a:t>',</a:t>
             </a:r>
           </a:p>
           <a:p>
@@ -9270,7 +9354,7 @@
           <a:effectLst/>
           <a:extLst>
             <a:ext uri="{C572A759-6A51-4108-AA02-DFA0A04FC94B}">
-              <ma14:wrappingTextBoxFlag xmlns="" xmlns:m="http://schemas.openxmlformats.org/officeDocument/2006/math" xmlns:a14="http://schemas.microsoft.com/office/drawing/2010/main" xmlns:ma14="http://schemas.microsoft.com/office/mac/drawingml/2011/main" val="1"/>
+              <ma14:wrappingTextBoxFlag xmlns:ma14="http://schemas.microsoft.com/office/mac/drawingml/2011/main" xmlns:a14="http://schemas.microsoft.com/office/drawing/2010/main" xmlns:m="http://schemas.openxmlformats.org/officeDocument/2006/math" xmlns="" val="1"/>
             </a:ext>
           </a:extLst>
         </p:spPr>
@@ -9356,7 +9440,7 @@
                 <a:latin typeface="Courier New" panose="02070309020205020404" pitchFamily="49" charset="0"/>
                 <a:cs typeface="Courier New" panose="02070309020205020404" pitchFamily="49" charset="0"/>
               </a:rPr>
-              <a:t>       file = "report.html“, ...)</a:t>
+              <a:t>       file = 'report.html', ...)</a:t>
             </a:r>
             <a:endParaRPr sz="1000" dirty="0">
               <a:solidFill>
@@ -9737,7 +9821,7 @@
           </a:ln>
           <a:extLst>
             <a:ext uri="{C572A759-6A51-4108-AA02-DFA0A04FC94B}">
-              <ma14:wrappingTextBoxFlag xmlns="" xmlns:m="http://schemas.openxmlformats.org/officeDocument/2006/math" xmlns:a14="http://schemas.microsoft.com/office/drawing/2010/main" xmlns:ma14="http://schemas.microsoft.com/office/mac/drawingml/2011/main" val="1"/>
+              <ma14:wrappingTextBoxFlag xmlns:ma14="http://schemas.microsoft.com/office/mac/drawingml/2011/main" xmlns:a14="http://schemas.microsoft.com/office/drawing/2010/main" xmlns:m="http://schemas.openxmlformats.org/officeDocument/2006/math" xmlns="" val="1"/>
             </a:ext>
           </a:extLst>
         </p:spPr>
@@ -9801,7 +9885,7 @@
           </a:ln>
           <a:extLst>
             <a:ext uri="{C572A759-6A51-4108-AA02-DFA0A04FC94B}">
-              <ma14:wrappingTextBoxFlag xmlns="" xmlns:m="http://schemas.openxmlformats.org/officeDocument/2006/math" xmlns:a14="http://schemas.microsoft.com/office/drawing/2010/main" xmlns:ma14="http://schemas.microsoft.com/office/mac/drawingml/2011/main" val="1"/>
+              <ma14:wrappingTextBoxFlag xmlns:ma14="http://schemas.microsoft.com/office/mac/drawingml/2011/main" xmlns:a14="http://schemas.microsoft.com/office/drawing/2010/main" xmlns:m="http://schemas.openxmlformats.org/officeDocument/2006/math" xmlns="" val="1"/>
             </a:ext>
           </a:extLst>
         </p:spPr>
@@ -9931,7 +10015,7 @@
                 <a:latin typeface="Courier New" panose="02070309020205020404" pitchFamily="49" charset="0"/>
                 <a:cs typeface="Courier New" panose="02070309020205020404" pitchFamily="49" charset="0"/>
               </a:rPr>
-              <a:t>("</a:t>
+              <a:t>('</a:t>
             </a:r>
             <a:r>
               <a:rPr lang="nl-NL" b="0" dirty="0" err="1">
@@ -9951,7 +10035,7 @@
                 <a:latin typeface="Courier New" panose="02070309020205020404" pitchFamily="49" charset="0"/>
                 <a:cs typeface="Courier New" panose="02070309020205020404" pitchFamily="49" charset="0"/>
               </a:rPr>
-              <a:t>")</a:t>
+              <a:t>')</a:t>
             </a:r>
           </a:p>
           <a:p>
@@ -10225,7 +10309,7 @@
           </a:ln>
           <a:extLst>
             <a:ext uri="{C572A759-6A51-4108-AA02-DFA0A04FC94B}">
-              <ma14:wrappingTextBoxFlag xmlns="" xmlns:m="http://schemas.openxmlformats.org/officeDocument/2006/math" xmlns:a14="http://schemas.microsoft.com/office/drawing/2010/main" xmlns:ma14="http://schemas.microsoft.com/office/mac/drawingml/2011/main" val="1"/>
+              <ma14:wrappingTextBoxFlag xmlns:ma14="http://schemas.microsoft.com/office/mac/drawingml/2011/main" xmlns:a14="http://schemas.microsoft.com/office/drawing/2010/main" xmlns:m="http://schemas.openxmlformats.org/officeDocument/2006/math" xmlns="" val="1"/>
             </a:ext>
           </a:extLst>
         </p:spPr>
@@ -10289,7 +10373,7 @@
           </a:ln>
           <a:extLst>
             <a:ext uri="{C572A759-6A51-4108-AA02-DFA0A04FC94B}">
-              <ma14:wrappingTextBoxFlag xmlns="" xmlns:m="http://schemas.openxmlformats.org/officeDocument/2006/math" xmlns:a14="http://schemas.microsoft.com/office/drawing/2010/main" xmlns:ma14="http://schemas.microsoft.com/office/mac/drawingml/2011/main" val="1"/>
+              <ma14:wrappingTextBoxFlag xmlns:ma14="http://schemas.microsoft.com/office/mac/drawingml/2011/main" xmlns:a14="http://schemas.microsoft.com/office/drawing/2010/main" xmlns:m="http://schemas.openxmlformats.org/officeDocument/2006/math" xmlns="" val="1"/>
             </a:ext>
           </a:extLst>
         </p:spPr>
@@ -10600,7 +10684,7 @@
                 <a:latin typeface="Courier New" panose="02070309020205020404" pitchFamily="49" charset="0"/>
                 <a:cs typeface="Courier New" panose="02070309020205020404" pitchFamily="49" charset="0"/>
               </a:rPr>
-              <a:t>data("</a:t>
+              <a:t>data('</a:t>
             </a:r>
             <a:r>
               <a:rPr lang="nl-NL" b="0" dirty="0" err="1">
@@ -10620,7 +10704,7 @@
                 <a:latin typeface="Courier New" panose="02070309020205020404" pitchFamily="49" charset="0"/>
                 <a:cs typeface="Courier New" panose="02070309020205020404" pitchFamily="49" charset="0"/>
               </a:rPr>
-              <a:t>")</a:t>
+              <a:t>')</a:t>
             </a:r>
           </a:p>
         </p:txBody>

</xml_diff>

<commit_message>
Built site for jfa: 0.5.3@fe2ed5f
</commit_message>
<xml_diff>
--- a/reference/figures/cheatsheet/cheatsheet.pptx
+++ b/reference/figures/cheatsheet/cheatsheet.pptx
@@ -323,12 +323,12 @@
   <pc:docChgLst>
     <pc:chgData name="Derks, Koen" userId="42903d96-be75-4cec-9136-f3710e86cd30" providerId="ADAL" clId="{31252840-B54D-42F9-AADB-EFDB9C1D7E85}"/>
     <pc:docChg chg="undo custSel modSld">
-      <pc:chgData name="Derks, Koen" userId="42903d96-be75-4cec-9136-f3710e86cd30" providerId="ADAL" clId="{31252840-B54D-42F9-AADB-EFDB9C1D7E85}" dt="2021-04-02T11:26:05.594" v="87" actId="113"/>
+      <pc:chgData name="Derks, Koen" userId="42903d96-be75-4cec-9136-f3710e86cd30" providerId="ADAL" clId="{31252840-B54D-42F9-AADB-EFDB9C1D7E85}" dt="2021-04-23T11:20:34.634" v="91" actId="20577"/>
       <pc:docMkLst>
         <pc:docMk/>
       </pc:docMkLst>
       <pc:sldChg chg="modSp mod">
-        <pc:chgData name="Derks, Koen" userId="42903d96-be75-4cec-9136-f3710e86cd30" providerId="ADAL" clId="{31252840-B54D-42F9-AADB-EFDB9C1D7E85}" dt="2021-04-02T11:26:05.594" v="87" actId="113"/>
+        <pc:chgData name="Derks, Koen" userId="42903d96-be75-4cec-9136-f3710e86cd30" providerId="ADAL" clId="{31252840-B54D-42F9-AADB-EFDB9C1D7E85}" dt="2021-04-23T11:20:34.634" v="91" actId="20577"/>
         <pc:sldMkLst>
           <pc:docMk/>
           <pc:sldMk cId="0" sldId="257"/>
@@ -398,7 +398,7 @@
           </ac:spMkLst>
         </pc:spChg>
         <pc:spChg chg="mod">
-          <ac:chgData name="Derks, Koen" userId="42903d96-be75-4cec-9136-f3710e86cd30" providerId="ADAL" clId="{31252840-B54D-42F9-AADB-EFDB9C1D7E85}" dt="2021-04-02T11:26:05.594" v="87" actId="113"/>
+          <ac:chgData name="Derks, Koen" userId="42903d96-be75-4cec-9136-f3710e86cd30" providerId="ADAL" clId="{31252840-B54D-42F9-AADB-EFDB9C1D7E85}" dt="2021-04-23T11:20:34.634" v="91" actId="20577"/>
           <ac:spMkLst>
             <pc:docMk/>
             <pc:sldMk cId="0" sldId="257"/>
@@ -2335,7 +2335,7 @@
           </a:ln>
           <a:extLst>
             <a:ext uri="{C572A759-6A51-4108-AA02-DFA0A04FC94B}">
-              <ma14:wrappingTextBoxFlag xmlns:ma14="http://schemas.microsoft.com/office/mac/drawingml/2011/main" xmlns:a14="http://schemas.microsoft.com/office/drawing/2010/main" xmlns:m="http://schemas.openxmlformats.org/officeDocument/2006/math" xmlns="" val="1"/>
+              <ma14:wrappingTextBoxFlag xmlns="" xmlns:m="http://schemas.openxmlformats.org/officeDocument/2006/math" xmlns:a14="http://schemas.microsoft.com/office/drawing/2010/main" xmlns:ma14="http://schemas.microsoft.com/office/mac/drawingml/2011/main" val="1"/>
             </a:ext>
           </a:extLst>
         </p:spPr>
@@ -2374,7 +2374,7 @@
           </a:ln>
           <a:extLst>
             <a:ext uri="{C572A759-6A51-4108-AA02-DFA0A04FC94B}">
-              <ma14:wrappingTextBoxFlag xmlns:ma14="http://schemas.microsoft.com/office/mac/drawingml/2011/main" xmlns:a14="http://schemas.microsoft.com/office/drawing/2010/main" xmlns:m="http://schemas.openxmlformats.org/officeDocument/2006/math" xmlns="" val="1"/>
+              <ma14:wrappingTextBoxFlag xmlns="" xmlns:m="http://schemas.openxmlformats.org/officeDocument/2006/math" xmlns:a14="http://schemas.microsoft.com/office/drawing/2010/main" xmlns:ma14="http://schemas.microsoft.com/office/mac/drawingml/2011/main" val="1"/>
             </a:ext>
           </a:extLst>
         </p:spPr>
@@ -3467,7 +3467,7 @@
           </a:ln>
           <a:extLst>
             <a:ext uri="{C572A759-6A51-4108-AA02-DFA0A04FC94B}">
-              <ma14:wrappingTextBoxFlag xmlns:ma14="http://schemas.microsoft.com/office/mac/drawingml/2011/main" xmlns:a14="http://schemas.microsoft.com/office/drawing/2010/main" xmlns:m="http://schemas.openxmlformats.org/officeDocument/2006/math" xmlns="" val="1"/>
+              <ma14:wrappingTextBoxFlag xmlns="" xmlns:m="http://schemas.openxmlformats.org/officeDocument/2006/math" xmlns:a14="http://schemas.microsoft.com/office/drawing/2010/main" xmlns:ma14="http://schemas.microsoft.com/office/mac/drawingml/2011/main" val="1"/>
             </a:ext>
           </a:extLst>
         </p:spPr>
@@ -3520,7 +3520,7 @@
           </a:ln>
           <a:extLst>
             <a:ext uri="{C572A759-6A51-4108-AA02-DFA0A04FC94B}">
-              <ma14:wrappingTextBoxFlag xmlns:ma14="http://schemas.microsoft.com/office/mac/drawingml/2011/main" xmlns:a14="http://schemas.microsoft.com/office/drawing/2010/main" xmlns:m="http://schemas.openxmlformats.org/officeDocument/2006/math" xmlns="" val="1"/>
+              <ma14:wrappingTextBoxFlag xmlns="" xmlns:m="http://schemas.openxmlformats.org/officeDocument/2006/math" xmlns:a14="http://schemas.microsoft.com/office/drawing/2010/main" xmlns:ma14="http://schemas.microsoft.com/office/mac/drawingml/2011/main" val="1"/>
             </a:ext>
           </a:extLst>
         </p:spPr>
@@ -3637,7 +3637,7 @@
             </a:r>
             <a:r>
               <a:rPr lang="nl-NL" dirty="0"/>
-              <a:t>2</a:t>
+              <a:t>3</a:t>
             </a:r>
             <a:r>
               <a:rPr dirty="0"/>
@@ -3653,7 +3653,7 @@
             </a:r>
             <a:r>
               <a:rPr lang="nl-NL" dirty="0"/>
-              <a:t>04</a:t>
+              <a:t>05</a:t>
             </a:r>
             <a:endParaRPr dirty="0"/>
           </a:p>
@@ -3678,7 +3678,7 @@
           </a:ln>
           <a:extLst>
             <a:ext uri="{C572A759-6A51-4108-AA02-DFA0A04FC94B}">
-              <ma14:wrappingTextBoxFlag xmlns:ma14="http://schemas.microsoft.com/office/mac/drawingml/2011/main" xmlns:a14="http://schemas.microsoft.com/office/drawing/2010/main" xmlns:m="http://schemas.openxmlformats.org/officeDocument/2006/math" xmlns="" val="1"/>
+              <ma14:wrappingTextBoxFlag xmlns="" xmlns:m="http://schemas.openxmlformats.org/officeDocument/2006/math" xmlns:a14="http://schemas.microsoft.com/office/drawing/2010/main" xmlns:ma14="http://schemas.microsoft.com/office/mac/drawingml/2011/main" val="1"/>
             </a:ext>
           </a:extLst>
         </p:spPr>
@@ -4259,7 +4259,7 @@
           </a:ln>
           <a:extLst>
             <a:ext uri="{C572A759-6A51-4108-AA02-DFA0A04FC94B}">
-              <ma14:wrappingTextBoxFlag xmlns:ma14="http://schemas.microsoft.com/office/mac/drawingml/2011/main" xmlns:a14="http://schemas.microsoft.com/office/drawing/2010/main" xmlns:m="http://schemas.openxmlformats.org/officeDocument/2006/math" xmlns="" val="1"/>
+              <ma14:wrappingTextBoxFlag xmlns="" xmlns:m="http://schemas.openxmlformats.org/officeDocument/2006/math" xmlns:a14="http://schemas.microsoft.com/office/drawing/2010/main" xmlns:ma14="http://schemas.microsoft.com/office/mac/drawingml/2011/main" val="1"/>
             </a:ext>
           </a:extLst>
         </p:spPr>
@@ -4428,7 +4428,7 @@
           <a:effectLst/>
           <a:extLst>
             <a:ext uri="{C572A759-6A51-4108-AA02-DFA0A04FC94B}">
-              <ma14:wrappingTextBoxFlag xmlns:ma14="http://schemas.microsoft.com/office/mac/drawingml/2011/main" xmlns:a14="http://schemas.microsoft.com/office/drawing/2010/main" xmlns:m="http://schemas.openxmlformats.org/officeDocument/2006/math" xmlns="" val="1"/>
+              <ma14:wrappingTextBoxFlag xmlns="" xmlns:m="http://schemas.openxmlformats.org/officeDocument/2006/math" xmlns:a14="http://schemas.microsoft.com/office/drawing/2010/main" xmlns:ma14="http://schemas.microsoft.com/office/mac/drawingml/2011/main" val="1"/>
             </a:ext>
           </a:extLst>
         </p:spPr>
@@ -4659,7 +4659,7 @@
           </a:ln>
           <a:extLst>
             <a:ext uri="{C572A759-6A51-4108-AA02-DFA0A04FC94B}">
-              <ma14:wrappingTextBoxFlag xmlns:ma14="http://schemas.microsoft.com/office/mac/drawingml/2011/main" xmlns:a14="http://schemas.microsoft.com/office/drawing/2010/main" xmlns:m="http://schemas.openxmlformats.org/officeDocument/2006/math" xmlns="" val="1"/>
+              <ma14:wrappingTextBoxFlag xmlns="" xmlns:m="http://schemas.openxmlformats.org/officeDocument/2006/math" xmlns:a14="http://schemas.microsoft.com/office/drawing/2010/main" xmlns:ma14="http://schemas.microsoft.com/office/mac/drawingml/2011/main" val="1"/>
             </a:ext>
           </a:extLst>
         </p:spPr>
@@ -4836,7 +4836,7 @@
           <a:effectLst/>
           <a:extLst>
             <a:ext uri="{C572A759-6A51-4108-AA02-DFA0A04FC94B}">
-              <ma14:wrappingTextBoxFlag xmlns="" xmlns:m="http://schemas.openxmlformats.org/officeDocument/2006/math" xmlns:a14="http://schemas.microsoft.com/office/drawing/2010/main" xmlns:ma14="http://schemas.microsoft.com/office/mac/drawingml/2011/main" xmlns:lc="http://schemas.openxmlformats.org/drawingml/2006/lockedCanvas" val="1"/>
+              <ma14:wrappingTextBoxFlag xmlns:lc="http://schemas.openxmlformats.org/drawingml/2006/lockedCanvas" xmlns:ma14="http://schemas.microsoft.com/office/mac/drawingml/2011/main" xmlns:a14="http://schemas.microsoft.com/office/drawing/2010/main" xmlns:m="http://schemas.openxmlformats.org/officeDocument/2006/math" xmlns="" val="1"/>
             </a:ext>
           </a:extLst>
         </p:spPr>
@@ -5330,7 +5330,7 @@
           </a:ln>
           <a:extLst>
             <a:ext uri="{C572A759-6A51-4108-AA02-DFA0A04FC94B}">
-              <ma14:wrappingTextBoxFlag xmlns:ma14="http://schemas.microsoft.com/office/mac/drawingml/2011/main" xmlns:a14="http://schemas.microsoft.com/office/drawing/2010/main" xmlns:m="http://schemas.openxmlformats.org/officeDocument/2006/math" xmlns="" val="1"/>
+              <ma14:wrappingTextBoxFlag xmlns="" xmlns:m="http://schemas.openxmlformats.org/officeDocument/2006/math" xmlns:a14="http://schemas.microsoft.com/office/drawing/2010/main" xmlns:ma14="http://schemas.microsoft.com/office/mac/drawingml/2011/main" val="1"/>
             </a:ext>
           </a:extLst>
         </p:spPr>
@@ -5564,7 +5564,7 @@
           </a:ln>
           <a:extLst>
             <a:ext uri="{C572A759-6A51-4108-AA02-DFA0A04FC94B}">
-              <ma14:wrappingTextBoxFlag xmlns:ma14="http://schemas.microsoft.com/office/mac/drawingml/2011/main" xmlns:a14="http://schemas.microsoft.com/office/drawing/2010/main" xmlns:m="http://schemas.openxmlformats.org/officeDocument/2006/math" xmlns="" val="1"/>
+              <ma14:wrappingTextBoxFlag xmlns="" xmlns:m="http://schemas.openxmlformats.org/officeDocument/2006/math" xmlns:a14="http://schemas.microsoft.com/office/drawing/2010/main" xmlns:ma14="http://schemas.microsoft.com/office/mac/drawingml/2011/main" val="1"/>
             </a:ext>
           </a:extLst>
         </p:spPr>
@@ -5695,7 +5695,7 @@
           <a:effectLst/>
           <a:extLst>
             <a:ext uri="{C572A759-6A51-4108-AA02-DFA0A04FC94B}">
-              <ma14:wrappingTextBoxFlag xmlns="" xmlns:m="http://schemas.openxmlformats.org/officeDocument/2006/math" xmlns:a14="http://schemas.microsoft.com/office/drawing/2010/main" xmlns:ma14="http://schemas.microsoft.com/office/mac/drawingml/2011/main" xmlns:lc="http://schemas.openxmlformats.org/drawingml/2006/lockedCanvas" val="1"/>
+              <ma14:wrappingTextBoxFlag xmlns:lc="http://schemas.openxmlformats.org/drawingml/2006/lockedCanvas" xmlns:ma14="http://schemas.microsoft.com/office/mac/drawingml/2011/main" xmlns:a14="http://schemas.microsoft.com/office/drawing/2010/main" xmlns:m="http://schemas.openxmlformats.org/officeDocument/2006/math" xmlns="" val="1"/>
             </a:ext>
           </a:extLst>
         </p:spPr>
@@ -6163,7 +6163,7 @@
           </a:ln>
           <a:extLst>
             <a:ext uri="{C572A759-6A51-4108-AA02-DFA0A04FC94B}">
-              <ma14:wrappingTextBoxFlag xmlns:ma14="http://schemas.microsoft.com/office/mac/drawingml/2011/main" xmlns:a14="http://schemas.microsoft.com/office/drawing/2010/main" xmlns:m="http://schemas.openxmlformats.org/officeDocument/2006/math" xmlns="" val="1"/>
+              <ma14:wrappingTextBoxFlag xmlns="" xmlns:m="http://schemas.openxmlformats.org/officeDocument/2006/math" xmlns:a14="http://schemas.microsoft.com/office/drawing/2010/main" xmlns:ma14="http://schemas.microsoft.com/office/mac/drawingml/2011/main" val="1"/>
             </a:ext>
           </a:extLst>
         </p:spPr>
@@ -6277,7 +6277,7 @@
           </a:ln>
           <a:extLst>
             <a:ext uri="{C572A759-6A51-4108-AA02-DFA0A04FC94B}">
-              <ma14:wrappingTextBoxFlag xmlns:ma14="http://schemas.microsoft.com/office/mac/drawingml/2011/main" xmlns:a14="http://schemas.microsoft.com/office/drawing/2010/main" xmlns:m="http://schemas.openxmlformats.org/officeDocument/2006/math" xmlns="" val="1"/>
+              <ma14:wrappingTextBoxFlag xmlns="" xmlns:m="http://schemas.openxmlformats.org/officeDocument/2006/math" xmlns:a14="http://schemas.microsoft.com/office/drawing/2010/main" xmlns:ma14="http://schemas.microsoft.com/office/mac/drawingml/2011/main" val="1"/>
             </a:ext>
           </a:extLst>
         </p:spPr>
@@ -6428,7 +6428,7 @@
           <a:effectLst/>
           <a:extLst>
             <a:ext uri="{C572A759-6A51-4108-AA02-DFA0A04FC94B}">
-              <ma14:wrappingTextBoxFlag xmlns="" xmlns:m="http://schemas.openxmlformats.org/officeDocument/2006/math" xmlns:a14="http://schemas.microsoft.com/office/drawing/2010/main" xmlns:ma14="http://schemas.microsoft.com/office/mac/drawingml/2011/main" xmlns:lc="http://schemas.openxmlformats.org/drawingml/2006/lockedCanvas" val="1"/>
+              <ma14:wrappingTextBoxFlag xmlns:lc="http://schemas.openxmlformats.org/drawingml/2006/lockedCanvas" xmlns:ma14="http://schemas.microsoft.com/office/mac/drawingml/2011/main" xmlns:a14="http://schemas.microsoft.com/office/drawing/2010/main" xmlns:m="http://schemas.openxmlformats.org/officeDocument/2006/math" xmlns="" val="1"/>
             </a:ext>
           </a:extLst>
         </p:spPr>
@@ -6922,7 +6922,7 @@
           </a:ln>
           <a:extLst>
             <a:ext uri="{C572A759-6A51-4108-AA02-DFA0A04FC94B}">
-              <ma14:wrappingTextBoxFlag xmlns:ma14="http://schemas.microsoft.com/office/mac/drawingml/2011/main" xmlns:a14="http://schemas.microsoft.com/office/drawing/2010/main" xmlns:m="http://schemas.openxmlformats.org/officeDocument/2006/math" xmlns="" val="1"/>
+              <ma14:wrappingTextBoxFlag xmlns="" xmlns:m="http://schemas.openxmlformats.org/officeDocument/2006/math" xmlns:a14="http://schemas.microsoft.com/office/drawing/2010/main" xmlns:ma14="http://schemas.microsoft.com/office/mac/drawingml/2011/main" val="1"/>
             </a:ext>
           </a:extLst>
         </p:spPr>
@@ -7224,7 +7224,7 @@
           </a:ln>
           <a:extLst>
             <a:ext uri="{C572A759-6A51-4108-AA02-DFA0A04FC94B}">
-              <ma14:wrappingTextBoxFlag xmlns:ma14="http://schemas.microsoft.com/office/mac/drawingml/2011/main" xmlns:a14="http://schemas.microsoft.com/office/drawing/2010/main" xmlns:m="http://schemas.openxmlformats.org/officeDocument/2006/math" xmlns="" val="1"/>
+              <ma14:wrappingTextBoxFlag xmlns="" xmlns:m="http://schemas.openxmlformats.org/officeDocument/2006/math" xmlns:a14="http://schemas.microsoft.com/office/drawing/2010/main" xmlns:ma14="http://schemas.microsoft.com/office/mac/drawingml/2011/main" val="1"/>
             </a:ext>
           </a:extLst>
         </p:spPr>
@@ -7345,7 +7345,7 @@
           <a:effectLst/>
           <a:extLst>
             <a:ext uri="{C572A759-6A51-4108-AA02-DFA0A04FC94B}">
-              <ma14:wrappingTextBoxFlag xmlns="" xmlns:m="http://schemas.openxmlformats.org/officeDocument/2006/math" xmlns:a14="http://schemas.microsoft.com/office/drawing/2010/main" xmlns:ma14="http://schemas.microsoft.com/office/mac/drawingml/2011/main" xmlns:lc="http://schemas.openxmlformats.org/drawingml/2006/lockedCanvas" val="1"/>
+              <ma14:wrappingTextBoxFlag xmlns:lc="http://schemas.openxmlformats.org/drawingml/2006/lockedCanvas" xmlns:ma14="http://schemas.microsoft.com/office/mac/drawingml/2011/main" xmlns:a14="http://schemas.microsoft.com/office/drawing/2010/main" xmlns:m="http://schemas.openxmlformats.org/officeDocument/2006/math" xmlns="" val="1"/>
             </a:ext>
           </a:extLst>
         </p:spPr>
@@ -7839,7 +7839,7 @@
           </a:ln>
           <a:extLst>
             <a:ext uri="{C572A759-6A51-4108-AA02-DFA0A04FC94B}">
-              <ma14:wrappingTextBoxFlag xmlns:ma14="http://schemas.microsoft.com/office/mac/drawingml/2011/main" xmlns:a14="http://schemas.microsoft.com/office/drawing/2010/main" xmlns:m="http://schemas.openxmlformats.org/officeDocument/2006/math" xmlns="" val="1"/>
+              <ma14:wrappingTextBoxFlag xmlns="" xmlns:m="http://schemas.openxmlformats.org/officeDocument/2006/math" xmlns:a14="http://schemas.microsoft.com/office/drawing/2010/main" xmlns:ma14="http://schemas.microsoft.com/office/mac/drawingml/2011/main" val="1"/>
             </a:ext>
           </a:extLst>
         </p:spPr>
@@ -7933,7 +7933,7 @@
           </a:ln>
           <a:extLst>
             <a:ext uri="{C572A759-6A51-4108-AA02-DFA0A04FC94B}">
-              <ma14:wrappingTextBoxFlag xmlns:ma14="http://schemas.microsoft.com/office/mac/drawingml/2011/main" xmlns:a14="http://schemas.microsoft.com/office/drawing/2010/main" xmlns:m="http://schemas.openxmlformats.org/officeDocument/2006/math" xmlns="" val="1"/>
+              <ma14:wrappingTextBoxFlag xmlns="" xmlns:m="http://schemas.openxmlformats.org/officeDocument/2006/math" xmlns:a14="http://schemas.microsoft.com/office/drawing/2010/main" xmlns:ma14="http://schemas.microsoft.com/office/mac/drawingml/2011/main" val="1"/>
             </a:ext>
           </a:extLst>
         </p:spPr>
@@ -8044,7 +8044,7 @@
           <a:effectLst/>
           <a:extLst>
             <a:ext uri="{C572A759-6A51-4108-AA02-DFA0A04FC94B}">
-              <ma14:wrappingTextBoxFlag xmlns="" xmlns:m="http://schemas.openxmlformats.org/officeDocument/2006/math" xmlns:a14="http://schemas.microsoft.com/office/drawing/2010/main" xmlns:ma14="http://schemas.microsoft.com/office/mac/drawingml/2011/main" xmlns:lc="http://schemas.openxmlformats.org/drawingml/2006/lockedCanvas" val="1"/>
+              <ma14:wrappingTextBoxFlag xmlns:lc="http://schemas.openxmlformats.org/drawingml/2006/lockedCanvas" xmlns:ma14="http://schemas.microsoft.com/office/mac/drawingml/2011/main" xmlns:a14="http://schemas.microsoft.com/office/drawing/2010/main" xmlns:m="http://schemas.openxmlformats.org/officeDocument/2006/math" xmlns="" val="1"/>
             </a:ext>
           </a:extLst>
         </p:spPr>
@@ -8426,7 +8426,7 @@
           <a:effectLst/>
           <a:extLst>
             <a:ext uri="{C572A759-6A51-4108-AA02-DFA0A04FC94B}">
-              <ma14:wrappingTextBoxFlag xmlns:ma14="http://schemas.microsoft.com/office/mac/drawingml/2011/main" xmlns:a14="http://schemas.microsoft.com/office/drawing/2010/main" xmlns:m="http://schemas.openxmlformats.org/officeDocument/2006/math" xmlns="" val="1"/>
+              <ma14:wrappingTextBoxFlag xmlns="" xmlns:m="http://schemas.openxmlformats.org/officeDocument/2006/math" xmlns:a14="http://schemas.microsoft.com/office/drawing/2010/main" xmlns:ma14="http://schemas.microsoft.com/office/mac/drawingml/2011/main" val="1"/>
             </a:ext>
           </a:extLst>
         </p:spPr>
@@ -8689,7 +8689,7 @@
           <a:effectLst/>
           <a:extLst>
             <a:ext uri="{C572A759-6A51-4108-AA02-DFA0A04FC94B}">
-              <ma14:wrappingTextBoxFlag xmlns:ma14="http://schemas.microsoft.com/office/mac/drawingml/2011/main" xmlns:a14="http://schemas.microsoft.com/office/drawing/2010/main" xmlns:m="http://schemas.openxmlformats.org/officeDocument/2006/math" xmlns="" val="1"/>
+              <ma14:wrappingTextBoxFlag xmlns="" xmlns:m="http://schemas.openxmlformats.org/officeDocument/2006/math" xmlns:a14="http://schemas.microsoft.com/office/drawing/2010/main" xmlns:ma14="http://schemas.microsoft.com/office/mac/drawingml/2011/main" val="1"/>
             </a:ext>
           </a:extLst>
         </p:spPr>
@@ -8955,7 +8955,7 @@
           <a:effectLst/>
           <a:extLst>
             <a:ext uri="{C572A759-6A51-4108-AA02-DFA0A04FC94B}">
-              <ma14:wrappingTextBoxFlag xmlns:ma14="http://schemas.microsoft.com/office/mac/drawingml/2011/main" xmlns:a14="http://schemas.microsoft.com/office/drawing/2010/main" xmlns:m="http://schemas.openxmlformats.org/officeDocument/2006/math" xmlns="" val="1"/>
+              <ma14:wrappingTextBoxFlag xmlns="" xmlns:m="http://schemas.openxmlformats.org/officeDocument/2006/math" xmlns:a14="http://schemas.microsoft.com/office/drawing/2010/main" xmlns:ma14="http://schemas.microsoft.com/office/mac/drawingml/2011/main" val="1"/>
             </a:ext>
           </a:extLst>
         </p:spPr>
@@ -9354,7 +9354,7 @@
           <a:effectLst/>
           <a:extLst>
             <a:ext uri="{C572A759-6A51-4108-AA02-DFA0A04FC94B}">
-              <ma14:wrappingTextBoxFlag xmlns:ma14="http://schemas.microsoft.com/office/mac/drawingml/2011/main" xmlns:a14="http://schemas.microsoft.com/office/drawing/2010/main" xmlns:m="http://schemas.openxmlformats.org/officeDocument/2006/math" xmlns="" val="1"/>
+              <ma14:wrappingTextBoxFlag xmlns="" xmlns:m="http://schemas.openxmlformats.org/officeDocument/2006/math" xmlns:a14="http://schemas.microsoft.com/office/drawing/2010/main" xmlns:ma14="http://schemas.microsoft.com/office/mac/drawingml/2011/main" val="1"/>
             </a:ext>
           </a:extLst>
         </p:spPr>
@@ -9821,7 +9821,7 @@
           </a:ln>
           <a:extLst>
             <a:ext uri="{C572A759-6A51-4108-AA02-DFA0A04FC94B}">
-              <ma14:wrappingTextBoxFlag xmlns:ma14="http://schemas.microsoft.com/office/mac/drawingml/2011/main" xmlns:a14="http://schemas.microsoft.com/office/drawing/2010/main" xmlns:m="http://schemas.openxmlformats.org/officeDocument/2006/math" xmlns="" val="1"/>
+              <ma14:wrappingTextBoxFlag xmlns="" xmlns:m="http://schemas.openxmlformats.org/officeDocument/2006/math" xmlns:a14="http://schemas.microsoft.com/office/drawing/2010/main" xmlns:ma14="http://schemas.microsoft.com/office/mac/drawingml/2011/main" val="1"/>
             </a:ext>
           </a:extLst>
         </p:spPr>
@@ -9885,7 +9885,7 @@
           </a:ln>
           <a:extLst>
             <a:ext uri="{C572A759-6A51-4108-AA02-DFA0A04FC94B}">
-              <ma14:wrappingTextBoxFlag xmlns:ma14="http://schemas.microsoft.com/office/mac/drawingml/2011/main" xmlns:a14="http://schemas.microsoft.com/office/drawing/2010/main" xmlns:m="http://schemas.openxmlformats.org/officeDocument/2006/math" xmlns="" val="1"/>
+              <ma14:wrappingTextBoxFlag xmlns="" xmlns:m="http://schemas.openxmlformats.org/officeDocument/2006/math" xmlns:a14="http://schemas.microsoft.com/office/drawing/2010/main" xmlns:ma14="http://schemas.microsoft.com/office/mac/drawingml/2011/main" val="1"/>
             </a:ext>
           </a:extLst>
         </p:spPr>
@@ -10309,7 +10309,7 @@
           </a:ln>
           <a:extLst>
             <a:ext uri="{C572A759-6A51-4108-AA02-DFA0A04FC94B}">
-              <ma14:wrappingTextBoxFlag xmlns:ma14="http://schemas.microsoft.com/office/mac/drawingml/2011/main" xmlns:a14="http://schemas.microsoft.com/office/drawing/2010/main" xmlns:m="http://schemas.openxmlformats.org/officeDocument/2006/math" xmlns="" val="1"/>
+              <ma14:wrappingTextBoxFlag xmlns="" xmlns:m="http://schemas.openxmlformats.org/officeDocument/2006/math" xmlns:a14="http://schemas.microsoft.com/office/drawing/2010/main" xmlns:ma14="http://schemas.microsoft.com/office/mac/drawingml/2011/main" val="1"/>
             </a:ext>
           </a:extLst>
         </p:spPr>
@@ -10373,7 +10373,7 @@
           </a:ln>
           <a:extLst>
             <a:ext uri="{C572A759-6A51-4108-AA02-DFA0A04FC94B}">
-              <ma14:wrappingTextBoxFlag xmlns:ma14="http://schemas.microsoft.com/office/mac/drawingml/2011/main" xmlns:a14="http://schemas.microsoft.com/office/drawing/2010/main" xmlns:m="http://schemas.openxmlformats.org/officeDocument/2006/math" xmlns="" val="1"/>
+              <ma14:wrappingTextBoxFlag xmlns="" xmlns:m="http://schemas.openxmlformats.org/officeDocument/2006/math" xmlns:a14="http://schemas.microsoft.com/office/drawing/2010/main" xmlns:ma14="http://schemas.microsoft.com/office/mac/drawingml/2011/main" val="1"/>
             </a:ext>
           </a:extLst>
         </p:spPr>

</xml_diff>

<commit_message>
Built site for jfa: 0.5.3@cea9f9c
</commit_message>
<xml_diff>
--- a/reference/figures/cheatsheet/cheatsheet.pptx
+++ b/reference/figures/cheatsheet/cheatsheet.pptx
@@ -517,6 +517,142 @@
         </pc:spChg>
         <pc:spChg chg="mod">
           <ac:chgData name="Derks, Koen" userId="42903d96-be75-4cec-9136-f3710e86cd30" providerId="ADAL" clId="{16DBF44E-6DA5-4025-8FE0-79440E68FF90}" dt="2021-01-02T10:54:16.346" v="130" actId="5793"/>
+          <ac:spMkLst>
+            <pc:docMk/>
+            <pc:sldMk cId="0" sldId="257"/>
+            <ac:spMk id="380" creationId="{00000000-0000-0000-0000-000000000000}"/>
+          </ac:spMkLst>
+        </pc:spChg>
+      </pc:sldChg>
+    </pc:docChg>
+  </pc:docChgLst>
+  <pc:docChgLst>
+    <pc:chgData name="Koen Derks" userId="42903d96-be75-4cec-9136-f3710e86cd30" providerId="ADAL" clId="{31252840-B54D-42F9-AADB-EFDB9C1D7E85}"/>
+    <pc:docChg chg="undo custSel modSld">
+      <pc:chgData name="Koen Derks" userId="42903d96-be75-4cec-9136-f3710e86cd30" providerId="ADAL" clId="{31252840-B54D-42F9-AADB-EFDB9C1D7E85}" dt="2021-04-26T22:12:14.261" v="1330" actId="20577"/>
+      <pc:docMkLst>
+        <pc:docMk/>
+      </pc:docMkLst>
+      <pc:sldChg chg="modSp mod">
+        <pc:chgData name="Koen Derks" userId="42903d96-be75-4cec-9136-f3710e86cd30" providerId="ADAL" clId="{31252840-B54D-42F9-AADB-EFDB9C1D7E85}" dt="2021-04-26T22:12:14.261" v="1330" actId="20577"/>
+        <pc:sldMkLst>
+          <pc:docMk/>
+          <pc:sldMk cId="0" sldId="257"/>
+        </pc:sldMkLst>
+        <pc:spChg chg="mod">
+          <ac:chgData name="Koen Derks" userId="42903d96-be75-4cec-9136-f3710e86cd30" providerId="ADAL" clId="{31252840-B54D-42F9-AADB-EFDB9C1D7E85}" dt="2021-04-26T21:52:17.891" v="668" actId="1035"/>
+          <ac:spMkLst>
+            <pc:docMk/>
+            <pc:sldMk cId="0" sldId="257"/>
+            <ac:spMk id="49" creationId="{E97C5BC1-4E52-41FF-B3AB-FEC280581B6E}"/>
+          </ac:spMkLst>
+        </pc:spChg>
+        <pc:spChg chg="mod">
+          <ac:chgData name="Koen Derks" userId="42903d96-be75-4cec-9136-f3710e86cd30" providerId="ADAL" clId="{31252840-B54D-42F9-AADB-EFDB9C1D7E85}" dt="2021-04-26T21:52:17.891" v="668" actId="1035"/>
+          <ac:spMkLst>
+            <pc:docMk/>
+            <pc:sldMk cId="0" sldId="257"/>
+            <ac:spMk id="52" creationId="{DD98DBD8-D3CF-4958-A26E-11C31BD0A8BF}"/>
+          </ac:spMkLst>
+        </pc:spChg>
+        <pc:spChg chg="mod">
+          <ac:chgData name="Koen Derks" userId="42903d96-be75-4cec-9136-f3710e86cd30" providerId="ADAL" clId="{31252840-B54D-42F9-AADB-EFDB9C1D7E85}" dt="2021-04-26T22:04:56.282" v="1132" actId="20577"/>
+          <ac:spMkLst>
+            <pc:docMk/>
+            <pc:sldMk cId="0" sldId="257"/>
+            <ac:spMk id="124" creationId="{840686DE-7A82-47C4-A954-0B456668CB4F}"/>
+          </ac:spMkLst>
+        </pc:spChg>
+        <pc:spChg chg="mod">
+          <ac:chgData name="Koen Derks" userId="42903d96-be75-4cec-9136-f3710e86cd30" providerId="ADAL" clId="{31252840-B54D-42F9-AADB-EFDB9C1D7E85}" dt="2021-04-26T22:04:50.421" v="1125" actId="20577"/>
+          <ac:spMkLst>
+            <pc:docMk/>
+            <pc:sldMk cId="0" sldId="257"/>
+            <ac:spMk id="125" creationId="{C0AF010B-EA0A-4FC0-B8B5-31E24875F737}"/>
+          </ac:spMkLst>
+        </pc:spChg>
+        <pc:spChg chg="mod">
+          <ac:chgData name="Koen Derks" userId="42903d96-be75-4cec-9136-f3710e86cd30" providerId="ADAL" clId="{31252840-B54D-42F9-AADB-EFDB9C1D7E85}" dt="2021-04-26T22:04:22.583" v="1115" actId="14100"/>
+          <ac:spMkLst>
+            <pc:docMk/>
+            <pc:sldMk cId="0" sldId="257"/>
+            <ac:spMk id="129" creationId="{217411A5-52C0-45D9-A546-49235C28A6D7}"/>
+          </ac:spMkLst>
+        </pc:spChg>
+        <pc:spChg chg="mod">
+          <ac:chgData name="Koen Derks" userId="42903d96-be75-4cec-9136-f3710e86cd30" providerId="ADAL" clId="{31252840-B54D-42F9-AADB-EFDB9C1D7E85}" dt="2021-04-26T22:05:51.308" v="1142" actId="20577"/>
+          <ac:spMkLst>
+            <pc:docMk/>
+            <pc:sldMk cId="0" sldId="257"/>
+            <ac:spMk id="130" creationId="{44904A4B-B912-4594-8AA2-DCA86DC78C9C}"/>
+          </ac:spMkLst>
+        </pc:spChg>
+        <pc:spChg chg="mod">
+          <ac:chgData name="Koen Derks" userId="42903d96-be75-4cec-9136-f3710e86cd30" providerId="ADAL" clId="{31252840-B54D-42F9-AADB-EFDB9C1D7E85}" dt="2021-04-26T22:08:40.896" v="1257" actId="20577"/>
+          <ac:spMkLst>
+            <pc:docMk/>
+            <pc:sldMk cId="0" sldId="257"/>
+            <ac:spMk id="134" creationId="{C90DEEAD-4A2B-4F58-B49D-5B584591DA8B}"/>
+          </ac:spMkLst>
+        </pc:spChg>
+        <pc:spChg chg="mod">
+          <ac:chgData name="Koen Derks" userId="42903d96-be75-4cec-9136-f3710e86cd30" providerId="ADAL" clId="{31252840-B54D-42F9-AADB-EFDB9C1D7E85}" dt="2021-04-26T22:09:25.947" v="1278" actId="20577"/>
+          <ac:spMkLst>
+            <pc:docMk/>
+            <pc:sldMk cId="0" sldId="257"/>
+            <ac:spMk id="135" creationId="{9D0348CA-97F1-4EDC-8F7E-BBB556E48519}"/>
+          </ac:spMkLst>
+        </pc:spChg>
+        <pc:spChg chg="mod">
+          <ac:chgData name="Koen Derks" userId="42903d96-be75-4cec-9136-f3710e86cd30" providerId="ADAL" clId="{31252840-B54D-42F9-AADB-EFDB9C1D7E85}" dt="2021-04-26T22:10:20.772" v="1326" actId="20577"/>
+          <ac:spMkLst>
+            <pc:docMk/>
+            <pc:sldMk cId="0" sldId="257"/>
+            <ac:spMk id="139" creationId="{F2B32D8F-8679-461C-AB88-ED31B7806035}"/>
+          </ac:spMkLst>
+        </pc:spChg>
+        <pc:spChg chg="mod">
+          <ac:chgData name="Koen Derks" userId="42903d96-be75-4cec-9136-f3710e86cd30" providerId="ADAL" clId="{31252840-B54D-42F9-AADB-EFDB9C1D7E85}" dt="2021-04-26T22:03:57.632" v="1110" actId="14100"/>
+          <ac:spMkLst>
+            <pc:docMk/>
+            <pc:sldMk cId="0" sldId="257"/>
+            <ac:spMk id="143" creationId="{FB0763FA-753C-40C1-A1E4-7DA1DDA10072}"/>
+          </ac:spMkLst>
+        </pc:spChg>
+        <pc:spChg chg="mod">
+          <ac:chgData name="Koen Derks" userId="42903d96-be75-4cec-9136-f3710e86cd30" providerId="ADAL" clId="{31252840-B54D-42F9-AADB-EFDB9C1D7E85}" dt="2021-04-26T22:04:00.353" v="1111" actId="14100"/>
+          <ac:spMkLst>
+            <pc:docMk/>
+            <pc:sldMk cId="0" sldId="257"/>
+            <ac:spMk id="144" creationId="{9AF2C0F0-B69F-45A7-9DB4-1D7962C71414}"/>
+          </ac:spMkLst>
+        </pc:spChg>
+        <pc:spChg chg="mod">
+          <ac:chgData name="Koen Derks" userId="42903d96-be75-4cec-9136-f3710e86cd30" providerId="ADAL" clId="{31252840-B54D-42F9-AADB-EFDB9C1D7E85}" dt="2021-04-26T22:12:14.261" v="1330" actId="20577"/>
+          <ac:spMkLst>
+            <pc:docMk/>
+            <pc:sldMk cId="0" sldId="257"/>
+            <ac:spMk id="145" creationId="{130E5FF5-89E1-42AE-84ED-37821A67F183}"/>
+          </ac:spMkLst>
+        </pc:spChg>
+        <pc:spChg chg="mod">
+          <ac:chgData name="Koen Derks" userId="42903d96-be75-4cec-9136-f3710e86cd30" providerId="ADAL" clId="{31252840-B54D-42F9-AADB-EFDB9C1D7E85}" dt="2021-04-26T21:54:25.388" v="786" actId="20577"/>
+          <ac:spMkLst>
+            <pc:docMk/>
+            <pc:sldMk cId="0" sldId="257"/>
+            <ac:spMk id="323" creationId="{00000000-0000-0000-0000-000000000000}"/>
+          </ac:spMkLst>
+        </pc:spChg>
+        <pc:spChg chg="mod">
+          <ac:chgData name="Koen Derks" userId="42903d96-be75-4cec-9136-f3710e86cd30" providerId="ADAL" clId="{31252840-B54D-42F9-AADB-EFDB9C1D7E85}" dt="2021-04-26T22:04:18.966" v="1114" actId="14100"/>
+          <ac:spMkLst>
+            <pc:docMk/>
+            <pc:sldMk cId="0" sldId="257"/>
+            <ac:spMk id="341" creationId="{00000000-0000-0000-0000-000000000000}"/>
+          </ac:spMkLst>
+        </pc:spChg>
+        <pc:spChg chg="mod">
+          <ac:chgData name="Koen Derks" userId="42903d96-be75-4cec-9136-f3710e86cd30" providerId="ADAL" clId="{31252840-B54D-42F9-AADB-EFDB9C1D7E85}" dt="2021-04-26T22:03:54.297" v="1109" actId="14100"/>
           <ac:spMkLst>
             <pc:docMk/>
             <pc:sldMk cId="0" sldId="257"/>
@@ -3668,7 +3804,7 @@
         <p:spPr>
           <a:xfrm>
             <a:off x="323329" y="2021970"/>
-            <a:ext cx="2704008" cy="1568131"/>
+            <a:ext cx="2704008" cy="1616259"/>
           </a:xfrm>
           <a:prstGeom prst="rect">
             <a:avLst/>
@@ -3742,13 +3878,13 @@
               <a:rPr lang="nl-NL" dirty="0">
                 <a:latin typeface="+mn-lt"/>
               </a:rPr>
-              <a:t> is </a:t>
+              <a:t> </a:t>
             </a:r>
             <a:r>
               <a:rPr lang="nl-NL" dirty="0" err="1">
                 <a:latin typeface="+mn-lt"/>
               </a:rPr>
-              <a:t>developed</a:t>
+              <a:t>facilitates</a:t>
             </a:r>
             <a:r>
               <a:rPr lang="nl-NL" dirty="0">
@@ -3760,121 +3896,37 @@
               <a:rPr lang="nl-NL" dirty="0" err="1">
                 <a:latin typeface="+mn-lt"/>
               </a:rPr>
-              <a:t>to</a:t>
+              <a:t>statistical</a:t>
             </a:r>
             <a:r>
               <a:rPr lang="nl-NL" dirty="0">
                 <a:latin typeface="+mn-lt"/>
               </a:rPr>
-              <a:t> </a:t>
+              <a:t> planning, </a:t>
             </a:r>
             <a:r>
               <a:rPr lang="nl-NL" dirty="0" err="1">
                 <a:latin typeface="+mn-lt"/>
               </a:rPr>
-              <a:t>facilitate</a:t>
+              <a:t>selection</a:t>
             </a:r>
             <a:r>
               <a:rPr lang="nl-NL" dirty="0">
                 <a:latin typeface="+mn-lt"/>
               </a:rPr>
-              <a:t> planning, </a:t>
+              <a:t>, and </a:t>
             </a:r>
             <a:r>
               <a:rPr lang="nl-NL" dirty="0" err="1">
                 <a:latin typeface="+mn-lt"/>
               </a:rPr>
-              <a:t>selection</a:t>
+              <a:t>evaluation</a:t>
             </a:r>
             <a:r>
               <a:rPr lang="nl-NL" dirty="0">
                 <a:latin typeface="+mn-lt"/>
               </a:rPr>
-              <a:t>, and </a:t>
-            </a:r>
-            <a:r>
-              <a:rPr lang="nl-NL" dirty="0" err="1">
-                <a:latin typeface="+mn-lt"/>
-              </a:rPr>
-              <a:t>evaluation</a:t>
-            </a:r>
-            <a:r>
-              <a:rPr lang="nl-NL" dirty="0">
-                <a:latin typeface="+mn-lt"/>
-              </a:rPr>
-              <a:t> of </a:t>
-            </a:r>
-            <a:r>
-              <a:rPr lang="nl-NL" dirty="0" err="1">
-                <a:latin typeface="+mn-lt"/>
-              </a:rPr>
-              <a:t>statistical</a:t>
-            </a:r>
-            <a:r>
-              <a:rPr lang="nl-NL" dirty="0">
-                <a:latin typeface="+mn-lt"/>
-              </a:rPr>
-              <a:t> audit samples in </a:t>
-            </a:r>
-            <a:r>
-              <a:rPr lang="nl-NL" dirty="0" err="1">
-                <a:latin typeface="+mn-lt"/>
-              </a:rPr>
-              <a:t>both</a:t>
-            </a:r>
-            <a:r>
-              <a:rPr lang="nl-NL" dirty="0">
-                <a:latin typeface="+mn-lt"/>
-              </a:rPr>
-              <a:t> </a:t>
-            </a:r>
-            <a:r>
-              <a:rPr lang="nl-NL" dirty="0" err="1">
-                <a:latin typeface="+mn-lt"/>
-              </a:rPr>
-              <a:t>its</a:t>
-            </a:r>
-            <a:r>
-              <a:rPr lang="nl-NL" dirty="0">
-                <a:latin typeface="+mn-lt"/>
-              </a:rPr>
-              <a:t> </a:t>
-            </a:r>
-            <a:r>
-              <a:rPr lang="nl-NL" dirty="0" err="1">
-                <a:latin typeface="+mn-lt"/>
-              </a:rPr>
-              <a:t>Bayesian</a:t>
-            </a:r>
-            <a:r>
-              <a:rPr lang="nl-NL" dirty="0">
-                <a:latin typeface="+mn-lt"/>
-              </a:rPr>
-              <a:t> and </a:t>
-            </a:r>
-            <a:r>
-              <a:rPr lang="nl-NL" dirty="0" err="1">
-                <a:latin typeface="+mn-lt"/>
-              </a:rPr>
-              <a:t>classical</a:t>
-            </a:r>
-            <a:r>
-              <a:rPr lang="nl-NL" dirty="0">
-                <a:latin typeface="+mn-lt"/>
-              </a:rPr>
-              <a:t> </a:t>
-            </a:r>
-            <a:r>
-              <a:rPr lang="nl-NL" dirty="0" err="1">
-                <a:latin typeface="+mn-lt"/>
-              </a:rPr>
-              <a:t>manifestations</a:t>
-            </a:r>
-            <a:r>
-              <a:rPr lang="nl-NL" dirty="0">
-                <a:latin typeface="+mn-lt"/>
-              </a:rPr>
-              <a:t>.  </a:t>
+              <a:t> of audit samples. </a:t>
             </a:r>
           </a:p>
           <a:p>
@@ -3945,7 +3997,7 @@
               <a:rPr lang="nl-NL" dirty="0" err="1">
                 <a:latin typeface="+mn-lt"/>
               </a:rPr>
-              <a:t>main</a:t>
+              <a:t>functions</a:t>
             </a:r>
             <a:r>
               <a:rPr lang="nl-NL" dirty="0">
@@ -3957,7 +4009,7 @@
               <a:rPr lang="nl-NL" dirty="0" err="1">
                 <a:latin typeface="+mn-lt"/>
               </a:rPr>
-              <a:t>functions</a:t>
+              <a:t>that</a:t>
             </a:r>
             <a:r>
               <a:rPr lang="nl-NL" dirty="0">
@@ -3969,120 +4021,110 @@
               <a:rPr lang="nl-NL" dirty="0" err="1">
                 <a:latin typeface="+mn-lt"/>
               </a:rPr>
-              <a:t>that</a:t>
+              <a:t>allow</a:t>
             </a:r>
             <a:r>
               <a:rPr lang="nl-NL" dirty="0">
                 <a:latin typeface="+mn-lt"/>
               </a:rPr>
+              <a:t> users </a:t>
+            </a:r>
+            <a:r>
+              <a:rPr lang="nl-NL" dirty="0" err="1">
+                <a:latin typeface="+mn-lt"/>
+              </a:rPr>
+              <a:t>to</a:t>
+            </a:r>
+            <a:r>
+              <a:rPr lang="nl-NL" dirty="0">
+                <a:latin typeface="+mn-lt"/>
+              </a:rPr>
               <a:t> </a:t>
             </a:r>
             <a:r>
-              <a:rPr lang="nl-NL" b="0" dirty="0" err="1">
-                <a:latin typeface="+mn-lt"/>
-              </a:rPr>
-              <a:t>can</a:t>
-            </a:r>
-            <a:r>
-              <a:rPr lang="nl-NL" b="0" dirty="0">
+              <a:rPr lang="nl-NL" dirty="0" err="1">
+                <a:latin typeface="+mn-lt"/>
+              </a:rPr>
+              <a:t>easily</a:t>
+            </a:r>
+            <a:r>
+              <a:rPr lang="nl-NL" dirty="0">
                 <a:latin typeface="+mn-lt"/>
               </a:rPr>
               <a:t> </a:t>
             </a:r>
             <a:r>
-              <a:rPr lang="nl-NL" b="0" dirty="0" err="1">
-                <a:latin typeface="+mn-lt"/>
-              </a:rPr>
-              <a:t>be</a:t>
-            </a:r>
-            <a:r>
-              <a:rPr lang="nl-NL" b="0" dirty="0">
+              <a:rPr lang="nl-NL" dirty="0" err="1">
+                <a:latin typeface="+mn-lt"/>
+              </a:rPr>
+              <a:t>apply</a:t>
+            </a:r>
+            <a:r>
+              <a:rPr lang="nl-NL" dirty="0">
                 <a:latin typeface="+mn-lt"/>
               </a:rPr>
               <a:t> </a:t>
             </a:r>
             <a:r>
-              <a:rPr lang="nl-NL" b="0" dirty="0" err="1">
-                <a:latin typeface="+mn-lt"/>
-              </a:rPr>
-              <a:t>used</a:t>
-            </a:r>
-            <a:r>
-              <a:rPr lang="nl-NL" b="0" dirty="0">
-                <a:latin typeface="+mn-lt"/>
-              </a:rPr>
-              <a:t> in order </a:t>
-            </a:r>
-            <a:r>
-              <a:rPr lang="nl-NL" b="0" dirty="0" err="1">
-                <a:latin typeface="+mn-lt"/>
-              </a:rPr>
-              <a:t>to</a:t>
-            </a:r>
-            <a:r>
-              <a:rPr lang="nl-NL" b="0" dirty="0">
+              <a:rPr lang="nl-NL" dirty="0" err="1">
+                <a:latin typeface="+mn-lt"/>
+              </a:rPr>
+              <a:t>Bayesian</a:t>
+            </a:r>
+            <a:r>
+              <a:rPr lang="nl-NL" dirty="0">
+                <a:latin typeface="+mn-lt"/>
+              </a:rPr>
+              <a:t> or </a:t>
+            </a:r>
+            <a:r>
+              <a:rPr lang="nl-NL" dirty="0" err="1">
+                <a:latin typeface="+mn-lt"/>
+              </a:rPr>
+              <a:t>classical</a:t>
+            </a:r>
+            <a:r>
+              <a:rPr lang="nl-NL" dirty="0">
                 <a:latin typeface="+mn-lt"/>
               </a:rPr>
               <a:t> </a:t>
             </a:r>
             <a:r>
-              <a:rPr lang="nl-NL" b="0" dirty="0" err="1">
-                <a:latin typeface="+mn-lt"/>
-              </a:rPr>
-              <a:t>facilitate</a:t>
-            </a:r>
-            <a:r>
-              <a:rPr lang="nl-NL" b="0" dirty="0">
+              <a:rPr lang="nl-NL" dirty="0" err="1">
+                <a:latin typeface="+mn-lt"/>
+              </a:rPr>
+              <a:t>probability</a:t>
+            </a:r>
+            <a:r>
+              <a:rPr lang="nl-NL" dirty="0">
                 <a:latin typeface="+mn-lt"/>
               </a:rPr>
               <a:t> </a:t>
             </a:r>
             <a:r>
-              <a:rPr lang="nl-NL" b="0" dirty="0" err="1">
-                <a:latin typeface="+mn-lt"/>
-              </a:rPr>
-              <a:t>an</a:t>
-            </a:r>
-            <a:r>
-              <a:rPr lang="nl-NL" b="0" dirty="0">
-                <a:latin typeface="+mn-lt"/>
-              </a:rPr>
-              <a:t> </a:t>
-            </a:r>
-            <a:r>
-              <a:rPr lang="nl-NL" b="0" dirty="0" err="1">
-                <a:latin typeface="+mn-lt"/>
-              </a:rPr>
-              <a:t>efficient</a:t>
-            </a:r>
-            <a:r>
-              <a:rPr lang="nl-NL" b="0" dirty="0">
-                <a:latin typeface="+mn-lt"/>
-              </a:rPr>
-              <a:t> audit sampling workflow.</a:t>
-            </a:r>
-          </a:p>
-          <a:p>
-            <a:pPr algn="just">
-              <a:lnSpc>
-                <a:spcPct val="90000"/>
-              </a:lnSpc>
-              <a:spcBef>
-                <a:spcPts val="0"/>
-              </a:spcBef>
-              <a:buClr>
-                <a:schemeClr val="accent4">
-                  <a:hueOff val="384618"/>
-                  <a:satOff val="3869"/>
-                  <a:lumOff val="5802"/>
-                </a:schemeClr>
-              </a:buClr>
-              <a:defRPr b="0">
-                <a:solidFill>
-                  <a:srgbClr val="000000"/>
-                </a:solidFill>
-              </a:defRPr>
-            </a:pPr>
+              <a:rPr lang="nl-NL" dirty="0" err="1">
+                <a:latin typeface="+mn-lt"/>
+              </a:rPr>
+              <a:t>theory</a:t>
+            </a:r>
+            <a:r>
+              <a:rPr lang="nl-NL" dirty="0">
+                <a:latin typeface="+mn-lt"/>
+              </a:rPr>
+              <a:t> in </a:t>
+            </a:r>
+            <a:r>
+              <a:rPr lang="nl-NL" dirty="0" err="1">
+                <a:latin typeface="+mn-lt"/>
+              </a:rPr>
+              <a:t>the</a:t>
+            </a:r>
+            <a:r>
+              <a:rPr lang="nl-NL" dirty="0">
+                <a:latin typeface="+mn-lt"/>
+              </a:rPr>
+              <a:t> standard  audit sampling workflow.</a:t>
+            </a:r>
             <a:endParaRPr lang="nl-NL" b="0" dirty="0">
               <a:latin typeface="+mn-lt"/>
             </a:endParaRPr>
@@ -4249,7 +4291,7 @@
         <p:spPr>
           <a:xfrm>
             <a:off x="4796180" y="2291473"/>
-            <a:ext cx="5493253" cy="851947"/>
+            <a:ext cx="5613573" cy="856564"/>
           </a:xfrm>
           <a:prstGeom prst="rect">
             <a:avLst/>
@@ -4301,7 +4343,27 @@
                 <a:effectLst/>
                 <a:latin typeface="+mn-lt"/>
               </a:rPr>
-              <a:t>This function creates a prior distribution for Bayesian audit sampling in which several different types of audit information can be incorporated.</a:t>
+              <a:t>This function creates a prior distribution for the misstatement in the population based on audit evidence specified via the </a:t>
+            </a:r>
+            <a:r>
+              <a:rPr lang="en-US" b="0" dirty="0">
+                <a:solidFill>
+                  <a:schemeClr val="accent1"/>
+                </a:solidFill>
+                <a:latin typeface="Courier New" panose="02070309020205020404" pitchFamily="49" charset="0"/>
+                <a:cs typeface="Courier New" panose="02070309020205020404" pitchFamily="49" charset="0"/>
+              </a:rPr>
+              <a:t>method</a:t>
+            </a:r>
+            <a:r>
+              <a:rPr lang="en-US" b="0" i="0" dirty="0">
+                <a:solidFill>
+                  <a:srgbClr val="000000"/>
+                </a:solidFill>
+                <a:effectLst/>
+                <a:latin typeface="+mn-lt"/>
+              </a:rPr>
+              <a:t> argument.</a:t>
             </a:r>
           </a:p>
           <a:p>
@@ -4407,8 +4469,8 @@
         </p:nvSpPr>
         <p:spPr>
           <a:xfrm>
-            <a:off x="10409753" y="2332459"/>
-            <a:ext cx="3178078" cy="571871"/>
+            <a:off x="10503567" y="2356523"/>
+            <a:ext cx="3143104" cy="571871"/>
           </a:xfrm>
           <a:prstGeom prst="rect">
             <a:avLst/>
@@ -4486,7 +4548,7 @@
                 <a:latin typeface="Courier New" panose="02070309020205020404" pitchFamily="49" charset="0"/>
                 <a:cs typeface="Courier New" panose="02070309020205020404" pitchFamily="49" charset="0"/>
               </a:rPr>
-              <a:t>materiality</a:t>
+              <a:t>confidence</a:t>
             </a:r>
             <a:r>
               <a:rPr lang="nl-NL" sz="1000" dirty="0">
@@ -4498,24 +4560,19 @@
                 <a:latin typeface="Courier New" panose="02070309020205020404" pitchFamily="49" charset="0"/>
                 <a:cs typeface="Courier New" panose="02070309020205020404" pitchFamily="49" charset="0"/>
               </a:rPr>
-              <a:t> = 0.05,</a:t>
-            </a:r>
-          </a:p>
-          <a:p>
-            <a:pPr>
-              <a:spcBef>
-                <a:spcPts val="0"/>
-              </a:spcBef>
-              <a:defRPr b="0">
-                <a:solidFill>
-                  <a:srgbClr val="000000"/>
-                </a:solidFill>
-                <a:latin typeface="Menlo"/>
-                <a:ea typeface="Menlo"/>
-                <a:cs typeface="Menlo"/>
-                <a:sym typeface="Menlo"/>
-              </a:defRPr>
-            </a:pPr>
+              <a:t> = 0.95,</a:t>
+            </a:r>
+            <a:br>
+              <a:rPr lang="nl-NL" sz="1000" dirty="0">
+                <a:solidFill>
+                  <a:schemeClr val="tx1">
+                    <a:lumMod val="50000"/>
+                  </a:schemeClr>
+                </a:solidFill>
+                <a:latin typeface="Courier New" panose="02070309020205020404" pitchFamily="49" charset="0"/>
+                <a:cs typeface="Courier New" panose="02070309020205020404" pitchFamily="49" charset="0"/>
+              </a:rPr>
+            </a:br>
             <a:r>
               <a:rPr lang="nl-NL" sz="1000" dirty="0">
                 <a:solidFill>
@@ -5320,7 +5377,7 @@
         <p:spPr>
           <a:xfrm>
             <a:off x="4798452" y="3875064"/>
-            <a:ext cx="5490981" cy="1188963"/>
+            <a:ext cx="5567197" cy="1022763"/>
           </a:xfrm>
           <a:prstGeom prst="rect">
             <a:avLst/>
@@ -5372,7 +5429,7 @@
                 <a:effectLst/>
                 <a:latin typeface="+mn-lt"/>
               </a:rPr>
-              <a:t>Given the allocated performance materiality or the minimum precision, </a:t>
+              <a:t>Given a performance materiality or a minimum precision, </a:t>
             </a:r>
             <a:r>
               <a:rPr lang="en-US" b="0" dirty="0">
@@ -5391,7 +5448,26 @@
                 <a:effectLst/>
                 <a:latin typeface="+mn-lt"/>
               </a:rPr>
-              <a:t>his function calculates the required sample size for an audit, based on the </a:t>
+              <a:t>his function calculates the minimum sample size </a:t>
+            </a:r>
+            <a:r>
+              <a:rPr lang="en-US" b="0" dirty="0">
+                <a:solidFill>
+                  <a:srgbClr val="000000"/>
+                </a:solidFill>
+                <a:latin typeface="+mn-lt"/>
+              </a:rPr>
+              <a:t>to achieve these objectives</a:t>
+            </a:r>
+            <a:r>
+              <a:rPr lang="en-US" b="0" i="0" dirty="0">
+                <a:solidFill>
+                  <a:srgbClr val="000000"/>
+                </a:solidFill>
+                <a:effectLst/>
+                <a:latin typeface="+mn-lt"/>
+              </a:rPr>
+              <a:t> based on the </a:t>
             </a:r>
             <a:r>
               <a:rPr lang="en-US" b="0" dirty="0">
@@ -5554,7 +5630,7 @@
         <p:spPr>
           <a:xfrm>
             <a:off x="4793460" y="3280844"/>
-            <a:ext cx="3701334" cy="277127"/>
+            <a:ext cx="3826368" cy="277127"/>
           </a:xfrm>
           <a:prstGeom prst="rect">
             <a:avLst/>
@@ -5588,82 +5664,15 @@
               </a:defRPr>
             </a:pPr>
             <a:r>
-              <a:rPr lang="nl-NL" sz="2000" dirty="0" err="1">
+              <a:rPr lang="en-US" sz="2000" dirty="0">
                 <a:solidFill>
                   <a:schemeClr val="tx1">
                     <a:lumMod val="50000"/>
                   </a:schemeClr>
                 </a:solidFill>
               </a:rPr>
-              <a:t>Calculate</a:t>
-            </a:r>
-            <a:r>
-              <a:rPr lang="nl-NL" sz="2000" dirty="0">
-                <a:solidFill>
-                  <a:schemeClr val="tx1">
-                    <a:lumMod val="50000"/>
-                  </a:schemeClr>
-                </a:solidFill>
-              </a:rPr>
-              <a:t> </a:t>
-            </a:r>
-            <a:r>
-              <a:rPr lang="nl-NL" sz="2000" dirty="0" err="1">
-                <a:solidFill>
-                  <a:schemeClr val="tx1">
-                    <a:lumMod val="50000"/>
-                  </a:schemeClr>
-                </a:solidFill>
-              </a:rPr>
-              <a:t>the</a:t>
-            </a:r>
-            <a:r>
-              <a:rPr lang="nl-NL" sz="2000" dirty="0">
-                <a:solidFill>
-                  <a:schemeClr val="tx1">
-                    <a:lumMod val="50000"/>
-                  </a:schemeClr>
-                </a:solidFill>
-              </a:rPr>
-              <a:t> </a:t>
-            </a:r>
-            <a:r>
-              <a:rPr lang="nl-NL" sz="2000" dirty="0" err="1">
-                <a:solidFill>
-                  <a:schemeClr val="tx1">
-                    <a:lumMod val="50000"/>
-                  </a:schemeClr>
-                </a:solidFill>
-              </a:rPr>
-              <a:t>required</a:t>
-            </a:r>
-            <a:r>
-              <a:rPr lang="nl-NL" sz="2000" dirty="0">
-                <a:solidFill>
-                  <a:schemeClr val="tx1">
-                    <a:lumMod val="50000"/>
-                  </a:schemeClr>
-                </a:solidFill>
-              </a:rPr>
-              <a:t> sample </a:t>
-            </a:r>
-            <a:r>
-              <a:rPr lang="nl-NL" sz="2000" dirty="0" err="1">
-                <a:solidFill>
-                  <a:schemeClr val="tx1">
-                    <a:lumMod val="50000"/>
-                  </a:schemeClr>
-                </a:solidFill>
-              </a:rPr>
-              <a:t>size</a:t>
-            </a:r>
-            <a:endParaRPr sz="2000" dirty="0">
-              <a:solidFill>
-                <a:schemeClr val="tx1">
-                  <a:lumMod val="50000"/>
-                </a:schemeClr>
-              </a:solidFill>
-            </a:endParaRPr>
+              <a:t>Calculate the minimum sample size</a:t>
+            </a:r>
           </a:p>
         </p:txBody>
       </p:sp>
@@ -6153,7 +6162,7 @@
         <p:spPr>
           <a:xfrm>
             <a:off x="4800724" y="5731817"/>
-            <a:ext cx="5488709" cy="775003"/>
+            <a:ext cx="5564925" cy="775003"/>
           </a:xfrm>
           <a:prstGeom prst="rect">
             <a:avLst/>
@@ -6267,7 +6276,7 @@
         <p:spPr>
           <a:xfrm>
             <a:off x="4795732" y="5137597"/>
-            <a:ext cx="4220707" cy="277127"/>
+            <a:ext cx="4921219" cy="277127"/>
           </a:xfrm>
           <a:prstGeom prst="rect">
             <a:avLst/>
@@ -6388,7 +6397,17 @@
                   </a:schemeClr>
                 </a:solidFill>
               </a:rPr>
-              <a:t> data</a:t>
+              <a:t> </a:t>
+            </a:r>
+            <a:r>
+              <a:rPr lang="nl-NL" sz="2000" dirty="0" err="1">
+                <a:solidFill>
+                  <a:schemeClr val="tx1">
+                    <a:lumMod val="50000"/>
+                  </a:schemeClr>
+                </a:solidFill>
+              </a:rPr>
+              <a:t>population</a:t>
             </a:r>
             <a:endParaRPr sz="2000" dirty="0">
               <a:solidFill>
@@ -6912,7 +6931,7 @@
         <p:spPr>
           <a:xfrm>
             <a:off x="4802996" y="7343814"/>
-            <a:ext cx="5486437" cy="1188963"/>
+            <a:ext cx="5562653" cy="1188963"/>
           </a:xfrm>
           <a:prstGeom prst="rect">
             <a:avLst/>
@@ -6963,7 +6982,7 @@
                 <a:cs typeface="Source Sans Pro"/>
                 <a:sym typeface="Source Sans Pro"/>
               </a:rPr>
-              <a:t>This function takes a data frame (using </a:t>
+              <a:t>This function takes a data sample (using </a:t>
             </a:r>
             <a:r>
               <a:rPr lang="en-US" dirty="0">
@@ -7023,7 +7042,7 @@
                 <a:cs typeface="Source Sans Pro"/>
                 <a:sym typeface="Source Sans Pro"/>
               </a:rPr>
-              <a:t>) or summary statistics (using </a:t>
+              <a:t>) or summary statistics from a sample (using </a:t>
             </a:r>
             <a:r>
               <a:rPr lang="en-US" dirty="0" err="1">
@@ -7063,7 +7082,7 @@
                 <a:cs typeface="Source Sans Pro"/>
                 <a:sym typeface="Source Sans Pro"/>
               </a:rPr>
-              <a:t>) and calculates the most likely error and upper confidence bound on the misstatement according to the specified </a:t>
+              <a:t>) and performs statistical evaluation on the misstatement in the population according to the specified </a:t>
             </a:r>
             <a:r>
               <a:rPr lang="en-US" dirty="0">
@@ -7162,7 +7181,7 @@
                 </a:solidFill>
                 <a:latin typeface="+mn-lt"/>
               </a:rPr>
-              <a:t>: An object returned by the </a:t>
+              <a:t>: An object returned by </a:t>
             </a:r>
             <a:r>
               <a:rPr lang="en-US" b="0" dirty="0" err="1">
@@ -7191,7 +7210,7 @@
                 </a:solidFill>
                 <a:latin typeface="+mn-lt"/>
               </a:rPr>
-              <a:t> function that specifies the prior.</a:t>
+              <a:t> that specifies the prior distribution.</a:t>
             </a:r>
             <a:endParaRPr lang="en-US" dirty="0">
               <a:latin typeface="+mn-lt"/>
@@ -7900,7 +7919,7 @@
                 <a:cs typeface="Source Sans Pro"/>
                 <a:sym typeface="Source Sans Pro"/>
               </a:rPr>
-              <a:t>, creates a report containing the results, and saves the report to a file in your working directory.</a:t>
+              <a:t> and creates a report containing the statistical results their interpretation.</a:t>
             </a:r>
             <a:endParaRPr dirty="0">
               <a:latin typeface="+mn-lt"/>
@@ -8405,8 +8424,8 @@
         </p:nvSpPr>
         <p:spPr>
           <a:xfrm>
-            <a:off x="10397721" y="3926057"/>
-            <a:ext cx="3178078" cy="725759"/>
+            <a:off x="10503567" y="3945369"/>
+            <a:ext cx="3143104" cy="879647"/>
           </a:xfrm>
           <a:prstGeom prst="rect">
             <a:avLst/>
@@ -8472,6 +8491,58 @@
                 <a:latin typeface="Courier New" panose="02070309020205020404" pitchFamily="49" charset="0"/>
                 <a:cs typeface="Courier New" panose="02070309020205020404" pitchFamily="49" charset="0"/>
               </a:rPr>
+              <a:t>confidence</a:t>
+            </a:r>
+            <a:r>
+              <a:rPr lang="nl-NL" sz="1000" dirty="0">
+                <a:solidFill>
+                  <a:schemeClr val="tx1">
+                    <a:lumMod val="50000"/>
+                  </a:schemeClr>
+                </a:solidFill>
+                <a:latin typeface="Courier New" panose="02070309020205020404" pitchFamily="49" charset="0"/>
+                <a:cs typeface="Courier New" panose="02070309020205020404" pitchFamily="49" charset="0"/>
+              </a:rPr>
+              <a:t> = 0.95,</a:t>
+            </a:r>
+          </a:p>
+          <a:p>
+            <a:pPr>
+              <a:spcBef>
+                <a:spcPts val="0"/>
+              </a:spcBef>
+              <a:defRPr b="0">
+                <a:solidFill>
+                  <a:srgbClr val="000000"/>
+                </a:solidFill>
+                <a:latin typeface="Menlo"/>
+                <a:ea typeface="Menlo"/>
+                <a:cs typeface="Menlo"/>
+                <a:sym typeface="Menlo"/>
+              </a:defRPr>
+            </a:pPr>
+            <a:r>
+              <a:rPr lang="nl-NL" sz="1000" dirty="0">
+                <a:solidFill>
+                  <a:schemeClr val="tx1">
+                    <a:lumMod val="50000"/>
+                  </a:schemeClr>
+                </a:solidFill>
+                <a:latin typeface="Courier New" panose="02070309020205020404" pitchFamily="49" charset="0"/>
+                <a:cs typeface="Courier New" panose="02070309020205020404" pitchFamily="49" charset="0"/>
+              </a:rPr>
+              <a:t>         </a:t>
+            </a:r>
+            <a:r>
+              <a:rPr lang="nl-NL" sz="1000" dirty="0" err="1">
+                <a:solidFill>
+                  <a:schemeClr val="tx1">
+                    <a:lumMod val="50000"/>
+                  </a:schemeClr>
+                </a:solidFill>
+                <a:latin typeface="Courier New" panose="02070309020205020404" pitchFamily="49" charset="0"/>
+                <a:cs typeface="Courier New" panose="02070309020205020404" pitchFamily="49" charset="0"/>
+              </a:rPr>
               <a:t>materiality</a:t>
             </a:r>
             <a:r>
@@ -8668,8 +8739,8 @@
         </p:nvSpPr>
         <p:spPr>
           <a:xfrm>
-            <a:off x="10409753" y="5787867"/>
-            <a:ext cx="3178078" cy="725759"/>
+            <a:off x="10503567" y="5787867"/>
+            <a:ext cx="3143104" cy="725759"/>
           </a:xfrm>
           <a:prstGeom prst="rect">
             <a:avLst/>
@@ -8934,8 +9005,8 @@
         </p:nvSpPr>
         <p:spPr>
           <a:xfrm>
-            <a:off x="10409752" y="7382463"/>
-            <a:ext cx="3166047" cy="879647"/>
+            <a:off x="10503567" y="7382463"/>
+            <a:ext cx="3143103" cy="879647"/>
           </a:xfrm>
           <a:prstGeom prst="rect">
             <a:avLst/>
@@ -9001,7 +9072,7 @@
                 <a:latin typeface="Courier New" panose="02070309020205020404" pitchFamily="49" charset="0"/>
                 <a:cs typeface="Courier New" panose="02070309020205020404" pitchFamily="49" charset="0"/>
               </a:rPr>
-              <a:t>(sample = </a:t>
+              <a:t>(</a:t>
             </a:r>
             <a:r>
               <a:rPr lang="nl-NL" sz="1000" dirty="0" err="1">
@@ -9013,7 +9084,7 @@
                 <a:latin typeface="Courier New" panose="02070309020205020404" pitchFamily="49" charset="0"/>
                 <a:cs typeface="Courier New" panose="02070309020205020404" pitchFamily="49" charset="0"/>
               </a:rPr>
-              <a:t>selectionResult</a:t>
+              <a:t>confidence</a:t>
             </a:r>
             <a:r>
               <a:rPr lang="nl-NL" sz="1000" dirty="0">
@@ -9025,7 +9096,7 @@
                 <a:latin typeface="Courier New" panose="02070309020205020404" pitchFamily="49" charset="0"/>
                 <a:cs typeface="Courier New" panose="02070309020205020404" pitchFamily="49" charset="0"/>
               </a:rPr>
-              <a:t>,</a:t>
+              <a:t> = 0.95,</a:t>
             </a:r>
           </a:p>
           <a:p>
@@ -9065,7 +9136,7 @@
                 <a:latin typeface="Courier New" panose="02070309020205020404" pitchFamily="49" charset="0"/>
                 <a:cs typeface="Courier New" panose="02070309020205020404" pitchFamily="49" charset="0"/>
               </a:rPr>
-              <a:t>bookValues</a:t>
+              <a:t>materiality</a:t>
             </a:r>
             <a:r>
               <a:rPr lang="nl-NL" sz="1000" dirty="0">
@@ -9077,31 +9148,7 @@
                 <a:latin typeface="Courier New" panose="02070309020205020404" pitchFamily="49" charset="0"/>
                 <a:cs typeface="Courier New" panose="02070309020205020404" pitchFamily="49" charset="0"/>
               </a:rPr>
-              <a:t> = '</a:t>
-            </a:r>
-            <a:r>
-              <a:rPr lang="nl-NL" sz="1000" dirty="0" err="1">
-                <a:solidFill>
-                  <a:schemeClr val="tx1">
-                    <a:lumMod val="50000"/>
-                  </a:schemeClr>
-                </a:solidFill>
-                <a:latin typeface="Courier New" panose="02070309020205020404" pitchFamily="49" charset="0"/>
-                <a:cs typeface="Courier New" panose="02070309020205020404" pitchFamily="49" charset="0"/>
-              </a:rPr>
-              <a:t>bookValue</a:t>
-            </a:r>
-            <a:r>
-              <a:rPr lang="nl-NL" sz="1000" dirty="0">
-                <a:solidFill>
-                  <a:schemeClr val="tx1">
-                    <a:lumMod val="50000"/>
-                  </a:schemeClr>
-                </a:solidFill>
-                <a:latin typeface="Courier New" panose="02070309020205020404" pitchFamily="49" charset="0"/>
-                <a:cs typeface="Courier New" panose="02070309020205020404" pitchFamily="49" charset="0"/>
-              </a:rPr>
-              <a:t>',</a:t>
+              <a:t> = 0.05,</a:t>
             </a:r>
           </a:p>
           <a:p>
@@ -9141,7 +9188,7 @@
                 <a:latin typeface="Courier New" panose="02070309020205020404" pitchFamily="49" charset="0"/>
                 <a:cs typeface="Courier New" panose="02070309020205020404" pitchFamily="49" charset="0"/>
               </a:rPr>
-              <a:t>auditValues</a:t>
+              <a:t>nSumstats</a:t>
             </a:r>
             <a:r>
               <a:rPr lang="nl-NL" sz="1000" dirty="0">
@@ -9153,31 +9200,7 @@
                 <a:latin typeface="Courier New" panose="02070309020205020404" pitchFamily="49" charset="0"/>
                 <a:cs typeface="Courier New" panose="02070309020205020404" pitchFamily="49" charset="0"/>
               </a:rPr>
-              <a:t> = '</a:t>
-            </a:r>
-            <a:r>
-              <a:rPr lang="nl-NL" sz="1000" dirty="0" err="1">
-                <a:solidFill>
-                  <a:schemeClr val="tx1">
-                    <a:lumMod val="50000"/>
-                  </a:schemeClr>
-                </a:solidFill>
-                <a:latin typeface="Courier New" panose="02070309020205020404" pitchFamily="49" charset="0"/>
-                <a:cs typeface="Courier New" panose="02070309020205020404" pitchFamily="49" charset="0"/>
-              </a:rPr>
-              <a:t>auditValue</a:t>
-            </a:r>
-            <a:r>
-              <a:rPr lang="nl-NL" sz="1000" dirty="0">
-                <a:solidFill>
-                  <a:schemeClr val="tx1">
-                    <a:lumMod val="50000"/>
-                  </a:schemeClr>
-                </a:solidFill>
-                <a:latin typeface="Courier New" panose="02070309020205020404" pitchFamily="49" charset="0"/>
-                <a:cs typeface="Courier New" panose="02070309020205020404" pitchFamily="49" charset="0"/>
-              </a:rPr>
-              <a:t>',</a:t>
+              <a:t> = 93,</a:t>
             </a:r>
           </a:p>
           <a:p>
@@ -9217,7 +9240,7 @@
                 <a:latin typeface="Courier New" panose="02070309020205020404" pitchFamily="49" charset="0"/>
                 <a:cs typeface="Courier New" panose="02070309020205020404" pitchFamily="49" charset="0"/>
               </a:rPr>
-              <a:t>method</a:t>
+              <a:t>kSumstats</a:t>
             </a:r>
             <a:r>
               <a:rPr lang="nl-NL" sz="1000" dirty="0">
@@ -9229,31 +9252,7 @@
                 <a:latin typeface="Courier New" panose="02070309020205020404" pitchFamily="49" charset="0"/>
                 <a:cs typeface="Courier New" panose="02070309020205020404" pitchFamily="49" charset="0"/>
               </a:rPr>
-              <a:t> = '</a:t>
-            </a:r>
-            <a:r>
-              <a:rPr lang="nl-NL" sz="1000" dirty="0" err="1">
-                <a:solidFill>
-                  <a:schemeClr val="tx1">
-                    <a:lumMod val="50000"/>
-                  </a:schemeClr>
-                </a:solidFill>
-                <a:latin typeface="Courier New" panose="02070309020205020404" pitchFamily="49" charset="0"/>
-                <a:cs typeface="Courier New" panose="02070309020205020404" pitchFamily="49" charset="0"/>
-              </a:rPr>
-              <a:t>stringer</a:t>
-            </a:r>
-            <a:r>
-              <a:rPr lang="nl-NL" sz="1000" dirty="0">
-                <a:solidFill>
-                  <a:schemeClr val="tx1">
-                    <a:lumMod val="50000"/>
-                  </a:schemeClr>
-                </a:solidFill>
-                <a:latin typeface="Courier New" panose="02070309020205020404" pitchFamily="49" charset="0"/>
-                <a:cs typeface="Courier New" panose="02070309020205020404" pitchFamily="49" charset="0"/>
-              </a:rPr>
-              <a:t>',</a:t>
+              <a:t> = 0,</a:t>
             </a:r>
           </a:p>
           <a:p>
@@ -9293,7 +9292,7 @@
                 <a:latin typeface="Courier New" panose="02070309020205020404" pitchFamily="49" charset="0"/>
                 <a:cs typeface="Courier New" panose="02070309020205020404" pitchFamily="49" charset="0"/>
               </a:rPr>
-              <a:t>materiality</a:t>
+              <a:t>method</a:t>
             </a:r>
             <a:r>
               <a:rPr lang="nl-NL" sz="1000" dirty="0">
@@ -9305,7 +9304,31 @@
                 <a:latin typeface="Courier New" panose="02070309020205020404" pitchFamily="49" charset="0"/>
                 <a:cs typeface="Courier New" panose="02070309020205020404" pitchFamily="49" charset="0"/>
               </a:rPr>
-              <a:t> = 0.05, ...)</a:t>
+              <a:t> = '</a:t>
+            </a:r>
+            <a:r>
+              <a:rPr lang="nl-NL" sz="1000" dirty="0" err="1">
+                <a:solidFill>
+                  <a:schemeClr val="tx1">
+                    <a:lumMod val="50000"/>
+                  </a:schemeClr>
+                </a:solidFill>
+                <a:latin typeface="Courier New" panose="02070309020205020404" pitchFamily="49" charset="0"/>
+                <a:cs typeface="Courier New" panose="02070309020205020404" pitchFamily="49" charset="0"/>
+              </a:rPr>
+              <a:t>binomial</a:t>
+            </a:r>
+            <a:r>
+              <a:rPr lang="nl-NL" sz="1000" dirty="0">
+                <a:solidFill>
+                  <a:schemeClr val="tx1">
+                    <a:lumMod val="50000"/>
+                  </a:schemeClr>
+                </a:solidFill>
+                <a:latin typeface="Courier New" panose="02070309020205020404" pitchFamily="49" charset="0"/>
+                <a:cs typeface="Courier New" panose="02070309020205020404" pitchFamily="49" charset="0"/>
+              </a:rPr>
+              <a:t>', ...)</a:t>
             </a:r>
             <a:endParaRPr sz="1000" dirty="0">
               <a:solidFill>
@@ -9810,7 +9833,7 @@
         </p:nvSpPr>
         <p:spPr>
           <a:xfrm>
-            <a:off x="323329" y="3889207"/>
+            <a:off x="323329" y="3768887"/>
             <a:ext cx="1551707" cy="340029"/>
           </a:xfrm>
           <a:prstGeom prst="rect">
@@ -9874,7 +9897,7 @@
         </p:nvSpPr>
         <p:spPr>
           <a:xfrm>
-            <a:off x="317394" y="4254729"/>
+            <a:off x="317394" y="4134409"/>
             <a:ext cx="2704008" cy="938976"/>
           </a:xfrm>
           <a:prstGeom prst="rect">

</xml_diff>

<commit_message>
Built site for jfa: 0.5.4@5e0c6cd
</commit_message>
<xml_diff>
--- a/reference/figures/cheatsheet/cheatsheet.pptx
+++ b/reference/figures/cheatsheet/cheatsheet.pptx
@@ -320,6 +320,54 @@
 
 <file path=ppt/changesInfos/changesInfo1.xml><?xml version="1.0" encoding="utf-8"?>
 <pc:chgInfo xmlns:a="http://schemas.openxmlformats.org/drawingml/2006/main" xmlns:r="http://schemas.openxmlformats.org/officeDocument/2006/relationships" xmlns:ac="http://schemas.microsoft.com/office/drawing/2013/main/command" xmlns:pc="http://schemas.microsoft.com/office/powerpoint/2013/main/command">
+  <pc:docChgLst>
+    <pc:chgData name="Derks, Koen" userId="42903d96-be75-4cec-9136-f3710e86cd30" providerId="ADAL" clId="{47C729CF-B9DC-4253-89B2-BDEEBCDC567C}"/>
+    <pc:docChg chg="modSld">
+      <pc:chgData name="Derks, Koen" userId="42903d96-be75-4cec-9136-f3710e86cd30" providerId="ADAL" clId="{47C729CF-B9DC-4253-89B2-BDEEBCDC567C}" dt="2021-05-13T13:34:37.534" v="50" actId="20577"/>
+      <pc:docMkLst>
+        <pc:docMk/>
+      </pc:docMkLst>
+      <pc:sldChg chg="modSp mod">
+        <pc:chgData name="Derks, Koen" userId="42903d96-be75-4cec-9136-f3710e86cd30" providerId="ADAL" clId="{47C729CF-B9DC-4253-89B2-BDEEBCDC567C}" dt="2021-05-13T13:34:37.534" v="50" actId="20577"/>
+        <pc:sldMkLst>
+          <pc:docMk/>
+          <pc:sldMk cId="0" sldId="257"/>
+        </pc:sldMkLst>
+        <pc:spChg chg="mod">
+          <ac:chgData name="Derks, Koen" userId="42903d96-be75-4cec-9136-f3710e86cd30" providerId="ADAL" clId="{47C729CF-B9DC-4253-89B2-BDEEBCDC567C}" dt="2021-05-13T13:26:15.533" v="46" actId="6549"/>
+          <ac:spMkLst>
+            <pc:docMk/>
+            <pc:sldMk cId="0" sldId="257"/>
+            <ac:spMk id="124" creationId="{840686DE-7A82-47C4-A954-0B456668CB4F}"/>
+          </ac:spMkLst>
+        </pc:spChg>
+        <pc:spChg chg="mod">
+          <ac:chgData name="Derks, Koen" userId="42903d96-be75-4cec-9136-f3710e86cd30" providerId="ADAL" clId="{47C729CF-B9DC-4253-89B2-BDEEBCDC567C}" dt="2021-05-13T13:25:58.682" v="21" actId="20577"/>
+          <ac:spMkLst>
+            <pc:docMk/>
+            <pc:sldMk cId="0" sldId="257"/>
+            <ac:spMk id="129" creationId="{217411A5-52C0-45D9-A546-49235C28A6D7}"/>
+          </ac:spMkLst>
+        </pc:spChg>
+        <pc:spChg chg="mod">
+          <ac:chgData name="Derks, Koen" userId="42903d96-be75-4cec-9136-f3710e86cd30" providerId="ADAL" clId="{47C729CF-B9DC-4253-89B2-BDEEBCDC567C}" dt="2021-05-13T13:25:21.172" v="3" actId="20577"/>
+          <ac:spMkLst>
+            <pc:docMk/>
+            <pc:sldMk cId="0" sldId="257"/>
+            <ac:spMk id="139" creationId="{F2B32D8F-8679-461C-AB88-ED31B7806035}"/>
+          </ac:spMkLst>
+        </pc:spChg>
+        <pc:spChg chg="mod">
+          <ac:chgData name="Derks, Koen" userId="42903d96-be75-4cec-9136-f3710e86cd30" providerId="ADAL" clId="{47C729CF-B9DC-4253-89B2-BDEEBCDC567C}" dt="2021-05-13T13:34:37.534" v="50" actId="20577"/>
+          <ac:spMkLst>
+            <pc:docMk/>
+            <pc:sldMk cId="0" sldId="257"/>
+            <ac:spMk id="322" creationId="{00000000-0000-0000-0000-000000000000}"/>
+          </ac:spMkLst>
+        </pc:spChg>
+      </pc:sldChg>
+    </pc:docChg>
+  </pc:docChgLst>
   <pc:docChgLst>
     <pc:chgData name="Derks, Koen" userId="42903d96-be75-4cec-9136-f3710e86cd30" providerId="ADAL" clId="{31252840-B54D-42F9-AADB-EFDB9C1D7E85}"/>
     <pc:docChg chg="undo custSel modSld">
@@ -3773,7 +3821,7 @@
             </a:r>
             <a:r>
               <a:rPr lang="nl-NL" dirty="0"/>
-              <a:t>3</a:t>
+              <a:t>4</a:t>
             </a:r>
             <a:r>
               <a:rPr dirty="0"/>
@@ -3789,7 +3837,7 @@
             </a:r>
             <a:r>
               <a:rPr lang="nl-NL" dirty="0"/>
-              <a:t>05</a:t>
+              <a:t>06</a:t>
             </a:r>
             <a:endParaRPr dirty="0"/>
           </a:p>
@@ -5476,7 +5524,7 @@
                 </a:solidFill>
                 <a:latin typeface="+mn-lt"/>
               </a:rPr>
-              <a:t>P</a:t>
+              <a:t>binomial</a:t>
             </a:r>
             <a:r>
               <a:rPr lang="en-US" b="0" i="0" dirty="0">
@@ -5486,7 +5534,7 @@
                 <a:effectLst/>
                 <a:latin typeface="+mn-lt"/>
               </a:rPr>
-              <a:t>oisson, binomial, or hypergeometric </a:t>
+              <a:t>, Poisson, or hypergeometric </a:t>
             </a:r>
             <a:r>
               <a:rPr lang="en-US" b="0" i="0" dirty="0">
@@ -7919,7 +7967,7 @@
                 <a:cs typeface="Source Sans Pro"/>
                 <a:sym typeface="Source Sans Pro"/>
               </a:rPr>
-              <a:t> and creates a report containing the statistical results their interpretation.</a:t>
+              <a:t> and creates a report containing the statistical results and their interpretation.</a:t>
             </a:r>
             <a:endParaRPr dirty="0">
               <a:latin typeface="+mn-lt"/>

</xml_diff>

<commit_message>
Built site for jfa: 0.5.4@4e80d39
</commit_message>
<xml_diff>
--- a/reference/figures/cheatsheet/cheatsheet.pptx
+++ b/reference/figures/cheatsheet/cheatsheet.pptx
@@ -508,6 +508,70 @@
           </pc:sldLayoutMkLst>
         </pc:sldLayoutChg>
       </pc:sldMasterChg>
+    </pc:docChg>
+  </pc:docChgLst>
+  <pc:docChgLst>
+    <pc:chgData name="Derks, Koen" userId="42903d96-be75-4cec-9136-f3710e86cd30" providerId="ADAL" clId="{CB4365A0-A1FB-4DEB-ADEA-703F473C097B}"/>
+    <pc:docChg chg="undo custSel modSld">
+      <pc:chgData name="Derks, Koen" userId="42903d96-be75-4cec-9136-f3710e86cd30" providerId="ADAL" clId="{CB4365A0-A1FB-4DEB-ADEA-703F473C097B}" dt="2021-06-02T16:31:03.713" v="294" actId="20577"/>
+      <pc:docMkLst>
+        <pc:docMk/>
+      </pc:docMkLst>
+      <pc:sldChg chg="modSp mod">
+        <pc:chgData name="Derks, Koen" userId="42903d96-be75-4cec-9136-f3710e86cd30" providerId="ADAL" clId="{CB4365A0-A1FB-4DEB-ADEA-703F473C097B}" dt="2021-06-02T16:31:03.713" v="294" actId="20577"/>
+        <pc:sldMkLst>
+          <pc:docMk/>
+          <pc:sldMk cId="0" sldId="257"/>
+        </pc:sldMkLst>
+        <pc:spChg chg="mod">
+          <ac:chgData name="Derks, Koen" userId="42903d96-be75-4cec-9136-f3710e86cd30" providerId="ADAL" clId="{CB4365A0-A1FB-4DEB-ADEA-703F473C097B}" dt="2021-06-02T16:29:22.224" v="227" actId="6549"/>
+          <ac:spMkLst>
+            <pc:docMk/>
+            <pc:sldMk cId="0" sldId="257"/>
+            <ac:spMk id="135" creationId="{9D0348CA-97F1-4EDC-8F7E-BBB556E48519}"/>
+          </ac:spMkLst>
+        </pc:spChg>
+        <pc:spChg chg="mod">
+          <ac:chgData name="Derks, Koen" userId="42903d96-be75-4cec-9136-f3710e86cd30" providerId="ADAL" clId="{CB4365A0-A1FB-4DEB-ADEA-703F473C097B}" dt="2021-06-02T16:31:03.713" v="294" actId="20577"/>
+          <ac:spMkLst>
+            <pc:docMk/>
+            <pc:sldMk cId="0" sldId="257"/>
+            <ac:spMk id="139" creationId="{F2B32D8F-8679-461C-AB88-ED31B7806035}"/>
+          </ac:spMkLst>
+        </pc:spChg>
+        <pc:spChg chg="mod">
+          <ac:chgData name="Derks, Koen" userId="42903d96-be75-4cec-9136-f3710e86cd30" providerId="ADAL" clId="{CB4365A0-A1FB-4DEB-ADEA-703F473C097B}" dt="2021-06-02T16:28:05.339" v="184" actId="20577"/>
+          <ac:spMkLst>
+            <pc:docMk/>
+            <pc:sldMk cId="0" sldId="257"/>
+            <ac:spMk id="140" creationId="{6BAF5637-414B-416F-8562-F22A27CA0897}"/>
+          </ac:spMkLst>
+        </pc:spChg>
+        <pc:spChg chg="mod">
+          <ac:chgData name="Derks, Koen" userId="42903d96-be75-4cec-9136-f3710e86cd30" providerId="ADAL" clId="{CB4365A0-A1FB-4DEB-ADEA-703F473C097B}" dt="2021-06-02T16:26:08.295" v="163"/>
+          <ac:spMkLst>
+            <pc:docMk/>
+            <pc:sldMk cId="0" sldId="257"/>
+            <ac:spMk id="341" creationId="{00000000-0000-0000-0000-000000000000}"/>
+          </ac:spMkLst>
+        </pc:spChg>
+        <pc:spChg chg="mod">
+          <ac:chgData name="Derks, Koen" userId="42903d96-be75-4cec-9136-f3710e86cd30" providerId="ADAL" clId="{CB4365A0-A1FB-4DEB-ADEA-703F473C097B}" dt="2021-06-02T16:25:49.328" v="162" actId="1036"/>
+          <ac:spMkLst>
+            <pc:docMk/>
+            <pc:sldMk cId="0" sldId="257"/>
+            <ac:spMk id="380" creationId="{00000000-0000-0000-0000-000000000000}"/>
+          </ac:spMkLst>
+        </pc:spChg>
+        <pc:spChg chg="mod">
+          <ac:chgData name="Derks, Koen" userId="42903d96-be75-4cec-9136-f3710e86cd30" providerId="ADAL" clId="{CB4365A0-A1FB-4DEB-ADEA-703F473C097B}" dt="2021-06-02T16:27:41.880" v="172" actId="20577"/>
+          <ac:spMkLst>
+            <pc:docMk/>
+            <pc:sldMk cId="0" sldId="257"/>
+            <ac:spMk id="384" creationId="{00000000-0000-0000-0000-000000000000}"/>
+          </ac:spMkLst>
+        </pc:spChg>
+      </pc:sldChg>
     </pc:docChg>
   </pc:docChgLst>
   <pc:docChgLst>
@@ -4338,8 +4402,8 @@
         </p:nvSpPr>
         <p:spPr>
           <a:xfrm>
-            <a:off x="4796180" y="2291473"/>
-            <a:ext cx="5613573" cy="856564"/>
+            <a:off x="4796180" y="2186698"/>
+            <a:ext cx="5613573" cy="1022763"/>
           </a:xfrm>
           <a:prstGeom prst="rect">
             <a:avLst/>
@@ -4411,7 +4475,28 @@
                 <a:effectLst/>
                 <a:latin typeface="+mn-lt"/>
               </a:rPr>
-              <a:t> argument.</a:t>
+              <a:t> argument. The prior distribution can be used as input for the </a:t>
+            </a:r>
+            <a:r>
+              <a:rPr lang="en-US" b="0" i="0" dirty="0">
+                <a:solidFill>
+                  <a:schemeClr val="accent1"/>
+                </a:solidFill>
+                <a:effectLst/>
+                <a:latin typeface="Courier New" panose="02070309020205020404" pitchFamily="49" charset="0"/>
+                <a:cs typeface="Courier New" panose="02070309020205020404" pitchFamily="49" charset="0"/>
+              </a:rPr>
+              <a:t>prior</a:t>
+            </a:r>
+            <a:r>
+              <a:rPr lang="en-US" b="0" i="0" dirty="0">
+                <a:solidFill>
+                  <a:srgbClr val="000000"/>
+                </a:solidFill>
+                <a:effectLst/>
+                <a:latin typeface="+mn-lt"/>
+              </a:rPr>
+              <a:t> argument in other functions to perform Bayesian inference.</a:t>
             </a:r>
           </a:p>
           <a:p>
@@ -4517,7 +4602,7 @@
         </p:nvSpPr>
         <p:spPr>
           <a:xfrm>
-            <a:off x="10503567" y="2356523"/>
+            <a:off x="10503567" y="2263940"/>
             <a:ext cx="3143104" cy="571871"/>
           </a:xfrm>
           <a:prstGeom prst="rect">
@@ -4754,7 +4839,7 @@
         <p:spPr>
           <a:xfrm>
             <a:off x="4791188" y="1610302"/>
-            <a:ext cx="5145639" cy="277127"/>
+            <a:ext cx="5493492" cy="277127"/>
           </a:xfrm>
           <a:prstGeom prst="rect">
             <a:avLst/>
@@ -4788,24 +4873,14 @@
               </a:defRPr>
             </a:pPr>
             <a:r>
-              <a:rPr lang="nl-NL" sz="2000" dirty="0" err="1">
+              <a:rPr lang="nl-NL" sz="2000" dirty="0">
                 <a:solidFill>
                   <a:schemeClr val="tx1">
                     <a:lumMod val="50000"/>
                   </a:schemeClr>
                 </a:solidFill>
               </a:rPr>
-              <a:t>Create</a:t>
-            </a:r>
-            <a:r>
-              <a:rPr lang="nl-NL" sz="2000" dirty="0">
-                <a:solidFill>
-                  <a:schemeClr val="tx1">
-                    <a:lumMod val="50000"/>
-                  </a:schemeClr>
-                </a:solidFill>
-              </a:rPr>
-              <a:t> a prior </a:t>
+              <a:t>Construct a prior </a:t>
             </a:r>
             <a:r>
               <a:rPr lang="nl-NL" sz="2000" dirty="0" err="1">
@@ -7281,7 +7356,7 @@
         <p:spPr>
           <a:xfrm>
             <a:off x="4798004" y="6749594"/>
-            <a:ext cx="2891817" cy="277127"/>
+            <a:ext cx="4908395" cy="277127"/>
           </a:xfrm>
           <a:prstGeom prst="rect">
             <a:avLst/>
@@ -7352,7 +7427,7 @@
                   </a:schemeClr>
                 </a:solidFill>
               </a:rPr>
-              <a:t> </a:t>
+              <a:t> misstatement in </a:t>
             </a:r>
             <a:r>
               <a:rPr lang="nl-NL" sz="2000" dirty="0" err="1">
@@ -7362,7 +7437,7 @@
                   </a:schemeClr>
                 </a:solidFill>
               </a:rPr>
-              <a:t>audited</a:t>
+              <a:t>the</a:t>
             </a:r>
             <a:r>
               <a:rPr lang="nl-NL" sz="2000" dirty="0">
@@ -7372,7 +7447,17 @@
                   </a:schemeClr>
                 </a:solidFill>
               </a:rPr>
-              <a:t> items</a:t>
+              <a:t> </a:t>
+            </a:r>
+            <a:r>
+              <a:rPr lang="nl-NL" sz="2000" dirty="0" err="1">
+                <a:solidFill>
+                  <a:schemeClr val="tx1">
+                    <a:lumMod val="50000"/>
+                  </a:schemeClr>
+                </a:solidFill>
+              </a:rPr>
+              <a:t>population</a:t>
             </a:r>
             <a:endParaRPr sz="2000" dirty="0">
               <a:solidFill>
@@ -7896,7 +7981,7 @@
         <p:spPr>
           <a:xfrm>
             <a:off x="4805268" y="9376204"/>
-            <a:ext cx="5484165" cy="442605"/>
+            <a:ext cx="5484165" cy="608804"/>
           </a:xfrm>
           <a:prstGeom prst="rect">
             <a:avLst/>
@@ -7967,7 +8052,28 @@
                 <a:cs typeface="Source Sans Pro"/>
                 <a:sym typeface="Source Sans Pro"/>
               </a:rPr>
-              <a:t> and creates a report containing the statistical results and their interpretation.</a:t>
+              <a:t> as returned by </a:t>
+            </a:r>
+            <a:r>
+              <a:rPr lang="en-US" b="0" dirty="0">
+                <a:solidFill>
+                  <a:schemeClr val="tx1"/>
+                </a:solidFill>
+                <a:latin typeface="Courier New" panose="02070309020205020404" pitchFamily="49" charset="0"/>
+                <a:ea typeface="Source Sans Pro"/>
+                <a:cs typeface="Courier New" panose="02070309020205020404" pitchFamily="49" charset="0"/>
+                <a:sym typeface="Source Sans Pro"/>
+              </a:rPr>
+              <a:t>evaluation()</a:t>
+            </a:r>
+            <a:r>
+              <a:rPr lang="en-US" dirty="0">
+                <a:latin typeface="+mn-lt"/>
+                <a:ea typeface="Source Sans Pro"/>
+                <a:cs typeface="Source Sans Pro"/>
+                <a:sym typeface="Source Sans Pro"/>
+              </a:rPr>
+              <a:t> and automatically generates a report containing the statistical results and their interpretation.</a:t>
             </a:r>
             <a:endParaRPr dirty="0">
               <a:latin typeface="+mn-lt"/>
@@ -7990,7 +8096,7 @@
         <p:spPr>
           <a:xfrm>
             <a:off x="4800276" y="8781984"/>
-            <a:ext cx="3082575" cy="277127"/>
+            <a:ext cx="4175823" cy="277127"/>
           </a:xfrm>
           <a:prstGeom prst="rect">
             <a:avLst/>
@@ -8061,7 +8167,7 @@
                   </a:schemeClr>
                 </a:solidFill>
               </a:rPr>
-              <a:t> </a:t>
+              <a:t> statistical </a:t>
             </a:r>
             <a:r>
               <a:rPr lang="nl-NL" sz="2000" dirty="0" err="1">

</xml_diff>

<commit_message>
Built site for jfa: 0.5.5@cd12131
</commit_message>
<xml_diff>
--- a/reference/figures/cheatsheet/cheatsheet.pptx
+++ b/reference/figures/cheatsheet/cheatsheet.pptx
@@ -569,6 +569,62 @@
             <pc:docMk/>
             <pc:sldMk cId="0" sldId="257"/>
             <ac:spMk id="384" creationId="{00000000-0000-0000-0000-000000000000}"/>
+          </ac:spMkLst>
+        </pc:spChg>
+      </pc:sldChg>
+    </pc:docChg>
+  </pc:docChgLst>
+  <pc:docChgLst>
+    <pc:chgData name="Derks, Koen" userId="42903d96-be75-4cec-9136-f3710e86cd30" providerId="ADAL" clId="{E813656B-DA65-4A86-81EE-25B476EAF3E8}"/>
+    <pc:docChg chg="undo custSel modSld">
+      <pc:chgData name="Derks, Koen" userId="42903d96-be75-4cec-9136-f3710e86cd30" providerId="ADAL" clId="{E813656B-DA65-4A86-81EE-25B476EAF3E8}" dt="2021-06-29T10:50:04.321" v="144" actId="20577"/>
+      <pc:docMkLst>
+        <pc:docMk/>
+      </pc:docMkLst>
+      <pc:sldChg chg="modSp mod">
+        <pc:chgData name="Derks, Koen" userId="42903d96-be75-4cec-9136-f3710e86cd30" providerId="ADAL" clId="{E813656B-DA65-4A86-81EE-25B476EAF3E8}" dt="2021-06-29T10:50:04.321" v="144" actId="20577"/>
+        <pc:sldMkLst>
+          <pc:docMk/>
+          <pc:sldMk cId="0" sldId="257"/>
+        </pc:sldMkLst>
+        <pc:spChg chg="mod">
+          <ac:chgData name="Derks, Koen" userId="42903d96-be75-4cec-9136-f3710e86cd30" providerId="ADAL" clId="{E813656B-DA65-4A86-81EE-25B476EAF3E8}" dt="2021-06-29T10:47:32.875" v="140" actId="20577"/>
+          <ac:spMkLst>
+            <pc:docMk/>
+            <pc:sldMk cId="0" sldId="257"/>
+            <ac:spMk id="134" creationId="{C90DEEAD-4A2B-4F58-B49D-5B584591DA8B}"/>
+          </ac:spMkLst>
+        </pc:spChg>
+        <pc:spChg chg="mod">
+          <ac:chgData name="Derks, Koen" userId="42903d96-be75-4cec-9136-f3710e86cd30" providerId="ADAL" clId="{E813656B-DA65-4A86-81EE-25B476EAF3E8}" dt="2021-06-29T10:50:04.321" v="144" actId="20577"/>
+          <ac:spMkLst>
+            <pc:docMk/>
+            <pc:sldMk cId="0" sldId="257"/>
+            <ac:spMk id="143" creationId="{FB0763FA-753C-40C1-A1E4-7DA1DDA10072}"/>
+          </ac:spMkLst>
+        </pc:spChg>
+        <pc:spChg chg="mod">
+          <ac:chgData name="Derks, Koen" userId="42903d96-be75-4cec-9136-f3710e86cd30" providerId="ADAL" clId="{E813656B-DA65-4A86-81EE-25B476EAF3E8}" dt="2021-06-29T10:48:42.091" v="142" actId="1035"/>
+          <ac:spMkLst>
+            <pc:docMk/>
+            <pc:sldMk cId="0" sldId="257"/>
+            <ac:spMk id="145" creationId="{130E5FF5-89E1-42AE-84ED-37821A67F183}"/>
+          </ac:spMkLst>
+        </pc:spChg>
+        <pc:spChg chg="mod">
+          <ac:chgData name="Derks, Koen" userId="42903d96-be75-4cec-9136-f3710e86cd30" providerId="ADAL" clId="{E813656B-DA65-4A86-81EE-25B476EAF3E8}" dt="2021-06-29T10:46:27.134" v="86" actId="20577"/>
+          <ac:spMkLst>
+            <pc:docMk/>
+            <pc:sldMk cId="0" sldId="257"/>
+            <ac:spMk id="322" creationId="{00000000-0000-0000-0000-000000000000}"/>
+          </ac:spMkLst>
+        </pc:spChg>
+        <pc:spChg chg="mod">
+          <ac:chgData name="Derks, Koen" userId="42903d96-be75-4cec-9136-f3710e86cd30" providerId="ADAL" clId="{E813656B-DA65-4A86-81EE-25B476EAF3E8}" dt="2021-06-29T10:47:50.850" v="141" actId="1035"/>
+          <ac:spMkLst>
+            <pc:docMk/>
+            <pc:sldMk cId="0" sldId="257"/>
+            <ac:spMk id="380" creationId="{00000000-0000-0000-0000-000000000000}"/>
           </ac:spMkLst>
         </pc:spChg>
       </pc:sldChg>
@@ -3885,7 +3941,7 @@
             </a:r>
             <a:r>
               <a:rPr lang="nl-NL" dirty="0"/>
-              <a:t>4</a:t>
+              <a:t>5</a:t>
             </a:r>
             <a:r>
               <a:rPr dirty="0"/>
@@ -3901,7 +3957,7 @@
             </a:r>
             <a:r>
               <a:rPr lang="nl-NL" dirty="0"/>
-              <a:t>06</a:t>
+              <a:t>07</a:t>
             </a:r>
             <a:endParaRPr dirty="0"/>
           </a:p>
@@ -4602,8 +4658,8 @@
         </p:nvSpPr>
         <p:spPr>
           <a:xfrm>
-            <a:off x="10503567" y="2263940"/>
-            <a:ext cx="3143104" cy="571871"/>
+            <a:off x="10503567" y="2273148"/>
+            <a:ext cx="3143104" cy="417982"/>
           </a:xfrm>
           <a:prstGeom prst="rect">
             <a:avLst/>
@@ -4670,53 +4726,6 @@
                 <a:cs typeface="Courier New" panose="02070309020205020404" pitchFamily="49" charset="0"/>
               </a:rPr>
               <a:t>(</a:t>
-            </a:r>
-            <a:r>
-              <a:rPr lang="nl-NL" sz="1000" dirty="0" err="1">
-                <a:solidFill>
-                  <a:schemeClr val="tx1">
-                    <a:lumMod val="50000"/>
-                  </a:schemeClr>
-                </a:solidFill>
-                <a:latin typeface="Courier New" panose="02070309020205020404" pitchFamily="49" charset="0"/>
-                <a:cs typeface="Courier New" panose="02070309020205020404" pitchFamily="49" charset="0"/>
-              </a:rPr>
-              <a:t>confidence</a:t>
-            </a:r>
-            <a:r>
-              <a:rPr lang="nl-NL" sz="1000" dirty="0">
-                <a:solidFill>
-                  <a:schemeClr val="tx1">
-                    <a:lumMod val="50000"/>
-                  </a:schemeClr>
-                </a:solidFill>
-                <a:latin typeface="Courier New" panose="02070309020205020404" pitchFamily="49" charset="0"/>
-                <a:cs typeface="Courier New" panose="02070309020205020404" pitchFamily="49" charset="0"/>
-              </a:rPr>
-              <a:t> = 0.95,</a:t>
-            </a:r>
-            <a:br>
-              <a:rPr lang="nl-NL" sz="1000" dirty="0">
-                <a:solidFill>
-                  <a:schemeClr val="tx1">
-                    <a:lumMod val="50000"/>
-                  </a:schemeClr>
-                </a:solidFill>
-                <a:latin typeface="Courier New" panose="02070309020205020404" pitchFamily="49" charset="0"/>
-                <a:cs typeface="Courier New" panose="02070309020205020404" pitchFamily="49" charset="0"/>
-              </a:rPr>
-            </a:br>
-            <a:r>
-              <a:rPr lang="nl-NL" sz="1000" dirty="0">
-                <a:solidFill>
-                  <a:schemeClr val="tx1">
-                    <a:lumMod val="50000"/>
-                  </a:schemeClr>
-                </a:solidFill>
-                <a:latin typeface="Courier New" panose="02070309020205020404" pitchFamily="49" charset="0"/>
-                <a:cs typeface="Courier New" panose="02070309020205020404" pitchFamily="49" charset="0"/>
-              </a:rPr>
-              <a:t>           </a:t>
             </a:r>
             <a:r>
               <a:rPr lang="nl-NL" sz="1000" dirty="0" err="1">
@@ -7225,8 +7234,45 @@
                 <a:cs typeface="Source Sans Pro"/>
                 <a:sym typeface="Source Sans Pro"/>
               </a:rPr>
-              <a:t>.</a:t>
-            </a:r>
+              <a:t>. </a:t>
+            </a:r>
+            <a:r>
+              <a:rPr lang="en-US" b="0" i="0" dirty="0">
+                <a:solidFill>
+                  <a:srgbClr val="000000"/>
+                </a:solidFill>
+                <a:effectLst/>
+                <a:latin typeface="+mn-lt"/>
+              </a:rPr>
+              <a:t>A </a:t>
+            </a:r>
+            <a:r>
+              <a:rPr lang="en-US" b="0" i="0" dirty="0">
+                <a:solidFill>
+                  <a:schemeClr val="accent1"/>
+                </a:solidFill>
+                <a:effectLst/>
+                <a:latin typeface="Courier New" panose="02070309020205020404" pitchFamily="49" charset="0"/>
+                <a:cs typeface="Courier New" panose="02070309020205020404" pitchFamily="49" charset="0"/>
+              </a:rPr>
+              <a:t>prior</a:t>
+            </a:r>
+            <a:r>
+              <a:rPr lang="en-US" b="0" i="0" dirty="0">
+                <a:solidFill>
+                  <a:srgbClr val="000000"/>
+                </a:solidFill>
+                <a:effectLst/>
+                <a:latin typeface="+mn-lt"/>
+              </a:rPr>
+              <a:t> can be specified to perform Bayesian evaluation.</a:t>
+            </a:r>
+            <a:endParaRPr lang="en-US" dirty="0">
+              <a:latin typeface="+mn-lt"/>
+              <a:ea typeface="Source Sans Pro"/>
+              <a:cs typeface="Source Sans Pro"/>
+              <a:sym typeface="Source Sans Pro"/>
+            </a:endParaRPr>
           </a:p>
           <a:p>
             <a:pPr>
@@ -8645,7 +8691,7 @@
                 <a:latin typeface="Courier New" panose="02070309020205020404" pitchFamily="49" charset="0"/>
                 <a:cs typeface="Courier New" panose="02070309020205020404" pitchFamily="49" charset="0"/>
               </a:rPr>
-              <a:t>confidence</a:t>
+              <a:t>materiality</a:t>
             </a:r>
             <a:r>
               <a:rPr lang="nl-NL" sz="1000" dirty="0">
@@ -8657,7 +8703,7 @@
                 <a:latin typeface="Courier New" panose="02070309020205020404" pitchFamily="49" charset="0"/>
                 <a:cs typeface="Courier New" panose="02070309020205020404" pitchFamily="49" charset="0"/>
               </a:rPr>
-              <a:t> = 0.95,</a:t>
+              <a:t> = 0.05,</a:t>
             </a:r>
           </a:p>
           <a:p>
@@ -8697,7 +8743,7 @@
                 <a:latin typeface="Courier New" panose="02070309020205020404" pitchFamily="49" charset="0"/>
                 <a:cs typeface="Courier New" panose="02070309020205020404" pitchFamily="49" charset="0"/>
               </a:rPr>
-              <a:t>materiality</a:t>
+              <a:t>expectedError</a:t>
             </a:r>
             <a:r>
               <a:rPr lang="nl-NL" sz="1000" dirty="0">
@@ -8709,7 +8755,7 @@
                 <a:latin typeface="Courier New" panose="02070309020205020404" pitchFamily="49" charset="0"/>
                 <a:cs typeface="Courier New" panose="02070309020205020404" pitchFamily="49" charset="0"/>
               </a:rPr>
-              <a:t> = 0.05,</a:t>
+              <a:t> = 0.01,</a:t>
             </a:r>
           </a:p>
           <a:p>
@@ -8737,7 +8783,7 @@
                 <a:latin typeface="Courier New" panose="02070309020205020404" pitchFamily="49" charset="0"/>
                 <a:cs typeface="Courier New" panose="02070309020205020404" pitchFamily="49" charset="0"/>
               </a:rPr>
-              <a:t>         </a:t>
+              <a:t>	 </a:t>
             </a:r>
             <a:r>
               <a:rPr lang="nl-NL" sz="1000" dirty="0" err="1">
@@ -8749,7 +8795,7 @@
                 <a:latin typeface="Courier New" panose="02070309020205020404" pitchFamily="49" charset="0"/>
                 <a:cs typeface="Courier New" panose="02070309020205020404" pitchFamily="49" charset="0"/>
               </a:rPr>
-              <a:t>expectedError</a:t>
+              <a:t>likelihood</a:t>
             </a:r>
             <a:r>
               <a:rPr lang="nl-NL" sz="1000" dirty="0">
@@ -8761,26 +8807,10 @@
                 <a:latin typeface="Courier New" panose="02070309020205020404" pitchFamily="49" charset="0"/>
                 <a:cs typeface="Courier New" panose="02070309020205020404" pitchFamily="49" charset="0"/>
               </a:rPr>
-              <a:t> = 0.01,</a:t>
-            </a:r>
-          </a:p>
-          <a:p>
-            <a:pPr>
-              <a:spcBef>
-                <a:spcPts val="0"/>
-              </a:spcBef>
-              <a:defRPr b="0">
-                <a:solidFill>
-                  <a:srgbClr val="000000"/>
-                </a:solidFill>
-                <a:latin typeface="Menlo"/>
-                <a:ea typeface="Menlo"/>
-                <a:cs typeface="Menlo"/>
-                <a:sym typeface="Menlo"/>
-              </a:defRPr>
-            </a:pPr>
-            <a:r>
-              <a:rPr lang="nl-NL" sz="1000" dirty="0">
+              <a:t> = '</a:t>
+            </a:r>
+            <a:r>
+              <a:rPr lang="nl-NL" sz="1000" dirty="0" err="1">
                 <a:solidFill>
                   <a:schemeClr val="tx1">
                     <a:lumMod val="50000"/>
@@ -8789,10 +8819,10 @@
                 <a:latin typeface="Courier New" panose="02070309020205020404" pitchFamily="49" charset="0"/>
                 <a:cs typeface="Courier New" panose="02070309020205020404" pitchFamily="49" charset="0"/>
               </a:rPr>
-              <a:t>	 </a:t>
-            </a:r>
-            <a:r>
-              <a:rPr lang="nl-NL" sz="1000" dirty="0" err="1">
+              <a:t>binomial</a:t>
+            </a:r>
+            <a:r>
+              <a:rPr lang="nl-NL" sz="1000" dirty="0">
                 <a:solidFill>
                   <a:schemeClr val="tx1">
                     <a:lumMod val="50000"/>
@@ -8801,9 +8831,9 @@
                 <a:latin typeface="Courier New" panose="02070309020205020404" pitchFamily="49" charset="0"/>
                 <a:cs typeface="Courier New" panose="02070309020205020404" pitchFamily="49" charset="0"/>
               </a:rPr>
-              <a:t>likelihood</a:t>
-            </a:r>
-            <a:r>
+              <a:t>',</a:t>
+            </a:r>
+            <a:br>
               <a:rPr lang="nl-NL" sz="1000" dirty="0">
                 <a:solidFill>
                   <a:schemeClr val="tx1">
@@ -8813,10 +8843,9 @@
                 <a:latin typeface="Courier New" panose="02070309020205020404" pitchFamily="49" charset="0"/>
                 <a:cs typeface="Courier New" panose="02070309020205020404" pitchFamily="49" charset="0"/>
               </a:rPr>
-              <a:t> = '</a:t>
-            </a:r>
-            <a:r>
-              <a:rPr lang="nl-NL" sz="1000" dirty="0" err="1">
+            </a:br>
+            <a:r>
+              <a:rPr lang="nl-NL" sz="1000" dirty="0">
                 <a:solidFill>
                   <a:schemeClr val="tx1">
                     <a:lumMod val="50000"/>
@@ -8825,10 +8854,10 @@
                 <a:latin typeface="Courier New" panose="02070309020205020404" pitchFamily="49" charset="0"/>
                 <a:cs typeface="Courier New" panose="02070309020205020404" pitchFamily="49" charset="0"/>
               </a:rPr>
-              <a:t>binomial</a:t>
-            </a:r>
-            <a:r>
-              <a:rPr lang="nl-NL" sz="1000" dirty="0">
+              <a:t>         </a:t>
+            </a:r>
+            <a:r>
+              <a:rPr lang="nl-NL" sz="1000" dirty="0" err="1">
                 <a:solidFill>
                   <a:schemeClr val="tx1">
                     <a:lumMod val="50000"/>
@@ -8837,7 +8866,19 @@
                 <a:latin typeface="Courier New" panose="02070309020205020404" pitchFamily="49" charset="0"/>
                 <a:cs typeface="Courier New" panose="02070309020205020404" pitchFamily="49" charset="0"/>
               </a:rPr>
-              <a:t>',</a:t>
+              <a:t>confidence</a:t>
+            </a:r>
+            <a:r>
+              <a:rPr lang="nl-NL" sz="1000" dirty="0">
+                <a:solidFill>
+                  <a:schemeClr val="tx1">
+                    <a:lumMod val="50000"/>
+                  </a:schemeClr>
+                </a:solidFill>
+                <a:latin typeface="Courier New" panose="02070309020205020404" pitchFamily="49" charset="0"/>
+                <a:cs typeface="Courier New" panose="02070309020205020404" pitchFamily="49" charset="0"/>
+              </a:rPr>
+              <a:t> = 0.95,</a:t>
             </a:r>
           </a:p>
           <a:p>
@@ -9159,8 +9200,8 @@
         </p:nvSpPr>
         <p:spPr>
           <a:xfrm>
-            <a:off x="10503567" y="7382463"/>
-            <a:ext cx="3143103" cy="879647"/>
+            <a:off x="10503567" y="7415590"/>
+            <a:ext cx="3143103" cy="1033536"/>
           </a:xfrm>
           <a:prstGeom prst="rect">
             <a:avLst/>
@@ -9238,7 +9279,7 @@
                 <a:latin typeface="Courier New" panose="02070309020205020404" pitchFamily="49" charset="0"/>
                 <a:cs typeface="Courier New" panose="02070309020205020404" pitchFamily="49" charset="0"/>
               </a:rPr>
-              <a:t>confidence</a:t>
+              <a:t>materiality</a:t>
             </a:r>
             <a:r>
               <a:rPr lang="nl-NL" sz="1000" dirty="0">
@@ -9250,7 +9291,7 @@
                 <a:latin typeface="Courier New" panose="02070309020205020404" pitchFamily="49" charset="0"/>
                 <a:cs typeface="Courier New" panose="02070309020205020404" pitchFamily="49" charset="0"/>
               </a:rPr>
-              <a:t> = 0.95,</a:t>
+              <a:t> = 0.05,</a:t>
             </a:r>
           </a:p>
           <a:p>
@@ -9290,7 +9331,7 @@
                 <a:latin typeface="Courier New" panose="02070309020205020404" pitchFamily="49" charset="0"/>
                 <a:cs typeface="Courier New" panose="02070309020205020404" pitchFamily="49" charset="0"/>
               </a:rPr>
-              <a:t>materiality</a:t>
+              <a:t>method</a:t>
             </a:r>
             <a:r>
               <a:rPr lang="nl-NL" sz="1000" dirty="0">
@@ -9302,7 +9343,31 @@
                 <a:latin typeface="Courier New" panose="02070309020205020404" pitchFamily="49" charset="0"/>
                 <a:cs typeface="Courier New" panose="02070309020205020404" pitchFamily="49" charset="0"/>
               </a:rPr>
-              <a:t> = 0.05,</a:t>
+              <a:t> = '</a:t>
+            </a:r>
+            <a:r>
+              <a:rPr lang="nl-NL" sz="1000" dirty="0" err="1">
+                <a:solidFill>
+                  <a:schemeClr val="tx1">
+                    <a:lumMod val="50000"/>
+                  </a:schemeClr>
+                </a:solidFill>
+                <a:latin typeface="Courier New" panose="02070309020205020404" pitchFamily="49" charset="0"/>
+                <a:cs typeface="Courier New" panose="02070309020205020404" pitchFamily="49" charset="0"/>
+              </a:rPr>
+              <a:t>binomial</a:t>
+            </a:r>
+            <a:r>
+              <a:rPr lang="nl-NL" sz="1000" dirty="0">
+                <a:solidFill>
+                  <a:schemeClr val="tx1">
+                    <a:lumMod val="50000"/>
+                  </a:schemeClr>
+                </a:solidFill>
+                <a:latin typeface="Courier New" panose="02070309020205020404" pitchFamily="49" charset="0"/>
+                <a:cs typeface="Courier New" panose="02070309020205020404" pitchFamily="49" charset="0"/>
+              </a:rPr>
+              <a:t>',</a:t>
             </a:r>
           </a:p>
           <a:p>
@@ -9342,7 +9407,7 @@
                 <a:latin typeface="Courier New" panose="02070309020205020404" pitchFamily="49" charset="0"/>
                 <a:cs typeface="Courier New" panose="02070309020205020404" pitchFamily="49" charset="0"/>
               </a:rPr>
-              <a:t>nSumstats</a:t>
+              <a:t>confidence</a:t>
             </a:r>
             <a:r>
               <a:rPr lang="nl-NL" sz="1000" dirty="0">
@@ -9354,7 +9419,7 @@
                 <a:latin typeface="Courier New" panose="02070309020205020404" pitchFamily="49" charset="0"/>
                 <a:cs typeface="Courier New" panose="02070309020205020404" pitchFamily="49" charset="0"/>
               </a:rPr>
-              <a:t> = 93,</a:t>
+              <a:t> = 0.95,</a:t>
             </a:r>
           </a:p>
           <a:p>
@@ -9394,7 +9459,7 @@
                 <a:latin typeface="Courier New" panose="02070309020205020404" pitchFamily="49" charset="0"/>
                 <a:cs typeface="Courier New" panose="02070309020205020404" pitchFamily="49" charset="0"/>
               </a:rPr>
-              <a:t>kSumstats</a:t>
+              <a:t>nSumstats</a:t>
             </a:r>
             <a:r>
               <a:rPr lang="nl-NL" sz="1000" dirty="0">
@@ -9406,7 +9471,7 @@
                 <a:latin typeface="Courier New" panose="02070309020205020404" pitchFamily="49" charset="0"/>
                 <a:cs typeface="Courier New" panose="02070309020205020404" pitchFamily="49" charset="0"/>
               </a:rPr>
-              <a:t> = 0,</a:t>
+              <a:t> = 93,</a:t>
             </a:r>
           </a:p>
           <a:p>
@@ -9446,7 +9511,7 @@
                 <a:latin typeface="Courier New" panose="02070309020205020404" pitchFamily="49" charset="0"/>
                 <a:cs typeface="Courier New" panose="02070309020205020404" pitchFamily="49" charset="0"/>
               </a:rPr>
-              <a:t>method</a:t>
+              <a:t>kSumstats</a:t>
             </a:r>
             <a:r>
               <a:rPr lang="nl-NL" sz="1000" dirty="0">
@@ -9458,10 +9523,26 @@
                 <a:latin typeface="Courier New" panose="02070309020205020404" pitchFamily="49" charset="0"/>
                 <a:cs typeface="Courier New" panose="02070309020205020404" pitchFamily="49" charset="0"/>
               </a:rPr>
-              <a:t> = '</a:t>
-            </a:r>
-            <a:r>
-              <a:rPr lang="nl-NL" sz="1000" dirty="0" err="1">
+              <a:t> = 0, </a:t>
+            </a:r>
+          </a:p>
+          <a:p>
+            <a:pPr>
+              <a:spcBef>
+                <a:spcPts val="0"/>
+              </a:spcBef>
+              <a:defRPr b="0">
+                <a:solidFill>
+                  <a:srgbClr val="000000"/>
+                </a:solidFill>
+                <a:latin typeface="Menlo"/>
+                <a:ea typeface="Menlo"/>
+                <a:cs typeface="Menlo"/>
+                <a:sym typeface="Menlo"/>
+              </a:defRPr>
+            </a:pPr>
+            <a:r>
+              <a:rPr lang="nl-NL" sz="1000" dirty="0">
                 <a:solidFill>
                   <a:schemeClr val="tx1">
                     <a:lumMod val="50000"/>
@@ -9470,19 +9551,7 @@
                 <a:latin typeface="Courier New" panose="02070309020205020404" pitchFamily="49" charset="0"/>
                 <a:cs typeface="Courier New" panose="02070309020205020404" pitchFamily="49" charset="0"/>
               </a:rPr>
-              <a:t>binomial</a:t>
-            </a:r>
-            <a:r>
-              <a:rPr lang="nl-NL" sz="1000" dirty="0">
-                <a:solidFill>
-                  <a:schemeClr val="tx1">
-                    <a:lumMod val="50000"/>
-                  </a:schemeClr>
-                </a:solidFill>
-                <a:latin typeface="Courier New" panose="02070309020205020404" pitchFamily="49" charset="0"/>
-                <a:cs typeface="Courier New" panose="02070309020205020404" pitchFamily="49" charset="0"/>
-              </a:rPr>
-              <a:t>', ...)</a:t>
+              <a:t>           prior = FALSE, ...)</a:t>
             </a:r>
             <a:endParaRPr sz="1000" dirty="0">
               <a:solidFill>

</xml_diff>

<commit_message>
Built site for jfa: 0.5.7@1772425
</commit_message>
<xml_diff>
--- a/reference/figures/cheatsheet/cheatsheet.pptx
+++ b/reference/figures/cheatsheet/cheatsheet.pptx
@@ -830,6 +830,30 @@
       </pc:sldChg>
     </pc:docChg>
   </pc:docChgLst>
+  <pc:docChgLst>
+    <pc:chgData name="Derks, Koen" userId="42903d96-be75-4cec-9136-f3710e86cd30" providerId="ADAL" clId="{98190025-2A7C-4D67-890F-BF5F2D889559}"/>
+    <pc:docChg chg="modSld">
+      <pc:chgData name="Derks, Koen" userId="42903d96-be75-4cec-9136-f3710e86cd30" providerId="ADAL" clId="{98190025-2A7C-4D67-890F-BF5F2D889559}" dt="2021-08-07T09:00:01.276" v="3" actId="20577"/>
+      <pc:docMkLst>
+        <pc:docMk/>
+      </pc:docMkLst>
+      <pc:sldChg chg="modSp mod">
+        <pc:chgData name="Derks, Koen" userId="42903d96-be75-4cec-9136-f3710e86cd30" providerId="ADAL" clId="{98190025-2A7C-4D67-890F-BF5F2D889559}" dt="2021-08-07T09:00:01.276" v="3" actId="20577"/>
+        <pc:sldMkLst>
+          <pc:docMk/>
+          <pc:sldMk cId="0" sldId="257"/>
+        </pc:sldMkLst>
+        <pc:spChg chg="mod">
+          <ac:chgData name="Derks, Koen" userId="42903d96-be75-4cec-9136-f3710e86cd30" providerId="ADAL" clId="{98190025-2A7C-4D67-890F-BF5F2D889559}" dt="2021-08-07T09:00:01.276" v="3" actId="20577"/>
+          <ac:spMkLst>
+            <pc:docMk/>
+            <pc:sldMk cId="0" sldId="257"/>
+            <ac:spMk id="322" creationId="{00000000-0000-0000-0000-000000000000}"/>
+          </ac:spMkLst>
+        </pc:spChg>
+      </pc:sldChg>
+    </pc:docChg>
+  </pc:docChgLst>
 </pc:chgInfo>
 </file>
 
@@ -2639,7 +2663,7 @@
           </a:ln>
           <a:extLst>
             <a:ext uri="{C572A759-6A51-4108-AA02-DFA0A04FC94B}">
-              <ma14:wrappingTextBoxFlag xmlns="" xmlns:m="http://schemas.openxmlformats.org/officeDocument/2006/math" xmlns:a14="http://schemas.microsoft.com/office/drawing/2010/main" xmlns:ma14="http://schemas.microsoft.com/office/mac/drawingml/2011/main" val="1"/>
+              <ma14:wrappingTextBoxFlag xmlns:ma14="http://schemas.microsoft.com/office/mac/drawingml/2011/main" xmlns:a14="http://schemas.microsoft.com/office/drawing/2010/main" xmlns:m="http://schemas.openxmlformats.org/officeDocument/2006/math" xmlns="" val="1"/>
             </a:ext>
           </a:extLst>
         </p:spPr>
@@ -2678,7 +2702,7 @@
           </a:ln>
           <a:extLst>
             <a:ext uri="{C572A759-6A51-4108-AA02-DFA0A04FC94B}">
-              <ma14:wrappingTextBoxFlag xmlns="" xmlns:m="http://schemas.openxmlformats.org/officeDocument/2006/math" xmlns:a14="http://schemas.microsoft.com/office/drawing/2010/main" xmlns:ma14="http://schemas.microsoft.com/office/mac/drawingml/2011/main" val="1"/>
+              <ma14:wrappingTextBoxFlag xmlns:ma14="http://schemas.microsoft.com/office/mac/drawingml/2011/main" xmlns:a14="http://schemas.microsoft.com/office/drawing/2010/main" xmlns:m="http://schemas.openxmlformats.org/officeDocument/2006/math" xmlns="" val="1"/>
             </a:ext>
           </a:extLst>
         </p:spPr>
@@ -3771,7 +3795,7 @@
           </a:ln>
           <a:extLst>
             <a:ext uri="{C572A759-6A51-4108-AA02-DFA0A04FC94B}">
-              <ma14:wrappingTextBoxFlag xmlns="" xmlns:m="http://schemas.openxmlformats.org/officeDocument/2006/math" xmlns:a14="http://schemas.microsoft.com/office/drawing/2010/main" xmlns:ma14="http://schemas.microsoft.com/office/mac/drawingml/2011/main" val="1"/>
+              <ma14:wrappingTextBoxFlag xmlns:ma14="http://schemas.microsoft.com/office/mac/drawingml/2011/main" xmlns:a14="http://schemas.microsoft.com/office/drawing/2010/main" xmlns:m="http://schemas.openxmlformats.org/officeDocument/2006/math" xmlns="" val="1"/>
             </a:ext>
           </a:extLst>
         </p:spPr>
@@ -3824,7 +3848,7 @@
           </a:ln>
           <a:extLst>
             <a:ext uri="{C572A759-6A51-4108-AA02-DFA0A04FC94B}">
-              <ma14:wrappingTextBoxFlag xmlns="" xmlns:m="http://schemas.openxmlformats.org/officeDocument/2006/math" xmlns:a14="http://schemas.microsoft.com/office/drawing/2010/main" xmlns:ma14="http://schemas.microsoft.com/office/mac/drawingml/2011/main" val="1"/>
+              <ma14:wrappingTextBoxFlag xmlns:ma14="http://schemas.microsoft.com/office/mac/drawingml/2011/main" xmlns:a14="http://schemas.microsoft.com/office/drawing/2010/main" xmlns:m="http://schemas.openxmlformats.org/officeDocument/2006/math" xmlns="" val="1"/>
             </a:ext>
           </a:extLst>
         </p:spPr>
@@ -3941,7 +3965,7 @@
             </a:r>
             <a:r>
               <a:rPr lang="nl-NL" dirty="0"/>
-              <a:t>5</a:t>
+              <a:t>7</a:t>
             </a:r>
             <a:r>
               <a:rPr dirty="0"/>
@@ -3957,7 +3981,7 @@
             </a:r>
             <a:r>
               <a:rPr lang="nl-NL" dirty="0"/>
-              <a:t>07</a:t>
+              <a:t>08</a:t>
             </a:r>
             <a:endParaRPr dirty="0"/>
           </a:p>
@@ -3982,7 +4006,7 @@
           </a:ln>
           <a:extLst>
             <a:ext uri="{C572A759-6A51-4108-AA02-DFA0A04FC94B}">
-              <ma14:wrappingTextBoxFlag xmlns="" xmlns:m="http://schemas.openxmlformats.org/officeDocument/2006/math" xmlns:a14="http://schemas.microsoft.com/office/drawing/2010/main" xmlns:ma14="http://schemas.microsoft.com/office/mac/drawingml/2011/main" val="1"/>
+              <ma14:wrappingTextBoxFlag xmlns:ma14="http://schemas.microsoft.com/office/mac/drawingml/2011/main" xmlns:a14="http://schemas.microsoft.com/office/drawing/2010/main" xmlns:m="http://schemas.openxmlformats.org/officeDocument/2006/math" xmlns="" val="1"/>
             </a:ext>
           </a:extLst>
         </p:spPr>
@@ -4469,7 +4493,7 @@
           </a:ln>
           <a:extLst>
             <a:ext uri="{C572A759-6A51-4108-AA02-DFA0A04FC94B}">
-              <ma14:wrappingTextBoxFlag xmlns="" xmlns:m="http://schemas.openxmlformats.org/officeDocument/2006/math" xmlns:a14="http://schemas.microsoft.com/office/drawing/2010/main" xmlns:ma14="http://schemas.microsoft.com/office/mac/drawingml/2011/main" val="1"/>
+              <ma14:wrappingTextBoxFlag xmlns:ma14="http://schemas.microsoft.com/office/mac/drawingml/2011/main" xmlns:a14="http://schemas.microsoft.com/office/drawing/2010/main" xmlns:m="http://schemas.openxmlformats.org/officeDocument/2006/math" xmlns="" val="1"/>
             </a:ext>
           </a:extLst>
         </p:spPr>
@@ -4679,7 +4703,7 @@
           <a:effectLst/>
           <a:extLst>
             <a:ext uri="{C572A759-6A51-4108-AA02-DFA0A04FC94B}">
-              <ma14:wrappingTextBoxFlag xmlns="" xmlns:m="http://schemas.openxmlformats.org/officeDocument/2006/math" xmlns:a14="http://schemas.microsoft.com/office/drawing/2010/main" xmlns:ma14="http://schemas.microsoft.com/office/mac/drawingml/2011/main" val="1"/>
+              <ma14:wrappingTextBoxFlag xmlns:ma14="http://schemas.microsoft.com/office/mac/drawingml/2011/main" xmlns:a14="http://schemas.microsoft.com/office/drawing/2010/main" xmlns:m="http://schemas.openxmlformats.org/officeDocument/2006/math" xmlns="" val="1"/>
             </a:ext>
           </a:extLst>
         </p:spPr>
@@ -4858,7 +4882,7 @@
           </a:ln>
           <a:extLst>
             <a:ext uri="{C572A759-6A51-4108-AA02-DFA0A04FC94B}">
-              <ma14:wrappingTextBoxFlag xmlns="" xmlns:m="http://schemas.openxmlformats.org/officeDocument/2006/math" xmlns:a14="http://schemas.microsoft.com/office/drawing/2010/main" xmlns:ma14="http://schemas.microsoft.com/office/mac/drawingml/2011/main" val="1"/>
+              <ma14:wrappingTextBoxFlag xmlns:ma14="http://schemas.microsoft.com/office/mac/drawingml/2011/main" xmlns:a14="http://schemas.microsoft.com/office/drawing/2010/main" xmlns:m="http://schemas.openxmlformats.org/officeDocument/2006/math" xmlns="" val="1"/>
             </a:ext>
           </a:extLst>
         </p:spPr>
@@ -5025,7 +5049,7 @@
           <a:effectLst/>
           <a:extLst>
             <a:ext uri="{C572A759-6A51-4108-AA02-DFA0A04FC94B}">
-              <ma14:wrappingTextBoxFlag xmlns:lc="http://schemas.openxmlformats.org/drawingml/2006/lockedCanvas" xmlns:ma14="http://schemas.microsoft.com/office/mac/drawingml/2011/main" xmlns:a14="http://schemas.microsoft.com/office/drawing/2010/main" xmlns:m="http://schemas.openxmlformats.org/officeDocument/2006/math" xmlns="" val="1"/>
+              <ma14:wrappingTextBoxFlag xmlns="" xmlns:m="http://schemas.openxmlformats.org/officeDocument/2006/math" xmlns:a14="http://schemas.microsoft.com/office/drawing/2010/main" xmlns:ma14="http://schemas.microsoft.com/office/mac/drawingml/2011/main" xmlns:lc="http://schemas.openxmlformats.org/drawingml/2006/lockedCanvas" val="1"/>
             </a:ext>
           </a:extLst>
         </p:spPr>
@@ -5519,7 +5543,7 @@
           </a:ln>
           <a:extLst>
             <a:ext uri="{C572A759-6A51-4108-AA02-DFA0A04FC94B}">
-              <ma14:wrappingTextBoxFlag xmlns="" xmlns:m="http://schemas.openxmlformats.org/officeDocument/2006/math" xmlns:a14="http://schemas.microsoft.com/office/drawing/2010/main" xmlns:ma14="http://schemas.microsoft.com/office/mac/drawingml/2011/main" val="1"/>
+              <ma14:wrappingTextBoxFlag xmlns:ma14="http://schemas.microsoft.com/office/mac/drawingml/2011/main" xmlns:a14="http://schemas.microsoft.com/office/drawing/2010/main" xmlns:m="http://schemas.openxmlformats.org/officeDocument/2006/math" xmlns="" val="1"/>
             </a:ext>
           </a:extLst>
         </p:spPr>
@@ -5772,7 +5796,7 @@
           </a:ln>
           <a:extLst>
             <a:ext uri="{C572A759-6A51-4108-AA02-DFA0A04FC94B}">
-              <ma14:wrappingTextBoxFlag xmlns="" xmlns:m="http://schemas.openxmlformats.org/officeDocument/2006/math" xmlns:a14="http://schemas.microsoft.com/office/drawing/2010/main" xmlns:ma14="http://schemas.microsoft.com/office/mac/drawingml/2011/main" val="1"/>
+              <ma14:wrappingTextBoxFlag xmlns:ma14="http://schemas.microsoft.com/office/mac/drawingml/2011/main" xmlns:a14="http://schemas.microsoft.com/office/drawing/2010/main" xmlns:m="http://schemas.openxmlformats.org/officeDocument/2006/math" xmlns="" val="1"/>
             </a:ext>
           </a:extLst>
         </p:spPr>
@@ -5836,7 +5860,7 @@
           <a:effectLst/>
           <a:extLst>
             <a:ext uri="{C572A759-6A51-4108-AA02-DFA0A04FC94B}">
-              <ma14:wrappingTextBoxFlag xmlns:lc="http://schemas.openxmlformats.org/drawingml/2006/lockedCanvas" xmlns:ma14="http://schemas.microsoft.com/office/mac/drawingml/2011/main" xmlns:a14="http://schemas.microsoft.com/office/drawing/2010/main" xmlns:m="http://schemas.openxmlformats.org/officeDocument/2006/math" xmlns="" val="1"/>
+              <ma14:wrappingTextBoxFlag xmlns="" xmlns:m="http://schemas.openxmlformats.org/officeDocument/2006/math" xmlns:a14="http://schemas.microsoft.com/office/drawing/2010/main" xmlns:ma14="http://schemas.microsoft.com/office/mac/drawingml/2011/main" xmlns:lc="http://schemas.openxmlformats.org/drawingml/2006/lockedCanvas" val="1"/>
             </a:ext>
           </a:extLst>
         </p:spPr>
@@ -6304,7 +6328,7 @@
           </a:ln>
           <a:extLst>
             <a:ext uri="{C572A759-6A51-4108-AA02-DFA0A04FC94B}">
-              <ma14:wrappingTextBoxFlag xmlns="" xmlns:m="http://schemas.openxmlformats.org/officeDocument/2006/math" xmlns:a14="http://schemas.microsoft.com/office/drawing/2010/main" xmlns:ma14="http://schemas.microsoft.com/office/mac/drawingml/2011/main" val="1"/>
+              <ma14:wrappingTextBoxFlag xmlns:ma14="http://schemas.microsoft.com/office/mac/drawingml/2011/main" xmlns:a14="http://schemas.microsoft.com/office/drawing/2010/main" xmlns:m="http://schemas.openxmlformats.org/officeDocument/2006/math" xmlns="" val="1"/>
             </a:ext>
           </a:extLst>
         </p:spPr>
@@ -6418,7 +6442,7 @@
           </a:ln>
           <a:extLst>
             <a:ext uri="{C572A759-6A51-4108-AA02-DFA0A04FC94B}">
-              <ma14:wrappingTextBoxFlag xmlns="" xmlns:m="http://schemas.openxmlformats.org/officeDocument/2006/math" xmlns:a14="http://schemas.microsoft.com/office/drawing/2010/main" xmlns:ma14="http://schemas.microsoft.com/office/mac/drawingml/2011/main" val="1"/>
+              <ma14:wrappingTextBoxFlag xmlns:ma14="http://schemas.microsoft.com/office/mac/drawingml/2011/main" xmlns:a14="http://schemas.microsoft.com/office/drawing/2010/main" xmlns:m="http://schemas.openxmlformats.org/officeDocument/2006/math" xmlns="" val="1"/>
             </a:ext>
           </a:extLst>
         </p:spPr>
@@ -6579,7 +6603,7 @@
           <a:effectLst/>
           <a:extLst>
             <a:ext uri="{C572A759-6A51-4108-AA02-DFA0A04FC94B}">
-              <ma14:wrappingTextBoxFlag xmlns:lc="http://schemas.openxmlformats.org/drawingml/2006/lockedCanvas" xmlns:ma14="http://schemas.microsoft.com/office/mac/drawingml/2011/main" xmlns:a14="http://schemas.microsoft.com/office/drawing/2010/main" xmlns:m="http://schemas.openxmlformats.org/officeDocument/2006/math" xmlns="" val="1"/>
+              <ma14:wrappingTextBoxFlag xmlns="" xmlns:m="http://schemas.openxmlformats.org/officeDocument/2006/math" xmlns:a14="http://schemas.microsoft.com/office/drawing/2010/main" xmlns:ma14="http://schemas.microsoft.com/office/mac/drawingml/2011/main" xmlns:lc="http://schemas.openxmlformats.org/drawingml/2006/lockedCanvas" val="1"/>
             </a:ext>
           </a:extLst>
         </p:spPr>
@@ -7073,7 +7097,7 @@
           </a:ln>
           <a:extLst>
             <a:ext uri="{C572A759-6A51-4108-AA02-DFA0A04FC94B}">
-              <ma14:wrappingTextBoxFlag xmlns="" xmlns:m="http://schemas.openxmlformats.org/officeDocument/2006/math" xmlns:a14="http://schemas.microsoft.com/office/drawing/2010/main" xmlns:ma14="http://schemas.microsoft.com/office/mac/drawingml/2011/main" val="1"/>
+              <ma14:wrappingTextBoxFlag xmlns:ma14="http://schemas.microsoft.com/office/mac/drawingml/2011/main" xmlns:a14="http://schemas.microsoft.com/office/drawing/2010/main" xmlns:m="http://schemas.openxmlformats.org/officeDocument/2006/math" xmlns="" val="1"/>
             </a:ext>
           </a:extLst>
         </p:spPr>
@@ -7412,7 +7436,7 @@
           </a:ln>
           <a:extLst>
             <a:ext uri="{C572A759-6A51-4108-AA02-DFA0A04FC94B}">
-              <ma14:wrappingTextBoxFlag xmlns="" xmlns:m="http://schemas.openxmlformats.org/officeDocument/2006/math" xmlns:a14="http://schemas.microsoft.com/office/drawing/2010/main" xmlns:ma14="http://schemas.microsoft.com/office/mac/drawingml/2011/main" val="1"/>
+              <ma14:wrappingTextBoxFlag xmlns:ma14="http://schemas.microsoft.com/office/mac/drawingml/2011/main" xmlns:a14="http://schemas.microsoft.com/office/drawing/2010/main" xmlns:m="http://schemas.openxmlformats.org/officeDocument/2006/math" xmlns="" val="1"/>
             </a:ext>
           </a:extLst>
         </p:spPr>
@@ -7543,7 +7567,7 @@
           <a:effectLst/>
           <a:extLst>
             <a:ext uri="{C572A759-6A51-4108-AA02-DFA0A04FC94B}">
-              <ma14:wrappingTextBoxFlag xmlns:lc="http://schemas.openxmlformats.org/drawingml/2006/lockedCanvas" xmlns:ma14="http://schemas.microsoft.com/office/mac/drawingml/2011/main" xmlns:a14="http://schemas.microsoft.com/office/drawing/2010/main" xmlns:m="http://schemas.openxmlformats.org/officeDocument/2006/math" xmlns="" val="1"/>
+              <ma14:wrappingTextBoxFlag xmlns="" xmlns:m="http://schemas.openxmlformats.org/officeDocument/2006/math" xmlns:a14="http://schemas.microsoft.com/office/drawing/2010/main" xmlns:ma14="http://schemas.microsoft.com/office/mac/drawingml/2011/main" xmlns:lc="http://schemas.openxmlformats.org/drawingml/2006/lockedCanvas" val="1"/>
             </a:ext>
           </a:extLst>
         </p:spPr>
@@ -8037,7 +8061,7 @@
           </a:ln>
           <a:extLst>
             <a:ext uri="{C572A759-6A51-4108-AA02-DFA0A04FC94B}">
-              <ma14:wrappingTextBoxFlag xmlns="" xmlns:m="http://schemas.openxmlformats.org/officeDocument/2006/math" xmlns:a14="http://schemas.microsoft.com/office/drawing/2010/main" xmlns:ma14="http://schemas.microsoft.com/office/mac/drawingml/2011/main" val="1"/>
+              <ma14:wrappingTextBoxFlag xmlns:ma14="http://schemas.microsoft.com/office/mac/drawingml/2011/main" xmlns:a14="http://schemas.microsoft.com/office/drawing/2010/main" xmlns:m="http://schemas.openxmlformats.org/officeDocument/2006/math" xmlns="" val="1"/>
             </a:ext>
           </a:extLst>
         </p:spPr>
@@ -8152,7 +8176,7 @@
           </a:ln>
           <a:extLst>
             <a:ext uri="{C572A759-6A51-4108-AA02-DFA0A04FC94B}">
-              <ma14:wrappingTextBoxFlag xmlns="" xmlns:m="http://schemas.openxmlformats.org/officeDocument/2006/math" xmlns:a14="http://schemas.microsoft.com/office/drawing/2010/main" xmlns:ma14="http://schemas.microsoft.com/office/mac/drawingml/2011/main" val="1"/>
+              <ma14:wrappingTextBoxFlag xmlns:ma14="http://schemas.microsoft.com/office/mac/drawingml/2011/main" xmlns:a14="http://schemas.microsoft.com/office/drawing/2010/main" xmlns:m="http://schemas.openxmlformats.org/officeDocument/2006/math" xmlns="" val="1"/>
             </a:ext>
           </a:extLst>
         </p:spPr>
@@ -8263,7 +8287,7 @@
           <a:effectLst/>
           <a:extLst>
             <a:ext uri="{C572A759-6A51-4108-AA02-DFA0A04FC94B}">
-              <ma14:wrappingTextBoxFlag xmlns:lc="http://schemas.openxmlformats.org/drawingml/2006/lockedCanvas" xmlns:ma14="http://schemas.microsoft.com/office/mac/drawingml/2011/main" xmlns:a14="http://schemas.microsoft.com/office/drawing/2010/main" xmlns:m="http://schemas.openxmlformats.org/officeDocument/2006/math" xmlns="" val="1"/>
+              <ma14:wrappingTextBoxFlag xmlns="" xmlns:m="http://schemas.openxmlformats.org/officeDocument/2006/math" xmlns:a14="http://schemas.microsoft.com/office/drawing/2010/main" xmlns:ma14="http://schemas.microsoft.com/office/mac/drawingml/2011/main" xmlns:lc="http://schemas.openxmlformats.org/drawingml/2006/lockedCanvas" val="1"/>
             </a:ext>
           </a:extLst>
         </p:spPr>
@@ -8645,7 +8669,7 @@
           <a:effectLst/>
           <a:extLst>
             <a:ext uri="{C572A759-6A51-4108-AA02-DFA0A04FC94B}">
-              <ma14:wrappingTextBoxFlag xmlns="" xmlns:m="http://schemas.openxmlformats.org/officeDocument/2006/math" xmlns:a14="http://schemas.microsoft.com/office/drawing/2010/main" xmlns:ma14="http://schemas.microsoft.com/office/mac/drawingml/2011/main" val="1"/>
+              <ma14:wrappingTextBoxFlag xmlns:ma14="http://schemas.microsoft.com/office/mac/drawingml/2011/main" xmlns:a14="http://schemas.microsoft.com/office/drawing/2010/main" xmlns:m="http://schemas.openxmlformats.org/officeDocument/2006/math" xmlns="" val="1"/>
             </a:ext>
           </a:extLst>
         </p:spPr>
@@ -8955,7 +8979,7 @@
           <a:effectLst/>
           <a:extLst>
             <a:ext uri="{C572A759-6A51-4108-AA02-DFA0A04FC94B}">
-              <ma14:wrappingTextBoxFlag xmlns="" xmlns:m="http://schemas.openxmlformats.org/officeDocument/2006/math" xmlns:a14="http://schemas.microsoft.com/office/drawing/2010/main" xmlns:ma14="http://schemas.microsoft.com/office/mac/drawingml/2011/main" val="1"/>
+              <ma14:wrappingTextBoxFlag xmlns:ma14="http://schemas.microsoft.com/office/mac/drawingml/2011/main" xmlns:a14="http://schemas.microsoft.com/office/drawing/2010/main" xmlns:m="http://schemas.openxmlformats.org/officeDocument/2006/math" xmlns="" val="1"/>
             </a:ext>
           </a:extLst>
         </p:spPr>
@@ -9221,7 +9245,7 @@
           <a:effectLst/>
           <a:extLst>
             <a:ext uri="{C572A759-6A51-4108-AA02-DFA0A04FC94B}">
-              <ma14:wrappingTextBoxFlag xmlns="" xmlns:m="http://schemas.openxmlformats.org/officeDocument/2006/math" xmlns:a14="http://schemas.microsoft.com/office/drawing/2010/main" xmlns:ma14="http://schemas.microsoft.com/office/mac/drawingml/2011/main" val="1"/>
+              <ma14:wrappingTextBoxFlag xmlns:ma14="http://schemas.microsoft.com/office/mac/drawingml/2011/main" xmlns:a14="http://schemas.microsoft.com/office/drawing/2010/main" xmlns:m="http://schemas.openxmlformats.org/officeDocument/2006/math" xmlns="" val="1"/>
             </a:ext>
           </a:extLst>
         </p:spPr>
@@ -9600,7 +9624,7 @@
           <a:effectLst/>
           <a:extLst>
             <a:ext uri="{C572A759-6A51-4108-AA02-DFA0A04FC94B}">
-              <ma14:wrappingTextBoxFlag xmlns="" xmlns:m="http://schemas.openxmlformats.org/officeDocument/2006/math" xmlns:a14="http://schemas.microsoft.com/office/drawing/2010/main" xmlns:ma14="http://schemas.microsoft.com/office/mac/drawingml/2011/main" val="1"/>
+              <ma14:wrappingTextBoxFlag xmlns:ma14="http://schemas.microsoft.com/office/mac/drawingml/2011/main" xmlns:a14="http://schemas.microsoft.com/office/drawing/2010/main" xmlns:m="http://schemas.openxmlformats.org/officeDocument/2006/math" xmlns="" val="1"/>
             </a:ext>
           </a:extLst>
         </p:spPr>
@@ -10067,7 +10091,7 @@
           </a:ln>
           <a:extLst>
             <a:ext uri="{C572A759-6A51-4108-AA02-DFA0A04FC94B}">
-              <ma14:wrappingTextBoxFlag xmlns="" xmlns:m="http://schemas.openxmlformats.org/officeDocument/2006/math" xmlns:a14="http://schemas.microsoft.com/office/drawing/2010/main" xmlns:ma14="http://schemas.microsoft.com/office/mac/drawingml/2011/main" val="1"/>
+              <ma14:wrappingTextBoxFlag xmlns:ma14="http://schemas.microsoft.com/office/mac/drawingml/2011/main" xmlns:a14="http://schemas.microsoft.com/office/drawing/2010/main" xmlns:m="http://schemas.openxmlformats.org/officeDocument/2006/math" xmlns="" val="1"/>
             </a:ext>
           </a:extLst>
         </p:spPr>
@@ -10131,7 +10155,7 @@
           </a:ln>
           <a:extLst>
             <a:ext uri="{C572A759-6A51-4108-AA02-DFA0A04FC94B}">
-              <ma14:wrappingTextBoxFlag xmlns="" xmlns:m="http://schemas.openxmlformats.org/officeDocument/2006/math" xmlns:a14="http://schemas.microsoft.com/office/drawing/2010/main" xmlns:ma14="http://schemas.microsoft.com/office/mac/drawingml/2011/main" val="1"/>
+              <ma14:wrappingTextBoxFlag xmlns:ma14="http://schemas.microsoft.com/office/mac/drawingml/2011/main" xmlns:a14="http://schemas.microsoft.com/office/drawing/2010/main" xmlns:m="http://schemas.openxmlformats.org/officeDocument/2006/math" xmlns="" val="1"/>
             </a:ext>
           </a:extLst>
         </p:spPr>
@@ -10555,7 +10579,7 @@
           </a:ln>
           <a:extLst>
             <a:ext uri="{C572A759-6A51-4108-AA02-DFA0A04FC94B}">
-              <ma14:wrappingTextBoxFlag xmlns="" xmlns:m="http://schemas.openxmlformats.org/officeDocument/2006/math" xmlns:a14="http://schemas.microsoft.com/office/drawing/2010/main" xmlns:ma14="http://schemas.microsoft.com/office/mac/drawingml/2011/main" val="1"/>
+              <ma14:wrappingTextBoxFlag xmlns:ma14="http://schemas.microsoft.com/office/mac/drawingml/2011/main" xmlns:a14="http://schemas.microsoft.com/office/drawing/2010/main" xmlns:m="http://schemas.openxmlformats.org/officeDocument/2006/math" xmlns="" val="1"/>
             </a:ext>
           </a:extLst>
         </p:spPr>
@@ -10619,7 +10643,7 @@
           </a:ln>
           <a:extLst>
             <a:ext uri="{C572A759-6A51-4108-AA02-DFA0A04FC94B}">
-              <ma14:wrappingTextBoxFlag xmlns="" xmlns:m="http://schemas.openxmlformats.org/officeDocument/2006/math" xmlns:a14="http://schemas.microsoft.com/office/drawing/2010/main" xmlns:ma14="http://schemas.microsoft.com/office/mac/drawingml/2011/main" val="1"/>
+              <ma14:wrappingTextBoxFlag xmlns:ma14="http://schemas.microsoft.com/office/mac/drawingml/2011/main" xmlns:a14="http://schemas.microsoft.com/office/drawing/2010/main" xmlns:m="http://schemas.openxmlformats.org/officeDocument/2006/math" xmlns="" val="1"/>
             </a:ext>
           </a:extLst>
         </p:spPr>

</xml_diff>

<commit_message>
Built site for jfa: 0.6.0@2a9ecd8
</commit_message>
<xml_diff>
--- a/reference/figures/cheatsheet/cheatsheet.pptx
+++ b/reference/figures/cheatsheet/cheatsheet.pptx
@@ -321,44 +321,20 @@
 <file path=ppt/changesInfos/changesInfo1.xml><?xml version="1.0" encoding="utf-8"?>
 <pc:chgInfo xmlns:a="http://schemas.openxmlformats.org/drawingml/2006/main" xmlns:r="http://schemas.openxmlformats.org/officeDocument/2006/relationships" xmlns:ac="http://schemas.microsoft.com/office/drawing/2013/main/command" xmlns:pc="http://schemas.microsoft.com/office/powerpoint/2013/main/command">
   <pc:docChgLst>
-    <pc:chgData name="Derks, Koen" userId="42903d96-be75-4cec-9136-f3710e86cd30" providerId="ADAL" clId="{47C729CF-B9DC-4253-89B2-BDEEBCDC567C}"/>
+    <pc:chgData name="Derks, Koen" userId="42903d96-be75-4cec-9136-f3710e86cd30" providerId="ADAL" clId="{98190025-2A7C-4D67-890F-BF5F2D889559}"/>
     <pc:docChg chg="modSld">
-      <pc:chgData name="Derks, Koen" userId="42903d96-be75-4cec-9136-f3710e86cd30" providerId="ADAL" clId="{47C729CF-B9DC-4253-89B2-BDEEBCDC567C}" dt="2021-05-13T13:34:37.534" v="50" actId="20577"/>
+      <pc:chgData name="Derks, Koen" userId="42903d96-be75-4cec-9136-f3710e86cd30" providerId="ADAL" clId="{98190025-2A7C-4D67-890F-BF5F2D889559}" dt="2021-08-07T09:00:01.276" v="3" actId="20577"/>
       <pc:docMkLst>
         <pc:docMk/>
       </pc:docMkLst>
       <pc:sldChg chg="modSp mod">
-        <pc:chgData name="Derks, Koen" userId="42903d96-be75-4cec-9136-f3710e86cd30" providerId="ADAL" clId="{47C729CF-B9DC-4253-89B2-BDEEBCDC567C}" dt="2021-05-13T13:34:37.534" v="50" actId="20577"/>
+        <pc:chgData name="Derks, Koen" userId="42903d96-be75-4cec-9136-f3710e86cd30" providerId="ADAL" clId="{98190025-2A7C-4D67-890F-BF5F2D889559}" dt="2021-08-07T09:00:01.276" v="3" actId="20577"/>
         <pc:sldMkLst>
           <pc:docMk/>
           <pc:sldMk cId="0" sldId="257"/>
         </pc:sldMkLst>
         <pc:spChg chg="mod">
-          <ac:chgData name="Derks, Koen" userId="42903d96-be75-4cec-9136-f3710e86cd30" providerId="ADAL" clId="{47C729CF-B9DC-4253-89B2-BDEEBCDC567C}" dt="2021-05-13T13:26:15.533" v="46" actId="6549"/>
-          <ac:spMkLst>
-            <pc:docMk/>
-            <pc:sldMk cId="0" sldId="257"/>
-            <ac:spMk id="124" creationId="{840686DE-7A82-47C4-A954-0B456668CB4F}"/>
-          </ac:spMkLst>
-        </pc:spChg>
-        <pc:spChg chg="mod">
-          <ac:chgData name="Derks, Koen" userId="42903d96-be75-4cec-9136-f3710e86cd30" providerId="ADAL" clId="{47C729CF-B9DC-4253-89B2-BDEEBCDC567C}" dt="2021-05-13T13:25:58.682" v="21" actId="20577"/>
-          <ac:spMkLst>
-            <pc:docMk/>
-            <pc:sldMk cId="0" sldId="257"/>
-            <ac:spMk id="129" creationId="{217411A5-52C0-45D9-A546-49235C28A6D7}"/>
-          </ac:spMkLst>
-        </pc:spChg>
-        <pc:spChg chg="mod">
-          <ac:chgData name="Derks, Koen" userId="42903d96-be75-4cec-9136-f3710e86cd30" providerId="ADAL" clId="{47C729CF-B9DC-4253-89B2-BDEEBCDC567C}" dt="2021-05-13T13:25:21.172" v="3" actId="20577"/>
-          <ac:spMkLst>
-            <pc:docMk/>
-            <pc:sldMk cId="0" sldId="257"/>
-            <ac:spMk id="139" creationId="{F2B32D8F-8679-461C-AB88-ED31B7806035}"/>
-          </ac:spMkLst>
-        </pc:spChg>
-        <pc:spChg chg="mod">
-          <ac:chgData name="Derks, Koen" userId="42903d96-be75-4cec-9136-f3710e86cd30" providerId="ADAL" clId="{47C729CF-B9DC-4253-89B2-BDEEBCDC567C}" dt="2021-05-13T13:34:37.534" v="50" actId="20577"/>
+          <ac:chgData name="Derks, Koen" userId="42903d96-be75-4cec-9136-f3710e86cd30" providerId="ADAL" clId="{98190025-2A7C-4D67-890F-BF5F2D889559}" dt="2021-08-07T09:00:01.276" v="3" actId="20577"/>
           <ac:spMkLst>
             <pc:docMk/>
             <pc:sldMk cId="0" sldId="257"/>
@@ -511,70 +487,6 @@
     </pc:docChg>
   </pc:docChgLst>
   <pc:docChgLst>
-    <pc:chgData name="Derks, Koen" userId="42903d96-be75-4cec-9136-f3710e86cd30" providerId="ADAL" clId="{CB4365A0-A1FB-4DEB-ADEA-703F473C097B}"/>
-    <pc:docChg chg="undo custSel modSld">
-      <pc:chgData name="Derks, Koen" userId="42903d96-be75-4cec-9136-f3710e86cd30" providerId="ADAL" clId="{CB4365A0-A1FB-4DEB-ADEA-703F473C097B}" dt="2021-06-02T16:31:03.713" v="294" actId="20577"/>
-      <pc:docMkLst>
-        <pc:docMk/>
-      </pc:docMkLst>
-      <pc:sldChg chg="modSp mod">
-        <pc:chgData name="Derks, Koen" userId="42903d96-be75-4cec-9136-f3710e86cd30" providerId="ADAL" clId="{CB4365A0-A1FB-4DEB-ADEA-703F473C097B}" dt="2021-06-02T16:31:03.713" v="294" actId="20577"/>
-        <pc:sldMkLst>
-          <pc:docMk/>
-          <pc:sldMk cId="0" sldId="257"/>
-        </pc:sldMkLst>
-        <pc:spChg chg="mod">
-          <ac:chgData name="Derks, Koen" userId="42903d96-be75-4cec-9136-f3710e86cd30" providerId="ADAL" clId="{CB4365A0-A1FB-4DEB-ADEA-703F473C097B}" dt="2021-06-02T16:29:22.224" v="227" actId="6549"/>
-          <ac:spMkLst>
-            <pc:docMk/>
-            <pc:sldMk cId="0" sldId="257"/>
-            <ac:spMk id="135" creationId="{9D0348CA-97F1-4EDC-8F7E-BBB556E48519}"/>
-          </ac:spMkLst>
-        </pc:spChg>
-        <pc:spChg chg="mod">
-          <ac:chgData name="Derks, Koen" userId="42903d96-be75-4cec-9136-f3710e86cd30" providerId="ADAL" clId="{CB4365A0-A1FB-4DEB-ADEA-703F473C097B}" dt="2021-06-02T16:31:03.713" v="294" actId="20577"/>
-          <ac:spMkLst>
-            <pc:docMk/>
-            <pc:sldMk cId="0" sldId="257"/>
-            <ac:spMk id="139" creationId="{F2B32D8F-8679-461C-AB88-ED31B7806035}"/>
-          </ac:spMkLst>
-        </pc:spChg>
-        <pc:spChg chg="mod">
-          <ac:chgData name="Derks, Koen" userId="42903d96-be75-4cec-9136-f3710e86cd30" providerId="ADAL" clId="{CB4365A0-A1FB-4DEB-ADEA-703F473C097B}" dt="2021-06-02T16:28:05.339" v="184" actId="20577"/>
-          <ac:spMkLst>
-            <pc:docMk/>
-            <pc:sldMk cId="0" sldId="257"/>
-            <ac:spMk id="140" creationId="{6BAF5637-414B-416F-8562-F22A27CA0897}"/>
-          </ac:spMkLst>
-        </pc:spChg>
-        <pc:spChg chg="mod">
-          <ac:chgData name="Derks, Koen" userId="42903d96-be75-4cec-9136-f3710e86cd30" providerId="ADAL" clId="{CB4365A0-A1FB-4DEB-ADEA-703F473C097B}" dt="2021-06-02T16:26:08.295" v="163"/>
-          <ac:spMkLst>
-            <pc:docMk/>
-            <pc:sldMk cId="0" sldId="257"/>
-            <ac:spMk id="341" creationId="{00000000-0000-0000-0000-000000000000}"/>
-          </ac:spMkLst>
-        </pc:spChg>
-        <pc:spChg chg="mod">
-          <ac:chgData name="Derks, Koen" userId="42903d96-be75-4cec-9136-f3710e86cd30" providerId="ADAL" clId="{CB4365A0-A1FB-4DEB-ADEA-703F473C097B}" dt="2021-06-02T16:25:49.328" v="162" actId="1036"/>
-          <ac:spMkLst>
-            <pc:docMk/>
-            <pc:sldMk cId="0" sldId="257"/>
-            <ac:spMk id="380" creationId="{00000000-0000-0000-0000-000000000000}"/>
-          </ac:spMkLst>
-        </pc:spChg>
-        <pc:spChg chg="mod">
-          <ac:chgData name="Derks, Koen" userId="42903d96-be75-4cec-9136-f3710e86cd30" providerId="ADAL" clId="{CB4365A0-A1FB-4DEB-ADEA-703F473C097B}" dt="2021-06-02T16:27:41.880" v="172" actId="20577"/>
-          <ac:spMkLst>
-            <pc:docMk/>
-            <pc:sldMk cId="0" sldId="257"/>
-            <ac:spMk id="384" creationId="{00000000-0000-0000-0000-000000000000}"/>
-          </ac:spMkLst>
-        </pc:spChg>
-      </pc:sldChg>
-    </pc:docChg>
-  </pc:docChgLst>
-  <pc:docChgLst>
     <pc:chgData name="Derks, Koen" userId="42903d96-be75-4cec-9136-f3710e86cd30" providerId="ADAL" clId="{E813656B-DA65-4A86-81EE-25B476EAF3E8}"/>
     <pc:docChg chg="undo custSel modSld">
       <pc:chgData name="Derks, Koen" userId="42903d96-be75-4cec-9136-f3710e86cd30" providerId="ADAL" clId="{E813656B-DA65-4A86-81EE-25B476EAF3E8}" dt="2021-06-29T10:50:04.321" v="144" actId="20577"/>
@@ -689,6 +601,70 @@
             <pc:docMk/>
             <pc:sldMk cId="0" sldId="257"/>
             <ac:spMk id="380" creationId="{00000000-0000-0000-0000-000000000000}"/>
+          </ac:spMkLst>
+        </pc:spChg>
+      </pc:sldChg>
+    </pc:docChg>
+  </pc:docChgLst>
+  <pc:docChgLst>
+    <pc:chgData name="Derks, Koen" userId="42903d96-be75-4cec-9136-f3710e86cd30" providerId="ADAL" clId="{CB4365A0-A1FB-4DEB-ADEA-703F473C097B}"/>
+    <pc:docChg chg="undo custSel modSld">
+      <pc:chgData name="Derks, Koen" userId="42903d96-be75-4cec-9136-f3710e86cd30" providerId="ADAL" clId="{CB4365A0-A1FB-4DEB-ADEA-703F473C097B}" dt="2021-06-02T16:31:03.713" v="294" actId="20577"/>
+      <pc:docMkLst>
+        <pc:docMk/>
+      </pc:docMkLst>
+      <pc:sldChg chg="modSp mod">
+        <pc:chgData name="Derks, Koen" userId="42903d96-be75-4cec-9136-f3710e86cd30" providerId="ADAL" clId="{CB4365A0-A1FB-4DEB-ADEA-703F473C097B}" dt="2021-06-02T16:31:03.713" v="294" actId="20577"/>
+        <pc:sldMkLst>
+          <pc:docMk/>
+          <pc:sldMk cId="0" sldId="257"/>
+        </pc:sldMkLst>
+        <pc:spChg chg="mod">
+          <ac:chgData name="Derks, Koen" userId="42903d96-be75-4cec-9136-f3710e86cd30" providerId="ADAL" clId="{CB4365A0-A1FB-4DEB-ADEA-703F473C097B}" dt="2021-06-02T16:29:22.224" v="227" actId="6549"/>
+          <ac:spMkLst>
+            <pc:docMk/>
+            <pc:sldMk cId="0" sldId="257"/>
+            <ac:spMk id="135" creationId="{9D0348CA-97F1-4EDC-8F7E-BBB556E48519}"/>
+          </ac:spMkLst>
+        </pc:spChg>
+        <pc:spChg chg="mod">
+          <ac:chgData name="Derks, Koen" userId="42903d96-be75-4cec-9136-f3710e86cd30" providerId="ADAL" clId="{CB4365A0-A1FB-4DEB-ADEA-703F473C097B}" dt="2021-06-02T16:31:03.713" v="294" actId="20577"/>
+          <ac:spMkLst>
+            <pc:docMk/>
+            <pc:sldMk cId="0" sldId="257"/>
+            <ac:spMk id="139" creationId="{F2B32D8F-8679-461C-AB88-ED31B7806035}"/>
+          </ac:spMkLst>
+        </pc:spChg>
+        <pc:spChg chg="mod">
+          <ac:chgData name="Derks, Koen" userId="42903d96-be75-4cec-9136-f3710e86cd30" providerId="ADAL" clId="{CB4365A0-A1FB-4DEB-ADEA-703F473C097B}" dt="2021-06-02T16:28:05.339" v="184" actId="20577"/>
+          <ac:spMkLst>
+            <pc:docMk/>
+            <pc:sldMk cId="0" sldId="257"/>
+            <ac:spMk id="140" creationId="{6BAF5637-414B-416F-8562-F22A27CA0897}"/>
+          </ac:spMkLst>
+        </pc:spChg>
+        <pc:spChg chg="mod">
+          <ac:chgData name="Derks, Koen" userId="42903d96-be75-4cec-9136-f3710e86cd30" providerId="ADAL" clId="{CB4365A0-A1FB-4DEB-ADEA-703F473C097B}" dt="2021-06-02T16:26:08.295" v="163"/>
+          <ac:spMkLst>
+            <pc:docMk/>
+            <pc:sldMk cId="0" sldId="257"/>
+            <ac:spMk id="341" creationId="{00000000-0000-0000-0000-000000000000}"/>
+          </ac:spMkLst>
+        </pc:spChg>
+        <pc:spChg chg="mod">
+          <ac:chgData name="Derks, Koen" userId="42903d96-be75-4cec-9136-f3710e86cd30" providerId="ADAL" clId="{CB4365A0-A1FB-4DEB-ADEA-703F473C097B}" dt="2021-06-02T16:25:49.328" v="162" actId="1036"/>
+          <ac:spMkLst>
+            <pc:docMk/>
+            <pc:sldMk cId="0" sldId="257"/>
+            <ac:spMk id="380" creationId="{00000000-0000-0000-0000-000000000000}"/>
+          </ac:spMkLst>
+        </pc:spChg>
+        <pc:spChg chg="mod">
+          <ac:chgData name="Derks, Koen" userId="42903d96-be75-4cec-9136-f3710e86cd30" providerId="ADAL" clId="{CB4365A0-A1FB-4DEB-ADEA-703F473C097B}" dt="2021-06-02T16:27:41.880" v="172" actId="20577"/>
+          <ac:spMkLst>
+            <pc:docMk/>
+            <pc:sldMk cId="0" sldId="257"/>
+            <ac:spMk id="384" creationId="{00000000-0000-0000-0000-000000000000}"/>
           </ac:spMkLst>
         </pc:spChg>
       </pc:sldChg>
@@ -831,20 +807,44 @@
     </pc:docChg>
   </pc:docChgLst>
   <pc:docChgLst>
-    <pc:chgData name="Derks, Koen" userId="42903d96-be75-4cec-9136-f3710e86cd30" providerId="ADAL" clId="{98190025-2A7C-4D67-890F-BF5F2D889559}"/>
+    <pc:chgData name="Derks, Koen" userId="42903d96-be75-4cec-9136-f3710e86cd30" providerId="ADAL" clId="{47C729CF-B9DC-4253-89B2-BDEEBCDC567C}"/>
     <pc:docChg chg="modSld">
-      <pc:chgData name="Derks, Koen" userId="42903d96-be75-4cec-9136-f3710e86cd30" providerId="ADAL" clId="{98190025-2A7C-4D67-890F-BF5F2D889559}" dt="2021-08-07T09:00:01.276" v="3" actId="20577"/>
+      <pc:chgData name="Derks, Koen" userId="42903d96-be75-4cec-9136-f3710e86cd30" providerId="ADAL" clId="{47C729CF-B9DC-4253-89B2-BDEEBCDC567C}" dt="2021-05-13T13:34:37.534" v="50" actId="20577"/>
       <pc:docMkLst>
         <pc:docMk/>
       </pc:docMkLst>
       <pc:sldChg chg="modSp mod">
-        <pc:chgData name="Derks, Koen" userId="42903d96-be75-4cec-9136-f3710e86cd30" providerId="ADAL" clId="{98190025-2A7C-4D67-890F-BF5F2D889559}" dt="2021-08-07T09:00:01.276" v="3" actId="20577"/>
+        <pc:chgData name="Derks, Koen" userId="42903d96-be75-4cec-9136-f3710e86cd30" providerId="ADAL" clId="{47C729CF-B9DC-4253-89B2-BDEEBCDC567C}" dt="2021-05-13T13:34:37.534" v="50" actId="20577"/>
         <pc:sldMkLst>
           <pc:docMk/>
           <pc:sldMk cId="0" sldId="257"/>
         </pc:sldMkLst>
         <pc:spChg chg="mod">
-          <ac:chgData name="Derks, Koen" userId="42903d96-be75-4cec-9136-f3710e86cd30" providerId="ADAL" clId="{98190025-2A7C-4D67-890F-BF5F2D889559}" dt="2021-08-07T09:00:01.276" v="3" actId="20577"/>
+          <ac:chgData name="Derks, Koen" userId="42903d96-be75-4cec-9136-f3710e86cd30" providerId="ADAL" clId="{47C729CF-B9DC-4253-89B2-BDEEBCDC567C}" dt="2021-05-13T13:26:15.533" v="46" actId="6549"/>
+          <ac:spMkLst>
+            <pc:docMk/>
+            <pc:sldMk cId="0" sldId="257"/>
+            <ac:spMk id="124" creationId="{840686DE-7A82-47C4-A954-0B456668CB4F}"/>
+          </ac:spMkLst>
+        </pc:spChg>
+        <pc:spChg chg="mod">
+          <ac:chgData name="Derks, Koen" userId="42903d96-be75-4cec-9136-f3710e86cd30" providerId="ADAL" clId="{47C729CF-B9DC-4253-89B2-BDEEBCDC567C}" dt="2021-05-13T13:25:58.682" v="21" actId="20577"/>
+          <ac:spMkLst>
+            <pc:docMk/>
+            <pc:sldMk cId="0" sldId="257"/>
+            <ac:spMk id="129" creationId="{217411A5-52C0-45D9-A546-49235C28A6D7}"/>
+          </ac:spMkLst>
+        </pc:spChg>
+        <pc:spChg chg="mod">
+          <ac:chgData name="Derks, Koen" userId="42903d96-be75-4cec-9136-f3710e86cd30" providerId="ADAL" clId="{47C729CF-B9DC-4253-89B2-BDEEBCDC567C}" dt="2021-05-13T13:25:21.172" v="3" actId="20577"/>
+          <ac:spMkLst>
+            <pc:docMk/>
+            <pc:sldMk cId="0" sldId="257"/>
+            <ac:spMk id="139" creationId="{F2B32D8F-8679-461C-AB88-ED31B7806035}"/>
+          </ac:spMkLst>
+        </pc:spChg>
+        <pc:spChg chg="mod">
+          <ac:chgData name="Derks, Koen" userId="42903d96-be75-4cec-9136-f3710e86cd30" providerId="ADAL" clId="{47C729CF-B9DC-4253-89B2-BDEEBCDC567C}" dt="2021-05-13T13:34:37.534" v="50" actId="20577"/>
           <ac:spMkLst>
             <pc:docMk/>
             <pc:sldMk cId="0" sldId="257"/>
@@ -2663,7 +2663,7 @@
           </a:ln>
           <a:extLst>
             <a:ext uri="{C572A759-6A51-4108-AA02-DFA0A04FC94B}">
-              <ma14:wrappingTextBoxFlag xmlns:ma14="http://schemas.microsoft.com/office/mac/drawingml/2011/main" xmlns:a14="http://schemas.microsoft.com/office/drawing/2010/main" xmlns:m="http://schemas.openxmlformats.org/officeDocument/2006/math" xmlns="" val="1"/>
+              <ma14:wrappingTextBoxFlag xmlns="" xmlns:m="http://schemas.openxmlformats.org/officeDocument/2006/math" xmlns:a14="http://schemas.microsoft.com/office/drawing/2010/main" xmlns:ma14="http://schemas.microsoft.com/office/mac/drawingml/2011/main" val="1"/>
             </a:ext>
           </a:extLst>
         </p:spPr>
@@ -2702,7 +2702,7 @@
           </a:ln>
           <a:extLst>
             <a:ext uri="{C572A759-6A51-4108-AA02-DFA0A04FC94B}">
-              <ma14:wrappingTextBoxFlag xmlns:ma14="http://schemas.microsoft.com/office/mac/drawingml/2011/main" xmlns:a14="http://schemas.microsoft.com/office/drawing/2010/main" xmlns:m="http://schemas.openxmlformats.org/officeDocument/2006/math" xmlns="" val="1"/>
+              <ma14:wrappingTextBoxFlag xmlns="" xmlns:m="http://schemas.openxmlformats.org/officeDocument/2006/math" xmlns:a14="http://schemas.microsoft.com/office/drawing/2010/main" xmlns:ma14="http://schemas.microsoft.com/office/mac/drawingml/2011/main" val="1"/>
             </a:ext>
           </a:extLst>
         </p:spPr>
@@ -3795,7 +3795,7 @@
           </a:ln>
           <a:extLst>
             <a:ext uri="{C572A759-6A51-4108-AA02-DFA0A04FC94B}">
-              <ma14:wrappingTextBoxFlag xmlns:ma14="http://schemas.microsoft.com/office/mac/drawingml/2011/main" xmlns:a14="http://schemas.microsoft.com/office/drawing/2010/main" xmlns:m="http://schemas.openxmlformats.org/officeDocument/2006/math" xmlns="" val="1"/>
+              <ma14:wrappingTextBoxFlag xmlns="" xmlns:m="http://schemas.openxmlformats.org/officeDocument/2006/math" xmlns:a14="http://schemas.microsoft.com/office/drawing/2010/main" xmlns:ma14="http://schemas.microsoft.com/office/mac/drawingml/2011/main" val="1"/>
             </a:ext>
           </a:extLst>
         </p:spPr>
@@ -3848,7 +3848,7 @@
           </a:ln>
           <a:extLst>
             <a:ext uri="{C572A759-6A51-4108-AA02-DFA0A04FC94B}">
-              <ma14:wrappingTextBoxFlag xmlns:ma14="http://schemas.microsoft.com/office/mac/drawingml/2011/main" xmlns:a14="http://schemas.microsoft.com/office/drawing/2010/main" xmlns:m="http://schemas.openxmlformats.org/officeDocument/2006/math" xmlns="" val="1"/>
+              <ma14:wrappingTextBoxFlag xmlns="" xmlns:m="http://schemas.openxmlformats.org/officeDocument/2006/math" xmlns:a14="http://schemas.microsoft.com/office/drawing/2010/main" xmlns:ma14="http://schemas.microsoft.com/office/mac/drawingml/2011/main" val="1"/>
             </a:ext>
           </a:extLst>
         </p:spPr>
@@ -3961,11 +3961,19 @@
             </a:r>
             <a:r>
               <a:rPr dirty="0"/>
-              <a:t> version  0.5.</a:t>
+              <a:t> version  0.</a:t>
             </a:r>
             <a:r>
               <a:rPr lang="nl-NL" dirty="0"/>
-              <a:t>7</a:t>
+              <a:t>6</a:t>
+            </a:r>
+            <a:r>
+              <a:rPr dirty="0"/>
+              <a:t>.</a:t>
+            </a:r>
+            <a:r>
+              <a:rPr lang="nl-NL" dirty="0"/>
+              <a:t>0</a:t>
             </a:r>
             <a:r>
               <a:rPr dirty="0"/>
@@ -3981,7 +3989,7 @@
             </a:r>
             <a:r>
               <a:rPr lang="nl-NL" dirty="0"/>
-              <a:t>08</a:t>
+              <a:t>09</a:t>
             </a:r>
             <a:endParaRPr dirty="0"/>
           </a:p>
@@ -4006,7 +4014,7 @@
           </a:ln>
           <a:extLst>
             <a:ext uri="{C572A759-6A51-4108-AA02-DFA0A04FC94B}">
-              <ma14:wrappingTextBoxFlag xmlns:ma14="http://schemas.microsoft.com/office/mac/drawingml/2011/main" xmlns:a14="http://schemas.microsoft.com/office/drawing/2010/main" xmlns:m="http://schemas.openxmlformats.org/officeDocument/2006/math" xmlns="" val="1"/>
+              <ma14:wrappingTextBoxFlag xmlns="" xmlns:m="http://schemas.openxmlformats.org/officeDocument/2006/math" xmlns:a14="http://schemas.microsoft.com/office/drawing/2010/main" xmlns:ma14="http://schemas.microsoft.com/office/mac/drawingml/2011/main" val="1"/>
             </a:ext>
           </a:extLst>
         </p:spPr>
@@ -4493,7 +4501,7 @@
           </a:ln>
           <a:extLst>
             <a:ext uri="{C572A759-6A51-4108-AA02-DFA0A04FC94B}">
-              <ma14:wrappingTextBoxFlag xmlns:ma14="http://schemas.microsoft.com/office/mac/drawingml/2011/main" xmlns:a14="http://schemas.microsoft.com/office/drawing/2010/main" xmlns:m="http://schemas.openxmlformats.org/officeDocument/2006/math" xmlns="" val="1"/>
+              <ma14:wrappingTextBoxFlag xmlns="" xmlns:m="http://schemas.openxmlformats.org/officeDocument/2006/math" xmlns:a14="http://schemas.microsoft.com/office/drawing/2010/main" xmlns:ma14="http://schemas.microsoft.com/office/mac/drawingml/2011/main" val="1"/>
             </a:ext>
           </a:extLst>
         </p:spPr>
@@ -4703,7 +4711,7 @@
           <a:effectLst/>
           <a:extLst>
             <a:ext uri="{C572A759-6A51-4108-AA02-DFA0A04FC94B}">
-              <ma14:wrappingTextBoxFlag xmlns:ma14="http://schemas.microsoft.com/office/mac/drawingml/2011/main" xmlns:a14="http://schemas.microsoft.com/office/drawing/2010/main" xmlns:m="http://schemas.openxmlformats.org/officeDocument/2006/math" xmlns="" val="1"/>
+              <ma14:wrappingTextBoxFlag xmlns="" xmlns:m="http://schemas.openxmlformats.org/officeDocument/2006/math" xmlns:a14="http://schemas.microsoft.com/office/drawing/2010/main" xmlns:ma14="http://schemas.microsoft.com/office/mac/drawingml/2011/main" val="1"/>
             </a:ext>
           </a:extLst>
         </p:spPr>
@@ -4882,7 +4890,7 @@
           </a:ln>
           <a:extLst>
             <a:ext uri="{C572A759-6A51-4108-AA02-DFA0A04FC94B}">
-              <ma14:wrappingTextBoxFlag xmlns:ma14="http://schemas.microsoft.com/office/mac/drawingml/2011/main" xmlns:a14="http://schemas.microsoft.com/office/drawing/2010/main" xmlns:m="http://schemas.openxmlformats.org/officeDocument/2006/math" xmlns="" val="1"/>
+              <ma14:wrappingTextBoxFlag xmlns="" xmlns:m="http://schemas.openxmlformats.org/officeDocument/2006/math" xmlns:a14="http://schemas.microsoft.com/office/drawing/2010/main" xmlns:ma14="http://schemas.microsoft.com/office/mac/drawingml/2011/main" val="1"/>
             </a:ext>
           </a:extLst>
         </p:spPr>
@@ -5049,7 +5057,7 @@
           <a:effectLst/>
           <a:extLst>
             <a:ext uri="{C572A759-6A51-4108-AA02-DFA0A04FC94B}">
-              <ma14:wrappingTextBoxFlag xmlns="" xmlns:m="http://schemas.openxmlformats.org/officeDocument/2006/math" xmlns:a14="http://schemas.microsoft.com/office/drawing/2010/main" xmlns:ma14="http://schemas.microsoft.com/office/mac/drawingml/2011/main" xmlns:lc="http://schemas.openxmlformats.org/drawingml/2006/lockedCanvas" val="1"/>
+              <ma14:wrappingTextBoxFlag xmlns:lc="http://schemas.openxmlformats.org/drawingml/2006/lockedCanvas" xmlns:ma14="http://schemas.microsoft.com/office/mac/drawingml/2011/main" xmlns:a14="http://schemas.microsoft.com/office/drawing/2010/main" xmlns:m="http://schemas.openxmlformats.org/officeDocument/2006/math" xmlns="" val="1"/>
             </a:ext>
           </a:extLst>
         </p:spPr>
@@ -5543,7 +5551,7 @@
           </a:ln>
           <a:extLst>
             <a:ext uri="{C572A759-6A51-4108-AA02-DFA0A04FC94B}">
-              <ma14:wrappingTextBoxFlag xmlns:ma14="http://schemas.microsoft.com/office/mac/drawingml/2011/main" xmlns:a14="http://schemas.microsoft.com/office/drawing/2010/main" xmlns:m="http://schemas.openxmlformats.org/officeDocument/2006/math" xmlns="" val="1"/>
+              <ma14:wrappingTextBoxFlag xmlns="" xmlns:m="http://schemas.openxmlformats.org/officeDocument/2006/math" xmlns:a14="http://schemas.microsoft.com/office/drawing/2010/main" xmlns:ma14="http://schemas.microsoft.com/office/mac/drawingml/2011/main" val="1"/>
             </a:ext>
           </a:extLst>
         </p:spPr>
@@ -5747,14 +5755,14 @@
               </a:defRPr>
             </a:pPr>
             <a:r>
-              <a:rPr lang="en-US" b="0" dirty="0" err="1">
+              <a:rPr lang="en-US" b="0" dirty="0">
                 <a:solidFill>
                   <a:schemeClr val="accent1"/>
                 </a:solidFill>
                 <a:latin typeface="Courier New" panose="02070309020205020404" pitchFamily="49" charset="0"/>
                 <a:cs typeface="Courier New" panose="02070309020205020404" pitchFamily="49" charset="0"/>
               </a:rPr>
-              <a:t>expectedError</a:t>
+              <a:t>expected</a:t>
             </a:r>
             <a:r>
               <a:rPr lang="en-US" b="0" dirty="0">
@@ -5796,7 +5804,7 @@
           </a:ln>
           <a:extLst>
             <a:ext uri="{C572A759-6A51-4108-AA02-DFA0A04FC94B}">
-              <ma14:wrappingTextBoxFlag xmlns:ma14="http://schemas.microsoft.com/office/mac/drawingml/2011/main" xmlns:a14="http://schemas.microsoft.com/office/drawing/2010/main" xmlns:m="http://schemas.openxmlformats.org/officeDocument/2006/math" xmlns="" val="1"/>
+              <ma14:wrappingTextBoxFlag xmlns="" xmlns:m="http://schemas.openxmlformats.org/officeDocument/2006/math" xmlns:a14="http://schemas.microsoft.com/office/drawing/2010/main" xmlns:ma14="http://schemas.microsoft.com/office/mac/drawingml/2011/main" val="1"/>
             </a:ext>
           </a:extLst>
         </p:spPr>
@@ -5860,7 +5868,7 @@
           <a:effectLst/>
           <a:extLst>
             <a:ext uri="{C572A759-6A51-4108-AA02-DFA0A04FC94B}">
-              <ma14:wrappingTextBoxFlag xmlns="" xmlns:m="http://schemas.openxmlformats.org/officeDocument/2006/math" xmlns:a14="http://schemas.microsoft.com/office/drawing/2010/main" xmlns:ma14="http://schemas.microsoft.com/office/mac/drawingml/2011/main" xmlns:lc="http://schemas.openxmlformats.org/drawingml/2006/lockedCanvas" val="1"/>
+              <ma14:wrappingTextBoxFlag xmlns:lc="http://schemas.openxmlformats.org/drawingml/2006/lockedCanvas" xmlns:ma14="http://schemas.microsoft.com/office/mac/drawingml/2011/main" xmlns:a14="http://schemas.microsoft.com/office/drawing/2010/main" xmlns:m="http://schemas.openxmlformats.org/officeDocument/2006/math" xmlns="" val="1"/>
             </a:ext>
           </a:extLst>
         </p:spPr>
@@ -6318,7 +6326,7 @@
         <p:spPr>
           <a:xfrm>
             <a:off x="4800724" y="5731817"/>
-            <a:ext cx="5564925" cy="775003"/>
+            <a:ext cx="5564925" cy="613421"/>
           </a:xfrm>
           <a:prstGeom prst="rect">
             <a:avLst/>
@@ -6328,7 +6336,7 @@
           </a:ln>
           <a:extLst>
             <a:ext uri="{C572A759-6A51-4108-AA02-DFA0A04FC94B}">
-              <ma14:wrappingTextBoxFlag xmlns:ma14="http://schemas.microsoft.com/office/mac/drawingml/2011/main" xmlns:a14="http://schemas.microsoft.com/office/drawing/2010/main" xmlns:m="http://schemas.openxmlformats.org/officeDocument/2006/math" xmlns="" val="1"/>
+              <ma14:wrappingTextBoxFlag xmlns="" xmlns:m="http://schemas.openxmlformats.org/officeDocument/2006/math" xmlns:a14="http://schemas.microsoft.com/office/drawing/2010/main" xmlns:ma14="http://schemas.microsoft.com/office/mac/drawingml/2011/main" val="1"/>
             </a:ext>
           </a:extLst>
         </p:spPr>
@@ -6381,7 +6389,7 @@
                 <a:latin typeface="Courier New" panose="02070309020205020404" pitchFamily="49" charset="0"/>
                 <a:cs typeface="Courier New" panose="02070309020205020404" pitchFamily="49" charset="0"/>
               </a:rPr>
-              <a:t>algorithm</a:t>
+              <a:t>method</a:t>
             </a:r>
             <a:r>
               <a:rPr lang="en-US" b="0" i="0" dirty="0">
@@ -6391,7 +6399,26 @@
                 <a:effectLst/>
                 <a:latin typeface="+mn-lt"/>
               </a:rPr>
-              <a:t>s: random sampling, cell sampling, or fixed interval sampling. Sampling is done in combination with one of two sampling </a:t>
+              <a:t>’s</a:t>
+            </a:r>
+            <a:r>
+              <a:rPr lang="en-US" b="0" dirty="0">
+                <a:solidFill>
+                  <a:srgbClr val="000000"/>
+                </a:solidFill>
+                <a:latin typeface="+mn-lt"/>
+              </a:rPr>
+              <a:t>:</a:t>
+            </a:r>
+            <a:r>
+              <a:rPr lang="en-US" b="0" i="0" dirty="0">
+                <a:solidFill>
+                  <a:srgbClr val="000000"/>
+                </a:solidFill>
+                <a:effectLst/>
+                <a:latin typeface="+mn-lt"/>
+              </a:rPr>
+              <a:t> random sampling, cell sampling, or fixed interval sampling. Sampling is done in combination with one of two sampling </a:t>
             </a:r>
             <a:r>
               <a:rPr lang="en-US" b="0" i="0" dirty="0">
@@ -6412,7 +6439,7 @@
                 <a:effectLst/>
                 <a:latin typeface="+mn-lt"/>
               </a:rPr>
-              <a:t>: records or monetary units.</a:t>
+              <a:t>: items or monetary units.</a:t>
             </a:r>
           </a:p>
         </p:txBody>
@@ -6442,7 +6469,7 @@
           </a:ln>
           <a:extLst>
             <a:ext uri="{C572A759-6A51-4108-AA02-DFA0A04FC94B}">
-              <ma14:wrappingTextBoxFlag xmlns:ma14="http://schemas.microsoft.com/office/mac/drawingml/2011/main" xmlns:a14="http://schemas.microsoft.com/office/drawing/2010/main" xmlns:m="http://schemas.openxmlformats.org/officeDocument/2006/math" xmlns="" val="1"/>
+              <ma14:wrappingTextBoxFlag xmlns="" xmlns:m="http://schemas.openxmlformats.org/officeDocument/2006/math" xmlns:a14="http://schemas.microsoft.com/office/drawing/2010/main" xmlns:ma14="http://schemas.microsoft.com/office/mac/drawingml/2011/main" val="1"/>
             </a:ext>
           </a:extLst>
         </p:spPr>
@@ -6603,7 +6630,7 @@
           <a:effectLst/>
           <a:extLst>
             <a:ext uri="{C572A759-6A51-4108-AA02-DFA0A04FC94B}">
-              <ma14:wrappingTextBoxFlag xmlns="" xmlns:m="http://schemas.openxmlformats.org/officeDocument/2006/math" xmlns:a14="http://schemas.microsoft.com/office/drawing/2010/main" xmlns:ma14="http://schemas.microsoft.com/office/mac/drawingml/2011/main" xmlns:lc="http://schemas.openxmlformats.org/drawingml/2006/lockedCanvas" val="1"/>
+              <ma14:wrappingTextBoxFlag xmlns:lc="http://schemas.openxmlformats.org/drawingml/2006/lockedCanvas" xmlns:ma14="http://schemas.microsoft.com/office/mac/drawingml/2011/main" xmlns:a14="http://schemas.microsoft.com/office/drawing/2010/main" xmlns:m="http://schemas.openxmlformats.org/officeDocument/2006/math" xmlns="" val="1"/>
             </a:ext>
           </a:extLst>
         </p:spPr>
@@ -7097,7 +7124,7 @@
           </a:ln>
           <a:extLst>
             <a:ext uri="{C572A759-6A51-4108-AA02-DFA0A04FC94B}">
-              <ma14:wrappingTextBoxFlag xmlns:ma14="http://schemas.microsoft.com/office/mac/drawingml/2011/main" xmlns:a14="http://schemas.microsoft.com/office/drawing/2010/main" xmlns:m="http://schemas.openxmlformats.org/officeDocument/2006/math" xmlns="" val="1"/>
+              <ma14:wrappingTextBoxFlag xmlns="" xmlns:m="http://schemas.openxmlformats.org/officeDocument/2006/math" xmlns:a14="http://schemas.microsoft.com/office/drawing/2010/main" xmlns:ma14="http://schemas.microsoft.com/office/mac/drawingml/2011/main" val="1"/>
             </a:ext>
           </a:extLst>
         </p:spPr>
@@ -7149,7 +7176,7 @@
                 <a:cs typeface="Courier New" panose="02070309020205020404" pitchFamily="49" charset="0"/>
                 <a:sym typeface="Source Sans Pro"/>
               </a:rPr>
-              <a:t>sample</a:t>
+              <a:t>data</a:t>
             </a:r>
             <a:r>
               <a:rPr lang="en-US" dirty="0">
@@ -7161,7 +7188,7 @@
               <a:t>, </a:t>
             </a:r>
             <a:r>
-              <a:rPr lang="en-US" dirty="0" err="1">
+              <a:rPr lang="en-US" dirty="0">
                 <a:solidFill>
                   <a:schemeClr val="accent1"/>
                 </a:solidFill>
@@ -7169,7 +7196,7 @@
                 <a:cs typeface="Courier New" panose="02070309020205020404" pitchFamily="49" charset="0"/>
                 <a:sym typeface="Source Sans Pro"/>
               </a:rPr>
-              <a:t>bookValues</a:t>
+              <a:t>values</a:t>
             </a:r>
             <a:r>
               <a:rPr lang="en-US" dirty="0">
@@ -7189,7 +7216,7 @@
                 <a:cs typeface="Courier New" panose="02070309020205020404" pitchFamily="49" charset="0"/>
                 <a:sym typeface="Source Sans Pro"/>
               </a:rPr>
-              <a:t>auditValues</a:t>
+              <a:t>values.audit</a:t>
             </a:r>
             <a:r>
               <a:rPr lang="en-US" dirty="0">
@@ -7201,7 +7228,7 @@
               <a:t>) or summary statistics from a sample (using </a:t>
             </a:r>
             <a:r>
-              <a:rPr lang="en-US" dirty="0" err="1">
+              <a:rPr lang="en-US" dirty="0">
                 <a:solidFill>
                   <a:schemeClr val="accent1"/>
                 </a:solidFill>
@@ -7209,7 +7236,7 @@
                 <a:cs typeface="Courier New" panose="02070309020205020404" pitchFamily="49" charset="0"/>
                 <a:sym typeface="Source Sans Pro"/>
               </a:rPr>
-              <a:t>nSumstats</a:t>
+              <a:t>x</a:t>
             </a:r>
             <a:r>
               <a:rPr lang="en-US" dirty="0">
@@ -7221,7 +7248,7 @@
               <a:t> and </a:t>
             </a:r>
             <a:r>
-              <a:rPr lang="en-US" dirty="0" err="1">
+              <a:rPr lang="en-US" dirty="0">
                 <a:solidFill>
                   <a:schemeClr val="accent1"/>
                 </a:solidFill>
@@ -7229,7 +7256,7 @@
                 <a:cs typeface="Courier New" panose="02070309020205020404" pitchFamily="49" charset="0"/>
                 <a:sym typeface="Source Sans Pro"/>
               </a:rPr>
-              <a:t>kSumstats</a:t>
+              <a:t>n</a:t>
             </a:r>
             <a:r>
               <a:rPr lang="en-US" dirty="0">
@@ -7436,7 +7463,7 @@
           </a:ln>
           <a:extLst>
             <a:ext uri="{C572A759-6A51-4108-AA02-DFA0A04FC94B}">
-              <ma14:wrappingTextBoxFlag xmlns:ma14="http://schemas.microsoft.com/office/mac/drawingml/2011/main" xmlns:a14="http://schemas.microsoft.com/office/drawing/2010/main" xmlns:m="http://schemas.openxmlformats.org/officeDocument/2006/math" xmlns="" val="1"/>
+              <ma14:wrappingTextBoxFlag xmlns="" xmlns:m="http://schemas.openxmlformats.org/officeDocument/2006/math" xmlns:a14="http://schemas.microsoft.com/office/drawing/2010/main" xmlns:ma14="http://schemas.microsoft.com/office/mac/drawingml/2011/main" val="1"/>
             </a:ext>
           </a:extLst>
         </p:spPr>
@@ -7567,7 +7594,7 @@
           <a:effectLst/>
           <a:extLst>
             <a:ext uri="{C572A759-6A51-4108-AA02-DFA0A04FC94B}">
-              <ma14:wrappingTextBoxFlag xmlns="" xmlns:m="http://schemas.openxmlformats.org/officeDocument/2006/math" xmlns:a14="http://schemas.microsoft.com/office/drawing/2010/main" xmlns:ma14="http://schemas.microsoft.com/office/mac/drawingml/2011/main" xmlns:lc="http://schemas.openxmlformats.org/drawingml/2006/lockedCanvas" val="1"/>
+              <ma14:wrappingTextBoxFlag xmlns:lc="http://schemas.openxmlformats.org/drawingml/2006/lockedCanvas" xmlns:ma14="http://schemas.microsoft.com/office/mac/drawingml/2011/main" xmlns:a14="http://schemas.microsoft.com/office/drawing/2010/main" xmlns:m="http://schemas.openxmlformats.org/officeDocument/2006/math" xmlns="" val="1"/>
             </a:ext>
           </a:extLst>
         </p:spPr>
@@ -8061,7 +8088,7 @@
           </a:ln>
           <a:extLst>
             <a:ext uri="{C572A759-6A51-4108-AA02-DFA0A04FC94B}">
-              <ma14:wrappingTextBoxFlag xmlns:ma14="http://schemas.microsoft.com/office/mac/drawingml/2011/main" xmlns:a14="http://schemas.microsoft.com/office/drawing/2010/main" xmlns:m="http://schemas.openxmlformats.org/officeDocument/2006/math" xmlns="" val="1"/>
+              <ma14:wrappingTextBoxFlag xmlns="" xmlns:m="http://schemas.openxmlformats.org/officeDocument/2006/math" xmlns:a14="http://schemas.microsoft.com/office/drawing/2010/main" xmlns:ma14="http://schemas.microsoft.com/office/mac/drawingml/2011/main" val="1"/>
             </a:ext>
           </a:extLst>
         </p:spPr>
@@ -8176,7 +8203,7 @@
           </a:ln>
           <a:extLst>
             <a:ext uri="{C572A759-6A51-4108-AA02-DFA0A04FC94B}">
-              <ma14:wrappingTextBoxFlag xmlns:ma14="http://schemas.microsoft.com/office/mac/drawingml/2011/main" xmlns:a14="http://schemas.microsoft.com/office/drawing/2010/main" xmlns:m="http://schemas.openxmlformats.org/officeDocument/2006/math" xmlns="" val="1"/>
+              <ma14:wrappingTextBoxFlag xmlns="" xmlns:m="http://schemas.openxmlformats.org/officeDocument/2006/math" xmlns:a14="http://schemas.microsoft.com/office/drawing/2010/main" xmlns:ma14="http://schemas.microsoft.com/office/mac/drawingml/2011/main" val="1"/>
             </a:ext>
           </a:extLst>
         </p:spPr>
@@ -8287,7 +8314,7 @@
           <a:effectLst/>
           <a:extLst>
             <a:ext uri="{C572A759-6A51-4108-AA02-DFA0A04FC94B}">
-              <ma14:wrappingTextBoxFlag xmlns="" xmlns:m="http://schemas.openxmlformats.org/officeDocument/2006/math" xmlns:a14="http://schemas.microsoft.com/office/drawing/2010/main" xmlns:ma14="http://schemas.microsoft.com/office/mac/drawingml/2011/main" xmlns:lc="http://schemas.openxmlformats.org/drawingml/2006/lockedCanvas" val="1"/>
+              <ma14:wrappingTextBoxFlag xmlns:lc="http://schemas.openxmlformats.org/drawingml/2006/lockedCanvas" xmlns:ma14="http://schemas.microsoft.com/office/mac/drawingml/2011/main" xmlns:a14="http://schemas.microsoft.com/office/drawing/2010/main" xmlns:m="http://schemas.openxmlformats.org/officeDocument/2006/math" xmlns="" val="1"/>
             </a:ext>
           </a:extLst>
         </p:spPr>
@@ -8669,7 +8696,7 @@
           <a:effectLst/>
           <a:extLst>
             <a:ext uri="{C572A759-6A51-4108-AA02-DFA0A04FC94B}">
-              <ma14:wrappingTextBoxFlag xmlns:ma14="http://schemas.microsoft.com/office/mac/drawingml/2011/main" xmlns:a14="http://schemas.microsoft.com/office/drawing/2010/main" xmlns:m="http://schemas.openxmlformats.org/officeDocument/2006/math" xmlns="" val="1"/>
+              <ma14:wrappingTextBoxFlag xmlns="" xmlns:m="http://schemas.openxmlformats.org/officeDocument/2006/math" xmlns:a14="http://schemas.microsoft.com/office/drawing/2010/main" xmlns:ma14="http://schemas.microsoft.com/office/mac/drawingml/2011/main" val="1"/>
             </a:ext>
           </a:extLst>
         </p:spPr>
@@ -8767,7 +8794,7 @@
                 <a:latin typeface="Courier New" panose="02070309020205020404" pitchFamily="49" charset="0"/>
                 <a:cs typeface="Courier New" panose="02070309020205020404" pitchFamily="49" charset="0"/>
               </a:rPr>
-              <a:t>expectedError</a:t>
+              <a:t>expected</a:t>
             </a:r>
             <a:r>
               <a:rPr lang="nl-NL" sz="1000" dirty="0">
@@ -8890,7 +8917,7 @@
                 <a:latin typeface="Courier New" panose="02070309020205020404" pitchFamily="49" charset="0"/>
                 <a:cs typeface="Courier New" panose="02070309020205020404" pitchFamily="49" charset="0"/>
               </a:rPr>
-              <a:t>confidence</a:t>
+              <a:t>conf.level</a:t>
             </a:r>
             <a:r>
               <a:rPr lang="nl-NL" sz="1000" dirty="0">
@@ -8979,7 +9006,7 @@
           <a:effectLst/>
           <a:extLst>
             <a:ext uri="{C572A759-6A51-4108-AA02-DFA0A04FC94B}">
-              <ma14:wrappingTextBoxFlag xmlns:ma14="http://schemas.microsoft.com/office/mac/drawingml/2011/main" xmlns:a14="http://schemas.microsoft.com/office/drawing/2010/main" xmlns:m="http://schemas.openxmlformats.org/officeDocument/2006/math" xmlns="" val="1"/>
+              <ma14:wrappingTextBoxFlag xmlns="" xmlns:m="http://schemas.openxmlformats.org/officeDocument/2006/math" xmlns:a14="http://schemas.microsoft.com/office/drawing/2010/main" xmlns:ma14="http://schemas.microsoft.com/office/mac/drawingml/2011/main" val="1"/>
             </a:ext>
           </a:extLst>
         </p:spPr>
@@ -9025,31 +9052,7 @@
                 <a:latin typeface="Courier New" panose="02070309020205020404" pitchFamily="49" charset="0"/>
                 <a:cs typeface="Courier New" panose="02070309020205020404" pitchFamily="49" charset="0"/>
               </a:rPr>
-              <a:t>(</a:t>
-            </a:r>
-            <a:r>
-              <a:rPr lang="nl-NL" sz="1000" dirty="0" err="1">
-                <a:solidFill>
-                  <a:schemeClr val="tx1">
-                    <a:lumMod val="50000"/>
-                  </a:schemeClr>
-                </a:solidFill>
-                <a:latin typeface="Courier New" panose="02070309020205020404" pitchFamily="49" charset="0"/>
-                <a:cs typeface="Courier New" panose="02070309020205020404" pitchFamily="49" charset="0"/>
-              </a:rPr>
-              <a:t>population</a:t>
-            </a:r>
-            <a:r>
-              <a:rPr lang="nl-NL" sz="1000" dirty="0">
-                <a:solidFill>
-                  <a:schemeClr val="tx1">
-                    <a:lumMod val="50000"/>
-                  </a:schemeClr>
-                </a:solidFill>
-                <a:latin typeface="Courier New" panose="02070309020205020404" pitchFamily="49" charset="0"/>
-                <a:cs typeface="Courier New" panose="02070309020205020404" pitchFamily="49" charset="0"/>
-              </a:rPr>
-              <a:t> = </a:t>
+              <a:t>(data = </a:t>
             </a:r>
             <a:r>
               <a:rPr lang="nl-NL" sz="1000" dirty="0" err="1">
@@ -9113,7 +9116,7 @@
                 <a:latin typeface="Courier New" panose="02070309020205020404" pitchFamily="49" charset="0"/>
                 <a:cs typeface="Courier New" panose="02070309020205020404" pitchFamily="49" charset="0"/>
               </a:rPr>
-              <a:t>sampleSize</a:t>
+              <a:t>size</a:t>
             </a:r>
             <a:r>
               <a:rPr lang="nl-NL" sz="1000" dirty="0">
@@ -9153,7 +9156,7 @@
                 <a:latin typeface="Courier New" panose="02070309020205020404" pitchFamily="49" charset="0"/>
                 <a:cs typeface="Courier New" panose="02070309020205020404" pitchFamily="49" charset="0"/>
               </a:rPr>
-              <a:t>          units = 'records',</a:t>
+              <a:t>          units = 'items',</a:t>
             </a:r>
           </a:p>
           <a:p>
@@ -9245,7 +9248,7 @@
           <a:effectLst/>
           <a:extLst>
             <a:ext uri="{C572A759-6A51-4108-AA02-DFA0A04FC94B}">
-              <ma14:wrappingTextBoxFlag xmlns:ma14="http://schemas.microsoft.com/office/mac/drawingml/2011/main" xmlns:a14="http://schemas.microsoft.com/office/drawing/2010/main" xmlns:m="http://schemas.openxmlformats.org/officeDocument/2006/math" xmlns="" val="1"/>
+              <ma14:wrappingTextBoxFlag xmlns="" xmlns:m="http://schemas.openxmlformats.org/officeDocument/2006/math" xmlns:a14="http://schemas.microsoft.com/office/drawing/2010/main" xmlns:ma14="http://schemas.microsoft.com/office/mac/drawingml/2011/main" val="1"/>
             </a:ext>
           </a:extLst>
         </p:spPr>
@@ -9431,7 +9434,7 @@
                 <a:latin typeface="Courier New" panose="02070309020205020404" pitchFamily="49" charset="0"/>
                 <a:cs typeface="Courier New" panose="02070309020205020404" pitchFamily="49" charset="0"/>
               </a:rPr>
-              <a:t>confidence</a:t>
+              <a:t>conf.level</a:t>
             </a:r>
             <a:r>
               <a:rPr lang="nl-NL" sz="1000" dirty="0">
@@ -9471,31 +9474,7 @@
                 <a:latin typeface="Courier New" panose="02070309020205020404" pitchFamily="49" charset="0"/>
                 <a:cs typeface="Courier New" panose="02070309020205020404" pitchFamily="49" charset="0"/>
               </a:rPr>
-              <a:t>           </a:t>
-            </a:r>
-            <a:r>
-              <a:rPr lang="nl-NL" sz="1000" dirty="0" err="1">
-                <a:solidFill>
-                  <a:schemeClr val="tx1">
-                    <a:lumMod val="50000"/>
-                  </a:schemeClr>
-                </a:solidFill>
-                <a:latin typeface="Courier New" panose="02070309020205020404" pitchFamily="49" charset="0"/>
-                <a:cs typeface="Courier New" panose="02070309020205020404" pitchFamily="49" charset="0"/>
-              </a:rPr>
-              <a:t>nSumstats</a:t>
-            </a:r>
-            <a:r>
-              <a:rPr lang="nl-NL" sz="1000" dirty="0">
-                <a:solidFill>
-                  <a:schemeClr val="tx1">
-                    <a:lumMod val="50000"/>
-                  </a:schemeClr>
-                </a:solidFill>
-                <a:latin typeface="Courier New" panose="02070309020205020404" pitchFamily="49" charset="0"/>
-                <a:cs typeface="Courier New" panose="02070309020205020404" pitchFamily="49" charset="0"/>
-              </a:rPr>
-              <a:t> = 93,</a:t>
+              <a:t>           x = 0,</a:t>
             </a:r>
           </a:p>
           <a:p>
@@ -9523,31 +9502,7 @@
                 <a:latin typeface="Courier New" panose="02070309020205020404" pitchFamily="49" charset="0"/>
                 <a:cs typeface="Courier New" panose="02070309020205020404" pitchFamily="49" charset="0"/>
               </a:rPr>
-              <a:t>           </a:t>
-            </a:r>
-            <a:r>
-              <a:rPr lang="nl-NL" sz="1000" dirty="0" err="1">
-                <a:solidFill>
-                  <a:schemeClr val="tx1">
-                    <a:lumMod val="50000"/>
-                  </a:schemeClr>
-                </a:solidFill>
-                <a:latin typeface="Courier New" panose="02070309020205020404" pitchFamily="49" charset="0"/>
-                <a:cs typeface="Courier New" panose="02070309020205020404" pitchFamily="49" charset="0"/>
-              </a:rPr>
-              <a:t>kSumstats</a:t>
-            </a:r>
-            <a:r>
-              <a:rPr lang="nl-NL" sz="1000" dirty="0">
-                <a:solidFill>
-                  <a:schemeClr val="tx1">
-                    <a:lumMod val="50000"/>
-                  </a:schemeClr>
-                </a:solidFill>
-                <a:latin typeface="Courier New" panose="02070309020205020404" pitchFamily="49" charset="0"/>
-                <a:cs typeface="Courier New" panose="02070309020205020404" pitchFamily="49" charset="0"/>
-              </a:rPr>
-              <a:t> = 0, </a:t>
+              <a:t>           n = 93, </a:t>
             </a:r>
           </a:p>
           <a:p>
@@ -9624,7 +9579,7 @@
           <a:effectLst/>
           <a:extLst>
             <a:ext uri="{C572A759-6A51-4108-AA02-DFA0A04FC94B}">
-              <ma14:wrappingTextBoxFlag xmlns:ma14="http://schemas.microsoft.com/office/mac/drawingml/2011/main" xmlns:a14="http://schemas.microsoft.com/office/drawing/2010/main" xmlns:m="http://schemas.openxmlformats.org/officeDocument/2006/math" xmlns="" val="1"/>
+              <ma14:wrappingTextBoxFlag xmlns="" xmlns:m="http://schemas.openxmlformats.org/officeDocument/2006/math" xmlns:a14="http://schemas.microsoft.com/office/drawing/2010/main" xmlns:ma14="http://schemas.microsoft.com/office/mac/drawingml/2011/main" val="1"/>
             </a:ext>
           </a:extLst>
         </p:spPr>
@@ -10091,7 +10046,7 @@
           </a:ln>
           <a:extLst>
             <a:ext uri="{C572A759-6A51-4108-AA02-DFA0A04FC94B}">
-              <ma14:wrappingTextBoxFlag xmlns:ma14="http://schemas.microsoft.com/office/mac/drawingml/2011/main" xmlns:a14="http://schemas.microsoft.com/office/drawing/2010/main" xmlns:m="http://schemas.openxmlformats.org/officeDocument/2006/math" xmlns="" val="1"/>
+              <ma14:wrappingTextBoxFlag xmlns="" xmlns:m="http://schemas.openxmlformats.org/officeDocument/2006/math" xmlns:a14="http://schemas.microsoft.com/office/drawing/2010/main" xmlns:ma14="http://schemas.microsoft.com/office/mac/drawingml/2011/main" val="1"/>
             </a:ext>
           </a:extLst>
         </p:spPr>
@@ -10155,7 +10110,7 @@
           </a:ln>
           <a:extLst>
             <a:ext uri="{C572A759-6A51-4108-AA02-DFA0A04FC94B}">
-              <ma14:wrappingTextBoxFlag xmlns:ma14="http://schemas.microsoft.com/office/mac/drawingml/2011/main" xmlns:a14="http://schemas.microsoft.com/office/drawing/2010/main" xmlns:m="http://schemas.openxmlformats.org/officeDocument/2006/math" xmlns="" val="1"/>
+              <ma14:wrappingTextBoxFlag xmlns="" xmlns:m="http://schemas.openxmlformats.org/officeDocument/2006/math" xmlns:a14="http://schemas.microsoft.com/office/drawing/2010/main" xmlns:ma14="http://schemas.microsoft.com/office/mac/drawingml/2011/main" val="1"/>
             </a:ext>
           </a:extLst>
         </p:spPr>
@@ -10579,7 +10534,7 @@
           </a:ln>
           <a:extLst>
             <a:ext uri="{C572A759-6A51-4108-AA02-DFA0A04FC94B}">
-              <ma14:wrappingTextBoxFlag xmlns:ma14="http://schemas.microsoft.com/office/mac/drawingml/2011/main" xmlns:a14="http://schemas.microsoft.com/office/drawing/2010/main" xmlns:m="http://schemas.openxmlformats.org/officeDocument/2006/math" xmlns="" val="1"/>
+              <ma14:wrappingTextBoxFlag xmlns="" xmlns:m="http://schemas.openxmlformats.org/officeDocument/2006/math" xmlns:a14="http://schemas.microsoft.com/office/drawing/2010/main" xmlns:ma14="http://schemas.microsoft.com/office/mac/drawingml/2011/main" val="1"/>
             </a:ext>
           </a:extLst>
         </p:spPr>
@@ -10643,7 +10598,7 @@
           </a:ln>
           <a:extLst>
             <a:ext uri="{C572A759-6A51-4108-AA02-DFA0A04FC94B}">
-              <ma14:wrappingTextBoxFlag xmlns:ma14="http://schemas.microsoft.com/office/mac/drawingml/2011/main" xmlns:a14="http://schemas.microsoft.com/office/drawing/2010/main" xmlns:m="http://schemas.openxmlformats.org/officeDocument/2006/math" xmlns="" val="1"/>
+              <ma14:wrappingTextBoxFlag xmlns="" xmlns:m="http://schemas.openxmlformats.org/officeDocument/2006/math" xmlns:a14="http://schemas.microsoft.com/office/drawing/2010/main" xmlns:ma14="http://schemas.microsoft.com/office/mac/drawingml/2011/main" val="1"/>
             </a:ext>
           </a:extLst>
         </p:spPr>

</xml_diff>

<commit_message>
Built site for jfa: 0.6.0@6d19998
</commit_message>
<xml_diff>
--- a/reference/figures/cheatsheet/cheatsheet.pptx
+++ b/reference/figures/cheatsheet/cheatsheet.pptx
@@ -4845,7 +4845,7 @@
                 <a:latin typeface="Courier New" panose="02070309020205020404" pitchFamily="49" charset="0"/>
                 <a:cs typeface="Courier New" panose="02070309020205020404" pitchFamily="49" charset="0"/>
               </a:rPr>
-              <a:t>binomial</a:t>
+              <a:t>poisson</a:t>
             </a:r>
             <a:r>
               <a:rPr lang="nl-NL" sz="1000" dirty="0">
@@ -8870,7 +8870,7 @@
                 <a:latin typeface="Courier New" panose="02070309020205020404" pitchFamily="49" charset="0"/>
                 <a:cs typeface="Courier New" panose="02070309020205020404" pitchFamily="49" charset="0"/>
               </a:rPr>
-              <a:t>binomial</a:t>
+              <a:t>poisson</a:t>
             </a:r>
             <a:r>
               <a:rPr lang="nl-NL" sz="1000" dirty="0">
@@ -9196,7 +9196,7 @@
                 <a:latin typeface="Courier New" panose="02070309020205020404" pitchFamily="49" charset="0"/>
                 <a:cs typeface="Courier New" panose="02070309020205020404" pitchFamily="49" charset="0"/>
               </a:rPr>
-              <a:t>algorithm</a:t>
+              <a:t>method</a:t>
             </a:r>
             <a:r>
               <a:rPr lang="nl-NL" sz="1000" dirty="0">
@@ -9382,7 +9382,7 @@
                 <a:latin typeface="Courier New" panose="02070309020205020404" pitchFamily="49" charset="0"/>
                 <a:cs typeface="Courier New" panose="02070309020205020404" pitchFamily="49" charset="0"/>
               </a:rPr>
-              <a:t>binomial</a:t>
+              <a:t>poisson</a:t>
             </a:r>
             <a:r>
               <a:rPr lang="nl-NL" sz="1000" dirty="0">

</xml_diff>

<commit_message>
Built site for jfa: 0.6.0@e54b519
</commit_message>
<xml_diff>
--- a/reference/figures/cheatsheet/cheatsheet.pptx
+++ b/reference/figures/cheatsheet/cheatsheet.pptx
@@ -2663,7 +2663,7 @@
           </a:ln>
           <a:extLst>
             <a:ext uri="{C572A759-6A51-4108-AA02-DFA0A04FC94B}">
-              <ma14:wrappingTextBoxFlag xmlns="" xmlns:m="http://schemas.openxmlformats.org/officeDocument/2006/math" xmlns:a14="http://schemas.microsoft.com/office/drawing/2010/main" xmlns:ma14="http://schemas.microsoft.com/office/mac/drawingml/2011/main" val="1"/>
+              <ma14:wrappingTextBoxFlag xmlns:ma14="http://schemas.microsoft.com/office/mac/drawingml/2011/main" xmlns:a14="http://schemas.microsoft.com/office/drawing/2010/main" xmlns:m="http://schemas.openxmlformats.org/officeDocument/2006/math" xmlns="" val="1"/>
             </a:ext>
           </a:extLst>
         </p:spPr>
@@ -2702,7 +2702,7 @@
           </a:ln>
           <a:extLst>
             <a:ext uri="{C572A759-6A51-4108-AA02-DFA0A04FC94B}">
-              <ma14:wrappingTextBoxFlag xmlns="" xmlns:m="http://schemas.openxmlformats.org/officeDocument/2006/math" xmlns:a14="http://schemas.microsoft.com/office/drawing/2010/main" xmlns:ma14="http://schemas.microsoft.com/office/mac/drawingml/2011/main" val="1"/>
+              <ma14:wrappingTextBoxFlag xmlns:ma14="http://schemas.microsoft.com/office/mac/drawingml/2011/main" xmlns:a14="http://schemas.microsoft.com/office/drawing/2010/main" xmlns:m="http://schemas.openxmlformats.org/officeDocument/2006/math" xmlns="" val="1"/>
             </a:ext>
           </a:extLst>
         </p:spPr>
@@ -3795,7 +3795,7 @@
           </a:ln>
           <a:extLst>
             <a:ext uri="{C572A759-6A51-4108-AA02-DFA0A04FC94B}">
-              <ma14:wrappingTextBoxFlag xmlns="" xmlns:m="http://schemas.openxmlformats.org/officeDocument/2006/math" xmlns:a14="http://schemas.microsoft.com/office/drawing/2010/main" xmlns:ma14="http://schemas.microsoft.com/office/mac/drawingml/2011/main" val="1"/>
+              <ma14:wrappingTextBoxFlag xmlns:ma14="http://schemas.microsoft.com/office/mac/drawingml/2011/main" xmlns:a14="http://schemas.microsoft.com/office/drawing/2010/main" xmlns:m="http://schemas.openxmlformats.org/officeDocument/2006/math" xmlns="" val="1"/>
             </a:ext>
           </a:extLst>
         </p:spPr>
@@ -3848,7 +3848,7 @@
           </a:ln>
           <a:extLst>
             <a:ext uri="{C572A759-6A51-4108-AA02-DFA0A04FC94B}">
-              <ma14:wrappingTextBoxFlag xmlns="" xmlns:m="http://schemas.openxmlformats.org/officeDocument/2006/math" xmlns:a14="http://schemas.microsoft.com/office/drawing/2010/main" xmlns:ma14="http://schemas.microsoft.com/office/mac/drawingml/2011/main" val="1"/>
+              <ma14:wrappingTextBoxFlag xmlns:ma14="http://schemas.microsoft.com/office/mac/drawingml/2011/main" xmlns:a14="http://schemas.microsoft.com/office/drawing/2010/main" xmlns:m="http://schemas.openxmlformats.org/officeDocument/2006/math" xmlns="" val="1"/>
             </a:ext>
           </a:extLst>
         </p:spPr>
@@ -4014,7 +4014,7 @@
           </a:ln>
           <a:extLst>
             <a:ext uri="{C572A759-6A51-4108-AA02-DFA0A04FC94B}">
-              <ma14:wrappingTextBoxFlag xmlns="" xmlns:m="http://schemas.openxmlformats.org/officeDocument/2006/math" xmlns:a14="http://schemas.microsoft.com/office/drawing/2010/main" xmlns:ma14="http://schemas.microsoft.com/office/mac/drawingml/2011/main" val="1"/>
+              <ma14:wrappingTextBoxFlag xmlns:ma14="http://schemas.microsoft.com/office/mac/drawingml/2011/main" xmlns:a14="http://schemas.microsoft.com/office/drawing/2010/main" xmlns:m="http://schemas.openxmlformats.org/officeDocument/2006/math" xmlns="" val="1"/>
             </a:ext>
           </a:extLst>
         </p:spPr>
@@ -4501,7 +4501,7 @@
           </a:ln>
           <a:extLst>
             <a:ext uri="{C572A759-6A51-4108-AA02-DFA0A04FC94B}">
-              <ma14:wrappingTextBoxFlag xmlns="" xmlns:m="http://schemas.openxmlformats.org/officeDocument/2006/math" xmlns:a14="http://schemas.microsoft.com/office/drawing/2010/main" xmlns:ma14="http://schemas.microsoft.com/office/mac/drawingml/2011/main" val="1"/>
+              <ma14:wrappingTextBoxFlag xmlns:ma14="http://schemas.microsoft.com/office/mac/drawingml/2011/main" xmlns:a14="http://schemas.microsoft.com/office/drawing/2010/main" xmlns:m="http://schemas.openxmlformats.org/officeDocument/2006/math" xmlns="" val="1"/>
             </a:ext>
           </a:extLst>
         </p:spPr>
@@ -4711,7 +4711,7 @@
           <a:effectLst/>
           <a:extLst>
             <a:ext uri="{C572A759-6A51-4108-AA02-DFA0A04FC94B}">
-              <ma14:wrappingTextBoxFlag xmlns="" xmlns:m="http://schemas.openxmlformats.org/officeDocument/2006/math" xmlns:a14="http://schemas.microsoft.com/office/drawing/2010/main" xmlns:ma14="http://schemas.microsoft.com/office/mac/drawingml/2011/main" val="1"/>
+              <ma14:wrappingTextBoxFlag xmlns:ma14="http://schemas.microsoft.com/office/mac/drawingml/2011/main" xmlns:a14="http://schemas.microsoft.com/office/drawing/2010/main" xmlns:m="http://schemas.openxmlformats.org/officeDocument/2006/math" xmlns="" val="1"/>
             </a:ext>
           </a:extLst>
         </p:spPr>
@@ -4890,7 +4890,7 @@
           </a:ln>
           <a:extLst>
             <a:ext uri="{C572A759-6A51-4108-AA02-DFA0A04FC94B}">
-              <ma14:wrappingTextBoxFlag xmlns="" xmlns:m="http://schemas.openxmlformats.org/officeDocument/2006/math" xmlns:a14="http://schemas.microsoft.com/office/drawing/2010/main" xmlns:ma14="http://schemas.microsoft.com/office/mac/drawingml/2011/main" val="1"/>
+              <ma14:wrappingTextBoxFlag xmlns:ma14="http://schemas.microsoft.com/office/mac/drawingml/2011/main" xmlns:a14="http://schemas.microsoft.com/office/drawing/2010/main" xmlns:m="http://schemas.openxmlformats.org/officeDocument/2006/math" xmlns="" val="1"/>
             </a:ext>
           </a:extLst>
         </p:spPr>
@@ -5057,7 +5057,7 @@
           <a:effectLst/>
           <a:extLst>
             <a:ext uri="{C572A759-6A51-4108-AA02-DFA0A04FC94B}">
-              <ma14:wrappingTextBoxFlag xmlns:lc="http://schemas.openxmlformats.org/drawingml/2006/lockedCanvas" xmlns:ma14="http://schemas.microsoft.com/office/mac/drawingml/2011/main" xmlns:a14="http://schemas.microsoft.com/office/drawing/2010/main" xmlns:m="http://schemas.openxmlformats.org/officeDocument/2006/math" xmlns="" val="1"/>
+              <ma14:wrappingTextBoxFlag xmlns="" xmlns:m="http://schemas.openxmlformats.org/officeDocument/2006/math" xmlns:a14="http://schemas.microsoft.com/office/drawing/2010/main" xmlns:ma14="http://schemas.microsoft.com/office/mac/drawingml/2011/main" xmlns:lc="http://schemas.openxmlformats.org/drawingml/2006/lockedCanvas" val="1"/>
             </a:ext>
           </a:extLst>
         </p:spPr>
@@ -5551,7 +5551,7 @@
           </a:ln>
           <a:extLst>
             <a:ext uri="{C572A759-6A51-4108-AA02-DFA0A04FC94B}">
-              <ma14:wrappingTextBoxFlag xmlns="" xmlns:m="http://schemas.openxmlformats.org/officeDocument/2006/math" xmlns:a14="http://schemas.microsoft.com/office/drawing/2010/main" xmlns:ma14="http://schemas.microsoft.com/office/mac/drawingml/2011/main" val="1"/>
+              <ma14:wrappingTextBoxFlag xmlns:ma14="http://schemas.microsoft.com/office/mac/drawingml/2011/main" xmlns:a14="http://schemas.microsoft.com/office/drawing/2010/main" xmlns:m="http://schemas.openxmlformats.org/officeDocument/2006/math" xmlns="" val="1"/>
             </a:ext>
           </a:extLst>
         </p:spPr>
@@ -5771,7 +5771,7 @@
                 </a:solidFill>
                 <a:latin typeface="+mn-lt"/>
               </a:rPr>
-              <a:t>: A fraction specifying the expected errors in the sample.</a:t>
+              <a:t>: A fraction or an integer specifying the expected errors in the sample.</a:t>
             </a:r>
             <a:endParaRPr dirty="0">
               <a:latin typeface="+mn-lt"/>
@@ -5804,7 +5804,7 @@
           </a:ln>
           <a:extLst>
             <a:ext uri="{C572A759-6A51-4108-AA02-DFA0A04FC94B}">
-              <ma14:wrappingTextBoxFlag xmlns="" xmlns:m="http://schemas.openxmlformats.org/officeDocument/2006/math" xmlns:a14="http://schemas.microsoft.com/office/drawing/2010/main" xmlns:ma14="http://schemas.microsoft.com/office/mac/drawingml/2011/main" val="1"/>
+              <ma14:wrappingTextBoxFlag xmlns:ma14="http://schemas.microsoft.com/office/mac/drawingml/2011/main" xmlns:a14="http://schemas.microsoft.com/office/drawing/2010/main" xmlns:m="http://schemas.openxmlformats.org/officeDocument/2006/math" xmlns="" val="1"/>
             </a:ext>
           </a:extLst>
         </p:spPr>
@@ -5868,7 +5868,7 @@
           <a:effectLst/>
           <a:extLst>
             <a:ext uri="{C572A759-6A51-4108-AA02-DFA0A04FC94B}">
-              <ma14:wrappingTextBoxFlag xmlns:lc="http://schemas.openxmlformats.org/drawingml/2006/lockedCanvas" xmlns:ma14="http://schemas.microsoft.com/office/mac/drawingml/2011/main" xmlns:a14="http://schemas.microsoft.com/office/drawing/2010/main" xmlns:m="http://schemas.openxmlformats.org/officeDocument/2006/math" xmlns="" val="1"/>
+              <ma14:wrappingTextBoxFlag xmlns="" xmlns:m="http://schemas.openxmlformats.org/officeDocument/2006/math" xmlns:a14="http://schemas.microsoft.com/office/drawing/2010/main" xmlns:ma14="http://schemas.microsoft.com/office/mac/drawingml/2011/main" xmlns:lc="http://schemas.openxmlformats.org/drawingml/2006/lockedCanvas" val="1"/>
             </a:ext>
           </a:extLst>
         </p:spPr>
@@ -6336,7 +6336,7 @@
           </a:ln>
           <a:extLst>
             <a:ext uri="{C572A759-6A51-4108-AA02-DFA0A04FC94B}">
-              <ma14:wrappingTextBoxFlag xmlns="" xmlns:m="http://schemas.openxmlformats.org/officeDocument/2006/math" xmlns:a14="http://schemas.microsoft.com/office/drawing/2010/main" xmlns:ma14="http://schemas.microsoft.com/office/mac/drawingml/2011/main" val="1"/>
+              <ma14:wrappingTextBoxFlag xmlns:ma14="http://schemas.microsoft.com/office/mac/drawingml/2011/main" xmlns:a14="http://schemas.microsoft.com/office/drawing/2010/main" xmlns:m="http://schemas.openxmlformats.org/officeDocument/2006/math" xmlns="" val="1"/>
             </a:ext>
           </a:extLst>
         </p:spPr>
@@ -6469,7 +6469,7 @@
           </a:ln>
           <a:extLst>
             <a:ext uri="{C572A759-6A51-4108-AA02-DFA0A04FC94B}">
-              <ma14:wrappingTextBoxFlag xmlns="" xmlns:m="http://schemas.openxmlformats.org/officeDocument/2006/math" xmlns:a14="http://schemas.microsoft.com/office/drawing/2010/main" xmlns:ma14="http://schemas.microsoft.com/office/mac/drawingml/2011/main" val="1"/>
+              <ma14:wrappingTextBoxFlag xmlns:ma14="http://schemas.microsoft.com/office/mac/drawingml/2011/main" xmlns:a14="http://schemas.microsoft.com/office/drawing/2010/main" xmlns:m="http://schemas.openxmlformats.org/officeDocument/2006/math" xmlns="" val="1"/>
             </a:ext>
           </a:extLst>
         </p:spPr>
@@ -6630,7 +6630,7 @@
           <a:effectLst/>
           <a:extLst>
             <a:ext uri="{C572A759-6A51-4108-AA02-DFA0A04FC94B}">
-              <ma14:wrappingTextBoxFlag xmlns:lc="http://schemas.openxmlformats.org/drawingml/2006/lockedCanvas" xmlns:ma14="http://schemas.microsoft.com/office/mac/drawingml/2011/main" xmlns:a14="http://schemas.microsoft.com/office/drawing/2010/main" xmlns:m="http://schemas.openxmlformats.org/officeDocument/2006/math" xmlns="" val="1"/>
+              <ma14:wrappingTextBoxFlag xmlns="" xmlns:m="http://schemas.openxmlformats.org/officeDocument/2006/math" xmlns:a14="http://schemas.microsoft.com/office/drawing/2010/main" xmlns:ma14="http://schemas.microsoft.com/office/mac/drawingml/2011/main" xmlns:lc="http://schemas.openxmlformats.org/drawingml/2006/lockedCanvas" val="1"/>
             </a:ext>
           </a:extLst>
         </p:spPr>
@@ -7124,7 +7124,7 @@
           </a:ln>
           <a:extLst>
             <a:ext uri="{C572A759-6A51-4108-AA02-DFA0A04FC94B}">
-              <ma14:wrappingTextBoxFlag xmlns="" xmlns:m="http://schemas.openxmlformats.org/officeDocument/2006/math" xmlns:a14="http://schemas.microsoft.com/office/drawing/2010/main" xmlns:ma14="http://schemas.microsoft.com/office/mac/drawingml/2011/main" val="1"/>
+              <ma14:wrappingTextBoxFlag xmlns:ma14="http://schemas.microsoft.com/office/mac/drawingml/2011/main" xmlns:a14="http://schemas.microsoft.com/office/drawing/2010/main" xmlns:m="http://schemas.openxmlformats.org/officeDocument/2006/math" xmlns="" val="1"/>
             </a:ext>
           </a:extLst>
         </p:spPr>
@@ -7463,7 +7463,7 @@
           </a:ln>
           <a:extLst>
             <a:ext uri="{C572A759-6A51-4108-AA02-DFA0A04FC94B}">
-              <ma14:wrappingTextBoxFlag xmlns="" xmlns:m="http://schemas.openxmlformats.org/officeDocument/2006/math" xmlns:a14="http://schemas.microsoft.com/office/drawing/2010/main" xmlns:ma14="http://schemas.microsoft.com/office/mac/drawingml/2011/main" val="1"/>
+              <ma14:wrappingTextBoxFlag xmlns:ma14="http://schemas.microsoft.com/office/mac/drawingml/2011/main" xmlns:a14="http://schemas.microsoft.com/office/drawing/2010/main" xmlns:m="http://schemas.openxmlformats.org/officeDocument/2006/math" xmlns="" val="1"/>
             </a:ext>
           </a:extLst>
         </p:spPr>
@@ -7594,7 +7594,7 @@
           <a:effectLst/>
           <a:extLst>
             <a:ext uri="{C572A759-6A51-4108-AA02-DFA0A04FC94B}">
-              <ma14:wrappingTextBoxFlag xmlns:lc="http://schemas.openxmlformats.org/drawingml/2006/lockedCanvas" xmlns:ma14="http://schemas.microsoft.com/office/mac/drawingml/2011/main" xmlns:a14="http://schemas.microsoft.com/office/drawing/2010/main" xmlns:m="http://schemas.openxmlformats.org/officeDocument/2006/math" xmlns="" val="1"/>
+              <ma14:wrappingTextBoxFlag xmlns="" xmlns:m="http://schemas.openxmlformats.org/officeDocument/2006/math" xmlns:a14="http://schemas.microsoft.com/office/drawing/2010/main" xmlns:ma14="http://schemas.microsoft.com/office/mac/drawingml/2011/main" xmlns:lc="http://schemas.openxmlformats.org/drawingml/2006/lockedCanvas" val="1"/>
             </a:ext>
           </a:extLst>
         </p:spPr>
@@ -8088,7 +8088,7 @@
           </a:ln>
           <a:extLst>
             <a:ext uri="{C572A759-6A51-4108-AA02-DFA0A04FC94B}">
-              <ma14:wrappingTextBoxFlag xmlns="" xmlns:m="http://schemas.openxmlformats.org/officeDocument/2006/math" xmlns:a14="http://schemas.microsoft.com/office/drawing/2010/main" xmlns:ma14="http://schemas.microsoft.com/office/mac/drawingml/2011/main" val="1"/>
+              <ma14:wrappingTextBoxFlag xmlns:ma14="http://schemas.microsoft.com/office/mac/drawingml/2011/main" xmlns:a14="http://schemas.microsoft.com/office/drawing/2010/main" xmlns:m="http://schemas.openxmlformats.org/officeDocument/2006/math" xmlns="" val="1"/>
             </a:ext>
           </a:extLst>
         </p:spPr>
@@ -8203,7 +8203,7 @@
           </a:ln>
           <a:extLst>
             <a:ext uri="{C572A759-6A51-4108-AA02-DFA0A04FC94B}">
-              <ma14:wrappingTextBoxFlag xmlns="" xmlns:m="http://schemas.openxmlformats.org/officeDocument/2006/math" xmlns:a14="http://schemas.microsoft.com/office/drawing/2010/main" xmlns:ma14="http://schemas.microsoft.com/office/mac/drawingml/2011/main" val="1"/>
+              <ma14:wrappingTextBoxFlag xmlns:ma14="http://schemas.microsoft.com/office/mac/drawingml/2011/main" xmlns:a14="http://schemas.microsoft.com/office/drawing/2010/main" xmlns:m="http://schemas.openxmlformats.org/officeDocument/2006/math" xmlns="" val="1"/>
             </a:ext>
           </a:extLst>
         </p:spPr>
@@ -8314,7 +8314,7 @@
           <a:effectLst/>
           <a:extLst>
             <a:ext uri="{C572A759-6A51-4108-AA02-DFA0A04FC94B}">
-              <ma14:wrappingTextBoxFlag xmlns:lc="http://schemas.openxmlformats.org/drawingml/2006/lockedCanvas" xmlns:ma14="http://schemas.microsoft.com/office/mac/drawingml/2011/main" xmlns:a14="http://schemas.microsoft.com/office/drawing/2010/main" xmlns:m="http://schemas.openxmlformats.org/officeDocument/2006/math" xmlns="" val="1"/>
+              <ma14:wrappingTextBoxFlag xmlns="" xmlns:m="http://schemas.openxmlformats.org/officeDocument/2006/math" xmlns:a14="http://schemas.microsoft.com/office/drawing/2010/main" xmlns:ma14="http://schemas.microsoft.com/office/mac/drawingml/2011/main" xmlns:lc="http://schemas.openxmlformats.org/drawingml/2006/lockedCanvas" val="1"/>
             </a:ext>
           </a:extLst>
         </p:spPr>
@@ -8696,7 +8696,7 @@
           <a:effectLst/>
           <a:extLst>
             <a:ext uri="{C572A759-6A51-4108-AA02-DFA0A04FC94B}">
-              <ma14:wrappingTextBoxFlag xmlns="" xmlns:m="http://schemas.openxmlformats.org/officeDocument/2006/math" xmlns:a14="http://schemas.microsoft.com/office/drawing/2010/main" xmlns:ma14="http://schemas.microsoft.com/office/mac/drawingml/2011/main" val="1"/>
+              <ma14:wrappingTextBoxFlag xmlns:ma14="http://schemas.microsoft.com/office/mac/drawingml/2011/main" xmlns:a14="http://schemas.microsoft.com/office/drawing/2010/main" xmlns:m="http://schemas.openxmlformats.org/officeDocument/2006/math" xmlns="" val="1"/>
             </a:ext>
           </a:extLst>
         </p:spPr>
@@ -9006,7 +9006,7 @@
           <a:effectLst/>
           <a:extLst>
             <a:ext uri="{C572A759-6A51-4108-AA02-DFA0A04FC94B}">
-              <ma14:wrappingTextBoxFlag xmlns="" xmlns:m="http://schemas.openxmlformats.org/officeDocument/2006/math" xmlns:a14="http://schemas.microsoft.com/office/drawing/2010/main" xmlns:ma14="http://schemas.microsoft.com/office/mac/drawingml/2011/main" val="1"/>
+              <ma14:wrappingTextBoxFlag xmlns:ma14="http://schemas.microsoft.com/office/mac/drawingml/2011/main" xmlns:a14="http://schemas.microsoft.com/office/drawing/2010/main" xmlns:m="http://schemas.openxmlformats.org/officeDocument/2006/math" xmlns="" val="1"/>
             </a:ext>
           </a:extLst>
         </p:spPr>
@@ -9248,7 +9248,7 @@
           <a:effectLst/>
           <a:extLst>
             <a:ext uri="{C572A759-6A51-4108-AA02-DFA0A04FC94B}">
-              <ma14:wrappingTextBoxFlag xmlns="" xmlns:m="http://schemas.openxmlformats.org/officeDocument/2006/math" xmlns:a14="http://schemas.microsoft.com/office/drawing/2010/main" xmlns:ma14="http://schemas.microsoft.com/office/mac/drawingml/2011/main" val="1"/>
+              <ma14:wrappingTextBoxFlag xmlns:ma14="http://schemas.microsoft.com/office/mac/drawingml/2011/main" xmlns:a14="http://schemas.microsoft.com/office/drawing/2010/main" xmlns:m="http://schemas.openxmlformats.org/officeDocument/2006/math" xmlns="" val="1"/>
             </a:ext>
           </a:extLst>
         </p:spPr>
@@ -9579,7 +9579,7 @@
           <a:effectLst/>
           <a:extLst>
             <a:ext uri="{C572A759-6A51-4108-AA02-DFA0A04FC94B}">
-              <ma14:wrappingTextBoxFlag xmlns="" xmlns:m="http://schemas.openxmlformats.org/officeDocument/2006/math" xmlns:a14="http://schemas.microsoft.com/office/drawing/2010/main" xmlns:ma14="http://schemas.microsoft.com/office/mac/drawingml/2011/main" val="1"/>
+              <ma14:wrappingTextBoxFlag xmlns:ma14="http://schemas.microsoft.com/office/mac/drawingml/2011/main" xmlns:a14="http://schemas.microsoft.com/office/drawing/2010/main" xmlns:m="http://schemas.openxmlformats.org/officeDocument/2006/math" xmlns="" val="1"/>
             </a:ext>
           </a:extLst>
         </p:spPr>
@@ -10046,7 +10046,7 @@
           </a:ln>
           <a:extLst>
             <a:ext uri="{C572A759-6A51-4108-AA02-DFA0A04FC94B}">
-              <ma14:wrappingTextBoxFlag xmlns="" xmlns:m="http://schemas.openxmlformats.org/officeDocument/2006/math" xmlns:a14="http://schemas.microsoft.com/office/drawing/2010/main" xmlns:ma14="http://schemas.microsoft.com/office/mac/drawingml/2011/main" val="1"/>
+              <ma14:wrappingTextBoxFlag xmlns:ma14="http://schemas.microsoft.com/office/mac/drawingml/2011/main" xmlns:a14="http://schemas.microsoft.com/office/drawing/2010/main" xmlns:m="http://schemas.openxmlformats.org/officeDocument/2006/math" xmlns="" val="1"/>
             </a:ext>
           </a:extLst>
         </p:spPr>
@@ -10110,7 +10110,7 @@
           </a:ln>
           <a:extLst>
             <a:ext uri="{C572A759-6A51-4108-AA02-DFA0A04FC94B}">
-              <ma14:wrappingTextBoxFlag xmlns="" xmlns:m="http://schemas.openxmlformats.org/officeDocument/2006/math" xmlns:a14="http://schemas.microsoft.com/office/drawing/2010/main" xmlns:ma14="http://schemas.microsoft.com/office/mac/drawingml/2011/main" val="1"/>
+              <ma14:wrappingTextBoxFlag xmlns:ma14="http://schemas.microsoft.com/office/mac/drawingml/2011/main" xmlns:a14="http://schemas.microsoft.com/office/drawing/2010/main" xmlns:m="http://schemas.openxmlformats.org/officeDocument/2006/math" xmlns="" val="1"/>
             </a:ext>
           </a:extLst>
         </p:spPr>
@@ -10534,7 +10534,7 @@
           </a:ln>
           <a:extLst>
             <a:ext uri="{C572A759-6A51-4108-AA02-DFA0A04FC94B}">
-              <ma14:wrappingTextBoxFlag xmlns="" xmlns:m="http://schemas.openxmlformats.org/officeDocument/2006/math" xmlns:a14="http://schemas.microsoft.com/office/drawing/2010/main" xmlns:ma14="http://schemas.microsoft.com/office/mac/drawingml/2011/main" val="1"/>
+              <ma14:wrappingTextBoxFlag xmlns:ma14="http://schemas.microsoft.com/office/mac/drawingml/2011/main" xmlns:a14="http://schemas.microsoft.com/office/drawing/2010/main" xmlns:m="http://schemas.openxmlformats.org/officeDocument/2006/math" xmlns="" val="1"/>
             </a:ext>
           </a:extLst>
         </p:spPr>
@@ -10598,7 +10598,7 @@
           </a:ln>
           <a:extLst>
             <a:ext uri="{C572A759-6A51-4108-AA02-DFA0A04FC94B}">
-              <ma14:wrappingTextBoxFlag xmlns="" xmlns:m="http://schemas.openxmlformats.org/officeDocument/2006/math" xmlns:a14="http://schemas.microsoft.com/office/drawing/2010/main" xmlns:ma14="http://schemas.microsoft.com/office/mac/drawingml/2011/main" val="1"/>
+              <ma14:wrappingTextBoxFlag xmlns:ma14="http://schemas.microsoft.com/office/mac/drawingml/2011/main" xmlns:a14="http://schemas.microsoft.com/office/drawing/2010/main" xmlns:m="http://schemas.openxmlformats.org/officeDocument/2006/math" xmlns="" val="1"/>
             </a:ext>
           </a:extLst>
         </p:spPr>

</xml_diff>

<commit_message>
Built site for jfa: 0.6.0@adeaaae
</commit_message>
<xml_diff>
--- a/reference/figures/cheatsheet/cheatsheet.pptx
+++ b/reference/figures/cheatsheet/cheatsheet.pptx
@@ -321,20 +321,44 @@
 <file path=ppt/changesInfos/changesInfo1.xml><?xml version="1.0" encoding="utf-8"?>
 <pc:chgInfo xmlns:a="http://schemas.openxmlformats.org/drawingml/2006/main" xmlns:r="http://schemas.openxmlformats.org/officeDocument/2006/relationships" xmlns:ac="http://schemas.microsoft.com/office/drawing/2013/main/command" xmlns:pc="http://schemas.microsoft.com/office/powerpoint/2013/main/command">
   <pc:docChgLst>
-    <pc:chgData name="Derks, Koen" userId="42903d96-be75-4cec-9136-f3710e86cd30" providerId="ADAL" clId="{98190025-2A7C-4D67-890F-BF5F2D889559}"/>
+    <pc:chgData name="Derks, Koen" userId="42903d96-be75-4cec-9136-f3710e86cd30" providerId="ADAL" clId="{47C729CF-B9DC-4253-89B2-BDEEBCDC567C}"/>
     <pc:docChg chg="modSld">
-      <pc:chgData name="Derks, Koen" userId="42903d96-be75-4cec-9136-f3710e86cd30" providerId="ADAL" clId="{98190025-2A7C-4D67-890F-BF5F2D889559}" dt="2021-08-07T09:00:01.276" v="3" actId="20577"/>
+      <pc:chgData name="Derks, Koen" userId="42903d96-be75-4cec-9136-f3710e86cd30" providerId="ADAL" clId="{47C729CF-B9DC-4253-89B2-BDEEBCDC567C}" dt="2021-05-13T13:34:37.534" v="50" actId="20577"/>
       <pc:docMkLst>
         <pc:docMk/>
       </pc:docMkLst>
       <pc:sldChg chg="modSp mod">
-        <pc:chgData name="Derks, Koen" userId="42903d96-be75-4cec-9136-f3710e86cd30" providerId="ADAL" clId="{98190025-2A7C-4D67-890F-BF5F2D889559}" dt="2021-08-07T09:00:01.276" v="3" actId="20577"/>
+        <pc:chgData name="Derks, Koen" userId="42903d96-be75-4cec-9136-f3710e86cd30" providerId="ADAL" clId="{47C729CF-B9DC-4253-89B2-BDEEBCDC567C}" dt="2021-05-13T13:34:37.534" v="50" actId="20577"/>
         <pc:sldMkLst>
           <pc:docMk/>
           <pc:sldMk cId="0" sldId="257"/>
         </pc:sldMkLst>
         <pc:spChg chg="mod">
-          <ac:chgData name="Derks, Koen" userId="42903d96-be75-4cec-9136-f3710e86cd30" providerId="ADAL" clId="{98190025-2A7C-4D67-890F-BF5F2D889559}" dt="2021-08-07T09:00:01.276" v="3" actId="20577"/>
+          <ac:chgData name="Derks, Koen" userId="42903d96-be75-4cec-9136-f3710e86cd30" providerId="ADAL" clId="{47C729CF-B9DC-4253-89B2-BDEEBCDC567C}" dt="2021-05-13T13:26:15.533" v="46" actId="6549"/>
+          <ac:spMkLst>
+            <pc:docMk/>
+            <pc:sldMk cId="0" sldId="257"/>
+            <ac:spMk id="124" creationId="{840686DE-7A82-47C4-A954-0B456668CB4F}"/>
+          </ac:spMkLst>
+        </pc:spChg>
+        <pc:spChg chg="mod">
+          <ac:chgData name="Derks, Koen" userId="42903d96-be75-4cec-9136-f3710e86cd30" providerId="ADAL" clId="{47C729CF-B9DC-4253-89B2-BDEEBCDC567C}" dt="2021-05-13T13:25:58.682" v="21" actId="20577"/>
+          <ac:spMkLst>
+            <pc:docMk/>
+            <pc:sldMk cId="0" sldId="257"/>
+            <ac:spMk id="129" creationId="{217411A5-52C0-45D9-A546-49235C28A6D7}"/>
+          </ac:spMkLst>
+        </pc:spChg>
+        <pc:spChg chg="mod">
+          <ac:chgData name="Derks, Koen" userId="42903d96-be75-4cec-9136-f3710e86cd30" providerId="ADAL" clId="{47C729CF-B9DC-4253-89B2-BDEEBCDC567C}" dt="2021-05-13T13:25:21.172" v="3" actId="20577"/>
+          <ac:spMkLst>
+            <pc:docMk/>
+            <pc:sldMk cId="0" sldId="257"/>
+            <ac:spMk id="139" creationId="{F2B32D8F-8679-461C-AB88-ED31B7806035}"/>
+          </ac:spMkLst>
+        </pc:spChg>
+        <pc:spChg chg="mod">
+          <ac:chgData name="Derks, Koen" userId="42903d96-be75-4cec-9136-f3710e86cd30" providerId="ADAL" clId="{47C729CF-B9DC-4253-89B2-BDEEBCDC567C}" dt="2021-05-13T13:34:37.534" v="50" actId="20577"/>
           <ac:spMkLst>
             <pc:docMk/>
             <pc:sldMk cId="0" sldId="257"/>
@@ -487,6 +511,70 @@
     </pc:docChg>
   </pc:docChgLst>
   <pc:docChgLst>
+    <pc:chgData name="Derks, Koen" userId="42903d96-be75-4cec-9136-f3710e86cd30" providerId="ADAL" clId="{CB4365A0-A1FB-4DEB-ADEA-703F473C097B}"/>
+    <pc:docChg chg="undo custSel modSld">
+      <pc:chgData name="Derks, Koen" userId="42903d96-be75-4cec-9136-f3710e86cd30" providerId="ADAL" clId="{CB4365A0-A1FB-4DEB-ADEA-703F473C097B}" dt="2021-06-02T16:31:03.713" v="294" actId="20577"/>
+      <pc:docMkLst>
+        <pc:docMk/>
+      </pc:docMkLst>
+      <pc:sldChg chg="modSp mod">
+        <pc:chgData name="Derks, Koen" userId="42903d96-be75-4cec-9136-f3710e86cd30" providerId="ADAL" clId="{CB4365A0-A1FB-4DEB-ADEA-703F473C097B}" dt="2021-06-02T16:31:03.713" v="294" actId="20577"/>
+        <pc:sldMkLst>
+          <pc:docMk/>
+          <pc:sldMk cId="0" sldId="257"/>
+        </pc:sldMkLst>
+        <pc:spChg chg="mod">
+          <ac:chgData name="Derks, Koen" userId="42903d96-be75-4cec-9136-f3710e86cd30" providerId="ADAL" clId="{CB4365A0-A1FB-4DEB-ADEA-703F473C097B}" dt="2021-06-02T16:29:22.224" v="227" actId="6549"/>
+          <ac:spMkLst>
+            <pc:docMk/>
+            <pc:sldMk cId="0" sldId="257"/>
+            <ac:spMk id="135" creationId="{9D0348CA-97F1-4EDC-8F7E-BBB556E48519}"/>
+          </ac:spMkLst>
+        </pc:spChg>
+        <pc:spChg chg="mod">
+          <ac:chgData name="Derks, Koen" userId="42903d96-be75-4cec-9136-f3710e86cd30" providerId="ADAL" clId="{CB4365A0-A1FB-4DEB-ADEA-703F473C097B}" dt="2021-06-02T16:31:03.713" v="294" actId="20577"/>
+          <ac:spMkLst>
+            <pc:docMk/>
+            <pc:sldMk cId="0" sldId="257"/>
+            <ac:spMk id="139" creationId="{F2B32D8F-8679-461C-AB88-ED31B7806035}"/>
+          </ac:spMkLst>
+        </pc:spChg>
+        <pc:spChg chg="mod">
+          <ac:chgData name="Derks, Koen" userId="42903d96-be75-4cec-9136-f3710e86cd30" providerId="ADAL" clId="{CB4365A0-A1FB-4DEB-ADEA-703F473C097B}" dt="2021-06-02T16:28:05.339" v="184" actId="20577"/>
+          <ac:spMkLst>
+            <pc:docMk/>
+            <pc:sldMk cId="0" sldId="257"/>
+            <ac:spMk id="140" creationId="{6BAF5637-414B-416F-8562-F22A27CA0897}"/>
+          </ac:spMkLst>
+        </pc:spChg>
+        <pc:spChg chg="mod">
+          <ac:chgData name="Derks, Koen" userId="42903d96-be75-4cec-9136-f3710e86cd30" providerId="ADAL" clId="{CB4365A0-A1FB-4DEB-ADEA-703F473C097B}" dt="2021-06-02T16:26:08.295" v="163"/>
+          <ac:spMkLst>
+            <pc:docMk/>
+            <pc:sldMk cId="0" sldId="257"/>
+            <ac:spMk id="341" creationId="{00000000-0000-0000-0000-000000000000}"/>
+          </ac:spMkLst>
+        </pc:spChg>
+        <pc:spChg chg="mod">
+          <ac:chgData name="Derks, Koen" userId="42903d96-be75-4cec-9136-f3710e86cd30" providerId="ADAL" clId="{CB4365A0-A1FB-4DEB-ADEA-703F473C097B}" dt="2021-06-02T16:25:49.328" v="162" actId="1036"/>
+          <ac:spMkLst>
+            <pc:docMk/>
+            <pc:sldMk cId="0" sldId="257"/>
+            <ac:spMk id="380" creationId="{00000000-0000-0000-0000-000000000000}"/>
+          </ac:spMkLst>
+        </pc:spChg>
+        <pc:spChg chg="mod">
+          <ac:chgData name="Derks, Koen" userId="42903d96-be75-4cec-9136-f3710e86cd30" providerId="ADAL" clId="{CB4365A0-A1FB-4DEB-ADEA-703F473C097B}" dt="2021-06-02T16:27:41.880" v="172" actId="20577"/>
+          <ac:spMkLst>
+            <pc:docMk/>
+            <pc:sldMk cId="0" sldId="257"/>
+            <ac:spMk id="384" creationId="{00000000-0000-0000-0000-000000000000}"/>
+          </ac:spMkLst>
+        </pc:spChg>
+      </pc:sldChg>
+    </pc:docChg>
+  </pc:docChgLst>
+  <pc:docChgLst>
     <pc:chgData name="Derks, Koen" userId="42903d96-be75-4cec-9136-f3710e86cd30" providerId="ADAL" clId="{E813656B-DA65-4A86-81EE-25B476EAF3E8}"/>
     <pc:docChg chg="undo custSel modSld">
       <pc:chgData name="Derks, Koen" userId="42903d96-be75-4cec-9136-f3710e86cd30" providerId="ADAL" clId="{E813656B-DA65-4A86-81EE-25B476EAF3E8}" dt="2021-06-29T10:50:04.321" v="144" actId="20577"/>
@@ -533,6 +621,38 @@
         </pc:spChg>
         <pc:spChg chg="mod">
           <ac:chgData name="Derks, Koen" userId="42903d96-be75-4cec-9136-f3710e86cd30" providerId="ADAL" clId="{E813656B-DA65-4A86-81EE-25B476EAF3E8}" dt="2021-06-29T10:47:50.850" v="141" actId="1035"/>
+          <ac:spMkLst>
+            <pc:docMk/>
+            <pc:sldMk cId="0" sldId="257"/>
+            <ac:spMk id="380" creationId="{00000000-0000-0000-0000-000000000000}"/>
+          </ac:spMkLst>
+        </pc:spChg>
+      </pc:sldChg>
+    </pc:docChg>
+  </pc:docChgLst>
+  <pc:docChgLst>
+    <pc:chgData name="Derks, Koen" userId="42903d96-be75-4cec-9136-f3710e86cd30" providerId="ADAL" clId="{B2C99C48-803B-45C3-BEC8-064BF2898A74}"/>
+    <pc:docChg chg="custSel modSld">
+      <pc:chgData name="Derks, Koen" userId="42903d96-be75-4cec-9136-f3710e86cd30" providerId="ADAL" clId="{B2C99C48-803B-45C3-BEC8-064BF2898A74}" dt="2021-09-16T13:56:06.276" v="28"/>
+      <pc:docMkLst>
+        <pc:docMk/>
+      </pc:docMkLst>
+      <pc:sldChg chg="modSp mod">
+        <pc:chgData name="Derks, Koen" userId="42903d96-be75-4cec-9136-f3710e86cd30" providerId="ADAL" clId="{B2C99C48-803B-45C3-BEC8-064BF2898A74}" dt="2021-09-16T13:56:06.276" v="28"/>
+        <pc:sldMkLst>
+          <pc:docMk/>
+          <pc:sldMk cId="0" sldId="257"/>
+        </pc:sldMkLst>
+        <pc:spChg chg="mod">
+          <ac:chgData name="Derks, Koen" userId="42903d96-be75-4cec-9136-f3710e86cd30" providerId="ADAL" clId="{B2C99C48-803B-45C3-BEC8-064BF2898A74}" dt="2021-09-16T13:56:06.276" v="28"/>
+          <ac:spMkLst>
+            <pc:docMk/>
+            <pc:sldMk cId="0" sldId="257"/>
+            <ac:spMk id="144" creationId="{9AF2C0F0-B69F-45A7-9DB4-1D7962C71414}"/>
+          </ac:spMkLst>
+        </pc:spChg>
+        <pc:spChg chg="mod">
+          <ac:chgData name="Derks, Koen" userId="42903d96-be75-4cec-9136-f3710e86cd30" providerId="ADAL" clId="{B2C99C48-803B-45C3-BEC8-064BF2898A74}" dt="2021-09-16T13:54:35.181" v="16" actId="1036"/>
           <ac:spMkLst>
             <pc:docMk/>
             <pc:sldMk cId="0" sldId="257"/>
@@ -601,70 +721,6 @@
             <pc:docMk/>
             <pc:sldMk cId="0" sldId="257"/>
             <ac:spMk id="380" creationId="{00000000-0000-0000-0000-000000000000}"/>
-          </ac:spMkLst>
-        </pc:spChg>
-      </pc:sldChg>
-    </pc:docChg>
-  </pc:docChgLst>
-  <pc:docChgLst>
-    <pc:chgData name="Derks, Koen" userId="42903d96-be75-4cec-9136-f3710e86cd30" providerId="ADAL" clId="{CB4365A0-A1FB-4DEB-ADEA-703F473C097B}"/>
-    <pc:docChg chg="undo custSel modSld">
-      <pc:chgData name="Derks, Koen" userId="42903d96-be75-4cec-9136-f3710e86cd30" providerId="ADAL" clId="{CB4365A0-A1FB-4DEB-ADEA-703F473C097B}" dt="2021-06-02T16:31:03.713" v="294" actId="20577"/>
-      <pc:docMkLst>
-        <pc:docMk/>
-      </pc:docMkLst>
-      <pc:sldChg chg="modSp mod">
-        <pc:chgData name="Derks, Koen" userId="42903d96-be75-4cec-9136-f3710e86cd30" providerId="ADAL" clId="{CB4365A0-A1FB-4DEB-ADEA-703F473C097B}" dt="2021-06-02T16:31:03.713" v="294" actId="20577"/>
-        <pc:sldMkLst>
-          <pc:docMk/>
-          <pc:sldMk cId="0" sldId="257"/>
-        </pc:sldMkLst>
-        <pc:spChg chg="mod">
-          <ac:chgData name="Derks, Koen" userId="42903d96-be75-4cec-9136-f3710e86cd30" providerId="ADAL" clId="{CB4365A0-A1FB-4DEB-ADEA-703F473C097B}" dt="2021-06-02T16:29:22.224" v="227" actId="6549"/>
-          <ac:spMkLst>
-            <pc:docMk/>
-            <pc:sldMk cId="0" sldId="257"/>
-            <ac:spMk id="135" creationId="{9D0348CA-97F1-4EDC-8F7E-BBB556E48519}"/>
-          </ac:spMkLst>
-        </pc:spChg>
-        <pc:spChg chg="mod">
-          <ac:chgData name="Derks, Koen" userId="42903d96-be75-4cec-9136-f3710e86cd30" providerId="ADAL" clId="{CB4365A0-A1FB-4DEB-ADEA-703F473C097B}" dt="2021-06-02T16:31:03.713" v="294" actId="20577"/>
-          <ac:spMkLst>
-            <pc:docMk/>
-            <pc:sldMk cId="0" sldId="257"/>
-            <ac:spMk id="139" creationId="{F2B32D8F-8679-461C-AB88-ED31B7806035}"/>
-          </ac:spMkLst>
-        </pc:spChg>
-        <pc:spChg chg="mod">
-          <ac:chgData name="Derks, Koen" userId="42903d96-be75-4cec-9136-f3710e86cd30" providerId="ADAL" clId="{CB4365A0-A1FB-4DEB-ADEA-703F473C097B}" dt="2021-06-02T16:28:05.339" v="184" actId="20577"/>
-          <ac:spMkLst>
-            <pc:docMk/>
-            <pc:sldMk cId="0" sldId="257"/>
-            <ac:spMk id="140" creationId="{6BAF5637-414B-416F-8562-F22A27CA0897}"/>
-          </ac:spMkLst>
-        </pc:spChg>
-        <pc:spChg chg="mod">
-          <ac:chgData name="Derks, Koen" userId="42903d96-be75-4cec-9136-f3710e86cd30" providerId="ADAL" clId="{CB4365A0-A1FB-4DEB-ADEA-703F473C097B}" dt="2021-06-02T16:26:08.295" v="163"/>
-          <ac:spMkLst>
-            <pc:docMk/>
-            <pc:sldMk cId="0" sldId="257"/>
-            <ac:spMk id="341" creationId="{00000000-0000-0000-0000-000000000000}"/>
-          </ac:spMkLst>
-        </pc:spChg>
-        <pc:spChg chg="mod">
-          <ac:chgData name="Derks, Koen" userId="42903d96-be75-4cec-9136-f3710e86cd30" providerId="ADAL" clId="{CB4365A0-A1FB-4DEB-ADEA-703F473C097B}" dt="2021-06-02T16:25:49.328" v="162" actId="1036"/>
-          <ac:spMkLst>
-            <pc:docMk/>
-            <pc:sldMk cId="0" sldId="257"/>
-            <ac:spMk id="380" creationId="{00000000-0000-0000-0000-000000000000}"/>
-          </ac:spMkLst>
-        </pc:spChg>
-        <pc:spChg chg="mod">
-          <ac:chgData name="Derks, Koen" userId="42903d96-be75-4cec-9136-f3710e86cd30" providerId="ADAL" clId="{CB4365A0-A1FB-4DEB-ADEA-703F473C097B}" dt="2021-06-02T16:27:41.880" v="172" actId="20577"/>
-          <ac:spMkLst>
-            <pc:docMk/>
-            <pc:sldMk cId="0" sldId="257"/>
-            <ac:spMk id="384" creationId="{00000000-0000-0000-0000-000000000000}"/>
           </ac:spMkLst>
         </pc:spChg>
       </pc:sldChg>
@@ -807,44 +863,20 @@
     </pc:docChg>
   </pc:docChgLst>
   <pc:docChgLst>
-    <pc:chgData name="Derks, Koen" userId="42903d96-be75-4cec-9136-f3710e86cd30" providerId="ADAL" clId="{47C729CF-B9DC-4253-89B2-BDEEBCDC567C}"/>
+    <pc:chgData name="Derks, Koen" userId="42903d96-be75-4cec-9136-f3710e86cd30" providerId="ADAL" clId="{98190025-2A7C-4D67-890F-BF5F2D889559}"/>
     <pc:docChg chg="modSld">
-      <pc:chgData name="Derks, Koen" userId="42903d96-be75-4cec-9136-f3710e86cd30" providerId="ADAL" clId="{47C729CF-B9DC-4253-89B2-BDEEBCDC567C}" dt="2021-05-13T13:34:37.534" v="50" actId="20577"/>
+      <pc:chgData name="Derks, Koen" userId="42903d96-be75-4cec-9136-f3710e86cd30" providerId="ADAL" clId="{98190025-2A7C-4D67-890F-BF5F2D889559}" dt="2021-08-07T09:00:01.276" v="3" actId="20577"/>
       <pc:docMkLst>
         <pc:docMk/>
       </pc:docMkLst>
       <pc:sldChg chg="modSp mod">
-        <pc:chgData name="Derks, Koen" userId="42903d96-be75-4cec-9136-f3710e86cd30" providerId="ADAL" clId="{47C729CF-B9DC-4253-89B2-BDEEBCDC567C}" dt="2021-05-13T13:34:37.534" v="50" actId="20577"/>
+        <pc:chgData name="Derks, Koen" userId="42903d96-be75-4cec-9136-f3710e86cd30" providerId="ADAL" clId="{98190025-2A7C-4D67-890F-BF5F2D889559}" dt="2021-08-07T09:00:01.276" v="3" actId="20577"/>
         <pc:sldMkLst>
           <pc:docMk/>
           <pc:sldMk cId="0" sldId="257"/>
         </pc:sldMkLst>
         <pc:spChg chg="mod">
-          <ac:chgData name="Derks, Koen" userId="42903d96-be75-4cec-9136-f3710e86cd30" providerId="ADAL" clId="{47C729CF-B9DC-4253-89B2-BDEEBCDC567C}" dt="2021-05-13T13:26:15.533" v="46" actId="6549"/>
-          <ac:spMkLst>
-            <pc:docMk/>
-            <pc:sldMk cId="0" sldId="257"/>
-            <ac:spMk id="124" creationId="{840686DE-7A82-47C4-A954-0B456668CB4F}"/>
-          </ac:spMkLst>
-        </pc:spChg>
-        <pc:spChg chg="mod">
-          <ac:chgData name="Derks, Koen" userId="42903d96-be75-4cec-9136-f3710e86cd30" providerId="ADAL" clId="{47C729CF-B9DC-4253-89B2-BDEEBCDC567C}" dt="2021-05-13T13:25:58.682" v="21" actId="20577"/>
-          <ac:spMkLst>
-            <pc:docMk/>
-            <pc:sldMk cId="0" sldId="257"/>
-            <ac:spMk id="129" creationId="{217411A5-52C0-45D9-A546-49235C28A6D7}"/>
-          </ac:spMkLst>
-        </pc:spChg>
-        <pc:spChg chg="mod">
-          <ac:chgData name="Derks, Koen" userId="42903d96-be75-4cec-9136-f3710e86cd30" providerId="ADAL" clId="{47C729CF-B9DC-4253-89B2-BDEEBCDC567C}" dt="2021-05-13T13:25:21.172" v="3" actId="20577"/>
-          <ac:spMkLst>
-            <pc:docMk/>
-            <pc:sldMk cId="0" sldId="257"/>
-            <ac:spMk id="139" creationId="{F2B32D8F-8679-461C-AB88-ED31B7806035}"/>
-          </ac:spMkLst>
-        </pc:spChg>
-        <pc:spChg chg="mod">
-          <ac:chgData name="Derks, Koen" userId="42903d96-be75-4cec-9136-f3710e86cd30" providerId="ADAL" clId="{47C729CF-B9DC-4253-89B2-BDEEBCDC567C}" dt="2021-05-13T13:34:37.534" v="50" actId="20577"/>
+          <ac:chgData name="Derks, Koen" userId="42903d96-be75-4cec-9136-f3710e86cd30" providerId="ADAL" clId="{98190025-2A7C-4D67-890F-BF5F2D889559}" dt="2021-08-07T09:00:01.276" v="3" actId="20577"/>
           <ac:spMkLst>
             <pc:docMk/>
             <pc:sldMk cId="0" sldId="257"/>
@@ -4690,7 +4722,7 @@
         </p:nvSpPr>
         <p:spPr>
           <a:xfrm>
-            <a:off x="10503567" y="2273148"/>
+            <a:off x="10503567" y="2262262"/>
             <a:ext cx="3143104" cy="417982"/>
           </a:xfrm>
           <a:prstGeom prst="rect">
@@ -4781,7 +4813,7 @@
                 <a:latin typeface="Courier New" panose="02070309020205020404" pitchFamily="49" charset="0"/>
                 <a:cs typeface="Courier New" panose="02070309020205020404" pitchFamily="49" charset="0"/>
               </a:rPr>
-              <a:t> = 'none',</a:t>
+              <a:t> = 'default',</a:t>
             </a:r>
           </a:p>
           <a:p>
@@ -9156,7 +9188,31 @@
                 <a:latin typeface="Courier New" panose="02070309020205020404" pitchFamily="49" charset="0"/>
                 <a:cs typeface="Courier New" panose="02070309020205020404" pitchFamily="49" charset="0"/>
               </a:rPr>
-              <a:t>          units = 'items',</a:t>
+              <a:t>          units = '</a:t>
+            </a:r>
+            <a:r>
+              <a:rPr lang="nl-NL" sz="1000" dirty="0" err="1">
+                <a:solidFill>
+                  <a:schemeClr val="tx1">
+                    <a:lumMod val="50000"/>
+                  </a:schemeClr>
+                </a:solidFill>
+                <a:latin typeface="Courier New" panose="02070309020205020404" pitchFamily="49" charset="0"/>
+                <a:cs typeface="Courier New" panose="02070309020205020404" pitchFamily="49" charset="0"/>
+              </a:rPr>
+              <a:t>rows</a:t>
+            </a:r>
+            <a:r>
+              <a:rPr lang="nl-NL" sz="1000" dirty="0">
+                <a:solidFill>
+                  <a:schemeClr val="tx1">
+                    <a:lumMod val="50000"/>
+                  </a:schemeClr>
+                </a:solidFill>
+                <a:latin typeface="Courier New" panose="02070309020205020404" pitchFamily="49" charset="0"/>
+                <a:cs typeface="Courier New" panose="02070309020205020404" pitchFamily="49" charset="0"/>
+              </a:rPr>
+              <a:t>',</a:t>
             </a:r>
           </a:p>
           <a:p>

</xml_diff>

<commit_message>
Built site for jfa: 0.6.0@410ef83
</commit_message>
<xml_diff>
--- a/reference/figures/cheatsheet/cheatsheet.pptx
+++ b/reference/figures/cheatsheet/cheatsheet.pptx
@@ -633,16 +633,24 @@
   <pc:docChgLst>
     <pc:chgData name="Derks, Koen" userId="42903d96-be75-4cec-9136-f3710e86cd30" providerId="ADAL" clId="{B2C99C48-803B-45C3-BEC8-064BF2898A74}"/>
     <pc:docChg chg="custSel modSld">
-      <pc:chgData name="Derks, Koen" userId="42903d96-be75-4cec-9136-f3710e86cd30" providerId="ADAL" clId="{B2C99C48-803B-45C3-BEC8-064BF2898A74}" dt="2021-09-16T13:56:06.276" v="28"/>
+      <pc:chgData name="Derks, Koen" userId="42903d96-be75-4cec-9136-f3710e86cd30" providerId="ADAL" clId="{B2C99C48-803B-45C3-BEC8-064BF2898A74}" dt="2021-09-16T14:23:53.513" v="35" actId="20577"/>
       <pc:docMkLst>
         <pc:docMk/>
       </pc:docMkLst>
       <pc:sldChg chg="modSp mod">
-        <pc:chgData name="Derks, Koen" userId="42903d96-be75-4cec-9136-f3710e86cd30" providerId="ADAL" clId="{B2C99C48-803B-45C3-BEC8-064BF2898A74}" dt="2021-09-16T13:56:06.276" v="28"/>
+        <pc:chgData name="Derks, Koen" userId="42903d96-be75-4cec-9136-f3710e86cd30" providerId="ADAL" clId="{B2C99C48-803B-45C3-BEC8-064BF2898A74}" dt="2021-09-16T14:23:53.513" v="35" actId="20577"/>
         <pc:sldMkLst>
           <pc:docMk/>
           <pc:sldMk cId="0" sldId="257"/>
         </pc:sldMkLst>
+        <pc:spChg chg="mod">
+          <ac:chgData name="Derks, Koen" userId="42903d96-be75-4cec-9136-f3710e86cd30" providerId="ADAL" clId="{B2C99C48-803B-45C3-BEC8-064BF2898A74}" dt="2021-09-16T14:23:53.513" v="35" actId="20577"/>
+          <ac:spMkLst>
+            <pc:docMk/>
+            <pc:sldMk cId="0" sldId="257"/>
+            <ac:spMk id="129" creationId="{217411A5-52C0-45D9-A546-49235C28A6D7}"/>
+          </ac:spMkLst>
+        </pc:spChg>
         <pc:spChg chg="mod">
           <ac:chgData name="Derks, Koen" userId="42903d96-be75-4cec-9136-f3710e86cd30" providerId="ADAL" clId="{B2C99C48-803B-45C3-BEC8-064BF2898A74}" dt="2021-09-16T13:56:06.276" v="28"/>
           <ac:spMkLst>
@@ -2695,7 +2703,7 @@
           </a:ln>
           <a:extLst>
             <a:ext uri="{C572A759-6A51-4108-AA02-DFA0A04FC94B}">
-              <ma14:wrappingTextBoxFlag xmlns:ma14="http://schemas.microsoft.com/office/mac/drawingml/2011/main" xmlns:a14="http://schemas.microsoft.com/office/drawing/2010/main" xmlns:m="http://schemas.openxmlformats.org/officeDocument/2006/math" xmlns="" val="1"/>
+              <ma14:wrappingTextBoxFlag xmlns="" xmlns:m="http://schemas.openxmlformats.org/officeDocument/2006/math" xmlns:a14="http://schemas.microsoft.com/office/drawing/2010/main" xmlns:ma14="http://schemas.microsoft.com/office/mac/drawingml/2011/main" val="1"/>
             </a:ext>
           </a:extLst>
         </p:spPr>
@@ -2734,7 +2742,7 @@
           </a:ln>
           <a:extLst>
             <a:ext uri="{C572A759-6A51-4108-AA02-DFA0A04FC94B}">
-              <ma14:wrappingTextBoxFlag xmlns:ma14="http://schemas.microsoft.com/office/mac/drawingml/2011/main" xmlns:a14="http://schemas.microsoft.com/office/drawing/2010/main" xmlns:m="http://schemas.openxmlformats.org/officeDocument/2006/math" xmlns="" val="1"/>
+              <ma14:wrappingTextBoxFlag xmlns="" xmlns:m="http://schemas.openxmlformats.org/officeDocument/2006/math" xmlns:a14="http://schemas.microsoft.com/office/drawing/2010/main" xmlns:ma14="http://schemas.microsoft.com/office/mac/drawingml/2011/main" val="1"/>
             </a:ext>
           </a:extLst>
         </p:spPr>
@@ -3827,7 +3835,7 @@
           </a:ln>
           <a:extLst>
             <a:ext uri="{C572A759-6A51-4108-AA02-DFA0A04FC94B}">
-              <ma14:wrappingTextBoxFlag xmlns:ma14="http://schemas.microsoft.com/office/mac/drawingml/2011/main" xmlns:a14="http://schemas.microsoft.com/office/drawing/2010/main" xmlns:m="http://schemas.openxmlformats.org/officeDocument/2006/math" xmlns="" val="1"/>
+              <ma14:wrappingTextBoxFlag xmlns="" xmlns:m="http://schemas.openxmlformats.org/officeDocument/2006/math" xmlns:a14="http://schemas.microsoft.com/office/drawing/2010/main" xmlns:ma14="http://schemas.microsoft.com/office/mac/drawingml/2011/main" val="1"/>
             </a:ext>
           </a:extLst>
         </p:spPr>
@@ -3880,7 +3888,7 @@
           </a:ln>
           <a:extLst>
             <a:ext uri="{C572A759-6A51-4108-AA02-DFA0A04FC94B}">
-              <ma14:wrappingTextBoxFlag xmlns:ma14="http://schemas.microsoft.com/office/mac/drawingml/2011/main" xmlns:a14="http://schemas.microsoft.com/office/drawing/2010/main" xmlns:m="http://schemas.openxmlformats.org/officeDocument/2006/math" xmlns="" val="1"/>
+              <ma14:wrappingTextBoxFlag xmlns="" xmlns:m="http://schemas.openxmlformats.org/officeDocument/2006/math" xmlns:a14="http://schemas.microsoft.com/office/drawing/2010/main" xmlns:ma14="http://schemas.microsoft.com/office/mac/drawingml/2011/main" val="1"/>
             </a:ext>
           </a:extLst>
         </p:spPr>
@@ -4046,7 +4054,7 @@
           </a:ln>
           <a:extLst>
             <a:ext uri="{C572A759-6A51-4108-AA02-DFA0A04FC94B}">
-              <ma14:wrappingTextBoxFlag xmlns:ma14="http://schemas.microsoft.com/office/mac/drawingml/2011/main" xmlns:a14="http://schemas.microsoft.com/office/drawing/2010/main" xmlns:m="http://schemas.openxmlformats.org/officeDocument/2006/math" xmlns="" val="1"/>
+              <ma14:wrappingTextBoxFlag xmlns="" xmlns:m="http://schemas.openxmlformats.org/officeDocument/2006/math" xmlns:a14="http://schemas.microsoft.com/office/drawing/2010/main" xmlns:ma14="http://schemas.microsoft.com/office/mac/drawingml/2011/main" val="1"/>
             </a:ext>
           </a:extLst>
         </p:spPr>
@@ -4533,7 +4541,7 @@
           </a:ln>
           <a:extLst>
             <a:ext uri="{C572A759-6A51-4108-AA02-DFA0A04FC94B}">
-              <ma14:wrappingTextBoxFlag xmlns:ma14="http://schemas.microsoft.com/office/mac/drawingml/2011/main" xmlns:a14="http://schemas.microsoft.com/office/drawing/2010/main" xmlns:m="http://schemas.openxmlformats.org/officeDocument/2006/math" xmlns="" val="1"/>
+              <ma14:wrappingTextBoxFlag xmlns="" xmlns:m="http://schemas.openxmlformats.org/officeDocument/2006/math" xmlns:a14="http://schemas.microsoft.com/office/drawing/2010/main" xmlns:ma14="http://schemas.microsoft.com/office/mac/drawingml/2011/main" val="1"/>
             </a:ext>
           </a:extLst>
         </p:spPr>
@@ -4743,7 +4751,7 @@
           <a:effectLst/>
           <a:extLst>
             <a:ext uri="{C572A759-6A51-4108-AA02-DFA0A04FC94B}">
-              <ma14:wrappingTextBoxFlag xmlns:ma14="http://schemas.microsoft.com/office/mac/drawingml/2011/main" xmlns:a14="http://schemas.microsoft.com/office/drawing/2010/main" xmlns:m="http://schemas.openxmlformats.org/officeDocument/2006/math" xmlns="" val="1"/>
+              <ma14:wrappingTextBoxFlag xmlns="" xmlns:m="http://schemas.openxmlformats.org/officeDocument/2006/math" xmlns:a14="http://schemas.microsoft.com/office/drawing/2010/main" xmlns:ma14="http://schemas.microsoft.com/office/mac/drawingml/2011/main" val="1"/>
             </a:ext>
           </a:extLst>
         </p:spPr>
@@ -4922,7 +4930,7 @@
           </a:ln>
           <a:extLst>
             <a:ext uri="{C572A759-6A51-4108-AA02-DFA0A04FC94B}">
-              <ma14:wrappingTextBoxFlag xmlns:ma14="http://schemas.microsoft.com/office/mac/drawingml/2011/main" xmlns:a14="http://schemas.microsoft.com/office/drawing/2010/main" xmlns:m="http://schemas.openxmlformats.org/officeDocument/2006/math" xmlns="" val="1"/>
+              <ma14:wrappingTextBoxFlag xmlns="" xmlns:m="http://schemas.openxmlformats.org/officeDocument/2006/math" xmlns:a14="http://schemas.microsoft.com/office/drawing/2010/main" xmlns:ma14="http://schemas.microsoft.com/office/mac/drawingml/2011/main" val="1"/>
             </a:ext>
           </a:extLst>
         </p:spPr>
@@ -5089,7 +5097,7 @@
           <a:effectLst/>
           <a:extLst>
             <a:ext uri="{C572A759-6A51-4108-AA02-DFA0A04FC94B}">
-              <ma14:wrappingTextBoxFlag xmlns="" xmlns:m="http://schemas.openxmlformats.org/officeDocument/2006/math" xmlns:a14="http://schemas.microsoft.com/office/drawing/2010/main" xmlns:ma14="http://schemas.microsoft.com/office/mac/drawingml/2011/main" xmlns:lc="http://schemas.openxmlformats.org/drawingml/2006/lockedCanvas" val="1"/>
+              <ma14:wrappingTextBoxFlag xmlns:lc="http://schemas.openxmlformats.org/drawingml/2006/lockedCanvas" xmlns:ma14="http://schemas.microsoft.com/office/mac/drawingml/2011/main" xmlns:a14="http://schemas.microsoft.com/office/drawing/2010/main" xmlns:m="http://schemas.openxmlformats.org/officeDocument/2006/math" xmlns="" val="1"/>
             </a:ext>
           </a:extLst>
         </p:spPr>
@@ -5583,7 +5591,7 @@
           </a:ln>
           <a:extLst>
             <a:ext uri="{C572A759-6A51-4108-AA02-DFA0A04FC94B}">
-              <ma14:wrappingTextBoxFlag xmlns:ma14="http://schemas.microsoft.com/office/mac/drawingml/2011/main" xmlns:a14="http://schemas.microsoft.com/office/drawing/2010/main" xmlns:m="http://schemas.openxmlformats.org/officeDocument/2006/math" xmlns="" val="1"/>
+              <ma14:wrappingTextBoxFlag xmlns="" xmlns:m="http://schemas.openxmlformats.org/officeDocument/2006/math" xmlns:a14="http://schemas.microsoft.com/office/drawing/2010/main" xmlns:ma14="http://schemas.microsoft.com/office/mac/drawingml/2011/main" val="1"/>
             </a:ext>
           </a:extLst>
         </p:spPr>
@@ -5836,7 +5844,7 @@
           </a:ln>
           <a:extLst>
             <a:ext uri="{C572A759-6A51-4108-AA02-DFA0A04FC94B}">
-              <ma14:wrappingTextBoxFlag xmlns:ma14="http://schemas.microsoft.com/office/mac/drawingml/2011/main" xmlns:a14="http://schemas.microsoft.com/office/drawing/2010/main" xmlns:m="http://schemas.openxmlformats.org/officeDocument/2006/math" xmlns="" val="1"/>
+              <ma14:wrappingTextBoxFlag xmlns="" xmlns:m="http://schemas.openxmlformats.org/officeDocument/2006/math" xmlns:a14="http://schemas.microsoft.com/office/drawing/2010/main" xmlns:ma14="http://schemas.microsoft.com/office/mac/drawingml/2011/main" val="1"/>
             </a:ext>
           </a:extLst>
         </p:spPr>
@@ -5900,7 +5908,7 @@
           <a:effectLst/>
           <a:extLst>
             <a:ext uri="{C572A759-6A51-4108-AA02-DFA0A04FC94B}">
-              <ma14:wrappingTextBoxFlag xmlns="" xmlns:m="http://schemas.openxmlformats.org/officeDocument/2006/math" xmlns:a14="http://schemas.microsoft.com/office/drawing/2010/main" xmlns:ma14="http://schemas.microsoft.com/office/mac/drawingml/2011/main" xmlns:lc="http://schemas.openxmlformats.org/drawingml/2006/lockedCanvas" val="1"/>
+              <ma14:wrappingTextBoxFlag xmlns:lc="http://schemas.openxmlformats.org/drawingml/2006/lockedCanvas" xmlns:ma14="http://schemas.microsoft.com/office/mac/drawingml/2011/main" xmlns:a14="http://schemas.microsoft.com/office/drawing/2010/main" xmlns:m="http://schemas.openxmlformats.org/officeDocument/2006/math" xmlns="" val="1"/>
             </a:ext>
           </a:extLst>
         </p:spPr>
@@ -6368,7 +6376,7 @@
           </a:ln>
           <a:extLst>
             <a:ext uri="{C572A759-6A51-4108-AA02-DFA0A04FC94B}">
-              <ma14:wrappingTextBoxFlag xmlns:ma14="http://schemas.microsoft.com/office/mac/drawingml/2011/main" xmlns:a14="http://schemas.microsoft.com/office/drawing/2010/main" xmlns:m="http://schemas.openxmlformats.org/officeDocument/2006/math" xmlns="" val="1"/>
+              <ma14:wrappingTextBoxFlag xmlns="" xmlns:m="http://schemas.openxmlformats.org/officeDocument/2006/math" xmlns:a14="http://schemas.microsoft.com/office/drawing/2010/main" xmlns:ma14="http://schemas.microsoft.com/office/mac/drawingml/2011/main" val="1"/>
             </a:ext>
           </a:extLst>
         </p:spPr>
@@ -6471,7 +6479,7 @@
                 <a:effectLst/>
                 <a:latin typeface="+mn-lt"/>
               </a:rPr>
-              <a:t>: items or monetary units.</a:t>
+              <a:t>: items (rows) or monetary units.</a:t>
             </a:r>
           </a:p>
         </p:txBody>
@@ -6501,7 +6509,7 @@
           </a:ln>
           <a:extLst>
             <a:ext uri="{C572A759-6A51-4108-AA02-DFA0A04FC94B}">
-              <ma14:wrappingTextBoxFlag xmlns:ma14="http://schemas.microsoft.com/office/mac/drawingml/2011/main" xmlns:a14="http://schemas.microsoft.com/office/drawing/2010/main" xmlns:m="http://schemas.openxmlformats.org/officeDocument/2006/math" xmlns="" val="1"/>
+              <ma14:wrappingTextBoxFlag xmlns="" xmlns:m="http://schemas.openxmlformats.org/officeDocument/2006/math" xmlns:a14="http://schemas.microsoft.com/office/drawing/2010/main" xmlns:ma14="http://schemas.microsoft.com/office/mac/drawingml/2011/main" val="1"/>
             </a:ext>
           </a:extLst>
         </p:spPr>
@@ -6662,7 +6670,7 @@
           <a:effectLst/>
           <a:extLst>
             <a:ext uri="{C572A759-6A51-4108-AA02-DFA0A04FC94B}">
-              <ma14:wrappingTextBoxFlag xmlns="" xmlns:m="http://schemas.openxmlformats.org/officeDocument/2006/math" xmlns:a14="http://schemas.microsoft.com/office/drawing/2010/main" xmlns:ma14="http://schemas.microsoft.com/office/mac/drawingml/2011/main" xmlns:lc="http://schemas.openxmlformats.org/drawingml/2006/lockedCanvas" val="1"/>
+              <ma14:wrappingTextBoxFlag xmlns:lc="http://schemas.openxmlformats.org/drawingml/2006/lockedCanvas" xmlns:ma14="http://schemas.microsoft.com/office/mac/drawingml/2011/main" xmlns:a14="http://schemas.microsoft.com/office/drawing/2010/main" xmlns:m="http://schemas.openxmlformats.org/officeDocument/2006/math" xmlns="" val="1"/>
             </a:ext>
           </a:extLst>
         </p:spPr>
@@ -7156,7 +7164,7 @@
           </a:ln>
           <a:extLst>
             <a:ext uri="{C572A759-6A51-4108-AA02-DFA0A04FC94B}">
-              <ma14:wrappingTextBoxFlag xmlns:ma14="http://schemas.microsoft.com/office/mac/drawingml/2011/main" xmlns:a14="http://schemas.microsoft.com/office/drawing/2010/main" xmlns:m="http://schemas.openxmlformats.org/officeDocument/2006/math" xmlns="" val="1"/>
+              <ma14:wrappingTextBoxFlag xmlns="" xmlns:m="http://schemas.openxmlformats.org/officeDocument/2006/math" xmlns:a14="http://schemas.microsoft.com/office/drawing/2010/main" xmlns:ma14="http://schemas.microsoft.com/office/mac/drawingml/2011/main" val="1"/>
             </a:ext>
           </a:extLst>
         </p:spPr>
@@ -7495,7 +7503,7 @@
           </a:ln>
           <a:extLst>
             <a:ext uri="{C572A759-6A51-4108-AA02-DFA0A04FC94B}">
-              <ma14:wrappingTextBoxFlag xmlns:ma14="http://schemas.microsoft.com/office/mac/drawingml/2011/main" xmlns:a14="http://schemas.microsoft.com/office/drawing/2010/main" xmlns:m="http://schemas.openxmlformats.org/officeDocument/2006/math" xmlns="" val="1"/>
+              <ma14:wrappingTextBoxFlag xmlns="" xmlns:m="http://schemas.openxmlformats.org/officeDocument/2006/math" xmlns:a14="http://schemas.microsoft.com/office/drawing/2010/main" xmlns:ma14="http://schemas.microsoft.com/office/mac/drawingml/2011/main" val="1"/>
             </a:ext>
           </a:extLst>
         </p:spPr>
@@ -7626,7 +7634,7 @@
           <a:effectLst/>
           <a:extLst>
             <a:ext uri="{C572A759-6A51-4108-AA02-DFA0A04FC94B}">
-              <ma14:wrappingTextBoxFlag xmlns="" xmlns:m="http://schemas.openxmlformats.org/officeDocument/2006/math" xmlns:a14="http://schemas.microsoft.com/office/drawing/2010/main" xmlns:ma14="http://schemas.microsoft.com/office/mac/drawingml/2011/main" xmlns:lc="http://schemas.openxmlformats.org/drawingml/2006/lockedCanvas" val="1"/>
+              <ma14:wrappingTextBoxFlag xmlns:lc="http://schemas.openxmlformats.org/drawingml/2006/lockedCanvas" xmlns:ma14="http://schemas.microsoft.com/office/mac/drawingml/2011/main" xmlns:a14="http://schemas.microsoft.com/office/drawing/2010/main" xmlns:m="http://schemas.openxmlformats.org/officeDocument/2006/math" xmlns="" val="1"/>
             </a:ext>
           </a:extLst>
         </p:spPr>
@@ -8120,7 +8128,7 @@
           </a:ln>
           <a:extLst>
             <a:ext uri="{C572A759-6A51-4108-AA02-DFA0A04FC94B}">
-              <ma14:wrappingTextBoxFlag xmlns:ma14="http://schemas.microsoft.com/office/mac/drawingml/2011/main" xmlns:a14="http://schemas.microsoft.com/office/drawing/2010/main" xmlns:m="http://schemas.openxmlformats.org/officeDocument/2006/math" xmlns="" val="1"/>
+              <ma14:wrappingTextBoxFlag xmlns="" xmlns:m="http://schemas.openxmlformats.org/officeDocument/2006/math" xmlns:a14="http://schemas.microsoft.com/office/drawing/2010/main" xmlns:ma14="http://schemas.microsoft.com/office/mac/drawingml/2011/main" val="1"/>
             </a:ext>
           </a:extLst>
         </p:spPr>
@@ -8235,7 +8243,7 @@
           </a:ln>
           <a:extLst>
             <a:ext uri="{C572A759-6A51-4108-AA02-DFA0A04FC94B}">
-              <ma14:wrappingTextBoxFlag xmlns:ma14="http://schemas.microsoft.com/office/mac/drawingml/2011/main" xmlns:a14="http://schemas.microsoft.com/office/drawing/2010/main" xmlns:m="http://schemas.openxmlformats.org/officeDocument/2006/math" xmlns="" val="1"/>
+              <ma14:wrappingTextBoxFlag xmlns="" xmlns:m="http://schemas.openxmlformats.org/officeDocument/2006/math" xmlns:a14="http://schemas.microsoft.com/office/drawing/2010/main" xmlns:ma14="http://schemas.microsoft.com/office/mac/drawingml/2011/main" val="1"/>
             </a:ext>
           </a:extLst>
         </p:spPr>
@@ -8346,7 +8354,7 @@
           <a:effectLst/>
           <a:extLst>
             <a:ext uri="{C572A759-6A51-4108-AA02-DFA0A04FC94B}">
-              <ma14:wrappingTextBoxFlag xmlns="" xmlns:m="http://schemas.openxmlformats.org/officeDocument/2006/math" xmlns:a14="http://schemas.microsoft.com/office/drawing/2010/main" xmlns:ma14="http://schemas.microsoft.com/office/mac/drawingml/2011/main" xmlns:lc="http://schemas.openxmlformats.org/drawingml/2006/lockedCanvas" val="1"/>
+              <ma14:wrappingTextBoxFlag xmlns:lc="http://schemas.openxmlformats.org/drawingml/2006/lockedCanvas" xmlns:ma14="http://schemas.microsoft.com/office/mac/drawingml/2011/main" xmlns:a14="http://schemas.microsoft.com/office/drawing/2010/main" xmlns:m="http://schemas.openxmlformats.org/officeDocument/2006/math" xmlns="" val="1"/>
             </a:ext>
           </a:extLst>
         </p:spPr>
@@ -8728,7 +8736,7 @@
           <a:effectLst/>
           <a:extLst>
             <a:ext uri="{C572A759-6A51-4108-AA02-DFA0A04FC94B}">
-              <ma14:wrappingTextBoxFlag xmlns:ma14="http://schemas.microsoft.com/office/mac/drawingml/2011/main" xmlns:a14="http://schemas.microsoft.com/office/drawing/2010/main" xmlns:m="http://schemas.openxmlformats.org/officeDocument/2006/math" xmlns="" val="1"/>
+              <ma14:wrappingTextBoxFlag xmlns="" xmlns:m="http://schemas.openxmlformats.org/officeDocument/2006/math" xmlns:a14="http://schemas.microsoft.com/office/drawing/2010/main" xmlns:ma14="http://schemas.microsoft.com/office/mac/drawingml/2011/main" val="1"/>
             </a:ext>
           </a:extLst>
         </p:spPr>
@@ -9038,7 +9046,7 @@
           <a:effectLst/>
           <a:extLst>
             <a:ext uri="{C572A759-6A51-4108-AA02-DFA0A04FC94B}">
-              <ma14:wrappingTextBoxFlag xmlns:ma14="http://schemas.microsoft.com/office/mac/drawingml/2011/main" xmlns:a14="http://schemas.microsoft.com/office/drawing/2010/main" xmlns:m="http://schemas.openxmlformats.org/officeDocument/2006/math" xmlns="" val="1"/>
+              <ma14:wrappingTextBoxFlag xmlns="" xmlns:m="http://schemas.openxmlformats.org/officeDocument/2006/math" xmlns:a14="http://schemas.microsoft.com/office/drawing/2010/main" xmlns:ma14="http://schemas.microsoft.com/office/mac/drawingml/2011/main" val="1"/>
             </a:ext>
           </a:extLst>
         </p:spPr>
@@ -9304,7 +9312,7 @@
           <a:effectLst/>
           <a:extLst>
             <a:ext uri="{C572A759-6A51-4108-AA02-DFA0A04FC94B}">
-              <ma14:wrappingTextBoxFlag xmlns:ma14="http://schemas.microsoft.com/office/mac/drawingml/2011/main" xmlns:a14="http://schemas.microsoft.com/office/drawing/2010/main" xmlns:m="http://schemas.openxmlformats.org/officeDocument/2006/math" xmlns="" val="1"/>
+              <ma14:wrappingTextBoxFlag xmlns="" xmlns:m="http://schemas.openxmlformats.org/officeDocument/2006/math" xmlns:a14="http://schemas.microsoft.com/office/drawing/2010/main" xmlns:ma14="http://schemas.microsoft.com/office/mac/drawingml/2011/main" val="1"/>
             </a:ext>
           </a:extLst>
         </p:spPr>
@@ -9635,7 +9643,7 @@
           <a:effectLst/>
           <a:extLst>
             <a:ext uri="{C572A759-6A51-4108-AA02-DFA0A04FC94B}">
-              <ma14:wrappingTextBoxFlag xmlns:ma14="http://schemas.microsoft.com/office/mac/drawingml/2011/main" xmlns:a14="http://schemas.microsoft.com/office/drawing/2010/main" xmlns:m="http://schemas.openxmlformats.org/officeDocument/2006/math" xmlns="" val="1"/>
+              <ma14:wrappingTextBoxFlag xmlns="" xmlns:m="http://schemas.openxmlformats.org/officeDocument/2006/math" xmlns:a14="http://schemas.microsoft.com/office/drawing/2010/main" xmlns:ma14="http://schemas.microsoft.com/office/mac/drawingml/2011/main" val="1"/>
             </a:ext>
           </a:extLst>
         </p:spPr>
@@ -10102,7 +10110,7 @@
           </a:ln>
           <a:extLst>
             <a:ext uri="{C572A759-6A51-4108-AA02-DFA0A04FC94B}">
-              <ma14:wrappingTextBoxFlag xmlns:ma14="http://schemas.microsoft.com/office/mac/drawingml/2011/main" xmlns:a14="http://schemas.microsoft.com/office/drawing/2010/main" xmlns:m="http://schemas.openxmlformats.org/officeDocument/2006/math" xmlns="" val="1"/>
+              <ma14:wrappingTextBoxFlag xmlns="" xmlns:m="http://schemas.openxmlformats.org/officeDocument/2006/math" xmlns:a14="http://schemas.microsoft.com/office/drawing/2010/main" xmlns:ma14="http://schemas.microsoft.com/office/mac/drawingml/2011/main" val="1"/>
             </a:ext>
           </a:extLst>
         </p:spPr>
@@ -10166,7 +10174,7 @@
           </a:ln>
           <a:extLst>
             <a:ext uri="{C572A759-6A51-4108-AA02-DFA0A04FC94B}">
-              <ma14:wrappingTextBoxFlag xmlns:ma14="http://schemas.microsoft.com/office/mac/drawingml/2011/main" xmlns:a14="http://schemas.microsoft.com/office/drawing/2010/main" xmlns:m="http://schemas.openxmlformats.org/officeDocument/2006/math" xmlns="" val="1"/>
+              <ma14:wrappingTextBoxFlag xmlns="" xmlns:m="http://schemas.openxmlformats.org/officeDocument/2006/math" xmlns:a14="http://schemas.microsoft.com/office/drawing/2010/main" xmlns:ma14="http://schemas.microsoft.com/office/mac/drawingml/2011/main" val="1"/>
             </a:ext>
           </a:extLst>
         </p:spPr>
@@ -10590,7 +10598,7 @@
           </a:ln>
           <a:extLst>
             <a:ext uri="{C572A759-6A51-4108-AA02-DFA0A04FC94B}">
-              <ma14:wrappingTextBoxFlag xmlns:ma14="http://schemas.microsoft.com/office/mac/drawingml/2011/main" xmlns:a14="http://schemas.microsoft.com/office/drawing/2010/main" xmlns:m="http://schemas.openxmlformats.org/officeDocument/2006/math" xmlns="" val="1"/>
+              <ma14:wrappingTextBoxFlag xmlns="" xmlns:m="http://schemas.openxmlformats.org/officeDocument/2006/math" xmlns:a14="http://schemas.microsoft.com/office/drawing/2010/main" xmlns:ma14="http://schemas.microsoft.com/office/mac/drawingml/2011/main" val="1"/>
             </a:ext>
           </a:extLst>
         </p:spPr>
@@ -10654,7 +10662,7 @@
           </a:ln>
           <a:extLst>
             <a:ext uri="{C572A759-6A51-4108-AA02-DFA0A04FC94B}">
-              <ma14:wrappingTextBoxFlag xmlns:ma14="http://schemas.microsoft.com/office/mac/drawingml/2011/main" xmlns:a14="http://schemas.microsoft.com/office/drawing/2010/main" xmlns:m="http://schemas.openxmlformats.org/officeDocument/2006/math" xmlns="" val="1"/>
+              <ma14:wrappingTextBoxFlag xmlns="" xmlns:m="http://schemas.openxmlformats.org/officeDocument/2006/math" xmlns:a14="http://schemas.microsoft.com/office/drawing/2010/main" xmlns:ma14="http://schemas.microsoft.com/office/mac/drawingml/2011/main" val="1"/>
             </a:ext>
           </a:extLst>
         </p:spPr>

</xml_diff>

<commit_message>
Built site for jfa: 0.6.0@f3bef09
</commit_message>
<xml_diff>
--- a/reference/figures/cheatsheet/cheatsheet.pptx
+++ b/reference/figures/cheatsheet/cheatsheet.pptx
@@ -633,12 +633,12 @@
   <pc:docChgLst>
     <pc:chgData name="Derks, Koen" userId="42903d96-be75-4cec-9136-f3710e86cd30" providerId="ADAL" clId="{B2C99C48-803B-45C3-BEC8-064BF2898A74}"/>
     <pc:docChg chg="custSel modSld">
-      <pc:chgData name="Derks, Koen" userId="42903d96-be75-4cec-9136-f3710e86cd30" providerId="ADAL" clId="{B2C99C48-803B-45C3-BEC8-064BF2898A74}" dt="2021-09-16T14:23:53.513" v="35" actId="20577"/>
+      <pc:chgData name="Derks, Koen" userId="42903d96-be75-4cec-9136-f3710e86cd30" providerId="ADAL" clId="{B2C99C48-803B-45C3-BEC8-064BF2898A74}" dt="2021-09-17T16:30:22.742" v="47"/>
       <pc:docMkLst>
         <pc:docMk/>
       </pc:docMkLst>
       <pc:sldChg chg="modSp mod">
-        <pc:chgData name="Derks, Koen" userId="42903d96-be75-4cec-9136-f3710e86cd30" providerId="ADAL" clId="{B2C99C48-803B-45C3-BEC8-064BF2898A74}" dt="2021-09-16T14:23:53.513" v="35" actId="20577"/>
+        <pc:chgData name="Derks, Koen" userId="42903d96-be75-4cec-9136-f3710e86cd30" providerId="ADAL" clId="{B2C99C48-803B-45C3-BEC8-064BF2898A74}" dt="2021-09-17T16:30:22.742" v="47"/>
         <pc:sldMkLst>
           <pc:docMk/>
           <pc:sldMk cId="0" sldId="257"/>
@@ -652,7 +652,7 @@
           </ac:spMkLst>
         </pc:spChg>
         <pc:spChg chg="mod">
-          <ac:chgData name="Derks, Koen" userId="42903d96-be75-4cec-9136-f3710e86cd30" providerId="ADAL" clId="{B2C99C48-803B-45C3-BEC8-064BF2898A74}" dt="2021-09-16T13:56:06.276" v="28"/>
+          <ac:chgData name="Derks, Koen" userId="42903d96-be75-4cec-9136-f3710e86cd30" providerId="ADAL" clId="{B2C99C48-803B-45C3-BEC8-064BF2898A74}" dt="2021-09-17T16:30:22.742" v="47"/>
           <ac:spMkLst>
             <pc:docMk/>
             <pc:sldMk cId="0" sldId="257"/>
@@ -2703,7 +2703,7 @@
           </a:ln>
           <a:extLst>
             <a:ext uri="{C572A759-6A51-4108-AA02-DFA0A04FC94B}">
-              <ma14:wrappingTextBoxFlag xmlns="" xmlns:m="http://schemas.openxmlformats.org/officeDocument/2006/math" xmlns:a14="http://schemas.microsoft.com/office/drawing/2010/main" xmlns:ma14="http://schemas.microsoft.com/office/mac/drawingml/2011/main" val="1"/>
+              <ma14:wrappingTextBoxFlag xmlns:ma14="http://schemas.microsoft.com/office/mac/drawingml/2011/main" xmlns:a14="http://schemas.microsoft.com/office/drawing/2010/main" xmlns:m="http://schemas.openxmlformats.org/officeDocument/2006/math" xmlns="" val="1"/>
             </a:ext>
           </a:extLst>
         </p:spPr>
@@ -2742,7 +2742,7 @@
           </a:ln>
           <a:extLst>
             <a:ext uri="{C572A759-6A51-4108-AA02-DFA0A04FC94B}">
-              <ma14:wrappingTextBoxFlag xmlns="" xmlns:m="http://schemas.openxmlformats.org/officeDocument/2006/math" xmlns:a14="http://schemas.microsoft.com/office/drawing/2010/main" xmlns:ma14="http://schemas.microsoft.com/office/mac/drawingml/2011/main" val="1"/>
+              <ma14:wrappingTextBoxFlag xmlns:ma14="http://schemas.microsoft.com/office/mac/drawingml/2011/main" xmlns:a14="http://schemas.microsoft.com/office/drawing/2010/main" xmlns:m="http://schemas.openxmlformats.org/officeDocument/2006/math" xmlns="" val="1"/>
             </a:ext>
           </a:extLst>
         </p:spPr>
@@ -3835,7 +3835,7 @@
           </a:ln>
           <a:extLst>
             <a:ext uri="{C572A759-6A51-4108-AA02-DFA0A04FC94B}">
-              <ma14:wrappingTextBoxFlag xmlns="" xmlns:m="http://schemas.openxmlformats.org/officeDocument/2006/math" xmlns:a14="http://schemas.microsoft.com/office/drawing/2010/main" xmlns:ma14="http://schemas.microsoft.com/office/mac/drawingml/2011/main" val="1"/>
+              <ma14:wrappingTextBoxFlag xmlns:ma14="http://schemas.microsoft.com/office/mac/drawingml/2011/main" xmlns:a14="http://schemas.microsoft.com/office/drawing/2010/main" xmlns:m="http://schemas.openxmlformats.org/officeDocument/2006/math" xmlns="" val="1"/>
             </a:ext>
           </a:extLst>
         </p:spPr>
@@ -3888,7 +3888,7 @@
           </a:ln>
           <a:extLst>
             <a:ext uri="{C572A759-6A51-4108-AA02-DFA0A04FC94B}">
-              <ma14:wrappingTextBoxFlag xmlns="" xmlns:m="http://schemas.openxmlformats.org/officeDocument/2006/math" xmlns:a14="http://schemas.microsoft.com/office/drawing/2010/main" xmlns:ma14="http://schemas.microsoft.com/office/mac/drawingml/2011/main" val="1"/>
+              <ma14:wrappingTextBoxFlag xmlns:ma14="http://schemas.microsoft.com/office/mac/drawingml/2011/main" xmlns:a14="http://schemas.microsoft.com/office/drawing/2010/main" xmlns:m="http://schemas.openxmlformats.org/officeDocument/2006/math" xmlns="" val="1"/>
             </a:ext>
           </a:extLst>
         </p:spPr>
@@ -4054,7 +4054,7 @@
           </a:ln>
           <a:extLst>
             <a:ext uri="{C572A759-6A51-4108-AA02-DFA0A04FC94B}">
-              <ma14:wrappingTextBoxFlag xmlns="" xmlns:m="http://schemas.openxmlformats.org/officeDocument/2006/math" xmlns:a14="http://schemas.microsoft.com/office/drawing/2010/main" xmlns:ma14="http://schemas.microsoft.com/office/mac/drawingml/2011/main" val="1"/>
+              <ma14:wrappingTextBoxFlag xmlns:ma14="http://schemas.microsoft.com/office/mac/drawingml/2011/main" xmlns:a14="http://schemas.microsoft.com/office/drawing/2010/main" xmlns:m="http://schemas.openxmlformats.org/officeDocument/2006/math" xmlns="" val="1"/>
             </a:ext>
           </a:extLst>
         </p:spPr>
@@ -4541,7 +4541,7 @@
           </a:ln>
           <a:extLst>
             <a:ext uri="{C572A759-6A51-4108-AA02-DFA0A04FC94B}">
-              <ma14:wrappingTextBoxFlag xmlns="" xmlns:m="http://schemas.openxmlformats.org/officeDocument/2006/math" xmlns:a14="http://schemas.microsoft.com/office/drawing/2010/main" xmlns:ma14="http://schemas.microsoft.com/office/mac/drawingml/2011/main" val="1"/>
+              <ma14:wrappingTextBoxFlag xmlns:ma14="http://schemas.microsoft.com/office/mac/drawingml/2011/main" xmlns:a14="http://schemas.microsoft.com/office/drawing/2010/main" xmlns:m="http://schemas.openxmlformats.org/officeDocument/2006/math" xmlns="" val="1"/>
             </a:ext>
           </a:extLst>
         </p:spPr>
@@ -4751,7 +4751,7 @@
           <a:effectLst/>
           <a:extLst>
             <a:ext uri="{C572A759-6A51-4108-AA02-DFA0A04FC94B}">
-              <ma14:wrappingTextBoxFlag xmlns="" xmlns:m="http://schemas.openxmlformats.org/officeDocument/2006/math" xmlns:a14="http://schemas.microsoft.com/office/drawing/2010/main" xmlns:ma14="http://schemas.microsoft.com/office/mac/drawingml/2011/main" val="1"/>
+              <ma14:wrappingTextBoxFlag xmlns:ma14="http://schemas.microsoft.com/office/mac/drawingml/2011/main" xmlns:a14="http://schemas.microsoft.com/office/drawing/2010/main" xmlns:m="http://schemas.openxmlformats.org/officeDocument/2006/math" xmlns="" val="1"/>
             </a:ext>
           </a:extLst>
         </p:spPr>
@@ -4930,7 +4930,7 @@
           </a:ln>
           <a:extLst>
             <a:ext uri="{C572A759-6A51-4108-AA02-DFA0A04FC94B}">
-              <ma14:wrappingTextBoxFlag xmlns="" xmlns:m="http://schemas.openxmlformats.org/officeDocument/2006/math" xmlns:a14="http://schemas.microsoft.com/office/drawing/2010/main" xmlns:ma14="http://schemas.microsoft.com/office/mac/drawingml/2011/main" val="1"/>
+              <ma14:wrappingTextBoxFlag xmlns:ma14="http://schemas.microsoft.com/office/mac/drawingml/2011/main" xmlns:a14="http://schemas.microsoft.com/office/drawing/2010/main" xmlns:m="http://schemas.openxmlformats.org/officeDocument/2006/math" xmlns="" val="1"/>
             </a:ext>
           </a:extLst>
         </p:spPr>
@@ -5097,7 +5097,7 @@
           <a:effectLst/>
           <a:extLst>
             <a:ext uri="{C572A759-6A51-4108-AA02-DFA0A04FC94B}">
-              <ma14:wrappingTextBoxFlag xmlns:lc="http://schemas.openxmlformats.org/drawingml/2006/lockedCanvas" xmlns:ma14="http://schemas.microsoft.com/office/mac/drawingml/2011/main" xmlns:a14="http://schemas.microsoft.com/office/drawing/2010/main" xmlns:m="http://schemas.openxmlformats.org/officeDocument/2006/math" xmlns="" val="1"/>
+              <ma14:wrappingTextBoxFlag xmlns="" xmlns:m="http://schemas.openxmlformats.org/officeDocument/2006/math" xmlns:a14="http://schemas.microsoft.com/office/drawing/2010/main" xmlns:ma14="http://schemas.microsoft.com/office/mac/drawingml/2011/main" xmlns:lc="http://schemas.openxmlformats.org/drawingml/2006/lockedCanvas" val="1"/>
             </a:ext>
           </a:extLst>
         </p:spPr>
@@ -5591,7 +5591,7 @@
           </a:ln>
           <a:extLst>
             <a:ext uri="{C572A759-6A51-4108-AA02-DFA0A04FC94B}">
-              <ma14:wrappingTextBoxFlag xmlns="" xmlns:m="http://schemas.openxmlformats.org/officeDocument/2006/math" xmlns:a14="http://schemas.microsoft.com/office/drawing/2010/main" xmlns:ma14="http://schemas.microsoft.com/office/mac/drawingml/2011/main" val="1"/>
+              <ma14:wrappingTextBoxFlag xmlns:ma14="http://schemas.microsoft.com/office/mac/drawingml/2011/main" xmlns:a14="http://schemas.microsoft.com/office/drawing/2010/main" xmlns:m="http://schemas.openxmlformats.org/officeDocument/2006/math" xmlns="" val="1"/>
             </a:ext>
           </a:extLst>
         </p:spPr>
@@ -5844,7 +5844,7 @@
           </a:ln>
           <a:extLst>
             <a:ext uri="{C572A759-6A51-4108-AA02-DFA0A04FC94B}">
-              <ma14:wrappingTextBoxFlag xmlns="" xmlns:m="http://schemas.openxmlformats.org/officeDocument/2006/math" xmlns:a14="http://schemas.microsoft.com/office/drawing/2010/main" xmlns:ma14="http://schemas.microsoft.com/office/mac/drawingml/2011/main" val="1"/>
+              <ma14:wrappingTextBoxFlag xmlns:ma14="http://schemas.microsoft.com/office/mac/drawingml/2011/main" xmlns:a14="http://schemas.microsoft.com/office/drawing/2010/main" xmlns:m="http://schemas.openxmlformats.org/officeDocument/2006/math" xmlns="" val="1"/>
             </a:ext>
           </a:extLst>
         </p:spPr>
@@ -5908,7 +5908,7 @@
           <a:effectLst/>
           <a:extLst>
             <a:ext uri="{C572A759-6A51-4108-AA02-DFA0A04FC94B}">
-              <ma14:wrappingTextBoxFlag xmlns:lc="http://schemas.openxmlformats.org/drawingml/2006/lockedCanvas" xmlns:ma14="http://schemas.microsoft.com/office/mac/drawingml/2011/main" xmlns:a14="http://schemas.microsoft.com/office/drawing/2010/main" xmlns:m="http://schemas.openxmlformats.org/officeDocument/2006/math" xmlns="" val="1"/>
+              <ma14:wrappingTextBoxFlag xmlns="" xmlns:m="http://schemas.openxmlformats.org/officeDocument/2006/math" xmlns:a14="http://schemas.microsoft.com/office/drawing/2010/main" xmlns:ma14="http://schemas.microsoft.com/office/mac/drawingml/2011/main" xmlns:lc="http://schemas.openxmlformats.org/drawingml/2006/lockedCanvas" val="1"/>
             </a:ext>
           </a:extLst>
         </p:spPr>
@@ -6376,7 +6376,7 @@
           </a:ln>
           <a:extLst>
             <a:ext uri="{C572A759-6A51-4108-AA02-DFA0A04FC94B}">
-              <ma14:wrappingTextBoxFlag xmlns="" xmlns:m="http://schemas.openxmlformats.org/officeDocument/2006/math" xmlns:a14="http://schemas.microsoft.com/office/drawing/2010/main" xmlns:ma14="http://schemas.microsoft.com/office/mac/drawingml/2011/main" val="1"/>
+              <ma14:wrappingTextBoxFlag xmlns:ma14="http://schemas.microsoft.com/office/mac/drawingml/2011/main" xmlns:a14="http://schemas.microsoft.com/office/drawing/2010/main" xmlns:m="http://schemas.openxmlformats.org/officeDocument/2006/math" xmlns="" val="1"/>
             </a:ext>
           </a:extLst>
         </p:spPr>
@@ -6509,7 +6509,7 @@
           </a:ln>
           <a:extLst>
             <a:ext uri="{C572A759-6A51-4108-AA02-DFA0A04FC94B}">
-              <ma14:wrappingTextBoxFlag xmlns="" xmlns:m="http://schemas.openxmlformats.org/officeDocument/2006/math" xmlns:a14="http://schemas.microsoft.com/office/drawing/2010/main" xmlns:ma14="http://schemas.microsoft.com/office/mac/drawingml/2011/main" val="1"/>
+              <ma14:wrappingTextBoxFlag xmlns:ma14="http://schemas.microsoft.com/office/mac/drawingml/2011/main" xmlns:a14="http://schemas.microsoft.com/office/drawing/2010/main" xmlns:m="http://schemas.openxmlformats.org/officeDocument/2006/math" xmlns="" val="1"/>
             </a:ext>
           </a:extLst>
         </p:spPr>
@@ -6670,7 +6670,7 @@
           <a:effectLst/>
           <a:extLst>
             <a:ext uri="{C572A759-6A51-4108-AA02-DFA0A04FC94B}">
-              <ma14:wrappingTextBoxFlag xmlns:lc="http://schemas.openxmlformats.org/drawingml/2006/lockedCanvas" xmlns:ma14="http://schemas.microsoft.com/office/mac/drawingml/2011/main" xmlns:a14="http://schemas.microsoft.com/office/drawing/2010/main" xmlns:m="http://schemas.openxmlformats.org/officeDocument/2006/math" xmlns="" val="1"/>
+              <ma14:wrappingTextBoxFlag xmlns="" xmlns:m="http://schemas.openxmlformats.org/officeDocument/2006/math" xmlns:a14="http://schemas.microsoft.com/office/drawing/2010/main" xmlns:ma14="http://schemas.microsoft.com/office/mac/drawingml/2011/main" xmlns:lc="http://schemas.openxmlformats.org/drawingml/2006/lockedCanvas" val="1"/>
             </a:ext>
           </a:extLst>
         </p:spPr>
@@ -7164,7 +7164,7 @@
           </a:ln>
           <a:extLst>
             <a:ext uri="{C572A759-6A51-4108-AA02-DFA0A04FC94B}">
-              <ma14:wrappingTextBoxFlag xmlns="" xmlns:m="http://schemas.openxmlformats.org/officeDocument/2006/math" xmlns:a14="http://schemas.microsoft.com/office/drawing/2010/main" xmlns:ma14="http://schemas.microsoft.com/office/mac/drawingml/2011/main" val="1"/>
+              <ma14:wrappingTextBoxFlag xmlns:ma14="http://schemas.microsoft.com/office/mac/drawingml/2011/main" xmlns:a14="http://schemas.microsoft.com/office/drawing/2010/main" xmlns:m="http://schemas.openxmlformats.org/officeDocument/2006/math" xmlns="" val="1"/>
             </a:ext>
           </a:extLst>
         </p:spPr>
@@ -7503,7 +7503,7 @@
           </a:ln>
           <a:extLst>
             <a:ext uri="{C572A759-6A51-4108-AA02-DFA0A04FC94B}">
-              <ma14:wrappingTextBoxFlag xmlns="" xmlns:m="http://schemas.openxmlformats.org/officeDocument/2006/math" xmlns:a14="http://schemas.microsoft.com/office/drawing/2010/main" xmlns:ma14="http://schemas.microsoft.com/office/mac/drawingml/2011/main" val="1"/>
+              <ma14:wrappingTextBoxFlag xmlns:ma14="http://schemas.microsoft.com/office/mac/drawingml/2011/main" xmlns:a14="http://schemas.microsoft.com/office/drawing/2010/main" xmlns:m="http://schemas.openxmlformats.org/officeDocument/2006/math" xmlns="" val="1"/>
             </a:ext>
           </a:extLst>
         </p:spPr>
@@ -7634,7 +7634,7 @@
           <a:effectLst/>
           <a:extLst>
             <a:ext uri="{C572A759-6A51-4108-AA02-DFA0A04FC94B}">
-              <ma14:wrappingTextBoxFlag xmlns:lc="http://schemas.openxmlformats.org/drawingml/2006/lockedCanvas" xmlns:ma14="http://schemas.microsoft.com/office/mac/drawingml/2011/main" xmlns:a14="http://schemas.microsoft.com/office/drawing/2010/main" xmlns:m="http://schemas.openxmlformats.org/officeDocument/2006/math" xmlns="" val="1"/>
+              <ma14:wrappingTextBoxFlag xmlns="" xmlns:m="http://schemas.openxmlformats.org/officeDocument/2006/math" xmlns:a14="http://schemas.microsoft.com/office/drawing/2010/main" xmlns:ma14="http://schemas.microsoft.com/office/mac/drawingml/2011/main" xmlns:lc="http://schemas.openxmlformats.org/drawingml/2006/lockedCanvas" val="1"/>
             </a:ext>
           </a:extLst>
         </p:spPr>
@@ -8128,7 +8128,7 @@
           </a:ln>
           <a:extLst>
             <a:ext uri="{C572A759-6A51-4108-AA02-DFA0A04FC94B}">
-              <ma14:wrappingTextBoxFlag xmlns="" xmlns:m="http://schemas.openxmlformats.org/officeDocument/2006/math" xmlns:a14="http://schemas.microsoft.com/office/drawing/2010/main" xmlns:ma14="http://schemas.microsoft.com/office/mac/drawingml/2011/main" val="1"/>
+              <ma14:wrappingTextBoxFlag xmlns:ma14="http://schemas.microsoft.com/office/mac/drawingml/2011/main" xmlns:a14="http://schemas.microsoft.com/office/drawing/2010/main" xmlns:m="http://schemas.openxmlformats.org/officeDocument/2006/math" xmlns="" val="1"/>
             </a:ext>
           </a:extLst>
         </p:spPr>
@@ -8243,7 +8243,7 @@
           </a:ln>
           <a:extLst>
             <a:ext uri="{C572A759-6A51-4108-AA02-DFA0A04FC94B}">
-              <ma14:wrappingTextBoxFlag xmlns="" xmlns:m="http://schemas.openxmlformats.org/officeDocument/2006/math" xmlns:a14="http://schemas.microsoft.com/office/drawing/2010/main" xmlns:ma14="http://schemas.microsoft.com/office/mac/drawingml/2011/main" val="1"/>
+              <ma14:wrappingTextBoxFlag xmlns:ma14="http://schemas.microsoft.com/office/mac/drawingml/2011/main" xmlns:a14="http://schemas.microsoft.com/office/drawing/2010/main" xmlns:m="http://schemas.openxmlformats.org/officeDocument/2006/math" xmlns="" val="1"/>
             </a:ext>
           </a:extLst>
         </p:spPr>
@@ -8354,7 +8354,7 @@
           <a:effectLst/>
           <a:extLst>
             <a:ext uri="{C572A759-6A51-4108-AA02-DFA0A04FC94B}">
-              <ma14:wrappingTextBoxFlag xmlns:lc="http://schemas.openxmlformats.org/drawingml/2006/lockedCanvas" xmlns:ma14="http://schemas.microsoft.com/office/mac/drawingml/2011/main" xmlns:a14="http://schemas.microsoft.com/office/drawing/2010/main" xmlns:m="http://schemas.openxmlformats.org/officeDocument/2006/math" xmlns="" val="1"/>
+              <ma14:wrappingTextBoxFlag xmlns="" xmlns:m="http://schemas.openxmlformats.org/officeDocument/2006/math" xmlns:a14="http://schemas.microsoft.com/office/drawing/2010/main" xmlns:ma14="http://schemas.microsoft.com/office/mac/drawingml/2011/main" xmlns:lc="http://schemas.openxmlformats.org/drawingml/2006/lockedCanvas" val="1"/>
             </a:ext>
           </a:extLst>
         </p:spPr>
@@ -8736,7 +8736,7 @@
           <a:effectLst/>
           <a:extLst>
             <a:ext uri="{C572A759-6A51-4108-AA02-DFA0A04FC94B}">
-              <ma14:wrappingTextBoxFlag xmlns="" xmlns:m="http://schemas.openxmlformats.org/officeDocument/2006/math" xmlns:a14="http://schemas.microsoft.com/office/drawing/2010/main" xmlns:ma14="http://schemas.microsoft.com/office/mac/drawingml/2011/main" val="1"/>
+              <ma14:wrappingTextBoxFlag xmlns:ma14="http://schemas.microsoft.com/office/mac/drawingml/2011/main" xmlns:a14="http://schemas.microsoft.com/office/drawing/2010/main" xmlns:m="http://schemas.openxmlformats.org/officeDocument/2006/math" xmlns="" val="1"/>
             </a:ext>
           </a:extLst>
         </p:spPr>
@@ -9046,7 +9046,7 @@
           <a:effectLst/>
           <a:extLst>
             <a:ext uri="{C572A759-6A51-4108-AA02-DFA0A04FC94B}">
-              <ma14:wrappingTextBoxFlag xmlns="" xmlns:m="http://schemas.openxmlformats.org/officeDocument/2006/math" xmlns:a14="http://schemas.microsoft.com/office/drawing/2010/main" xmlns:ma14="http://schemas.microsoft.com/office/mac/drawingml/2011/main" val="1"/>
+              <ma14:wrappingTextBoxFlag xmlns:ma14="http://schemas.microsoft.com/office/mac/drawingml/2011/main" xmlns:a14="http://schemas.microsoft.com/office/drawing/2010/main" xmlns:m="http://schemas.openxmlformats.org/officeDocument/2006/math" xmlns="" val="1"/>
             </a:ext>
           </a:extLst>
         </p:spPr>
@@ -9196,10 +9196,10 @@
                 <a:latin typeface="Courier New" panose="02070309020205020404" pitchFamily="49" charset="0"/>
                 <a:cs typeface="Courier New" panose="02070309020205020404" pitchFamily="49" charset="0"/>
               </a:rPr>
-              <a:t>          units = '</a:t>
-            </a:r>
-            <a:r>
-              <a:rPr lang="nl-NL" sz="1000" dirty="0" err="1">
+              <a:t>          units </a:t>
+            </a:r>
+            <a:r>
+              <a:rPr lang="nl-NL" sz="1000">
                 <a:solidFill>
                   <a:schemeClr val="tx1">
                     <a:lumMod val="50000"/>
@@ -9208,7 +9208,7 @@
                 <a:latin typeface="Courier New" panose="02070309020205020404" pitchFamily="49" charset="0"/>
                 <a:cs typeface="Courier New" panose="02070309020205020404" pitchFamily="49" charset="0"/>
               </a:rPr>
-              <a:t>rows</a:t>
+              <a:t>= 'items</a:t>
             </a:r>
             <a:r>
               <a:rPr lang="nl-NL" sz="1000" dirty="0">
@@ -9312,7 +9312,7 @@
           <a:effectLst/>
           <a:extLst>
             <a:ext uri="{C572A759-6A51-4108-AA02-DFA0A04FC94B}">
-              <ma14:wrappingTextBoxFlag xmlns="" xmlns:m="http://schemas.openxmlformats.org/officeDocument/2006/math" xmlns:a14="http://schemas.microsoft.com/office/drawing/2010/main" xmlns:ma14="http://schemas.microsoft.com/office/mac/drawingml/2011/main" val="1"/>
+              <ma14:wrappingTextBoxFlag xmlns:ma14="http://schemas.microsoft.com/office/mac/drawingml/2011/main" xmlns:a14="http://schemas.microsoft.com/office/drawing/2010/main" xmlns:m="http://schemas.openxmlformats.org/officeDocument/2006/math" xmlns="" val="1"/>
             </a:ext>
           </a:extLst>
         </p:spPr>
@@ -9643,7 +9643,7 @@
           <a:effectLst/>
           <a:extLst>
             <a:ext uri="{C572A759-6A51-4108-AA02-DFA0A04FC94B}">
-              <ma14:wrappingTextBoxFlag xmlns="" xmlns:m="http://schemas.openxmlformats.org/officeDocument/2006/math" xmlns:a14="http://schemas.microsoft.com/office/drawing/2010/main" xmlns:ma14="http://schemas.microsoft.com/office/mac/drawingml/2011/main" val="1"/>
+              <ma14:wrappingTextBoxFlag xmlns:ma14="http://schemas.microsoft.com/office/mac/drawingml/2011/main" xmlns:a14="http://schemas.microsoft.com/office/drawing/2010/main" xmlns:m="http://schemas.openxmlformats.org/officeDocument/2006/math" xmlns="" val="1"/>
             </a:ext>
           </a:extLst>
         </p:spPr>
@@ -10110,7 +10110,7 @@
           </a:ln>
           <a:extLst>
             <a:ext uri="{C572A759-6A51-4108-AA02-DFA0A04FC94B}">
-              <ma14:wrappingTextBoxFlag xmlns="" xmlns:m="http://schemas.openxmlformats.org/officeDocument/2006/math" xmlns:a14="http://schemas.microsoft.com/office/drawing/2010/main" xmlns:ma14="http://schemas.microsoft.com/office/mac/drawingml/2011/main" val="1"/>
+              <ma14:wrappingTextBoxFlag xmlns:ma14="http://schemas.microsoft.com/office/mac/drawingml/2011/main" xmlns:a14="http://schemas.microsoft.com/office/drawing/2010/main" xmlns:m="http://schemas.openxmlformats.org/officeDocument/2006/math" xmlns="" val="1"/>
             </a:ext>
           </a:extLst>
         </p:spPr>
@@ -10174,7 +10174,7 @@
           </a:ln>
           <a:extLst>
             <a:ext uri="{C572A759-6A51-4108-AA02-DFA0A04FC94B}">
-              <ma14:wrappingTextBoxFlag xmlns="" xmlns:m="http://schemas.openxmlformats.org/officeDocument/2006/math" xmlns:a14="http://schemas.microsoft.com/office/drawing/2010/main" xmlns:ma14="http://schemas.microsoft.com/office/mac/drawingml/2011/main" val="1"/>
+              <ma14:wrappingTextBoxFlag xmlns:ma14="http://schemas.microsoft.com/office/mac/drawingml/2011/main" xmlns:a14="http://schemas.microsoft.com/office/drawing/2010/main" xmlns:m="http://schemas.openxmlformats.org/officeDocument/2006/math" xmlns="" val="1"/>
             </a:ext>
           </a:extLst>
         </p:spPr>
@@ -10598,7 +10598,7 @@
           </a:ln>
           <a:extLst>
             <a:ext uri="{C572A759-6A51-4108-AA02-DFA0A04FC94B}">
-              <ma14:wrappingTextBoxFlag xmlns="" xmlns:m="http://schemas.openxmlformats.org/officeDocument/2006/math" xmlns:a14="http://schemas.microsoft.com/office/drawing/2010/main" xmlns:ma14="http://schemas.microsoft.com/office/mac/drawingml/2011/main" val="1"/>
+              <ma14:wrappingTextBoxFlag xmlns:ma14="http://schemas.microsoft.com/office/mac/drawingml/2011/main" xmlns:a14="http://schemas.microsoft.com/office/drawing/2010/main" xmlns:m="http://schemas.openxmlformats.org/officeDocument/2006/math" xmlns="" val="1"/>
             </a:ext>
           </a:extLst>
         </p:spPr>
@@ -10662,7 +10662,7 @@
           </a:ln>
           <a:extLst>
             <a:ext uri="{C572A759-6A51-4108-AA02-DFA0A04FC94B}">
-              <ma14:wrappingTextBoxFlag xmlns="" xmlns:m="http://schemas.openxmlformats.org/officeDocument/2006/math" xmlns:a14="http://schemas.microsoft.com/office/drawing/2010/main" xmlns:ma14="http://schemas.microsoft.com/office/mac/drawingml/2011/main" val="1"/>
+              <ma14:wrappingTextBoxFlag xmlns:ma14="http://schemas.microsoft.com/office/mac/drawingml/2011/main" xmlns:a14="http://schemas.microsoft.com/office/drawing/2010/main" xmlns:m="http://schemas.openxmlformats.org/officeDocument/2006/math" xmlns="" val="1"/>
             </a:ext>
           </a:extLst>
         </p:spPr>

</xml_diff>

<commit_message>
Built site for jfa: 0.6.0@4f93cf4
</commit_message>
<xml_diff>
--- a/reference/figures/cheatsheet/cheatsheet.pptx
+++ b/reference/figures/cheatsheet/cheatsheet.pptx
@@ -633,12 +633,12 @@
   <pc:docChgLst>
     <pc:chgData name="Derks, Koen" userId="42903d96-be75-4cec-9136-f3710e86cd30" providerId="ADAL" clId="{B2C99C48-803B-45C3-BEC8-064BF2898A74}"/>
     <pc:docChg chg="custSel modSld">
-      <pc:chgData name="Derks, Koen" userId="42903d96-be75-4cec-9136-f3710e86cd30" providerId="ADAL" clId="{B2C99C48-803B-45C3-BEC8-064BF2898A74}" dt="2021-09-17T16:30:22.742" v="47"/>
+      <pc:chgData name="Derks, Koen" userId="42903d96-be75-4cec-9136-f3710e86cd30" providerId="ADAL" clId="{B2C99C48-803B-45C3-BEC8-064BF2898A74}" dt="2021-09-18T11:38:05.739" v="101"/>
       <pc:docMkLst>
         <pc:docMk/>
       </pc:docMkLst>
       <pc:sldChg chg="modSp mod">
-        <pc:chgData name="Derks, Koen" userId="42903d96-be75-4cec-9136-f3710e86cd30" providerId="ADAL" clId="{B2C99C48-803B-45C3-BEC8-064BF2898A74}" dt="2021-09-17T16:30:22.742" v="47"/>
+        <pc:chgData name="Derks, Koen" userId="42903d96-be75-4cec-9136-f3710e86cd30" providerId="ADAL" clId="{B2C99C48-803B-45C3-BEC8-064BF2898A74}" dt="2021-09-18T11:38:05.739" v="101"/>
         <pc:sldMkLst>
           <pc:docMk/>
           <pc:sldMk cId="0" sldId="257"/>
@@ -657,6 +657,14 @@
             <pc:docMk/>
             <pc:sldMk cId="0" sldId="257"/>
             <ac:spMk id="144" creationId="{9AF2C0F0-B69F-45A7-9DB4-1D7962C71414}"/>
+          </ac:spMkLst>
+        </pc:spChg>
+        <pc:spChg chg="mod">
+          <ac:chgData name="Derks, Koen" userId="42903d96-be75-4cec-9136-f3710e86cd30" providerId="ADAL" clId="{B2C99C48-803B-45C3-BEC8-064BF2898A74}" dt="2021-09-18T11:38:05.739" v="101"/>
+          <ac:spMkLst>
+            <pc:docMk/>
+            <pc:sldMk cId="0" sldId="257"/>
+            <ac:spMk id="145" creationId="{130E5FF5-89E1-42AE-84ED-37821A67F183}"/>
           </ac:spMkLst>
         </pc:spChg>
         <pc:spChg chg="mod">
@@ -2703,7 +2711,7 @@
           </a:ln>
           <a:extLst>
             <a:ext uri="{C572A759-6A51-4108-AA02-DFA0A04FC94B}">
-              <ma14:wrappingTextBoxFlag xmlns:ma14="http://schemas.microsoft.com/office/mac/drawingml/2011/main" xmlns:a14="http://schemas.microsoft.com/office/drawing/2010/main" xmlns:m="http://schemas.openxmlformats.org/officeDocument/2006/math" xmlns="" val="1"/>
+              <ma14:wrappingTextBoxFlag xmlns="" xmlns:m="http://schemas.openxmlformats.org/officeDocument/2006/math" xmlns:a14="http://schemas.microsoft.com/office/drawing/2010/main" xmlns:ma14="http://schemas.microsoft.com/office/mac/drawingml/2011/main" val="1"/>
             </a:ext>
           </a:extLst>
         </p:spPr>
@@ -2742,7 +2750,7 @@
           </a:ln>
           <a:extLst>
             <a:ext uri="{C572A759-6A51-4108-AA02-DFA0A04FC94B}">
-              <ma14:wrappingTextBoxFlag xmlns:ma14="http://schemas.microsoft.com/office/mac/drawingml/2011/main" xmlns:a14="http://schemas.microsoft.com/office/drawing/2010/main" xmlns:m="http://schemas.openxmlformats.org/officeDocument/2006/math" xmlns="" val="1"/>
+              <ma14:wrappingTextBoxFlag xmlns="" xmlns:m="http://schemas.openxmlformats.org/officeDocument/2006/math" xmlns:a14="http://schemas.microsoft.com/office/drawing/2010/main" xmlns:ma14="http://schemas.microsoft.com/office/mac/drawingml/2011/main" val="1"/>
             </a:ext>
           </a:extLst>
         </p:spPr>
@@ -3835,7 +3843,7 @@
           </a:ln>
           <a:extLst>
             <a:ext uri="{C572A759-6A51-4108-AA02-DFA0A04FC94B}">
-              <ma14:wrappingTextBoxFlag xmlns:ma14="http://schemas.microsoft.com/office/mac/drawingml/2011/main" xmlns:a14="http://schemas.microsoft.com/office/drawing/2010/main" xmlns:m="http://schemas.openxmlformats.org/officeDocument/2006/math" xmlns="" val="1"/>
+              <ma14:wrappingTextBoxFlag xmlns="" xmlns:m="http://schemas.openxmlformats.org/officeDocument/2006/math" xmlns:a14="http://schemas.microsoft.com/office/drawing/2010/main" xmlns:ma14="http://schemas.microsoft.com/office/mac/drawingml/2011/main" val="1"/>
             </a:ext>
           </a:extLst>
         </p:spPr>
@@ -3888,7 +3896,7 @@
           </a:ln>
           <a:extLst>
             <a:ext uri="{C572A759-6A51-4108-AA02-DFA0A04FC94B}">
-              <ma14:wrappingTextBoxFlag xmlns:ma14="http://schemas.microsoft.com/office/mac/drawingml/2011/main" xmlns:a14="http://schemas.microsoft.com/office/drawing/2010/main" xmlns:m="http://schemas.openxmlformats.org/officeDocument/2006/math" xmlns="" val="1"/>
+              <ma14:wrappingTextBoxFlag xmlns="" xmlns:m="http://schemas.openxmlformats.org/officeDocument/2006/math" xmlns:a14="http://schemas.microsoft.com/office/drawing/2010/main" xmlns:ma14="http://schemas.microsoft.com/office/mac/drawingml/2011/main" val="1"/>
             </a:ext>
           </a:extLst>
         </p:spPr>
@@ -4054,7 +4062,7 @@
           </a:ln>
           <a:extLst>
             <a:ext uri="{C572A759-6A51-4108-AA02-DFA0A04FC94B}">
-              <ma14:wrappingTextBoxFlag xmlns:ma14="http://schemas.microsoft.com/office/mac/drawingml/2011/main" xmlns:a14="http://schemas.microsoft.com/office/drawing/2010/main" xmlns:m="http://schemas.openxmlformats.org/officeDocument/2006/math" xmlns="" val="1"/>
+              <ma14:wrappingTextBoxFlag xmlns="" xmlns:m="http://schemas.openxmlformats.org/officeDocument/2006/math" xmlns:a14="http://schemas.microsoft.com/office/drawing/2010/main" xmlns:ma14="http://schemas.microsoft.com/office/mac/drawingml/2011/main" val="1"/>
             </a:ext>
           </a:extLst>
         </p:spPr>
@@ -4541,7 +4549,7 @@
           </a:ln>
           <a:extLst>
             <a:ext uri="{C572A759-6A51-4108-AA02-DFA0A04FC94B}">
-              <ma14:wrappingTextBoxFlag xmlns:ma14="http://schemas.microsoft.com/office/mac/drawingml/2011/main" xmlns:a14="http://schemas.microsoft.com/office/drawing/2010/main" xmlns:m="http://schemas.openxmlformats.org/officeDocument/2006/math" xmlns="" val="1"/>
+              <ma14:wrappingTextBoxFlag xmlns="" xmlns:m="http://schemas.openxmlformats.org/officeDocument/2006/math" xmlns:a14="http://schemas.microsoft.com/office/drawing/2010/main" xmlns:ma14="http://schemas.microsoft.com/office/mac/drawingml/2011/main" val="1"/>
             </a:ext>
           </a:extLst>
         </p:spPr>
@@ -4751,7 +4759,7 @@
           <a:effectLst/>
           <a:extLst>
             <a:ext uri="{C572A759-6A51-4108-AA02-DFA0A04FC94B}">
-              <ma14:wrappingTextBoxFlag xmlns:ma14="http://schemas.microsoft.com/office/mac/drawingml/2011/main" xmlns:a14="http://schemas.microsoft.com/office/drawing/2010/main" xmlns:m="http://schemas.openxmlformats.org/officeDocument/2006/math" xmlns="" val="1"/>
+              <ma14:wrappingTextBoxFlag xmlns="" xmlns:m="http://schemas.openxmlformats.org/officeDocument/2006/math" xmlns:a14="http://schemas.microsoft.com/office/drawing/2010/main" xmlns:ma14="http://schemas.microsoft.com/office/mac/drawingml/2011/main" val="1"/>
             </a:ext>
           </a:extLst>
         </p:spPr>
@@ -4930,7 +4938,7 @@
           </a:ln>
           <a:extLst>
             <a:ext uri="{C572A759-6A51-4108-AA02-DFA0A04FC94B}">
-              <ma14:wrappingTextBoxFlag xmlns:ma14="http://schemas.microsoft.com/office/mac/drawingml/2011/main" xmlns:a14="http://schemas.microsoft.com/office/drawing/2010/main" xmlns:m="http://schemas.openxmlformats.org/officeDocument/2006/math" xmlns="" val="1"/>
+              <ma14:wrappingTextBoxFlag xmlns="" xmlns:m="http://schemas.openxmlformats.org/officeDocument/2006/math" xmlns:a14="http://schemas.microsoft.com/office/drawing/2010/main" xmlns:ma14="http://schemas.microsoft.com/office/mac/drawingml/2011/main" val="1"/>
             </a:ext>
           </a:extLst>
         </p:spPr>
@@ -5097,7 +5105,7 @@
           <a:effectLst/>
           <a:extLst>
             <a:ext uri="{C572A759-6A51-4108-AA02-DFA0A04FC94B}">
-              <ma14:wrappingTextBoxFlag xmlns="" xmlns:m="http://schemas.openxmlformats.org/officeDocument/2006/math" xmlns:a14="http://schemas.microsoft.com/office/drawing/2010/main" xmlns:ma14="http://schemas.microsoft.com/office/mac/drawingml/2011/main" xmlns:lc="http://schemas.openxmlformats.org/drawingml/2006/lockedCanvas" val="1"/>
+              <ma14:wrappingTextBoxFlag xmlns:lc="http://schemas.openxmlformats.org/drawingml/2006/lockedCanvas" xmlns:ma14="http://schemas.microsoft.com/office/mac/drawingml/2011/main" xmlns:a14="http://schemas.microsoft.com/office/drawing/2010/main" xmlns:m="http://schemas.openxmlformats.org/officeDocument/2006/math" xmlns="" val="1"/>
             </a:ext>
           </a:extLst>
         </p:spPr>
@@ -5591,7 +5599,7 @@
           </a:ln>
           <a:extLst>
             <a:ext uri="{C572A759-6A51-4108-AA02-DFA0A04FC94B}">
-              <ma14:wrappingTextBoxFlag xmlns:ma14="http://schemas.microsoft.com/office/mac/drawingml/2011/main" xmlns:a14="http://schemas.microsoft.com/office/drawing/2010/main" xmlns:m="http://schemas.openxmlformats.org/officeDocument/2006/math" xmlns="" val="1"/>
+              <ma14:wrappingTextBoxFlag xmlns="" xmlns:m="http://schemas.openxmlformats.org/officeDocument/2006/math" xmlns:a14="http://schemas.microsoft.com/office/drawing/2010/main" xmlns:ma14="http://schemas.microsoft.com/office/mac/drawingml/2011/main" val="1"/>
             </a:ext>
           </a:extLst>
         </p:spPr>
@@ -5844,7 +5852,7 @@
           </a:ln>
           <a:extLst>
             <a:ext uri="{C572A759-6A51-4108-AA02-DFA0A04FC94B}">
-              <ma14:wrappingTextBoxFlag xmlns:ma14="http://schemas.microsoft.com/office/mac/drawingml/2011/main" xmlns:a14="http://schemas.microsoft.com/office/drawing/2010/main" xmlns:m="http://schemas.openxmlformats.org/officeDocument/2006/math" xmlns="" val="1"/>
+              <ma14:wrappingTextBoxFlag xmlns="" xmlns:m="http://schemas.openxmlformats.org/officeDocument/2006/math" xmlns:a14="http://schemas.microsoft.com/office/drawing/2010/main" xmlns:ma14="http://schemas.microsoft.com/office/mac/drawingml/2011/main" val="1"/>
             </a:ext>
           </a:extLst>
         </p:spPr>
@@ -5908,7 +5916,7 @@
           <a:effectLst/>
           <a:extLst>
             <a:ext uri="{C572A759-6A51-4108-AA02-DFA0A04FC94B}">
-              <ma14:wrappingTextBoxFlag xmlns="" xmlns:m="http://schemas.openxmlformats.org/officeDocument/2006/math" xmlns:a14="http://schemas.microsoft.com/office/drawing/2010/main" xmlns:ma14="http://schemas.microsoft.com/office/mac/drawingml/2011/main" xmlns:lc="http://schemas.openxmlformats.org/drawingml/2006/lockedCanvas" val="1"/>
+              <ma14:wrappingTextBoxFlag xmlns:lc="http://schemas.openxmlformats.org/drawingml/2006/lockedCanvas" xmlns:ma14="http://schemas.microsoft.com/office/mac/drawingml/2011/main" xmlns:a14="http://schemas.microsoft.com/office/drawing/2010/main" xmlns:m="http://schemas.openxmlformats.org/officeDocument/2006/math" xmlns="" val="1"/>
             </a:ext>
           </a:extLst>
         </p:spPr>
@@ -6376,7 +6384,7 @@
           </a:ln>
           <a:extLst>
             <a:ext uri="{C572A759-6A51-4108-AA02-DFA0A04FC94B}">
-              <ma14:wrappingTextBoxFlag xmlns:ma14="http://schemas.microsoft.com/office/mac/drawingml/2011/main" xmlns:a14="http://schemas.microsoft.com/office/drawing/2010/main" xmlns:m="http://schemas.openxmlformats.org/officeDocument/2006/math" xmlns="" val="1"/>
+              <ma14:wrappingTextBoxFlag xmlns="" xmlns:m="http://schemas.openxmlformats.org/officeDocument/2006/math" xmlns:a14="http://schemas.microsoft.com/office/drawing/2010/main" xmlns:ma14="http://schemas.microsoft.com/office/mac/drawingml/2011/main" val="1"/>
             </a:ext>
           </a:extLst>
         </p:spPr>
@@ -6509,7 +6517,7 @@
           </a:ln>
           <a:extLst>
             <a:ext uri="{C572A759-6A51-4108-AA02-DFA0A04FC94B}">
-              <ma14:wrappingTextBoxFlag xmlns:ma14="http://schemas.microsoft.com/office/mac/drawingml/2011/main" xmlns:a14="http://schemas.microsoft.com/office/drawing/2010/main" xmlns:m="http://schemas.openxmlformats.org/officeDocument/2006/math" xmlns="" val="1"/>
+              <ma14:wrappingTextBoxFlag xmlns="" xmlns:m="http://schemas.openxmlformats.org/officeDocument/2006/math" xmlns:a14="http://schemas.microsoft.com/office/drawing/2010/main" xmlns:ma14="http://schemas.microsoft.com/office/mac/drawingml/2011/main" val="1"/>
             </a:ext>
           </a:extLst>
         </p:spPr>
@@ -6670,7 +6678,7 @@
           <a:effectLst/>
           <a:extLst>
             <a:ext uri="{C572A759-6A51-4108-AA02-DFA0A04FC94B}">
-              <ma14:wrappingTextBoxFlag xmlns="" xmlns:m="http://schemas.openxmlformats.org/officeDocument/2006/math" xmlns:a14="http://schemas.microsoft.com/office/drawing/2010/main" xmlns:ma14="http://schemas.microsoft.com/office/mac/drawingml/2011/main" xmlns:lc="http://schemas.openxmlformats.org/drawingml/2006/lockedCanvas" val="1"/>
+              <ma14:wrappingTextBoxFlag xmlns:lc="http://schemas.openxmlformats.org/drawingml/2006/lockedCanvas" xmlns:ma14="http://schemas.microsoft.com/office/mac/drawingml/2011/main" xmlns:a14="http://schemas.microsoft.com/office/drawing/2010/main" xmlns:m="http://schemas.openxmlformats.org/officeDocument/2006/math" xmlns="" val="1"/>
             </a:ext>
           </a:extLst>
         </p:spPr>
@@ -7164,7 +7172,7 @@
           </a:ln>
           <a:extLst>
             <a:ext uri="{C572A759-6A51-4108-AA02-DFA0A04FC94B}">
-              <ma14:wrappingTextBoxFlag xmlns:ma14="http://schemas.microsoft.com/office/mac/drawingml/2011/main" xmlns:a14="http://schemas.microsoft.com/office/drawing/2010/main" xmlns:m="http://schemas.openxmlformats.org/officeDocument/2006/math" xmlns="" val="1"/>
+              <ma14:wrappingTextBoxFlag xmlns="" xmlns:m="http://schemas.openxmlformats.org/officeDocument/2006/math" xmlns:a14="http://schemas.microsoft.com/office/drawing/2010/main" xmlns:ma14="http://schemas.microsoft.com/office/mac/drawingml/2011/main" val="1"/>
             </a:ext>
           </a:extLst>
         </p:spPr>
@@ -7503,7 +7511,7 @@
           </a:ln>
           <a:extLst>
             <a:ext uri="{C572A759-6A51-4108-AA02-DFA0A04FC94B}">
-              <ma14:wrappingTextBoxFlag xmlns:ma14="http://schemas.microsoft.com/office/mac/drawingml/2011/main" xmlns:a14="http://schemas.microsoft.com/office/drawing/2010/main" xmlns:m="http://schemas.openxmlformats.org/officeDocument/2006/math" xmlns="" val="1"/>
+              <ma14:wrappingTextBoxFlag xmlns="" xmlns:m="http://schemas.openxmlformats.org/officeDocument/2006/math" xmlns:a14="http://schemas.microsoft.com/office/drawing/2010/main" xmlns:ma14="http://schemas.microsoft.com/office/mac/drawingml/2011/main" val="1"/>
             </a:ext>
           </a:extLst>
         </p:spPr>
@@ -7634,7 +7642,7 @@
           <a:effectLst/>
           <a:extLst>
             <a:ext uri="{C572A759-6A51-4108-AA02-DFA0A04FC94B}">
-              <ma14:wrappingTextBoxFlag xmlns="" xmlns:m="http://schemas.openxmlformats.org/officeDocument/2006/math" xmlns:a14="http://schemas.microsoft.com/office/drawing/2010/main" xmlns:ma14="http://schemas.microsoft.com/office/mac/drawingml/2011/main" xmlns:lc="http://schemas.openxmlformats.org/drawingml/2006/lockedCanvas" val="1"/>
+              <ma14:wrappingTextBoxFlag xmlns:lc="http://schemas.openxmlformats.org/drawingml/2006/lockedCanvas" xmlns:ma14="http://schemas.microsoft.com/office/mac/drawingml/2011/main" xmlns:a14="http://schemas.microsoft.com/office/drawing/2010/main" xmlns:m="http://schemas.openxmlformats.org/officeDocument/2006/math" xmlns="" val="1"/>
             </a:ext>
           </a:extLst>
         </p:spPr>
@@ -8128,7 +8136,7 @@
           </a:ln>
           <a:extLst>
             <a:ext uri="{C572A759-6A51-4108-AA02-DFA0A04FC94B}">
-              <ma14:wrappingTextBoxFlag xmlns:ma14="http://schemas.microsoft.com/office/mac/drawingml/2011/main" xmlns:a14="http://schemas.microsoft.com/office/drawing/2010/main" xmlns:m="http://schemas.openxmlformats.org/officeDocument/2006/math" xmlns="" val="1"/>
+              <ma14:wrappingTextBoxFlag xmlns="" xmlns:m="http://schemas.openxmlformats.org/officeDocument/2006/math" xmlns:a14="http://schemas.microsoft.com/office/drawing/2010/main" xmlns:ma14="http://schemas.microsoft.com/office/mac/drawingml/2011/main" val="1"/>
             </a:ext>
           </a:extLst>
         </p:spPr>
@@ -8243,7 +8251,7 @@
           </a:ln>
           <a:extLst>
             <a:ext uri="{C572A759-6A51-4108-AA02-DFA0A04FC94B}">
-              <ma14:wrappingTextBoxFlag xmlns:ma14="http://schemas.microsoft.com/office/mac/drawingml/2011/main" xmlns:a14="http://schemas.microsoft.com/office/drawing/2010/main" xmlns:m="http://schemas.openxmlformats.org/officeDocument/2006/math" xmlns="" val="1"/>
+              <ma14:wrappingTextBoxFlag xmlns="" xmlns:m="http://schemas.openxmlformats.org/officeDocument/2006/math" xmlns:a14="http://schemas.microsoft.com/office/drawing/2010/main" xmlns:ma14="http://schemas.microsoft.com/office/mac/drawingml/2011/main" val="1"/>
             </a:ext>
           </a:extLst>
         </p:spPr>
@@ -8354,7 +8362,7 @@
           <a:effectLst/>
           <a:extLst>
             <a:ext uri="{C572A759-6A51-4108-AA02-DFA0A04FC94B}">
-              <ma14:wrappingTextBoxFlag xmlns="" xmlns:m="http://schemas.openxmlformats.org/officeDocument/2006/math" xmlns:a14="http://schemas.microsoft.com/office/drawing/2010/main" xmlns:ma14="http://schemas.microsoft.com/office/mac/drawingml/2011/main" xmlns:lc="http://schemas.openxmlformats.org/drawingml/2006/lockedCanvas" val="1"/>
+              <ma14:wrappingTextBoxFlag xmlns:lc="http://schemas.openxmlformats.org/drawingml/2006/lockedCanvas" xmlns:ma14="http://schemas.microsoft.com/office/mac/drawingml/2011/main" xmlns:a14="http://schemas.microsoft.com/office/drawing/2010/main" xmlns:m="http://schemas.openxmlformats.org/officeDocument/2006/math" xmlns="" val="1"/>
             </a:ext>
           </a:extLst>
         </p:spPr>
@@ -8736,7 +8744,7 @@
           <a:effectLst/>
           <a:extLst>
             <a:ext uri="{C572A759-6A51-4108-AA02-DFA0A04FC94B}">
-              <ma14:wrappingTextBoxFlag xmlns:ma14="http://schemas.microsoft.com/office/mac/drawingml/2011/main" xmlns:a14="http://schemas.microsoft.com/office/drawing/2010/main" xmlns:m="http://schemas.openxmlformats.org/officeDocument/2006/math" xmlns="" val="1"/>
+              <ma14:wrappingTextBoxFlag xmlns="" xmlns:m="http://schemas.openxmlformats.org/officeDocument/2006/math" xmlns:a14="http://schemas.microsoft.com/office/drawing/2010/main" xmlns:ma14="http://schemas.microsoft.com/office/mac/drawingml/2011/main" val="1"/>
             </a:ext>
           </a:extLst>
         </p:spPr>
@@ -9046,7 +9054,7 @@
           <a:effectLst/>
           <a:extLst>
             <a:ext uri="{C572A759-6A51-4108-AA02-DFA0A04FC94B}">
-              <ma14:wrappingTextBoxFlag xmlns:ma14="http://schemas.microsoft.com/office/mac/drawingml/2011/main" xmlns:a14="http://schemas.microsoft.com/office/drawing/2010/main" xmlns:m="http://schemas.openxmlformats.org/officeDocument/2006/math" xmlns="" val="1"/>
+              <ma14:wrappingTextBoxFlag xmlns="" xmlns:m="http://schemas.openxmlformats.org/officeDocument/2006/math" xmlns:a14="http://schemas.microsoft.com/office/drawing/2010/main" xmlns:ma14="http://schemas.microsoft.com/office/mac/drawingml/2011/main" val="1"/>
             </a:ext>
           </a:extLst>
         </p:spPr>
@@ -9196,31 +9204,7 @@
                 <a:latin typeface="Courier New" panose="02070309020205020404" pitchFamily="49" charset="0"/>
                 <a:cs typeface="Courier New" panose="02070309020205020404" pitchFamily="49" charset="0"/>
               </a:rPr>
-              <a:t>          units </a:t>
-            </a:r>
-            <a:r>
-              <a:rPr lang="nl-NL" sz="1000">
-                <a:solidFill>
-                  <a:schemeClr val="tx1">
-                    <a:lumMod val="50000"/>
-                  </a:schemeClr>
-                </a:solidFill>
-                <a:latin typeface="Courier New" panose="02070309020205020404" pitchFamily="49" charset="0"/>
-                <a:cs typeface="Courier New" panose="02070309020205020404" pitchFamily="49" charset="0"/>
-              </a:rPr>
-              <a:t>= 'items</a:t>
-            </a:r>
-            <a:r>
-              <a:rPr lang="nl-NL" sz="1000" dirty="0">
-                <a:solidFill>
-                  <a:schemeClr val="tx1">
-                    <a:lumMod val="50000"/>
-                  </a:schemeClr>
-                </a:solidFill>
-                <a:latin typeface="Courier New" panose="02070309020205020404" pitchFamily="49" charset="0"/>
-                <a:cs typeface="Courier New" panose="02070309020205020404" pitchFamily="49" charset="0"/>
-              </a:rPr>
-              <a:t>',</a:t>
+              <a:t>          units = 'items',</a:t>
             </a:r>
           </a:p>
           <a:p>
@@ -9291,8 +9275,8 @@
         </p:nvSpPr>
         <p:spPr>
           <a:xfrm>
-            <a:off x="10503567" y="7415590"/>
-            <a:ext cx="3143103" cy="1033536"/>
+            <a:off x="10503567" y="7414846"/>
+            <a:ext cx="3143103" cy="1187424"/>
           </a:xfrm>
           <a:prstGeom prst="rect">
             <a:avLst/>
@@ -9312,7 +9296,7 @@
           <a:effectLst/>
           <a:extLst>
             <a:ext uri="{C572A759-6A51-4108-AA02-DFA0A04FC94B}">
-              <ma14:wrappingTextBoxFlag xmlns:ma14="http://schemas.microsoft.com/office/mac/drawingml/2011/main" xmlns:a14="http://schemas.microsoft.com/office/drawing/2010/main" xmlns:m="http://schemas.openxmlformats.org/officeDocument/2006/math" xmlns="" val="1"/>
+              <ma14:wrappingTextBoxFlag xmlns="" xmlns:m="http://schemas.openxmlformats.org/officeDocument/2006/math" xmlns:a14="http://schemas.microsoft.com/office/drawing/2010/main" xmlns:ma14="http://schemas.microsoft.com/office/mac/drawingml/2011/main" val="1"/>
             </a:ext>
           </a:extLst>
         </p:spPr>
@@ -9459,6 +9443,82 @@
                 <a:cs typeface="Courier New" panose="02070309020205020404" pitchFamily="49" charset="0"/>
               </a:rPr>
               <a:t>',</a:t>
+            </a:r>
+          </a:p>
+          <a:p>
+            <a:pPr>
+              <a:spcBef>
+                <a:spcPts val="0"/>
+              </a:spcBef>
+              <a:defRPr b="0">
+                <a:solidFill>
+                  <a:srgbClr val="000000"/>
+                </a:solidFill>
+                <a:latin typeface="Menlo"/>
+                <a:ea typeface="Menlo"/>
+                <a:cs typeface="Menlo"/>
+                <a:sym typeface="Menlo"/>
+              </a:defRPr>
+            </a:pPr>
+            <a:r>
+              <a:rPr lang="nl-NL" sz="1000" dirty="0">
+                <a:solidFill>
+                  <a:schemeClr val="tx1">
+                    <a:lumMod val="50000"/>
+                  </a:schemeClr>
+                </a:solidFill>
+                <a:latin typeface="Courier New" panose="02070309020205020404" pitchFamily="49" charset="0"/>
+                <a:cs typeface="Courier New" panose="02070309020205020404" pitchFamily="49" charset="0"/>
+              </a:rPr>
+              <a:t>           </a:t>
+            </a:r>
+            <a:r>
+              <a:rPr lang="nl-NL" sz="1000" dirty="0" err="1">
+                <a:solidFill>
+                  <a:schemeClr val="tx1">
+                    <a:lumMod val="50000"/>
+                  </a:schemeClr>
+                </a:solidFill>
+                <a:latin typeface="Courier New" panose="02070309020205020404" pitchFamily="49" charset="0"/>
+                <a:cs typeface="Courier New" panose="02070309020205020404" pitchFamily="49" charset="0"/>
+              </a:rPr>
+              <a:t>alternative</a:t>
+            </a:r>
+            <a:r>
+              <a:rPr lang="nl-NL" sz="1000" dirty="0">
+                <a:solidFill>
+                  <a:schemeClr val="tx1">
+                    <a:lumMod val="50000"/>
+                  </a:schemeClr>
+                </a:solidFill>
+                <a:latin typeface="Courier New" panose="02070309020205020404" pitchFamily="49" charset="0"/>
+                <a:cs typeface="Courier New" panose="02070309020205020404" pitchFamily="49" charset="0"/>
+              </a:rPr>
+              <a:t> = '</a:t>
+            </a:r>
+            <a:r>
+              <a:rPr lang="nl-NL" sz="1000" dirty="0" err="1">
+                <a:solidFill>
+                  <a:schemeClr val="tx1">
+                    <a:lumMod val="50000"/>
+                  </a:schemeClr>
+                </a:solidFill>
+                <a:latin typeface="Courier New" panose="02070309020205020404" pitchFamily="49" charset="0"/>
+                <a:cs typeface="Courier New" panose="02070309020205020404" pitchFamily="49" charset="0"/>
+              </a:rPr>
+              <a:t>less</a:t>
+            </a:r>
+            <a:r>
+              <a:rPr lang="nl-NL" sz="1000" dirty="0">
+                <a:solidFill>
+                  <a:schemeClr val="tx1">
+                    <a:lumMod val="50000"/>
+                  </a:schemeClr>
+                </a:solidFill>
+                <a:latin typeface="Courier New" panose="02070309020205020404" pitchFamily="49" charset="0"/>
+                <a:cs typeface="Courier New" panose="02070309020205020404" pitchFamily="49" charset="0"/>
+              </a:rPr>
+              <a:t>’,</a:t>
             </a:r>
           </a:p>
           <a:p>
@@ -9643,7 +9703,7 @@
           <a:effectLst/>
           <a:extLst>
             <a:ext uri="{C572A759-6A51-4108-AA02-DFA0A04FC94B}">
-              <ma14:wrappingTextBoxFlag xmlns:ma14="http://schemas.microsoft.com/office/mac/drawingml/2011/main" xmlns:a14="http://schemas.microsoft.com/office/drawing/2010/main" xmlns:m="http://schemas.openxmlformats.org/officeDocument/2006/math" xmlns="" val="1"/>
+              <ma14:wrappingTextBoxFlag xmlns="" xmlns:m="http://schemas.openxmlformats.org/officeDocument/2006/math" xmlns:a14="http://schemas.microsoft.com/office/drawing/2010/main" xmlns:ma14="http://schemas.microsoft.com/office/mac/drawingml/2011/main" val="1"/>
             </a:ext>
           </a:extLst>
         </p:spPr>
@@ -10110,7 +10170,7 @@
           </a:ln>
           <a:extLst>
             <a:ext uri="{C572A759-6A51-4108-AA02-DFA0A04FC94B}">
-              <ma14:wrappingTextBoxFlag xmlns:ma14="http://schemas.microsoft.com/office/mac/drawingml/2011/main" xmlns:a14="http://schemas.microsoft.com/office/drawing/2010/main" xmlns:m="http://schemas.openxmlformats.org/officeDocument/2006/math" xmlns="" val="1"/>
+              <ma14:wrappingTextBoxFlag xmlns="" xmlns:m="http://schemas.openxmlformats.org/officeDocument/2006/math" xmlns:a14="http://schemas.microsoft.com/office/drawing/2010/main" xmlns:ma14="http://schemas.microsoft.com/office/mac/drawingml/2011/main" val="1"/>
             </a:ext>
           </a:extLst>
         </p:spPr>
@@ -10174,7 +10234,7 @@
           </a:ln>
           <a:extLst>
             <a:ext uri="{C572A759-6A51-4108-AA02-DFA0A04FC94B}">
-              <ma14:wrappingTextBoxFlag xmlns:ma14="http://schemas.microsoft.com/office/mac/drawingml/2011/main" xmlns:a14="http://schemas.microsoft.com/office/drawing/2010/main" xmlns:m="http://schemas.openxmlformats.org/officeDocument/2006/math" xmlns="" val="1"/>
+              <ma14:wrappingTextBoxFlag xmlns="" xmlns:m="http://schemas.openxmlformats.org/officeDocument/2006/math" xmlns:a14="http://schemas.microsoft.com/office/drawing/2010/main" xmlns:ma14="http://schemas.microsoft.com/office/mac/drawingml/2011/main" val="1"/>
             </a:ext>
           </a:extLst>
         </p:spPr>
@@ -10598,7 +10658,7 @@
           </a:ln>
           <a:extLst>
             <a:ext uri="{C572A759-6A51-4108-AA02-DFA0A04FC94B}">
-              <ma14:wrappingTextBoxFlag xmlns:ma14="http://schemas.microsoft.com/office/mac/drawingml/2011/main" xmlns:a14="http://schemas.microsoft.com/office/drawing/2010/main" xmlns:m="http://schemas.openxmlformats.org/officeDocument/2006/math" xmlns="" val="1"/>
+              <ma14:wrappingTextBoxFlag xmlns="" xmlns:m="http://schemas.openxmlformats.org/officeDocument/2006/math" xmlns:a14="http://schemas.microsoft.com/office/drawing/2010/main" xmlns:ma14="http://schemas.microsoft.com/office/mac/drawingml/2011/main" val="1"/>
             </a:ext>
           </a:extLst>
         </p:spPr>
@@ -10662,7 +10722,7 @@
           </a:ln>
           <a:extLst>
             <a:ext uri="{C572A759-6A51-4108-AA02-DFA0A04FC94B}">
-              <ma14:wrappingTextBoxFlag xmlns:ma14="http://schemas.microsoft.com/office/mac/drawingml/2011/main" xmlns:a14="http://schemas.microsoft.com/office/drawing/2010/main" xmlns:m="http://schemas.openxmlformats.org/officeDocument/2006/math" xmlns="" val="1"/>
+              <ma14:wrappingTextBoxFlag xmlns="" xmlns:m="http://schemas.openxmlformats.org/officeDocument/2006/math" xmlns:a14="http://schemas.microsoft.com/office/drawing/2010/main" xmlns:ma14="http://schemas.microsoft.com/office/mac/drawingml/2011/main" val="1"/>
             </a:ext>
           </a:extLst>
         </p:spPr>

</xml_diff>

<commit_message>
Built site for jfa: 0.7.1@be45c95
</commit_message>
<xml_diff>
--- a/reference/figures/cheatsheet/cheatsheet.pptx
+++ b/reference/figures/cheatsheet/cheatsheet.pptx
@@ -321,44 +321,20 @@
 <file path=ppt/changesInfos/changesInfo1.xml><?xml version="1.0" encoding="utf-8"?>
 <pc:chgInfo xmlns:a="http://schemas.openxmlformats.org/drawingml/2006/main" xmlns:r="http://schemas.openxmlformats.org/officeDocument/2006/relationships" xmlns:ac="http://schemas.microsoft.com/office/drawing/2013/main/command" xmlns:pc="http://schemas.microsoft.com/office/powerpoint/2013/main/command">
   <pc:docChgLst>
-    <pc:chgData name="Derks, Koen" userId="42903d96-be75-4cec-9136-f3710e86cd30" providerId="ADAL" clId="{47C729CF-B9DC-4253-89B2-BDEEBCDC567C}"/>
+    <pc:chgData name="Derks, Koen" userId="42903d96-be75-4cec-9136-f3710e86cd30" providerId="ADAL" clId="{98190025-2A7C-4D67-890F-BF5F2D889559}"/>
     <pc:docChg chg="modSld">
-      <pc:chgData name="Derks, Koen" userId="42903d96-be75-4cec-9136-f3710e86cd30" providerId="ADAL" clId="{47C729CF-B9DC-4253-89B2-BDEEBCDC567C}" dt="2021-05-13T13:34:37.534" v="50" actId="20577"/>
+      <pc:chgData name="Derks, Koen" userId="42903d96-be75-4cec-9136-f3710e86cd30" providerId="ADAL" clId="{98190025-2A7C-4D67-890F-BF5F2D889559}" dt="2021-08-07T09:00:01.276" v="3" actId="20577"/>
       <pc:docMkLst>
         <pc:docMk/>
       </pc:docMkLst>
       <pc:sldChg chg="modSp mod">
-        <pc:chgData name="Derks, Koen" userId="42903d96-be75-4cec-9136-f3710e86cd30" providerId="ADAL" clId="{47C729CF-B9DC-4253-89B2-BDEEBCDC567C}" dt="2021-05-13T13:34:37.534" v="50" actId="20577"/>
+        <pc:chgData name="Derks, Koen" userId="42903d96-be75-4cec-9136-f3710e86cd30" providerId="ADAL" clId="{98190025-2A7C-4D67-890F-BF5F2D889559}" dt="2021-08-07T09:00:01.276" v="3" actId="20577"/>
         <pc:sldMkLst>
           <pc:docMk/>
           <pc:sldMk cId="0" sldId="257"/>
         </pc:sldMkLst>
         <pc:spChg chg="mod">
-          <ac:chgData name="Derks, Koen" userId="42903d96-be75-4cec-9136-f3710e86cd30" providerId="ADAL" clId="{47C729CF-B9DC-4253-89B2-BDEEBCDC567C}" dt="2021-05-13T13:26:15.533" v="46" actId="6549"/>
-          <ac:spMkLst>
-            <pc:docMk/>
-            <pc:sldMk cId="0" sldId="257"/>
-            <ac:spMk id="124" creationId="{840686DE-7A82-47C4-A954-0B456668CB4F}"/>
-          </ac:spMkLst>
-        </pc:spChg>
-        <pc:spChg chg="mod">
-          <ac:chgData name="Derks, Koen" userId="42903d96-be75-4cec-9136-f3710e86cd30" providerId="ADAL" clId="{47C729CF-B9DC-4253-89B2-BDEEBCDC567C}" dt="2021-05-13T13:25:58.682" v="21" actId="20577"/>
-          <ac:spMkLst>
-            <pc:docMk/>
-            <pc:sldMk cId="0" sldId="257"/>
-            <ac:spMk id="129" creationId="{217411A5-52C0-45D9-A546-49235C28A6D7}"/>
-          </ac:spMkLst>
-        </pc:spChg>
-        <pc:spChg chg="mod">
-          <ac:chgData name="Derks, Koen" userId="42903d96-be75-4cec-9136-f3710e86cd30" providerId="ADAL" clId="{47C729CF-B9DC-4253-89B2-BDEEBCDC567C}" dt="2021-05-13T13:25:21.172" v="3" actId="20577"/>
-          <ac:spMkLst>
-            <pc:docMk/>
-            <pc:sldMk cId="0" sldId="257"/>
-            <ac:spMk id="139" creationId="{F2B32D8F-8679-461C-AB88-ED31B7806035}"/>
-          </ac:spMkLst>
-        </pc:spChg>
-        <pc:spChg chg="mod">
-          <ac:chgData name="Derks, Koen" userId="42903d96-be75-4cec-9136-f3710e86cd30" providerId="ADAL" clId="{47C729CF-B9DC-4253-89B2-BDEEBCDC567C}" dt="2021-05-13T13:34:37.534" v="50" actId="20577"/>
+          <ac:chgData name="Derks, Koen" userId="42903d96-be75-4cec-9136-f3710e86cd30" providerId="ADAL" clId="{98190025-2A7C-4D67-890F-BF5F2D889559}" dt="2021-08-07T09:00:01.276" v="3" actId="20577"/>
           <ac:spMkLst>
             <pc:docMk/>
             <pc:sldMk cId="0" sldId="257"/>
@@ -465,6 +441,54 @@
     </pc:docChg>
   </pc:docChgLst>
   <pc:docChgLst>
+    <pc:chgData name="Derks, Koen" userId="42903d96-be75-4cec-9136-f3710e86cd30" providerId="ADAL" clId="{B2C99C48-803B-45C3-BEC8-064BF2898A74}"/>
+    <pc:docChg chg="custSel modSld">
+      <pc:chgData name="Derks, Koen" userId="42903d96-be75-4cec-9136-f3710e86cd30" providerId="ADAL" clId="{B2C99C48-803B-45C3-BEC8-064BF2898A74}" dt="2021-09-18T11:38:05.739" v="101"/>
+      <pc:docMkLst>
+        <pc:docMk/>
+      </pc:docMkLst>
+      <pc:sldChg chg="modSp mod">
+        <pc:chgData name="Derks, Koen" userId="42903d96-be75-4cec-9136-f3710e86cd30" providerId="ADAL" clId="{B2C99C48-803B-45C3-BEC8-064BF2898A74}" dt="2021-09-18T11:38:05.739" v="101"/>
+        <pc:sldMkLst>
+          <pc:docMk/>
+          <pc:sldMk cId="0" sldId="257"/>
+        </pc:sldMkLst>
+        <pc:spChg chg="mod">
+          <ac:chgData name="Derks, Koen" userId="42903d96-be75-4cec-9136-f3710e86cd30" providerId="ADAL" clId="{B2C99C48-803B-45C3-BEC8-064BF2898A74}" dt="2021-09-16T14:23:53.513" v="35" actId="20577"/>
+          <ac:spMkLst>
+            <pc:docMk/>
+            <pc:sldMk cId="0" sldId="257"/>
+            <ac:spMk id="129" creationId="{217411A5-52C0-45D9-A546-49235C28A6D7}"/>
+          </ac:spMkLst>
+        </pc:spChg>
+        <pc:spChg chg="mod">
+          <ac:chgData name="Derks, Koen" userId="42903d96-be75-4cec-9136-f3710e86cd30" providerId="ADAL" clId="{B2C99C48-803B-45C3-BEC8-064BF2898A74}" dt="2021-09-17T16:30:22.742" v="47"/>
+          <ac:spMkLst>
+            <pc:docMk/>
+            <pc:sldMk cId="0" sldId="257"/>
+            <ac:spMk id="144" creationId="{9AF2C0F0-B69F-45A7-9DB4-1D7962C71414}"/>
+          </ac:spMkLst>
+        </pc:spChg>
+        <pc:spChg chg="mod">
+          <ac:chgData name="Derks, Koen" userId="42903d96-be75-4cec-9136-f3710e86cd30" providerId="ADAL" clId="{B2C99C48-803B-45C3-BEC8-064BF2898A74}" dt="2021-09-18T11:38:05.739" v="101"/>
+          <ac:spMkLst>
+            <pc:docMk/>
+            <pc:sldMk cId="0" sldId="257"/>
+            <ac:spMk id="145" creationId="{130E5FF5-89E1-42AE-84ED-37821A67F183}"/>
+          </ac:spMkLst>
+        </pc:spChg>
+        <pc:spChg chg="mod">
+          <ac:chgData name="Derks, Koen" userId="42903d96-be75-4cec-9136-f3710e86cd30" providerId="ADAL" clId="{B2C99C48-803B-45C3-BEC8-064BF2898A74}" dt="2021-09-16T13:54:35.181" v="16" actId="1036"/>
+          <ac:spMkLst>
+            <pc:docMk/>
+            <pc:sldMk cId="0" sldId="257"/>
+            <ac:spMk id="380" creationId="{00000000-0000-0000-0000-000000000000}"/>
+          </ac:spMkLst>
+        </pc:spChg>
+      </pc:sldChg>
+    </pc:docChg>
+  </pc:docChgLst>
+  <pc:docChgLst>
     <pc:chgData name="Derks, Koen" userId="42903d96-be75-4cec-9136-f3710e86cd30" providerId="ADAL" clId="{76736121-1439-4CC5-B71A-43EA3D14E7B7}"/>
     <pc:docChg chg="delSld modSld">
       <pc:chgData name="Derks, Koen" userId="42903d96-be75-4cec-9136-f3710e86cd30" providerId="ADAL" clId="{76736121-1439-4CC5-B71A-43EA3D14E7B7}" dt="2020-11-28T22:53:19.244" v="23" actId="20577"/>
@@ -508,70 +532,6 @@
           </pc:sldLayoutMkLst>
         </pc:sldLayoutChg>
       </pc:sldMasterChg>
-    </pc:docChg>
-  </pc:docChgLst>
-  <pc:docChgLst>
-    <pc:chgData name="Derks, Koen" userId="42903d96-be75-4cec-9136-f3710e86cd30" providerId="ADAL" clId="{CB4365A0-A1FB-4DEB-ADEA-703F473C097B}"/>
-    <pc:docChg chg="undo custSel modSld">
-      <pc:chgData name="Derks, Koen" userId="42903d96-be75-4cec-9136-f3710e86cd30" providerId="ADAL" clId="{CB4365A0-A1FB-4DEB-ADEA-703F473C097B}" dt="2021-06-02T16:31:03.713" v="294" actId="20577"/>
-      <pc:docMkLst>
-        <pc:docMk/>
-      </pc:docMkLst>
-      <pc:sldChg chg="modSp mod">
-        <pc:chgData name="Derks, Koen" userId="42903d96-be75-4cec-9136-f3710e86cd30" providerId="ADAL" clId="{CB4365A0-A1FB-4DEB-ADEA-703F473C097B}" dt="2021-06-02T16:31:03.713" v="294" actId="20577"/>
-        <pc:sldMkLst>
-          <pc:docMk/>
-          <pc:sldMk cId="0" sldId="257"/>
-        </pc:sldMkLst>
-        <pc:spChg chg="mod">
-          <ac:chgData name="Derks, Koen" userId="42903d96-be75-4cec-9136-f3710e86cd30" providerId="ADAL" clId="{CB4365A0-A1FB-4DEB-ADEA-703F473C097B}" dt="2021-06-02T16:29:22.224" v="227" actId="6549"/>
-          <ac:spMkLst>
-            <pc:docMk/>
-            <pc:sldMk cId="0" sldId="257"/>
-            <ac:spMk id="135" creationId="{9D0348CA-97F1-4EDC-8F7E-BBB556E48519}"/>
-          </ac:spMkLst>
-        </pc:spChg>
-        <pc:spChg chg="mod">
-          <ac:chgData name="Derks, Koen" userId="42903d96-be75-4cec-9136-f3710e86cd30" providerId="ADAL" clId="{CB4365A0-A1FB-4DEB-ADEA-703F473C097B}" dt="2021-06-02T16:31:03.713" v="294" actId="20577"/>
-          <ac:spMkLst>
-            <pc:docMk/>
-            <pc:sldMk cId="0" sldId="257"/>
-            <ac:spMk id="139" creationId="{F2B32D8F-8679-461C-AB88-ED31B7806035}"/>
-          </ac:spMkLst>
-        </pc:spChg>
-        <pc:spChg chg="mod">
-          <ac:chgData name="Derks, Koen" userId="42903d96-be75-4cec-9136-f3710e86cd30" providerId="ADAL" clId="{CB4365A0-A1FB-4DEB-ADEA-703F473C097B}" dt="2021-06-02T16:28:05.339" v="184" actId="20577"/>
-          <ac:spMkLst>
-            <pc:docMk/>
-            <pc:sldMk cId="0" sldId="257"/>
-            <ac:spMk id="140" creationId="{6BAF5637-414B-416F-8562-F22A27CA0897}"/>
-          </ac:spMkLst>
-        </pc:spChg>
-        <pc:spChg chg="mod">
-          <ac:chgData name="Derks, Koen" userId="42903d96-be75-4cec-9136-f3710e86cd30" providerId="ADAL" clId="{CB4365A0-A1FB-4DEB-ADEA-703F473C097B}" dt="2021-06-02T16:26:08.295" v="163"/>
-          <ac:spMkLst>
-            <pc:docMk/>
-            <pc:sldMk cId="0" sldId="257"/>
-            <ac:spMk id="341" creationId="{00000000-0000-0000-0000-000000000000}"/>
-          </ac:spMkLst>
-        </pc:spChg>
-        <pc:spChg chg="mod">
-          <ac:chgData name="Derks, Koen" userId="42903d96-be75-4cec-9136-f3710e86cd30" providerId="ADAL" clId="{CB4365A0-A1FB-4DEB-ADEA-703F473C097B}" dt="2021-06-02T16:25:49.328" v="162" actId="1036"/>
-          <ac:spMkLst>
-            <pc:docMk/>
-            <pc:sldMk cId="0" sldId="257"/>
-            <ac:spMk id="380" creationId="{00000000-0000-0000-0000-000000000000}"/>
-          </ac:spMkLst>
-        </pc:spChg>
-        <pc:spChg chg="mod">
-          <ac:chgData name="Derks, Koen" userId="42903d96-be75-4cec-9136-f3710e86cd30" providerId="ADAL" clId="{CB4365A0-A1FB-4DEB-ADEA-703F473C097B}" dt="2021-06-02T16:27:41.880" v="172" actId="20577"/>
-          <ac:spMkLst>
-            <pc:docMk/>
-            <pc:sldMk cId="0" sldId="257"/>
-            <ac:spMk id="384" creationId="{00000000-0000-0000-0000-000000000000}"/>
-          </ac:spMkLst>
-        </pc:spChg>
-      </pc:sldChg>
     </pc:docChg>
   </pc:docChgLst>
   <pc:docChgLst>
@@ -621,54 +581,6 @@
         </pc:spChg>
         <pc:spChg chg="mod">
           <ac:chgData name="Derks, Koen" userId="42903d96-be75-4cec-9136-f3710e86cd30" providerId="ADAL" clId="{E813656B-DA65-4A86-81EE-25B476EAF3E8}" dt="2021-06-29T10:47:50.850" v="141" actId="1035"/>
-          <ac:spMkLst>
-            <pc:docMk/>
-            <pc:sldMk cId="0" sldId="257"/>
-            <ac:spMk id="380" creationId="{00000000-0000-0000-0000-000000000000}"/>
-          </ac:spMkLst>
-        </pc:spChg>
-      </pc:sldChg>
-    </pc:docChg>
-  </pc:docChgLst>
-  <pc:docChgLst>
-    <pc:chgData name="Derks, Koen" userId="42903d96-be75-4cec-9136-f3710e86cd30" providerId="ADAL" clId="{B2C99C48-803B-45C3-BEC8-064BF2898A74}"/>
-    <pc:docChg chg="custSel modSld">
-      <pc:chgData name="Derks, Koen" userId="42903d96-be75-4cec-9136-f3710e86cd30" providerId="ADAL" clId="{B2C99C48-803B-45C3-BEC8-064BF2898A74}" dt="2021-09-18T11:38:05.739" v="101"/>
-      <pc:docMkLst>
-        <pc:docMk/>
-      </pc:docMkLst>
-      <pc:sldChg chg="modSp mod">
-        <pc:chgData name="Derks, Koen" userId="42903d96-be75-4cec-9136-f3710e86cd30" providerId="ADAL" clId="{B2C99C48-803B-45C3-BEC8-064BF2898A74}" dt="2021-09-18T11:38:05.739" v="101"/>
-        <pc:sldMkLst>
-          <pc:docMk/>
-          <pc:sldMk cId="0" sldId="257"/>
-        </pc:sldMkLst>
-        <pc:spChg chg="mod">
-          <ac:chgData name="Derks, Koen" userId="42903d96-be75-4cec-9136-f3710e86cd30" providerId="ADAL" clId="{B2C99C48-803B-45C3-BEC8-064BF2898A74}" dt="2021-09-16T14:23:53.513" v="35" actId="20577"/>
-          <ac:spMkLst>
-            <pc:docMk/>
-            <pc:sldMk cId="0" sldId="257"/>
-            <ac:spMk id="129" creationId="{217411A5-52C0-45D9-A546-49235C28A6D7}"/>
-          </ac:spMkLst>
-        </pc:spChg>
-        <pc:spChg chg="mod">
-          <ac:chgData name="Derks, Koen" userId="42903d96-be75-4cec-9136-f3710e86cd30" providerId="ADAL" clId="{B2C99C48-803B-45C3-BEC8-064BF2898A74}" dt="2021-09-17T16:30:22.742" v="47"/>
-          <ac:spMkLst>
-            <pc:docMk/>
-            <pc:sldMk cId="0" sldId="257"/>
-            <ac:spMk id="144" creationId="{9AF2C0F0-B69F-45A7-9DB4-1D7962C71414}"/>
-          </ac:spMkLst>
-        </pc:spChg>
-        <pc:spChg chg="mod">
-          <ac:chgData name="Derks, Koen" userId="42903d96-be75-4cec-9136-f3710e86cd30" providerId="ADAL" clId="{B2C99C48-803B-45C3-BEC8-064BF2898A74}" dt="2021-09-18T11:38:05.739" v="101"/>
-          <ac:spMkLst>
-            <pc:docMk/>
-            <pc:sldMk cId="0" sldId="257"/>
-            <ac:spMk id="145" creationId="{130E5FF5-89E1-42AE-84ED-37821A67F183}"/>
-          </ac:spMkLst>
-        </pc:spChg>
-        <pc:spChg chg="mod">
-          <ac:chgData name="Derks, Koen" userId="42903d96-be75-4cec-9136-f3710e86cd30" providerId="ADAL" clId="{B2C99C48-803B-45C3-BEC8-064BF2898A74}" dt="2021-09-16T13:54:35.181" v="16" actId="1036"/>
           <ac:spMkLst>
             <pc:docMk/>
             <pc:sldMk cId="0" sldId="257"/>
@@ -737,6 +649,70 @@
             <pc:docMk/>
             <pc:sldMk cId="0" sldId="257"/>
             <ac:spMk id="380" creationId="{00000000-0000-0000-0000-000000000000}"/>
+          </ac:spMkLst>
+        </pc:spChg>
+      </pc:sldChg>
+    </pc:docChg>
+  </pc:docChgLst>
+  <pc:docChgLst>
+    <pc:chgData name="Derks, Koen" userId="42903d96-be75-4cec-9136-f3710e86cd30" providerId="ADAL" clId="{CB4365A0-A1FB-4DEB-ADEA-703F473C097B}"/>
+    <pc:docChg chg="undo custSel modSld">
+      <pc:chgData name="Derks, Koen" userId="42903d96-be75-4cec-9136-f3710e86cd30" providerId="ADAL" clId="{CB4365A0-A1FB-4DEB-ADEA-703F473C097B}" dt="2021-06-02T16:31:03.713" v="294" actId="20577"/>
+      <pc:docMkLst>
+        <pc:docMk/>
+      </pc:docMkLst>
+      <pc:sldChg chg="modSp mod">
+        <pc:chgData name="Derks, Koen" userId="42903d96-be75-4cec-9136-f3710e86cd30" providerId="ADAL" clId="{CB4365A0-A1FB-4DEB-ADEA-703F473C097B}" dt="2021-06-02T16:31:03.713" v="294" actId="20577"/>
+        <pc:sldMkLst>
+          <pc:docMk/>
+          <pc:sldMk cId="0" sldId="257"/>
+        </pc:sldMkLst>
+        <pc:spChg chg="mod">
+          <ac:chgData name="Derks, Koen" userId="42903d96-be75-4cec-9136-f3710e86cd30" providerId="ADAL" clId="{CB4365A0-A1FB-4DEB-ADEA-703F473C097B}" dt="2021-06-02T16:29:22.224" v="227" actId="6549"/>
+          <ac:spMkLst>
+            <pc:docMk/>
+            <pc:sldMk cId="0" sldId="257"/>
+            <ac:spMk id="135" creationId="{9D0348CA-97F1-4EDC-8F7E-BBB556E48519}"/>
+          </ac:spMkLst>
+        </pc:spChg>
+        <pc:spChg chg="mod">
+          <ac:chgData name="Derks, Koen" userId="42903d96-be75-4cec-9136-f3710e86cd30" providerId="ADAL" clId="{CB4365A0-A1FB-4DEB-ADEA-703F473C097B}" dt="2021-06-02T16:31:03.713" v="294" actId="20577"/>
+          <ac:spMkLst>
+            <pc:docMk/>
+            <pc:sldMk cId="0" sldId="257"/>
+            <ac:spMk id="139" creationId="{F2B32D8F-8679-461C-AB88-ED31B7806035}"/>
+          </ac:spMkLst>
+        </pc:spChg>
+        <pc:spChg chg="mod">
+          <ac:chgData name="Derks, Koen" userId="42903d96-be75-4cec-9136-f3710e86cd30" providerId="ADAL" clId="{CB4365A0-A1FB-4DEB-ADEA-703F473C097B}" dt="2021-06-02T16:28:05.339" v="184" actId="20577"/>
+          <ac:spMkLst>
+            <pc:docMk/>
+            <pc:sldMk cId="0" sldId="257"/>
+            <ac:spMk id="140" creationId="{6BAF5637-414B-416F-8562-F22A27CA0897}"/>
+          </ac:spMkLst>
+        </pc:spChg>
+        <pc:spChg chg="mod">
+          <ac:chgData name="Derks, Koen" userId="42903d96-be75-4cec-9136-f3710e86cd30" providerId="ADAL" clId="{CB4365A0-A1FB-4DEB-ADEA-703F473C097B}" dt="2021-06-02T16:26:08.295" v="163"/>
+          <ac:spMkLst>
+            <pc:docMk/>
+            <pc:sldMk cId="0" sldId="257"/>
+            <ac:spMk id="341" creationId="{00000000-0000-0000-0000-000000000000}"/>
+          </ac:spMkLst>
+        </pc:spChg>
+        <pc:spChg chg="mod">
+          <ac:chgData name="Derks, Koen" userId="42903d96-be75-4cec-9136-f3710e86cd30" providerId="ADAL" clId="{CB4365A0-A1FB-4DEB-ADEA-703F473C097B}" dt="2021-06-02T16:25:49.328" v="162" actId="1036"/>
+          <ac:spMkLst>
+            <pc:docMk/>
+            <pc:sldMk cId="0" sldId="257"/>
+            <ac:spMk id="380" creationId="{00000000-0000-0000-0000-000000000000}"/>
+          </ac:spMkLst>
+        </pc:spChg>
+        <pc:spChg chg="mod">
+          <ac:chgData name="Derks, Koen" userId="42903d96-be75-4cec-9136-f3710e86cd30" providerId="ADAL" clId="{CB4365A0-A1FB-4DEB-ADEA-703F473C097B}" dt="2021-06-02T16:27:41.880" v="172" actId="20577"/>
+          <ac:spMkLst>
+            <pc:docMk/>
+            <pc:sldMk cId="0" sldId="257"/>
+            <ac:spMk id="384" creationId="{00000000-0000-0000-0000-000000000000}"/>
           </ac:spMkLst>
         </pc:spChg>
       </pc:sldChg>
@@ -879,20 +855,44 @@
     </pc:docChg>
   </pc:docChgLst>
   <pc:docChgLst>
-    <pc:chgData name="Derks, Koen" userId="42903d96-be75-4cec-9136-f3710e86cd30" providerId="ADAL" clId="{98190025-2A7C-4D67-890F-BF5F2D889559}"/>
+    <pc:chgData name="Derks, Koen" userId="42903d96-be75-4cec-9136-f3710e86cd30" providerId="ADAL" clId="{47C729CF-B9DC-4253-89B2-BDEEBCDC567C}"/>
     <pc:docChg chg="modSld">
-      <pc:chgData name="Derks, Koen" userId="42903d96-be75-4cec-9136-f3710e86cd30" providerId="ADAL" clId="{98190025-2A7C-4D67-890F-BF5F2D889559}" dt="2021-08-07T09:00:01.276" v="3" actId="20577"/>
+      <pc:chgData name="Derks, Koen" userId="42903d96-be75-4cec-9136-f3710e86cd30" providerId="ADAL" clId="{47C729CF-B9DC-4253-89B2-BDEEBCDC567C}" dt="2021-05-13T13:34:37.534" v="50" actId="20577"/>
       <pc:docMkLst>
         <pc:docMk/>
       </pc:docMkLst>
       <pc:sldChg chg="modSp mod">
-        <pc:chgData name="Derks, Koen" userId="42903d96-be75-4cec-9136-f3710e86cd30" providerId="ADAL" clId="{98190025-2A7C-4D67-890F-BF5F2D889559}" dt="2021-08-07T09:00:01.276" v="3" actId="20577"/>
+        <pc:chgData name="Derks, Koen" userId="42903d96-be75-4cec-9136-f3710e86cd30" providerId="ADAL" clId="{47C729CF-B9DC-4253-89B2-BDEEBCDC567C}" dt="2021-05-13T13:34:37.534" v="50" actId="20577"/>
         <pc:sldMkLst>
           <pc:docMk/>
           <pc:sldMk cId="0" sldId="257"/>
         </pc:sldMkLst>
         <pc:spChg chg="mod">
-          <ac:chgData name="Derks, Koen" userId="42903d96-be75-4cec-9136-f3710e86cd30" providerId="ADAL" clId="{98190025-2A7C-4D67-890F-BF5F2D889559}" dt="2021-08-07T09:00:01.276" v="3" actId="20577"/>
+          <ac:chgData name="Derks, Koen" userId="42903d96-be75-4cec-9136-f3710e86cd30" providerId="ADAL" clId="{47C729CF-B9DC-4253-89B2-BDEEBCDC567C}" dt="2021-05-13T13:26:15.533" v="46" actId="6549"/>
+          <ac:spMkLst>
+            <pc:docMk/>
+            <pc:sldMk cId="0" sldId="257"/>
+            <ac:spMk id="124" creationId="{840686DE-7A82-47C4-A954-0B456668CB4F}"/>
+          </ac:spMkLst>
+        </pc:spChg>
+        <pc:spChg chg="mod">
+          <ac:chgData name="Derks, Koen" userId="42903d96-be75-4cec-9136-f3710e86cd30" providerId="ADAL" clId="{47C729CF-B9DC-4253-89B2-BDEEBCDC567C}" dt="2021-05-13T13:25:58.682" v="21" actId="20577"/>
+          <ac:spMkLst>
+            <pc:docMk/>
+            <pc:sldMk cId="0" sldId="257"/>
+            <ac:spMk id="129" creationId="{217411A5-52C0-45D9-A546-49235C28A6D7}"/>
+          </ac:spMkLst>
+        </pc:spChg>
+        <pc:spChg chg="mod">
+          <ac:chgData name="Derks, Koen" userId="42903d96-be75-4cec-9136-f3710e86cd30" providerId="ADAL" clId="{47C729CF-B9DC-4253-89B2-BDEEBCDC567C}" dt="2021-05-13T13:25:21.172" v="3" actId="20577"/>
+          <ac:spMkLst>
+            <pc:docMk/>
+            <pc:sldMk cId="0" sldId="257"/>
+            <ac:spMk id="139" creationId="{F2B32D8F-8679-461C-AB88-ED31B7806035}"/>
+          </ac:spMkLst>
+        </pc:spChg>
+        <pc:spChg chg="mod">
+          <ac:chgData name="Derks, Koen" userId="42903d96-be75-4cec-9136-f3710e86cd30" providerId="ADAL" clId="{47C729CF-B9DC-4253-89B2-BDEEBCDC567C}" dt="2021-05-13T13:34:37.534" v="50" actId="20577"/>
           <ac:spMkLst>
             <pc:docMk/>
             <pc:sldMk cId="0" sldId="257"/>
@@ -990,9 +990,9 @@
         <a:spcPct val="125000"/>
       </a:lnSpc>
       <a:defRPr sz="2600">
-        <a:latin typeface="Avenir Roman"/>
-        <a:ea typeface="Avenir Roman"/>
-        <a:cs typeface="Avenir Roman"/>
+        <a:latin typeface="Avenir"/>
+        <a:ea typeface="Avenir"/>
+        <a:cs typeface="Avenir"/>
         <a:sym typeface="Avenir Roman"/>
       </a:defRPr>
     </a:lvl1pPr>
@@ -1001,9 +1001,9 @@
         <a:spcPct val="125000"/>
       </a:lnSpc>
       <a:defRPr sz="2600">
-        <a:latin typeface="Avenir Roman"/>
-        <a:ea typeface="Avenir Roman"/>
-        <a:cs typeface="Avenir Roman"/>
+        <a:latin typeface="Avenir"/>
+        <a:ea typeface="Avenir"/>
+        <a:cs typeface="Avenir"/>
         <a:sym typeface="Avenir Roman"/>
       </a:defRPr>
     </a:lvl2pPr>
@@ -1012,9 +1012,9 @@
         <a:spcPct val="125000"/>
       </a:lnSpc>
       <a:defRPr sz="2600">
-        <a:latin typeface="Avenir Roman"/>
-        <a:ea typeface="Avenir Roman"/>
-        <a:cs typeface="Avenir Roman"/>
+        <a:latin typeface="Avenir"/>
+        <a:ea typeface="Avenir"/>
+        <a:cs typeface="Avenir"/>
         <a:sym typeface="Avenir Roman"/>
       </a:defRPr>
     </a:lvl3pPr>
@@ -1023,9 +1023,9 @@
         <a:spcPct val="125000"/>
       </a:lnSpc>
       <a:defRPr sz="2600">
-        <a:latin typeface="Avenir Roman"/>
-        <a:ea typeface="Avenir Roman"/>
-        <a:cs typeface="Avenir Roman"/>
+        <a:latin typeface="Avenir"/>
+        <a:ea typeface="Avenir"/>
+        <a:cs typeface="Avenir"/>
         <a:sym typeface="Avenir Roman"/>
       </a:defRPr>
     </a:lvl4pPr>
@@ -1034,9 +1034,9 @@
         <a:spcPct val="125000"/>
       </a:lnSpc>
       <a:defRPr sz="2600">
-        <a:latin typeface="Avenir Roman"/>
-        <a:ea typeface="Avenir Roman"/>
-        <a:cs typeface="Avenir Roman"/>
+        <a:latin typeface="Avenir"/>
+        <a:ea typeface="Avenir"/>
+        <a:cs typeface="Avenir"/>
         <a:sym typeface="Avenir Roman"/>
       </a:defRPr>
     </a:lvl5pPr>
@@ -1045,9 +1045,9 @@
         <a:spcPct val="125000"/>
       </a:lnSpc>
       <a:defRPr sz="2600">
-        <a:latin typeface="Avenir Roman"/>
-        <a:ea typeface="Avenir Roman"/>
-        <a:cs typeface="Avenir Roman"/>
+        <a:latin typeface="Avenir"/>
+        <a:ea typeface="Avenir"/>
+        <a:cs typeface="Avenir"/>
         <a:sym typeface="Avenir Roman"/>
       </a:defRPr>
     </a:lvl6pPr>
@@ -1056,9 +1056,9 @@
         <a:spcPct val="125000"/>
       </a:lnSpc>
       <a:defRPr sz="2600">
-        <a:latin typeface="Avenir Roman"/>
-        <a:ea typeface="Avenir Roman"/>
-        <a:cs typeface="Avenir Roman"/>
+        <a:latin typeface="Avenir"/>
+        <a:ea typeface="Avenir"/>
+        <a:cs typeface="Avenir"/>
         <a:sym typeface="Avenir Roman"/>
       </a:defRPr>
     </a:lvl7pPr>
@@ -1067,9 +1067,9 @@
         <a:spcPct val="125000"/>
       </a:lnSpc>
       <a:defRPr sz="2600">
-        <a:latin typeface="Avenir Roman"/>
-        <a:ea typeface="Avenir Roman"/>
-        <a:cs typeface="Avenir Roman"/>
+        <a:latin typeface="Avenir"/>
+        <a:ea typeface="Avenir"/>
+        <a:cs typeface="Avenir"/>
         <a:sym typeface="Avenir Roman"/>
       </a:defRPr>
     </a:lvl8pPr>
@@ -1078,9 +1078,9 @@
         <a:spcPct val="125000"/>
       </a:lnSpc>
       <a:defRPr sz="2600">
-        <a:latin typeface="Avenir Roman"/>
-        <a:ea typeface="Avenir Roman"/>
-        <a:cs typeface="Avenir Roman"/>
+        <a:latin typeface="Avenir"/>
+        <a:ea typeface="Avenir"/>
+        <a:cs typeface="Avenir"/>
         <a:sym typeface="Avenir Roman"/>
       </a:defRPr>
     </a:lvl9pPr>
@@ -2711,7 +2711,7 @@
           </a:ln>
           <a:extLst>
             <a:ext uri="{C572A759-6A51-4108-AA02-DFA0A04FC94B}">
-              <ma14:wrappingTextBoxFlag xmlns="" xmlns:m="http://schemas.openxmlformats.org/officeDocument/2006/math" xmlns:a14="http://schemas.microsoft.com/office/drawing/2010/main" xmlns:ma14="http://schemas.microsoft.com/office/mac/drawingml/2011/main" val="1"/>
+              <ma14:wrappingTextBoxFlag xmlns:ma14="http://schemas.microsoft.com/office/mac/drawingml/2011/main" xmlns:a14="http://schemas.microsoft.com/office/drawing/2010/main" xmlns:m="http://schemas.openxmlformats.org/officeDocument/2006/math" xmlns="" val="1"/>
             </a:ext>
           </a:extLst>
         </p:spPr>
@@ -2750,7 +2750,7 @@
           </a:ln>
           <a:extLst>
             <a:ext uri="{C572A759-6A51-4108-AA02-DFA0A04FC94B}">
-              <ma14:wrappingTextBoxFlag xmlns="" xmlns:m="http://schemas.openxmlformats.org/officeDocument/2006/math" xmlns:a14="http://schemas.microsoft.com/office/drawing/2010/main" xmlns:ma14="http://schemas.microsoft.com/office/mac/drawingml/2011/main" val="1"/>
+              <ma14:wrappingTextBoxFlag xmlns:ma14="http://schemas.microsoft.com/office/mac/drawingml/2011/main" xmlns:a14="http://schemas.microsoft.com/office/drawing/2010/main" xmlns:m="http://schemas.openxmlformats.org/officeDocument/2006/math" xmlns="" val="1"/>
             </a:ext>
           </a:extLst>
         </p:spPr>
@@ -3753,9 +3753,11 @@
             <a:avLst/>
           </a:prstGeom>
           <a:solidFill>
-            <a:srgbClr val="79B0DC">
-              <a:alpha val="23776"/>
-            </a:srgbClr>
+            <a:schemeClr val="accent1">
+              <a:lumMod val="20000"/>
+              <a:lumOff val="80000"/>
+              <a:alpha val="50000"/>
+            </a:schemeClr>
           </a:solidFill>
           <a:ln w="12700">
             <a:miter lim="400000"/>
@@ -3843,7 +3845,7 @@
           </a:ln>
           <a:extLst>
             <a:ext uri="{C572A759-6A51-4108-AA02-DFA0A04FC94B}">
-              <ma14:wrappingTextBoxFlag xmlns="" xmlns:m="http://schemas.openxmlformats.org/officeDocument/2006/math" xmlns:a14="http://schemas.microsoft.com/office/drawing/2010/main" xmlns:ma14="http://schemas.microsoft.com/office/mac/drawingml/2011/main" val="1"/>
+              <ma14:wrappingTextBoxFlag xmlns:ma14="http://schemas.microsoft.com/office/mac/drawingml/2011/main" xmlns:a14="http://schemas.microsoft.com/office/drawing/2010/main" xmlns:m="http://schemas.openxmlformats.org/officeDocument/2006/math" xmlns="" val="1"/>
             </a:ext>
           </a:extLst>
         </p:spPr>
@@ -3896,7 +3898,7 @@
           </a:ln>
           <a:extLst>
             <a:ext uri="{C572A759-6A51-4108-AA02-DFA0A04FC94B}">
-              <ma14:wrappingTextBoxFlag xmlns="" xmlns:m="http://schemas.openxmlformats.org/officeDocument/2006/math" xmlns:a14="http://schemas.microsoft.com/office/drawing/2010/main" xmlns:ma14="http://schemas.microsoft.com/office/mac/drawingml/2011/main" val="1"/>
+              <ma14:wrappingTextBoxFlag xmlns:ma14="http://schemas.microsoft.com/office/mac/drawingml/2011/main" xmlns:a14="http://schemas.microsoft.com/office/drawing/2010/main" xmlns:m="http://schemas.openxmlformats.org/officeDocument/2006/math" xmlns="" val="1"/>
             </a:ext>
           </a:extLst>
         </p:spPr>
@@ -4013,7 +4015,7 @@
             </a:r>
             <a:r>
               <a:rPr lang="nl-NL" dirty="0"/>
-              <a:t>6</a:t>
+              <a:t>7</a:t>
             </a:r>
             <a:r>
               <a:rPr dirty="0"/>
@@ -4021,7 +4023,7 @@
             </a:r>
             <a:r>
               <a:rPr lang="nl-NL" dirty="0"/>
-              <a:t>0</a:t>
+              <a:t>1</a:t>
             </a:r>
             <a:r>
               <a:rPr dirty="0"/>
@@ -4029,7 +4031,7 @@
             </a:r>
             <a:r>
               <a:rPr lang="nl-NL" dirty="0"/>
-              <a:t>21</a:t>
+              <a:t>23</a:t>
             </a:r>
             <a:r>
               <a:rPr dirty="0"/>
@@ -4037,7 +4039,7 @@
             </a:r>
             <a:r>
               <a:rPr lang="nl-NL" dirty="0"/>
-              <a:t>09</a:t>
+              <a:t>10</a:t>
             </a:r>
             <a:endParaRPr dirty="0"/>
           </a:p>
@@ -4062,7 +4064,7 @@
           </a:ln>
           <a:extLst>
             <a:ext uri="{C572A759-6A51-4108-AA02-DFA0A04FC94B}">
-              <ma14:wrappingTextBoxFlag xmlns="" xmlns:m="http://schemas.openxmlformats.org/officeDocument/2006/math" xmlns:a14="http://schemas.microsoft.com/office/drawing/2010/main" xmlns:ma14="http://schemas.microsoft.com/office/mac/drawingml/2011/main" val="1"/>
+              <ma14:wrappingTextBoxFlag xmlns:ma14="http://schemas.microsoft.com/office/mac/drawingml/2011/main" xmlns:a14="http://schemas.microsoft.com/office/drawing/2010/main" xmlns:m="http://schemas.openxmlformats.org/officeDocument/2006/math" xmlns="" val="1"/>
             </a:ext>
           </a:extLst>
         </p:spPr>
@@ -4549,7 +4551,7 @@
           </a:ln>
           <a:extLst>
             <a:ext uri="{C572A759-6A51-4108-AA02-DFA0A04FC94B}">
-              <ma14:wrappingTextBoxFlag xmlns="" xmlns:m="http://schemas.openxmlformats.org/officeDocument/2006/math" xmlns:a14="http://schemas.microsoft.com/office/drawing/2010/main" xmlns:ma14="http://schemas.microsoft.com/office/mac/drawingml/2011/main" val="1"/>
+              <ma14:wrappingTextBoxFlag xmlns:ma14="http://schemas.microsoft.com/office/mac/drawingml/2011/main" xmlns:a14="http://schemas.microsoft.com/office/drawing/2010/main" xmlns:m="http://schemas.openxmlformats.org/officeDocument/2006/math" xmlns="" val="1"/>
             </a:ext>
           </a:extLst>
         </p:spPr>
@@ -4748,6 +4750,7 @@
             <a:schemeClr val="accent1">
               <a:lumMod val="20000"/>
               <a:lumOff val="80000"/>
+              <a:alpha val="50000"/>
             </a:schemeClr>
           </a:solidFill>
           <a:ln w="12700">
@@ -4759,7 +4762,7 @@
           <a:effectLst/>
           <a:extLst>
             <a:ext uri="{C572A759-6A51-4108-AA02-DFA0A04FC94B}">
-              <ma14:wrappingTextBoxFlag xmlns="" xmlns:m="http://schemas.openxmlformats.org/officeDocument/2006/math" xmlns:a14="http://schemas.microsoft.com/office/drawing/2010/main" xmlns:ma14="http://schemas.microsoft.com/office/mac/drawingml/2011/main" val="1"/>
+              <ma14:wrappingTextBoxFlag xmlns:ma14="http://schemas.microsoft.com/office/mac/drawingml/2011/main" xmlns:a14="http://schemas.microsoft.com/office/drawing/2010/main" xmlns:m="http://schemas.openxmlformats.org/officeDocument/2006/math" xmlns="" val="1"/>
             </a:ext>
           </a:extLst>
         </p:spPr>
@@ -4938,7 +4941,7 @@
           </a:ln>
           <a:extLst>
             <a:ext uri="{C572A759-6A51-4108-AA02-DFA0A04FC94B}">
-              <ma14:wrappingTextBoxFlag xmlns="" xmlns:m="http://schemas.openxmlformats.org/officeDocument/2006/math" xmlns:a14="http://schemas.microsoft.com/office/drawing/2010/main" xmlns:ma14="http://schemas.microsoft.com/office/mac/drawingml/2011/main" val="1"/>
+              <ma14:wrappingTextBoxFlag xmlns:ma14="http://schemas.microsoft.com/office/mac/drawingml/2011/main" xmlns:a14="http://schemas.microsoft.com/office/drawing/2010/main" xmlns:m="http://schemas.openxmlformats.org/officeDocument/2006/math" xmlns="" val="1"/>
             </a:ext>
           </a:extLst>
         </p:spPr>
@@ -5043,7 +5046,7 @@
       </p:sp>
       <p:pic>
         <p:nvPicPr>
-          <p:cNvPr id="5" name="Picture 4" descr="A picture containing text, sign, vector graphics&#10;&#10;Description automatically generated">
+          <p:cNvPr id="5" name="Picture 4">
             <a:extLst>
               <a:ext uri="{FF2B5EF4-FFF2-40B4-BE49-F238E27FC236}">
                 <a16:creationId xmlns:a16="http://schemas.microsoft.com/office/drawing/2014/main" id="{9D598E9F-ACC8-44EF-92E4-287D4B9B8AE0}"/>
@@ -5063,14 +5066,13 @@
               </a:ext>
             </a:extLst>
           </a:blip>
-          <a:stretch>
-            <a:fillRect/>
-          </a:stretch>
+          <a:srcRect/>
+          <a:stretch/>
         </p:blipFill>
         <p:spPr>
           <a:xfrm>
-            <a:off x="11906251" y="176731"/>
-            <a:ext cx="1561260" cy="1805794"/>
+            <a:off x="11906251" y="181433"/>
+            <a:ext cx="1561260" cy="1796389"/>
           </a:xfrm>
           <a:prstGeom prst="rect">
             <a:avLst/>
@@ -5105,7 +5107,7 @@
           <a:effectLst/>
           <a:extLst>
             <a:ext uri="{C572A759-6A51-4108-AA02-DFA0A04FC94B}">
-              <ma14:wrappingTextBoxFlag xmlns:lc="http://schemas.openxmlformats.org/drawingml/2006/lockedCanvas" xmlns:ma14="http://schemas.microsoft.com/office/mac/drawingml/2011/main" xmlns:a14="http://schemas.microsoft.com/office/drawing/2010/main" xmlns:m="http://schemas.openxmlformats.org/officeDocument/2006/math" xmlns="" val="1"/>
+              <ma14:wrappingTextBoxFlag xmlns="" xmlns:m="http://schemas.openxmlformats.org/officeDocument/2006/math" xmlns:a14="http://schemas.microsoft.com/office/drawing/2010/main" xmlns:ma14="http://schemas.microsoft.com/office/mac/drawingml/2011/main" xmlns:lc="http://schemas.openxmlformats.org/drawingml/2006/lockedCanvas" val="1"/>
             </a:ext>
           </a:extLst>
         </p:spPr>
@@ -5599,7 +5601,7 @@
           </a:ln>
           <a:extLst>
             <a:ext uri="{C572A759-6A51-4108-AA02-DFA0A04FC94B}">
-              <ma14:wrappingTextBoxFlag xmlns="" xmlns:m="http://schemas.openxmlformats.org/officeDocument/2006/math" xmlns:a14="http://schemas.microsoft.com/office/drawing/2010/main" xmlns:ma14="http://schemas.microsoft.com/office/mac/drawingml/2011/main" val="1"/>
+              <ma14:wrappingTextBoxFlag xmlns:ma14="http://schemas.microsoft.com/office/mac/drawingml/2011/main" xmlns:a14="http://schemas.microsoft.com/office/drawing/2010/main" xmlns:m="http://schemas.openxmlformats.org/officeDocument/2006/math" xmlns="" val="1"/>
             </a:ext>
           </a:extLst>
         </p:spPr>
@@ -5852,7 +5854,7 @@
           </a:ln>
           <a:extLst>
             <a:ext uri="{C572A759-6A51-4108-AA02-DFA0A04FC94B}">
-              <ma14:wrappingTextBoxFlag xmlns="" xmlns:m="http://schemas.openxmlformats.org/officeDocument/2006/math" xmlns:a14="http://schemas.microsoft.com/office/drawing/2010/main" xmlns:ma14="http://schemas.microsoft.com/office/mac/drawingml/2011/main" val="1"/>
+              <ma14:wrappingTextBoxFlag xmlns:ma14="http://schemas.microsoft.com/office/mac/drawingml/2011/main" xmlns:a14="http://schemas.microsoft.com/office/drawing/2010/main" xmlns:m="http://schemas.openxmlformats.org/officeDocument/2006/math" xmlns="" val="1"/>
             </a:ext>
           </a:extLst>
         </p:spPr>
@@ -5916,7 +5918,7 @@
           <a:effectLst/>
           <a:extLst>
             <a:ext uri="{C572A759-6A51-4108-AA02-DFA0A04FC94B}">
-              <ma14:wrappingTextBoxFlag xmlns:lc="http://schemas.openxmlformats.org/drawingml/2006/lockedCanvas" xmlns:ma14="http://schemas.microsoft.com/office/mac/drawingml/2011/main" xmlns:a14="http://schemas.microsoft.com/office/drawing/2010/main" xmlns:m="http://schemas.openxmlformats.org/officeDocument/2006/math" xmlns="" val="1"/>
+              <ma14:wrappingTextBoxFlag xmlns="" xmlns:m="http://schemas.openxmlformats.org/officeDocument/2006/math" xmlns:a14="http://schemas.microsoft.com/office/drawing/2010/main" xmlns:ma14="http://schemas.microsoft.com/office/mac/drawingml/2011/main" xmlns:lc="http://schemas.openxmlformats.org/drawingml/2006/lockedCanvas" val="1"/>
             </a:ext>
           </a:extLst>
         </p:spPr>
@@ -6384,7 +6386,7 @@
           </a:ln>
           <a:extLst>
             <a:ext uri="{C572A759-6A51-4108-AA02-DFA0A04FC94B}">
-              <ma14:wrappingTextBoxFlag xmlns="" xmlns:m="http://schemas.openxmlformats.org/officeDocument/2006/math" xmlns:a14="http://schemas.microsoft.com/office/drawing/2010/main" xmlns:ma14="http://schemas.microsoft.com/office/mac/drawingml/2011/main" val="1"/>
+              <ma14:wrappingTextBoxFlag xmlns:ma14="http://schemas.microsoft.com/office/mac/drawingml/2011/main" xmlns:a14="http://schemas.microsoft.com/office/drawing/2010/main" xmlns:m="http://schemas.openxmlformats.org/officeDocument/2006/math" xmlns="" val="1"/>
             </a:ext>
           </a:extLst>
         </p:spPr>
@@ -6517,7 +6519,7 @@
           </a:ln>
           <a:extLst>
             <a:ext uri="{C572A759-6A51-4108-AA02-DFA0A04FC94B}">
-              <ma14:wrappingTextBoxFlag xmlns="" xmlns:m="http://schemas.openxmlformats.org/officeDocument/2006/math" xmlns:a14="http://schemas.microsoft.com/office/drawing/2010/main" xmlns:ma14="http://schemas.microsoft.com/office/mac/drawingml/2011/main" val="1"/>
+              <ma14:wrappingTextBoxFlag xmlns:ma14="http://schemas.microsoft.com/office/mac/drawingml/2011/main" xmlns:a14="http://schemas.microsoft.com/office/drawing/2010/main" xmlns:m="http://schemas.openxmlformats.org/officeDocument/2006/math" xmlns="" val="1"/>
             </a:ext>
           </a:extLst>
         </p:spPr>
@@ -6678,7 +6680,7 @@
           <a:effectLst/>
           <a:extLst>
             <a:ext uri="{C572A759-6A51-4108-AA02-DFA0A04FC94B}">
-              <ma14:wrappingTextBoxFlag xmlns:lc="http://schemas.openxmlformats.org/drawingml/2006/lockedCanvas" xmlns:ma14="http://schemas.microsoft.com/office/mac/drawingml/2011/main" xmlns:a14="http://schemas.microsoft.com/office/drawing/2010/main" xmlns:m="http://schemas.openxmlformats.org/officeDocument/2006/math" xmlns="" val="1"/>
+              <ma14:wrappingTextBoxFlag xmlns="" xmlns:m="http://schemas.openxmlformats.org/officeDocument/2006/math" xmlns:a14="http://schemas.microsoft.com/office/drawing/2010/main" xmlns:ma14="http://schemas.microsoft.com/office/mac/drawingml/2011/main" xmlns:lc="http://schemas.openxmlformats.org/drawingml/2006/lockedCanvas" val="1"/>
             </a:ext>
           </a:extLst>
         </p:spPr>
@@ -7172,7 +7174,7 @@
           </a:ln>
           <a:extLst>
             <a:ext uri="{C572A759-6A51-4108-AA02-DFA0A04FC94B}">
-              <ma14:wrappingTextBoxFlag xmlns="" xmlns:m="http://schemas.openxmlformats.org/officeDocument/2006/math" xmlns:a14="http://schemas.microsoft.com/office/drawing/2010/main" xmlns:ma14="http://schemas.microsoft.com/office/mac/drawingml/2011/main" val="1"/>
+              <ma14:wrappingTextBoxFlag xmlns:ma14="http://schemas.microsoft.com/office/mac/drawingml/2011/main" xmlns:a14="http://schemas.microsoft.com/office/drawing/2010/main" xmlns:m="http://schemas.openxmlformats.org/officeDocument/2006/math" xmlns="" val="1"/>
             </a:ext>
           </a:extLst>
         </p:spPr>
@@ -7511,7 +7513,7 @@
           </a:ln>
           <a:extLst>
             <a:ext uri="{C572A759-6A51-4108-AA02-DFA0A04FC94B}">
-              <ma14:wrappingTextBoxFlag xmlns="" xmlns:m="http://schemas.openxmlformats.org/officeDocument/2006/math" xmlns:a14="http://schemas.microsoft.com/office/drawing/2010/main" xmlns:ma14="http://schemas.microsoft.com/office/mac/drawingml/2011/main" val="1"/>
+              <ma14:wrappingTextBoxFlag xmlns:ma14="http://schemas.microsoft.com/office/mac/drawingml/2011/main" xmlns:a14="http://schemas.microsoft.com/office/drawing/2010/main" xmlns:m="http://schemas.openxmlformats.org/officeDocument/2006/math" xmlns="" val="1"/>
             </a:ext>
           </a:extLst>
         </p:spPr>
@@ -7642,7 +7644,7 @@
           <a:effectLst/>
           <a:extLst>
             <a:ext uri="{C572A759-6A51-4108-AA02-DFA0A04FC94B}">
-              <ma14:wrappingTextBoxFlag xmlns:lc="http://schemas.openxmlformats.org/drawingml/2006/lockedCanvas" xmlns:ma14="http://schemas.microsoft.com/office/mac/drawingml/2011/main" xmlns:a14="http://schemas.microsoft.com/office/drawing/2010/main" xmlns:m="http://schemas.openxmlformats.org/officeDocument/2006/math" xmlns="" val="1"/>
+              <ma14:wrappingTextBoxFlag xmlns="" xmlns:m="http://schemas.openxmlformats.org/officeDocument/2006/math" xmlns:a14="http://schemas.microsoft.com/office/drawing/2010/main" xmlns:ma14="http://schemas.microsoft.com/office/mac/drawingml/2011/main" xmlns:lc="http://schemas.openxmlformats.org/drawingml/2006/lockedCanvas" val="1"/>
             </a:ext>
           </a:extLst>
         </p:spPr>
@@ -8136,7 +8138,7 @@
           </a:ln>
           <a:extLst>
             <a:ext uri="{C572A759-6A51-4108-AA02-DFA0A04FC94B}">
-              <ma14:wrappingTextBoxFlag xmlns="" xmlns:m="http://schemas.openxmlformats.org/officeDocument/2006/math" xmlns:a14="http://schemas.microsoft.com/office/drawing/2010/main" xmlns:ma14="http://schemas.microsoft.com/office/mac/drawingml/2011/main" val="1"/>
+              <ma14:wrappingTextBoxFlag xmlns:ma14="http://schemas.microsoft.com/office/mac/drawingml/2011/main" xmlns:a14="http://schemas.microsoft.com/office/drawing/2010/main" xmlns:m="http://schemas.openxmlformats.org/officeDocument/2006/math" xmlns="" val="1"/>
             </a:ext>
           </a:extLst>
         </p:spPr>
@@ -8251,7 +8253,7 @@
           </a:ln>
           <a:extLst>
             <a:ext uri="{C572A759-6A51-4108-AA02-DFA0A04FC94B}">
-              <ma14:wrappingTextBoxFlag xmlns="" xmlns:m="http://schemas.openxmlformats.org/officeDocument/2006/math" xmlns:a14="http://schemas.microsoft.com/office/drawing/2010/main" xmlns:ma14="http://schemas.microsoft.com/office/mac/drawingml/2011/main" val="1"/>
+              <ma14:wrappingTextBoxFlag xmlns:ma14="http://schemas.microsoft.com/office/mac/drawingml/2011/main" xmlns:a14="http://schemas.microsoft.com/office/drawing/2010/main" xmlns:m="http://schemas.openxmlformats.org/officeDocument/2006/math" xmlns="" val="1"/>
             </a:ext>
           </a:extLst>
         </p:spPr>
@@ -8362,7 +8364,7 @@
           <a:effectLst/>
           <a:extLst>
             <a:ext uri="{C572A759-6A51-4108-AA02-DFA0A04FC94B}">
-              <ma14:wrappingTextBoxFlag xmlns:lc="http://schemas.openxmlformats.org/drawingml/2006/lockedCanvas" xmlns:ma14="http://schemas.microsoft.com/office/mac/drawingml/2011/main" xmlns:a14="http://schemas.microsoft.com/office/drawing/2010/main" xmlns:m="http://schemas.openxmlformats.org/officeDocument/2006/math" xmlns="" val="1"/>
+              <ma14:wrappingTextBoxFlag xmlns="" xmlns:m="http://schemas.openxmlformats.org/officeDocument/2006/math" xmlns:a14="http://schemas.microsoft.com/office/drawing/2010/main" xmlns:ma14="http://schemas.microsoft.com/office/mac/drawingml/2011/main" xmlns:lc="http://schemas.openxmlformats.org/drawingml/2006/lockedCanvas" val="1"/>
             </a:ext>
           </a:extLst>
         </p:spPr>
@@ -8733,6 +8735,7 @@
             <a:schemeClr val="accent1">
               <a:lumMod val="20000"/>
               <a:lumOff val="80000"/>
+              <a:alpha val="50000"/>
             </a:schemeClr>
           </a:solidFill>
           <a:ln w="12700">
@@ -8744,7 +8747,7 @@
           <a:effectLst/>
           <a:extLst>
             <a:ext uri="{C572A759-6A51-4108-AA02-DFA0A04FC94B}">
-              <ma14:wrappingTextBoxFlag xmlns="" xmlns:m="http://schemas.openxmlformats.org/officeDocument/2006/math" xmlns:a14="http://schemas.microsoft.com/office/drawing/2010/main" xmlns:ma14="http://schemas.microsoft.com/office/mac/drawingml/2011/main" val="1"/>
+              <ma14:wrappingTextBoxFlag xmlns:ma14="http://schemas.microsoft.com/office/mac/drawingml/2011/main" xmlns:a14="http://schemas.microsoft.com/office/drawing/2010/main" xmlns:m="http://schemas.openxmlformats.org/officeDocument/2006/math" xmlns="" val="1"/>
             </a:ext>
           </a:extLst>
         </p:spPr>
@@ -9043,6 +9046,7 @@
             <a:schemeClr val="accent1">
               <a:lumMod val="20000"/>
               <a:lumOff val="80000"/>
+              <a:alpha val="50000"/>
             </a:schemeClr>
           </a:solidFill>
           <a:ln w="12700">
@@ -9054,7 +9058,7 @@
           <a:effectLst/>
           <a:extLst>
             <a:ext uri="{C572A759-6A51-4108-AA02-DFA0A04FC94B}">
-              <ma14:wrappingTextBoxFlag xmlns="" xmlns:m="http://schemas.openxmlformats.org/officeDocument/2006/math" xmlns:a14="http://schemas.microsoft.com/office/drawing/2010/main" xmlns:ma14="http://schemas.microsoft.com/office/mac/drawingml/2011/main" val="1"/>
+              <ma14:wrappingTextBoxFlag xmlns:ma14="http://schemas.microsoft.com/office/mac/drawingml/2011/main" xmlns:a14="http://schemas.microsoft.com/office/drawing/2010/main" xmlns:m="http://schemas.openxmlformats.org/officeDocument/2006/math" xmlns="" val="1"/>
             </a:ext>
           </a:extLst>
         </p:spPr>
@@ -9285,6 +9289,7 @@
             <a:schemeClr val="accent1">
               <a:lumMod val="20000"/>
               <a:lumOff val="80000"/>
+              <a:alpha val="50000"/>
             </a:schemeClr>
           </a:solidFill>
           <a:ln w="12700">
@@ -9296,7 +9301,7 @@
           <a:effectLst/>
           <a:extLst>
             <a:ext uri="{C572A759-6A51-4108-AA02-DFA0A04FC94B}">
-              <ma14:wrappingTextBoxFlag xmlns="" xmlns:m="http://schemas.openxmlformats.org/officeDocument/2006/math" xmlns:a14="http://schemas.microsoft.com/office/drawing/2010/main" xmlns:ma14="http://schemas.microsoft.com/office/mac/drawingml/2011/main" val="1"/>
+              <ma14:wrappingTextBoxFlag xmlns:ma14="http://schemas.microsoft.com/office/mac/drawingml/2011/main" xmlns:a14="http://schemas.microsoft.com/office/drawing/2010/main" xmlns:m="http://schemas.openxmlformats.org/officeDocument/2006/math" xmlns="" val="1"/>
             </a:ext>
           </a:extLst>
         </p:spPr>
@@ -9692,6 +9697,7 @@
             <a:schemeClr val="accent1">
               <a:lumMod val="20000"/>
               <a:lumOff val="80000"/>
+              <a:alpha val="50000"/>
             </a:schemeClr>
           </a:solidFill>
           <a:ln w="12700">
@@ -9703,7 +9709,7 @@
           <a:effectLst/>
           <a:extLst>
             <a:ext uri="{C572A759-6A51-4108-AA02-DFA0A04FC94B}">
-              <ma14:wrappingTextBoxFlag xmlns="" xmlns:m="http://schemas.openxmlformats.org/officeDocument/2006/math" xmlns:a14="http://schemas.microsoft.com/office/drawing/2010/main" xmlns:ma14="http://schemas.microsoft.com/office/mac/drawingml/2011/main" val="1"/>
+              <ma14:wrappingTextBoxFlag xmlns:ma14="http://schemas.microsoft.com/office/mac/drawingml/2011/main" xmlns:a14="http://schemas.microsoft.com/office/drawing/2010/main" xmlns:m="http://schemas.openxmlformats.org/officeDocument/2006/math" xmlns="" val="1"/>
             </a:ext>
           </a:extLst>
         </p:spPr>
@@ -10170,7 +10176,7 @@
           </a:ln>
           <a:extLst>
             <a:ext uri="{C572A759-6A51-4108-AA02-DFA0A04FC94B}">
-              <ma14:wrappingTextBoxFlag xmlns="" xmlns:m="http://schemas.openxmlformats.org/officeDocument/2006/math" xmlns:a14="http://schemas.microsoft.com/office/drawing/2010/main" xmlns:ma14="http://schemas.microsoft.com/office/mac/drawingml/2011/main" val="1"/>
+              <ma14:wrappingTextBoxFlag xmlns:ma14="http://schemas.microsoft.com/office/mac/drawingml/2011/main" xmlns:a14="http://schemas.microsoft.com/office/drawing/2010/main" xmlns:m="http://schemas.openxmlformats.org/officeDocument/2006/math" xmlns="" val="1"/>
             </a:ext>
           </a:extLst>
         </p:spPr>
@@ -10234,7 +10240,7 @@
           </a:ln>
           <a:extLst>
             <a:ext uri="{C572A759-6A51-4108-AA02-DFA0A04FC94B}">
-              <ma14:wrappingTextBoxFlag xmlns="" xmlns:m="http://schemas.openxmlformats.org/officeDocument/2006/math" xmlns:a14="http://schemas.microsoft.com/office/drawing/2010/main" xmlns:ma14="http://schemas.microsoft.com/office/mac/drawingml/2011/main" val="1"/>
+              <ma14:wrappingTextBoxFlag xmlns:ma14="http://schemas.microsoft.com/office/mac/drawingml/2011/main" xmlns:a14="http://schemas.microsoft.com/office/drawing/2010/main" xmlns:m="http://schemas.openxmlformats.org/officeDocument/2006/math" xmlns="" val="1"/>
             </a:ext>
           </a:extLst>
         </p:spPr>
@@ -10658,7 +10664,7 @@
           </a:ln>
           <a:extLst>
             <a:ext uri="{C572A759-6A51-4108-AA02-DFA0A04FC94B}">
-              <ma14:wrappingTextBoxFlag xmlns="" xmlns:m="http://schemas.openxmlformats.org/officeDocument/2006/math" xmlns:a14="http://schemas.microsoft.com/office/drawing/2010/main" xmlns:ma14="http://schemas.microsoft.com/office/mac/drawingml/2011/main" val="1"/>
+              <ma14:wrappingTextBoxFlag xmlns:ma14="http://schemas.microsoft.com/office/mac/drawingml/2011/main" xmlns:a14="http://schemas.microsoft.com/office/drawing/2010/main" xmlns:m="http://schemas.openxmlformats.org/officeDocument/2006/math" xmlns="" val="1"/>
             </a:ext>
           </a:extLst>
         </p:spPr>
@@ -10722,7 +10728,7 @@
           </a:ln>
           <a:extLst>
             <a:ext uri="{C572A759-6A51-4108-AA02-DFA0A04FC94B}">
-              <ma14:wrappingTextBoxFlag xmlns="" xmlns:m="http://schemas.openxmlformats.org/officeDocument/2006/math" xmlns:a14="http://schemas.microsoft.com/office/drawing/2010/main" xmlns:ma14="http://schemas.microsoft.com/office/mac/drawingml/2011/main" val="1"/>
+              <ma14:wrappingTextBoxFlag xmlns:ma14="http://schemas.microsoft.com/office/mac/drawingml/2011/main" xmlns:a14="http://schemas.microsoft.com/office/drawing/2010/main" xmlns:m="http://schemas.openxmlformats.org/officeDocument/2006/math" xmlns="" val="1"/>
             </a:ext>
           </a:extLst>
         </p:spPr>

</xml_diff>

<commit_message>
Built site for jfa: 0.7.1@7c99266
</commit_message>
<xml_diff>
--- a/reference/figures/cheatsheet/cheatsheet.pptx
+++ b/reference/figures/cheatsheet/cheatsheet.pptx
@@ -441,6 +441,52 @@
     </pc:docChg>
   </pc:docChgLst>
   <pc:docChgLst>
+    <pc:chgData name="Derks, Koen" userId="42903d96-be75-4cec-9136-f3710e86cd30" providerId="ADAL" clId="{76736121-1439-4CC5-B71A-43EA3D14E7B7}"/>
+    <pc:docChg chg="delSld modSld">
+      <pc:chgData name="Derks, Koen" userId="42903d96-be75-4cec-9136-f3710e86cd30" providerId="ADAL" clId="{76736121-1439-4CC5-B71A-43EA3D14E7B7}" dt="2020-11-28T22:53:19.244" v="23" actId="20577"/>
+      <pc:docMkLst>
+        <pc:docMk/>
+      </pc:docMkLst>
+      <pc:sldChg chg="del">
+        <pc:chgData name="Derks, Koen" userId="42903d96-be75-4cec-9136-f3710e86cd30" providerId="ADAL" clId="{76736121-1439-4CC5-B71A-43EA3D14E7B7}" dt="2020-11-28T22:52:40.993" v="0" actId="47"/>
+        <pc:sldMkLst>
+          <pc:docMk/>
+          <pc:sldMk cId="0" sldId="256"/>
+        </pc:sldMkLst>
+      </pc:sldChg>
+      <pc:sldChg chg="modSp mod">
+        <pc:chgData name="Derks, Koen" userId="42903d96-be75-4cec-9136-f3710e86cd30" providerId="ADAL" clId="{76736121-1439-4CC5-B71A-43EA3D14E7B7}" dt="2020-11-28T22:53:19.244" v="23" actId="20577"/>
+        <pc:sldMkLst>
+          <pc:docMk/>
+          <pc:sldMk cId="0" sldId="257"/>
+        </pc:sldMkLst>
+        <pc:spChg chg="mod">
+          <ac:chgData name="Derks, Koen" userId="42903d96-be75-4cec-9136-f3710e86cd30" providerId="ADAL" clId="{76736121-1439-4CC5-B71A-43EA3D14E7B7}" dt="2020-11-28T22:53:19.244" v="23" actId="20577"/>
+          <ac:spMkLst>
+            <pc:docMk/>
+            <pc:sldMk cId="0" sldId="257"/>
+            <ac:spMk id="334" creationId="{00000000-0000-0000-0000-000000000000}"/>
+          </ac:spMkLst>
+        </pc:spChg>
+      </pc:sldChg>
+      <pc:sldMasterChg chg="delSldLayout">
+        <pc:chgData name="Derks, Koen" userId="42903d96-be75-4cec-9136-f3710e86cd30" providerId="ADAL" clId="{76736121-1439-4CC5-B71A-43EA3D14E7B7}" dt="2020-11-28T22:52:40.993" v="0" actId="47"/>
+        <pc:sldMasterMkLst>
+          <pc:docMk/>
+          <pc:sldMasterMk cId="0" sldId="2147483648"/>
+        </pc:sldMasterMkLst>
+        <pc:sldLayoutChg chg="del">
+          <pc:chgData name="Derks, Koen" userId="42903d96-be75-4cec-9136-f3710e86cd30" providerId="ADAL" clId="{76736121-1439-4CC5-B71A-43EA3D14E7B7}" dt="2020-11-28T22:52:40.993" v="0" actId="47"/>
+          <pc:sldLayoutMkLst>
+            <pc:docMk/>
+            <pc:sldMasterMk cId="0" sldId="2147483648"/>
+            <pc:sldLayoutMk cId="0" sldId="2147483661"/>
+          </pc:sldLayoutMkLst>
+        </pc:sldLayoutChg>
+      </pc:sldMasterChg>
+    </pc:docChg>
+  </pc:docChgLst>
+  <pc:docChgLst>
     <pc:chgData name="Derks, Koen" userId="42903d96-be75-4cec-9136-f3710e86cd30" providerId="ADAL" clId="{B2C99C48-803B-45C3-BEC8-064BF2898A74}"/>
     <pc:docChg chg="custSel modSld">
       <pc:chgData name="Derks, Koen" userId="42903d96-be75-4cec-9136-f3710e86cd30" providerId="ADAL" clId="{B2C99C48-803B-45C3-BEC8-064BF2898A74}" dt="2021-09-18T11:38:05.739" v="101"/>
@@ -486,52 +532,6 @@
           </ac:spMkLst>
         </pc:spChg>
       </pc:sldChg>
-    </pc:docChg>
-  </pc:docChgLst>
-  <pc:docChgLst>
-    <pc:chgData name="Derks, Koen" userId="42903d96-be75-4cec-9136-f3710e86cd30" providerId="ADAL" clId="{76736121-1439-4CC5-B71A-43EA3D14E7B7}"/>
-    <pc:docChg chg="delSld modSld">
-      <pc:chgData name="Derks, Koen" userId="42903d96-be75-4cec-9136-f3710e86cd30" providerId="ADAL" clId="{76736121-1439-4CC5-B71A-43EA3D14E7B7}" dt="2020-11-28T22:53:19.244" v="23" actId="20577"/>
-      <pc:docMkLst>
-        <pc:docMk/>
-      </pc:docMkLst>
-      <pc:sldChg chg="del">
-        <pc:chgData name="Derks, Koen" userId="42903d96-be75-4cec-9136-f3710e86cd30" providerId="ADAL" clId="{76736121-1439-4CC5-B71A-43EA3D14E7B7}" dt="2020-11-28T22:52:40.993" v="0" actId="47"/>
-        <pc:sldMkLst>
-          <pc:docMk/>
-          <pc:sldMk cId="0" sldId="256"/>
-        </pc:sldMkLst>
-      </pc:sldChg>
-      <pc:sldChg chg="modSp mod">
-        <pc:chgData name="Derks, Koen" userId="42903d96-be75-4cec-9136-f3710e86cd30" providerId="ADAL" clId="{76736121-1439-4CC5-B71A-43EA3D14E7B7}" dt="2020-11-28T22:53:19.244" v="23" actId="20577"/>
-        <pc:sldMkLst>
-          <pc:docMk/>
-          <pc:sldMk cId="0" sldId="257"/>
-        </pc:sldMkLst>
-        <pc:spChg chg="mod">
-          <ac:chgData name="Derks, Koen" userId="42903d96-be75-4cec-9136-f3710e86cd30" providerId="ADAL" clId="{76736121-1439-4CC5-B71A-43EA3D14E7B7}" dt="2020-11-28T22:53:19.244" v="23" actId="20577"/>
-          <ac:spMkLst>
-            <pc:docMk/>
-            <pc:sldMk cId="0" sldId="257"/>
-            <ac:spMk id="334" creationId="{00000000-0000-0000-0000-000000000000}"/>
-          </ac:spMkLst>
-        </pc:spChg>
-      </pc:sldChg>
-      <pc:sldMasterChg chg="delSldLayout">
-        <pc:chgData name="Derks, Koen" userId="42903d96-be75-4cec-9136-f3710e86cd30" providerId="ADAL" clId="{76736121-1439-4CC5-B71A-43EA3D14E7B7}" dt="2020-11-28T22:52:40.993" v="0" actId="47"/>
-        <pc:sldMasterMkLst>
-          <pc:docMk/>
-          <pc:sldMasterMk cId="0" sldId="2147483648"/>
-        </pc:sldMasterMkLst>
-        <pc:sldLayoutChg chg="del">
-          <pc:chgData name="Derks, Koen" userId="42903d96-be75-4cec-9136-f3710e86cd30" providerId="ADAL" clId="{76736121-1439-4CC5-B71A-43EA3D14E7B7}" dt="2020-11-28T22:52:40.993" v="0" actId="47"/>
-          <pc:sldLayoutMkLst>
-            <pc:docMk/>
-            <pc:sldMasterMk cId="0" sldId="2147483648"/>
-            <pc:sldLayoutMk cId="0" sldId="2147483661"/>
-          </pc:sldLayoutMkLst>
-        </pc:sldLayoutChg>
-      </pc:sldMasterChg>
     </pc:docChg>
   </pc:docChgLst>
   <pc:docChgLst>
@@ -2711,7 +2711,7 @@
           </a:ln>
           <a:extLst>
             <a:ext uri="{C572A759-6A51-4108-AA02-DFA0A04FC94B}">
-              <ma14:wrappingTextBoxFlag xmlns:ma14="http://schemas.microsoft.com/office/mac/drawingml/2011/main" xmlns:a14="http://schemas.microsoft.com/office/drawing/2010/main" xmlns:m="http://schemas.openxmlformats.org/officeDocument/2006/math" xmlns="" val="1"/>
+              <ma14:wrappingTextBoxFlag xmlns="" xmlns:m="http://schemas.openxmlformats.org/officeDocument/2006/math" xmlns:a14="http://schemas.microsoft.com/office/drawing/2010/main" xmlns:ma14="http://schemas.microsoft.com/office/mac/drawingml/2011/main" val="1"/>
             </a:ext>
           </a:extLst>
         </p:spPr>
@@ -2750,7 +2750,7 @@
           </a:ln>
           <a:extLst>
             <a:ext uri="{C572A759-6A51-4108-AA02-DFA0A04FC94B}">
-              <ma14:wrappingTextBoxFlag xmlns:ma14="http://schemas.microsoft.com/office/mac/drawingml/2011/main" xmlns:a14="http://schemas.microsoft.com/office/drawing/2010/main" xmlns:m="http://schemas.openxmlformats.org/officeDocument/2006/math" xmlns="" val="1"/>
+              <ma14:wrappingTextBoxFlag xmlns="" xmlns:m="http://schemas.openxmlformats.org/officeDocument/2006/math" xmlns:a14="http://schemas.microsoft.com/office/drawing/2010/main" xmlns:ma14="http://schemas.microsoft.com/office/mac/drawingml/2011/main" val="1"/>
             </a:ext>
           </a:extLst>
         </p:spPr>
@@ -3845,7 +3845,7 @@
           </a:ln>
           <a:extLst>
             <a:ext uri="{C572A759-6A51-4108-AA02-DFA0A04FC94B}">
-              <ma14:wrappingTextBoxFlag xmlns:ma14="http://schemas.microsoft.com/office/mac/drawingml/2011/main" xmlns:a14="http://schemas.microsoft.com/office/drawing/2010/main" xmlns:m="http://schemas.openxmlformats.org/officeDocument/2006/math" xmlns="" val="1"/>
+              <ma14:wrappingTextBoxFlag xmlns="" xmlns:m="http://schemas.openxmlformats.org/officeDocument/2006/math" xmlns:a14="http://schemas.microsoft.com/office/drawing/2010/main" xmlns:ma14="http://schemas.microsoft.com/office/mac/drawingml/2011/main" val="1"/>
             </a:ext>
           </a:extLst>
         </p:spPr>
@@ -3898,7 +3898,7 @@
           </a:ln>
           <a:extLst>
             <a:ext uri="{C572A759-6A51-4108-AA02-DFA0A04FC94B}">
-              <ma14:wrappingTextBoxFlag xmlns:ma14="http://schemas.microsoft.com/office/mac/drawingml/2011/main" xmlns:a14="http://schemas.microsoft.com/office/drawing/2010/main" xmlns:m="http://schemas.openxmlformats.org/officeDocument/2006/math" xmlns="" val="1"/>
+              <ma14:wrappingTextBoxFlag xmlns="" xmlns:m="http://schemas.openxmlformats.org/officeDocument/2006/math" xmlns:a14="http://schemas.microsoft.com/office/drawing/2010/main" xmlns:ma14="http://schemas.microsoft.com/office/mac/drawingml/2011/main" val="1"/>
             </a:ext>
           </a:extLst>
         </p:spPr>
@@ -4023,7 +4023,7 @@
             </a:r>
             <a:r>
               <a:rPr lang="nl-NL" dirty="0"/>
-              <a:t>1</a:t>
+              <a:t>2</a:t>
             </a:r>
             <a:r>
               <a:rPr dirty="0"/>
@@ -4039,7 +4039,7 @@
             </a:r>
             <a:r>
               <a:rPr lang="nl-NL" dirty="0"/>
-              <a:t>10</a:t>
+              <a:t>11</a:t>
             </a:r>
             <a:endParaRPr dirty="0"/>
           </a:p>
@@ -4064,7 +4064,7 @@
           </a:ln>
           <a:extLst>
             <a:ext uri="{C572A759-6A51-4108-AA02-DFA0A04FC94B}">
-              <ma14:wrappingTextBoxFlag xmlns:ma14="http://schemas.microsoft.com/office/mac/drawingml/2011/main" xmlns:a14="http://schemas.microsoft.com/office/drawing/2010/main" xmlns:m="http://schemas.openxmlformats.org/officeDocument/2006/math" xmlns="" val="1"/>
+              <ma14:wrappingTextBoxFlag xmlns="" xmlns:m="http://schemas.openxmlformats.org/officeDocument/2006/math" xmlns:a14="http://schemas.microsoft.com/office/drawing/2010/main" xmlns:ma14="http://schemas.microsoft.com/office/mac/drawingml/2011/main" val="1"/>
             </a:ext>
           </a:extLst>
         </p:spPr>
@@ -4540,7 +4540,7 @@
         </p:nvSpPr>
         <p:spPr>
           <a:xfrm>
-            <a:off x="4796180" y="2186698"/>
+            <a:off x="4796180" y="2352958"/>
             <a:ext cx="5613573" cy="1022763"/>
           </a:xfrm>
           <a:prstGeom prst="rect">
@@ -4551,7 +4551,7 @@
           </a:ln>
           <a:extLst>
             <a:ext uri="{C572A759-6A51-4108-AA02-DFA0A04FC94B}">
-              <ma14:wrappingTextBoxFlag xmlns:ma14="http://schemas.microsoft.com/office/mac/drawingml/2011/main" xmlns:a14="http://schemas.microsoft.com/office/drawing/2010/main" xmlns:m="http://schemas.openxmlformats.org/officeDocument/2006/math" xmlns="" val="1"/>
+              <ma14:wrappingTextBoxFlag xmlns="" xmlns:m="http://schemas.openxmlformats.org/officeDocument/2006/math" xmlns:a14="http://schemas.microsoft.com/office/drawing/2010/main" xmlns:ma14="http://schemas.microsoft.com/office/mac/drawingml/2011/main" val="1"/>
             </a:ext>
           </a:extLst>
         </p:spPr>
@@ -4740,7 +4740,7 @@
         </p:nvSpPr>
         <p:spPr>
           <a:xfrm>
-            <a:off x="10503567" y="2262262"/>
+            <a:off x="10503567" y="2428522"/>
             <a:ext cx="3143104" cy="417982"/>
           </a:xfrm>
           <a:prstGeom prst="rect">
@@ -4762,7 +4762,7 @@
           <a:effectLst/>
           <a:extLst>
             <a:ext uri="{C572A759-6A51-4108-AA02-DFA0A04FC94B}">
-              <ma14:wrappingTextBoxFlag xmlns:ma14="http://schemas.microsoft.com/office/mac/drawingml/2011/main" xmlns:a14="http://schemas.microsoft.com/office/drawing/2010/main" xmlns:m="http://schemas.openxmlformats.org/officeDocument/2006/math" xmlns="" val="1"/>
+              <ma14:wrappingTextBoxFlag xmlns="" xmlns:m="http://schemas.openxmlformats.org/officeDocument/2006/math" xmlns:a14="http://schemas.microsoft.com/office/drawing/2010/main" xmlns:ma14="http://schemas.microsoft.com/office/mac/drawingml/2011/main" val="1"/>
             </a:ext>
           </a:extLst>
         </p:spPr>
@@ -4930,7 +4930,7 @@
         </p:nvSpPr>
         <p:spPr>
           <a:xfrm>
-            <a:off x="4791188" y="1610302"/>
+            <a:off x="4791188" y="1776562"/>
             <a:ext cx="5493492" cy="277127"/>
           </a:xfrm>
           <a:prstGeom prst="rect">
@@ -4941,7 +4941,7 @@
           </a:ln>
           <a:extLst>
             <a:ext uri="{C572A759-6A51-4108-AA02-DFA0A04FC94B}">
-              <ma14:wrappingTextBoxFlag xmlns:ma14="http://schemas.microsoft.com/office/mac/drawingml/2011/main" xmlns:a14="http://schemas.microsoft.com/office/drawing/2010/main" xmlns:m="http://schemas.openxmlformats.org/officeDocument/2006/math" xmlns="" val="1"/>
+              <ma14:wrappingTextBoxFlag xmlns="" xmlns:m="http://schemas.openxmlformats.org/officeDocument/2006/math" xmlns:a14="http://schemas.microsoft.com/office/drawing/2010/main" xmlns:ma14="http://schemas.microsoft.com/office/mac/drawingml/2011/main" val="1"/>
             </a:ext>
           </a:extLst>
         </p:spPr>
@@ -5093,7 +5093,7 @@
         </p:nvSpPr>
         <p:spPr>
           <a:xfrm>
-            <a:off x="4814439" y="1903347"/>
+            <a:off x="4814439" y="2069607"/>
             <a:ext cx="1606209" cy="210314"/>
           </a:xfrm>
           <a:prstGeom prst="rect">
@@ -5107,7 +5107,7 @@
           <a:effectLst/>
           <a:extLst>
             <a:ext uri="{C572A759-6A51-4108-AA02-DFA0A04FC94B}">
-              <ma14:wrappingTextBoxFlag xmlns="" xmlns:m="http://schemas.openxmlformats.org/officeDocument/2006/math" xmlns:a14="http://schemas.microsoft.com/office/drawing/2010/main" xmlns:ma14="http://schemas.microsoft.com/office/mac/drawingml/2011/main" xmlns:lc="http://schemas.openxmlformats.org/drawingml/2006/lockedCanvas" val="1"/>
+              <ma14:wrappingTextBoxFlag xmlns:lc="http://schemas.openxmlformats.org/drawingml/2006/lockedCanvas" xmlns:ma14="http://schemas.microsoft.com/office/mac/drawingml/2011/main" xmlns:a14="http://schemas.microsoft.com/office/drawing/2010/main" xmlns:m="http://schemas.openxmlformats.org/officeDocument/2006/math" xmlns="" val="1"/>
             </a:ext>
           </a:extLst>
         </p:spPr>
@@ -5494,7 +5494,7 @@
         </p:nvSpPr>
         <p:spPr>
           <a:xfrm>
-            <a:off x="9428960" y="3200892"/>
+            <a:off x="9428960" y="3505702"/>
             <a:ext cx="4264736" cy="0"/>
           </a:xfrm>
           <a:prstGeom prst="line">
@@ -5542,7 +5542,7 @@
         </p:nvSpPr>
         <p:spPr>
           <a:xfrm>
-            <a:off x="4816711" y="3200892"/>
+            <a:off x="4816711" y="3505702"/>
             <a:ext cx="7110861" cy="0"/>
           </a:xfrm>
           <a:prstGeom prst="line">
@@ -5590,8 +5590,8 @@
         </p:nvSpPr>
         <p:spPr>
           <a:xfrm>
-            <a:off x="4798452" y="3875064"/>
-            <a:ext cx="5567197" cy="1022763"/>
+            <a:off x="4798452" y="4249145"/>
+            <a:ext cx="5567197" cy="1432106"/>
           </a:xfrm>
           <a:prstGeom prst="rect">
             <a:avLst/>
@@ -5601,7 +5601,7 @@
           </a:ln>
           <a:extLst>
             <a:ext uri="{C572A759-6A51-4108-AA02-DFA0A04FC94B}">
-              <ma14:wrappingTextBoxFlag xmlns:ma14="http://schemas.microsoft.com/office/mac/drawingml/2011/main" xmlns:a14="http://schemas.microsoft.com/office/drawing/2010/main" xmlns:m="http://schemas.openxmlformats.org/officeDocument/2006/math" xmlns="" val="1"/>
+              <ma14:wrappingTextBoxFlag xmlns="" xmlns:m="http://schemas.openxmlformats.org/officeDocument/2006/math" xmlns:a14="http://schemas.microsoft.com/office/drawing/2010/main" xmlns:ma14="http://schemas.microsoft.com/office/mac/drawingml/2011/main" val="1"/>
             </a:ext>
           </a:extLst>
         </p:spPr>
@@ -5812,6 +5812,53 @@
                 <a:latin typeface="Courier New" panose="02070309020205020404" pitchFamily="49" charset="0"/>
                 <a:cs typeface="Courier New" panose="02070309020205020404" pitchFamily="49" charset="0"/>
               </a:rPr>
+              <a:t>materiality</a:t>
+            </a:r>
+            <a:r>
+              <a:rPr lang="en-US" b="0" dirty="0">
+                <a:solidFill>
+                  <a:srgbClr val="000000"/>
+                </a:solidFill>
+                <a:latin typeface="+mn-lt"/>
+              </a:rPr>
+              <a:t>: A fraction specifying the maximum tolerable misstatement.</a:t>
+            </a:r>
+          </a:p>
+          <a:p>
+            <a:pPr marL="171450" indent="-171450">
+              <a:lnSpc>
+                <a:spcPct val="90000"/>
+              </a:lnSpc>
+              <a:spcBef>
+                <a:spcPts val="300"/>
+              </a:spcBef>
+              <a:buClr>
+                <a:schemeClr val="accent4">
+                  <a:hueOff val="384618"/>
+                  <a:satOff val="3869"/>
+                  <a:lumOff val="5802"/>
+                </a:schemeClr>
+              </a:buClr>
+              <a:buFont typeface="Arial" panose="020B0604020202020204" pitchFamily="34" charset="0"/>
+              <a:buChar char="•"/>
+              <a:defRPr b="0">
+                <a:solidFill>
+                  <a:srgbClr val="000000"/>
+                </a:solidFill>
+                <a:latin typeface="+mn-lt"/>
+                <a:ea typeface="+mn-ea"/>
+                <a:cs typeface="+mn-cs"/>
+                <a:sym typeface="Source Sans Pro Light"/>
+              </a:defRPr>
+            </a:pPr>
+            <a:r>
+              <a:rPr lang="en-US" b="0" dirty="0">
+                <a:solidFill>
+                  <a:schemeClr val="accent1"/>
+                </a:solidFill>
+                <a:latin typeface="Courier New" panose="02070309020205020404" pitchFamily="49" charset="0"/>
+                <a:cs typeface="Courier New" panose="02070309020205020404" pitchFamily="49" charset="0"/>
+              </a:rPr>
               <a:t>expected</a:t>
             </a:r>
             <a:r>
@@ -5821,11 +5868,55 @@
                 </a:solidFill>
                 <a:latin typeface="+mn-lt"/>
               </a:rPr>
-              <a:t>: A fraction or an integer specifying the expected errors in the sample.</a:t>
-            </a:r>
-            <a:endParaRPr dirty="0">
-              <a:latin typeface="+mn-lt"/>
-            </a:endParaRPr>
+              <a:t>: A fraction or an integer specifying the tolerable errors in the sample.</a:t>
+            </a:r>
+          </a:p>
+          <a:p>
+            <a:pPr marL="171450" indent="-171450">
+              <a:lnSpc>
+                <a:spcPct val="90000"/>
+              </a:lnSpc>
+              <a:spcBef>
+                <a:spcPts val="300"/>
+              </a:spcBef>
+              <a:buClr>
+                <a:schemeClr val="accent4">
+                  <a:hueOff val="384618"/>
+                  <a:satOff val="3869"/>
+                  <a:lumOff val="5802"/>
+                </a:schemeClr>
+              </a:buClr>
+              <a:buFont typeface="Arial" panose="020B0604020202020204" pitchFamily="34" charset="0"/>
+              <a:buChar char="•"/>
+              <a:defRPr b="0">
+                <a:solidFill>
+                  <a:srgbClr val="000000"/>
+                </a:solidFill>
+                <a:latin typeface="+mn-lt"/>
+                <a:ea typeface="+mn-ea"/>
+                <a:cs typeface="+mn-cs"/>
+                <a:sym typeface="Source Sans Pro Light"/>
+              </a:defRPr>
+            </a:pPr>
+            <a:r>
+              <a:rPr lang="en-US" b="0" dirty="0" err="1">
+                <a:solidFill>
+                  <a:schemeClr val="accent1"/>
+                </a:solidFill>
+                <a:latin typeface="Courier New" panose="02070309020205020404" pitchFamily="49" charset="0"/>
+                <a:cs typeface="Courier New" panose="02070309020205020404" pitchFamily="49" charset="0"/>
+              </a:rPr>
+              <a:t>conf.level</a:t>
+            </a:r>
+            <a:r>
+              <a:rPr lang="en-US" b="0" dirty="0">
+                <a:solidFill>
+                  <a:srgbClr val="000000"/>
+                </a:solidFill>
+                <a:latin typeface="+mn-lt"/>
+              </a:rPr>
+              <a:t>: A fraction specifying the confidence level needed.</a:t>
+            </a:r>
           </a:p>
         </p:txBody>
       </p:sp>
@@ -5843,7 +5934,7 @@
         </p:nvSpPr>
         <p:spPr>
           <a:xfrm>
-            <a:off x="4793460" y="3280844"/>
+            <a:off x="4793460" y="3654925"/>
             <a:ext cx="3826368" cy="277127"/>
           </a:xfrm>
           <a:prstGeom prst="rect">
@@ -5854,7 +5945,7 @@
           </a:ln>
           <a:extLst>
             <a:ext uri="{C572A759-6A51-4108-AA02-DFA0A04FC94B}">
-              <ma14:wrappingTextBoxFlag xmlns:ma14="http://schemas.microsoft.com/office/mac/drawingml/2011/main" xmlns:a14="http://schemas.microsoft.com/office/drawing/2010/main" xmlns:m="http://schemas.openxmlformats.org/officeDocument/2006/math" xmlns="" val="1"/>
+              <ma14:wrappingTextBoxFlag xmlns="" xmlns:m="http://schemas.openxmlformats.org/officeDocument/2006/math" xmlns:a14="http://schemas.microsoft.com/office/drawing/2010/main" xmlns:ma14="http://schemas.microsoft.com/office/mac/drawingml/2011/main" val="1"/>
             </a:ext>
           </a:extLst>
         </p:spPr>
@@ -5904,7 +5995,7 @@
         </p:nvSpPr>
         <p:spPr>
           <a:xfrm>
-            <a:off x="4816711" y="3573889"/>
+            <a:off x="4816711" y="3947970"/>
             <a:ext cx="1420261" cy="210314"/>
           </a:xfrm>
           <a:prstGeom prst="rect">
@@ -5918,7 +6009,7 @@
           <a:effectLst/>
           <a:extLst>
             <a:ext uri="{C572A759-6A51-4108-AA02-DFA0A04FC94B}">
-              <ma14:wrappingTextBoxFlag xmlns="" xmlns:m="http://schemas.openxmlformats.org/officeDocument/2006/math" xmlns:a14="http://schemas.microsoft.com/office/drawing/2010/main" xmlns:ma14="http://schemas.microsoft.com/office/mac/drawingml/2011/main" xmlns:lc="http://schemas.openxmlformats.org/drawingml/2006/lockedCanvas" val="1"/>
+              <ma14:wrappingTextBoxFlag xmlns:lc="http://schemas.openxmlformats.org/drawingml/2006/lockedCanvas" xmlns:ma14="http://schemas.microsoft.com/office/mac/drawingml/2011/main" xmlns:a14="http://schemas.microsoft.com/office/drawing/2010/main" xmlns:m="http://schemas.openxmlformats.org/officeDocument/2006/math" xmlns="" val="1"/>
             </a:ext>
           </a:extLst>
         </p:spPr>
@@ -6279,7 +6370,7 @@
         </p:nvSpPr>
         <p:spPr>
           <a:xfrm>
-            <a:off x="9431232" y="5057645"/>
+            <a:off x="9431232" y="5875080"/>
             <a:ext cx="4264736" cy="0"/>
           </a:xfrm>
           <a:prstGeom prst="line">
@@ -6327,7 +6418,7 @@
         </p:nvSpPr>
         <p:spPr>
           <a:xfrm>
-            <a:off x="4818983" y="5057645"/>
+            <a:off x="4818983" y="5875080"/>
             <a:ext cx="7110861" cy="0"/>
           </a:xfrm>
           <a:prstGeom prst="line">
@@ -6375,7 +6466,7 @@
         </p:nvSpPr>
         <p:spPr>
           <a:xfrm>
-            <a:off x="4800724" y="5731817"/>
+            <a:off x="4800724" y="6646231"/>
             <a:ext cx="5564925" cy="613421"/>
           </a:xfrm>
           <a:prstGeom prst="rect">
@@ -6386,7 +6477,7 @@
           </a:ln>
           <a:extLst>
             <a:ext uri="{C572A759-6A51-4108-AA02-DFA0A04FC94B}">
-              <ma14:wrappingTextBoxFlag xmlns:ma14="http://schemas.microsoft.com/office/mac/drawingml/2011/main" xmlns:a14="http://schemas.microsoft.com/office/drawing/2010/main" xmlns:m="http://schemas.openxmlformats.org/officeDocument/2006/math" xmlns="" val="1"/>
+              <ma14:wrappingTextBoxFlag xmlns="" xmlns:m="http://schemas.openxmlformats.org/officeDocument/2006/math" xmlns:a14="http://schemas.microsoft.com/office/drawing/2010/main" xmlns:ma14="http://schemas.microsoft.com/office/mac/drawingml/2011/main" val="1"/>
             </a:ext>
           </a:extLst>
         </p:spPr>
@@ -6508,7 +6599,7 @@
         </p:nvSpPr>
         <p:spPr>
           <a:xfrm>
-            <a:off x="4795732" y="5137597"/>
+            <a:off x="4795732" y="6052011"/>
             <a:ext cx="4921219" cy="277127"/>
           </a:xfrm>
           <a:prstGeom prst="rect">
@@ -6519,7 +6610,7 @@
           </a:ln>
           <a:extLst>
             <a:ext uri="{C572A759-6A51-4108-AA02-DFA0A04FC94B}">
-              <ma14:wrappingTextBoxFlag xmlns:ma14="http://schemas.microsoft.com/office/mac/drawingml/2011/main" xmlns:a14="http://schemas.microsoft.com/office/drawing/2010/main" xmlns:m="http://schemas.openxmlformats.org/officeDocument/2006/math" xmlns="" val="1"/>
+              <ma14:wrappingTextBoxFlag xmlns="" xmlns:m="http://schemas.openxmlformats.org/officeDocument/2006/math" xmlns:a14="http://schemas.microsoft.com/office/drawing/2010/main" xmlns:ma14="http://schemas.microsoft.com/office/mac/drawingml/2011/main" val="1"/>
             </a:ext>
           </a:extLst>
         </p:spPr>
@@ -6666,7 +6757,7 @@
         </p:nvSpPr>
         <p:spPr>
           <a:xfrm>
-            <a:off x="4818983" y="5430642"/>
+            <a:off x="4818983" y="6345056"/>
             <a:ext cx="1513235" cy="210314"/>
           </a:xfrm>
           <a:prstGeom prst="rect">
@@ -6680,7 +6771,7 @@
           <a:effectLst/>
           <a:extLst>
             <a:ext uri="{C572A759-6A51-4108-AA02-DFA0A04FC94B}">
-              <ma14:wrappingTextBoxFlag xmlns="" xmlns:m="http://schemas.openxmlformats.org/officeDocument/2006/math" xmlns:a14="http://schemas.microsoft.com/office/drawing/2010/main" xmlns:ma14="http://schemas.microsoft.com/office/mac/drawingml/2011/main" xmlns:lc="http://schemas.openxmlformats.org/drawingml/2006/lockedCanvas" val="1"/>
+              <ma14:wrappingTextBoxFlag xmlns:lc="http://schemas.openxmlformats.org/drawingml/2006/lockedCanvas" xmlns:ma14="http://schemas.microsoft.com/office/mac/drawingml/2011/main" xmlns:a14="http://schemas.microsoft.com/office/drawing/2010/main" xmlns:m="http://schemas.openxmlformats.org/officeDocument/2006/math" xmlns="" val="1"/>
             </a:ext>
           </a:extLst>
         </p:spPr>
@@ -7067,7 +7158,7 @@
         </p:nvSpPr>
         <p:spPr>
           <a:xfrm>
-            <a:off x="9433504" y="6669642"/>
+            <a:off x="9433504" y="7653329"/>
             <a:ext cx="4264736" cy="0"/>
           </a:xfrm>
           <a:prstGeom prst="line">
@@ -7115,7 +7206,7 @@
         </p:nvSpPr>
         <p:spPr>
           <a:xfrm>
-            <a:off x="4821255" y="6669642"/>
+            <a:off x="4821255" y="7653329"/>
             <a:ext cx="7110861" cy="0"/>
           </a:xfrm>
           <a:prstGeom prst="line">
@@ -7163,7 +7254,7 @@
         </p:nvSpPr>
         <p:spPr>
           <a:xfrm>
-            <a:off x="4802996" y="7343814"/>
+            <a:off x="4802996" y="8438319"/>
             <a:ext cx="5562653" cy="1188963"/>
           </a:xfrm>
           <a:prstGeom prst="rect">
@@ -7174,7 +7265,7 @@
           </a:ln>
           <a:extLst>
             <a:ext uri="{C572A759-6A51-4108-AA02-DFA0A04FC94B}">
-              <ma14:wrappingTextBoxFlag xmlns:ma14="http://schemas.microsoft.com/office/mac/drawingml/2011/main" xmlns:a14="http://schemas.microsoft.com/office/drawing/2010/main" xmlns:m="http://schemas.openxmlformats.org/officeDocument/2006/math" xmlns="" val="1"/>
+              <ma14:wrappingTextBoxFlag xmlns="" xmlns:m="http://schemas.openxmlformats.org/officeDocument/2006/math" xmlns:a14="http://schemas.microsoft.com/office/drawing/2010/main" xmlns:ma14="http://schemas.microsoft.com/office/mac/drawingml/2011/main" val="1"/>
             </a:ext>
           </a:extLst>
         </p:spPr>
@@ -7502,7 +7593,7 @@
         </p:nvSpPr>
         <p:spPr>
           <a:xfrm>
-            <a:off x="4798004" y="6749594"/>
+            <a:off x="4798004" y="7844099"/>
             <a:ext cx="4908395" cy="277127"/>
           </a:xfrm>
           <a:prstGeom prst="rect">
@@ -7513,7 +7604,7 @@
           </a:ln>
           <a:extLst>
             <a:ext uri="{C572A759-6A51-4108-AA02-DFA0A04FC94B}">
-              <ma14:wrappingTextBoxFlag xmlns:ma14="http://schemas.microsoft.com/office/mac/drawingml/2011/main" xmlns:a14="http://schemas.microsoft.com/office/drawing/2010/main" xmlns:m="http://schemas.openxmlformats.org/officeDocument/2006/math" xmlns="" val="1"/>
+              <ma14:wrappingTextBoxFlag xmlns="" xmlns:m="http://schemas.openxmlformats.org/officeDocument/2006/math" xmlns:a14="http://schemas.microsoft.com/office/drawing/2010/main" xmlns:ma14="http://schemas.microsoft.com/office/mac/drawingml/2011/main" val="1"/>
             </a:ext>
           </a:extLst>
         </p:spPr>
@@ -7630,7 +7721,7 @@
         </p:nvSpPr>
         <p:spPr>
           <a:xfrm>
-            <a:off x="4821255" y="7042639"/>
+            <a:off x="4821255" y="8137144"/>
             <a:ext cx="1606209" cy="210314"/>
           </a:xfrm>
           <a:prstGeom prst="rect">
@@ -7644,7 +7735,7 @@
           <a:effectLst/>
           <a:extLst>
             <a:ext uri="{C572A759-6A51-4108-AA02-DFA0A04FC94B}">
-              <ma14:wrappingTextBoxFlag xmlns="" xmlns:m="http://schemas.openxmlformats.org/officeDocument/2006/math" xmlns:a14="http://schemas.microsoft.com/office/drawing/2010/main" xmlns:ma14="http://schemas.microsoft.com/office/mac/drawingml/2011/main" xmlns:lc="http://schemas.openxmlformats.org/drawingml/2006/lockedCanvas" val="1"/>
+              <ma14:wrappingTextBoxFlag xmlns:lc="http://schemas.openxmlformats.org/drawingml/2006/lockedCanvas" xmlns:ma14="http://schemas.microsoft.com/office/mac/drawingml/2011/main" xmlns:a14="http://schemas.microsoft.com/office/drawing/2010/main" xmlns:m="http://schemas.openxmlformats.org/officeDocument/2006/math" xmlns="" val="1"/>
             </a:ext>
           </a:extLst>
         </p:spPr>
@@ -8031,7 +8122,7 @@
         </p:nvSpPr>
         <p:spPr>
           <a:xfrm>
-            <a:off x="9435776" y="8702032"/>
+            <a:off x="9435776" y="9921232"/>
             <a:ext cx="4264736" cy="0"/>
           </a:xfrm>
           <a:prstGeom prst="line">
@@ -8079,7 +8170,7 @@
         </p:nvSpPr>
         <p:spPr>
           <a:xfrm>
-            <a:off x="4823527" y="8702032"/>
+            <a:off x="4823527" y="9921232"/>
             <a:ext cx="7110861" cy="0"/>
           </a:xfrm>
           <a:prstGeom prst="line">
@@ -8110,604 +8201,6 @@
               </a:defRPr>
             </a:pPr>
             <a:endParaRPr/>
-          </a:p>
-        </p:txBody>
-      </p:sp>
-      <p:sp>
-        <p:nvSpPr>
-          <p:cNvPr id="139" name="Use headers, colors, and/or backgrounds to separate or group together sections.">
-            <a:extLst>
-              <a:ext uri="{FF2B5EF4-FFF2-40B4-BE49-F238E27FC236}">
-                <a16:creationId xmlns:a16="http://schemas.microsoft.com/office/drawing/2014/main" id="{F2B32D8F-8679-461C-AB88-ED31B7806035}"/>
-              </a:ext>
-            </a:extLst>
-          </p:cNvPr>
-          <p:cNvSpPr txBox="1"/>
-          <p:nvPr/>
-        </p:nvSpPr>
-        <p:spPr>
-          <a:xfrm>
-            <a:off x="4805268" y="9376204"/>
-            <a:ext cx="5484165" cy="608804"/>
-          </a:xfrm>
-          <a:prstGeom prst="rect">
-            <a:avLst/>
-          </a:prstGeom>
-          <a:ln w="12700">
-            <a:miter lim="400000"/>
-          </a:ln>
-          <a:extLst>
-            <a:ext uri="{C572A759-6A51-4108-AA02-DFA0A04FC94B}">
-              <ma14:wrappingTextBoxFlag xmlns:ma14="http://schemas.microsoft.com/office/mac/drawingml/2011/main" xmlns:a14="http://schemas.microsoft.com/office/drawing/2010/main" xmlns:m="http://schemas.openxmlformats.org/officeDocument/2006/math" xmlns="" val="1"/>
-            </a:ext>
-          </a:extLst>
-        </p:spPr>
-        <p:txBody>
-          <a:bodyPr wrap="square" lIns="54570" tIns="54570" rIns="54570" bIns="54570">
-            <a:spAutoFit/>
-          </a:bodyPr>
-          <a:lstStyle/>
-          <a:p>
-            <a:pPr algn="just">
-              <a:lnSpc>
-                <a:spcPct val="90000"/>
-              </a:lnSpc>
-              <a:spcBef>
-                <a:spcPts val="300"/>
-              </a:spcBef>
-              <a:buClr>
-                <a:schemeClr val="accent4">
-                  <a:hueOff val="384618"/>
-                  <a:satOff val="3869"/>
-                  <a:lumOff val="5802"/>
-                </a:schemeClr>
-              </a:buClr>
-              <a:defRPr b="0">
-                <a:solidFill>
-                  <a:srgbClr val="000000"/>
-                </a:solidFill>
-                <a:latin typeface="+mn-lt"/>
-                <a:ea typeface="+mn-ea"/>
-                <a:cs typeface="+mn-cs"/>
-                <a:sym typeface="Source Sans Pro Light"/>
-              </a:defRPr>
-            </a:pPr>
-            <a:r>
-              <a:rPr lang="en-US" dirty="0">
-                <a:latin typeface="+mn-lt"/>
-                <a:ea typeface="Source Sans Pro"/>
-                <a:cs typeface="Source Sans Pro"/>
-                <a:sym typeface="Source Sans Pro"/>
-              </a:rPr>
-              <a:t>This function takes an object of class </a:t>
-            </a:r>
-            <a:r>
-              <a:rPr lang="en-US" dirty="0" err="1">
-                <a:solidFill>
-                  <a:schemeClr val="accent1"/>
-                </a:solidFill>
-                <a:latin typeface="Courier New" panose="02070309020205020404" pitchFamily="49" charset="0"/>
-                <a:cs typeface="Courier New" panose="02070309020205020404" pitchFamily="49" charset="0"/>
-                <a:sym typeface="Source Sans Pro"/>
-              </a:rPr>
-              <a:t>jfaEvaluation</a:t>
-            </a:r>
-            <a:r>
-              <a:rPr lang="en-US" dirty="0">
-                <a:latin typeface="+mn-lt"/>
-                <a:ea typeface="Source Sans Pro"/>
-                <a:cs typeface="Source Sans Pro"/>
-                <a:sym typeface="Source Sans Pro"/>
-              </a:rPr>
-              <a:t> as returned by </a:t>
-            </a:r>
-            <a:r>
-              <a:rPr lang="en-US" b="0" dirty="0">
-                <a:solidFill>
-                  <a:schemeClr val="tx1"/>
-                </a:solidFill>
-                <a:latin typeface="Courier New" panose="02070309020205020404" pitchFamily="49" charset="0"/>
-                <a:ea typeface="Source Sans Pro"/>
-                <a:cs typeface="Courier New" panose="02070309020205020404" pitchFamily="49" charset="0"/>
-                <a:sym typeface="Source Sans Pro"/>
-              </a:rPr>
-              <a:t>evaluation()</a:t>
-            </a:r>
-            <a:r>
-              <a:rPr lang="en-US" dirty="0">
-                <a:latin typeface="+mn-lt"/>
-                <a:ea typeface="Source Sans Pro"/>
-                <a:cs typeface="Source Sans Pro"/>
-                <a:sym typeface="Source Sans Pro"/>
-              </a:rPr>
-              <a:t> and automatically generates a report containing the statistical results and their interpretation.</a:t>
-            </a:r>
-            <a:endParaRPr dirty="0">
-              <a:latin typeface="+mn-lt"/>
-            </a:endParaRPr>
-          </a:p>
-        </p:txBody>
-      </p:sp>
-      <p:sp>
-        <p:nvSpPr>
-          <p:cNvPr id="140" name="Layout Suggestions">
-            <a:extLst>
-              <a:ext uri="{FF2B5EF4-FFF2-40B4-BE49-F238E27FC236}">
-                <a16:creationId xmlns:a16="http://schemas.microsoft.com/office/drawing/2014/main" id="{6BAF5637-414B-416F-8562-F22A27CA0897}"/>
-              </a:ext>
-            </a:extLst>
-          </p:cNvPr>
-          <p:cNvSpPr txBox="1"/>
-          <p:nvPr/>
-        </p:nvSpPr>
-        <p:spPr>
-          <a:xfrm>
-            <a:off x="4800276" y="8781984"/>
-            <a:ext cx="4175823" cy="277127"/>
-          </a:xfrm>
-          <a:prstGeom prst="rect">
-            <a:avLst/>
-          </a:prstGeom>
-          <a:ln w="12700">
-            <a:miter lim="400000"/>
-          </a:ln>
-          <a:extLst>
-            <a:ext uri="{C572A759-6A51-4108-AA02-DFA0A04FC94B}">
-              <ma14:wrappingTextBoxFlag xmlns:ma14="http://schemas.microsoft.com/office/mac/drawingml/2011/main" xmlns:a14="http://schemas.microsoft.com/office/drawing/2010/main" xmlns:m="http://schemas.openxmlformats.org/officeDocument/2006/math" xmlns="" val="1"/>
-            </a:ext>
-          </a:extLst>
-        </p:spPr>
-        <p:txBody>
-          <a:bodyPr wrap="none" lIns="12700" tIns="12700" rIns="12700" bIns="12700" anchor="ctr">
-            <a:spAutoFit/>
-          </a:bodyPr>
-          <a:lstStyle/>
-          <a:p>
-            <a:pPr lvl="1" indent="0">
-              <a:lnSpc>
-                <a:spcPct val="80000"/>
-              </a:lnSpc>
-              <a:spcBef>
-                <a:spcPts val="0"/>
-              </a:spcBef>
-              <a:defRPr sz="2500" b="0">
-                <a:solidFill>
-                  <a:srgbClr val="628DB5"/>
-                </a:solidFill>
-              </a:defRPr>
-            </a:pPr>
-            <a:r>
-              <a:rPr lang="nl-NL" sz="2000" dirty="0" err="1">
-                <a:solidFill>
-                  <a:schemeClr val="tx1">
-                    <a:lumMod val="50000"/>
-                  </a:schemeClr>
-                </a:solidFill>
-              </a:rPr>
-              <a:t>Create</a:t>
-            </a:r>
-            <a:r>
-              <a:rPr lang="nl-NL" sz="2000" dirty="0">
-                <a:solidFill>
-                  <a:schemeClr val="tx1">
-                    <a:lumMod val="50000"/>
-                  </a:schemeClr>
-                </a:solidFill>
-              </a:rPr>
-              <a:t> a report of </a:t>
-            </a:r>
-            <a:r>
-              <a:rPr lang="nl-NL" sz="2000" dirty="0" err="1">
-                <a:solidFill>
-                  <a:schemeClr val="tx1">
-                    <a:lumMod val="50000"/>
-                  </a:schemeClr>
-                </a:solidFill>
-              </a:rPr>
-              <a:t>the</a:t>
-            </a:r>
-            <a:r>
-              <a:rPr lang="nl-NL" sz="2000" dirty="0">
-                <a:solidFill>
-                  <a:schemeClr val="tx1">
-                    <a:lumMod val="50000"/>
-                  </a:schemeClr>
-                </a:solidFill>
-              </a:rPr>
-              <a:t> statistical </a:t>
-            </a:r>
-            <a:r>
-              <a:rPr lang="nl-NL" sz="2000" dirty="0" err="1">
-                <a:solidFill>
-                  <a:schemeClr val="tx1">
-                    <a:lumMod val="50000"/>
-                  </a:schemeClr>
-                </a:solidFill>
-              </a:rPr>
-              <a:t>results</a:t>
-            </a:r>
-            <a:endParaRPr sz="2000" dirty="0">
-              <a:solidFill>
-                <a:schemeClr val="tx1">
-                  <a:lumMod val="50000"/>
-                </a:schemeClr>
-              </a:solidFill>
-            </a:endParaRPr>
-          </a:p>
-        </p:txBody>
-      </p:sp>
-      <p:sp>
-        <p:nvSpPr>
-          <p:cNvPr id="141" name="SUBTITLE">
-            <a:extLst>
-              <a:ext uri="{FF2B5EF4-FFF2-40B4-BE49-F238E27FC236}">
-                <a16:creationId xmlns:a16="http://schemas.microsoft.com/office/drawing/2014/main" id="{C6AAD9D5-B0E8-44D0-931B-ACB015F0D23B}"/>
-              </a:ext>
-            </a:extLst>
-          </p:cNvPr>
-          <p:cNvSpPr txBox="1"/>
-          <p:nvPr/>
-        </p:nvSpPr>
-        <p:spPr>
-          <a:xfrm>
-            <a:off x="4823527" y="9075029"/>
-            <a:ext cx="1234312" cy="210314"/>
-          </a:xfrm>
-          <a:prstGeom prst="rect">
-            <a:avLst/>
-          </a:prstGeom>
-          <a:noFill/>
-          <a:ln w="12700" cap="flat">
-            <a:noFill/>
-            <a:miter lim="400000"/>
-          </a:ln>
-          <a:effectLst/>
-          <a:extLst>
-            <a:ext uri="{C572A759-6A51-4108-AA02-DFA0A04FC94B}">
-              <ma14:wrappingTextBoxFlag xmlns="" xmlns:m="http://schemas.openxmlformats.org/officeDocument/2006/math" xmlns:a14="http://schemas.microsoft.com/office/drawing/2010/main" xmlns:ma14="http://schemas.microsoft.com/office/mac/drawingml/2011/main" xmlns:lc="http://schemas.openxmlformats.org/drawingml/2006/lockedCanvas" val="1"/>
-            </a:ext>
-          </a:extLst>
-        </p:spPr>
-        <p:txBody>
-          <a:bodyPr wrap="none" lIns="12700" tIns="12700" rIns="12700" bIns="12700" numCol="1" anchor="ctr">
-            <a:spAutoFit/>
-          </a:bodyPr>
-          <a:lstStyle>
-            <a:defPPr marL="0" marR="0" indent="0" algn="l" defTabSz="914400" rtl="0" fontAlgn="auto" latinLnBrk="1" hangingPunct="0">
-              <a:lnSpc>
-                <a:spcPct val="100000"/>
-              </a:lnSpc>
-              <a:spcBef>
-                <a:spcPts val="0"/>
-              </a:spcBef>
-              <a:spcAft>
-                <a:spcPts val="0"/>
-              </a:spcAft>
-              <a:buClrTx/>
-              <a:buSzTx/>
-              <a:buFontTx/>
-              <a:buNone/>
-              <a:tabLst/>
-              <a:defRPr kumimoji="0" sz="1800" b="0" i="0" u="none" strike="noStrike" cap="none" spc="0" normalizeH="0" baseline="0">
-                <a:ln>
-                  <a:noFill/>
-                </a:ln>
-                <a:solidFill>
-                  <a:srgbClr val="000000"/>
-                </a:solidFill>
-                <a:effectLst/>
-                <a:uFillTx/>
-              </a:defRPr>
-            </a:defPPr>
-            <a:lvl1pPr marL="0" marR="0" indent="0" algn="l" defTabSz="584200" rtl="0" fontAlgn="auto" latinLnBrk="0" hangingPunct="0">
-              <a:lnSpc>
-                <a:spcPct val="100000"/>
-              </a:lnSpc>
-              <a:spcBef>
-                <a:spcPts val="200"/>
-              </a:spcBef>
-              <a:spcAft>
-                <a:spcPts val="0"/>
-              </a:spcAft>
-              <a:buClrTx/>
-              <a:buSzTx/>
-              <a:buFontTx/>
-              <a:buNone/>
-              <a:tabLst/>
-              <a:defRPr kumimoji="0" sz="1200" b="1" i="0" u="none" strike="noStrike" cap="none" spc="0" normalizeH="0" baseline="0">
-                <a:ln>
-                  <a:noFill/>
-                </a:ln>
-                <a:solidFill>
-                  <a:srgbClr val="4C4C4C"/>
-                </a:solidFill>
-                <a:effectLst/>
-                <a:uFillTx/>
-                <a:latin typeface="Source Sans Pro"/>
-                <a:ea typeface="Source Sans Pro"/>
-                <a:cs typeface="Source Sans Pro"/>
-                <a:sym typeface="Source Sans Pro"/>
-              </a:defRPr>
-            </a:lvl1pPr>
-            <a:lvl2pPr marL="0" marR="0" indent="228600" algn="l" defTabSz="584200" rtl="0" fontAlgn="auto" latinLnBrk="0" hangingPunct="0">
-              <a:lnSpc>
-                <a:spcPct val="100000"/>
-              </a:lnSpc>
-              <a:spcBef>
-                <a:spcPts val="200"/>
-              </a:spcBef>
-              <a:spcAft>
-                <a:spcPts val="0"/>
-              </a:spcAft>
-              <a:buClrTx/>
-              <a:buSzTx/>
-              <a:buFontTx/>
-              <a:buNone/>
-              <a:tabLst/>
-              <a:defRPr kumimoji="0" sz="1200" b="1" i="0" u="none" strike="noStrike" cap="none" spc="0" normalizeH="0" baseline="0">
-                <a:ln>
-                  <a:noFill/>
-                </a:ln>
-                <a:solidFill>
-                  <a:srgbClr val="4C4C4C"/>
-                </a:solidFill>
-                <a:effectLst/>
-                <a:uFillTx/>
-                <a:latin typeface="Source Sans Pro"/>
-                <a:ea typeface="Source Sans Pro"/>
-                <a:cs typeface="Source Sans Pro"/>
-                <a:sym typeface="Source Sans Pro"/>
-              </a:defRPr>
-            </a:lvl2pPr>
-            <a:lvl3pPr marL="0" marR="0" indent="457200" algn="l" defTabSz="584200" rtl="0" fontAlgn="auto" latinLnBrk="0" hangingPunct="0">
-              <a:lnSpc>
-                <a:spcPct val="100000"/>
-              </a:lnSpc>
-              <a:spcBef>
-                <a:spcPts val="200"/>
-              </a:spcBef>
-              <a:spcAft>
-                <a:spcPts val="0"/>
-              </a:spcAft>
-              <a:buClrTx/>
-              <a:buSzTx/>
-              <a:buFontTx/>
-              <a:buNone/>
-              <a:tabLst/>
-              <a:defRPr kumimoji="0" sz="1200" b="1" i="0" u="none" strike="noStrike" cap="none" spc="0" normalizeH="0" baseline="0">
-                <a:ln>
-                  <a:noFill/>
-                </a:ln>
-                <a:solidFill>
-                  <a:srgbClr val="4C4C4C"/>
-                </a:solidFill>
-                <a:effectLst/>
-                <a:uFillTx/>
-                <a:latin typeface="Source Sans Pro"/>
-                <a:ea typeface="Source Sans Pro"/>
-                <a:cs typeface="Source Sans Pro"/>
-                <a:sym typeface="Source Sans Pro"/>
-              </a:defRPr>
-            </a:lvl3pPr>
-            <a:lvl4pPr marL="0" marR="0" indent="685800" algn="l" defTabSz="584200" rtl="0" fontAlgn="auto" latinLnBrk="0" hangingPunct="0">
-              <a:lnSpc>
-                <a:spcPct val="100000"/>
-              </a:lnSpc>
-              <a:spcBef>
-                <a:spcPts val="200"/>
-              </a:spcBef>
-              <a:spcAft>
-                <a:spcPts val="0"/>
-              </a:spcAft>
-              <a:buClrTx/>
-              <a:buSzTx/>
-              <a:buFontTx/>
-              <a:buNone/>
-              <a:tabLst/>
-              <a:defRPr kumimoji="0" sz="1200" b="1" i="0" u="none" strike="noStrike" cap="none" spc="0" normalizeH="0" baseline="0">
-                <a:ln>
-                  <a:noFill/>
-                </a:ln>
-                <a:solidFill>
-                  <a:srgbClr val="4C4C4C"/>
-                </a:solidFill>
-                <a:effectLst/>
-                <a:uFillTx/>
-                <a:latin typeface="Source Sans Pro"/>
-                <a:ea typeface="Source Sans Pro"/>
-                <a:cs typeface="Source Sans Pro"/>
-                <a:sym typeface="Source Sans Pro"/>
-              </a:defRPr>
-            </a:lvl4pPr>
-            <a:lvl5pPr marL="0" marR="0" indent="914400" algn="l" defTabSz="584200" rtl="0" fontAlgn="auto" latinLnBrk="0" hangingPunct="0">
-              <a:lnSpc>
-                <a:spcPct val="100000"/>
-              </a:lnSpc>
-              <a:spcBef>
-                <a:spcPts val="200"/>
-              </a:spcBef>
-              <a:spcAft>
-                <a:spcPts val="0"/>
-              </a:spcAft>
-              <a:buClrTx/>
-              <a:buSzTx/>
-              <a:buFontTx/>
-              <a:buNone/>
-              <a:tabLst/>
-              <a:defRPr kumimoji="0" sz="1200" b="1" i="0" u="none" strike="noStrike" cap="none" spc="0" normalizeH="0" baseline="0">
-                <a:ln>
-                  <a:noFill/>
-                </a:ln>
-                <a:solidFill>
-                  <a:srgbClr val="4C4C4C"/>
-                </a:solidFill>
-                <a:effectLst/>
-                <a:uFillTx/>
-                <a:latin typeface="Source Sans Pro"/>
-                <a:ea typeface="Source Sans Pro"/>
-                <a:cs typeface="Source Sans Pro"/>
-                <a:sym typeface="Source Sans Pro"/>
-              </a:defRPr>
-            </a:lvl5pPr>
-            <a:lvl6pPr marL="0" marR="0" indent="1143000" algn="l" defTabSz="584200" rtl="0" fontAlgn="auto" latinLnBrk="0" hangingPunct="0">
-              <a:lnSpc>
-                <a:spcPct val="100000"/>
-              </a:lnSpc>
-              <a:spcBef>
-                <a:spcPts val="200"/>
-              </a:spcBef>
-              <a:spcAft>
-                <a:spcPts val="0"/>
-              </a:spcAft>
-              <a:buClrTx/>
-              <a:buSzTx/>
-              <a:buFontTx/>
-              <a:buNone/>
-              <a:tabLst/>
-              <a:defRPr kumimoji="0" sz="1200" b="1" i="0" u="none" strike="noStrike" cap="none" spc="0" normalizeH="0" baseline="0">
-                <a:ln>
-                  <a:noFill/>
-                </a:ln>
-                <a:solidFill>
-                  <a:srgbClr val="4C4C4C"/>
-                </a:solidFill>
-                <a:effectLst/>
-                <a:uFillTx/>
-                <a:latin typeface="Source Sans Pro"/>
-                <a:ea typeface="Source Sans Pro"/>
-                <a:cs typeface="Source Sans Pro"/>
-                <a:sym typeface="Source Sans Pro"/>
-              </a:defRPr>
-            </a:lvl6pPr>
-            <a:lvl7pPr marL="0" marR="0" indent="1371600" algn="l" defTabSz="584200" rtl="0" fontAlgn="auto" latinLnBrk="0" hangingPunct="0">
-              <a:lnSpc>
-                <a:spcPct val="100000"/>
-              </a:lnSpc>
-              <a:spcBef>
-                <a:spcPts val="200"/>
-              </a:spcBef>
-              <a:spcAft>
-                <a:spcPts val="0"/>
-              </a:spcAft>
-              <a:buClrTx/>
-              <a:buSzTx/>
-              <a:buFontTx/>
-              <a:buNone/>
-              <a:tabLst/>
-              <a:defRPr kumimoji="0" sz="1200" b="1" i="0" u="none" strike="noStrike" cap="none" spc="0" normalizeH="0" baseline="0">
-                <a:ln>
-                  <a:noFill/>
-                </a:ln>
-                <a:solidFill>
-                  <a:srgbClr val="4C4C4C"/>
-                </a:solidFill>
-                <a:effectLst/>
-                <a:uFillTx/>
-                <a:latin typeface="Source Sans Pro"/>
-                <a:ea typeface="Source Sans Pro"/>
-                <a:cs typeface="Source Sans Pro"/>
-                <a:sym typeface="Source Sans Pro"/>
-              </a:defRPr>
-            </a:lvl7pPr>
-            <a:lvl8pPr marL="0" marR="0" indent="1600200" algn="l" defTabSz="584200" rtl="0" fontAlgn="auto" latinLnBrk="0" hangingPunct="0">
-              <a:lnSpc>
-                <a:spcPct val="100000"/>
-              </a:lnSpc>
-              <a:spcBef>
-                <a:spcPts val="200"/>
-              </a:spcBef>
-              <a:spcAft>
-                <a:spcPts val="0"/>
-              </a:spcAft>
-              <a:buClrTx/>
-              <a:buSzTx/>
-              <a:buFontTx/>
-              <a:buNone/>
-              <a:tabLst/>
-              <a:defRPr kumimoji="0" sz="1200" b="1" i="0" u="none" strike="noStrike" cap="none" spc="0" normalizeH="0" baseline="0">
-                <a:ln>
-                  <a:noFill/>
-                </a:ln>
-                <a:solidFill>
-                  <a:srgbClr val="4C4C4C"/>
-                </a:solidFill>
-                <a:effectLst/>
-                <a:uFillTx/>
-                <a:latin typeface="Source Sans Pro"/>
-                <a:ea typeface="Source Sans Pro"/>
-                <a:cs typeface="Source Sans Pro"/>
-                <a:sym typeface="Source Sans Pro"/>
-              </a:defRPr>
-            </a:lvl8pPr>
-            <a:lvl9pPr marL="0" marR="0" indent="1828800" algn="l" defTabSz="584200" rtl="0" fontAlgn="auto" latinLnBrk="0" hangingPunct="0">
-              <a:lnSpc>
-                <a:spcPct val="100000"/>
-              </a:lnSpc>
-              <a:spcBef>
-                <a:spcPts val="200"/>
-              </a:spcBef>
-              <a:spcAft>
-                <a:spcPts val="0"/>
-              </a:spcAft>
-              <a:buClrTx/>
-              <a:buSzTx/>
-              <a:buFontTx/>
-              <a:buNone/>
-              <a:tabLst/>
-              <a:defRPr kumimoji="0" sz="1200" b="1" i="0" u="none" strike="noStrike" cap="none" spc="0" normalizeH="0" baseline="0">
-                <a:ln>
-                  <a:noFill/>
-                </a:ln>
-                <a:solidFill>
-                  <a:srgbClr val="4C4C4C"/>
-                </a:solidFill>
-                <a:effectLst/>
-                <a:uFillTx/>
-                <a:latin typeface="Source Sans Pro"/>
-                <a:ea typeface="Source Sans Pro"/>
-                <a:cs typeface="Source Sans Pro"/>
-                <a:sym typeface="Source Sans Pro"/>
-              </a:defRPr>
-            </a:lvl9pPr>
-          </a:lstStyle>
-          <a:p>
-            <a:pPr lvl="1" indent="0"/>
-            <a:r>
-              <a:rPr lang="nl-NL" dirty="0" err="1">
-                <a:solidFill>
-                  <a:schemeClr val="tx1">
-                    <a:lumMod val="60000"/>
-                    <a:lumOff val="40000"/>
-                  </a:schemeClr>
-                </a:solidFill>
-                <a:latin typeface="Courier New" panose="02070309020205020404" pitchFamily="49" charset="0"/>
-                <a:cs typeface="Courier New" panose="02070309020205020404" pitchFamily="49" charset="0"/>
-              </a:rPr>
-              <a:t>jfa</a:t>
-            </a:r>
-            <a:r>
-              <a:rPr lang="nl-NL" dirty="0">
-                <a:solidFill>
-                  <a:schemeClr val="tx1">
-                    <a:lumMod val="60000"/>
-                    <a:lumOff val="40000"/>
-                  </a:schemeClr>
-                </a:solidFill>
-                <a:latin typeface="Courier New" panose="02070309020205020404" pitchFamily="49" charset="0"/>
-                <a:cs typeface="Courier New" panose="02070309020205020404" pitchFamily="49" charset="0"/>
-              </a:rPr>
-              <a:t>::report()</a:t>
-            </a:r>
-            <a:endParaRPr dirty="0">
-              <a:solidFill>
-                <a:schemeClr val="tx1">
-                  <a:lumMod val="60000"/>
-                  <a:lumOff val="40000"/>
-                </a:schemeClr>
-              </a:solidFill>
-              <a:latin typeface="Courier New" panose="02070309020205020404" pitchFamily="49" charset="0"/>
-              <a:cs typeface="Courier New" panose="02070309020205020404" pitchFamily="49" charset="0"/>
-            </a:endParaRPr>
           </a:p>
         </p:txBody>
       </p:sp>
@@ -8725,7 +8218,7 @@
         </p:nvSpPr>
         <p:spPr>
           <a:xfrm>
-            <a:off x="10503567" y="3945369"/>
+            <a:off x="10503567" y="4319450"/>
             <a:ext cx="3143104" cy="879647"/>
           </a:xfrm>
           <a:prstGeom prst="rect">
@@ -8747,7 +8240,7 @@
           <a:effectLst/>
           <a:extLst>
             <a:ext uri="{C572A759-6A51-4108-AA02-DFA0A04FC94B}">
-              <ma14:wrappingTextBoxFlag xmlns:ma14="http://schemas.microsoft.com/office/mac/drawingml/2011/main" xmlns:a14="http://schemas.microsoft.com/office/drawing/2010/main" xmlns:m="http://schemas.openxmlformats.org/officeDocument/2006/math" xmlns="" val="1"/>
+              <ma14:wrappingTextBoxFlag xmlns="" xmlns:m="http://schemas.openxmlformats.org/officeDocument/2006/math" xmlns:a14="http://schemas.microsoft.com/office/drawing/2010/main" xmlns:ma14="http://schemas.microsoft.com/office/mac/drawingml/2011/main" val="1"/>
             </a:ext>
           </a:extLst>
         </p:spPr>
@@ -9036,7 +8529,7 @@
         </p:nvSpPr>
         <p:spPr>
           <a:xfrm>
-            <a:off x="10503567" y="5787867"/>
+            <a:off x="10503567" y="6702281"/>
             <a:ext cx="3143104" cy="725759"/>
           </a:xfrm>
           <a:prstGeom prst="rect">
@@ -9058,7 +8551,7 @@
           <a:effectLst/>
           <a:extLst>
             <a:ext uri="{C572A759-6A51-4108-AA02-DFA0A04FC94B}">
-              <ma14:wrappingTextBoxFlag xmlns:ma14="http://schemas.microsoft.com/office/mac/drawingml/2011/main" xmlns:a14="http://schemas.microsoft.com/office/drawing/2010/main" xmlns:m="http://schemas.openxmlformats.org/officeDocument/2006/math" xmlns="" val="1"/>
+              <ma14:wrappingTextBoxFlag xmlns="" xmlns:m="http://schemas.openxmlformats.org/officeDocument/2006/math" xmlns:a14="http://schemas.microsoft.com/office/drawing/2010/main" xmlns:ma14="http://schemas.microsoft.com/office/mac/drawingml/2011/main" val="1"/>
             </a:ext>
           </a:extLst>
         </p:spPr>
@@ -9279,7 +8772,7 @@
         </p:nvSpPr>
         <p:spPr>
           <a:xfrm>
-            <a:off x="10503567" y="7414846"/>
+            <a:off x="10503567" y="8509351"/>
             <a:ext cx="3143103" cy="1187424"/>
           </a:xfrm>
           <a:prstGeom prst="rect">
@@ -9301,7 +8794,7 @@
           <a:effectLst/>
           <a:extLst>
             <a:ext uri="{C572A759-6A51-4108-AA02-DFA0A04FC94B}">
-              <ma14:wrappingTextBoxFlag xmlns:ma14="http://schemas.microsoft.com/office/mac/drawingml/2011/main" xmlns:a14="http://schemas.microsoft.com/office/drawing/2010/main" xmlns:m="http://schemas.openxmlformats.org/officeDocument/2006/math" xmlns="" val="1"/>
+              <ma14:wrappingTextBoxFlag xmlns="" xmlns:m="http://schemas.openxmlformats.org/officeDocument/2006/math" xmlns:a14="http://schemas.microsoft.com/office/drawing/2010/main" xmlns:ma14="http://schemas.microsoft.com/office/mac/drawingml/2011/main" val="1"/>
             </a:ext>
           </a:extLst>
         </p:spPr>
@@ -9660,142 +9153,6 @@
                 <a:cs typeface="Courier New" panose="02070309020205020404" pitchFamily="49" charset="0"/>
               </a:rPr>
               <a:t>           prior = FALSE, ...)</a:t>
-            </a:r>
-            <a:endParaRPr sz="1000" dirty="0">
-              <a:solidFill>
-                <a:schemeClr val="tx1">
-                  <a:lumMod val="50000"/>
-                </a:schemeClr>
-              </a:solidFill>
-              <a:latin typeface="Courier New" panose="02070309020205020404" pitchFamily="49" charset="0"/>
-              <a:cs typeface="Courier New" panose="02070309020205020404" pitchFamily="49" charset="0"/>
-            </a:endParaRPr>
-          </a:p>
-        </p:txBody>
-      </p:sp>
-      <p:sp>
-        <p:nvSpPr>
-          <p:cNvPr id="146" name="ggplot(mpg, aes(hwy, cty)) +…">
-            <a:extLst>
-              <a:ext uri="{FF2B5EF4-FFF2-40B4-BE49-F238E27FC236}">
-                <a16:creationId xmlns:a16="http://schemas.microsoft.com/office/drawing/2014/main" id="{7FDCB908-2F7E-48F5-81CD-C9EF3585FD33}"/>
-              </a:ext>
-            </a:extLst>
-          </p:cNvPr>
-          <p:cNvSpPr txBox="1"/>
-          <p:nvPr/>
-        </p:nvSpPr>
-        <p:spPr>
-          <a:xfrm>
-            <a:off x="10409753" y="9422768"/>
-            <a:ext cx="3178078" cy="417982"/>
-          </a:xfrm>
-          <a:prstGeom prst="rect">
-            <a:avLst/>
-          </a:prstGeom>
-          <a:solidFill>
-            <a:schemeClr val="accent1">
-              <a:lumMod val="20000"/>
-              <a:lumOff val="80000"/>
-              <a:alpha val="50000"/>
-            </a:schemeClr>
-          </a:solidFill>
-          <a:ln w="12700">
-            <a:solidFill>
-              <a:schemeClr val="bg1"/>
-            </a:solidFill>
-            <a:miter lim="400000"/>
-          </a:ln>
-          <a:effectLst/>
-          <a:extLst>
-            <a:ext uri="{C572A759-6A51-4108-AA02-DFA0A04FC94B}">
-              <ma14:wrappingTextBoxFlag xmlns:ma14="http://schemas.microsoft.com/office/mac/drawingml/2011/main" xmlns:a14="http://schemas.microsoft.com/office/drawing/2010/main" xmlns:m="http://schemas.openxmlformats.org/officeDocument/2006/math" xmlns="" val="1"/>
-            </a:ext>
-          </a:extLst>
-        </p:spPr>
-        <p:txBody>
-          <a:bodyPr wrap="square" lIns="54570" tIns="54570" rIns="54570" bIns="54570" anchor="ctr">
-            <a:spAutoFit/>
-          </a:bodyPr>
-          <a:lstStyle/>
-          <a:p>
-            <a:pPr>
-              <a:spcBef>
-                <a:spcPts val="0"/>
-              </a:spcBef>
-              <a:defRPr b="0">
-                <a:solidFill>
-                  <a:srgbClr val="000000"/>
-                </a:solidFill>
-                <a:latin typeface="Menlo"/>
-                <a:ea typeface="Menlo"/>
-                <a:cs typeface="Menlo"/>
-                <a:sym typeface="Menlo"/>
-              </a:defRPr>
-            </a:pPr>
-            <a:r>
-              <a:rPr lang="nl-NL" sz="1000" dirty="0">
-                <a:solidFill>
-                  <a:schemeClr val="tx1">
-                    <a:lumMod val="50000"/>
-                  </a:schemeClr>
-                </a:solidFill>
-                <a:latin typeface="Courier New" panose="02070309020205020404" pitchFamily="49" charset="0"/>
-                <a:cs typeface="Courier New" panose="02070309020205020404" pitchFamily="49" charset="0"/>
-              </a:rPr>
-              <a:t>report(object = </a:t>
-            </a:r>
-            <a:r>
-              <a:rPr lang="nl-NL" sz="1000" dirty="0" err="1">
-                <a:solidFill>
-                  <a:schemeClr val="tx1">
-                    <a:lumMod val="50000"/>
-                  </a:schemeClr>
-                </a:solidFill>
-                <a:latin typeface="Courier New" panose="02070309020205020404" pitchFamily="49" charset="0"/>
-                <a:cs typeface="Courier New" panose="02070309020205020404" pitchFamily="49" charset="0"/>
-              </a:rPr>
-              <a:t>evaluationResult</a:t>
-            </a:r>
-            <a:r>
-              <a:rPr lang="nl-NL" sz="1000" dirty="0">
-                <a:solidFill>
-                  <a:schemeClr val="tx1">
-                    <a:lumMod val="50000"/>
-                  </a:schemeClr>
-                </a:solidFill>
-                <a:latin typeface="Courier New" panose="02070309020205020404" pitchFamily="49" charset="0"/>
-                <a:cs typeface="Courier New" panose="02070309020205020404" pitchFamily="49" charset="0"/>
-              </a:rPr>
-              <a:t>,</a:t>
-            </a:r>
-          </a:p>
-          <a:p>
-            <a:pPr>
-              <a:spcBef>
-                <a:spcPts val="0"/>
-              </a:spcBef>
-              <a:defRPr b="0">
-                <a:solidFill>
-                  <a:srgbClr val="000000"/>
-                </a:solidFill>
-                <a:latin typeface="Menlo"/>
-                <a:ea typeface="Menlo"/>
-                <a:cs typeface="Menlo"/>
-                <a:sym typeface="Menlo"/>
-              </a:defRPr>
-            </a:pPr>
-            <a:r>
-              <a:rPr lang="nl-NL" sz="1000" dirty="0">
-                <a:solidFill>
-                  <a:schemeClr val="tx1">
-                    <a:lumMod val="50000"/>
-                  </a:schemeClr>
-                </a:solidFill>
-                <a:latin typeface="Courier New" panose="02070309020205020404" pitchFamily="49" charset="0"/>
-                <a:cs typeface="Courier New" panose="02070309020205020404" pitchFamily="49" charset="0"/>
-              </a:rPr>
-              <a:t>       file = 'report.html', ...)</a:t>
             </a:r>
             <a:endParaRPr sz="1000" dirty="0">
               <a:solidFill>
@@ -9839,7 +9196,7 @@
         </p:blipFill>
         <p:spPr>
           <a:xfrm>
-            <a:off x="3122229" y="3638229"/>
+            <a:off x="3122229" y="4123138"/>
             <a:ext cx="1381919" cy="963659"/>
           </a:xfrm>
           <a:prstGeom prst="rect">
@@ -9877,7 +9234,7 @@
         </p:blipFill>
         <p:spPr>
           <a:xfrm>
-            <a:off x="3405652" y="5465155"/>
+            <a:off x="3405652" y="6310292"/>
             <a:ext cx="1075796" cy="827268"/>
           </a:xfrm>
           <a:prstGeom prst="rect">
@@ -9915,46 +9272,8 @@
         </p:blipFill>
         <p:spPr>
           <a:xfrm>
-            <a:off x="3231466" y="7103227"/>
+            <a:off x="3231466" y="8336289"/>
             <a:ext cx="1225918" cy="951786"/>
-          </a:xfrm>
-          <a:prstGeom prst="rect">
-            <a:avLst/>
-          </a:prstGeom>
-        </p:spPr>
-      </p:pic>
-      <p:pic>
-        <p:nvPicPr>
-          <p:cNvPr id="18" name="Graphic 17">
-            <a:extLst>
-              <a:ext uri="{FF2B5EF4-FFF2-40B4-BE49-F238E27FC236}">
-                <a16:creationId xmlns:a16="http://schemas.microsoft.com/office/drawing/2014/main" id="{30905B44-6799-4078-BE7D-7E3472CDDF70}"/>
-              </a:ext>
-            </a:extLst>
-          </p:cNvPr>
-          <p:cNvPicPr>
-            <a:picLocks noChangeAspect="1"/>
-          </p:cNvPicPr>
-          <p:nvPr/>
-        </p:nvPicPr>
-        <p:blipFill rotWithShape="1">
-          <a:blip r:embed="rId6">
-            <a:extLst>
-              <a:ext uri="{28A0092B-C50C-407E-A947-70E740481C1C}">
-                <a14:useLocalDpi xmlns:a14="http://schemas.microsoft.com/office/drawing/2010/main" val="0"/>
-              </a:ext>
-              <a:ext uri="{96DAC541-7B7A-43D3-8B79-37D633B846F1}">
-                <asvg:svgBlip xmlns:asvg="http://schemas.microsoft.com/office/drawing/2016/SVG/main" r:embed="rId7"/>
-              </a:ext>
-            </a:extLst>
-          </a:blip>
-          <a:srcRect l="88899" t="-1" b="21466"/>
-          <a:stretch/>
-        </p:blipFill>
-        <p:spPr>
-          <a:xfrm>
-            <a:off x="3476669" y="8817333"/>
-            <a:ext cx="1249936" cy="969379"/>
           </a:xfrm>
           <a:prstGeom prst="rect">
             <a:avLst/>
@@ -9991,7 +9310,7 @@
         </p:blipFill>
         <p:spPr>
           <a:xfrm rot="5400000">
-            <a:off x="3707792" y="2977485"/>
+            <a:off x="3707792" y="3254580"/>
             <a:ext cx="405386" cy="473733"/>
           </a:xfrm>
           <a:prstGeom prst="rect">
@@ -10029,7 +9348,7 @@
         </p:blipFill>
         <p:spPr>
           <a:xfrm rot="5400000">
-            <a:off x="3703776" y="4802272"/>
+            <a:off x="3703776" y="5495010"/>
             <a:ext cx="405386" cy="473733"/>
           </a:xfrm>
           <a:prstGeom prst="rect">
@@ -10067,45 +9386,7 @@
         </p:blipFill>
         <p:spPr>
           <a:xfrm rot="5400000">
-            <a:off x="3699760" y="6482690"/>
-            <a:ext cx="405386" cy="473733"/>
-          </a:xfrm>
-          <a:prstGeom prst="rect">
-            <a:avLst/>
-          </a:prstGeom>
-        </p:spPr>
-      </p:pic>
-      <p:pic>
-        <p:nvPicPr>
-          <p:cNvPr id="63" name="Graphic 62">
-            <a:extLst>
-              <a:ext uri="{FF2B5EF4-FFF2-40B4-BE49-F238E27FC236}">
-                <a16:creationId xmlns:a16="http://schemas.microsoft.com/office/drawing/2014/main" id="{A936CAF7-412E-4DDC-9FDF-82ABB8CE5829}"/>
-              </a:ext>
-            </a:extLst>
-          </p:cNvPr>
-          <p:cNvPicPr>
-            <a:picLocks noChangeAspect="1"/>
-          </p:cNvPicPr>
-          <p:nvPr/>
-        </p:nvPicPr>
-        <p:blipFill rotWithShape="1">
-          <a:blip r:embed="rId6">
-            <a:extLst>
-              <a:ext uri="{28A0092B-C50C-407E-A947-70E740481C1C}">
-                <a14:useLocalDpi xmlns:a14="http://schemas.microsoft.com/office/drawing/2010/main" val="0"/>
-              </a:ext>
-              <a:ext uri="{96DAC541-7B7A-43D3-8B79-37D633B846F1}">
-                <asvg:svgBlip xmlns:asvg="http://schemas.microsoft.com/office/drawing/2016/SVG/main" r:embed="rId7"/>
-              </a:ext>
-            </a:extLst>
-          </a:blip>
-          <a:srcRect l="81312" t="14743" r="13505" b="29995"/>
-          <a:stretch/>
-        </p:blipFill>
-        <p:spPr>
-          <a:xfrm rot="5400000">
-            <a:off x="3719812" y="8319516"/>
+            <a:off x="3699760" y="7577214"/>
             <a:ext cx="405386" cy="473733"/>
           </a:xfrm>
           <a:prstGeom prst="rect">
@@ -10143,7 +9424,7 @@
         </p:blipFill>
         <p:spPr>
           <a:xfrm>
-            <a:off x="3477464" y="1835209"/>
+            <a:off x="3477464" y="2070739"/>
             <a:ext cx="990588" cy="951786"/>
           </a:xfrm>
           <a:prstGeom prst="rect">
@@ -10176,7 +9457,7 @@
           </a:ln>
           <a:extLst>
             <a:ext uri="{C572A759-6A51-4108-AA02-DFA0A04FC94B}">
-              <ma14:wrappingTextBoxFlag xmlns:ma14="http://schemas.microsoft.com/office/mac/drawingml/2011/main" xmlns:a14="http://schemas.microsoft.com/office/drawing/2010/main" xmlns:m="http://schemas.openxmlformats.org/officeDocument/2006/math" xmlns="" val="1"/>
+              <ma14:wrappingTextBoxFlag xmlns="" xmlns:m="http://schemas.openxmlformats.org/officeDocument/2006/math" xmlns:a14="http://schemas.microsoft.com/office/drawing/2010/main" xmlns:ma14="http://schemas.microsoft.com/office/mac/drawingml/2011/main" val="1"/>
             </a:ext>
           </a:extLst>
         </p:spPr>
@@ -10240,7 +9521,7 @@
           </a:ln>
           <a:extLst>
             <a:ext uri="{C572A759-6A51-4108-AA02-DFA0A04FC94B}">
-              <ma14:wrappingTextBoxFlag xmlns:ma14="http://schemas.microsoft.com/office/mac/drawingml/2011/main" xmlns:a14="http://schemas.microsoft.com/office/drawing/2010/main" xmlns:m="http://schemas.openxmlformats.org/officeDocument/2006/math" xmlns="" val="1"/>
+              <ma14:wrappingTextBoxFlag xmlns="" xmlns:m="http://schemas.openxmlformats.org/officeDocument/2006/math" xmlns:a14="http://schemas.microsoft.com/office/drawing/2010/main" xmlns:ma14="http://schemas.microsoft.com/office/mac/drawingml/2011/main" val="1"/>
             </a:ext>
           </a:extLst>
         </p:spPr>
@@ -10664,7 +9945,7 @@
           </a:ln>
           <a:extLst>
             <a:ext uri="{C572A759-6A51-4108-AA02-DFA0A04FC94B}">
-              <ma14:wrappingTextBoxFlag xmlns:ma14="http://schemas.microsoft.com/office/mac/drawingml/2011/main" xmlns:a14="http://schemas.microsoft.com/office/drawing/2010/main" xmlns:m="http://schemas.openxmlformats.org/officeDocument/2006/math" xmlns="" val="1"/>
+              <ma14:wrappingTextBoxFlag xmlns="" xmlns:m="http://schemas.openxmlformats.org/officeDocument/2006/math" xmlns:a14="http://schemas.microsoft.com/office/drawing/2010/main" xmlns:ma14="http://schemas.microsoft.com/office/mac/drawingml/2011/main" val="1"/>
             </a:ext>
           </a:extLst>
         </p:spPr>
@@ -10728,7 +10009,7 @@
           </a:ln>
           <a:extLst>
             <a:ext uri="{C572A759-6A51-4108-AA02-DFA0A04FC94B}">
-              <ma14:wrappingTextBoxFlag xmlns:ma14="http://schemas.microsoft.com/office/mac/drawingml/2011/main" xmlns:a14="http://schemas.microsoft.com/office/drawing/2010/main" xmlns:m="http://schemas.openxmlformats.org/officeDocument/2006/math" xmlns="" val="1"/>
+              <ma14:wrappingTextBoxFlag xmlns="" xmlns:m="http://schemas.openxmlformats.org/officeDocument/2006/math" xmlns:a14="http://schemas.microsoft.com/office/drawing/2010/main" xmlns:ma14="http://schemas.microsoft.com/office/mac/drawingml/2011/main" val="1"/>
             </a:ext>
           </a:extLst>
         </p:spPr>

</xml_diff>